<commit_message>
Metadata updates, design collateral, markdown updates.
</commit_message>
<xml_diff>
--- a/Images/All ADF Activities.pptx
+++ b/Images/All ADF Activities.pptx
@@ -2,19 +2,20 @@
 <file path=ppt/presentation.xml><?xml version="1.0" encoding="utf-8"?>
 <p:presentation xmlns:a="http://schemas.openxmlformats.org/drawingml/2006/main" xmlns:r="http://schemas.openxmlformats.org/officeDocument/2006/relationships" xmlns:p="http://schemas.openxmlformats.org/presentationml/2006/main" saveSubsetFonts="1">
   <p:sldMasterIdLst>
-    <p:sldMasterId id="2147483648" r:id="rId1"/>
+    <p:sldMasterId id="2147483660" r:id="rId1"/>
   </p:sldMasterIdLst>
   <p:sldIdLst>
     <p:sldId id="256" r:id="rId2"/>
     <p:sldId id="257" r:id="rId3"/>
+    <p:sldId id="258" r:id="rId4"/>
   </p:sldIdLst>
-  <p:sldSz cx="12192000" cy="6858000"/>
+  <p:sldSz cx="12192000" cy="10799763"/>
   <p:notesSz cx="6858000" cy="9144000"/>
   <p:defaultTextStyle>
     <a:defPPr>
       <a:defRPr lang="en-US"/>
     </a:defPPr>
-    <a:lvl1pPr marL="0" algn="l" defTabSz="914400" rtl="0" eaLnBrk="1" latinLnBrk="0" hangingPunct="1">
+    <a:lvl1pPr marL="0" algn="l" defTabSz="457200" rtl="0" eaLnBrk="1" latinLnBrk="0" hangingPunct="1">
       <a:defRPr sz="1800" kern="1200">
         <a:solidFill>
           <a:schemeClr val="tx1"/>
@@ -24,7 +25,7 @@
         <a:cs typeface="+mn-cs"/>
       </a:defRPr>
     </a:lvl1pPr>
-    <a:lvl2pPr marL="457200" algn="l" defTabSz="914400" rtl="0" eaLnBrk="1" latinLnBrk="0" hangingPunct="1">
+    <a:lvl2pPr marL="457200" algn="l" defTabSz="457200" rtl="0" eaLnBrk="1" latinLnBrk="0" hangingPunct="1">
       <a:defRPr sz="1800" kern="1200">
         <a:solidFill>
           <a:schemeClr val="tx1"/>
@@ -34,7 +35,7 @@
         <a:cs typeface="+mn-cs"/>
       </a:defRPr>
     </a:lvl2pPr>
-    <a:lvl3pPr marL="914400" algn="l" defTabSz="914400" rtl="0" eaLnBrk="1" latinLnBrk="0" hangingPunct="1">
+    <a:lvl3pPr marL="914400" algn="l" defTabSz="457200" rtl="0" eaLnBrk="1" latinLnBrk="0" hangingPunct="1">
       <a:defRPr sz="1800" kern="1200">
         <a:solidFill>
           <a:schemeClr val="tx1"/>
@@ -44,7 +45,7 @@
         <a:cs typeface="+mn-cs"/>
       </a:defRPr>
     </a:lvl3pPr>
-    <a:lvl4pPr marL="1371600" algn="l" defTabSz="914400" rtl="0" eaLnBrk="1" latinLnBrk="0" hangingPunct="1">
+    <a:lvl4pPr marL="1371600" algn="l" defTabSz="457200" rtl="0" eaLnBrk="1" latinLnBrk="0" hangingPunct="1">
       <a:defRPr sz="1800" kern="1200">
         <a:solidFill>
           <a:schemeClr val="tx1"/>
@@ -54,7 +55,7 @@
         <a:cs typeface="+mn-cs"/>
       </a:defRPr>
     </a:lvl4pPr>
-    <a:lvl5pPr marL="1828800" algn="l" defTabSz="914400" rtl="0" eaLnBrk="1" latinLnBrk="0" hangingPunct="1">
+    <a:lvl5pPr marL="1828800" algn="l" defTabSz="457200" rtl="0" eaLnBrk="1" latinLnBrk="0" hangingPunct="1">
       <a:defRPr sz="1800" kern="1200">
         <a:solidFill>
           <a:schemeClr val="tx1"/>
@@ -64,7 +65,7 @@
         <a:cs typeface="+mn-cs"/>
       </a:defRPr>
     </a:lvl5pPr>
-    <a:lvl6pPr marL="2286000" algn="l" defTabSz="914400" rtl="0" eaLnBrk="1" latinLnBrk="0" hangingPunct="1">
+    <a:lvl6pPr marL="2286000" algn="l" defTabSz="457200" rtl="0" eaLnBrk="1" latinLnBrk="0" hangingPunct="1">
       <a:defRPr sz="1800" kern="1200">
         <a:solidFill>
           <a:schemeClr val="tx1"/>
@@ -74,7 +75,7 @@
         <a:cs typeface="+mn-cs"/>
       </a:defRPr>
     </a:lvl6pPr>
-    <a:lvl7pPr marL="2743200" algn="l" defTabSz="914400" rtl="0" eaLnBrk="1" latinLnBrk="0" hangingPunct="1">
+    <a:lvl7pPr marL="2743200" algn="l" defTabSz="457200" rtl="0" eaLnBrk="1" latinLnBrk="0" hangingPunct="1">
       <a:defRPr sz="1800" kern="1200">
         <a:solidFill>
           <a:schemeClr val="tx1"/>
@@ -84,7 +85,7 @@
         <a:cs typeface="+mn-cs"/>
       </a:defRPr>
     </a:lvl7pPr>
-    <a:lvl8pPr marL="3200400" algn="l" defTabSz="914400" rtl="0" eaLnBrk="1" latinLnBrk="0" hangingPunct="1">
+    <a:lvl8pPr marL="3200400" algn="l" defTabSz="457200" rtl="0" eaLnBrk="1" latinLnBrk="0" hangingPunct="1">
       <a:defRPr sz="1800" kern="1200">
         <a:solidFill>
           <a:schemeClr val="tx1"/>
@@ -94,7 +95,7 @@
         <a:cs typeface="+mn-cs"/>
       </a:defRPr>
     </a:lvl8pPr>
-    <a:lvl9pPr marL="3657600" algn="l" defTabSz="914400" rtl="0" eaLnBrk="1" latinLnBrk="0" hangingPunct="1">
+    <a:lvl9pPr marL="3657600" algn="l" defTabSz="457200" rtl="0" eaLnBrk="1" latinLnBrk="0" hangingPunct="1">
       <a:defRPr sz="1800" kern="1200">
         <a:solidFill>
           <a:schemeClr val="tx1"/>
@@ -132,13 +133,7 @@
       </p:grpSpPr>
       <p:sp>
         <p:nvSpPr>
-          <p:cNvPr id="2" name="Title 1">
-            <a:extLst>
-              <a:ext uri="{FF2B5EF4-FFF2-40B4-BE49-F238E27FC236}">
-                <a16:creationId xmlns:a16="http://schemas.microsoft.com/office/drawing/2014/main" id="{0807243C-B5D0-4467-917F-20308BD2618A}"/>
-              </a:ext>
-            </a:extLst>
-          </p:cNvPr>
+          <p:cNvPr id="2" name="Title 1"/>
           <p:cNvSpPr>
             <a:spLocks noGrp="1"/>
           </p:cNvSpPr>
@@ -148,15 +143,15 @@
         </p:nvSpPr>
         <p:spPr>
           <a:xfrm>
-            <a:off x="1524000" y="1122363"/>
-            <a:ext cx="9144000" cy="2387600"/>
+            <a:off x="914400" y="1767462"/>
+            <a:ext cx="10363200" cy="3759917"/>
           </a:xfrm>
         </p:spPr>
         <p:txBody>
           <a:bodyPr anchor="b"/>
           <a:lstStyle>
             <a:lvl1pPr algn="ctr">
-              <a:defRPr sz="6000"/>
+              <a:defRPr sz="8000"/>
             </a:lvl1pPr>
           </a:lstStyle>
           <a:p>
@@ -164,19 +159,13 @@
               <a:rPr lang="en-US"/>
               <a:t>Click to edit Master title style</a:t>
             </a:r>
-            <a:endParaRPr lang="en-GB"/>
-          </a:p>
-        </p:txBody>
-      </p:sp>
-      <p:sp>
-        <p:nvSpPr>
-          <p:cNvPr id="3" name="Subtitle 2">
-            <a:extLst>
-              <a:ext uri="{FF2B5EF4-FFF2-40B4-BE49-F238E27FC236}">
-                <a16:creationId xmlns:a16="http://schemas.microsoft.com/office/drawing/2014/main" id="{2ABF553A-668E-4B81-995C-F8EFE12221F1}"/>
-              </a:ext>
-            </a:extLst>
-          </p:cNvPr>
+            <a:endParaRPr lang="en-US" dirty="0"/>
+          </a:p>
+        </p:txBody>
+      </p:sp>
+      <p:sp>
+        <p:nvSpPr>
+          <p:cNvPr id="3" name="Subtitle 2"/>
           <p:cNvSpPr>
             <a:spLocks noGrp="1"/>
           </p:cNvSpPr>
@@ -186,8 +175,8 @@
         </p:nvSpPr>
         <p:spPr>
           <a:xfrm>
-            <a:off x="1524000" y="3602038"/>
-            <a:ext cx="9144000" cy="1655762"/>
+            <a:off x="1524000" y="5672376"/>
+            <a:ext cx="9144000" cy="2607442"/>
           </a:xfrm>
         </p:spPr>
         <p:txBody>
@@ -195,39 +184,39 @@
           <a:lstStyle>
             <a:lvl1pPr marL="0" indent="0" algn="ctr">
               <a:buNone/>
+              <a:defRPr sz="3200"/>
+            </a:lvl1pPr>
+            <a:lvl2pPr marL="609585" indent="0" algn="ctr">
+              <a:buNone/>
+              <a:defRPr sz="2667"/>
+            </a:lvl2pPr>
+            <a:lvl3pPr marL="1219170" indent="0" algn="ctr">
+              <a:buNone/>
               <a:defRPr sz="2400"/>
-            </a:lvl1pPr>
-            <a:lvl2pPr marL="457200" indent="0" algn="ctr">
-              <a:buNone/>
-              <a:defRPr sz="2000"/>
-            </a:lvl2pPr>
-            <a:lvl3pPr marL="914400" indent="0" algn="ctr">
-              <a:buNone/>
-              <a:defRPr sz="1800"/>
             </a:lvl3pPr>
-            <a:lvl4pPr marL="1371600" indent="0" algn="ctr">
-              <a:buNone/>
-              <a:defRPr sz="1600"/>
+            <a:lvl4pPr marL="1828754" indent="0" algn="ctr">
+              <a:buNone/>
+              <a:defRPr sz="2133"/>
             </a:lvl4pPr>
-            <a:lvl5pPr marL="1828800" indent="0" algn="ctr">
-              <a:buNone/>
-              <a:defRPr sz="1600"/>
+            <a:lvl5pPr marL="2438339" indent="0" algn="ctr">
+              <a:buNone/>
+              <a:defRPr sz="2133"/>
             </a:lvl5pPr>
-            <a:lvl6pPr marL="2286000" indent="0" algn="ctr">
-              <a:buNone/>
-              <a:defRPr sz="1600"/>
+            <a:lvl6pPr marL="3047924" indent="0" algn="ctr">
+              <a:buNone/>
+              <a:defRPr sz="2133"/>
             </a:lvl6pPr>
-            <a:lvl7pPr marL="2743200" indent="0" algn="ctr">
-              <a:buNone/>
-              <a:defRPr sz="1600"/>
+            <a:lvl7pPr marL="3657509" indent="0" algn="ctr">
+              <a:buNone/>
+              <a:defRPr sz="2133"/>
             </a:lvl7pPr>
-            <a:lvl8pPr marL="3200400" indent="0" algn="ctr">
-              <a:buNone/>
-              <a:defRPr sz="1600"/>
+            <a:lvl8pPr marL="4267093" indent="0" algn="ctr">
+              <a:buNone/>
+              <a:defRPr sz="2133"/>
             </a:lvl8pPr>
-            <a:lvl9pPr marL="3657600" indent="0" algn="ctr">
-              <a:buNone/>
-              <a:defRPr sz="1600"/>
+            <a:lvl9pPr marL="4876678" indent="0" algn="ctr">
+              <a:buNone/>
+              <a:defRPr sz="2133"/>
             </a:lvl9pPr>
           </a:lstStyle>
           <a:p>
@@ -235,19 +224,13 @@
               <a:rPr lang="en-US"/>
               <a:t>Click to edit Master subtitle style</a:t>
             </a:r>
-            <a:endParaRPr lang="en-GB"/>
-          </a:p>
-        </p:txBody>
-      </p:sp>
-      <p:sp>
-        <p:nvSpPr>
-          <p:cNvPr id="4" name="Date Placeholder 3">
-            <a:extLst>
-              <a:ext uri="{FF2B5EF4-FFF2-40B4-BE49-F238E27FC236}">
-                <a16:creationId xmlns:a16="http://schemas.microsoft.com/office/drawing/2014/main" id="{2B7F6456-1B13-46C2-AD94-2B5406595514}"/>
-              </a:ext>
-            </a:extLst>
-          </p:cNvPr>
+            <a:endParaRPr lang="en-US" dirty="0"/>
+          </a:p>
+        </p:txBody>
+      </p:sp>
+      <p:sp>
+        <p:nvSpPr>
+          <p:cNvPr id="4" name="Date Placeholder 3"/>
           <p:cNvSpPr>
             <a:spLocks noGrp="1"/>
           </p:cNvSpPr>
@@ -262,7 +245,7 @@
           <a:p>
             <a:fld id="{1F80DB50-5271-4B1A-976D-0A7715B55622}" type="datetimeFigureOut">
               <a:rPr lang="en-GB" smtClean="0"/>
-              <a:t>02/03/2020</a:t>
+              <a:t>10/03/2020</a:t>
             </a:fld>
             <a:endParaRPr lang="en-GB"/>
           </a:p>
@@ -270,13 +253,7 @@
       </p:sp>
       <p:sp>
         <p:nvSpPr>
-          <p:cNvPr id="5" name="Footer Placeholder 4">
-            <a:extLst>
-              <a:ext uri="{FF2B5EF4-FFF2-40B4-BE49-F238E27FC236}">
-                <a16:creationId xmlns:a16="http://schemas.microsoft.com/office/drawing/2014/main" id="{EB826C43-5265-48E5-BB31-3EB8201FE3A1}"/>
-              </a:ext>
-            </a:extLst>
-          </p:cNvPr>
+          <p:cNvPr id="5" name="Footer Placeholder 4"/>
           <p:cNvSpPr>
             <a:spLocks noGrp="1"/>
           </p:cNvSpPr>
@@ -295,13 +272,7 @@
       </p:sp>
       <p:sp>
         <p:nvSpPr>
-          <p:cNvPr id="6" name="Slide Number Placeholder 5">
-            <a:extLst>
-              <a:ext uri="{FF2B5EF4-FFF2-40B4-BE49-F238E27FC236}">
-                <a16:creationId xmlns:a16="http://schemas.microsoft.com/office/drawing/2014/main" id="{25E91CC8-10D9-4698-8AEF-0070632E877C}"/>
-              </a:ext>
-            </a:extLst>
-          </p:cNvPr>
+          <p:cNvPr id="6" name="Slide Number Placeholder 5"/>
           <p:cNvSpPr>
             <a:spLocks noGrp="1"/>
           </p:cNvSpPr>
@@ -325,7 +296,7 @@
     </p:spTree>
     <p:extLst>
       <p:ext uri="{BB962C8B-B14F-4D97-AF65-F5344CB8AC3E}">
-        <p14:creationId xmlns:p14="http://schemas.microsoft.com/office/powerpoint/2010/main" val="467715797"/>
+        <p14:creationId xmlns:p14="http://schemas.microsoft.com/office/powerpoint/2010/main" val="3440236250"/>
       </p:ext>
     </p:extLst>
   </p:cSld>
@@ -354,13 +325,7 @@
       </p:grpSpPr>
       <p:sp>
         <p:nvSpPr>
-          <p:cNvPr id="2" name="Title 1">
-            <a:extLst>
-              <a:ext uri="{FF2B5EF4-FFF2-40B4-BE49-F238E27FC236}">
-                <a16:creationId xmlns:a16="http://schemas.microsoft.com/office/drawing/2014/main" id="{CBF62869-614D-46BF-8093-384C230EFBA1}"/>
-              </a:ext>
-            </a:extLst>
-          </p:cNvPr>
+          <p:cNvPr id="2" name="Title 1"/>
           <p:cNvSpPr>
             <a:spLocks noGrp="1"/>
           </p:cNvSpPr>
@@ -377,19 +342,13 @@
               <a:rPr lang="en-US"/>
               <a:t>Click to edit Master title style</a:t>
             </a:r>
-            <a:endParaRPr lang="en-GB"/>
-          </a:p>
-        </p:txBody>
-      </p:sp>
-      <p:sp>
-        <p:nvSpPr>
-          <p:cNvPr id="3" name="Vertical Text Placeholder 2">
-            <a:extLst>
-              <a:ext uri="{FF2B5EF4-FFF2-40B4-BE49-F238E27FC236}">
-                <a16:creationId xmlns:a16="http://schemas.microsoft.com/office/drawing/2014/main" id="{F76CD6BD-A9DA-4B4E-8928-1670E7539B54}"/>
-              </a:ext>
-            </a:extLst>
-          </p:cNvPr>
+            <a:endParaRPr lang="en-US" dirty="0"/>
+          </a:p>
+        </p:txBody>
+      </p:sp>
+      <p:sp>
+        <p:nvSpPr>
+          <p:cNvPr id="3" name="Vertical Text Placeholder 2"/>
           <p:cNvSpPr>
             <a:spLocks noGrp="1"/>
           </p:cNvSpPr>
@@ -435,19 +394,13 @@
               <a:rPr lang="en-US"/>
               <a:t>Fifth level</a:t>
             </a:r>
-            <a:endParaRPr lang="en-GB"/>
-          </a:p>
-        </p:txBody>
-      </p:sp>
-      <p:sp>
-        <p:nvSpPr>
-          <p:cNvPr id="4" name="Date Placeholder 3">
-            <a:extLst>
-              <a:ext uri="{FF2B5EF4-FFF2-40B4-BE49-F238E27FC236}">
-                <a16:creationId xmlns:a16="http://schemas.microsoft.com/office/drawing/2014/main" id="{0B4ABBEA-4892-4AAA-8C52-503D1601BE75}"/>
-              </a:ext>
-            </a:extLst>
-          </p:cNvPr>
+            <a:endParaRPr lang="en-US" dirty="0"/>
+          </a:p>
+        </p:txBody>
+      </p:sp>
+      <p:sp>
+        <p:nvSpPr>
+          <p:cNvPr id="4" name="Date Placeholder 3"/>
           <p:cNvSpPr>
             <a:spLocks noGrp="1"/>
           </p:cNvSpPr>
@@ -462,7 +415,7 @@
           <a:p>
             <a:fld id="{1F80DB50-5271-4B1A-976D-0A7715B55622}" type="datetimeFigureOut">
               <a:rPr lang="en-GB" smtClean="0"/>
-              <a:t>02/03/2020</a:t>
+              <a:t>10/03/2020</a:t>
             </a:fld>
             <a:endParaRPr lang="en-GB"/>
           </a:p>
@@ -470,13 +423,7 @@
       </p:sp>
       <p:sp>
         <p:nvSpPr>
-          <p:cNvPr id="5" name="Footer Placeholder 4">
-            <a:extLst>
-              <a:ext uri="{FF2B5EF4-FFF2-40B4-BE49-F238E27FC236}">
-                <a16:creationId xmlns:a16="http://schemas.microsoft.com/office/drawing/2014/main" id="{B07E6D13-6D56-437C-804B-F87D4E0B4A3B}"/>
-              </a:ext>
-            </a:extLst>
-          </p:cNvPr>
+          <p:cNvPr id="5" name="Footer Placeholder 4"/>
           <p:cNvSpPr>
             <a:spLocks noGrp="1"/>
           </p:cNvSpPr>
@@ -495,13 +442,7 @@
       </p:sp>
       <p:sp>
         <p:nvSpPr>
-          <p:cNvPr id="6" name="Slide Number Placeholder 5">
-            <a:extLst>
-              <a:ext uri="{FF2B5EF4-FFF2-40B4-BE49-F238E27FC236}">
-                <a16:creationId xmlns:a16="http://schemas.microsoft.com/office/drawing/2014/main" id="{0EF5CB02-122B-41BF-A696-4EDC7D05A267}"/>
-              </a:ext>
-            </a:extLst>
-          </p:cNvPr>
+          <p:cNvPr id="6" name="Slide Number Placeholder 5"/>
           <p:cNvSpPr>
             <a:spLocks noGrp="1"/>
           </p:cNvSpPr>
@@ -525,7 +466,7 @@
     </p:spTree>
     <p:extLst>
       <p:ext uri="{BB962C8B-B14F-4D97-AF65-F5344CB8AC3E}">
-        <p14:creationId xmlns:p14="http://schemas.microsoft.com/office/powerpoint/2010/main" val="1016529794"/>
+        <p14:creationId xmlns:p14="http://schemas.microsoft.com/office/powerpoint/2010/main" val="2882513047"/>
       </p:ext>
     </p:extLst>
   </p:cSld>
@@ -554,13 +495,7 @@
       </p:grpSpPr>
       <p:sp>
         <p:nvSpPr>
-          <p:cNvPr id="2" name="Vertical Title 1">
-            <a:extLst>
-              <a:ext uri="{FF2B5EF4-FFF2-40B4-BE49-F238E27FC236}">
-                <a16:creationId xmlns:a16="http://schemas.microsoft.com/office/drawing/2014/main" id="{D25BC74C-3981-426B-BE9C-F8A11A816E14}"/>
-              </a:ext>
-            </a:extLst>
-          </p:cNvPr>
+          <p:cNvPr id="2" name="Vertical Title 1"/>
           <p:cNvSpPr>
             <a:spLocks noGrp="1"/>
           </p:cNvSpPr>
@@ -570,8 +505,8 @@
         </p:nvSpPr>
         <p:spPr>
           <a:xfrm>
-            <a:off x="8724900" y="365125"/>
-            <a:ext cx="2628900" cy="5811838"/>
+            <a:off x="8724901" y="574987"/>
+            <a:ext cx="2628900" cy="9152300"/>
           </a:xfrm>
         </p:spPr>
         <p:txBody>
@@ -582,19 +517,13 @@
               <a:rPr lang="en-US"/>
               <a:t>Click to edit Master title style</a:t>
             </a:r>
-            <a:endParaRPr lang="en-GB"/>
-          </a:p>
-        </p:txBody>
-      </p:sp>
-      <p:sp>
-        <p:nvSpPr>
-          <p:cNvPr id="3" name="Vertical Text Placeholder 2">
-            <a:extLst>
-              <a:ext uri="{FF2B5EF4-FFF2-40B4-BE49-F238E27FC236}">
-                <a16:creationId xmlns:a16="http://schemas.microsoft.com/office/drawing/2014/main" id="{1AC9A89F-682D-4C65-9AD2-373A28E8140D}"/>
-              </a:ext>
-            </a:extLst>
-          </p:cNvPr>
+            <a:endParaRPr lang="en-US" dirty="0"/>
+          </a:p>
+        </p:txBody>
+      </p:sp>
+      <p:sp>
+        <p:nvSpPr>
+          <p:cNvPr id="3" name="Vertical Text Placeholder 2"/>
           <p:cNvSpPr>
             <a:spLocks noGrp="1"/>
           </p:cNvSpPr>
@@ -604,8 +533,8 @@
         </p:nvSpPr>
         <p:spPr>
           <a:xfrm>
-            <a:off x="838200" y="365125"/>
-            <a:ext cx="7734300" cy="5811838"/>
+            <a:off x="838201" y="574987"/>
+            <a:ext cx="7734300" cy="9152300"/>
           </a:xfrm>
         </p:spPr>
         <p:txBody>
@@ -645,19 +574,13 @@
               <a:rPr lang="en-US"/>
               <a:t>Fifth level</a:t>
             </a:r>
-            <a:endParaRPr lang="en-GB"/>
-          </a:p>
-        </p:txBody>
-      </p:sp>
-      <p:sp>
-        <p:nvSpPr>
-          <p:cNvPr id="4" name="Date Placeholder 3">
-            <a:extLst>
-              <a:ext uri="{FF2B5EF4-FFF2-40B4-BE49-F238E27FC236}">
-                <a16:creationId xmlns:a16="http://schemas.microsoft.com/office/drawing/2014/main" id="{DB33FD61-22A0-4B9A-A228-99A891AE47FB}"/>
-              </a:ext>
-            </a:extLst>
-          </p:cNvPr>
+            <a:endParaRPr lang="en-US" dirty="0"/>
+          </a:p>
+        </p:txBody>
+      </p:sp>
+      <p:sp>
+        <p:nvSpPr>
+          <p:cNvPr id="4" name="Date Placeholder 3"/>
           <p:cNvSpPr>
             <a:spLocks noGrp="1"/>
           </p:cNvSpPr>
@@ -672,7 +595,7 @@
           <a:p>
             <a:fld id="{1F80DB50-5271-4B1A-976D-0A7715B55622}" type="datetimeFigureOut">
               <a:rPr lang="en-GB" smtClean="0"/>
-              <a:t>02/03/2020</a:t>
+              <a:t>10/03/2020</a:t>
             </a:fld>
             <a:endParaRPr lang="en-GB"/>
           </a:p>
@@ -680,13 +603,7 @@
       </p:sp>
       <p:sp>
         <p:nvSpPr>
-          <p:cNvPr id="5" name="Footer Placeholder 4">
-            <a:extLst>
-              <a:ext uri="{FF2B5EF4-FFF2-40B4-BE49-F238E27FC236}">
-                <a16:creationId xmlns:a16="http://schemas.microsoft.com/office/drawing/2014/main" id="{D1A79CAB-1FB6-4DD2-AC69-E134DC8B4A4C}"/>
-              </a:ext>
-            </a:extLst>
-          </p:cNvPr>
+          <p:cNvPr id="5" name="Footer Placeholder 4"/>
           <p:cNvSpPr>
             <a:spLocks noGrp="1"/>
           </p:cNvSpPr>
@@ -705,13 +622,7 @@
       </p:sp>
       <p:sp>
         <p:nvSpPr>
-          <p:cNvPr id="6" name="Slide Number Placeholder 5">
-            <a:extLst>
-              <a:ext uri="{FF2B5EF4-FFF2-40B4-BE49-F238E27FC236}">
-                <a16:creationId xmlns:a16="http://schemas.microsoft.com/office/drawing/2014/main" id="{C002AEB7-968D-4CA8-BFF5-95F774A54A91}"/>
-              </a:ext>
-            </a:extLst>
-          </p:cNvPr>
+          <p:cNvPr id="6" name="Slide Number Placeholder 5"/>
           <p:cNvSpPr>
             <a:spLocks noGrp="1"/>
           </p:cNvSpPr>
@@ -735,7 +646,7 @@
     </p:spTree>
     <p:extLst>
       <p:ext uri="{BB962C8B-B14F-4D97-AF65-F5344CB8AC3E}">
-        <p14:creationId xmlns:p14="http://schemas.microsoft.com/office/powerpoint/2010/main" val="2007562757"/>
+        <p14:creationId xmlns:p14="http://schemas.microsoft.com/office/powerpoint/2010/main" val="4023126191"/>
       </p:ext>
     </p:extLst>
   </p:cSld>
@@ -764,13 +675,7 @@
       </p:grpSpPr>
       <p:sp>
         <p:nvSpPr>
-          <p:cNvPr id="2" name="Title 1">
-            <a:extLst>
-              <a:ext uri="{FF2B5EF4-FFF2-40B4-BE49-F238E27FC236}">
-                <a16:creationId xmlns:a16="http://schemas.microsoft.com/office/drawing/2014/main" id="{6DAC8324-DC6A-487B-A69F-77671A7B5B53}"/>
-              </a:ext>
-            </a:extLst>
-          </p:cNvPr>
+          <p:cNvPr id="2" name="Title 1"/>
           <p:cNvSpPr>
             <a:spLocks noGrp="1"/>
           </p:cNvSpPr>
@@ -787,19 +692,13 @@
               <a:rPr lang="en-US"/>
               <a:t>Click to edit Master title style</a:t>
             </a:r>
-            <a:endParaRPr lang="en-GB"/>
-          </a:p>
-        </p:txBody>
-      </p:sp>
-      <p:sp>
-        <p:nvSpPr>
-          <p:cNvPr id="3" name="Content Placeholder 2">
-            <a:extLst>
-              <a:ext uri="{FF2B5EF4-FFF2-40B4-BE49-F238E27FC236}">
-                <a16:creationId xmlns:a16="http://schemas.microsoft.com/office/drawing/2014/main" id="{9502174C-EC91-4660-84F5-0F70C931A50B}"/>
-              </a:ext>
-            </a:extLst>
-          </p:cNvPr>
+            <a:endParaRPr lang="en-US" dirty="0"/>
+          </a:p>
+        </p:txBody>
+      </p:sp>
+      <p:sp>
+        <p:nvSpPr>
+          <p:cNvPr id="3" name="Content Placeholder 2"/>
           <p:cNvSpPr>
             <a:spLocks noGrp="1"/>
           </p:cNvSpPr>
@@ -845,19 +744,13 @@
               <a:rPr lang="en-US"/>
               <a:t>Fifth level</a:t>
             </a:r>
-            <a:endParaRPr lang="en-GB"/>
-          </a:p>
-        </p:txBody>
-      </p:sp>
-      <p:sp>
-        <p:nvSpPr>
-          <p:cNvPr id="4" name="Date Placeholder 3">
-            <a:extLst>
-              <a:ext uri="{FF2B5EF4-FFF2-40B4-BE49-F238E27FC236}">
-                <a16:creationId xmlns:a16="http://schemas.microsoft.com/office/drawing/2014/main" id="{30D5540B-5FE7-4189-AE98-53E9E0E1F691}"/>
-              </a:ext>
-            </a:extLst>
-          </p:cNvPr>
+            <a:endParaRPr lang="en-US" dirty="0"/>
+          </a:p>
+        </p:txBody>
+      </p:sp>
+      <p:sp>
+        <p:nvSpPr>
+          <p:cNvPr id="4" name="Date Placeholder 3"/>
           <p:cNvSpPr>
             <a:spLocks noGrp="1"/>
           </p:cNvSpPr>
@@ -872,7 +765,7 @@
           <a:p>
             <a:fld id="{1F80DB50-5271-4B1A-976D-0A7715B55622}" type="datetimeFigureOut">
               <a:rPr lang="en-GB" smtClean="0"/>
-              <a:t>02/03/2020</a:t>
+              <a:t>10/03/2020</a:t>
             </a:fld>
             <a:endParaRPr lang="en-GB"/>
           </a:p>
@@ -880,13 +773,7 @@
       </p:sp>
       <p:sp>
         <p:nvSpPr>
-          <p:cNvPr id="5" name="Footer Placeholder 4">
-            <a:extLst>
-              <a:ext uri="{FF2B5EF4-FFF2-40B4-BE49-F238E27FC236}">
-                <a16:creationId xmlns:a16="http://schemas.microsoft.com/office/drawing/2014/main" id="{14BDA942-B791-4D00-997D-AEEB588DCA2D}"/>
-              </a:ext>
-            </a:extLst>
-          </p:cNvPr>
+          <p:cNvPr id="5" name="Footer Placeholder 4"/>
           <p:cNvSpPr>
             <a:spLocks noGrp="1"/>
           </p:cNvSpPr>
@@ -905,13 +792,7 @@
       </p:sp>
       <p:sp>
         <p:nvSpPr>
-          <p:cNvPr id="6" name="Slide Number Placeholder 5">
-            <a:extLst>
-              <a:ext uri="{FF2B5EF4-FFF2-40B4-BE49-F238E27FC236}">
-                <a16:creationId xmlns:a16="http://schemas.microsoft.com/office/drawing/2014/main" id="{1896219D-5E98-45EC-A163-528C576AFD40}"/>
-              </a:ext>
-            </a:extLst>
-          </p:cNvPr>
+          <p:cNvPr id="6" name="Slide Number Placeholder 5"/>
           <p:cNvSpPr>
             <a:spLocks noGrp="1"/>
           </p:cNvSpPr>
@@ -935,7 +816,7 @@
     </p:spTree>
     <p:extLst>
       <p:ext uri="{BB962C8B-B14F-4D97-AF65-F5344CB8AC3E}">
-        <p14:creationId xmlns:p14="http://schemas.microsoft.com/office/powerpoint/2010/main" val="4278596413"/>
+        <p14:creationId xmlns:p14="http://schemas.microsoft.com/office/powerpoint/2010/main" val="1987097556"/>
       </p:ext>
     </p:extLst>
   </p:cSld>
@@ -964,13 +845,7 @@
       </p:grpSpPr>
       <p:sp>
         <p:nvSpPr>
-          <p:cNvPr id="2" name="Title 1">
-            <a:extLst>
-              <a:ext uri="{FF2B5EF4-FFF2-40B4-BE49-F238E27FC236}">
-                <a16:creationId xmlns:a16="http://schemas.microsoft.com/office/drawing/2014/main" id="{2E3AC82C-397C-4211-AD59-0F2498AE2D8F}"/>
-              </a:ext>
-            </a:extLst>
-          </p:cNvPr>
+          <p:cNvPr id="2" name="Title 1"/>
           <p:cNvSpPr>
             <a:spLocks noGrp="1"/>
           </p:cNvSpPr>
@@ -980,15 +855,15 @@
         </p:nvSpPr>
         <p:spPr>
           <a:xfrm>
-            <a:off x="831850" y="1709738"/>
-            <a:ext cx="10515600" cy="2852737"/>
+            <a:off x="831851" y="2692444"/>
+            <a:ext cx="10515600" cy="4492401"/>
           </a:xfrm>
         </p:spPr>
         <p:txBody>
           <a:bodyPr anchor="b"/>
           <a:lstStyle>
             <a:lvl1pPr>
-              <a:defRPr sz="6000"/>
+              <a:defRPr sz="8000"/>
             </a:lvl1pPr>
           </a:lstStyle>
           <a:p>
@@ -996,19 +871,13 @@
               <a:rPr lang="en-US"/>
               <a:t>Click to edit Master title style</a:t>
             </a:r>
-            <a:endParaRPr lang="en-GB"/>
-          </a:p>
-        </p:txBody>
-      </p:sp>
-      <p:sp>
-        <p:nvSpPr>
-          <p:cNvPr id="3" name="Text Placeholder 2">
-            <a:extLst>
-              <a:ext uri="{FF2B5EF4-FFF2-40B4-BE49-F238E27FC236}">
-                <a16:creationId xmlns:a16="http://schemas.microsoft.com/office/drawing/2014/main" id="{DB9DF1BF-C62D-45C9-99F4-4886CC3B919A}"/>
-              </a:ext>
-            </a:extLst>
-          </p:cNvPr>
+            <a:endParaRPr lang="en-US" dirty="0"/>
+          </a:p>
+        </p:txBody>
+      </p:sp>
+      <p:sp>
+        <p:nvSpPr>
+          <p:cNvPr id="3" name="Text Placeholder 2"/>
           <p:cNvSpPr>
             <a:spLocks noGrp="1"/>
           </p:cNvSpPr>
@@ -1018,14 +887,32 @@
         </p:nvSpPr>
         <p:spPr>
           <a:xfrm>
-            <a:off x="831850" y="4589463"/>
-            <a:ext cx="10515600" cy="1500187"/>
+            <a:off x="831851" y="7227345"/>
+            <a:ext cx="10515600" cy="2362447"/>
           </a:xfrm>
         </p:spPr>
         <p:txBody>
           <a:bodyPr/>
           <a:lstStyle>
             <a:lvl1pPr marL="0" indent="0">
+              <a:buNone/>
+              <a:defRPr sz="3200">
+                <a:solidFill>
+                  <a:schemeClr val="tx1"/>
+                </a:solidFill>
+              </a:defRPr>
+            </a:lvl1pPr>
+            <a:lvl2pPr marL="609585" indent="0">
+              <a:buNone/>
+              <a:defRPr sz="2667">
+                <a:solidFill>
+                  <a:schemeClr val="tx1">
+                    <a:tint val="75000"/>
+                  </a:schemeClr>
+                </a:solidFill>
+              </a:defRPr>
+            </a:lvl2pPr>
+            <a:lvl3pPr marL="1219170" indent="0">
               <a:buNone/>
               <a:defRPr sz="2400">
                 <a:solidFill>
@@ -1034,30 +921,10 @@
                   </a:schemeClr>
                 </a:solidFill>
               </a:defRPr>
-            </a:lvl1pPr>
-            <a:lvl2pPr marL="457200" indent="0">
-              <a:buNone/>
-              <a:defRPr sz="2000">
-                <a:solidFill>
-                  <a:schemeClr val="tx1">
-                    <a:tint val="75000"/>
-                  </a:schemeClr>
-                </a:solidFill>
-              </a:defRPr>
-            </a:lvl2pPr>
-            <a:lvl3pPr marL="914400" indent="0">
-              <a:buNone/>
-              <a:defRPr sz="1800">
-                <a:solidFill>
-                  <a:schemeClr val="tx1">
-                    <a:tint val="75000"/>
-                  </a:schemeClr>
-                </a:solidFill>
-              </a:defRPr>
             </a:lvl3pPr>
-            <a:lvl4pPr marL="1371600" indent="0">
-              <a:buNone/>
-              <a:defRPr sz="1600">
+            <a:lvl4pPr marL="1828754" indent="0">
+              <a:buNone/>
+              <a:defRPr sz="2133">
                 <a:solidFill>
                   <a:schemeClr val="tx1">
                     <a:tint val="75000"/>
@@ -1065,9 +932,9 @@
                 </a:solidFill>
               </a:defRPr>
             </a:lvl4pPr>
-            <a:lvl5pPr marL="1828800" indent="0">
-              <a:buNone/>
-              <a:defRPr sz="1600">
+            <a:lvl5pPr marL="2438339" indent="0">
+              <a:buNone/>
+              <a:defRPr sz="2133">
                 <a:solidFill>
                   <a:schemeClr val="tx1">
                     <a:tint val="75000"/>
@@ -1075,9 +942,9 @@
                 </a:solidFill>
               </a:defRPr>
             </a:lvl5pPr>
-            <a:lvl6pPr marL="2286000" indent="0">
-              <a:buNone/>
-              <a:defRPr sz="1600">
+            <a:lvl6pPr marL="3047924" indent="0">
+              <a:buNone/>
+              <a:defRPr sz="2133">
                 <a:solidFill>
                   <a:schemeClr val="tx1">
                     <a:tint val="75000"/>
@@ -1085,9 +952,9 @@
                 </a:solidFill>
               </a:defRPr>
             </a:lvl6pPr>
-            <a:lvl7pPr marL="2743200" indent="0">
-              <a:buNone/>
-              <a:defRPr sz="1600">
+            <a:lvl7pPr marL="3657509" indent="0">
+              <a:buNone/>
+              <a:defRPr sz="2133">
                 <a:solidFill>
                   <a:schemeClr val="tx1">
                     <a:tint val="75000"/>
@@ -1095,9 +962,9 @@
                 </a:solidFill>
               </a:defRPr>
             </a:lvl7pPr>
-            <a:lvl8pPr marL="3200400" indent="0">
-              <a:buNone/>
-              <a:defRPr sz="1600">
+            <a:lvl8pPr marL="4267093" indent="0">
+              <a:buNone/>
+              <a:defRPr sz="2133">
                 <a:solidFill>
                   <a:schemeClr val="tx1">
                     <a:tint val="75000"/>
@@ -1105,9 +972,9 @@
                 </a:solidFill>
               </a:defRPr>
             </a:lvl8pPr>
-            <a:lvl9pPr marL="3657600" indent="0">
-              <a:buNone/>
-              <a:defRPr sz="1600">
+            <a:lvl9pPr marL="4876678" indent="0">
+              <a:buNone/>
+              <a:defRPr sz="2133">
                 <a:solidFill>
                   <a:schemeClr val="tx1">
                     <a:tint val="75000"/>
@@ -1127,13 +994,7 @@
       </p:sp>
       <p:sp>
         <p:nvSpPr>
-          <p:cNvPr id="4" name="Date Placeholder 3">
-            <a:extLst>
-              <a:ext uri="{FF2B5EF4-FFF2-40B4-BE49-F238E27FC236}">
-                <a16:creationId xmlns:a16="http://schemas.microsoft.com/office/drawing/2014/main" id="{C2228705-E184-4084-8E1D-BDE01F6C8D78}"/>
-              </a:ext>
-            </a:extLst>
-          </p:cNvPr>
+          <p:cNvPr id="4" name="Date Placeholder 3"/>
           <p:cNvSpPr>
             <a:spLocks noGrp="1"/>
           </p:cNvSpPr>
@@ -1148,7 +1009,7 @@
           <a:p>
             <a:fld id="{1F80DB50-5271-4B1A-976D-0A7715B55622}" type="datetimeFigureOut">
               <a:rPr lang="en-GB" smtClean="0"/>
-              <a:t>02/03/2020</a:t>
+              <a:t>10/03/2020</a:t>
             </a:fld>
             <a:endParaRPr lang="en-GB"/>
           </a:p>
@@ -1156,13 +1017,7 @@
       </p:sp>
       <p:sp>
         <p:nvSpPr>
-          <p:cNvPr id="5" name="Footer Placeholder 4">
-            <a:extLst>
-              <a:ext uri="{FF2B5EF4-FFF2-40B4-BE49-F238E27FC236}">
-                <a16:creationId xmlns:a16="http://schemas.microsoft.com/office/drawing/2014/main" id="{6FF137A4-522B-400B-9AE4-C476698FD80E}"/>
-              </a:ext>
-            </a:extLst>
-          </p:cNvPr>
+          <p:cNvPr id="5" name="Footer Placeholder 4"/>
           <p:cNvSpPr>
             <a:spLocks noGrp="1"/>
           </p:cNvSpPr>
@@ -1181,13 +1036,7 @@
       </p:sp>
       <p:sp>
         <p:nvSpPr>
-          <p:cNvPr id="6" name="Slide Number Placeholder 5">
-            <a:extLst>
-              <a:ext uri="{FF2B5EF4-FFF2-40B4-BE49-F238E27FC236}">
-                <a16:creationId xmlns:a16="http://schemas.microsoft.com/office/drawing/2014/main" id="{8510FDFC-EE85-46EA-9B2A-E49602DC795A}"/>
-              </a:ext>
-            </a:extLst>
-          </p:cNvPr>
+          <p:cNvPr id="6" name="Slide Number Placeholder 5"/>
           <p:cNvSpPr>
             <a:spLocks noGrp="1"/>
           </p:cNvSpPr>
@@ -1211,7 +1060,7 @@
     </p:spTree>
     <p:extLst>
       <p:ext uri="{BB962C8B-B14F-4D97-AF65-F5344CB8AC3E}">
-        <p14:creationId xmlns:p14="http://schemas.microsoft.com/office/powerpoint/2010/main" val="2274796905"/>
+        <p14:creationId xmlns:p14="http://schemas.microsoft.com/office/powerpoint/2010/main" val="3875938107"/>
       </p:ext>
     </p:extLst>
   </p:cSld>
@@ -1240,13 +1089,7 @@
       </p:grpSpPr>
       <p:sp>
         <p:nvSpPr>
-          <p:cNvPr id="2" name="Title 1">
-            <a:extLst>
-              <a:ext uri="{FF2B5EF4-FFF2-40B4-BE49-F238E27FC236}">
-                <a16:creationId xmlns:a16="http://schemas.microsoft.com/office/drawing/2014/main" id="{EF806699-571C-4511-8F43-375823B81D1F}"/>
-              </a:ext>
-            </a:extLst>
-          </p:cNvPr>
+          <p:cNvPr id="2" name="Title 1"/>
           <p:cNvSpPr>
             <a:spLocks noGrp="1"/>
           </p:cNvSpPr>
@@ -1263,19 +1106,13 @@
               <a:rPr lang="en-US"/>
               <a:t>Click to edit Master title style</a:t>
             </a:r>
-            <a:endParaRPr lang="en-GB"/>
-          </a:p>
-        </p:txBody>
-      </p:sp>
-      <p:sp>
-        <p:nvSpPr>
-          <p:cNvPr id="3" name="Content Placeholder 2">
-            <a:extLst>
-              <a:ext uri="{FF2B5EF4-FFF2-40B4-BE49-F238E27FC236}">
-                <a16:creationId xmlns:a16="http://schemas.microsoft.com/office/drawing/2014/main" id="{00B6FE52-0B38-4B5C-BB4F-67D276897D3F}"/>
-              </a:ext>
-            </a:extLst>
-          </p:cNvPr>
+            <a:endParaRPr lang="en-US" dirty="0"/>
+          </a:p>
+        </p:txBody>
+      </p:sp>
+      <p:sp>
+        <p:nvSpPr>
+          <p:cNvPr id="3" name="Content Placeholder 2"/>
           <p:cNvSpPr>
             <a:spLocks noGrp="1"/>
           </p:cNvSpPr>
@@ -1285,8 +1122,8 @@
         </p:nvSpPr>
         <p:spPr>
           <a:xfrm>
-            <a:off x="838200" y="1825625"/>
-            <a:ext cx="5181600" cy="4351338"/>
+            <a:off x="838200" y="2874937"/>
+            <a:ext cx="5181600" cy="6852350"/>
           </a:xfrm>
         </p:spPr>
         <p:txBody>
@@ -1326,19 +1163,13 @@
               <a:rPr lang="en-US"/>
               <a:t>Fifth level</a:t>
             </a:r>
-            <a:endParaRPr lang="en-GB"/>
-          </a:p>
-        </p:txBody>
-      </p:sp>
-      <p:sp>
-        <p:nvSpPr>
-          <p:cNvPr id="4" name="Content Placeholder 3">
-            <a:extLst>
-              <a:ext uri="{FF2B5EF4-FFF2-40B4-BE49-F238E27FC236}">
-                <a16:creationId xmlns:a16="http://schemas.microsoft.com/office/drawing/2014/main" id="{E7ABF4D3-7C72-4EC3-91E6-3E030DA7DC5F}"/>
-              </a:ext>
-            </a:extLst>
-          </p:cNvPr>
+            <a:endParaRPr lang="en-US" dirty="0"/>
+          </a:p>
+        </p:txBody>
+      </p:sp>
+      <p:sp>
+        <p:nvSpPr>
+          <p:cNvPr id="4" name="Content Placeholder 3"/>
           <p:cNvSpPr>
             <a:spLocks noGrp="1"/>
           </p:cNvSpPr>
@@ -1348,8 +1179,8 @@
         </p:nvSpPr>
         <p:spPr>
           <a:xfrm>
-            <a:off x="6172200" y="1825625"/>
-            <a:ext cx="5181600" cy="4351338"/>
+            <a:off x="6172200" y="2874937"/>
+            <a:ext cx="5181600" cy="6852350"/>
           </a:xfrm>
         </p:spPr>
         <p:txBody>
@@ -1389,19 +1220,13 @@
               <a:rPr lang="en-US"/>
               <a:t>Fifth level</a:t>
             </a:r>
-            <a:endParaRPr lang="en-GB"/>
-          </a:p>
-        </p:txBody>
-      </p:sp>
-      <p:sp>
-        <p:nvSpPr>
-          <p:cNvPr id="5" name="Date Placeholder 4">
-            <a:extLst>
-              <a:ext uri="{FF2B5EF4-FFF2-40B4-BE49-F238E27FC236}">
-                <a16:creationId xmlns:a16="http://schemas.microsoft.com/office/drawing/2014/main" id="{7B771F3F-F0DD-4323-8A44-1DCB51D21A50}"/>
-              </a:ext>
-            </a:extLst>
-          </p:cNvPr>
+            <a:endParaRPr lang="en-US" dirty="0"/>
+          </a:p>
+        </p:txBody>
+      </p:sp>
+      <p:sp>
+        <p:nvSpPr>
+          <p:cNvPr id="5" name="Date Placeholder 4"/>
           <p:cNvSpPr>
             <a:spLocks noGrp="1"/>
           </p:cNvSpPr>
@@ -1416,7 +1241,7 @@
           <a:p>
             <a:fld id="{1F80DB50-5271-4B1A-976D-0A7715B55622}" type="datetimeFigureOut">
               <a:rPr lang="en-GB" smtClean="0"/>
-              <a:t>02/03/2020</a:t>
+              <a:t>10/03/2020</a:t>
             </a:fld>
             <a:endParaRPr lang="en-GB"/>
           </a:p>
@@ -1424,13 +1249,7 @@
       </p:sp>
       <p:sp>
         <p:nvSpPr>
-          <p:cNvPr id="6" name="Footer Placeholder 5">
-            <a:extLst>
-              <a:ext uri="{FF2B5EF4-FFF2-40B4-BE49-F238E27FC236}">
-                <a16:creationId xmlns:a16="http://schemas.microsoft.com/office/drawing/2014/main" id="{FCB0C440-C968-4363-9980-E1E3A786D518}"/>
-              </a:ext>
-            </a:extLst>
-          </p:cNvPr>
+          <p:cNvPr id="6" name="Footer Placeholder 5"/>
           <p:cNvSpPr>
             <a:spLocks noGrp="1"/>
           </p:cNvSpPr>
@@ -1449,13 +1268,7 @@
       </p:sp>
       <p:sp>
         <p:nvSpPr>
-          <p:cNvPr id="7" name="Slide Number Placeholder 6">
-            <a:extLst>
-              <a:ext uri="{FF2B5EF4-FFF2-40B4-BE49-F238E27FC236}">
-                <a16:creationId xmlns:a16="http://schemas.microsoft.com/office/drawing/2014/main" id="{434859DF-379D-44E0-98A2-A819D76C7750}"/>
-              </a:ext>
-            </a:extLst>
-          </p:cNvPr>
+          <p:cNvPr id="7" name="Slide Number Placeholder 6"/>
           <p:cNvSpPr>
             <a:spLocks noGrp="1"/>
           </p:cNvSpPr>
@@ -1479,7 +1292,7 @@
     </p:spTree>
     <p:extLst>
       <p:ext uri="{BB962C8B-B14F-4D97-AF65-F5344CB8AC3E}">
-        <p14:creationId xmlns:p14="http://schemas.microsoft.com/office/powerpoint/2010/main" val="2258490416"/>
+        <p14:creationId xmlns:p14="http://schemas.microsoft.com/office/powerpoint/2010/main" val="2273438764"/>
       </p:ext>
     </p:extLst>
   </p:cSld>
@@ -1508,13 +1321,7 @@
       </p:grpSpPr>
       <p:sp>
         <p:nvSpPr>
-          <p:cNvPr id="2" name="Title 1">
-            <a:extLst>
-              <a:ext uri="{FF2B5EF4-FFF2-40B4-BE49-F238E27FC236}">
-                <a16:creationId xmlns:a16="http://schemas.microsoft.com/office/drawing/2014/main" id="{3A23DBA8-3FF2-41E1-977A-CDC82F2003FB}"/>
-              </a:ext>
-            </a:extLst>
-          </p:cNvPr>
+          <p:cNvPr id="2" name="Title 1"/>
           <p:cNvSpPr>
             <a:spLocks noGrp="1"/>
           </p:cNvSpPr>
@@ -1524,8 +1331,8 @@
         </p:nvSpPr>
         <p:spPr>
           <a:xfrm>
-            <a:off x="839788" y="365125"/>
-            <a:ext cx="10515600" cy="1325563"/>
+            <a:off x="839788" y="574990"/>
+            <a:ext cx="10515600" cy="2087455"/>
           </a:xfrm>
         </p:spPr>
         <p:txBody>
@@ -1536,19 +1343,13 @@
               <a:rPr lang="en-US"/>
               <a:t>Click to edit Master title style</a:t>
             </a:r>
-            <a:endParaRPr lang="en-GB"/>
-          </a:p>
-        </p:txBody>
-      </p:sp>
-      <p:sp>
-        <p:nvSpPr>
-          <p:cNvPr id="3" name="Text Placeholder 2">
-            <a:extLst>
-              <a:ext uri="{FF2B5EF4-FFF2-40B4-BE49-F238E27FC236}">
-                <a16:creationId xmlns:a16="http://schemas.microsoft.com/office/drawing/2014/main" id="{12D8492B-EA18-4618-B7DE-483DFE54102A}"/>
-              </a:ext>
-            </a:extLst>
-          </p:cNvPr>
+            <a:endParaRPr lang="en-US" dirty="0"/>
+          </a:p>
+        </p:txBody>
+      </p:sp>
+      <p:sp>
+        <p:nvSpPr>
+          <p:cNvPr id="3" name="Text Placeholder 2"/>
           <p:cNvSpPr>
             <a:spLocks noGrp="1"/>
           </p:cNvSpPr>
@@ -1558,8 +1359,8 @@
         </p:nvSpPr>
         <p:spPr>
           <a:xfrm>
-            <a:off x="839788" y="1681163"/>
-            <a:ext cx="5157787" cy="823912"/>
+            <a:off x="839789" y="2647443"/>
+            <a:ext cx="5157787" cy="1297471"/>
           </a:xfrm>
         </p:spPr>
         <p:txBody>
@@ -1567,39 +1368,39 @@
           <a:lstStyle>
             <a:lvl1pPr marL="0" indent="0">
               <a:buNone/>
+              <a:defRPr sz="3200" b="1"/>
+            </a:lvl1pPr>
+            <a:lvl2pPr marL="609585" indent="0">
+              <a:buNone/>
+              <a:defRPr sz="2667" b="1"/>
+            </a:lvl2pPr>
+            <a:lvl3pPr marL="1219170" indent="0">
+              <a:buNone/>
               <a:defRPr sz="2400" b="1"/>
-            </a:lvl1pPr>
-            <a:lvl2pPr marL="457200" indent="0">
-              <a:buNone/>
-              <a:defRPr sz="2000" b="1"/>
-            </a:lvl2pPr>
-            <a:lvl3pPr marL="914400" indent="0">
-              <a:buNone/>
-              <a:defRPr sz="1800" b="1"/>
             </a:lvl3pPr>
-            <a:lvl4pPr marL="1371600" indent="0">
-              <a:buNone/>
-              <a:defRPr sz="1600" b="1"/>
+            <a:lvl4pPr marL="1828754" indent="0">
+              <a:buNone/>
+              <a:defRPr sz="2133" b="1"/>
             </a:lvl4pPr>
-            <a:lvl5pPr marL="1828800" indent="0">
-              <a:buNone/>
-              <a:defRPr sz="1600" b="1"/>
+            <a:lvl5pPr marL="2438339" indent="0">
+              <a:buNone/>
+              <a:defRPr sz="2133" b="1"/>
             </a:lvl5pPr>
-            <a:lvl6pPr marL="2286000" indent="0">
-              <a:buNone/>
-              <a:defRPr sz="1600" b="1"/>
+            <a:lvl6pPr marL="3047924" indent="0">
+              <a:buNone/>
+              <a:defRPr sz="2133" b="1"/>
             </a:lvl6pPr>
-            <a:lvl7pPr marL="2743200" indent="0">
-              <a:buNone/>
-              <a:defRPr sz="1600" b="1"/>
+            <a:lvl7pPr marL="3657509" indent="0">
+              <a:buNone/>
+              <a:defRPr sz="2133" b="1"/>
             </a:lvl7pPr>
-            <a:lvl8pPr marL="3200400" indent="0">
-              <a:buNone/>
-              <a:defRPr sz="1600" b="1"/>
+            <a:lvl8pPr marL="4267093" indent="0">
+              <a:buNone/>
+              <a:defRPr sz="2133" b="1"/>
             </a:lvl8pPr>
-            <a:lvl9pPr marL="3657600" indent="0">
-              <a:buNone/>
-              <a:defRPr sz="1600" b="1"/>
+            <a:lvl9pPr marL="4876678" indent="0">
+              <a:buNone/>
+              <a:defRPr sz="2133" b="1"/>
             </a:lvl9pPr>
           </a:lstStyle>
           <a:p>
@@ -1613,13 +1414,7 @@
       </p:sp>
       <p:sp>
         <p:nvSpPr>
-          <p:cNvPr id="4" name="Content Placeholder 3">
-            <a:extLst>
-              <a:ext uri="{FF2B5EF4-FFF2-40B4-BE49-F238E27FC236}">
-                <a16:creationId xmlns:a16="http://schemas.microsoft.com/office/drawing/2014/main" id="{68AB3009-2F87-45B3-A0D6-C490BF84F851}"/>
-              </a:ext>
-            </a:extLst>
-          </p:cNvPr>
+          <p:cNvPr id="4" name="Content Placeholder 3"/>
           <p:cNvSpPr>
             <a:spLocks noGrp="1"/>
           </p:cNvSpPr>
@@ -1629,8 +1424,8 @@
         </p:nvSpPr>
         <p:spPr>
           <a:xfrm>
-            <a:off x="839788" y="2505075"/>
-            <a:ext cx="5157787" cy="3684588"/>
+            <a:off x="839789" y="3944914"/>
+            <a:ext cx="5157787" cy="5802373"/>
           </a:xfrm>
         </p:spPr>
         <p:txBody>
@@ -1670,19 +1465,13 @@
               <a:rPr lang="en-US"/>
               <a:t>Fifth level</a:t>
             </a:r>
-            <a:endParaRPr lang="en-GB"/>
-          </a:p>
-        </p:txBody>
-      </p:sp>
-      <p:sp>
-        <p:nvSpPr>
-          <p:cNvPr id="5" name="Text Placeholder 4">
-            <a:extLst>
-              <a:ext uri="{FF2B5EF4-FFF2-40B4-BE49-F238E27FC236}">
-                <a16:creationId xmlns:a16="http://schemas.microsoft.com/office/drawing/2014/main" id="{1ED998C9-F159-475B-BE19-30E67CEDF841}"/>
-              </a:ext>
-            </a:extLst>
-          </p:cNvPr>
+            <a:endParaRPr lang="en-US" dirty="0"/>
+          </a:p>
+        </p:txBody>
+      </p:sp>
+      <p:sp>
+        <p:nvSpPr>
+          <p:cNvPr id="5" name="Text Placeholder 4"/>
           <p:cNvSpPr>
             <a:spLocks noGrp="1"/>
           </p:cNvSpPr>
@@ -1692,8 +1481,8 @@
         </p:nvSpPr>
         <p:spPr>
           <a:xfrm>
-            <a:off x="6172200" y="1681163"/>
-            <a:ext cx="5183188" cy="823912"/>
+            <a:off x="6172201" y="2647443"/>
+            <a:ext cx="5183188" cy="1297471"/>
           </a:xfrm>
         </p:spPr>
         <p:txBody>
@@ -1701,39 +1490,39 @@
           <a:lstStyle>
             <a:lvl1pPr marL="0" indent="0">
               <a:buNone/>
+              <a:defRPr sz="3200" b="1"/>
+            </a:lvl1pPr>
+            <a:lvl2pPr marL="609585" indent="0">
+              <a:buNone/>
+              <a:defRPr sz="2667" b="1"/>
+            </a:lvl2pPr>
+            <a:lvl3pPr marL="1219170" indent="0">
+              <a:buNone/>
               <a:defRPr sz="2400" b="1"/>
-            </a:lvl1pPr>
-            <a:lvl2pPr marL="457200" indent="0">
-              <a:buNone/>
-              <a:defRPr sz="2000" b="1"/>
-            </a:lvl2pPr>
-            <a:lvl3pPr marL="914400" indent="0">
-              <a:buNone/>
-              <a:defRPr sz="1800" b="1"/>
             </a:lvl3pPr>
-            <a:lvl4pPr marL="1371600" indent="0">
-              <a:buNone/>
-              <a:defRPr sz="1600" b="1"/>
+            <a:lvl4pPr marL="1828754" indent="0">
+              <a:buNone/>
+              <a:defRPr sz="2133" b="1"/>
             </a:lvl4pPr>
-            <a:lvl5pPr marL="1828800" indent="0">
-              <a:buNone/>
-              <a:defRPr sz="1600" b="1"/>
+            <a:lvl5pPr marL="2438339" indent="0">
+              <a:buNone/>
+              <a:defRPr sz="2133" b="1"/>
             </a:lvl5pPr>
-            <a:lvl6pPr marL="2286000" indent="0">
-              <a:buNone/>
-              <a:defRPr sz="1600" b="1"/>
+            <a:lvl6pPr marL="3047924" indent="0">
+              <a:buNone/>
+              <a:defRPr sz="2133" b="1"/>
             </a:lvl6pPr>
-            <a:lvl7pPr marL="2743200" indent="0">
-              <a:buNone/>
-              <a:defRPr sz="1600" b="1"/>
+            <a:lvl7pPr marL="3657509" indent="0">
+              <a:buNone/>
+              <a:defRPr sz="2133" b="1"/>
             </a:lvl7pPr>
-            <a:lvl8pPr marL="3200400" indent="0">
-              <a:buNone/>
-              <a:defRPr sz="1600" b="1"/>
+            <a:lvl8pPr marL="4267093" indent="0">
+              <a:buNone/>
+              <a:defRPr sz="2133" b="1"/>
             </a:lvl8pPr>
-            <a:lvl9pPr marL="3657600" indent="0">
-              <a:buNone/>
-              <a:defRPr sz="1600" b="1"/>
+            <a:lvl9pPr marL="4876678" indent="0">
+              <a:buNone/>
+              <a:defRPr sz="2133" b="1"/>
             </a:lvl9pPr>
           </a:lstStyle>
           <a:p>
@@ -1747,13 +1536,7 @@
       </p:sp>
       <p:sp>
         <p:nvSpPr>
-          <p:cNvPr id="6" name="Content Placeholder 5">
-            <a:extLst>
-              <a:ext uri="{FF2B5EF4-FFF2-40B4-BE49-F238E27FC236}">
-                <a16:creationId xmlns:a16="http://schemas.microsoft.com/office/drawing/2014/main" id="{013720D2-5CB1-4DD6-8C78-483B35C3A022}"/>
-              </a:ext>
-            </a:extLst>
-          </p:cNvPr>
+          <p:cNvPr id="6" name="Content Placeholder 5"/>
           <p:cNvSpPr>
             <a:spLocks noGrp="1"/>
           </p:cNvSpPr>
@@ -1763,8 +1546,8 @@
         </p:nvSpPr>
         <p:spPr>
           <a:xfrm>
-            <a:off x="6172200" y="2505075"/>
-            <a:ext cx="5183188" cy="3684588"/>
+            <a:off x="6172201" y="3944914"/>
+            <a:ext cx="5183188" cy="5802373"/>
           </a:xfrm>
         </p:spPr>
         <p:txBody>
@@ -1804,19 +1587,13 @@
               <a:rPr lang="en-US"/>
               <a:t>Fifth level</a:t>
             </a:r>
-            <a:endParaRPr lang="en-GB"/>
-          </a:p>
-        </p:txBody>
-      </p:sp>
-      <p:sp>
-        <p:nvSpPr>
-          <p:cNvPr id="7" name="Date Placeholder 6">
-            <a:extLst>
-              <a:ext uri="{FF2B5EF4-FFF2-40B4-BE49-F238E27FC236}">
-                <a16:creationId xmlns:a16="http://schemas.microsoft.com/office/drawing/2014/main" id="{375AE159-B4D0-4AA1-87AA-1D250279285E}"/>
-              </a:ext>
-            </a:extLst>
-          </p:cNvPr>
+            <a:endParaRPr lang="en-US" dirty="0"/>
+          </a:p>
+        </p:txBody>
+      </p:sp>
+      <p:sp>
+        <p:nvSpPr>
+          <p:cNvPr id="7" name="Date Placeholder 6"/>
           <p:cNvSpPr>
             <a:spLocks noGrp="1"/>
           </p:cNvSpPr>
@@ -1831,7 +1608,7 @@
           <a:p>
             <a:fld id="{1F80DB50-5271-4B1A-976D-0A7715B55622}" type="datetimeFigureOut">
               <a:rPr lang="en-GB" smtClean="0"/>
-              <a:t>02/03/2020</a:t>
+              <a:t>10/03/2020</a:t>
             </a:fld>
             <a:endParaRPr lang="en-GB"/>
           </a:p>
@@ -1839,13 +1616,7 @@
       </p:sp>
       <p:sp>
         <p:nvSpPr>
-          <p:cNvPr id="8" name="Footer Placeholder 7">
-            <a:extLst>
-              <a:ext uri="{FF2B5EF4-FFF2-40B4-BE49-F238E27FC236}">
-                <a16:creationId xmlns:a16="http://schemas.microsoft.com/office/drawing/2014/main" id="{7BB46C08-037C-4AA3-92D2-9E50F782A0B9}"/>
-              </a:ext>
-            </a:extLst>
-          </p:cNvPr>
+          <p:cNvPr id="8" name="Footer Placeholder 7"/>
           <p:cNvSpPr>
             <a:spLocks noGrp="1"/>
           </p:cNvSpPr>
@@ -1864,13 +1635,7 @@
       </p:sp>
       <p:sp>
         <p:nvSpPr>
-          <p:cNvPr id="9" name="Slide Number Placeholder 8">
-            <a:extLst>
-              <a:ext uri="{FF2B5EF4-FFF2-40B4-BE49-F238E27FC236}">
-                <a16:creationId xmlns:a16="http://schemas.microsoft.com/office/drawing/2014/main" id="{777A673D-7D2C-46D6-8EED-E993E07F93C4}"/>
-              </a:ext>
-            </a:extLst>
-          </p:cNvPr>
+          <p:cNvPr id="9" name="Slide Number Placeholder 8"/>
           <p:cNvSpPr>
             <a:spLocks noGrp="1"/>
           </p:cNvSpPr>
@@ -1894,7 +1659,7 @@
     </p:spTree>
     <p:extLst>
       <p:ext uri="{BB962C8B-B14F-4D97-AF65-F5344CB8AC3E}">
-        <p14:creationId xmlns:p14="http://schemas.microsoft.com/office/powerpoint/2010/main" val="2838048363"/>
+        <p14:creationId xmlns:p14="http://schemas.microsoft.com/office/powerpoint/2010/main" val="3899613517"/>
       </p:ext>
     </p:extLst>
   </p:cSld>
@@ -1923,13 +1688,7 @@
       </p:grpSpPr>
       <p:sp>
         <p:nvSpPr>
-          <p:cNvPr id="2" name="Title 1">
-            <a:extLst>
-              <a:ext uri="{FF2B5EF4-FFF2-40B4-BE49-F238E27FC236}">
-                <a16:creationId xmlns:a16="http://schemas.microsoft.com/office/drawing/2014/main" id="{1DC9165A-9BD0-466C-B783-79BD5E214669}"/>
-              </a:ext>
-            </a:extLst>
-          </p:cNvPr>
+          <p:cNvPr id="2" name="Title 1"/>
           <p:cNvSpPr>
             <a:spLocks noGrp="1"/>
           </p:cNvSpPr>
@@ -1946,19 +1705,13 @@
               <a:rPr lang="en-US"/>
               <a:t>Click to edit Master title style</a:t>
             </a:r>
-            <a:endParaRPr lang="en-GB"/>
-          </a:p>
-        </p:txBody>
-      </p:sp>
-      <p:sp>
-        <p:nvSpPr>
-          <p:cNvPr id="3" name="Date Placeholder 2">
-            <a:extLst>
-              <a:ext uri="{FF2B5EF4-FFF2-40B4-BE49-F238E27FC236}">
-                <a16:creationId xmlns:a16="http://schemas.microsoft.com/office/drawing/2014/main" id="{8924B15A-9F33-4EC7-A1D6-EC8DE9BB27F9}"/>
-              </a:ext>
-            </a:extLst>
-          </p:cNvPr>
+            <a:endParaRPr lang="en-US" dirty="0"/>
+          </a:p>
+        </p:txBody>
+      </p:sp>
+      <p:sp>
+        <p:nvSpPr>
+          <p:cNvPr id="3" name="Date Placeholder 2"/>
           <p:cNvSpPr>
             <a:spLocks noGrp="1"/>
           </p:cNvSpPr>
@@ -1973,7 +1726,7 @@
           <a:p>
             <a:fld id="{1F80DB50-5271-4B1A-976D-0A7715B55622}" type="datetimeFigureOut">
               <a:rPr lang="en-GB" smtClean="0"/>
-              <a:t>02/03/2020</a:t>
+              <a:t>10/03/2020</a:t>
             </a:fld>
             <a:endParaRPr lang="en-GB"/>
           </a:p>
@@ -1981,13 +1734,7 @@
       </p:sp>
       <p:sp>
         <p:nvSpPr>
-          <p:cNvPr id="4" name="Footer Placeholder 3">
-            <a:extLst>
-              <a:ext uri="{FF2B5EF4-FFF2-40B4-BE49-F238E27FC236}">
-                <a16:creationId xmlns:a16="http://schemas.microsoft.com/office/drawing/2014/main" id="{5C5F9A54-67C6-4185-A518-AFBE3690585D}"/>
-              </a:ext>
-            </a:extLst>
-          </p:cNvPr>
+          <p:cNvPr id="4" name="Footer Placeholder 3"/>
           <p:cNvSpPr>
             <a:spLocks noGrp="1"/>
           </p:cNvSpPr>
@@ -2006,13 +1753,7 @@
       </p:sp>
       <p:sp>
         <p:nvSpPr>
-          <p:cNvPr id="5" name="Slide Number Placeholder 4">
-            <a:extLst>
-              <a:ext uri="{FF2B5EF4-FFF2-40B4-BE49-F238E27FC236}">
-                <a16:creationId xmlns:a16="http://schemas.microsoft.com/office/drawing/2014/main" id="{2EB34D56-D2D5-4F9C-AA7E-EA1B35041497}"/>
-              </a:ext>
-            </a:extLst>
-          </p:cNvPr>
+          <p:cNvPr id="5" name="Slide Number Placeholder 4"/>
           <p:cNvSpPr>
             <a:spLocks noGrp="1"/>
           </p:cNvSpPr>
@@ -2036,7 +1777,7 @@
     </p:spTree>
     <p:extLst>
       <p:ext uri="{BB962C8B-B14F-4D97-AF65-F5344CB8AC3E}">
-        <p14:creationId xmlns:p14="http://schemas.microsoft.com/office/powerpoint/2010/main" val="2785700063"/>
+        <p14:creationId xmlns:p14="http://schemas.microsoft.com/office/powerpoint/2010/main" val="2357814314"/>
       </p:ext>
     </p:extLst>
   </p:cSld>
@@ -2065,13 +1806,7 @@
       </p:grpSpPr>
       <p:sp>
         <p:nvSpPr>
-          <p:cNvPr id="2" name="Date Placeholder 1">
-            <a:extLst>
-              <a:ext uri="{FF2B5EF4-FFF2-40B4-BE49-F238E27FC236}">
-                <a16:creationId xmlns:a16="http://schemas.microsoft.com/office/drawing/2014/main" id="{51D226CA-7815-48BE-9E7D-2C7CFDC731B9}"/>
-              </a:ext>
-            </a:extLst>
-          </p:cNvPr>
+          <p:cNvPr id="2" name="Date Placeholder 1"/>
           <p:cNvSpPr>
             <a:spLocks noGrp="1"/>
           </p:cNvSpPr>
@@ -2086,7 +1821,7 @@
           <a:p>
             <a:fld id="{1F80DB50-5271-4B1A-976D-0A7715B55622}" type="datetimeFigureOut">
               <a:rPr lang="en-GB" smtClean="0"/>
-              <a:t>02/03/2020</a:t>
+              <a:t>10/03/2020</a:t>
             </a:fld>
             <a:endParaRPr lang="en-GB"/>
           </a:p>
@@ -2094,13 +1829,7 @@
       </p:sp>
       <p:sp>
         <p:nvSpPr>
-          <p:cNvPr id="3" name="Footer Placeholder 2">
-            <a:extLst>
-              <a:ext uri="{FF2B5EF4-FFF2-40B4-BE49-F238E27FC236}">
-                <a16:creationId xmlns:a16="http://schemas.microsoft.com/office/drawing/2014/main" id="{0DAEFE8E-7054-42F9-8167-618BEC24B13A}"/>
-              </a:ext>
-            </a:extLst>
-          </p:cNvPr>
+          <p:cNvPr id="3" name="Footer Placeholder 2"/>
           <p:cNvSpPr>
             <a:spLocks noGrp="1"/>
           </p:cNvSpPr>
@@ -2119,13 +1848,7 @@
       </p:sp>
       <p:sp>
         <p:nvSpPr>
-          <p:cNvPr id="4" name="Slide Number Placeholder 3">
-            <a:extLst>
-              <a:ext uri="{FF2B5EF4-FFF2-40B4-BE49-F238E27FC236}">
-                <a16:creationId xmlns:a16="http://schemas.microsoft.com/office/drawing/2014/main" id="{353289C3-EFF6-4F8C-A63F-AD09A07675F4}"/>
-              </a:ext>
-            </a:extLst>
-          </p:cNvPr>
+          <p:cNvPr id="4" name="Slide Number Placeholder 3"/>
           <p:cNvSpPr>
             <a:spLocks noGrp="1"/>
           </p:cNvSpPr>
@@ -2149,7 +1872,7 @@
     </p:spTree>
     <p:extLst>
       <p:ext uri="{BB962C8B-B14F-4D97-AF65-F5344CB8AC3E}">
-        <p14:creationId xmlns:p14="http://schemas.microsoft.com/office/powerpoint/2010/main" val="2395771333"/>
+        <p14:creationId xmlns:p14="http://schemas.microsoft.com/office/powerpoint/2010/main" val="4093149544"/>
       </p:ext>
     </p:extLst>
   </p:cSld>
@@ -2178,13 +1901,7 @@
       </p:grpSpPr>
       <p:sp>
         <p:nvSpPr>
-          <p:cNvPr id="2" name="Title 1">
-            <a:extLst>
-              <a:ext uri="{FF2B5EF4-FFF2-40B4-BE49-F238E27FC236}">
-                <a16:creationId xmlns:a16="http://schemas.microsoft.com/office/drawing/2014/main" id="{5D02E8A2-F3E5-4F34-9AB0-2C4C28AB0031}"/>
-              </a:ext>
-            </a:extLst>
-          </p:cNvPr>
+          <p:cNvPr id="2" name="Title 1"/>
           <p:cNvSpPr>
             <a:spLocks noGrp="1"/>
           </p:cNvSpPr>
@@ -2194,15 +1911,15 @@
         </p:nvSpPr>
         <p:spPr>
           <a:xfrm>
-            <a:off x="839788" y="457200"/>
-            <a:ext cx="3932237" cy="1600200"/>
+            <a:off x="839788" y="719984"/>
+            <a:ext cx="3932237" cy="2519945"/>
           </a:xfrm>
         </p:spPr>
         <p:txBody>
           <a:bodyPr anchor="b"/>
           <a:lstStyle>
             <a:lvl1pPr>
-              <a:defRPr sz="3200"/>
+              <a:defRPr sz="4267"/>
             </a:lvl1pPr>
           </a:lstStyle>
           <a:p>
@@ -2210,19 +1927,13 @@
               <a:rPr lang="en-US"/>
               <a:t>Click to edit Master title style</a:t>
             </a:r>
-            <a:endParaRPr lang="en-GB"/>
-          </a:p>
-        </p:txBody>
-      </p:sp>
-      <p:sp>
-        <p:nvSpPr>
-          <p:cNvPr id="3" name="Content Placeholder 2">
-            <a:extLst>
-              <a:ext uri="{FF2B5EF4-FFF2-40B4-BE49-F238E27FC236}">
-                <a16:creationId xmlns:a16="http://schemas.microsoft.com/office/drawing/2014/main" id="{873A7C84-9E8C-46BD-9CC9-FE5BB6C067FA}"/>
-              </a:ext>
-            </a:extLst>
-          </p:cNvPr>
+            <a:endParaRPr lang="en-US" dirty="0"/>
+          </a:p>
+        </p:txBody>
+      </p:sp>
+      <p:sp>
+        <p:nvSpPr>
+          <p:cNvPr id="3" name="Content Placeholder 2"/>
           <p:cNvSpPr>
             <a:spLocks noGrp="1"/>
           </p:cNvSpPr>
@@ -2232,39 +1943,39 @@
         </p:nvSpPr>
         <p:spPr>
           <a:xfrm>
-            <a:off x="5183188" y="987425"/>
-            <a:ext cx="6172200" cy="4873625"/>
+            <a:off x="5183188" y="1554968"/>
+            <a:ext cx="6172200" cy="7674832"/>
           </a:xfrm>
         </p:spPr>
         <p:txBody>
           <a:bodyPr/>
           <a:lstStyle>
             <a:lvl1pPr>
-              <a:defRPr sz="3200"/>
+              <a:defRPr sz="4267"/>
             </a:lvl1pPr>
             <a:lvl2pPr>
-              <a:defRPr sz="2800"/>
+              <a:defRPr sz="3733"/>
             </a:lvl2pPr>
             <a:lvl3pPr>
-              <a:defRPr sz="2400"/>
+              <a:defRPr sz="3200"/>
             </a:lvl3pPr>
             <a:lvl4pPr>
-              <a:defRPr sz="2000"/>
+              <a:defRPr sz="2667"/>
             </a:lvl4pPr>
             <a:lvl5pPr>
-              <a:defRPr sz="2000"/>
+              <a:defRPr sz="2667"/>
             </a:lvl5pPr>
             <a:lvl6pPr>
-              <a:defRPr sz="2000"/>
+              <a:defRPr sz="2667"/>
             </a:lvl6pPr>
             <a:lvl7pPr>
-              <a:defRPr sz="2000"/>
+              <a:defRPr sz="2667"/>
             </a:lvl7pPr>
             <a:lvl8pPr>
-              <a:defRPr sz="2000"/>
+              <a:defRPr sz="2667"/>
             </a:lvl8pPr>
             <a:lvl9pPr>
-              <a:defRPr sz="2000"/>
+              <a:defRPr sz="2667"/>
             </a:lvl9pPr>
           </a:lstStyle>
           <a:p>
@@ -2301,19 +2012,13 @@
               <a:rPr lang="en-US"/>
               <a:t>Fifth level</a:t>
             </a:r>
-            <a:endParaRPr lang="en-GB"/>
-          </a:p>
-        </p:txBody>
-      </p:sp>
-      <p:sp>
-        <p:nvSpPr>
-          <p:cNvPr id="4" name="Text Placeholder 3">
-            <a:extLst>
-              <a:ext uri="{FF2B5EF4-FFF2-40B4-BE49-F238E27FC236}">
-                <a16:creationId xmlns:a16="http://schemas.microsoft.com/office/drawing/2014/main" id="{6BB7EF5F-F52E-429D-BF2C-7DE2BE7117F8}"/>
-              </a:ext>
-            </a:extLst>
-          </p:cNvPr>
+            <a:endParaRPr lang="en-US" dirty="0"/>
+          </a:p>
+        </p:txBody>
+      </p:sp>
+      <p:sp>
+        <p:nvSpPr>
+          <p:cNvPr id="4" name="Text Placeholder 3"/>
           <p:cNvSpPr>
             <a:spLocks noGrp="1"/>
           </p:cNvSpPr>
@@ -2323,8 +2028,8 @@
         </p:nvSpPr>
         <p:spPr>
           <a:xfrm>
-            <a:off x="839788" y="2057400"/>
-            <a:ext cx="3932237" cy="3811588"/>
+            <a:off x="839788" y="3239929"/>
+            <a:ext cx="3932237" cy="6002369"/>
           </a:xfrm>
         </p:spPr>
         <p:txBody>
@@ -2332,39 +2037,39 @@
           <a:lstStyle>
             <a:lvl1pPr marL="0" indent="0">
               <a:buNone/>
+              <a:defRPr sz="2133"/>
+            </a:lvl1pPr>
+            <a:lvl2pPr marL="609585" indent="0">
+              <a:buNone/>
+              <a:defRPr sz="1867"/>
+            </a:lvl2pPr>
+            <a:lvl3pPr marL="1219170" indent="0">
+              <a:buNone/>
               <a:defRPr sz="1600"/>
-            </a:lvl1pPr>
-            <a:lvl2pPr marL="457200" indent="0">
-              <a:buNone/>
-              <a:defRPr sz="1400"/>
-            </a:lvl2pPr>
-            <a:lvl3pPr marL="914400" indent="0">
-              <a:buNone/>
-              <a:defRPr sz="1200"/>
             </a:lvl3pPr>
-            <a:lvl4pPr marL="1371600" indent="0">
-              <a:buNone/>
-              <a:defRPr sz="1000"/>
+            <a:lvl4pPr marL="1828754" indent="0">
+              <a:buNone/>
+              <a:defRPr sz="1333"/>
             </a:lvl4pPr>
-            <a:lvl5pPr marL="1828800" indent="0">
-              <a:buNone/>
-              <a:defRPr sz="1000"/>
+            <a:lvl5pPr marL="2438339" indent="0">
+              <a:buNone/>
+              <a:defRPr sz="1333"/>
             </a:lvl5pPr>
-            <a:lvl6pPr marL="2286000" indent="0">
-              <a:buNone/>
-              <a:defRPr sz="1000"/>
+            <a:lvl6pPr marL="3047924" indent="0">
+              <a:buNone/>
+              <a:defRPr sz="1333"/>
             </a:lvl6pPr>
-            <a:lvl7pPr marL="2743200" indent="0">
-              <a:buNone/>
-              <a:defRPr sz="1000"/>
+            <a:lvl7pPr marL="3657509" indent="0">
+              <a:buNone/>
+              <a:defRPr sz="1333"/>
             </a:lvl7pPr>
-            <a:lvl8pPr marL="3200400" indent="0">
-              <a:buNone/>
-              <a:defRPr sz="1000"/>
+            <a:lvl8pPr marL="4267093" indent="0">
+              <a:buNone/>
+              <a:defRPr sz="1333"/>
             </a:lvl8pPr>
-            <a:lvl9pPr marL="3657600" indent="0">
-              <a:buNone/>
-              <a:defRPr sz="1000"/>
+            <a:lvl9pPr marL="4876678" indent="0">
+              <a:buNone/>
+              <a:defRPr sz="1333"/>
             </a:lvl9pPr>
           </a:lstStyle>
           <a:p>
@@ -2378,13 +2083,7 @@
       </p:sp>
       <p:sp>
         <p:nvSpPr>
-          <p:cNvPr id="5" name="Date Placeholder 4">
-            <a:extLst>
-              <a:ext uri="{FF2B5EF4-FFF2-40B4-BE49-F238E27FC236}">
-                <a16:creationId xmlns:a16="http://schemas.microsoft.com/office/drawing/2014/main" id="{7F94966C-011C-4B92-A11D-58FDB8B0F0CF}"/>
-              </a:ext>
-            </a:extLst>
-          </p:cNvPr>
+          <p:cNvPr id="5" name="Date Placeholder 4"/>
           <p:cNvSpPr>
             <a:spLocks noGrp="1"/>
           </p:cNvSpPr>
@@ -2399,7 +2098,7 @@
           <a:p>
             <a:fld id="{1F80DB50-5271-4B1A-976D-0A7715B55622}" type="datetimeFigureOut">
               <a:rPr lang="en-GB" smtClean="0"/>
-              <a:t>02/03/2020</a:t>
+              <a:t>10/03/2020</a:t>
             </a:fld>
             <a:endParaRPr lang="en-GB"/>
           </a:p>
@@ -2407,13 +2106,7 @@
       </p:sp>
       <p:sp>
         <p:nvSpPr>
-          <p:cNvPr id="6" name="Footer Placeholder 5">
-            <a:extLst>
-              <a:ext uri="{FF2B5EF4-FFF2-40B4-BE49-F238E27FC236}">
-                <a16:creationId xmlns:a16="http://schemas.microsoft.com/office/drawing/2014/main" id="{38D61F1A-2035-47D3-9AE6-D57583EC9827}"/>
-              </a:ext>
-            </a:extLst>
-          </p:cNvPr>
+          <p:cNvPr id="6" name="Footer Placeholder 5"/>
           <p:cNvSpPr>
             <a:spLocks noGrp="1"/>
           </p:cNvSpPr>
@@ -2432,13 +2125,7 @@
       </p:sp>
       <p:sp>
         <p:nvSpPr>
-          <p:cNvPr id="7" name="Slide Number Placeholder 6">
-            <a:extLst>
-              <a:ext uri="{FF2B5EF4-FFF2-40B4-BE49-F238E27FC236}">
-                <a16:creationId xmlns:a16="http://schemas.microsoft.com/office/drawing/2014/main" id="{B7DABDAD-C5F4-428B-BEB5-5AD06EC36225}"/>
-              </a:ext>
-            </a:extLst>
-          </p:cNvPr>
+          <p:cNvPr id="7" name="Slide Number Placeholder 6"/>
           <p:cNvSpPr>
             <a:spLocks noGrp="1"/>
           </p:cNvSpPr>
@@ -2462,7 +2149,7 @@
     </p:spTree>
     <p:extLst>
       <p:ext uri="{BB962C8B-B14F-4D97-AF65-F5344CB8AC3E}">
-        <p14:creationId xmlns:p14="http://schemas.microsoft.com/office/powerpoint/2010/main" val="854023404"/>
+        <p14:creationId xmlns:p14="http://schemas.microsoft.com/office/powerpoint/2010/main" val="743331835"/>
       </p:ext>
     </p:extLst>
   </p:cSld>
@@ -2491,13 +2178,7 @@
       </p:grpSpPr>
       <p:sp>
         <p:nvSpPr>
-          <p:cNvPr id="2" name="Title 1">
-            <a:extLst>
-              <a:ext uri="{FF2B5EF4-FFF2-40B4-BE49-F238E27FC236}">
-                <a16:creationId xmlns:a16="http://schemas.microsoft.com/office/drawing/2014/main" id="{46B95ACB-9876-4713-BC2D-A0EA6283BAC4}"/>
-              </a:ext>
-            </a:extLst>
-          </p:cNvPr>
+          <p:cNvPr id="2" name="Title 1"/>
           <p:cNvSpPr>
             <a:spLocks noGrp="1"/>
           </p:cNvSpPr>
@@ -2507,15 +2188,15 @@
         </p:nvSpPr>
         <p:spPr>
           <a:xfrm>
-            <a:off x="839788" y="457200"/>
-            <a:ext cx="3932237" cy="1600200"/>
+            <a:off x="839788" y="719984"/>
+            <a:ext cx="3932237" cy="2519945"/>
           </a:xfrm>
         </p:spPr>
         <p:txBody>
           <a:bodyPr anchor="b"/>
           <a:lstStyle>
             <a:lvl1pPr>
-              <a:defRPr sz="3200"/>
+              <a:defRPr sz="4267"/>
             </a:lvl1pPr>
           </a:lstStyle>
           <a:p>
@@ -2523,21 +2204,15 @@
               <a:rPr lang="en-US"/>
               <a:t>Click to edit Master title style</a:t>
             </a:r>
-            <a:endParaRPr lang="en-GB"/>
-          </a:p>
-        </p:txBody>
-      </p:sp>
-      <p:sp>
-        <p:nvSpPr>
-          <p:cNvPr id="3" name="Picture Placeholder 2">
-            <a:extLst>
-              <a:ext uri="{FF2B5EF4-FFF2-40B4-BE49-F238E27FC236}">
-                <a16:creationId xmlns:a16="http://schemas.microsoft.com/office/drawing/2014/main" id="{A1B2916D-BEF5-4328-B44C-B542E63D27BA}"/>
-              </a:ext>
-            </a:extLst>
-          </p:cNvPr>
-          <p:cNvSpPr>
-            <a:spLocks noGrp="1"/>
+            <a:endParaRPr lang="en-US" dirty="0"/>
+          </a:p>
+        </p:txBody>
+      </p:sp>
+      <p:sp>
+        <p:nvSpPr>
+          <p:cNvPr id="3" name="Picture Placeholder 2"/>
+          <p:cNvSpPr>
+            <a:spLocks noGrp="1" noChangeAspect="1"/>
           </p:cNvSpPr>
           <p:nvPr>
             <p:ph type="pic" idx="1"/>
@@ -2545,8 +2220,73 @@
         </p:nvSpPr>
         <p:spPr>
           <a:xfrm>
-            <a:off x="5183188" y="987425"/>
-            <a:ext cx="6172200" cy="4873625"/>
+            <a:off x="5183188" y="1554968"/>
+            <a:ext cx="6172200" cy="7674832"/>
+          </a:xfrm>
+        </p:spPr>
+        <p:txBody>
+          <a:bodyPr anchor="t"/>
+          <a:lstStyle>
+            <a:lvl1pPr marL="0" indent="0">
+              <a:buNone/>
+              <a:defRPr sz="4267"/>
+            </a:lvl1pPr>
+            <a:lvl2pPr marL="609585" indent="0">
+              <a:buNone/>
+              <a:defRPr sz="3733"/>
+            </a:lvl2pPr>
+            <a:lvl3pPr marL="1219170" indent="0">
+              <a:buNone/>
+              <a:defRPr sz="3200"/>
+            </a:lvl3pPr>
+            <a:lvl4pPr marL="1828754" indent="0">
+              <a:buNone/>
+              <a:defRPr sz="2667"/>
+            </a:lvl4pPr>
+            <a:lvl5pPr marL="2438339" indent="0">
+              <a:buNone/>
+              <a:defRPr sz="2667"/>
+            </a:lvl5pPr>
+            <a:lvl6pPr marL="3047924" indent="0">
+              <a:buNone/>
+              <a:defRPr sz="2667"/>
+            </a:lvl6pPr>
+            <a:lvl7pPr marL="3657509" indent="0">
+              <a:buNone/>
+              <a:defRPr sz="2667"/>
+            </a:lvl7pPr>
+            <a:lvl8pPr marL="4267093" indent="0">
+              <a:buNone/>
+              <a:defRPr sz="2667"/>
+            </a:lvl8pPr>
+            <a:lvl9pPr marL="4876678" indent="0">
+              <a:buNone/>
+              <a:defRPr sz="2667"/>
+            </a:lvl9pPr>
+          </a:lstStyle>
+          <a:p>
+            <a:r>
+              <a:rPr lang="en-US"/>
+              <a:t>Click icon to add picture</a:t>
+            </a:r>
+            <a:endParaRPr lang="en-US" dirty="0"/>
+          </a:p>
+        </p:txBody>
+      </p:sp>
+      <p:sp>
+        <p:nvSpPr>
+          <p:cNvPr id="4" name="Text Placeholder 3"/>
+          <p:cNvSpPr>
+            <a:spLocks noGrp="1"/>
+          </p:cNvSpPr>
+          <p:nvPr>
+            <p:ph type="body" sz="half" idx="2"/>
+          </p:nvPr>
+        </p:nvSpPr>
+        <p:spPr>
+          <a:xfrm>
+            <a:off x="839788" y="3239929"/>
+            <a:ext cx="3932237" cy="6002369"/>
           </a:xfrm>
         </p:spPr>
         <p:txBody>
@@ -2554,109 +2294,42 @@
           <a:lstStyle>
             <a:lvl1pPr marL="0" indent="0">
               <a:buNone/>
-              <a:defRPr sz="3200"/>
+              <a:defRPr sz="2133"/>
             </a:lvl1pPr>
-            <a:lvl2pPr marL="457200" indent="0">
-              <a:buNone/>
-              <a:defRPr sz="2800"/>
+            <a:lvl2pPr marL="609585" indent="0">
+              <a:buNone/>
+              <a:defRPr sz="1867"/>
             </a:lvl2pPr>
-            <a:lvl3pPr marL="914400" indent="0">
-              <a:buNone/>
-              <a:defRPr sz="2400"/>
+            <a:lvl3pPr marL="1219170" indent="0">
+              <a:buNone/>
+              <a:defRPr sz="1600"/>
             </a:lvl3pPr>
-            <a:lvl4pPr marL="1371600" indent="0">
-              <a:buNone/>
-              <a:defRPr sz="2000"/>
+            <a:lvl4pPr marL="1828754" indent="0">
+              <a:buNone/>
+              <a:defRPr sz="1333"/>
             </a:lvl4pPr>
-            <a:lvl5pPr marL="1828800" indent="0">
-              <a:buNone/>
-              <a:defRPr sz="2000"/>
+            <a:lvl5pPr marL="2438339" indent="0">
+              <a:buNone/>
+              <a:defRPr sz="1333"/>
             </a:lvl5pPr>
-            <a:lvl6pPr marL="2286000" indent="0">
-              <a:buNone/>
-              <a:defRPr sz="2000"/>
+            <a:lvl6pPr marL="3047924" indent="0">
+              <a:buNone/>
+              <a:defRPr sz="1333"/>
             </a:lvl6pPr>
-            <a:lvl7pPr marL="2743200" indent="0">
-              <a:buNone/>
-              <a:defRPr sz="2000"/>
+            <a:lvl7pPr marL="3657509" indent="0">
+              <a:buNone/>
+              <a:defRPr sz="1333"/>
             </a:lvl7pPr>
-            <a:lvl8pPr marL="3200400" indent="0">
-              <a:buNone/>
-              <a:defRPr sz="2000"/>
+            <a:lvl8pPr marL="4267093" indent="0">
+              <a:buNone/>
+              <a:defRPr sz="1333"/>
             </a:lvl8pPr>
-            <a:lvl9pPr marL="3657600" indent="0">
-              <a:buNone/>
-              <a:defRPr sz="2000"/>
+            <a:lvl9pPr marL="4876678" indent="0">
+              <a:buNone/>
+              <a:defRPr sz="1333"/>
             </a:lvl9pPr>
           </a:lstStyle>
           <a:p>
-            <a:endParaRPr lang="en-GB"/>
-          </a:p>
-        </p:txBody>
-      </p:sp>
-      <p:sp>
-        <p:nvSpPr>
-          <p:cNvPr id="4" name="Text Placeholder 3">
-            <a:extLst>
-              <a:ext uri="{FF2B5EF4-FFF2-40B4-BE49-F238E27FC236}">
-                <a16:creationId xmlns:a16="http://schemas.microsoft.com/office/drawing/2014/main" id="{CC4E22E2-81BB-4881-B376-76628F5A067A}"/>
-              </a:ext>
-            </a:extLst>
-          </p:cNvPr>
-          <p:cNvSpPr>
-            <a:spLocks noGrp="1"/>
-          </p:cNvSpPr>
-          <p:nvPr>
-            <p:ph type="body" sz="half" idx="2"/>
-          </p:nvPr>
-        </p:nvSpPr>
-        <p:spPr>
-          <a:xfrm>
-            <a:off x="839788" y="2057400"/>
-            <a:ext cx="3932237" cy="3811588"/>
-          </a:xfrm>
-        </p:spPr>
-        <p:txBody>
-          <a:bodyPr/>
-          <a:lstStyle>
-            <a:lvl1pPr marL="0" indent="0">
-              <a:buNone/>
-              <a:defRPr sz="1600"/>
-            </a:lvl1pPr>
-            <a:lvl2pPr marL="457200" indent="0">
-              <a:buNone/>
-              <a:defRPr sz="1400"/>
-            </a:lvl2pPr>
-            <a:lvl3pPr marL="914400" indent="0">
-              <a:buNone/>
-              <a:defRPr sz="1200"/>
-            </a:lvl3pPr>
-            <a:lvl4pPr marL="1371600" indent="0">
-              <a:buNone/>
-              <a:defRPr sz="1000"/>
-            </a:lvl4pPr>
-            <a:lvl5pPr marL="1828800" indent="0">
-              <a:buNone/>
-              <a:defRPr sz="1000"/>
-            </a:lvl5pPr>
-            <a:lvl6pPr marL="2286000" indent="0">
-              <a:buNone/>
-              <a:defRPr sz="1000"/>
-            </a:lvl6pPr>
-            <a:lvl7pPr marL="2743200" indent="0">
-              <a:buNone/>
-              <a:defRPr sz="1000"/>
-            </a:lvl7pPr>
-            <a:lvl8pPr marL="3200400" indent="0">
-              <a:buNone/>
-              <a:defRPr sz="1000"/>
-            </a:lvl8pPr>
-            <a:lvl9pPr marL="3657600" indent="0">
-              <a:buNone/>
-              <a:defRPr sz="1000"/>
-            </a:lvl9pPr>
-          </a:lstStyle>
-          <a:p>
             <a:pPr lvl="0"/>
             <a:r>
               <a:rPr lang="en-US"/>
@@ -2667,13 +2340,7 @@
       </p:sp>
       <p:sp>
         <p:nvSpPr>
-          <p:cNvPr id="5" name="Date Placeholder 4">
-            <a:extLst>
-              <a:ext uri="{FF2B5EF4-FFF2-40B4-BE49-F238E27FC236}">
-                <a16:creationId xmlns:a16="http://schemas.microsoft.com/office/drawing/2014/main" id="{6B6CCC47-4958-4A3C-A994-45947AAC10CB}"/>
-              </a:ext>
-            </a:extLst>
-          </p:cNvPr>
+          <p:cNvPr id="5" name="Date Placeholder 4"/>
           <p:cNvSpPr>
             <a:spLocks noGrp="1"/>
           </p:cNvSpPr>
@@ -2688,7 +2355,7 @@
           <a:p>
             <a:fld id="{1F80DB50-5271-4B1A-976D-0A7715B55622}" type="datetimeFigureOut">
               <a:rPr lang="en-GB" smtClean="0"/>
-              <a:t>02/03/2020</a:t>
+              <a:t>10/03/2020</a:t>
             </a:fld>
             <a:endParaRPr lang="en-GB"/>
           </a:p>
@@ -2696,13 +2363,7 @@
       </p:sp>
       <p:sp>
         <p:nvSpPr>
-          <p:cNvPr id="6" name="Footer Placeholder 5">
-            <a:extLst>
-              <a:ext uri="{FF2B5EF4-FFF2-40B4-BE49-F238E27FC236}">
-                <a16:creationId xmlns:a16="http://schemas.microsoft.com/office/drawing/2014/main" id="{69D698CF-58C3-4D06-91CC-6B0F3B80EE2B}"/>
-              </a:ext>
-            </a:extLst>
-          </p:cNvPr>
+          <p:cNvPr id="6" name="Footer Placeholder 5"/>
           <p:cNvSpPr>
             <a:spLocks noGrp="1"/>
           </p:cNvSpPr>
@@ -2721,13 +2382,7 @@
       </p:sp>
       <p:sp>
         <p:nvSpPr>
-          <p:cNvPr id="7" name="Slide Number Placeholder 6">
-            <a:extLst>
-              <a:ext uri="{FF2B5EF4-FFF2-40B4-BE49-F238E27FC236}">
-                <a16:creationId xmlns:a16="http://schemas.microsoft.com/office/drawing/2014/main" id="{D52D61C7-53EA-45DD-A29F-CD23AEF1F710}"/>
-              </a:ext>
-            </a:extLst>
-          </p:cNvPr>
+          <p:cNvPr id="7" name="Slide Number Placeholder 6"/>
           <p:cNvSpPr>
             <a:spLocks noGrp="1"/>
           </p:cNvSpPr>
@@ -2751,7 +2406,7 @@
     </p:spTree>
     <p:extLst>
       <p:ext uri="{BB962C8B-B14F-4D97-AF65-F5344CB8AC3E}">
-        <p14:creationId xmlns:p14="http://schemas.microsoft.com/office/powerpoint/2010/main" val="931690554"/>
+        <p14:creationId xmlns:p14="http://schemas.microsoft.com/office/powerpoint/2010/main" val="209468333"/>
       </p:ext>
     </p:extLst>
   </p:cSld>
@@ -2785,13 +2440,7 @@
       </p:grpSpPr>
       <p:sp>
         <p:nvSpPr>
-          <p:cNvPr id="2" name="Title Placeholder 1">
-            <a:extLst>
-              <a:ext uri="{FF2B5EF4-FFF2-40B4-BE49-F238E27FC236}">
-                <a16:creationId xmlns:a16="http://schemas.microsoft.com/office/drawing/2014/main" id="{028902B1-797D-4B29-A6FE-15D6F6FE66C7}"/>
-              </a:ext>
-            </a:extLst>
-          </p:cNvPr>
+          <p:cNvPr id="2" name="Title Placeholder 1"/>
           <p:cNvSpPr>
             <a:spLocks noGrp="1"/>
           </p:cNvSpPr>
@@ -2801,8 +2450,8 @@
         </p:nvSpPr>
         <p:spPr>
           <a:xfrm>
-            <a:off x="838200" y="365125"/>
-            <a:ext cx="10515600" cy="1325563"/>
+            <a:off x="838200" y="574990"/>
+            <a:ext cx="10515600" cy="2087455"/>
           </a:xfrm>
           <a:prstGeom prst="rect">
             <a:avLst/>
@@ -2818,19 +2467,13 @@
               <a:rPr lang="en-US"/>
               <a:t>Click to edit Master title style</a:t>
             </a:r>
-            <a:endParaRPr lang="en-GB"/>
-          </a:p>
-        </p:txBody>
-      </p:sp>
-      <p:sp>
-        <p:nvSpPr>
-          <p:cNvPr id="3" name="Text Placeholder 2">
-            <a:extLst>
-              <a:ext uri="{FF2B5EF4-FFF2-40B4-BE49-F238E27FC236}">
-                <a16:creationId xmlns:a16="http://schemas.microsoft.com/office/drawing/2014/main" id="{9AB50180-5BEE-48C0-B899-5AD2D50A3CD8}"/>
-              </a:ext>
-            </a:extLst>
-          </p:cNvPr>
+            <a:endParaRPr lang="en-US" dirty="0"/>
+          </a:p>
+        </p:txBody>
+      </p:sp>
+      <p:sp>
+        <p:nvSpPr>
+          <p:cNvPr id="3" name="Text Placeholder 2"/>
           <p:cNvSpPr>
             <a:spLocks noGrp="1"/>
           </p:cNvSpPr>
@@ -2840,8 +2483,8 @@
         </p:nvSpPr>
         <p:spPr>
           <a:xfrm>
-            <a:off x="838200" y="1825625"/>
-            <a:ext cx="10515600" cy="4351338"/>
+            <a:off x="838200" y="2874937"/>
+            <a:ext cx="10515600" cy="6852350"/>
           </a:xfrm>
           <a:prstGeom prst="rect">
             <a:avLst/>
@@ -2886,19 +2529,13 @@
               <a:rPr lang="en-US"/>
               <a:t>Fifth level</a:t>
             </a:r>
-            <a:endParaRPr lang="en-GB"/>
-          </a:p>
-        </p:txBody>
-      </p:sp>
-      <p:sp>
-        <p:nvSpPr>
-          <p:cNvPr id="4" name="Date Placeholder 3">
-            <a:extLst>
-              <a:ext uri="{FF2B5EF4-FFF2-40B4-BE49-F238E27FC236}">
-                <a16:creationId xmlns:a16="http://schemas.microsoft.com/office/drawing/2014/main" id="{D0BD0CC1-7E10-4262-9CB1-93F484EE4B38}"/>
-              </a:ext>
-            </a:extLst>
-          </p:cNvPr>
+            <a:endParaRPr lang="en-US" dirty="0"/>
+          </a:p>
+        </p:txBody>
+      </p:sp>
+      <p:sp>
+        <p:nvSpPr>
+          <p:cNvPr id="4" name="Date Placeholder 3"/>
           <p:cNvSpPr>
             <a:spLocks noGrp="1"/>
           </p:cNvSpPr>
@@ -2908,8 +2545,8 @@
         </p:nvSpPr>
         <p:spPr>
           <a:xfrm>
-            <a:off x="838200" y="6356350"/>
-            <a:ext cx="2743200" cy="365125"/>
+            <a:off x="838200" y="10009783"/>
+            <a:ext cx="2743200" cy="574987"/>
           </a:xfrm>
           <a:prstGeom prst="rect">
             <a:avLst/>
@@ -2919,7 +2556,7 @@
           <a:bodyPr vert="horz" lIns="91440" tIns="45720" rIns="91440" bIns="45720" rtlCol="0" anchor="ctr"/>
           <a:lstStyle>
             <a:lvl1pPr algn="l">
-              <a:defRPr sz="1200">
+              <a:defRPr sz="1600">
                 <a:solidFill>
                   <a:schemeClr val="tx1">
                     <a:tint val="75000"/>
@@ -2931,7 +2568,7 @@
           <a:p>
             <a:fld id="{1F80DB50-5271-4B1A-976D-0A7715B55622}" type="datetimeFigureOut">
               <a:rPr lang="en-GB" smtClean="0"/>
-              <a:t>02/03/2020</a:t>
+              <a:t>10/03/2020</a:t>
             </a:fld>
             <a:endParaRPr lang="en-GB"/>
           </a:p>
@@ -2939,13 +2576,7 @@
       </p:sp>
       <p:sp>
         <p:nvSpPr>
-          <p:cNvPr id="5" name="Footer Placeholder 4">
-            <a:extLst>
-              <a:ext uri="{FF2B5EF4-FFF2-40B4-BE49-F238E27FC236}">
-                <a16:creationId xmlns:a16="http://schemas.microsoft.com/office/drawing/2014/main" id="{014DB248-3332-404D-B319-94D2F6BA7105}"/>
-              </a:ext>
-            </a:extLst>
-          </p:cNvPr>
+          <p:cNvPr id="5" name="Footer Placeholder 4"/>
           <p:cNvSpPr>
             <a:spLocks noGrp="1"/>
           </p:cNvSpPr>
@@ -2955,8 +2586,8 @@
         </p:nvSpPr>
         <p:spPr>
           <a:xfrm>
-            <a:off x="4038600" y="6356350"/>
-            <a:ext cx="4114800" cy="365125"/>
+            <a:off x="4038600" y="10009783"/>
+            <a:ext cx="4114800" cy="574987"/>
           </a:xfrm>
           <a:prstGeom prst="rect">
             <a:avLst/>
@@ -2966,7 +2597,7 @@
           <a:bodyPr vert="horz" lIns="91440" tIns="45720" rIns="91440" bIns="45720" rtlCol="0" anchor="ctr"/>
           <a:lstStyle>
             <a:lvl1pPr algn="ctr">
-              <a:defRPr sz="1200">
+              <a:defRPr sz="1600">
                 <a:solidFill>
                   <a:schemeClr val="tx1">
                     <a:tint val="75000"/>
@@ -2982,13 +2613,7 @@
       </p:sp>
       <p:sp>
         <p:nvSpPr>
-          <p:cNvPr id="6" name="Slide Number Placeholder 5">
-            <a:extLst>
-              <a:ext uri="{FF2B5EF4-FFF2-40B4-BE49-F238E27FC236}">
-                <a16:creationId xmlns:a16="http://schemas.microsoft.com/office/drawing/2014/main" id="{F1ADA7DF-50D3-44EB-86C2-100745FEB332}"/>
-              </a:ext>
-            </a:extLst>
-          </p:cNvPr>
+          <p:cNvPr id="6" name="Slide Number Placeholder 5"/>
           <p:cNvSpPr>
             <a:spLocks noGrp="1"/>
           </p:cNvSpPr>
@@ -2998,8 +2623,8 @@
         </p:nvSpPr>
         <p:spPr>
           <a:xfrm>
-            <a:off x="8610600" y="6356350"/>
-            <a:ext cx="2743200" cy="365125"/>
+            <a:off x="8610600" y="10009783"/>
+            <a:ext cx="2743200" cy="574987"/>
           </a:xfrm>
           <a:prstGeom prst="rect">
             <a:avLst/>
@@ -3009,7 +2634,7 @@
           <a:bodyPr vert="horz" lIns="91440" tIns="45720" rIns="91440" bIns="45720" rtlCol="0" anchor="ctr"/>
           <a:lstStyle>
             <a:lvl1pPr algn="r">
-              <a:defRPr sz="1200">
+              <a:defRPr sz="1600">
                 <a:solidFill>
                   <a:schemeClr val="tx1">
                     <a:tint val="75000"/>
@@ -3030,27 +2655,27 @@
     </p:spTree>
     <p:extLst>
       <p:ext uri="{BB962C8B-B14F-4D97-AF65-F5344CB8AC3E}">
-        <p14:creationId xmlns:p14="http://schemas.microsoft.com/office/powerpoint/2010/main" val="933686223"/>
+        <p14:creationId xmlns:p14="http://schemas.microsoft.com/office/powerpoint/2010/main" val="3317130137"/>
       </p:ext>
     </p:extLst>
   </p:cSld>
   <p:clrMap bg1="lt1" tx1="dk1" bg2="lt2" tx2="dk2" accent1="accent1" accent2="accent2" accent3="accent3" accent4="accent4" accent5="accent5" accent6="accent6" hlink="hlink" folHlink="folHlink"/>
   <p:sldLayoutIdLst>
-    <p:sldLayoutId id="2147483649" r:id="rId1"/>
-    <p:sldLayoutId id="2147483650" r:id="rId2"/>
-    <p:sldLayoutId id="2147483651" r:id="rId3"/>
-    <p:sldLayoutId id="2147483652" r:id="rId4"/>
-    <p:sldLayoutId id="2147483653" r:id="rId5"/>
-    <p:sldLayoutId id="2147483654" r:id="rId6"/>
-    <p:sldLayoutId id="2147483655" r:id="rId7"/>
-    <p:sldLayoutId id="2147483656" r:id="rId8"/>
-    <p:sldLayoutId id="2147483657" r:id="rId9"/>
-    <p:sldLayoutId id="2147483658" r:id="rId10"/>
-    <p:sldLayoutId id="2147483659" r:id="rId11"/>
+    <p:sldLayoutId id="2147483661" r:id="rId1"/>
+    <p:sldLayoutId id="2147483662" r:id="rId2"/>
+    <p:sldLayoutId id="2147483663" r:id="rId3"/>
+    <p:sldLayoutId id="2147483664" r:id="rId4"/>
+    <p:sldLayoutId id="2147483665" r:id="rId5"/>
+    <p:sldLayoutId id="2147483666" r:id="rId6"/>
+    <p:sldLayoutId id="2147483667" r:id="rId7"/>
+    <p:sldLayoutId id="2147483668" r:id="rId8"/>
+    <p:sldLayoutId id="2147483669" r:id="rId9"/>
+    <p:sldLayoutId id="2147483670" r:id="rId10"/>
+    <p:sldLayoutId id="2147483671" r:id="rId11"/>
   </p:sldLayoutIdLst>
   <p:txStyles>
     <p:titleStyle>
-      <a:lvl1pPr algn="l" defTabSz="914400" rtl="0" eaLnBrk="1" latinLnBrk="0" hangingPunct="1">
+      <a:lvl1pPr algn="l" defTabSz="1219170" rtl="0" eaLnBrk="1" latinLnBrk="0" hangingPunct="1">
         <a:lnSpc>
           <a:spcPct val="90000"/>
         </a:lnSpc>
@@ -3058,7 +2683,7 @@
           <a:spcPct val="0"/>
         </a:spcBef>
         <a:buNone/>
-        <a:defRPr sz="4400" kern="1200">
+        <a:defRPr sz="5867" kern="1200">
           <a:solidFill>
             <a:schemeClr val="tx1"/>
           </a:solidFill>
@@ -3069,16 +2694,16 @@
       </a:lvl1pPr>
     </p:titleStyle>
     <p:bodyStyle>
-      <a:lvl1pPr marL="228600" indent="-228600" algn="l" defTabSz="914400" rtl="0" eaLnBrk="1" latinLnBrk="0" hangingPunct="1">
+      <a:lvl1pPr marL="304792" indent="-304792" algn="l" defTabSz="1219170" rtl="0" eaLnBrk="1" latinLnBrk="0" hangingPunct="1">
         <a:lnSpc>
           <a:spcPct val="90000"/>
         </a:lnSpc>
         <a:spcBef>
-          <a:spcPts val="1000"/>
+          <a:spcPts val="1333"/>
         </a:spcBef>
         <a:buFont typeface="Arial" panose="020B0604020202020204" pitchFamily="34" charset="0"/>
         <a:buChar char="•"/>
-        <a:defRPr sz="2800" kern="1200">
+        <a:defRPr sz="3733" kern="1200">
           <a:solidFill>
             <a:schemeClr val="tx1"/>
           </a:solidFill>
@@ -3087,12 +2712,48 @@
           <a:cs typeface="+mn-cs"/>
         </a:defRPr>
       </a:lvl1pPr>
-      <a:lvl2pPr marL="685800" indent="-228600" algn="l" defTabSz="914400" rtl="0" eaLnBrk="1" latinLnBrk="0" hangingPunct="1">
+      <a:lvl2pPr marL="914377" indent="-304792" algn="l" defTabSz="1219170" rtl="0" eaLnBrk="1" latinLnBrk="0" hangingPunct="1">
         <a:lnSpc>
           <a:spcPct val="90000"/>
         </a:lnSpc>
         <a:spcBef>
-          <a:spcPts val="500"/>
+          <a:spcPts val="667"/>
+        </a:spcBef>
+        <a:buFont typeface="Arial" panose="020B0604020202020204" pitchFamily="34" charset="0"/>
+        <a:buChar char="•"/>
+        <a:defRPr sz="3200" kern="1200">
+          <a:solidFill>
+            <a:schemeClr val="tx1"/>
+          </a:solidFill>
+          <a:latin typeface="+mn-lt"/>
+          <a:ea typeface="+mn-ea"/>
+          <a:cs typeface="+mn-cs"/>
+        </a:defRPr>
+      </a:lvl2pPr>
+      <a:lvl3pPr marL="1523962" indent="-304792" algn="l" defTabSz="1219170" rtl="0" eaLnBrk="1" latinLnBrk="0" hangingPunct="1">
+        <a:lnSpc>
+          <a:spcPct val="90000"/>
+        </a:lnSpc>
+        <a:spcBef>
+          <a:spcPts val="667"/>
+        </a:spcBef>
+        <a:buFont typeface="Arial" panose="020B0604020202020204" pitchFamily="34" charset="0"/>
+        <a:buChar char="•"/>
+        <a:defRPr sz="2667" kern="1200">
+          <a:solidFill>
+            <a:schemeClr val="tx1"/>
+          </a:solidFill>
+          <a:latin typeface="+mn-lt"/>
+          <a:ea typeface="+mn-ea"/>
+          <a:cs typeface="+mn-cs"/>
+        </a:defRPr>
+      </a:lvl3pPr>
+      <a:lvl4pPr marL="2133547" indent="-304792" algn="l" defTabSz="1219170" rtl="0" eaLnBrk="1" latinLnBrk="0" hangingPunct="1">
+        <a:lnSpc>
+          <a:spcPct val="90000"/>
+        </a:lnSpc>
+        <a:spcBef>
+          <a:spcPts val="667"/>
         </a:spcBef>
         <a:buFont typeface="Arial" panose="020B0604020202020204" pitchFamily="34" charset="0"/>
         <a:buChar char="•"/>
@@ -3104,53 +2765,17 @@
           <a:ea typeface="+mn-ea"/>
           <a:cs typeface="+mn-cs"/>
         </a:defRPr>
-      </a:lvl2pPr>
-      <a:lvl3pPr marL="1143000" indent="-228600" algn="l" defTabSz="914400" rtl="0" eaLnBrk="1" latinLnBrk="0" hangingPunct="1">
+      </a:lvl4pPr>
+      <a:lvl5pPr marL="2743131" indent="-304792" algn="l" defTabSz="1219170" rtl="0" eaLnBrk="1" latinLnBrk="0" hangingPunct="1">
         <a:lnSpc>
           <a:spcPct val="90000"/>
         </a:lnSpc>
         <a:spcBef>
-          <a:spcPts val="500"/>
+          <a:spcPts val="667"/>
         </a:spcBef>
         <a:buFont typeface="Arial" panose="020B0604020202020204" pitchFamily="34" charset="0"/>
         <a:buChar char="•"/>
-        <a:defRPr sz="2000" kern="1200">
-          <a:solidFill>
-            <a:schemeClr val="tx1"/>
-          </a:solidFill>
-          <a:latin typeface="+mn-lt"/>
-          <a:ea typeface="+mn-ea"/>
-          <a:cs typeface="+mn-cs"/>
-        </a:defRPr>
-      </a:lvl3pPr>
-      <a:lvl4pPr marL="1600200" indent="-228600" algn="l" defTabSz="914400" rtl="0" eaLnBrk="1" latinLnBrk="0" hangingPunct="1">
-        <a:lnSpc>
-          <a:spcPct val="90000"/>
-        </a:lnSpc>
-        <a:spcBef>
-          <a:spcPts val="500"/>
-        </a:spcBef>
-        <a:buFont typeface="Arial" panose="020B0604020202020204" pitchFamily="34" charset="0"/>
-        <a:buChar char="•"/>
-        <a:defRPr sz="1800" kern="1200">
-          <a:solidFill>
-            <a:schemeClr val="tx1"/>
-          </a:solidFill>
-          <a:latin typeface="+mn-lt"/>
-          <a:ea typeface="+mn-ea"/>
-          <a:cs typeface="+mn-cs"/>
-        </a:defRPr>
-      </a:lvl4pPr>
-      <a:lvl5pPr marL="2057400" indent="-228600" algn="l" defTabSz="914400" rtl="0" eaLnBrk="1" latinLnBrk="0" hangingPunct="1">
-        <a:lnSpc>
-          <a:spcPct val="90000"/>
-        </a:lnSpc>
-        <a:spcBef>
-          <a:spcPts val="500"/>
-        </a:spcBef>
-        <a:buFont typeface="Arial" panose="020B0604020202020204" pitchFamily="34" charset="0"/>
-        <a:buChar char="•"/>
-        <a:defRPr sz="1800" kern="1200">
+        <a:defRPr sz="2400" kern="1200">
           <a:solidFill>
             <a:schemeClr val="tx1"/>
           </a:solidFill>
@@ -3159,16 +2784,16 @@
           <a:cs typeface="+mn-cs"/>
         </a:defRPr>
       </a:lvl5pPr>
-      <a:lvl6pPr marL="2514600" indent="-228600" algn="l" defTabSz="914400" rtl="0" eaLnBrk="1" latinLnBrk="0" hangingPunct="1">
+      <a:lvl6pPr marL="3352716" indent="-304792" algn="l" defTabSz="1219170" rtl="0" eaLnBrk="1" latinLnBrk="0" hangingPunct="1">
         <a:lnSpc>
           <a:spcPct val="90000"/>
         </a:lnSpc>
         <a:spcBef>
-          <a:spcPts val="500"/>
+          <a:spcPts val="667"/>
         </a:spcBef>
         <a:buFont typeface="Arial" panose="020B0604020202020204" pitchFamily="34" charset="0"/>
         <a:buChar char="•"/>
-        <a:defRPr sz="1800" kern="1200">
+        <a:defRPr sz="2400" kern="1200">
           <a:solidFill>
             <a:schemeClr val="tx1"/>
           </a:solidFill>
@@ -3177,16 +2802,16 @@
           <a:cs typeface="+mn-cs"/>
         </a:defRPr>
       </a:lvl6pPr>
-      <a:lvl7pPr marL="2971800" indent="-228600" algn="l" defTabSz="914400" rtl="0" eaLnBrk="1" latinLnBrk="0" hangingPunct="1">
+      <a:lvl7pPr marL="3962301" indent="-304792" algn="l" defTabSz="1219170" rtl="0" eaLnBrk="1" latinLnBrk="0" hangingPunct="1">
         <a:lnSpc>
           <a:spcPct val="90000"/>
         </a:lnSpc>
         <a:spcBef>
-          <a:spcPts val="500"/>
+          <a:spcPts val="667"/>
         </a:spcBef>
         <a:buFont typeface="Arial" panose="020B0604020202020204" pitchFamily="34" charset="0"/>
         <a:buChar char="•"/>
-        <a:defRPr sz="1800" kern="1200">
+        <a:defRPr sz="2400" kern="1200">
           <a:solidFill>
             <a:schemeClr val="tx1"/>
           </a:solidFill>
@@ -3195,16 +2820,16 @@
           <a:cs typeface="+mn-cs"/>
         </a:defRPr>
       </a:lvl7pPr>
-      <a:lvl8pPr marL="3429000" indent="-228600" algn="l" defTabSz="914400" rtl="0" eaLnBrk="1" latinLnBrk="0" hangingPunct="1">
+      <a:lvl8pPr marL="4571886" indent="-304792" algn="l" defTabSz="1219170" rtl="0" eaLnBrk="1" latinLnBrk="0" hangingPunct="1">
         <a:lnSpc>
           <a:spcPct val="90000"/>
         </a:lnSpc>
         <a:spcBef>
-          <a:spcPts val="500"/>
+          <a:spcPts val="667"/>
         </a:spcBef>
         <a:buFont typeface="Arial" panose="020B0604020202020204" pitchFamily="34" charset="0"/>
         <a:buChar char="•"/>
-        <a:defRPr sz="1800" kern="1200">
+        <a:defRPr sz="2400" kern="1200">
           <a:solidFill>
             <a:schemeClr val="tx1"/>
           </a:solidFill>
@@ -3213,16 +2838,16 @@
           <a:cs typeface="+mn-cs"/>
         </a:defRPr>
       </a:lvl8pPr>
-      <a:lvl9pPr marL="3886200" indent="-228600" algn="l" defTabSz="914400" rtl="0" eaLnBrk="1" latinLnBrk="0" hangingPunct="1">
+      <a:lvl9pPr marL="5181470" indent="-304792" algn="l" defTabSz="1219170" rtl="0" eaLnBrk="1" latinLnBrk="0" hangingPunct="1">
         <a:lnSpc>
           <a:spcPct val="90000"/>
         </a:lnSpc>
         <a:spcBef>
-          <a:spcPts val="500"/>
+          <a:spcPts val="667"/>
         </a:spcBef>
         <a:buFont typeface="Arial" panose="020B0604020202020204" pitchFamily="34" charset="0"/>
         <a:buChar char="•"/>
-        <a:defRPr sz="1800" kern="1200">
+        <a:defRPr sz="2400" kern="1200">
           <a:solidFill>
             <a:schemeClr val="tx1"/>
           </a:solidFill>
@@ -3236,8 +2861,8 @@
       <a:defPPr>
         <a:defRPr lang="en-US"/>
       </a:defPPr>
-      <a:lvl1pPr marL="0" algn="l" defTabSz="914400" rtl="0" eaLnBrk="1" latinLnBrk="0" hangingPunct="1">
-        <a:defRPr sz="1800" kern="1200">
+      <a:lvl1pPr marL="0" algn="l" defTabSz="1219170" rtl="0" eaLnBrk="1" latinLnBrk="0" hangingPunct="1">
+        <a:defRPr sz="2400" kern="1200">
           <a:solidFill>
             <a:schemeClr val="tx1"/>
           </a:solidFill>
@@ -3246,8 +2871,8 @@
           <a:cs typeface="+mn-cs"/>
         </a:defRPr>
       </a:lvl1pPr>
-      <a:lvl2pPr marL="457200" algn="l" defTabSz="914400" rtl="0" eaLnBrk="1" latinLnBrk="0" hangingPunct="1">
-        <a:defRPr sz="1800" kern="1200">
+      <a:lvl2pPr marL="609585" algn="l" defTabSz="1219170" rtl="0" eaLnBrk="1" latinLnBrk="0" hangingPunct="1">
+        <a:defRPr sz="2400" kern="1200">
           <a:solidFill>
             <a:schemeClr val="tx1"/>
           </a:solidFill>
@@ -3256,8 +2881,8 @@
           <a:cs typeface="+mn-cs"/>
         </a:defRPr>
       </a:lvl2pPr>
-      <a:lvl3pPr marL="914400" algn="l" defTabSz="914400" rtl="0" eaLnBrk="1" latinLnBrk="0" hangingPunct="1">
-        <a:defRPr sz="1800" kern="1200">
+      <a:lvl3pPr marL="1219170" algn="l" defTabSz="1219170" rtl="0" eaLnBrk="1" latinLnBrk="0" hangingPunct="1">
+        <a:defRPr sz="2400" kern="1200">
           <a:solidFill>
             <a:schemeClr val="tx1"/>
           </a:solidFill>
@@ -3266,8 +2891,8 @@
           <a:cs typeface="+mn-cs"/>
         </a:defRPr>
       </a:lvl3pPr>
-      <a:lvl4pPr marL="1371600" algn="l" defTabSz="914400" rtl="0" eaLnBrk="1" latinLnBrk="0" hangingPunct="1">
-        <a:defRPr sz="1800" kern="1200">
+      <a:lvl4pPr marL="1828754" algn="l" defTabSz="1219170" rtl="0" eaLnBrk="1" latinLnBrk="0" hangingPunct="1">
+        <a:defRPr sz="2400" kern="1200">
           <a:solidFill>
             <a:schemeClr val="tx1"/>
           </a:solidFill>
@@ -3276,8 +2901,8 @@
           <a:cs typeface="+mn-cs"/>
         </a:defRPr>
       </a:lvl4pPr>
-      <a:lvl5pPr marL="1828800" algn="l" defTabSz="914400" rtl="0" eaLnBrk="1" latinLnBrk="0" hangingPunct="1">
-        <a:defRPr sz="1800" kern="1200">
+      <a:lvl5pPr marL="2438339" algn="l" defTabSz="1219170" rtl="0" eaLnBrk="1" latinLnBrk="0" hangingPunct="1">
+        <a:defRPr sz="2400" kern="1200">
           <a:solidFill>
             <a:schemeClr val="tx1"/>
           </a:solidFill>
@@ -3286,8 +2911,8 @@
           <a:cs typeface="+mn-cs"/>
         </a:defRPr>
       </a:lvl5pPr>
-      <a:lvl6pPr marL="2286000" algn="l" defTabSz="914400" rtl="0" eaLnBrk="1" latinLnBrk="0" hangingPunct="1">
-        <a:defRPr sz="1800" kern="1200">
+      <a:lvl6pPr marL="3047924" algn="l" defTabSz="1219170" rtl="0" eaLnBrk="1" latinLnBrk="0" hangingPunct="1">
+        <a:defRPr sz="2400" kern="1200">
           <a:solidFill>
             <a:schemeClr val="tx1"/>
           </a:solidFill>
@@ -3296,8 +2921,8 @@
           <a:cs typeface="+mn-cs"/>
         </a:defRPr>
       </a:lvl6pPr>
-      <a:lvl7pPr marL="2743200" algn="l" defTabSz="914400" rtl="0" eaLnBrk="1" latinLnBrk="0" hangingPunct="1">
-        <a:defRPr sz="1800" kern="1200">
+      <a:lvl7pPr marL="3657509" algn="l" defTabSz="1219170" rtl="0" eaLnBrk="1" latinLnBrk="0" hangingPunct="1">
+        <a:defRPr sz="2400" kern="1200">
           <a:solidFill>
             <a:schemeClr val="tx1"/>
           </a:solidFill>
@@ -3306,8 +2931,8 @@
           <a:cs typeface="+mn-cs"/>
         </a:defRPr>
       </a:lvl7pPr>
-      <a:lvl8pPr marL="3200400" algn="l" defTabSz="914400" rtl="0" eaLnBrk="1" latinLnBrk="0" hangingPunct="1">
-        <a:defRPr sz="1800" kern="1200">
+      <a:lvl8pPr marL="4267093" algn="l" defTabSz="1219170" rtl="0" eaLnBrk="1" latinLnBrk="0" hangingPunct="1">
+        <a:defRPr sz="2400" kern="1200">
           <a:solidFill>
             <a:schemeClr val="tx1"/>
           </a:solidFill>
@@ -3316,8 +2941,8 @@
           <a:cs typeface="+mn-cs"/>
         </a:defRPr>
       </a:lvl8pPr>
-      <a:lvl9pPr marL="3657600" algn="l" defTabSz="914400" rtl="0" eaLnBrk="1" latinLnBrk="0" hangingPunct="1">
-        <a:defRPr sz="1800" kern="1200">
+      <a:lvl9pPr marL="4876678" algn="l" defTabSz="1219170" rtl="0" eaLnBrk="1" latinLnBrk="0" hangingPunct="1">
+        <a:defRPr sz="2400" kern="1200">
           <a:solidFill>
             <a:schemeClr val="tx1"/>
           </a:solidFill>
@@ -3376,7 +3001,7 @@
         </p:blipFill>
         <p:spPr>
           <a:xfrm>
-            <a:off x="1616691" y="143808"/>
+            <a:off x="1616691" y="2114689"/>
             <a:ext cx="6699512" cy="1527060"/>
           </a:xfrm>
           <a:prstGeom prst="rect">
@@ -3412,7 +3037,7 @@
         </p:blipFill>
         <p:spPr>
           <a:xfrm>
-            <a:off x="2985247" y="5285172"/>
+            <a:off x="2985248" y="7256053"/>
             <a:ext cx="6911787" cy="1572828"/>
           </a:xfrm>
           <a:prstGeom prst="rect">
@@ -3434,7 +3059,7 @@
         </p:nvSpPr>
         <p:spPr>
           <a:xfrm rot="5400000">
-            <a:off x="3891174" y="-1656851"/>
+            <a:off x="3891175" y="314030"/>
             <a:ext cx="669973" cy="6997234"/>
           </a:xfrm>
           <a:prstGeom prst="leftBrace">
@@ -3486,7 +3111,7 @@
         </p:nvSpPr>
         <p:spPr>
           <a:xfrm rot="5400000">
-            <a:off x="4781930" y="1206911"/>
+            <a:off x="4781931" y="3177792"/>
             <a:ext cx="669973" cy="3491130"/>
           </a:xfrm>
           <a:prstGeom prst="leftBrace">
@@ -3552,7 +3177,7 @@
         </p:blipFill>
         <p:spPr>
           <a:xfrm>
-            <a:off x="764055" y="2053541"/>
+            <a:off x="764056" y="4024423"/>
             <a:ext cx="6911787" cy="669971"/>
           </a:xfrm>
           <a:prstGeom prst="rect">
@@ -3574,7 +3199,7 @@
         </p:nvSpPr>
         <p:spPr>
           <a:xfrm rot="5400000">
-            <a:off x="5646713" y="2296001"/>
+            <a:off x="5646714" y="4266882"/>
             <a:ext cx="669973" cy="3491130"/>
           </a:xfrm>
           <a:prstGeom prst="leftBrace">
@@ -3640,7 +3265,7 @@
         </p:blipFill>
         <p:spPr>
           <a:xfrm>
-            <a:off x="3429711" y="3118885"/>
+            <a:off x="3429712" y="5089767"/>
             <a:ext cx="3394671" cy="704555"/>
           </a:xfrm>
           <a:prstGeom prst="rect">
@@ -3662,7 +3287,7 @@
         </p:nvSpPr>
         <p:spPr>
           <a:xfrm rot="5400000">
-            <a:off x="6070854" y="1617694"/>
+            <a:off x="6070855" y="3588576"/>
             <a:ext cx="669973" cy="6982383"/>
           </a:xfrm>
           <a:prstGeom prst="leftBrace">
@@ -3728,7 +3353,7 @@
         </p:blipFill>
         <p:spPr>
           <a:xfrm>
-            <a:off x="4306588" y="4212463"/>
+            <a:off x="4306588" y="6183344"/>
             <a:ext cx="3394672" cy="684890"/>
           </a:xfrm>
           <a:prstGeom prst="rect">
@@ -3794,7 +3419,7 @@
         </p:blipFill>
         <p:spPr>
           <a:xfrm>
-            <a:off x="3012346" y="143808"/>
+            <a:off x="3012346" y="2114689"/>
             <a:ext cx="6699512" cy="1527060"/>
           </a:xfrm>
           <a:prstGeom prst="rect">
@@ -3830,7 +3455,7 @@
         </p:blipFill>
         <p:spPr>
           <a:xfrm>
-            <a:off x="4380902" y="5285172"/>
+            <a:off x="4380903" y="7256053"/>
             <a:ext cx="6911787" cy="1572828"/>
           </a:xfrm>
           <a:prstGeom prst="rect">
@@ -3852,7 +3477,7 @@
         </p:nvSpPr>
         <p:spPr>
           <a:xfrm rot="5400000">
-            <a:off x="5286829" y="-1656851"/>
+            <a:off x="5286830" y="314030"/>
             <a:ext cx="669973" cy="6997234"/>
           </a:xfrm>
           <a:prstGeom prst="leftBrace">
@@ -3904,7 +3529,7 @@
         </p:nvSpPr>
         <p:spPr>
           <a:xfrm rot="5400000">
-            <a:off x="6177585" y="1206911"/>
+            <a:off x="6177586" y="3177792"/>
             <a:ext cx="669973" cy="3491130"/>
           </a:xfrm>
           <a:prstGeom prst="leftBrace">
@@ -3970,7 +3595,7 @@
         </p:blipFill>
         <p:spPr>
           <a:xfrm>
-            <a:off x="2159710" y="2053541"/>
+            <a:off x="2159711" y="4024423"/>
             <a:ext cx="6911787" cy="669971"/>
           </a:xfrm>
           <a:prstGeom prst="rect">
@@ -3992,7 +3617,7 @@
         </p:nvSpPr>
         <p:spPr>
           <a:xfrm rot="5400000">
-            <a:off x="7042368" y="2296001"/>
+            <a:off x="7042369" y="4266882"/>
             <a:ext cx="669973" cy="3491130"/>
           </a:xfrm>
           <a:prstGeom prst="leftBrace">
@@ -4058,7 +3683,7 @@
         </p:blipFill>
         <p:spPr>
           <a:xfrm>
-            <a:off x="4825366" y="3118885"/>
+            <a:off x="4825367" y="5089767"/>
             <a:ext cx="3394671" cy="704555"/>
           </a:xfrm>
           <a:prstGeom prst="rect">
@@ -4080,7 +3705,7 @@
         </p:nvSpPr>
         <p:spPr>
           <a:xfrm rot="5400000">
-            <a:off x="7466509" y="1617694"/>
+            <a:off x="7466510" y="3588576"/>
             <a:ext cx="669973" cy="6982383"/>
           </a:xfrm>
           <a:prstGeom prst="leftBrace">
@@ -4146,7 +3771,7 @@
         </p:blipFill>
         <p:spPr>
           <a:xfrm>
-            <a:off x="5702243" y="4212463"/>
+            <a:off x="5702243" y="6183344"/>
             <a:ext cx="3394672" cy="684890"/>
           </a:xfrm>
           <a:prstGeom prst="rect">
@@ -4176,7 +3801,7 @@
         </p:blipFill>
         <p:spPr>
           <a:xfrm>
-            <a:off x="80211" y="61294"/>
+            <a:off x="80211" y="2032175"/>
             <a:ext cx="892528" cy="579404"/>
           </a:xfrm>
           <a:prstGeom prst="rect">
@@ -4206,7 +3831,7 @@
         </p:blipFill>
         <p:spPr>
           <a:xfrm>
-            <a:off x="80211" y="1808425"/>
+            <a:off x="80211" y="3779306"/>
             <a:ext cx="892528" cy="586800"/>
           </a:xfrm>
           <a:prstGeom prst="rect">
@@ -4236,7 +3861,7 @@
         </p:blipFill>
         <p:spPr>
           <a:xfrm>
-            <a:off x="80211" y="4032931"/>
+            <a:off x="80211" y="6003812"/>
             <a:ext cx="892528" cy="586800"/>
           </a:xfrm>
           <a:prstGeom prst="rect">
@@ -4260,7 +3885,7 @@
         </p:nvCxnSpPr>
         <p:spPr>
           <a:xfrm>
-            <a:off x="80211" y="1702952"/>
+            <a:off x="80211" y="3673833"/>
             <a:ext cx="11277600" cy="0"/>
           </a:xfrm>
           <a:prstGeom prst="line">
@@ -4306,7 +3931,7 @@
         </p:nvCxnSpPr>
         <p:spPr>
           <a:xfrm>
-            <a:off x="80211" y="3932803"/>
+            <a:off x="80211" y="5903684"/>
             <a:ext cx="11277600" cy="0"/>
           </a:xfrm>
           <a:prstGeom prst="line">
@@ -4350,7 +3975,7 @@
         </p:nvSpPr>
         <p:spPr>
           <a:xfrm>
-            <a:off x="972739" y="126362"/>
+            <a:off x="972739" y="2097244"/>
             <a:ext cx="1813060" cy="461665"/>
           </a:xfrm>
           <a:prstGeom prst="rect">
@@ -4386,7 +4011,7 @@
         </p:nvSpPr>
         <p:spPr>
           <a:xfrm>
-            <a:off x="949407" y="1870992"/>
+            <a:off x="949408" y="3841874"/>
             <a:ext cx="1025089" cy="461665"/>
           </a:xfrm>
           <a:prstGeom prst="rect">
@@ -4422,7 +4047,7 @@
         </p:nvSpPr>
         <p:spPr>
           <a:xfrm>
-            <a:off x="950089" y="4095498"/>
+            <a:off x="950090" y="6066380"/>
             <a:ext cx="829073" cy="461665"/>
           </a:xfrm>
           <a:prstGeom prst="rect">
@@ -4441,6 +4066,41 @@
               <a:t>Child</a:t>
             </a:r>
             <a:endParaRPr lang="en-GB" sz="2400" b="1" dirty="0"/>
+          </a:p>
+        </p:txBody>
+      </p:sp>
+      <p:sp>
+        <p:nvSpPr>
+          <p:cNvPr id="6" name="TextBox 5">
+            <a:extLst>
+              <a:ext uri="{FF2B5EF4-FFF2-40B4-BE49-F238E27FC236}">
+                <a16:creationId xmlns:a16="http://schemas.microsoft.com/office/drawing/2014/main" id="{17F8A168-3F01-42AA-ACD1-52226D338250}"/>
+              </a:ext>
+            </a:extLst>
+          </p:cNvPr>
+          <p:cNvSpPr txBox="1"/>
+          <p:nvPr/>
+        </p:nvSpPr>
+        <p:spPr>
+          <a:xfrm>
+            <a:off x="11584142" y="1970881"/>
+            <a:ext cx="588623" cy="369332"/>
+          </a:xfrm>
+          <a:prstGeom prst="rect">
+            <a:avLst/>
+          </a:prstGeom>
+          <a:noFill/>
+        </p:spPr>
+        <p:txBody>
+          <a:bodyPr wrap="none" rtlCol="0">
+            <a:spAutoFit/>
+          </a:bodyPr>
+          <a:lstStyle/>
+          <a:p>
+            <a:r>
+              <a:rPr lang="en-GB" b="1" dirty="0"/>
+              <a:t>v1.0</a:t>
+            </a:r>
           </a:p>
         </p:txBody>
       </p:sp>
@@ -4457,10 +4117,735 @@
 </p:sld>
 </file>
 
+<file path=ppt/slides/slide3.xml><?xml version="1.0" encoding="utf-8"?>
+<p:sld xmlns:a="http://schemas.openxmlformats.org/drawingml/2006/main" xmlns:r="http://schemas.openxmlformats.org/officeDocument/2006/relationships" xmlns:p="http://schemas.openxmlformats.org/presentationml/2006/main">
+  <p:cSld>
+    <p:spTree>
+      <p:nvGrpSpPr>
+        <p:cNvPr id="1" name=""/>
+        <p:cNvGrpSpPr/>
+        <p:nvPr/>
+      </p:nvGrpSpPr>
+      <p:grpSpPr>
+        <a:xfrm>
+          <a:off x="0" y="0"/>
+          <a:ext cx="0" cy="0"/>
+          <a:chOff x="0" y="0"/>
+          <a:chExt cx="0" cy="0"/>
+        </a:xfrm>
+      </p:grpSpPr>
+      <p:sp>
+        <p:nvSpPr>
+          <p:cNvPr id="12" name="Left Brace 11">
+            <a:extLst>
+              <a:ext uri="{FF2B5EF4-FFF2-40B4-BE49-F238E27FC236}">
+                <a16:creationId xmlns:a16="http://schemas.microsoft.com/office/drawing/2014/main" id="{77D93561-8CDB-430E-8A88-3911DEFB7740}"/>
+              </a:ext>
+            </a:extLst>
+          </p:cNvPr>
+          <p:cNvSpPr/>
+          <p:nvPr/>
+        </p:nvSpPr>
+        <p:spPr>
+          <a:xfrm rot="5400000">
+            <a:off x="8572249" y="3467005"/>
+            <a:ext cx="669973" cy="4490358"/>
+          </a:xfrm>
+          <a:prstGeom prst="leftBrace">
+            <a:avLst>
+              <a:gd name="adj1" fmla="val 8333"/>
+              <a:gd name="adj2" fmla="val 49429"/>
+            </a:avLst>
+          </a:prstGeom>
+          <a:ln w="38100">
+            <a:solidFill>
+              <a:schemeClr val="accent4"/>
+            </a:solidFill>
+          </a:ln>
+        </p:spPr>
+        <p:style>
+          <a:lnRef idx="1">
+            <a:schemeClr val="accent1"/>
+          </a:lnRef>
+          <a:fillRef idx="0">
+            <a:schemeClr val="accent1"/>
+          </a:fillRef>
+          <a:effectRef idx="0">
+            <a:schemeClr val="accent1"/>
+          </a:effectRef>
+          <a:fontRef idx="minor">
+            <a:schemeClr val="tx1"/>
+          </a:fontRef>
+        </p:style>
+        <p:txBody>
+          <a:bodyPr rtlCol="0" anchor="ctr"/>
+          <a:lstStyle/>
+          <a:p>
+            <a:pPr algn="ctr"/>
+            <a:endParaRPr lang="en-GB" dirty="0"/>
+          </a:p>
+        </p:txBody>
+      </p:sp>
+      <p:pic>
+        <p:nvPicPr>
+          <p:cNvPr id="19" name="Picture 18">
+            <a:extLst>
+              <a:ext uri="{FF2B5EF4-FFF2-40B4-BE49-F238E27FC236}">
+                <a16:creationId xmlns:a16="http://schemas.microsoft.com/office/drawing/2014/main" id="{4D704760-CFE0-4000-82CE-D6EBCE2D5B12}"/>
+              </a:ext>
+            </a:extLst>
+          </p:cNvPr>
+          <p:cNvPicPr>
+            <a:picLocks noChangeAspect="1"/>
+          </p:cNvPicPr>
+          <p:nvPr/>
+        </p:nvPicPr>
+        <p:blipFill>
+          <a:blip r:embed="rId2"/>
+          <a:stretch>
+            <a:fillRect/>
+          </a:stretch>
+        </p:blipFill>
+        <p:spPr>
+          <a:xfrm>
+            <a:off x="6733536" y="4492827"/>
+            <a:ext cx="2884534" cy="1038183"/>
+          </a:xfrm>
+          <a:prstGeom prst="rect">
+            <a:avLst/>
+          </a:prstGeom>
+        </p:spPr>
+      </p:pic>
+      <p:sp>
+        <p:nvSpPr>
+          <p:cNvPr id="14" name="Left Brace 13">
+            <a:extLst>
+              <a:ext uri="{FF2B5EF4-FFF2-40B4-BE49-F238E27FC236}">
+                <a16:creationId xmlns:a16="http://schemas.microsoft.com/office/drawing/2014/main" id="{21CB80A6-2177-4740-A5FA-B2FC1E8D547F}"/>
+              </a:ext>
+            </a:extLst>
+          </p:cNvPr>
+          <p:cNvSpPr/>
+          <p:nvPr/>
+        </p:nvSpPr>
+        <p:spPr>
+          <a:xfrm rot="5400000">
+            <a:off x="5240602" y="-1462661"/>
+            <a:ext cx="669973" cy="6256206"/>
+          </a:xfrm>
+          <a:prstGeom prst="leftBrace">
+            <a:avLst>
+              <a:gd name="adj1" fmla="val 8333"/>
+              <a:gd name="adj2" fmla="val 49886"/>
+            </a:avLst>
+          </a:prstGeom>
+          <a:ln w="38100">
+            <a:solidFill>
+              <a:schemeClr val="accent4"/>
+            </a:solidFill>
+          </a:ln>
+        </p:spPr>
+        <p:style>
+          <a:lnRef idx="1">
+            <a:schemeClr val="accent1"/>
+          </a:lnRef>
+          <a:fillRef idx="0">
+            <a:schemeClr val="accent1"/>
+          </a:fillRef>
+          <a:effectRef idx="0">
+            <a:schemeClr val="accent1"/>
+          </a:effectRef>
+          <a:fontRef idx="minor">
+            <a:schemeClr val="tx1"/>
+          </a:fontRef>
+        </p:style>
+        <p:txBody>
+          <a:bodyPr rtlCol="0" anchor="ctr"/>
+          <a:lstStyle/>
+          <a:p>
+            <a:pPr algn="ctr"/>
+            <a:endParaRPr lang="en-GB" dirty="0"/>
+          </a:p>
+        </p:txBody>
+      </p:sp>
+      <p:sp>
+        <p:nvSpPr>
+          <p:cNvPr id="10" name="Left Brace 9">
+            <a:extLst>
+              <a:ext uri="{FF2B5EF4-FFF2-40B4-BE49-F238E27FC236}">
+                <a16:creationId xmlns:a16="http://schemas.microsoft.com/office/drawing/2014/main" id="{D9BAFF37-C112-4618-A993-30FC9730AEDC}"/>
+              </a:ext>
+            </a:extLst>
+          </p:cNvPr>
+          <p:cNvSpPr/>
+          <p:nvPr/>
+        </p:nvSpPr>
+        <p:spPr>
+          <a:xfrm rot="5400000">
+            <a:off x="7851972" y="2970555"/>
+            <a:ext cx="669973" cy="3049801"/>
+          </a:xfrm>
+          <a:prstGeom prst="leftBrace">
+            <a:avLst>
+              <a:gd name="adj1" fmla="val 8333"/>
+              <a:gd name="adj2" fmla="val 49886"/>
+            </a:avLst>
+          </a:prstGeom>
+          <a:ln w="38100">
+            <a:solidFill>
+              <a:schemeClr val="accent4"/>
+            </a:solidFill>
+          </a:ln>
+        </p:spPr>
+        <p:style>
+          <a:lnRef idx="1">
+            <a:schemeClr val="accent1"/>
+          </a:lnRef>
+          <a:fillRef idx="0">
+            <a:schemeClr val="accent1"/>
+          </a:fillRef>
+          <a:effectRef idx="0">
+            <a:schemeClr val="accent1"/>
+          </a:effectRef>
+          <a:fontRef idx="minor">
+            <a:schemeClr val="tx1"/>
+          </a:fontRef>
+        </p:style>
+        <p:txBody>
+          <a:bodyPr rtlCol="0" anchor="ctr"/>
+          <a:lstStyle/>
+          <a:p>
+            <a:pPr algn="ctr"/>
+            <a:endParaRPr lang="en-GB" dirty="0"/>
+          </a:p>
+        </p:txBody>
+      </p:sp>
+      <p:pic>
+        <p:nvPicPr>
+          <p:cNvPr id="9" name="Picture 8" descr="A screenshot of a cell phone&#10;&#10;Description automatically generated">
+            <a:extLst>
+              <a:ext uri="{FF2B5EF4-FFF2-40B4-BE49-F238E27FC236}">
+                <a16:creationId xmlns:a16="http://schemas.microsoft.com/office/drawing/2014/main" id="{07FC1643-C668-4E3F-A395-738D92D66D85}"/>
+              </a:ext>
+            </a:extLst>
+          </p:cNvPr>
+          <p:cNvPicPr>
+            <a:picLocks noChangeAspect="1"/>
+          </p:cNvPicPr>
+          <p:nvPr/>
+        </p:nvPicPr>
+        <p:blipFill>
+          <a:blip r:embed="rId3">
+            <a:extLst>
+              <a:ext uri="{28A0092B-C50C-407E-A947-70E740481C1C}">
+                <a14:useLocalDpi xmlns:a14="http://schemas.microsoft.com/office/drawing/2010/main" val="0"/>
+              </a:ext>
+            </a:extLst>
+          </a:blip>
+          <a:stretch>
+            <a:fillRect/>
+          </a:stretch>
+        </p:blipFill>
+        <p:spPr>
+          <a:xfrm>
+            <a:off x="5738883" y="3571651"/>
+            <a:ext cx="3164539" cy="656792"/>
+          </a:xfrm>
+          <a:prstGeom prst="rect">
+            <a:avLst/>
+          </a:prstGeom>
+        </p:spPr>
+      </p:pic>
+      <p:pic>
+        <p:nvPicPr>
+          <p:cNvPr id="2" name="Picture 1">
+            <a:extLst>
+              <a:ext uri="{FF2B5EF4-FFF2-40B4-BE49-F238E27FC236}">
+                <a16:creationId xmlns:a16="http://schemas.microsoft.com/office/drawing/2014/main" id="{36CE73C9-BA77-4ECA-AA16-858684EEB8DD}"/>
+              </a:ext>
+            </a:extLst>
+          </p:cNvPr>
+          <p:cNvPicPr>
+            <a:picLocks noChangeAspect="1"/>
+          </p:cNvPicPr>
+          <p:nvPr/>
+        </p:nvPicPr>
+        <p:blipFill>
+          <a:blip r:embed="rId4"/>
+          <a:stretch>
+            <a:fillRect/>
+          </a:stretch>
+        </p:blipFill>
+        <p:spPr>
+          <a:xfrm>
+            <a:off x="80211" y="89075"/>
+            <a:ext cx="892528" cy="579404"/>
+          </a:xfrm>
+          <a:prstGeom prst="rect">
+            <a:avLst/>
+          </a:prstGeom>
+        </p:spPr>
+      </p:pic>
+      <p:pic>
+        <p:nvPicPr>
+          <p:cNvPr id="3" name="Picture 2">
+            <a:extLst>
+              <a:ext uri="{FF2B5EF4-FFF2-40B4-BE49-F238E27FC236}">
+                <a16:creationId xmlns:a16="http://schemas.microsoft.com/office/drawing/2014/main" id="{BAC2FA6D-7E44-4A70-ABBF-441AC58C61D8}"/>
+              </a:ext>
+            </a:extLst>
+          </p:cNvPr>
+          <p:cNvPicPr>
+            <a:picLocks noChangeAspect="1"/>
+          </p:cNvPicPr>
+          <p:nvPr/>
+        </p:nvPicPr>
+        <p:blipFill>
+          <a:blip r:embed="rId5"/>
+          <a:stretch>
+            <a:fillRect/>
+          </a:stretch>
+        </p:blipFill>
+        <p:spPr>
+          <a:xfrm>
+            <a:off x="80211" y="1656591"/>
+            <a:ext cx="892528" cy="586800"/>
+          </a:xfrm>
+          <a:prstGeom prst="rect">
+            <a:avLst/>
+          </a:prstGeom>
+        </p:spPr>
+      </p:pic>
+      <p:pic>
+        <p:nvPicPr>
+          <p:cNvPr id="4" name="Picture 3">
+            <a:extLst>
+              <a:ext uri="{FF2B5EF4-FFF2-40B4-BE49-F238E27FC236}">
+                <a16:creationId xmlns:a16="http://schemas.microsoft.com/office/drawing/2014/main" id="{FB95A457-1250-418F-8752-3AD3D6CA1CBF}"/>
+              </a:ext>
+            </a:extLst>
+          </p:cNvPr>
+          <p:cNvPicPr>
+            <a:picLocks noChangeAspect="1"/>
+          </p:cNvPicPr>
+          <p:nvPr/>
+        </p:nvPicPr>
+        <p:blipFill>
+          <a:blip r:embed="rId6"/>
+          <a:stretch>
+            <a:fillRect/>
+          </a:stretch>
+        </p:blipFill>
+        <p:spPr>
+          <a:xfrm>
+            <a:off x="80211" y="4452598"/>
+            <a:ext cx="892528" cy="586800"/>
+          </a:xfrm>
+          <a:prstGeom prst="rect">
+            <a:avLst/>
+          </a:prstGeom>
+        </p:spPr>
+      </p:pic>
+      <p:cxnSp>
+        <p:nvCxnSpPr>
+          <p:cNvPr id="8" name="Straight Connector 7">
+            <a:extLst>
+              <a:ext uri="{FF2B5EF4-FFF2-40B4-BE49-F238E27FC236}">
+                <a16:creationId xmlns:a16="http://schemas.microsoft.com/office/drawing/2014/main" id="{B3C21FE1-62D5-40B2-8293-E02C7F95F45F}"/>
+              </a:ext>
+            </a:extLst>
+          </p:cNvPr>
+          <p:cNvCxnSpPr>
+            <a:cxnSpLocks/>
+          </p:cNvCxnSpPr>
+          <p:nvPr/>
+        </p:nvCxnSpPr>
+        <p:spPr>
+          <a:xfrm>
+            <a:off x="80211" y="1591940"/>
+            <a:ext cx="11277600" cy="0"/>
+          </a:xfrm>
+          <a:prstGeom prst="line">
+            <a:avLst/>
+          </a:prstGeom>
+          <a:ln w="57150">
+            <a:solidFill>
+              <a:schemeClr val="bg1">
+                <a:lumMod val="50000"/>
+              </a:schemeClr>
+            </a:solidFill>
+            <a:prstDash val="sysDot"/>
+          </a:ln>
+        </p:spPr>
+        <p:style>
+          <a:lnRef idx="1">
+            <a:schemeClr val="accent1"/>
+          </a:lnRef>
+          <a:fillRef idx="0">
+            <a:schemeClr val="accent1"/>
+          </a:fillRef>
+          <a:effectRef idx="0">
+            <a:schemeClr val="accent1"/>
+          </a:effectRef>
+          <a:fontRef idx="minor">
+            <a:schemeClr val="tx1"/>
+          </a:fontRef>
+        </p:style>
+      </p:cxnSp>
+      <p:cxnSp>
+        <p:nvCxnSpPr>
+          <p:cNvPr id="18" name="Straight Connector 17">
+            <a:extLst>
+              <a:ext uri="{FF2B5EF4-FFF2-40B4-BE49-F238E27FC236}">
+                <a16:creationId xmlns:a16="http://schemas.microsoft.com/office/drawing/2014/main" id="{38FE55ED-9890-448D-B9B6-36A3574E90DB}"/>
+              </a:ext>
+            </a:extLst>
+          </p:cNvPr>
+          <p:cNvCxnSpPr>
+            <a:cxnSpLocks/>
+          </p:cNvCxnSpPr>
+          <p:nvPr/>
+        </p:nvCxnSpPr>
+        <p:spPr>
+          <a:xfrm>
+            <a:off x="80211" y="4360634"/>
+            <a:ext cx="11277600" cy="0"/>
+          </a:xfrm>
+          <a:prstGeom prst="line">
+            <a:avLst/>
+          </a:prstGeom>
+          <a:ln w="57150">
+            <a:solidFill>
+              <a:schemeClr val="bg1">
+                <a:lumMod val="50000"/>
+              </a:schemeClr>
+            </a:solidFill>
+            <a:prstDash val="sysDot"/>
+          </a:ln>
+        </p:spPr>
+        <p:style>
+          <a:lnRef idx="1">
+            <a:schemeClr val="accent1"/>
+          </a:lnRef>
+          <a:fillRef idx="0">
+            <a:schemeClr val="accent1"/>
+          </a:fillRef>
+          <a:effectRef idx="0">
+            <a:schemeClr val="accent1"/>
+          </a:effectRef>
+          <a:fontRef idx="minor">
+            <a:schemeClr val="tx1"/>
+          </a:fontRef>
+        </p:style>
+      </p:cxnSp>
+      <p:sp>
+        <p:nvSpPr>
+          <p:cNvPr id="23" name="TextBox 22">
+            <a:extLst>
+              <a:ext uri="{FF2B5EF4-FFF2-40B4-BE49-F238E27FC236}">
+                <a16:creationId xmlns:a16="http://schemas.microsoft.com/office/drawing/2014/main" id="{06F8B482-C37F-4E4C-9FB0-942BA9C3D5D1}"/>
+              </a:ext>
+            </a:extLst>
+          </p:cNvPr>
+          <p:cNvSpPr txBox="1"/>
+          <p:nvPr/>
+        </p:nvSpPr>
+        <p:spPr>
+          <a:xfrm>
+            <a:off x="972739" y="154144"/>
+            <a:ext cx="1813060" cy="461665"/>
+          </a:xfrm>
+          <a:prstGeom prst="rect">
+            <a:avLst/>
+          </a:prstGeom>
+          <a:noFill/>
+        </p:spPr>
+        <p:txBody>
+          <a:bodyPr wrap="none" rtlCol="0">
+            <a:spAutoFit/>
+          </a:bodyPr>
+          <a:lstStyle/>
+          <a:p>
+            <a:r>
+              <a:rPr lang="en-US" sz="2400" b="1" dirty="0"/>
+              <a:t>Grandparent</a:t>
+            </a:r>
+            <a:endParaRPr lang="en-GB" sz="2400" b="1" dirty="0"/>
+          </a:p>
+        </p:txBody>
+      </p:sp>
+      <p:sp>
+        <p:nvSpPr>
+          <p:cNvPr id="24" name="TextBox 23">
+            <a:extLst>
+              <a:ext uri="{FF2B5EF4-FFF2-40B4-BE49-F238E27FC236}">
+                <a16:creationId xmlns:a16="http://schemas.microsoft.com/office/drawing/2014/main" id="{2B1D7642-1297-4FF4-AC1C-9E90A1648238}"/>
+              </a:ext>
+            </a:extLst>
+          </p:cNvPr>
+          <p:cNvSpPr txBox="1"/>
+          <p:nvPr/>
+        </p:nvSpPr>
+        <p:spPr>
+          <a:xfrm>
+            <a:off x="949408" y="1719159"/>
+            <a:ext cx="1025089" cy="461665"/>
+          </a:xfrm>
+          <a:prstGeom prst="rect">
+            <a:avLst/>
+          </a:prstGeom>
+          <a:noFill/>
+        </p:spPr>
+        <p:txBody>
+          <a:bodyPr wrap="none" rtlCol="0">
+            <a:spAutoFit/>
+          </a:bodyPr>
+          <a:lstStyle/>
+          <a:p>
+            <a:r>
+              <a:rPr lang="en-US" sz="2400" b="1" dirty="0"/>
+              <a:t>Parent</a:t>
+            </a:r>
+            <a:endParaRPr lang="en-GB" sz="2400" b="1" dirty="0"/>
+          </a:p>
+        </p:txBody>
+      </p:sp>
+      <p:sp>
+        <p:nvSpPr>
+          <p:cNvPr id="25" name="TextBox 24">
+            <a:extLst>
+              <a:ext uri="{FF2B5EF4-FFF2-40B4-BE49-F238E27FC236}">
+                <a16:creationId xmlns:a16="http://schemas.microsoft.com/office/drawing/2014/main" id="{6B7827E1-5A9B-4381-BD48-FF1E8075FB93}"/>
+              </a:ext>
+            </a:extLst>
+          </p:cNvPr>
+          <p:cNvSpPr txBox="1"/>
+          <p:nvPr/>
+        </p:nvSpPr>
+        <p:spPr>
+          <a:xfrm>
+            <a:off x="950090" y="4515166"/>
+            <a:ext cx="829073" cy="461665"/>
+          </a:xfrm>
+          <a:prstGeom prst="rect">
+            <a:avLst/>
+          </a:prstGeom>
+          <a:noFill/>
+        </p:spPr>
+        <p:txBody>
+          <a:bodyPr wrap="none" rtlCol="0">
+            <a:spAutoFit/>
+          </a:bodyPr>
+          <a:lstStyle/>
+          <a:p>
+            <a:r>
+              <a:rPr lang="en-US" sz="2400" b="1" dirty="0"/>
+              <a:t>Child</a:t>
+            </a:r>
+            <a:endParaRPr lang="en-GB" sz="2400" b="1" dirty="0"/>
+          </a:p>
+        </p:txBody>
+      </p:sp>
+      <p:sp>
+        <p:nvSpPr>
+          <p:cNvPr id="6" name="TextBox 5">
+            <a:extLst>
+              <a:ext uri="{FF2B5EF4-FFF2-40B4-BE49-F238E27FC236}">
+                <a16:creationId xmlns:a16="http://schemas.microsoft.com/office/drawing/2014/main" id="{17F8A168-3F01-42AA-ACD1-52226D338250}"/>
+              </a:ext>
+            </a:extLst>
+          </p:cNvPr>
+          <p:cNvSpPr txBox="1"/>
+          <p:nvPr/>
+        </p:nvSpPr>
+        <p:spPr>
+          <a:xfrm>
+            <a:off x="10822142" y="27781"/>
+            <a:ext cx="588623" cy="369332"/>
+          </a:xfrm>
+          <a:prstGeom prst="rect">
+            <a:avLst/>
+          </a:prstGeom>
+          <a:noFill/>
+        </p:spPr>
+        <p:txBody>
+          <a:bodyPr wrap="none" rtlCol="0">
+            <a:spAutoFit/>
+          </a:bodyPr>
+          <a:lstStyle/>
+          <a:p>
+            <a:r>
+              <a:rPr lang="en-GB" b="1" dirty="0"/>
+              <a:t>v1.1</a:t>
+            </a:r>
+          </a:p>
+        </p:txBody>
+      </p:sp>
+      <p:sp>
+        <p:nvSpPr>
+          <p:cNvPr id="15" name="Left Brace 14">
+            <a:extLst>
+              <a:ext uri="{FF2B5EF4-FFF2-40B4-BE49-F238E27FC236}">
+                <a16:creationId xmlns:a16="http://schemas.microsoft.com/office/drawing/2014/main" id="{E4F55F19-6D3D-40FC-9579-C24CDFA3E5B6}"/>
+              </a:ext>
+            </a:extLst>
+          </p:cNvPr>
+          <p:cNvSpPr/>
+          <p:nvPr/>
+        </p:nvSpPr>
+        <p:spPr>
+          <a:xfrm rot="5400000">
+            <a:off x="7026584" y="1916607"/>
+            <a:ext cx="508102" cy="3245571"/>
+          </a:xfrm>
+          <a:prstGeom prst="leftBrace">
+            <a:avLst>
+              <a:gd name="adj1" fmla="val 8333"/>
+              <a:gd name="adj2" fmla="val 83094"/>
+            </a:avLst>
+          </a:prstGeom>
+          <a:ln w="38100">
+            <a:solidFill>
+              <a:schemeClr val="accent4"/>
+            </a:solidFill>
+          </a:ln>
+        </p:spPr>
+        <p:style>
+          <a:lnRef idx="1">
+            <a:schemeClr val="accent1"/>
+          </a:lnRef>
+          <a:fillRef idx="0">
+            <a:schemeClr val="accent1"/>
+          </a:fillRef>
+          <a:effectRef idx="0">
+            <a:schemeClr val="accent1"/>
+          </a:effectRef>
+          <a:fontRef idx="minor">
+            <a:schemeClr val="tx1"/>
+          </a:fontRef>
+        </p:style>
+        <p:txBody>
+          <a:bodyPr rtlCol="0" anchor="ctr"/>
+          <a:lstStyle/>
+          <a:p>
+            <a:pPr algn="ctr"/>
+            <a:endParaRPr lang="en-GB" dirty="0"/>
+          </a:p>
+        </p:txBody>
+      </p:sp>
+      <p:pic>
+        <p:nvPicPr>
+          <p:cNvPr id="5" name="Picture 4" descr="A screenshot of a cell phone&#10;&#10;Description automatically generated">
+            <a:extLst>
+              <a:ext uri="{FF2B5EF4-FFF2-40B4-BE49-F238E27FC236}">
+                <a16:creationId xmlns:a16="http://schemas.microsoft.com/office/drawing/2014/main" id="{9D5DA8E3-64DB-4086-90D5-4957AE971C73}"/>
+              </a:ext>
+            </a:extLst>
+          </p:cNvPr>
+          <p:cNvPicPr>
+            <a:picLocks noChangeAspect="1"/>
+          </p:cNvPicPr>
+          <p:nvPr/>
+        </p:nvPicPr>
+        <p:blipFill>
+          <a:blip r:embed="rId7">
+            <a:extLst>
+              <a:ext uri="{28A0092B-C50C-407E-A947-70E740481C1C}">
+                <a14:useLocalDpi xmlns:a14="http://schemas.microsoft.com/office/drawing/2010/main" val="0"/>
+              </a:ext>
+            </a:extLst>
+          </a:blip>
+          <a:stretch>
+            <a:fillRect/>
+          </a:stretch>
+        </p:blipFill>
+        <p:spPr>
+          <a:xfrm>
+            <a:off x="3012346" y="32795"/>
+            <a:ext cx="6699512" cy="1527060"/>
+          </a:xfrm>
+          <a:prstGeom prst="rect">
+            <a:avLst/>
+          </a:prstGeom>
+        </p:spPr>
+      </p:pic>
+      <p:pic>
+        <p:nvPicPr>
+          <p:cNvPr id="17" name="Picture 16">
+            <a:extLst>
+              <a:ext uri="{FF2B5EF4-FFF2-40B4-BE49-F238E27FC236}">
+                <a16:creationId xmlns:a16="http://schemas.microsoft.com/office/drawing/2014/main" id="{5A887F27-B4A1-4B8B-98CB-9E3CD4B64686}"/>
+              </a:ext>
+            </a:extLst>
+          </p:cNvPr>
+          <p:cNvPicPr>
+            <a:picLocks noChangeAspect="1"/>
+          </p:cNvPicPr>
+          <p:nvPr/>
+        </p:nvPicPr>
+        <p:blipFill>
+          <a:blip r:embed="rId8"/>
+          <a:stretch>
+            <a:fillRect/>
+          </a:stretch>
+        </p:blipFill>
+        <p:spPr>
+          <a:xfrm>
+            <a:off x="2548061" y="1709948"/>
+            <a:ext cx="5901976" cy="2202766"/>
+          </a:xfrm>
+          <a:prstGeom prst="rect">
+            <a:avLst/>
+          </a:prstGeom>
+        </p:spPr>
+      </p:pic>
+      <p:pic>
+        <p:nvPicPr>
+          <p:cNvPr id="20" name="Picture 19">
+            <a:extLst>
+              <a:ext uri="{FF2B5EF4-FFF2-40B4-BE49-F238E27FC236}">
+                <a16:creationId xmlns:a16="http://schemas.microsoft.com/office/drawing/2014/main" id="{AA8F518E-186F-47A0-8082-C0E861FADF91}"/>
+              </a:ext>
+            </a:extLst>
+          </p:cNvPr>
+          <p:cNvPicPr>
+            <a:picLocks noChangeAspect="1"/>
+          </p:cNvPicPr>
+          <p:nvPr/>
+        </p:nvPicPr>
+        <p:blipFill>
+          <a:blip r:embed="rId9"/>
+          <a:stretch>
+            <a:fillRect/>
+          </a:stretch>
+        </p:blipFill>
+        <p:spPr>
+          <a:xfrm>
+            <a:off x="6718507" y="5760983"/>
+            <a:ext cx="4369828" cy="2163642"/>
+          </a:xfrm>
+          <a:prstGeom prst="rect">
+            <a:avLst/>
+          </a:prstGeom>
+        </p:spPr>
+      </p:pic>
+    </p:spTree>
+    <p:extLst>
+      <p:ext uri="{BB962C8B-B14F-4D97-AF65-F5344CB8AC3E}">
+        <p14:creationId xmlns:p14="http://schemas.microsoft.com/office/powerpoint/2010/main" val="2341675613"/>
+      </p:ext>
+    </p:extLst>
+  </p:cSld>
+  <p:clrMapOvr>
+    <a:masterClrMapping/>
+  </p:clrMapOvr>
+</p:sld>
+</file>
+
 <file path=ppt/theme/theme1.xml><?xml version="1.0" encoding="utf-8"?>
 <a:theme xmlns:a="http://schemas.openxmlformats.org/drawingml/2006/main" name="Office Theme">
   <a:themeElements>
-    <a:clrScheme name="Office">
+    <a:clrScheme name="Office Theme">
       <a:dk1>
         <a:sysClr val="windowText" lastClr="000000"/>
       </a:dk1>
@@ -4498,7 +4883,7 @@
         <a:srgbClr val="954F72"/>
       </a:folHlink>
     </a:clrScheme>
-    <a:fontScheme name="Office">
+    <a:fontScheme name="Office Theme">
       <a:majorFont>
         <a:latin typeface="Calibri Light" panose="020F0302020204030204"/>
         <a:ea typeface=""/>
@@ -4533,23 +4918,6 @@
         <a:font script="Viet" typeface="Times New Roman"/>
         <a:font script="Uigh" typeface="Microsoft Uighur"/>
         <a:font script="Geor" typeface="Sylfaen"/>
-        <a:font script="Armn" typeface="Arial"/>
-        <a:font script="Bugi" typeface="Leelawadee UI"/>
-        <a:font script="Bopo" typeface="Microsoft JhengHei"/>
-        <a:font script="Java" typeface="Javanese Text"/>
-        <a:font script="Lisu" typeface="Segoe UI"/>
-        <a:font script="Mymr" typeface="Myanmar Text"/>
-        <a:font script="Nkoo" typeface="Ebrima"/>
-        <a:font script="Olck" typeface="Nirmala UI"/>
-        <a:font script="Osma" typeface="Ebrima"/>
-        <a:font script="Phag" typeface="Phagspa"/>
-        <a:font script="Syrn" typeface="Estrangelo Edessa"/>
-        <a:font script="Syrj" typeface="Estrangelo Edessa"/>
-        <a:font script="Syre" typeface="Estrangelo Edessa"/>
-        <a:font script="Sora" typeface="Nirmala UI"/>
-        <a:font script="Tale" typeface="Microsoft Tai Le"/>
-        <a:font script="Talu" typeface="Microsoft New Tai Lue"/>
-        <a:font script="Tfng" typeface="Ebrima"/>
       </a:majorFont>
       <a:minorFont>
         <a:latin typeface="Calibri" panose="020F0502020204030204"/>
@@ -4585,26 +4953,9 @@
         <a:font script="Viet" typeface="Arial"/>
         <a:font script="Uigh" typeface="Microsoft Uighur"/>
         <a:font script="Geor" typeface="Sylfaen"/>
-        <a:font script="Armn" typeface="Arial"/>
-        <a:font script="Bugi" typeface="Leelawadee UI"/>
-        <a:font script="Bopo" typeface="Microsoft JhengHei"/>
-        <a:font script="Java" typeface="Javanese Text"/>
-        <a:font script="Lisu" typeface="Segoe UI"/>
-        <a:font script="Mymr" typeface="Myanmar Text"/>
-        <a:font script="Nkoo" typeface="Ebrima"/>
-        <a:font script="Olck" typeface="Nirmala UI"/>
-        <a:font script="Osma" typeface="Ebrima"/>
-        <a:font script="Phag" typeface="Phagspa"/>
-        <a:font script="Syrn" typeface="Estrangelo Edessa"/>
-        <a:font script="Syrj" typeface="Estrangelo Edessa"/>
-        <a:font script="Syre" typeface="Estrangelo Edessa"/>
-        <a:font script="Sora" typeface="Nirmala UI"/>
-        <a:font script="Tale" typeface="Microsoft Tai Le"/>
-        <a:font script="Talu" typeface="Microsoft New Tai Lue"/>
-        <a:font script="Tfng" typeface="Ebrima"/>
       </a:minorFont>
     </a:fontScheme>
-    <a:fmtScheme name="Office">
+    <a:fmtScheme name="Office Theme">
       <a:fillStyleLst>
         <a:solidFill>
           <a:schemeClr val="phClr"/>

</xml_diff>

<commit_message>
Database updates to support restart ability.
</commit_message>
<xml_diff>
--- a/Images/All ADF Activities.pptx
+++ b/Images/All ADF Activities.pptx
@@ -8,6 +8,7 @@
     <p:sldId id="256" r:id="rId2"/>
     <p:sldId id="257" r:id="rId3"/>
     <p:sldId id="258" r:id="rId4"/>
+    <p:sldId id="259" r:id="rId5"/>
   </p:sldIdLst>
   <p:sldSz cx="12192000" cy="10799763"/>
   <p:notesSz cx="6858000" cy="9144000"/>
@@ -245,7 +246,7 @@
           <a:p>
             <a:fld id="{1F80DB50-5271-4B1A-976D-0A7715B55622}" type="datetimeFigureOut">
               <a:rPr lang="en-GB" smtClean="0"/>
-              <a:t>10/03/2020</a:t>
+              <a:t>17/03/2020</a:t>
             </a:fld>
             <a:endParaRPr lang="en-GB"/>
           </a:p>
@@ -415,7 +416,7 @@
           <a:p>
             <a:fld id="{1F80DB50-5271-4B1A-976D-0A7715B55622}" type="datetimeFigureOut">
               <a:rPr lang="en-GB" smtClean="0"/>
-              <a:t>10/03/2020</a:t>
+              <a:t>17/03/2020</a:t>
             </a:fld>
             <a:endParaRPr lang="en-GB"/>
           </a:p>
@@ -595,7 +596,7 @@
           <a:p>
             <a:fld id="{1F80DB50-5271-4B1A-976D-0A7715B55622}" type="datetimeFigureOut">
               <a:rPr lang="en-GB" smtClean="0"/>
-              <a:t>10/03/2020</a:t>
+              <a:t>17/03/2020</a:t>
             </a:fld>
             <a:endParaRPr lang="en-GB"/>
           </a:p>
@@ -765,7 +766,7 @@
           <a:p>
             <a:fld id="{1F80DB50-5271-4B1A-976D-0A7715B55622}" type="datetimeFigureOut">
               <a:rPr lang="en-GB" smtClean="0"/>
-              <a:t>10/03/2020</a:t>
+              <a:t>17/03/2020</a:t>
             </a:fld>
             <a:endParaRPr lang="en-GB"/>
           </a:p>
@@ -1009,7 +1010,7 @@
           <a:p>
             <a:fld id="{1F80DB50-5271-4B1A-976D-0A7715B55622}" type="datetimeFigureOut">
               <a:rPr lang="en-GB" smtClean="0"/>
-              <a:t>10/03/2020</a:t>
+              <a:t>17/03/2020</a:t>
             </a:fld>
             <a:endParaRPr lang="en-GB"/>
           </a:p>
@@ -1241,7 +1242,7 @@
           <a:p>
             <a:fld id="{1F80DB50-5271-4B1A-976D-0A7715B55622}" type="datetimeFigureOut">
               <a:rPr lang="en-GB" smtClean="0"/>
-              <a:t>10/03/2020</a:t>
+              <a:t>17/03/2020</a:t>
             </a:fld>
             <a:endParaRPr lang="en-GB"/>
           </a:p>
@@ -1608,7 +1609,7 @@
           <a:p>
             <a:fld id="{1F80DB50-5271-4B1A-976D-0A7715B55622}" type="datetimeFigureOut">
               <a:rPr lang="en-GB" smtClean="0"/>
-              <a:t>10/03/2020</a:t>
+              <a:t>17/03/2020</a:t>
             </a:fld>
             <a:endParaRPr lang="en-GB"/>
           </a:p>
@@ -1726,7 +1727,7 @@
           <a:p>
             <a:fld id="{1F80DB50-5271-4B1A-976D-0A7715B55622}" type="datetimeFigureOut">
               <a:rPr lang="en-GB" smtClean="0"/>
-              <a:t>10/03/2020</a:t>
+              <a:t>17/03/2020</a:t>
             </a:fld>
             <a:endParaRPr lang="en-GB"/>
           </a:p>
@@ -1821,7 +1822,7 @@
           <a:p>
             <a:fld id="{1F80DB50-5271-4B1A-976D-0A7715B55622}" type="datetimeFigureOut">
               <a:rPr lang="en-GB" smtClean="0"/>
-              <a:t>10/03/2020</a:t>
+              <a:t>17/03/2020</a:t>
             </a:fld>
             <a:endParaRPr lang="en-GB"/>
           </a:p>
@@ -2098,7 +2099,7 @@
           <a:p>
             <a:fld id="{1F80DB50-5271-4B1A-976D-0A7715B55622}" type="datetimeFigureOut">
               <a:rPr lang="en-GB" smtClean="0"/>
-              <a:t>10/03/2020</a:t>
+              <a:t>17/03/2020</a:t>
             </a:fld>
             <a:endParaRPr lang="en-GB"/>
           </a:p>
@@ -2355,7 +2356,7 @@
           <a:p>
             <a:fld id="{1F80DB50-5271-4B1A-976D-0A7715B55622}" type="datetimeFigureOut">
               <a:rPr lang="en-GB" smtClean="0"/>
-              <a:t>10/03/2020</a:t>
+              <a:t>17/03/2020</a:t>
             </a:fld>
             <a:endParaRPr lang="en-GB"/>
           </a:p>
@@ -2568,7 +2569,7 @@
           <a:p>
             <a:fld id="{1F80DB50-5271-4B1A-976D-0A7715B55622}" type="datetimeFigureOut">
               <a:rPr lang="en-GB" smtClean="0"/>
-              <a:t>10/03/2020</a:t>
+              <a:t>17/03/2020</a:t>
             </a:fld>
             <a:endParaRPr lang="en-GB"/>
           </a:p>
@@ -4842,6 +4843,908 @@
 </p:sld>
 </file>
 
+<file path=ppt/slides/slide4.xml><?xml version="1.0" encoding="utf-8"?>
+<p:sld xmlns:a="http://schemas.openxmlformats.org/drawingml/2006/main" xmlns:r="http://schemas.openxmlformats.org/officeDocument/2006/relationships" xmlns:p="http://schemas.openxmlformats.org/presentationml/2006/main">
+  <p:cSld>
+    <p:spTree>
+      <p:nvGrpSpPr>
+        <p:cNvPr id="1" name=""/>
+        <p:cNvGrpSpPr/>
+        <p:nvPr/>
+      </p:nvGrpSpPr>
+      <p:grpSpPr>
+        <a:xfrm>
+          <a:off x="0" y="0"/>
+          <a:ext cx="0" cy="0"/>
+          <a:chOff x="0" y="0"/>
+          <a:chExt cx="0" cy="0"/>
+        </a:xfrm>
+      </p:grpSpPr>
+      <p:sp>
+        <p:nvSpPr>
+          <p:cNvPr id="12" name="Left Brace 11">
+            <a:extLst>
+              <a:ext uri="{FF2B5EF4-FFF2-40B4-BE49-F238E27FC236}">
+                <a16:creationId xmlns:a16="http://schemas.microsoft.com/office/drawing/2014/main" id="{77D93561-8CDB-430E-8A88-3911DEFB7740}"/>
+              </a:ext>
+            </a:extLst>
+          </p:cNvPr>
+          <p:cNvSpPr/>
+          <p:nvPr/>
+        </p:nvSpPr>
+        <p:spPr>
+          <a:xfrm rot="5400000">
+            <a:off x="9376871" y="3583426"/>
+            <a:ext cx="669973" cy="4490358"/>
+          </a:xfrm>
+          <a:prstGeom prst="leftBrace">
+            <a:avLst>
+              <a:gd name="adj1" fmla="val 8333"/>
+              <a:gd name="adj2" fmla="val 49429"/>
+            </a:avLst>
+          </a:prstGeom>
+          <a:ln w="38100">
+            <a:solidFill>
+              <a:schemeClr val="accent4"/>
+            </a:solidFill>
+          </a:ln>
+        </p:spPr>
+        <p:style>
+          <a:lnRef idx="1">
+            <a:schemeClr val="accent1"/>
+          </a:lnRef>
+          <a:fillRef idx="0">
+            <a:schemeClr val="accent1"/>
+          </a:fillRef>
+          <a:effectRef idx="0">
+            <a:schemeClr val="accent1"/>
+          </a:effectRef>
+          <a:fontRef idx="minor">
+            <a:schemeClr val="tx1"/>
+          </a:fontRef>
+        </p:style>
+        <p:txBody>
+          <a:bodyPr rtlCol="0" anchor="ctr"/>
+          <a:lstStyle/>
+          <a:p>
+            <a:pPr algn="ctr"/>
+            <a:endParaRPr lang="en-GB" dirty="0"/>
+          </a:p>
+        </p:txBody>
+      </p:sp>
+      <p:sp>
+        <p:nvSpPr>
+          <p:cNvPr id="14" name="Left Brace 13">
+            <a:extLst>
+              <a:ext uri="{FF2B5EF4-FFF2-40B4-BE49-F238E27FC236}">
+                <a16:creationId xmlns:a16="http://schemas.microsoft.com/office/drawing/2014/main" id="{21CB80A6-2177-4740-A5FA-B2FC1E8D547F}"/>
+              </a:ext>
+            </a:extLst>
+          </p:cNvPr>
+          <p:cNvSpPr/>
+          <p:nvPr/>
+        </p:nvSpPr>
+        <p:spPr>
+          <a:xfrm rot="5400000">
+            <a:off x="5240602" y="-1462661"/>
+            <a:ext cx="669973" cy="6256206"/>
+          </a:xfrm>
+          <a:prstGeom prst="leftBrace">
+            <a:avLst>
+              <a:gd name="adj1" fmla="val 8333"/>
+              <a:gd name="adj2" fmla="val 49886"/>
+            </a:avLst>
+          </a:prstGeom>
+          <a:ln w="38100">
+            <a:solidFill>
+              <a:schemeClr val="accent4"/>
+            </a:solidFill>
+          </a:ln>
+        </p:spPr>
+        <p:style>
+          <a:lnRef idx="1">
+            <a:schemeClr val="accent1"/>
+          </a:lnRef>
+          <a:fillRef idx="0">
+            <a:schemeClr val="accent1"/>
+          </a:fillRef>
+          <a:effectRef idx="0">
+            <a:schemeClr val="accent1"/>
+          </a:effectRef>
+          <a:fontRef idx="minor">
+            <a:schemeClr val="tx1"/>
+          </a:fontRef>
+        </p:style>
+        <p:txBody>
+          <a:bodyPr rtlCol="0" anchor="ctr"/>
+          <a:lstStyle/>
+          <a:p>
+            <a:pPr algn="ctr"/>
+            <a:endParaRPr lang="en-GB" dirty="0"/>
+          </a:p>
+        </p:txBody>
+      </p:sp>
+      <p:sp>
+        <p:nvSpPr>
+          <p:cNvPr id="10" name="Left Brace 9">
+            <a:extLst>
+              <a:ext uri="{FF2B5EF4-FFF2-40B4-BE49-F238E27FC236}">
+                <a16:creationId xmlns:a16="http://schemas.microsoft.com/office/drawing/2014/main" id="{D9BAFF37-C112-4618-A993-30FC9730AEDC}"/>
+              </a:ext>
+            </a:extLst>
+          </p:cNvPr>
+          <p:cNvSpPr/>
+          <p:nvPr/>
+        </p:nvSpPr>
+        <p:spPr>
+          <a:xfrm rot="5400000">
+            <a:off x="7800351" y="2285909"/>
+            <a:ext cx="669973" cy="4490358"/>
+          </a:xfrm>
+          <a:prstGeom prst="leftBrace">
+            <a:avLst>
+              <a:gd name="adj1" fmla="val 8333"/>
+              <a:gd name="adj2" fmla="val 49886"/>
+            </a:avLst>
+          </a:prstGeom>
+          <a:ln w="38100">
+            <a:solidFill>
+              <a:schemeClr val="accent4"/>
+            </a:solidFill>
+          </a:ln>
+        </p:spPr>
+        <p:style>
+          <a:lnRef idx="1">
+            <a:schemeClr val="accent1"/>
+          </a:lnRef>
+          <a:fillRef idx="0">
+            <a:schemeClr val="accent1"/>
+          </a:fillRef>
+          <a:effectRef idx="0">
+            <a:schemeClr val="accent1"/>
+          </a:effectRef>
+          <a:fontRef idx="minor">
+            <a:schemeClr val="tx1"/>
+          </a:fontRef>
+        </p:style>
+        <p:txBody>
+          <a:bodyPr rtlCol="0" anchor="ctr"/>
+          <a:lstStyle/>
+          <a:p>
+            <a:pPr algn="ctr"/>
+            <a:endParaRPr lang="en-GB" dirty="0"/>
+          </a:p>
+        </p:txBody>
+      </p:sp>
+      <p:pic>
+        <p:nvPicPr>
+          <p:cNvPr id="2" name="Picture 1">
+            <a:extLst>
+              <a:ext uri="{FF2B5EF4-FFF2-40B4-BE49-F238E27FC236}">
+                <a16:creationId xmlns:a16="http://schemas.microsoft.com/office/drawing/2014/main" id="{36CE73C9-BA77-4ECA-AA16-858684EEB8DD}"/>
+              </a:ext>
+            </a:extLst>
+          </p:cNvPr>
+          <p:cNvPicPr>
+            <a:picLocks noChangeAspect="1"/>
+          </p:cNvPicPr>
+          <p:nvPr/>
+        </p:nvPicPr>
+        <p:blipFill>
+          <a:blip r:embed="rId2"/>
+          <a:stretch>
+            <a:fillRect/>
+          </a:stretch>
+        </p:blipFill>
+        <p:spPr>
+          <a:xfrm>
+            <a:off x="80211" y="89075"/>
+            <a:ext cx="892528" cy="579404"/>
+          </a:xfrm>
+          <a:prstGeom prst="rect">
+            <a:avLst/>
+          </a:prstGeom>
+        </p:spPr>
+      </p:pic>
+      <p:pic>
+        <p:nvPicPr>
+          <p:cNvPr id="3" name="Picture 2">
+            <a:extLst>
+              <a:ext uri="{FF2B5EF4-FFF2-40B4-BE49-F238E27FC236}">
+                <a16:creationId xmlns:a16="http://schemas.microsoft.com/office/drawing/2014/main" id="{BAC2FA6D-7E44-4A70-ABBF-441AC58C61D8}"/>
+              </a:ext>
+            </a:extLst>
+          </p:cNvPr>
+          <p:cNvPicPr>
+            <a:picLocks noChangeAspect="1"/>
+          </p:cNvPicPr>
+          <p:nvPr/>
+        </p:nvPicPr>
+        <p:blipFill>
+          <a:blip r:embed="rId3"/>
+          <a:stretch>
+            <a:fillRect/>
+          </a:stretch>
+        </p:blipFill>
+        <p:spPr>
+          <a:xfrm>
+            <a:off x="80211" y="1656591"/>
+            <a:ext cx="892528" cy="586800"/>
+          </a:xfrm>
+          <a:prstGeom prst="rect">
+            <a:avLst/>
+          </a:prstGeom>
+        </p:spPr>
+      </p:pic>
+      <p:pic>
+        <p:nvPicPr>
+          <p:cNvPr id="4" name="Picture 3">
+            <a:extLst>
+              <a:ext uri="{FF2B5EF4-FFF2-40B4-BE49-F238E27FC236}">
+                <a16:creationId xmlns:a16="http://schemas.microsoft.com/office/drawing/2014/main" id="{FB95A457-1250-418F-8752-3AD3D6CA1CBF}"/>
+              </a:ext>
+            </a:extLst>
+          </p:cNvPr>
+          <p:cNvPicPr>
+            <a:picLocks noChangeAspect="1"/>
+          </p:cNvPicPr>
+          <p:nvPr/>
+        </p:nvPicPr>
+        <p:blipFill>
+          <a:blip r:embed="rId4"/>
+          <a:stretch>
+            <a:fillRect/>
+          </a:stretch>
+        </p:blipFill>
+        <p:spPr>
+          <a:xfrm>
+            <a:off x="80211" y="4488229"/>
+            <a:ext cx="892528" cy="586800"/>
+          </a:xfrm>
+          <a:prstGeom prst="rect">
+            <a:avLst/>
+          </a:prstGeom>
+        </p:spPr>
+      </p:pic>
+      <p:cxnSp>
+        <p:nvCxnSpPr>
+          <p:cNvPr id="8" name="Straight Connector 7">
+            <a:extLst>
+              <a:ext uri="{FF2B5EF4-FFF2-40B4-BE49-F238E27FC236}">
+                <a16:creationId xmlns:a16="http://schemas.microsoft.com/office/drawing/2014/main" id="{B3C21FE1-62D5-40B2-8293-E02C7F95F45F}"/>
+              </a:ext>
+            </a:extLst>
+          </p:cNvPr>
+          <p:cNvCxnSpPr>
+            <a:cxnSpLocks/>
+          </p:cNvCxnSpPr>
+          <p:nvPr/>
+        </p:nvCxnSpPr>
+        <p:spPr>
+          <a:xfrm>
+            <a:off x="80211" y="1591940"/>
+            <a:ext cx="11277600" cy="0"/>
+          </a:xfrm>
+          <a:prstGeom prst="line">
+            <a:avLst/>
+          </a:prstGeom>
+          <a:ln w="57150">
+            <a:solidFill>
+              <a:schemeClr val="bg1">
+                <a:lumMod val="50000"/>
+              </a:schemeClr>
+            </a:solidFill>
+            <a:prstDash val="sysDot"/>
+          </a:ln>
+        </p:spPr>
+        <p:style>
+          <a:lnRef idx="1">
+            <a:schemeClr val="accent1"/>
+          </a:lnRef>
+          <a:fillRef idx="0">
+            <a:schemeClr val="accent1"/>
+          </a:fillRef>
+          <a:effectRef idx="0">
+            <a:schemeClr val="accent1"/>
+          </a:effectRef>
+          <a:fontRef idx="minor">
+            <a:schemeClr val="tx1"/>
+          </a:fontRef>
+        </p:style>
+      </p:cxnSp>
+      <p:cxnSp>
+        <p:nvCxnSpPr>
+          <p:cNvPr id="18" name="Straight Connector 17">
+            <a:extLst>
+              <a:ext uri="{FF2B5EF4-FFF2-40B4-BE49-F238E27FC236}">
+                <a16:creationId xmlns:a16="http://schemas.microsoft.com/office/drawing/2014/main" id="{38FE55ED-9890-448D-B9B6-36A3574E90DB}"/>
+              </a:ext>
+            </a:extLst>
+          </p:cNvPr>
+          <p:cNvCxnSpPr>
+            <a:cxnSpLocks/>
+          </p:cNvCxnSpPr>
+          <p:nvPr/>
+        </p:nvCxnSpPr>
+        <p:spPr>
+          <a:xfrm>
+            <a:off x="80211" y="4396265"/>
+            <a:ext cx="11277600" cy="0"/>
+          </a:xfrm>
+          <a:prstGeom prst="line">
+            <a:avLst/>
+          </a:prstGeom>
+          <a:ln w="57150">
+            <a:solidFill>
+              <a:schemeClr val="bg1">
+                <a:lumMod val="50000"/>
+              </a:schemeClr>
+            </a:solidFill>
+            <a:prstDash val="sysDot"/>
+          </a:ln>
+        </p:spPr>
+        <p:style>
+          <a:lnRef idx="1">
+            <a:schemeClr val="accent1"/>
+          </a:lnRef>
+          <a:fillRef idx="0">
+            <a:schemeClr val="accent1"/>
+          </a:fillRef>
+          <a:effectRef idx="0">
+            <a:schemeClr val="accent1"/>
+          </a:effectRef>
+          <a:fontRef idx="minor">
+            <a:schemeClr val="tx1"/>
+          </a:fontRef>
+        </p:style>
+      </p:cxnSp>
+      <p:sp>
+        <p:nvSpPr>
+          <p:cNvPr id="23" name="TextBox 22">
+            <a:extLst>
+              <a:ext uri="{FF2B5EF4-FFF2-40B4-BE49-F238E27FC236}">
+                <a16:creationId xmlns:a16="http://schemas.microsoft.com/office/drawing/2014/main" id="{06F8B482-C37F-4E4C-9FB0-942BA9C3D5D1}"/>
+              </a:ext>
+            </a:extLst>
+          </p:cNvPr>
+          <p:cNvSpPr txBox="1"/>
+          <p:nvPr/>
+        </p:nvSpPr>
+        <p:spPr>
+          <a:xfrm>
+            <a:off x="972739" y="154144"/>
+            <a:ext cx="1813060" cy="461665"/>
+          </a:xfrm>
+          <a:prstGeom prst="rect">
+            <a:avLst/>
+          </a:prstGeom>
+          <a:noFill/>
+        </p:spPr>
+        <p:txBody>
+          <a:bodyPr wrap="none" rtlCol="0">
+            <a:spAutoFit/>
+          </a:bodyPr>
+          <a:lstStyle/>
+          <a:p>
+            <a:r>
+              <a:rPr lang="en-US" sz="2400" b="1" dirty="0"/>
+              <a:t>Grandparent</a:t>
+            </a:r>
+            <a:endParaRPr lang="en-GB" sz="2400" b="1" dirty="0"/>
+          </a:p>
+        </p:txBody>
+      </p:sp>
+      <p:sp>
+        <p:nvSpPr>
+          <p:cNvPr id="24" name="TextBox 23">
+            <a:extLst>
+              <a:ext uri="{FF2B5EF4-FFF2-40B4-BE49-F238E27FC236}">
+                <a16:creationId xmlns:a16="http://schemas.microsoft.com/office/drawing/2014/main" id="{2B1D7642-1297-4FF4-AC1C-9E90A1648238}"/>
+              </a:ext>
+            </a:extLst>
+          </p:cNvPr>
+          <p:cNvSpPr txBox="1"/>
+          <p:nvPr/>
+        </p:nvSpPr>
+        <p:spPr>
+          <a:xfrm>
+            <a:off x="949408" y="1719159"/>
+            <a:ext cx="1025089" cy="461665"/>
+          </a:xfrm>
+          <a:prstGeom prst="rect">
+            <a:avLst/>
+          </a:prstGeom>
+          <a:noFill/>
+        </p:spPr>
+        <p:txBody>
+          <a:bodyPr wrap="none" rtlCol="0">
+            <a:spAutoFit/>
+          </a:bodyPr>
+          <a:lstStyle/>
+          <a:p>
+            <a:r>
+              <a:rPr lang="en-US" sz="2400" b="1" dirty="0"/>
+              <a:t>Parent</a:t>
+            </a:r>
+            <a:endParaRPr lang="en-GB" sz="2400" b="1" dirty="0"/>
+          </a:p>
+        </p:txBody>
+      </p:sp>
+      <p:sp>
+        <p:nvSpPr>
+          <p:cNvPr id="25" name="TextBox 24">
+            <a:extLst>
+              <a:ext uri="{FF2B5EF4-FFF2-40B4-BE49-F238E27FC236}">
+                <a16:creationId xmlns:a16="http://schemas.microsoft.com/office/drawing/2014/main" id="{6B7827E1-5A9B-4381-BD48-FF1E8075FB93}"/>
+              </a:ext>
+            </a:extLst>
+          </p:cNvPr>
+          <p:cNvSpPr txBox="1"/>
+          <p:nvPr/>
+        </p:nvSpPr>
+        <p:spPr>
+          <a:xfrm>
+            <a:off x="950090" y="4550797"/>
+            <a:ext cx="829073" cy="461665"/>
+          </a:xfrm>
+          <a:prstGeom prst="rect">
+            <a:avLst/>
+          </a:prstGeom>
+          <a:noFill/>
+        </p:spPr>
+        <p:txBody>
+          <a:bodyPr wrap="none" rtlCol="0">
+            <a:spAutoFit/>
+          </a:bodyPr>
+          <a:lstStyle/>
+          <a:p>
+            <a:r>
+              <a:rPr lang="en-US" sz="2400" b="1" dirty="0"/>
+              <a:t>Child</a:t>
+            </a:r>
+            <a:endParaRPr lang="en-GB" sz="2400" b="1" dirty="0"/>
+          </a:p>
+        </p:txBody>
+      </p:sp>
+      <p:sp>
+        <p:nvSpPr>
+          <p:cNvPr id="6" name="TextBox 5">
+            <a:extLst>
+              <a:ext uri="{FF2B5EF4-FFF2-40B4-BE49-F238E27FC236}">
+                <a16:creationId xmlns:a16="http://schemas.microsoft.com/office/drawing/2014/main" id="{17F8A168-3F01-42AA-ACD1-52226D338250}"/>
+              </a:ext>
+            </a:extLst>
+          </p:cNvPr>
+          <p:cNvSpPr txBox="1"/>
+          <p:nvPr/>
+        </p:nvSpPr>
+        <p:spPr>
+          <a:xfrm>
+            <a:off x="11380289" y="31562"/>
+            <a:ext cx="588623" cy="369332"/>
+          </a:xfrm>
+          <a:prstGeom prst="rect">
+            <a:avLst/>
+          </a:prstGeom>
+          <a:noFill/>
+        </p:spPr>
+        <p:txBody>
+          <a:bodyPr wrap="none" rtlCol="0">
+            <a:spAutoFit/>
+          </a:bodyPr>
+          <a:lstStyle/>
+          <a:p>
+            <a:r>
+              <a:rPr lang="en-GB" b="1" dirty="0"/>
+              <a:t>v1.1</a:t>
+            </a:r>
+          </a:p>
+        </p:txBody>
+      </p:sp>
+      <p:pic>
+        <p:nvPicPr>
+          <p:cNvPr id="5" name="Picture 4" descr="A screenshot of a cell phone&#10;&#10;Description automatically generated">
+            <a:extLst>
+              <a:ext uri="{FF2B5EF4-FFF2-40B4-BE49-F238E27FC236}">
+                <a16:creationId xmlns:a16="http://schemas.microsoft.com/office/drawing/2014/main" id="{9D5DA8E3-64DB-4086-90D5-4957AE971C73}"/>
+              </a:ext>
+            </a:extLst>
+          </p:cNvPr>
+          <p:cNvPicPr>
+            <a:picLocks noChangeAspect="1"/>
+          </p:cNvPicPr>
+          <p:nvPr/>
+        </p:nvPicPr>
+        <p:blipFill>
+          <a:blip r:embed="rId5">
+            <a:extLst>
+              <a:ext uri="{28A0092B-C50C-407E-A947-70E740481C1C}">
+                <a14:useLocalDpi xmlns:a14="http://schemas.microsoft.com/office/drawing/2010/main" val="0"/>
+              </a:ext>
+            </a:extLst>
+          </a:blip>
+          <a:stretch>
+            <a:fillRect/>
+          </a:stretch>
+        </p:blipFill>
+        <p:spPr>
+          <a:xfrm>
+            <a:off x="3012346" y="32795"/>
+            <a:ext cx="6699512" cy="1527060"/>
+          </a:xfrm>
+          <a:prstGeom prst="rect">
+            <a:avLst/>
+          </a:prstGeom>
+        </p:spPr>
+      </p:pic>
+      <p:pic>
+        <p:nvPicPr>
+          <p:cNvPr id="7" name="Picture 6">
+            <a:extLst>
+              <a:ext uri="{FF2B5EF4-FFF2-40B4-BE49-F238E27FC236}">
+                <a16:creationId xmlns:a16="http://schemas.microsoft.com/office/drawing/2014/main" id="{658E3D45-1C71-4F20-9610-695B461E2222}"/>
+              </a:ext>
+            </a:extLst>
+          </p:cNvPr>
+          <p:cNvPicPr>
+            <a:picLocks noChangeAspect="1"/>
+          </p:cNvPicPr>
+          <p:nvPr/>
+        </p:nvPicPr>
+        <p:blipFill>
+          <a:blip r:embed="rId6"/>
+          <a:stretch>
+            <a:fillRect/>
+          </a:stretch>
+        </p:blipFill>
+        <p:spPr>
+          <a:xfrm>
+            <a:off x="2621035" y="1745746"/>
+            <a:ext cx="5909106" cy="2202766"/>
+          </a:xfrm>
+          <a:prstGeom prst="rect">
+            <a:avLst/>
+          </a:prstGeom>
+        </p:spPr>
+      </p:pic>
+      <p:sp>
+        <p:nvSpPr>
+          <p:cNvPr id="15" name="Left Brace 14">
+            <a:extLst>
+              <a:ext uri="{FF2B5EF4-FFF2-40B4-BE49-F238E27FC236}">
+                <a16:creationId xmlns:a16="http://schemas.microsoft.com/office/drawing/2014/main" id="{E4F55F19-6D3D-40FC-9579-C24CDFA3E5B6}"/>
+              </a:ext>
+            </a:extLst>
+          </p:cNvPr>
+          <p:cNvSpPr/>
+          <p:nvPr/>
+        </p:nvSpPr>
+        <p:spPr>
+          <a:xfrm rot="5400000">
+            <a:off x="7026584" y="1916607"/>
+            <a:ext cx="508102" cy="3245571"/>
+          </a:xfrm>
+          <a:prstGeom prst="leftBrace">
+            <a:avLst>
+              <a:gd name="adj1" fmla="val 8333"/>
+              <a:gd name="adj2" fmla="val 83094"/>
+            </a:avLst>
+          </a:prstGeom>
+          <a:ln w="38100">
+            <a:solidFill>
+              <a:schemeClr val="accent4"/>
+            </a:solidFill>
+          </a:ln>
+        </p:spPr>
+        <p:style>
+          <a:lnRef idx="1">
+            <a:schemeClr val="accent1"/>
+          </a:lnRef>
+          <a:fillRef idx="0">
+            <a:schemeClr val="accent1"/>
+          </a:fillRef>
+          <a:effectRef idx="0">
+            <a:schemeClr val="accent1"/>
+          </a:effectRef>
+          <a:fontRef idx="minor">
+            <a:schemeClr val="tx1"/>
+          </a:fontRef>
+        </p:style>
+        <p:txBody>
+          <a:bodyPr rtlCol="0" anchor="ctr"/>
+          <a:lstStyle/>
+          <a:p>
+            <a:pPr algn="ctr"/>
+            <a:endParaRPr lang="en-GB" dirty="0"/>
+          </a:p>
+        </p:txBody>
+      </p:sp>
+      <p:pic>
+        <p:nvPicPr>
+          <p:cNvPr id="9" name="Picture 8" descr="A screenshot of a cell phone&#10;&#10;Description automatically generated">
+            <a:extLst>
+              <a:ext uri="{FF2B5EF4-FFF2-40B4-BE49-F238E27FC236}">
+                <a16:creationId xmlns:a16="http://schemas.microsoft.com/office/drawing/2014/main" id="{07FC1643-C668-4E3F-A395-738D92D66D85}"/>
+              </a:ext>
+            </a:extLst>
+          </p:cNvPr>
+          <p:cNvPicPr>
+            <a:picLocks noChangeAspect="1"/>
+          </p:cNvPicPr>
+          <p:nvPr/>
+        </p:nvPicPr>
+        <p:blipFill>
+          <a:blip r:embed="rId7">
+            <a:extLst>
+              <a:ext uri="{28A0092B-C50C-407E-A947-70E740481C1C}">
+                <a14:useLocalDpi xmlns:a14="http://schemas.microsoft.com/office/drawing/2010/main" val="0"/>
+              </a:ext>
+            </a:extLst>
+          </a:blip>
+          <a:stretch>
+            <a:fillRect/>
+          </a:stretch>
+        </p:blipFill>
+        <p:spPr>
+          <a:xfrm>
+            <a:off x="5719011" y="3597240"/>
+            <a:ext cx="3164539" cy="656792"/>
+          </a:xfrm>
+          <a:prstGeom prst="rect">
+            <a:avLst/>
+          </a:prstGeom>
+        </p:spPr>
+      </p:pic>
+      <p:pic>
+        <p:nvPicPr>
+          <p:cNvPr id="11" name="Picture 10">
+            <a:extLst>
+              <a:ext uri="{FF2B5EF4-FFF2-40B4-BE49-F238E27FC236}">
+                <a16:creationId xmlns:a16="http://schemas.microsoft.com/office/drawing/2014/main" id="{932CABC6-C89F-4168-9E0F-B51EF565030E}"/>
+              </a:ext>
+            </a:extLst>
+          </p:cNvPr>
+          <p:cNvPicPr>
+            <a:picLocks noChangeAspect="1"/>
+          </p:cNvPicPr>
+          <p:nvPr/>
+        </p:nvPicPr>
+        <p:blipFill>
+          <a:blip r:embed="rId8"/>
+          <a:stretch>
+            <a:fillRect/>
+          </a:stretch>
+        </p:blipFill>
+        <p:spPr>
+          <a:xfrm>
+            <a:off x="5995392" y="4617658"/>
+            <a:ext cx="4360822" cy="953930"/>
+          </a:xfrm>
+          <a:prstGeom prst="rect">
+            <a:avLst/>
+          </a:prstGeom>
+        </p:spPr>
+      </p:pic>
+      <p:pic>
+        <p:nvPicPr>
+          <p:cNvPr id="13" name="Picture 12">
+            <a:extLst>
+              <a:ext uri="{FF2B5EF4-FFF2-40B4-BE49-F238E27FC236}">
+                <a16:creationId xmlns:a16="http://schemas.microsoft.com/office/drawing/2014/main" id="{8368042C-E687-48AF-A57E-545C047CDB31}"/>
+              </a:ext>
+            </a:extLst>
+          </p:cNvPr>
+          <p:cNvPicPr>
+            <a:picLocks noChangeAspect="1"/>
+          </p:cNvPicPr>
+          <p:nvPr/>
+        </p:nvPicPr>
+        <p:blipFill>
+          <a:blip r:embed="rId9"/>
+          <a:stretch>
+            <a:fillRect/>
+          </a:stretch>
+        </p:blipFill>
+        <p:spPr>
+          <a:xfrm>
+            <a:off x="7576159" y="5902106"/>
+            <a:ext cx="4271396" cy="2132677"/>
+          </a:xfrm>
+          <a:prstGeom prst="rect">
+            <a:avLst/>
+          </a:prstGeom>
+        </p:spPr>
+      </p:pic>
+      <p:sp>
+        <p:nvSpPr>
+          <p:cNvPr id="26" name="Left Brace 25">
+            <a:extLst>
+              <a:ext uri="{FF2B5EF4-FFF2-40B4-BE49-F238E27FC236}">
+                <a16:creationId xmlns:a16="http://schemas.microsoft.com/office/drawing/2014/main" id="{BFEB9A75-8F72-4342-9B37-CDA035FC48E7}"/>
+              </a:ext>
+            </a:extLst>
+          </p:cNvPr>
+          <p:cNvSpPr/>
+          <p:nvPr/>
+        </p:nvSpPr>
+        <p:spPr>
+          <a:xfrm rot="5400000">
+            <a:off x="10474817" y="6889729"/>
+            <a:ext cx="669973" cy="2318216"/>
+          </a:xfrm>
+          <a:prstGeom prst="leftBrace">
+            <a:avLst>
+              <a:gd name="adj1" fmla="val 8333"/>
+              <a:gd name="adj2" fmla="val 33684"/>
+            </a:avLst>
+          </a:prstGeom>
+          <a:ln w="38100">
+            <a:solidFill>
+              <a:schemeClr val="accent4"/>
+            </a:solidFill>
+          </a:ln>
+        </p:spPr>
+        <p:style>
+          <a:lnRef idx="1">
+            <a:schemeClr val="accent1"/>
+          </a:lnRef>
+          <a:fillRef idx="0">
+            <a:schemeClr val="accent1"/>
+          </a:fillRef>
+          <a:effectRef idx="0">
+            <a:schemeClr val="accent1"/>
+          </a:effectRef>
+          <a:fontRef idx="minor">
+            <a:schemeClr val="tx1"/>
+          </a:fontRef>
+        </p:style>
+        <p:txBody>
+          <a:bodyPr rtlCol="0" anchor="ctr"/>
+          <a:lstStyle/>
+          <a:p>
+            <a:pPr algn="ctr"/>
+            <a:endParaRPr lang="en-GB" dirty="0"/>
+          </a:p>
+        </p:txBody>
+      </p:sp>
+      <p:pic>
+        <p:nvPicPr>
+          <p:cNvPr id="16" name="Picture 15">
+            <a:extLst>
+              <a:ext uri="{FF2B5EF4-FFF2-40B4-BE49-F238E27FC236}">
+                <a16:creationId xmlns:a16="http://schemas.microsoft.com/office/drawing/2014/main" id="{F24BA0AF-BC82-4B39-B34F-61FA814CDF4F}"/>
+              </a:ext>
+            </a:extLst>
+          </p:cNvPr>
+          <p:cNvPicPr>
+            <a:picLocks noChangeAspect="1"/>
+          </p:cNvPicPr>
+          <p:nvPr/>
+        </p:nvPicPr>
+        <p:blipFill>
+          <a:blip r:embed="rId10"/>
+          <a:stretch>
+            <a:fillRect/>
+          </a:stretch>
+        </p:blipFill>
+        <p:spPr>
+          <a:xfrm>
+            <a:off x="10637023" y="8155443"/>
+            <a:ext cx="1281782" cy="628684"/>
+          </a:xfrm>
+          <a:prstGeom prst="rect">
+            <a:avLst/>
+          </a:prstGeom>
+        </p:spPr>
+      </p:pic>
+      <p:pic>
+        <p:nvPicPr>
+          <p:cNvPr id="21" name="Picture 20">
+            <a:extLst>
+              <a:ext uri="{FF2B5EF4-FFF2-40B4-BE49-F238E27FC236}">
+                <a16:creationId xmlns:a16="http://schemas.microsoft.com/office/drawing/2014/main" id="{E4C2318B-2360-42D0-9299-8909E272F9B4}"/>
+              </a:ext>
+            </a:extLst>
+          </p:cNvPr>
+          <p:cNvPicPr>
+            <a:picLocks noChangeAspect="1"/>
+          </p:cNvPicPr>
+          <p:nvPr/>
+        </p:nvPicPr>
+        <p:blipFill>
+          <a:blip r:embed="rId11"/>
+          <a:stretch>
+            <a:fillRect/>
+          </a:stretch>
+        </p:blipFill>
+        <p:spPr>
+          <a:xfrm>
+            <a:off x="10644879" y="8808497"/>
+            <a:ext cx="1271547" cy="626469"/>
+          </a:xfrm>
+          <a:prstGeom prst="rect">
+            <a:avLst/>
+          </a:prstGeom>
+        </p:spPr>
+      </p:pic>
+      <p:pic>
+        <p:nvPicPr>
+          <p:cNvPr id="22" name="Picture 21">
+            <a:extLst>
+              <a:ext uri="{FF2B5EF4-FFF2-40B4-BE49-F238E27FC236}">
+                <a16:creationId xmlns:a16="http://schemas.microsoft.com/office/drawing/2014/main" id="{363DAB9F-0C05-4E7F-85D5-DC404795DA15}"/>
+              </a:ext>
+            </a:extLst>
+          </p:cNvPr>
+          <p:cNvPicPr>
+            <a:picLocks noChangeAspect="1"/>
+          </p:cNvPicPr>
+          <p:nvPr/>
+        </p:nvPicPr>
+        <p:blipFill>
+          <a:blip r:embed="rId12"/>
+          <a:stretch>
+            <a:fillRect/>
+          </a:stretch>
+        </p:blipFill>
+        <p:spPr>
+          <a:xfrm>
+            <a:off x="10613273" y="9460793"/>
+            <a:ext cx="1295931" cy="626469"/>
+          </a:xfrm>
+          <a:prstGeom prst="rect">
+            <a:avLst/>
+          </a:prstGeom>
+        </p:spPr>
+      </p:pic>
+      <p:sp>
+        <p:nvSpPr>
+          <p:cNvPr id="27" name="TextBox 26">
+            <a:extLst>
+              <a:ext uri="{FF2B5EF4-FFF2-40B4-BE49-F238E27FC236}">
+                <a16:creationId xmlns:a16="http://schemas.microsoft.com/office/drawing/2014/main" id="{7D5378B2-2ACB-40F2-81F0-5133D5E3A132}"/>
+              </a:ext>
+            </a:extLst>
+          </p:cNvPr>
+          <p:cNvSpPr txBox="1"/>
+          <p:nvPr/>
+        </p:nvSpPr>
+        <p:spPr>
+          <a:xfrm>
+            <a:off x="9655647" y="8285119"/>
+            <a:ext cx="994183" cy="369332"/>
+          </a:xfrm>
+          <a:prstGeom prst="rect">
+            <a:avLst/>
+          </a:prstGeom>
+          <a:noFill/>
+        </p:spPr>
+        <p:txBody>
+          <a:bodyPr wrap="none" rtlCol="0">
+            <a:spAutoFit/>
+          </a:bodyPr>
+          <a:lstStyle/>
+          <a:p>
+            <a:r>
+              <a:rPr lang="en-GB" dirty="0"/>
+              <a:t>@{Case}</a:t>
+            </a:r>
+          </a:p>
+        </p:txBody>
+      </p:sp>
+    </p:spTree>
+    <p:extLst>
+      <p:ext uri="{BB962C8B-B14F-4D97-AF65-F5344CB8AC3E}">
+        <p14:creationId xmlns:p14="http://schemas.microsoft.com/office/powerpoint/2010/main" val="2841542088"/>
+      </p:ext>
+    </p:extLst>
+  </p:cSld>
+  <p:clrMapOvr>
+    <a:masterClrMapping/>
+  </p:clrMapOvr>
+</p:sld>
+</file>
+
 <file path=ppt/theme/theme1.xml><?xml version="1.0" encoding="utf-8"?>
 <a:theme xmlns:a="http://schemas.openxmlformats.org/drawingml/2006/main" name="Office Theme">
   <a:themeElements>

</xml_diff>

<commit_message>
Final pre release checks and tweaks.
</commit_message>
<xml_diff>
--- a/Images/All ADF Activities.pptx
+++ b/Images/All ADF Activities.pptx
@@ -8,6 +8,7 @@
     <p:sldId id="257" r:id="rId2"/>
     <p:sldId id="258" r:id="rId3"/>
     <p:sldId id="259" r:id="rId4"/>
+    <p:sldId id="260" r:id="rId5"/>
   </p:sldIdLst>
   <p:sldSz cx="12192000" cy="10799763"/>
   <p:notesSz cx="6858000" cy="9144000"/>
@@ -245,7 +246,7 @@
           <a:p>
             <a:fld id="{1F80DB50-5271-4B1A-976D-0A7715B55622}" type="datetimeFigureOut">
               <a:rPr lang="en-GB" smtClean="0"/>
-              <a:t>19/03/2020</a:t>
+              <a:t>24/03/2020</a:t>
             </a:fld>
             <a:endParaRPr lang="en-GB"/>
           </a:p>
@@ -415,7 +416,7 @@
           <a:p>
             <a:fld id="{1F80DB50-5271-4B1A-976D-0A7715B55622}" type="datetimeFigureOut">
               <a:rPr lang="en-GB" smtClean="0"/>
-              <a:t>19/03/2020</a:t>
+              <a:t>24/03/2020</a:t>
             </a:fld>
             <a:endParaRPr lang="en-GB"/>
           </a:p>
@@ -595,7 +596,7 @@
           <a:p>
             <a:fld id="{1F80DB50-5271-4B1A-976D-0A7715B55622}" type="datetimeFigureOut">
               <a:rPr lang="en-GB" smtClean="0"/>
-              <a:t>19/03/2020</a:t>
+              <a:t>24/03/2020</a:t>
             </a:fld>
             <a:endParaRPr lang="en-GB"/>
           </a:p>
@@ -765,7 +766,7 @@
           <a:p>
             <a:fld id="{1F80DB50-5271-4B1A-976D-0A7715B55622}" type="datetimeFigureOut">
               <a:rPr lang="en-GB" smtClean="0"/>
-              <a:t>19/03/2020</a:t>
+              <a:t>24/03/2020</a:t>
             </a:fld>
             <a:endParaRPr lang="en-GB"/>
           </a:p>
@@ -1009,7 +1010,7 @@
           <a:p>
             <a:fld id="{1F80DB50-5271-4B1A-976D-0A7715B55622}" type="datetimeFigureOut">
               <a:rPr lang="en-GB" smtClean="0"/>
-              <a:t>19/03/2020</a:t>
+              <a:t>24/03/2020</a:t>
             </a:fld>
             <a:endParaRPr lang="en-GB"/>
           </a:p>
@@ -1241,7 +1242,7 @@
           <a:p>
             <a:fld id="{1F80DB50-5271-4B1A-976D-0A7715B55622}" type="datetimeFigureOut">
               <a:rPr lang="en-GB" smtClean="0"/>
-              <a:t>19/03/2020</a:t>
+              <a:t>24/03/2020</a:t>
             </a:fld>
             <a:endParaRPr lang="en-GB"/>
           </a:p>
@@ -1608,7 +1609,7 @@
           <a:p>
             <a:fld id="{1F80DB50-5271-4B1A-976D-0A7715B55622}" type="datetimeFigureOut">
               <a:rPr lang="en-GB" smtClean="0"/>
-              <a:t>19/03/2020</a:t>
+              <a:t>24/03/2020</a:t>
             </a:fld>
             <a:endParaRPr lang="en-GB"/>
           </a:p>
@@ -1726,7 +1727,7 @@
           <a:p>
             <a:fld id="{1F80DB50-5271-4B1A-976D-0A7715B55622}" type="datetimeFigureOut">
               <a:rPr lang="en-GB" smtClean="0"/>
-              <a:t>19/03/2020</a:t>
+              <a:t>24/03/2020</a:t>
             </a:fld>
             <a:endParaRPr lang="en-GB"/>
           </a:p>
@@ -1821,7 +1822,7 @@
           <a:p>
             <a:fld id="{1F80DB50-5271-4B1A-976D-0A7715B55622}" type="datetimeFigureOut">
               <a:rPr lang="en-GB" smtClean="0"/>
-              <a:t>19/03/2020</a:t>
+              <a:t>24/03/2020</a:t>
             </a:fld>
             <a:endParaRPr lang="en-GB"/>
           </a:p>
@@ -2098,7 +2099,7 @@
           <a:p>
             <a:fld id="{1F80DB50-5271-4B1A-976D-0A7715B55622}" type="datetimeFigureOut">
               <a:rPr lang="en-GB" smtClean="0"/>
-              <a:t>19/03/2020</a:t>
+              <a:t>24/03/2020</a:t>
             </a:fld>
             <a:endParaRPr lang="en-GB"/>
           </a:p>
@@ -2355,7 +2356,7 @@
           <a:p>
             <a:fld id="{1F80DB50-5271-4B1A-976D-0A7715B55622}" type="datetimeFigureOut">
               <a:rPr lang="en-GB" smtClean="0"/>
-              <a:t>19/03/2020</a:t>
+              <a:t>24/03/2020</a:t>
             </a:fld>
             <a:endParaRPr lang="en-GB"/>
           </a:p>
@@ -2568,7 +2569,7 @@
           <a:p>
             <a:fld id="{1F80DB50-5271-4B1A-976D-0A7715B55622}" type="datetimeFigureOut">
               <a:rPr lang="en-GB" smtClean="0"/>
-              <a:t>19/03/2020</a:t>
+              <a:t>24/03/2020</a:t>
             </a:fld>
             <a:endParaRPr lang="en-GB"/>
           </a:p>
@@ -4441,168 +4442,12 @@
           <a:chExt cx="0" cy="0"/>
         </a:xfrm>
       </p:grpSpPr>
-      <p:sp>
-        <p:nvSpPr>
-          <p:cNvPr id="12" name="Left Brace 11">
-            <a:extLst>
-              <a:ext uri="{FF2B5EF4-FFF2-40B4-BE49-F238E27FC236}">
-                <a16:creationId xmlns:a16="http://schemas.microsoft.com/office/drawing/2014/main" id="{77D93561-8CDB-430E-8A88-3911DEFB7740}"/>
-              </a:ext>
-            </a:extLst>
-          </p:cNvPr>
-          <p:cNvSpPr/>
-          <p:nvPr/>
-        </p:nvSpPr>
-        <p:spPr>
-          <a:xfrm rot="5400000">
-            <a:off x="9151241" y="3583426"/>
-            <a:ext cx="669973" cy="4490358"/>
-          </a:xfrm>
-          <a:prstGeom prst="leftBrace">
-            <a:avLst>
-              <a:gd name="adj1" fmla="val 8333"/>
-              <a:gd name="adj2" fmla="val 49429"/>
-            </a:avLst>
-          </a:prstGeom>
-          <a:ln w="38100">
-            <a:solidFill>
-              <a:schemeClr val="accent4"/>
-            </a:solidFill>
-          </a:ln>
-        </p:spPr>
-        <p:style>
-          <a:lnRef idx="1">
-            <a:schemeClr val="accent1"/>
-          </a:lnRef>
-          <a:fillRef idx="0">
-            <a:schemeClr val="accent1"/>
-          </a:fillRef>
-          <a:effectRef idx="0">
-            <a:schemeClr val="accent1"/>
-          </a:effectRef>
-          <a:fontRef idx="minor">
-            <a:schemeClr val="tx1"/>
-          </a:fontRef>
-        </p:style>
-        <p:txBody>
-          <a:bodyPr rtlCol="0" anchor="ctr"/>
-          <a:lstStyle/>
-          <a:p>
-            <a:pPr algn="ctr"/>
-            <a:endParaRPr lang="en-GB" dirty="0"/>
-          </a:p>
-        </p:txBody>
-      </p:sp>
-      <p:sp>
-        <p:nvSpPr>
-          <p:cNvPr id="14" name="Left Brace 13">
-            <a:extLst>
-              <a:ext uri="{FF2B5EF4-FFF2-40B4-BE49-F238E27FC236}">
-                <a16:creationId xmlns:a16="http://schemas.microsoft.com/office/drawing/2014/main" id="{21CB80A6-2177-4740-A5FA-B2FC1E8D547F}"/>
-              </a:ext>
-            </a:extLst>
-          </p:cNvPr>
-          <p:cNvSpPr/>
-          <p:nvPr/>
-        </p:nvSpPr>
-        <p:spPr>
-          <a:xfrm rot="5400000">
-            <a:off x="5240602" y="-1462661"/>
-            <a:ext cx="669973" cy="6256206"/>
-          </a:xfrm>
-          <a:prstGeom prst="leftBrace">
-            <a:avLst>
-              <a:gd name="adj1" fmla="val 8333"/>
-              <a:gd name="adj2" fmla="val 49886"/>
-            </a:avLst>
-          </a:prstGeom>
-          <a:ln w="38100">
-            <a:solidFill>
-              <a:schemeClr val="accent4"/>
-            </a:solidFill>
-          </a:ln>
-        </p:spPr>
-        <p:style>
-          <a:lnRef idx="1">
-            <a:schemeClr val="accent1"/>
-          </a:lnRef>
-          <a:fillRef idx="0">
-            <a:schemeClr val="accent1"/>
-          </a:fillRef>
-          <a:effectRef idx="0">
-            <a:schemeClr val="accent1"/>
-          </a:effectRef>
-          <a:fontRef idx="minor">
-            <a:schemeClr val="tx1"/>
-          </a:fontRef>
-        </p:style>
-        <p:txBody>
-          <a:bodyPr rtlCol="0" anchor="ctr"/>
-          <a:lstStyle/>
-          <a:p>
-            <a:pPr algn="ctr"/>
-            <a:endParaRPr lang="en-GB" dirty="0"/>
-          </a:p>
-        </p:txBody>
-      </p:sp>
-      <p:sp>
-        <p:nvSpPr>
-          <p:cNvPr id="10" name="Left Brace 9">
-            <a:extLst>
-              <a:ext uri="{FF2B5EF4-FFF2-40B4-BE49-F238E27FC236}">
-                <a16:creationId xmlns:a16="http://schemas.microsoft.com/office/drawing/2014/main" id="{D9BAFF37-C112-4618-A993-30FC9730AEDC}"/>
-              </a:ext>
-            </a:extLst>
-          </p:cNvPr>
-          <p:cNvSpPr/>
-          <p:nvPr/>
-        </p:nvSpPr>
-        <p:spPr>
-          <a:xfrm rot="5400000">
-            <a:off x="7574721" y="2285909"/>
-            <a:ext cx="669973" cy="4490358"/>
-          </a:xfrm>
-          <a:prstGeom prst="leftBrace">
-            <a:avLst>
-              <a:gd name="adj1" fmla="val 8333"/>
-              <a:gd name="adj2" fmla="val 49886"/>
-            </a:avLst>
-          </a:prstGeom>
-          <a:ln w="38100">
-            <a:solidFill>
-              <a:schemeClr val="accent4"/>
-            </a:solidFill>
-          </a:ln>
-        </p:spPr>
-        <p:style>
-          <a:lnRef idx="1">
-            <a:schemeClr val="accent1"/>
-          </a:lnRef>
-          <a:fillRef idx="0">
-            <a:schemeClr val="accent1"/>
-          </a:fillRef>
-          <a:effectRef idx="0">
-            <a:schemeClr val="accent1"/>
-          </a:effectRef>
-          <a:fontRef idx="minor">
-            <a:schemeClr val="tx1"/>
-          </a:fontRef>
-        </p:style>
-        <p:txBody>
-          <a:bodyPr rtlCol="0" anchor="ctr"/>
-          <a:lstStyle/>
-          <a:p>
-            <a:pPr algn="ctr"/>
-            <a:endParaRPr lang="en-GB" dirty="0"/>
-          </a:p>
-        </p:txBody>
-      </p:sp>
       <p:pic>
         <p:nvPicPr>
-          <p:cNvPr id="2" name="Picture 1">
-            <a:extLst>
-              <a:ext uri="{FF2B5EF4-FFF2-40B4-BE49-F238E27FC236}">
-                <a16:creationId xmlns:a16="http://schemas.microsoft.com/office/drawing/2014/main" id="{36CE73C9-BA77-4ECA-AA16-858684EEB8DD}"/>
+          <p:cNvPr id="20" name="Picture 19">
+            <a:extLst>
+              <a:ext uri="{FF2B5EF4-FFF2-40B4-BE49-F238E27FC236}">
+                <a16:creationId xmlns:a16="http://schemas.microsoft.com/office/drawing/2014/main" id="{748369A8-B672-4FC8-BC99-62C0A9FE1EB6}"/>
               </a:ext>
             </a:extLst>
           </p:cNvPr>
@@ -4619,68 +4464,8 @@
         </p:blipFill>
         <p:spPr>
           <a:xfrm>
-            <a:off x="80211" y="89075"/>
-            <a:ext cx="892528" cy="579404"/>
-          </a:xfrm>
-          <a:prstGeom prst="rect">
-            <a:avLst/>
-          </a:prstGeom>
-        </p:spPr>
-      </p:pic>
-      <p:pic>
-        <p:nvPicPr>
-          <p:cNvPr id="3" name="Picture 2">
-            <a:extLst>
-              <a:ext uri="{FF2B5EF4-FFF2-40B4-BE49-F238E27FC236}">
-                <a16:creationId xmlns:a16="http://schemas.microsoft.com/office/drawing/2014/main" id="{BAC2FA6D-7E44-4A70-ABBF-441AC58C61D8}"/>
-              </a:ext>
-            </a:extLst>
-          </p:cNvPr>
-          <p:cNvPicPr>
-            <a:picLocks noChangeAspect="1"/>
-          </p:cNvPicPr>
-          <p:nvPr/>
-        </p:nvPicPr>
-        <p:blipFill>
-          <a:blip r:embed="rId3"/>
-          <a:stretch>
-            <a:fillRect/>
-          </a:stretch>
-        </p:blipFill>
-        <p:spPr>
-          <a:xfrm>
-            <a:off x="80211" y="1656591"/>
-            <a:ext cx="892528" cy="586800"/>
-          </a:xfrm>
-          <a:prstGeom prst="rect">
-            <a:avLst/>
-          </a:prstGeom>
-        </p:spPr>
-      </p:pic>
-      <p:pic>
-        <p:nvPicPr>
-          <p:cNvPr id="4" name="Picture 3">
-            <a:extLst>
-              <a:ext uri="{FF2B5EF4-FFF2-40B4-BE49-F238E27FC236}">
-                <a16:creationId xmlns:a16="http://schemas.microsoft.com/office/drawing/2014/main" id="{FB95A457-1250-418F-8752-3AD3D6CA1CBF}"/>
-              </a:ext>
-            </a:extLst>
-          </p:cNvPr>
-          <p:cNvPicPr>
-            <a:picLocks noChangeAspect="1"/>
-          </p:cNvPicPr>
-          <p:nvPr/>
-        </p:nvPicPr>
-        <p:blipFill>
-          <a:blip r:embed="rId4"/>
-          <a:stretch>
-            <a:fillRect/>
-          </a:stretch>
-        </p:blipFill>
-        <p:spPr>
-          <a:xfrm>
-            <a:off x="80211" y="4488229"/>
-            <a:ext cx="892528" cy="586800"/>
+            <a:off x="6495504" y="5986272"/>
+            <a:ext cx="5565716" cy="2227507"/>
           </a:xfrm>
           <a:prstGeom prst="rect">
             <a:avLst/>
@@ -4703,7 +4488,7 @@
         </p:nvCxnSpPr>
         <p:spPr>
           <a:xfrm>
-            <a:off x="80211" y="1591940"/>
+            <a:off x="80211" y="1603815"/>
             <a:ext cx="12111789" cy="0"/>
           </a:xfrm>
           <a:prstGeom prst="line">
@@ -4749,7 +4534,7 @@
         </p:nvCxnSpPr>
         <p:spPr>
           <a:xfrm>
-            <a:off x="80211" y="4396265"/>
+            <a:off x="80211" y="4467515"/>
             <a:ext cx="12111789" cy="0"/>
           </a:xfrm>
           <a:prstGeom prst="line">
@@ -4781,6 +4566,252 @@
       </p:cxnSp>
       <p:sp>
         <p:nvSpPr>
+          <p:cNvPr id="12" name="Left Brace 11">
+            <a:extLst>
+              <a:ext uri="{FF2B5EF4-FFF2-40B4-BE49-F238E27FC236}">
+                <a16:creationId xmlns:a16="http://schemas.microsoft.com/office/drawing/2014/main" id="{77D93561-8CDB-430E-8A88-3911DEFB7740}"/>
+              </a:ext>
+            </a:extLst>
+          </p:cNvPr>
+          <p:cNvSpPr/>
+          <p:nvPr/>
+        </p:nvSpPr>
+        <p:spPr>
+          <a:xfrm rot="5400000">
+            <a:off x="8938190" y="3012702"/>
+            <a:ext cx="669973" cy="5774307"/>
+          </a:xfrm>
+          <a:prstGeom prst="leftBrace">
+            <a:avLst>
+              <a:gd name="adj1" fmla="val 8333"/>
+              <a:gd name="adj2" fmla="val 46961"/>
+            </a:avLst>
+          </a:prstGeom>
+          <a:ln w="38100">
+            <a:solidFill>
+              <a:schemeClr val="accent4"/>
+            </a:solidFill>
+          </a:ln>
+        </p:spPr>
+        <p:style>
+          <a:lnRef idx="1">
+            <a:schemeClr val="accent1"/>
+          </a:lnRef>
+          <a:fillRef idx="0">
+            <a:schemeClr val="accent1"/>
+          </a:fillRef>
+          <a:effectRef idx="0">
+            <a:schemeClr val="accent1"/>
+          </a:effectRef>
+          <a:fontRef idx="minor">
+            <a:schemeClr val="tx1"/>
+          </a:fontRef>
+        </p:style>
+        <p:txBody>
+          <a:bodyPr rtlCol="0" anchor="ctr"/>
+          <a:lstStyle/>
+          <a:p>
+            <a:pPr algn="ctr"/>
+            <a:endParaRPr lang="en-GB" dirty="0"/>
+          </a:p>
+        </p:txBody>
+      </p:sp>
+      <p:sp>
+        <p:nvSpPr>
+          <p:cNvPr id="14" name="Left Brace 13">
+            <a:extLst>
+              <a:ext uri="{FF2B5EF4-FFF2-40B4-BE49-F238E27FC236}">
+                <a16:creationId xmlns:a16="http://schemas.microsoft.com/office/drawing/2014/main" id="{21CB80A6-2177-4740-A5FA-B2FC1E8D547F}"/>
+              </a:ext>
+            </a:extLst>
+          </p:cNvPr>
+          <p:cNvSpPr/>
+          <p:nvPr/>
+        </p:nvSpPr>
+        <p:spPr>
+          <a:xfrm rot="5400000">
+            <a:off x="5240602" y="-1403286"/>
+            <a:ext cx="669973" cy="6256206"/>
+          </a:xfrm>
+          <a:prstGeom prst="leftBrace">
+            <a:avLst>
+              <a:gd name="adj1" fmla="val 8333"/>
+              <a:gd name="adj2" fmla="val 49886"/>
+            </a:avLst>
+          </a:prstGeom>
+          <a:ln w="38100">
+            <a:solidFill>
+              <a:schemeClr val="accent4"/>
+            </a:solidFill>
+          </a:ln>
+        </p:spPr>
+        <p:style>
+          <a:lnRef idx="1">
+            <a:schemeClr val="accent1"/>
+          </a:lnRef>
+          <a:fillRef idx="0">
+            <a:schemeClr val="accent1"/>
+          </a:fillRef>
+          <a:effectRef idx="0">
+            <a:schemeClr val="accent1"/>
+          </a:effectRef>
+          <a:fontRef idx="minor">
+            <a:schemeClr val="tx1"/>
+          </a:fontRef>
+        </p:style>
+        <p:txBody>
+          <a:bodyPr rtlCol="0" anchor="ctr"/>
+          <a:lstStyle/>
+          <a:p>
+            <a:pPr algn="ctr"/>
+            <a:endParaRPr lang="en-GB" dirty="0"/>
+          </a:p>
+        </p:txBody>
+      </p:sp>
+      <p:sp>
+        <p:nvSpPr>
+          <p:cNvPr id="10" name="Left Brace 9">
+            <a:extLst>
+              <a:ext uri="{FF2B5EF4-FFF2-40B4-BE49-F238E27FC236}">
+                <a16:creationId xmlns:a16="http://schemas.microsoft.com/office/drawing/2014/main" id="{D9BAFF37-C112-4618-A993-30FC9730AEDC}"/>
+              </a:ext>
+            </a:extLst>
+          </p:cNvPr>
+          <p:cNvSpPr/>
+          <p:nvPr/>
+        </p:nvSpPr>
+        <p:spPr>
+          <a:xfrm rot="5400000">
+            <a:off x="8378418" y="3129980"/>
+            <a:ext cx="669973" cy="2944717"/>
+          </a:xfrm>
+          <a:prstGeom prst="leftBrace">
+            <a:avLst>
+              <a:gd name="adj1" fmla="val 8333"/>
+              <a:gd name="adj2" fmla="val 24210"/>
+            </a:avLst>
+          </a:prstGeom>
+          <a:ln w="38100">
+            <a:solidFill>
+              <a:schemeClr val="accent4"/>
+            </a:solidFill>
+          </a:ln>
+        </p:spPr>
+        <p:style>
+          <a:lnRef idx="1">
+            <a:schemeClr val="accent1"/>
+          </a:lnRef>
+          <a:fillRef idx="0">
+            <a:schemeClr val="accent1"/>
+          </a:fillRef>
+          <a:effectRef idx="0">
+            <a:schemeClr val="accent1"/>
+          </a:effectRef>
+          <a:fontRef idx="minor">
+            <a:schemeClr val="tx1"/>
+          </a:fontRef>
+        </p:style>
+        <p:txBody>
+          <a:bodyPr rtlCol="0" anchor="ctr"/>
+          <a:lstStyle/>
+          <a:p>
+            <a:pPr algn="ctr"/>
+            <a:endParaRPr lang="en-GB" dirty="0"/>
+          </a:p>
+        </p:txBody>
+      </p:sp>
+      <p:pic>
+        <p:nvPicPr>
+          <p:cNvPr id="2" name="Picture 1">
+            <a:extLst>
+              <a:ext uri="{FF2B5EF4-FFF2-40B4-BE49-F238E27FC236}">
+                <a16:creationId xmlns:a16="http://schemas.microsoft.com/office/drawing/2014/main" id="{36CE73C9-BA77-4ECA-AA16-858684EEB8DD}"/>
+              </a:ext>
+            </a:extLst>
+          </p:cNvPr>
+          <p:cNvPicPr>
+            <a:picLocks noChangeAspect="1"/>
+          </p:cNvPicPr>
+          <p:nvPr/>
+        </p:nvPicPr>
+        <p:blipFill>
+          <a:blip r:embed="rId3"/>
+          <a:stretch>
+            <a:fillRect/>
+          </a:stretch>
+        </p:blipFill>
+        <p:spPr>
+          <a:xfrm>
+            <a:off x="80211" y="89075"/>
+            <a:ext cx="892528" cy="579404"/>
+          </a:xfrm>
+          <a:prstGeom prst="rect">
+            <a:avLst/>
+          </a:prstGeom>
+        </p:spPr>
+      </p:pic>
+      <p:pic>
+        <p:nvPicPr>
+          <p:cNvPr id="3" name="Picture 2">
+            <a:extLst>
+              <a:ext uri="{FF2B5EF4-FFF2-40B4-BE49-F238E27FC236}">
+                <a16:creationId xmlns:a16="http://schemas.microsoft.com/office/drawing/2014/main" id="{BAC2FA6D-7E44-4A70-ABBF-441AC58C61D8}"/>
+              </a:ext>
+            </a:extLst>
+          </p:cNvPr>
+          <p:cNvPicPr>
+            <a:picLocks noChangeAspect="1"/>
+          </p:cNvPicPr>
+          <p:nvPr/>
+        </p:nvPicPr>
+        <p:blipFill>
+          <a:blip r:embed="rId4"/>
+          <a:stretch>
+            <a:fillRect/>
+          </a:stretch>
+        </p:blipFill>
+        <p:spPr>
+          <a:xfrm>
+            <a:off x="80211" y="1727841"/>
+            <a:ext cx="892528" cy="586800"/>
+          </a:xfrm>
+          <a:prstGeom prst="rect">
+            <a:avLst/>
+          </a:prstGeom>
+        </p:spPr>
+      </p:pic>
+      <p:pic>
+        <p:nvPicPr>
+          <p:cNvPr id="4" name="Picture 3">
+            <a:extLst>
+              <a:ext uri="{FF2B5EF4-FFF2-40B4-BE49-F238E27FC236}">
+                <a16:creationId xmlns:a16="http://schemas.microsoft.com/office/drawing/2014/main" id="{FB95A457-1250-418F-8752-3AD3D6CA1CBF}"/>
+              </a:ext>
+            </a:extLst>
+          </p:cNvPr>
+          <p:cNvPicPr>
+            <a:picLocks noChangeAspect="1"/>
+          </p:cNvPicPr>
+          <p:nvPr/>
+        </p:nvPicPr>
+        <p:blipFill>
+          <a:blip r:embed="rId5"/>
+          <a:stretch>
+            <a:fillRect/>
+          </a:stretch>
+        </p:blipFill>
+        <p:spPr>
+          <a:xfrm>
+            <a:off x="80211" y="4559479"/>
+            <a:ext cx="892528" cy="586800"/>
+          </a:xfrm>
+          <a:prstGeom prst="rect">
+            <a:avLst/>
+          </a:prstGeom>
+        </p:spPr>
+      </p:pic>
+      <p:sp>
+        <p:nvSpPr>
           <p:cNvPr id="23" name="TextBox 22">
             <a:extLst>
               <a:ext uri="{FF2B5EF4-FFF2-40B4-BE49-F238E27FC236}">
@@ -4829,7 +4860,7 @@
         </p:nvSpPr>
         <p:spPr>
           <a:xfrm>
-            <a:off x="949408" y="1719159"/>
+            <a:off x="949408" y="1790409"/>
             <a:ext cx="1025089" cy="461665"/>
           </a:xfrm>
           <a:prstGeom prst="rect">
@@ -4865,7 +4896,7 @@
         </p:nvSpPr>
         <p:spPr>
           <a:xfrm>
-            <a:off x="950090" y="4550797"/>
+            <a:off x="950090" y="4622047"/>
             <a:ext cx="829073" cy="461665"/>
           </a:xfrm>
           <a:prstGeom prst="rect">
@@ -4937,7 +4968,7 @@
           <p:nvPr/>
         </p:nvPicPr>
         <p:blipFill>
-          <a:blip r:embed="rId5">
+          <a:blip r:embed="rId6">
             <a:extLst>
               <a:ext uri="{28A0092B-C50C-407E-A947-70E740481C1C}">
                 <a14:useLocalDpi xmlns:a14="http://schemas.microsoft.com/office/drawing/2010/main" val="0"/>
@@ -4964,88 +4995,6 @@
             <a:extLst>
               <a:ext uri="{FF2B5EF4-FFF2-40B4-BE49-F238E27FC236}">
                 <a16:creationId xmlns:a16="http://schemas.microsoft.com/office/drawing/2014/main" id="{658E3D45-1C71-4F20-9610-695B461E2222}"/>
-              </a:ext>
-            </a:extLst>
-          </p:cNvPr>
-          <p:cNvPicPr>
-            <a:picLocks noChangeAspect="1"/>
-          </p:cNvPicPr>
-          <p:nvPr/>
-        </p:nvPicPr>
-        <p:blipFill>
-          <a:blip r:embed="rId6"/>
-          <a:stretch>
-            <a:fillRect/>
-          </a:stretch>
-        </p:blipFill>
-        <p:spPr>
-          <a:xfrm>
-            <a:off x="2621035" y="1745746"/>
-            <a:ext cx="5909106" cy="2202766"/>
-          </a:xfrm>
-          <a:prstGeom prst="rect">
-            <a:avLst/>
-          </a:prstGeom>
-        </p:spPr>
-      </p:pic>
-      <p:sp>
-        <p:nvSpPr>
-          <p:cNvPr id="15" name="Left Brace 14">
-            <a:extLst>
-              <a:ext uri="{FF2B5EF4-FFF2-40B4-BE49-F238E27FC236}">
-                <a16:creationId xmlns:a16="http://schemas.microsoft.com/office/drawing/2014/main" id="{E4F55F19-6D3D-40FC-9579-C24CDFA3E5B6}"/>
-              </a:ext>
-            </a:extLst>
-          </p:cNvPr>
-          <p:cNvSpPr/>
-          <p:nvPr/>
-        </p:nvSpPr>
-        <p:spPr>
-          <a:xfrm rot="5400000">
-            <a:off x="6926720" y="2016472"/>
-            <a:ext cx="508102" cy="3045842"/>
-          </a:xfrm>
-          <a:prstGeom prst="leftBrace">
-            <a:avLst>
-              <a:gd name="adj1" fmla="val 8333"/>
-              <a:gd name="adj2" fmla="val 83094"/>
-            </a:avLst>
-          </a:prstGeom>
-          <a:ln w="38100">
-            <a:solidFill>
-              <a:schemeClr val="accent4"/>
-            </a:solidFill>
-          </a:ln>
-        </p:spPr>
-        <p:style>
-          <a:lnRef idx="1">
-            <a:schemeClr val="accent1"/>
-          </a:lnRef>
-          <a:fillRef idx="0">
-            <a:schemeClr val="accent1"/>
-          </a:fillRef>
-          <a:effectRef idx="0">
-            <a:schemeClr val="accent1"/>
-          </a:effectRef>
-          <a:fontRef idx="minor">
-            <a:schemeClr val="tx1"/>
-          </a:fontRef>
-        </p:style>
-        <p:txBody>
-          <a:bodyPr rtlCol="0" anchor="ctr"/>
-          <a:lstStyle/>
-          <a:p>
-            <a:pPr algn="ctr"/>
-            <a:endParaRPr lang="en-GB" dirty="0"/>
-          </a:p>
-        </p:txBody>
-      </p:sp>
-      <p:pic>
-        <p:nvPicPr>
-          <p:cNvPr id="11" name="Picture 10">
-            <a:extLst>
-              <a:ext uri="{FF2B5EF4-FFF2-40B4-BE49-F238E27FC236}">
-                <a16:creationId xmlns:a16="http://schemas.microsoft.com/office/drawing/2014/main" id="{932CABC6-C89F-4168-9E0F-B51EF565030E}"/>
               </a:ext>
             </a:extLst>
           </p:cNvPr>
@@ -5062,20 +5011,72 @@
         </p:blipFill>
         <p:spPr>
           <a:xfrm>
-            <a:off x="5769762" y="4617658"/>
-            <a:ext cx="4360822" cy="953930"/>
+            <a:off x="2621035" y="1816996"/>
+            <a:ext cx="5909106" cy="2202766"/>
           </a:xfrm>
           <a:prstGeom prst="rect">
             <a:avLst/>
           </a:prstGeom>
         </p:spPr>
       </p:pic>
+      <p:sp>
+        <p:nvSpPr>
+          <p:cNvPr id="26" name="Left Brace 25">
+            <a:extLst>
+              <a:ext uri="{FF2B5EF4-FFF2-40B4-BE49-F238E27FC236}">
+                <a16:creationId xmlns:a16="http://schemas.microsoft.com/office/drawing/2014/main" id="{BFEB9A75-8F72-4342-9B37-CDA035FC48E7}"/>
+              </a:ext>
+            </a:extLst>
+          </p:cNvPr>
+          <p:cNvSpPr/>
+          <p:nvPr/>
+        </p:nvSpPr>
+        <p:spPr>
+          <a:xfrm rot="5400000">
+            <a:off x="9243556" y="6950281"/>
+            <a:ext cx="669973" cy="2339616"/>
+          </a:xfrm>
+          <a:prstGeom prst="leftBrace">
+            <a:avLst>
+              <a:gd name="adj1" fmla="val 8333"/>
+              <a:gd name="adj2" fmla="val 33218"/>
+            </a:avLst>
+          </a:prstGeom>
+          <a:ln w="38100">
+            <a:solidFill>
+              <a:schemeClr val="accent4"/>
+            </a:solidFill>
+          </a:ln>
+        </p:spPr>
+        <p:style>
+          <a:lnRef idx="1">
+            <a:schemeClr val="accent1"/>
+          </a:lnRef>
+          <a:fillRef idx="0">
+            <a:schemeClr val="accent1"/>
+          </a:fillRef>
+          <a:effectRef idx="0">
+            <a:schemeClr val="accent1"/>
+          </a:effectRef>
+          <a:fontRef idx="minor">
+            <a:schemeClr val="tx1"/>
+          </a:fontRef>
+        </p:style>
+        <p:txBody>
+          <a:bodyPr rtlCol="0" anchor="ctr"/>
+          <a:lstStyle/>
+          <a:p>
+            <a:pPr algn="ctr"/>
+            <a:endParaRPr lang="en-GB" dirty="0"/>
+          </a:p>
+        </p:txBody>
+      </p:sp>
       <p:pic>
         <p:nvPicPr>
-          <p:cNvPr id="13" name="Picture 12">
-            <a:extLst>
-              <a:ext uri="{FF2B5EF4-FFF2-40B4-BE49-F238E27FC236}">
-                <a16:creationId xmlns:a16="http://schemas.microsoft.com/office/drawing/2014/main" id="{8368042C-E687-48AF-A57E-545C047CDB31}"/>
+          <p:cNvPr id="16" name="Picture 15">
+            <a:extLst>
+              <a:ext uri="{FF2B5EF4-FFF2-40B4-BE49-F238E27FC236}">
+                <a16:creationId xmlns:a16="http://schemas.microsoft.com/office/drawing/2014/main" id="{F24BA0AF-BC82-4B39-B34F-61FA814CDF4F}"/>
               </a:ext>
             </a:extLst>
           </p:cNvPr>
@@ -5092,72 +5093,20 @@
         </p:blipFill>
         <p:spPr>
           <a:xfrm>
-            <a:off x="7350529" y="5902106"/>
-            <a:ext cx="4271396" cy="2132677"/>
+            <a:off x="9390111" y="8226693"/>
+            <a:ext cx="1281782" cy="628684"/>
           </a:xfrm>
           <a:prstGeom prst="rect">
             <a:avLst/>
           </a:prstGeom>
         </p:spPr>
       </p:pic>
-      <p:sp>
-        <p:nvSpPr>
-          <p:cNvPr id="26" name="Left Brace 25">
-            <a:extLst>
-              <a:ext uri="{FF2B5EF4-FFF2-40B4-BE49-F238E27FC236}">
-                <a16:creationId xmlns:a16="http://schemas.microsoft.com/office/drawing/2014/main" id="{BFEB9A75-8F72-4342-9B37-CDA035FC48E7}"/>
-              </a:ext>
-            </a:extLst>
-          </p:cNvPr>
-          <p:cNvSpPr/>
-          <p:nvPr/>
-        </p:nvSpPr>
-        <p:spPr>
-          <a:xfrm rot="5400000">
-            <a:off x="10249187" y="6889729"/>
-            <a:ext cx="669973" cy="2318216"/>
-          </a:xfrm>
-          <a:prstGeom prst="leftBrace">
-            <a:avLst>
-              <a:gd name="adj1" fmla="val 8333"/>
-              <a:gd name="adj2" fmla="val 33684"/>
-            </a:avLst>
-          </a:prstGeom>
-          <a:ln w="38100">
-            <a:solidFill>
-              <a:schemeClr val="accent4"/>
-            </a:solidFill>
-          </a:ln>
-        </p:spPr>
-        <p:style>
-          <a:lnRef idx="1">
-            <a:schemeClr val="accent1"/>
-          </a:lnRef>
-          <a:fillRef idx="0">
-            <a:schemeClr val="accent1"/>
-          </a:fillRef>
-          <a:effectRef idx="0">
-            <a:schemeClr val="accent1"/>
-          </a:effectRef>
-          <a:fontRef idx="minor">
-            <a:schemeClr val="tx1"/>
-          </a:fontRef>
-        </p:style>
-        <p:txBody>
-          <a:bodyPr rtlCol="0" anchor="ctr"/>
-          <a:lstStyle/>
-          <a:p>
-            <a:pPr algn="ctr"/>
-            <a:endParaRPr lang="en-GB" dirty="0"/>
-          </a:p>
-        </p:txBody>
-      </p:sp>
       <p:pic>
         <p:nvPicPr>
-          <p:cNvPr id="16" name="Picture 15">
-            <a:extLst>
-              <a:ext uri="{FF2B5EF4-FFF2-40B4-BE49-F238E27FC236}">
-                <a16:creationId xmlns:a16="http://schemas.microsoft.com/office/drawing/2014/main" id="{F24BA0AF-BC82-4B39-B34F-61FA814CDF4F}"/>
+          <p:cNvPr id="21" name="Picture 20">
+            <a:extLst>
+              <a:ext uri="{FF2B5EF4-FFF2-40B4-BE49-F238E27FC236}">
+                <a16:creationId xmlns:a16="http://schemas.microsoft.com/office/drawing/2014/main" id="{E4C2318B-2360-42D0-9299-8909E272F9B4}"/>
               </a:ext>
             </a:extLst>
           </p:cNvPr>
@@ -5174,8 +5123,8 @@
         </p:blipFill>
         <p:spPr>
           <a:xfrm>
-            <a:off x="10411393" y="8155443"/>
-            <a:ext cx="1281782" cy="628684"/>
+            <a:off x="9397967" y="8879747"/>
+            <a:ext cx="1271547" cy="626469"/>
           </a:xfrm>
           <a:prstGeom prst="rect">
             <a:avLst/>
@@ -5184,10 +5133,10 @@
       </p:pic>
       <p:pic>
         <p:nvPicPr>
-          <p:cNvPr id="21" name="Picture 20">
-            <a:extLst>
-              <a:ext uri="{FF2B5EF4-FFF2-40B4-BE49-F238E27FC236}">
-                <a16:creationId xmlns:a16="http://schemas.microsoft.com/office/drawing/2014/main" id="{E4C2318B-2360-42D0-9299-8909E272F9B4}"/>
+          <p:cNvPr id="22" name="Picture 21">
+            <a:extLst>
+              <a:ext uri="{FF2B5EF4-FFF2-40B4-BE49-F238E27FC236}">
+                <a16:creationId xmlns:a16="http://schemas.microsoft.com/office/drawing/2014/main" id="{363DAB9F-0C05-4E7F-85D5-DC404795DA15}"/>
               </a:ext>
             </a:extLst>
           </p:cNvPr>
@@ -5204,20 +5153,55 @@
         </p:blipFill>
         <p:spPr>
           <a:xfrm>
-            <a:off x="10419249" y="8808497"/>
-            <a:ext cx="1271547" cy="626469"/>
+            <a:off x="9366361" y="9532043"/>
+            <a:ext cx="1295931" cy="626469"/>
           </a:xfrm>
           <a:prstGeom prst="rect">
             <a:avLst/>
           </a:prstGeom>
         </p:spPr>
       </p:pic>
+      <p:sp>
+        <p:nvSpPr>
+          <p:cNvPr id="27" name="TextBox 26">
+            <a:extLst>
+              <a:ext uri="{FF2B5EF4-FFF2-40B4-BE49-F238E27FC236}">
+                <a16:creationId xmlns:a16="http://schemas.microsoft.com/office/drawing/2014/main" id="{7D5378B2-2ACB-40F2-81F0-5133D5E3A132}"/>
+              </a:ext>
+            </a:extLst>
+          </p:cNvPr>
+          <p:cNvSpPr txBox="1"/>
+          <p:nvPr/>
+        </p:nvSpPr>
+        <p:spPr>
+          <a:xfrm>
+            <a:off x="8408735" y="8356369"/>
+            <a:ext cx="994183" cy="369332"/>
+          </a:xfrm>
+          <a:prstGeom prst="rect">
+            <a:avLst/>
+          </a:prstGeom>
+          <a:noFill/>
+        </p:spPr>
+        <p:txBody>
+          <a:bodyPr wrap="none" rtlCol="0">
+            <a:spAutoFit/>
+          </a:bodyPr>
+          <a:lstStyle/>
+          <a:p>
+            <a:r>
+              <a:rPr lang="en-GB" dirty="0"/>
+              <a:t>@{Case}</a:t>
+            </a:r>
+          </a:p>
+        </p:txBody>
+      </p:sp>
       <p:pic>
         <p:nvPicPr>
-          <p:cNvPr id="22" name="Picture 21">
-            <a:extLst>
-              <a:ext uri="{FF2B5EF4-FFF2-40B4-BE49-F238E27FC236}">
-                <a16:creationId xmlns:a16="http://schemas.microsoft.com/office/drawing/2014/main" id="{363DAB9F-0C05-4E7F-85D5-DC404795DA15}"/>
+          <p:cNvPr id="9" name="Picture 8">
+            <a:extLst>
+              <a:ext uri="{FF2B5EF4-FFF2-40B4-BE49-F238E27FC236}">
+                <a16:creationId xmlns:a16="http://schemas.microsoft.com/office/drawing/2014/main" id="{830ECE33-9E5F-4091-9D12-99B9CAA53606}"/>
               </a:ext>
             </a:extLst>
           </p:cNvPr>
@@ -5234,8 +5218,8 @@
         </p:blipFill>
         <p:spPr>
           <a:xfrm>
-            <a:off x="10387643" y="9460793"/>
-            <a:ext cx="1295931" cy="626469"/>
+            <a:off x="5736148" y="3693677"/>
+            <a:ext cx="4449616" cy="641100"/>
           </a:xfrm>
           <a:prstGeom prst="rect">
             <a:avLst/>
@@ -5244,45 +5228,62 @@
       </p:pic>
       <p:sp>
         <p:nvSpPr>
-          <p:cNvPr id="27" name="TextBox 26">
-            <a:extLst>
-              <a:ext uri="{FF2B5EF4-FFF2-40B4-BE49-F238E27FC236}">
-                <a16:creationId xmlns:a16="http://schemas.microsoft.com/office/drawing/2014/main" id="{7D5378B2-2ACB-40F2-81F0-5133D5E3A132}"/>
-              </a:ext>
-            </a:extLst>
-          </p:cNvPr>
-          <p:cNvSpPr txBox="1"/>
-          <p:nvPr/>
-        </p:nvSpPr>
-        <p:spPr>
-          <a:xfrm>
-            <a:off x="9430017" y="8285119"/>
-            <a:ext cx="994183" cy="369332"/>
-          </a:xfrm>
-          <a:prstGeom prst="rect">
-            <a:avLst/>
-          </a:prstGeom>
-          <a:noFill/>
-        </p:spPr>
-        <p:txBody>
-          <a:bodyPr wrap="none" rtlCol="0">
-            <a:spAutoFit/>
-          </a:bodyPr>
-          <a:lstStyle/>
-          <a:p>
-            <a:r>
-              <a:rPr lang="en-GB" dirty="0"/>
-              <a:t>@{Case}</a:t>
-            </a:r>
+          <p:cNvPr id="15" name="Left Brace 14">
+            <a:extLst>
+              <a:ext uri="{FF2B5EF4-FFF2-40B4-BE49-F238E27FC236}">
+                <a16:creationId xmlns:a16="http://schemas.microsoft.com/office/drawing/2014/main" id="{E4F55F19-6D3D-40FC-9579-C24CDFA3E5B6}"/>
+              </a:ext>
+            </a:extLst>
+          </p:cNvPr>
+          <p:cNvSpPr/>
+          <p:nvPr/>
+        </p:nvSpPr>
+        <p:spPr>
+          <a:xfrm rot="5400000">
+            <a:off x="7667756" y="1346686"/>
+            <a:ext cx="508102" cy="4527914"/>
+          </a:xfrm>
+          <a:prstGeom prst="leftBrace">
+            <a:avLst>
+              <a:gd name="adj1" fmla="val 8333"/>
+              <a:gd name="adj2" fmla="val 86241"/>
+            </a:avLst>
+          </a:prstGeom>
+          <a:ln w="38100">
+            <a:solidFill>
+              <a:schemeClr val="accent4"/>
+            </a:solidFill>
+          </a:ln>
+        </p:spPr>
+        <p:style>
+          <a:lnRef idx="1">
+            <a:schemeClr val="accent1"/>
+          </a:lnRef>
+          <a:fillRef idx="0">
+            <a:schemeClr val="accent1"/>
+          </a:fillRef>
+          <a:effectRef idx="0">
+            <a:schemeClr val="accent1"/>
+          </a:effectRef>
+          <a:fontRef idx="minor">
+            <a:schemeClr val="tx1"/>
+          </a:fontRef>
+        </p:style>
+        <p:txBody>
+          <a:bodyPr rtlCol="0" anchor="ctr"/>
+          <a:lstStyle/>
+          <a:p>
+            <a:pPr algn="ctr"/>
+            <a:endParaRPr lang="en-GB" dirty="0"/>
           </a:p>
         </p:txBody>
       </p:sp>
       <p:pic>
         <p:nvPicPr>
-          <p:cNvPr id="17" name="Picture 16">
-            <a:extLst>
-              <a:ext uri="{FF2B5EF4-FFF2-40B4-BE49-F238E27FC236}">
-                <a16:creationId xmlns:a16="http://schemas.microsoft.com/office/drawing/2014/main" id="{A14E6E31-1176-4A99-BE26-E5D4E2A3D321}"/>
+          <p:cNvPr id="19" name="Picture 18">
+            <a:extLst>
+              <a:ext uri="{FF2B5EF4-FFF2-40B4-BE49-F238E27FC236}">
+                <a16:creationId xmlns:a16="http://schemas.microsoft.com/office/drawing/2014/main" id="{45593E8A-47D3-4EAD-9C33-0C4BD7D50503}"/>
               </a:ext>
             </a:extLst>
           </p:cNvPr>
@@ -5299,8 +5300,8 @@
         </p:blipFill>
         <p:spPr>
           <a:xfrm>
-            <a:off x="5750829" y="3622427"/>
-            <a:ext cx="2866087" cy="641099"/>
+            <a:off x="7350529" y="4695897"/>
+            <a:ext cx="2803699" cy="928418"/>
           </a:xfrm>
           <a:prstGeom prst="rect">
             <a:avLst/>
@@ -5317,6 +5318,909 @@
   <p:clrMapOvr>
     <a:masterClrMapping/>
   </p:clrMapOvr>
+</p:sld>
+</file>
+
+<file path=ppt/slides/slide4.xml><?xml version="1.0" encoding="utf-8"?>
+<p:sld xmlns:a="http://schemas.openxmlformats.org/drawingml/2006/main" xmlns:r="http://schemas.openxmlformats.org/officeDocument/2006/relationships" xmlns:p="http://schemas.openxmlformats.org/presentationml/2006/main">
+  <p:cSld>
+    <p:spTree>
+      <p:nvGrpSpPr>
+        <p:cNvPr id="1" name=""/>
+        <p:cNvGrpSpPr/>
+        <p:nvPr/>
+      </p:nvGrpSpPr>
+      <p:grpSpPr>
+        <a:xfrm>
+          <a:off x="0" y="0"/>
+          <a:ext cx="0" cy="0"/>
+          <a:chOff x="0" y="0"/>
+          <a:chExt cx="0" cy="0"/>
+        </a:xfrm>
+      </p:grpSpPr>
+      <p:sp>
+        <p:nvSpPr>
+          <p:cNvPr id="16" name="TextBox 15">
+            <a:extLst>
+              <a:ext uri="{FF2B5EF4-FFF2-40B4-BE49-F238E27FC236}">
+                <a16:creationId xmlns:a16="http://schemas.microsoft.com/office/drawing/2014/main" id="{73A2C03B-7980-42A1-AE0F-C2B2904F8E3B}"/>
+              </a:ext>
+            </a:extLst>
+          </p:cNvPr>
+          <p:cNvSpPr txBox="1"/>
+          <p:nvPr/>
+        </p:nvSpPr>
+        <p:spPr>
+          <a:xfrm>
+            <a:off x="8314606" y="2200830"/>
+            <a:ext cx="1141659" cy="461665"/>
+          </a:xfrm>
+          <a:prstGeom prst="rect">
+            <a:avLst/>
+          </a:prstGeom>
+          <a:noFill/>
+        </p:spPr>
+        <p:txBody>
+          <a:bodyPr wrap="none" rtlCol="0">
+            <a:spAutoFit/>
+          </a:bodyPr>
+          <a:lstStyle/>
+          <a:p>
+            <a:r>
+              <a:rPr lang="en-GB" dirty="0"/>
+              <a:t>Success</a:t>
+            </a:r>
+          </a:p>
+        </p:txBody>
+      </p:sp>
+      <p:cxnSp>
+        <p:nvCxnSpPr>
+          <p:cNvPr id="17" name="Connector: Elbow 16">
+            <a:extLst>
+              <a:ext uri="{FF2B5EF4-FFF2-40B4-BE49-F238E27FC236}">
+                <a16:creationId xmlns:a16="http://schemas.microsoft.com/office/drawing/2014/main" id="{0326AC0F-054E-497A-8BD7-FCE6E6C13963}"/>
+              </a:ext>
+            </a:extLst>
+          </p:cNvPr>
+          <p:cNvCxnSpPr>
+            <a:cxnSpLocks/>
+          </p:cNvCxnSpPr>
+          <p:nvPr/>
+        </p:nvCxnSpPr>
+        <p:spPr>
+          <a:xfrm>
+            <a:off x="6299860" y="3054675"/>
+            <a:ext cx="1982707" cy="461665"/>
+          </a:xfrm>
+          <a:prstGeom prst="bentConnector3">
+            <a:avLst>
+              <a:gd name="adj1" fmla="val 46957"/>
+            </a:avLst>
+          </a:prstGeom>
+          <a:ln w="76200">
+            <a:solidFill>
+              <a:schemeClr val="bg1">
+                <a:lumMod val="65000"/>
+              </a:schemeClr>
+            </a:solidFill>
+            <a:tailEnd type="triangle"/>
+          </a:ln>
+        </p:spPr>
+        <p:style>
+          <a:lnRef idx="1">
+            <a:schemeClr val="accent1"/>
+          </a:lnRef>
+          <a:fillRef idx="0">
+            <a:schemeClr val="accent1"/>
+          </a:fillRef>
+          <a:effectRef idx="0">
+            <a:schemeClr val="accent1"/>
+          </a:effectRef>
+          <a:fontRef idx="minor">
+            <a:schemeClr val="tx1"/>
+          </a:fontRef>
+        </p:style>
+      </p:cxnSp>
+      <p:cxnSp>
+        <p:nvCxnSpPr>
+          <p:cNvPr id="18" name="Connector: Elbow 17">
+            <a:extLst>
+              <a:ext uri="{FF2B5EF4-FFF2-40B4-BE49-F238E27FC236}">
+                <a16:creationId xmlns:a16="http://schemas.microsoft.com/office/drawing/2014/main" id="{EA9ED334-623E-4A4E-BEEC-894068130618}"/>
+              </a:ext>
+            </a:extLst>
+          </p:cNvPr>
+          <p:cNvCxnSpPr>
+            <a:cxnSpLocks/>
+          </p:cNvCxnSpPr>
+          <p:nvPr/>
+        </p:nvCxnSpPr>
+        <p:spPr>
+          <a:xfrm>
+            <a:off x="6311900" y="2979010"/>
+            <a:ext cx="1982707" cy="195203"/>
+          </a:xfrm>
+          <a:prstGeom prst="bentConnector3">
+            <a:avLst>
+              <a:gd name="adj1" fmla="val 50160"/>
+            </a:avLst>
+          </a:prstGeom>
+          <a:ln w="76200">
+            <a:tailEnd type="triangle"/>
+          </a:ln>
+        </p:spPr>
+        <p:style>
+          <a:lnRef idx="1">
+            <a:schemeClr val="accent1"/>
+          </a:lnRef>
+          <a:fillRef idx="0">
+            <a:schemeClr val="accent1"/>
+          </a:fillRef>
+          <a:effectRef idx="0">
+            <a:schemeClr val="accent1"/>
+          </a:effectRef>
+          <a:fontRef idx="minor">
+            <a:schemeClr val="tx1"/>
+          </a:fontRef>
+        </p:style>
+      </p:cxnSp>
+      <p:cxnSp>
+        <p:nvCxnSpPr>
+          <p:cNvPr id="19" name="Connector: Elbow 18">
+            <a:extLst>
+              <a:ext uri="{FF2B5EF4-FFF2-40B4-BE49-F238E27FC236}">
+                <a16:creationId xmlns:a16="http://schemas.microsoft.com/office/drawing/2014/main" id="{A7930426-A189-4EF6-8BAD-519392C80A3D}"/>
+              </a:ext>
+            </a:extLst>
+          </p:cNvPr>
+          <p:cNvCxnSpPr>
+            <a:cxnSpLocks/>
+            <a:endCxn id="21" idx="1"/>
+          </p:cNvCxnSpPr>
+          <p:nvPr/>
+        </p:nvCxnSpPr>
+        <p:spPr>
+          <a:xfrm flipV="1">
+            <a:off x="6299860" y="2752586"/>
+            <a:ext cx="2007209" cy="150749"/>
+          </a:xfrm>
+          <a:prstGeom prst="bentConnector3">
+            <a:avLst>
+              <a:gd name="adj1" fmla="val 50000"/>
+            </a:avLst>
+          </a:prstGeom>
+          <a:ln w="76200">
+            <a:solidFill>
+              <a:srgbClr val="FF0000"/>
+            </a:solidFill>
+            <a:tailEnd type="triangle"/>
+          </a:ln>
+        </p:spPr>
+        <p:style>
+          <a:lnRef idx="1">
+            <a:schemeClr val="accent1"/>
+          </a:lnRef>
+          <a:fillRef idx="0">
+            <a:schemeClr val="accent1"/>
+          </a:fillRef>
+          <a:effectRef idx="0">
+            <a:schemeClr val="accent1"/>
+          </a:effectRef>
+          <a:fontRef idx="minor">
+            <a:schemeClr val="tx1"/>
+          </a:fontRef>
+        </p:style>
+      </p:cxnSp>
+      <p:cxnSp>
+        <p:nvCxnSpPr>
+          <p:cNvPr id="20" name="Connector: Elbow 19">
+            <a:extLst>
+              <a:ext uri="{FF2B5EF4-FFF2-40B4-BE49-F238E27FC236}">
+                <a16:creationId xmlns:a16="http://schemas.microsoft.com/office/drawing/2014/main" id="{CD0BAEEF-EF43-4C49-9EDB-FFCB13114794}"/>
+              </a:ext>
+            </a:extLst>
+          </p:cNvPr>
+          <p:cNvCxnSpPr>
+            <a:cxnSpLocks/>
+            <a:endCxn id="16" idx="1"/>
+          </p:cNvCxnSpPr>
+          <p:nvPr/>
+        </p:nvCxnSpPr>
+        <p:spPr>
+          <a:xfrm flipV="1">
+            <a:off x="6827520" y="2431663"/>
+            <a:ext cx="1487086" cy="398530"/>
+          </a:xfrm>
+          <a:prstGeom prst="bentConnector3">
+            <a:avLst>
+              <a:gd name="adj1" fmla="val 27454"/>
+            </a:avLst>
+          </a:prstGeom>
+          <a:ln w="76200">
+            <a:solidFill>
+              <a:schemeClr val="accent6"/>
+            </a:solidFill>
+            <a:tailEnd type="triangle"/>
+          </a:ln>
+        </p:spPr>
+        <p:style>
+          <a:lnRef idx="1">
+            <a:schemeClr val="accent1"/>
+          </a:lnRef>
+          <a:fillRef idx="0">
+            <a:schemeClr val="accent1"/>
+          </a:fillRef>
+          <a:effectRef idx="0">
+            <a:schemeClr val="accent1"/>
+          </a:effectRef>
+          <a:fontRef idx="minor">
+            <a:schemeClr val="tx1"/>
+          </a:fontRef>
+        </p:style>
+      </p:cxnSp>
+      <p:sp>
+        <p:nvSpPr>
+          <p:cNvPr id="21" name="TextBox 20">
+            <a:extLst>
+              <a:ext uri="{FF2B5EF4-FFF2-40B4-BE49-F238E27FC236}">
+                <a16:creationId xmlns:a16="http://schemas.microsoft.com/office/drawing/2014/main" id="{AD76AEFE-ADAA-4EDA-BE04-480A9CC89AD5}"/>
+              </a:ext>
+            </a:extLst>
+          </p:cNvPr>
+          <p:cNvSpPr txBox="1"/>
+          <p:nvPr/>
+        </p:nvSpPr>
+        <p:spPr>
+          <a:xfrm>
+            <a:off x="8307069" y="2567920"/>
+            <a:ext cx="500650" cy="369332"/>
+          </a:xfrm>
+          <a:prstGeom prst="rect">
+            <a:avLst/>
+          </a:prstGeom>
+          <a:noFill/>
+        </p:spPr>
+        <p:txBody>
+          <a:bodyPr wrap="none" rtlCol="0">
+            <a:spAutoFit/>
+          </a:bodyPr>
+          <a:lstStyle/>
+          <a:p>
+            <a:r>
+              <a:rPr lang="en-GB" dirty="0"/>
+              <a:t>Fail</a:t>
+            </a:r>
+          </a:p>
+        </p:txBody>
+      </p:sp>
+      <p:sp>
+        <p:nvSpPr>
+          <p:cNvPr id="22" name="TextBox 21">
+            <a:extLst>
+              <a:ext uri="{FF2B5EF4-FFF2-40B4-BE49-F238E27FC236}">
+                <a16:creationId xmlns:a16="http://schemas.microsoft.com/office/drawing/2014/main" id="{2DD5DCBD-88FD-4D3F-889E-91C2A2822707}"/>
+              </a:ext>
+            </a:extLst>
+          </p:cNvPr>
+          <p:cNvSpPr txBox="1"/>
+          <p:nvPr/>
+        </p:nvSpPr>
+        <p:spPr>
+          <a:xfrm>
+            <a:off x="8297782" y="2975782"/>
+            <a:ext cx="1393138" cy="461665"/>
+          </a:xfrm>
+          <a:prstGeom prst="rect">
+            <a:avLst/>
+          </a:prstGeom>
+          <a:noFill/>
+        </p:spPr>
+        <p:txBody>
+          <a:bodyPr wrap="none" rtlCol="0">
+            <a:spAutoFit/>
+          </a:bodyPr>
+          <a:lstStyle/>
+          <a:p>
+            <a:r>
+              <a:rPr lang="en-GB" dirty="0"/>
+              <a:t>Complete</a:t>
+            </a:r>
+          </a:p>
+        </p:txBody>
+      </p:sp>
+      <p:sp>
+        <p:nvSpPr>
+          <p:cNvPr id="23" name="TextBox 22">
+            <a:extLst>
+              <a:ext uri="{FF2B5EF4-FFF2-40B4-BE49-F238E27FC236}">
+                <a16:creationId xmlns:a16="http://schemas.microsoft.com/office/drawing/2014/main" id="{9034F2AF-5A71-4276-A703-86E9B2038E5D}"/>
+              </a:ext>
+            </a:extLst>
+          </p:cNvPr>
+          <p:cNvSpPr txBox="1"/>
+          <p:nvPr/>
+        </p:nvSpPr>
+        <p:spPr>
+          <a:xfrm>
+            <a:off x="8282567" y="3335715"/>
+            <a:ext cx="697627" cy="461665"/>
+          </a:xfrm>
+          <a:prstGeom prst="rect">
+            <a:avLst/>
+          </a:prstGeom>
+          <a:noFill/>
+        </p:spPr>
+        <p:txBody>
+          <a:bodyPr wrap="none" rtlCol="0">
+            <a:spAutoFit/>
+          </a:bodyPr>
+          <a:lstStyle/>
+          <a:p>
+            <a:r>
+              <a:rPr lang="en-GB" dirty="0"/>
+              <a:t>Skip</a:t>
+            </a:r>
+          </a:p>
+        </p:txBody>
+      </p:sp>
+      <p:pic>
+        <p:nvPicPr>
+          <p:cNvPr id="24" name="Picture 23">
+            <a:extLst>
+              <a:ext uri="{FF2B5EF4-FFF2-40B4-BE49-F238E27FC236}">
+                <a16:creationId xmlns:a16="http://schemas.microsoft.com/office/drawing/2014/main" id="{4625E80D-718C-4D38-BE2D-9FD3ABC359C0}"/>
+              </a:ext>
+            </a:extLst>
+          </p:cNvPr>
+          <p:cNvPicPr>
+            <a:picLocks noChangeAspect="1"/>
+          </p:cNvPicPr>
+          <p:nvPr/>
+        </p:nvPicPr>
+        <p:blipFill>
+          <a:blip r:embed="rId2"/>
+          <a:stretch>
+            <a:fillRect/>
+          </a:stretch>
+        </p:blipFill>
+        <p:spPr>
+          <a:xfrm>
+            <a:off x="4116388" y="1996889"/>
+            <a:ext cx="2895447" cy="1569659"/>
+          </a:xfrm>
+          <a:prstGeom prst="rect">
+            <a:avLst/>
+          </a:prstGeom>
+        </p:spPr>
+      </p:pic>
+      <p:sp>
+        <p:nvSpPr>
+          <p:cNvPr id="25" name="TextBox 24">
+            <a:extLst>
+              <a:ext uri="{FF2B5EF4-FFF2-40B4-BE49-F238E27FC236}">
+                <a16:creationId xmlns:a16="http://schemas.microsoft.com/office/drawing/2014/main" id="{3180D369-A55E-4F58-9859-E4C0EF3EDE42}"/>
+              </a:ext>
+            </a:extLst>
+          </p:cNvPr>
+          <p:cNvSpPr txBox="1"/>
+          <p:nvPr/>
+        </p:nvSpPr>
+        <p:spPr>
+          <a:xfrm>
+            <a:off x="5103542" y="2723239"/>
+            <a:ext cx="1891993" cy="400110"/>
+          </a:xfrm>
+          <a:prstGeom prst="rect">
+            <a:avLst/>
+          </a:prstGeom>
+          <a:noFill/>
+        </p:spPr>
+        <p:txBody>
+          <a:bodyPr wrap="none" rtlCol="0" anchor="ctr">
+            <a:spAutoFit/>
+          </a:bodyPr>
+          <a:lstStyle/>
+          <a:p>
+            <a:r>
+              <a:rPr lang="en-GB" sz="2000" dirty="0"/>
+              <a:t>Execute Pipeline</a:t>
+            </a:r>
+          </a:p>
+        </p:txBody>
+      </p:sp>
+      <p:pic>
+        <p:nvPicPr>
+          <p:cNvPr id="26" name="Picture 25">
+            <a:extLst>
+              <a:ext uri="{FF2B5EF4-FFF2-40B4-BE49-F238E27FC236}">
+                <a16:creationId xmlns:a16="http://schemas.microsoft.com/office/drawing/2014/main" id="{CC5615AE-C25D-4330-8F85-12448AE786F2}"/>
+              </a:ext>
+            </a:extLst>
+          </p:cNvPr>
+          <p:cNvPicPr>
+            <a:picLocks noChangeAspect="1"/>
+          </p:cNvPicPr>
+          <p:nvPr/>
+        </p:nvPicPr>
+        <p:blipFill>
+          <a:blip r:embed="rId3"/>
+          <a:stretch>
+            <a:fillRect/>
+          </a:stretch>
+        </p:blipFill>
+        <p:spPr>
+          <a:xfrm>
+            <a:off x="4269440" y="2546608"/>
+            <a:ext cx="854296" cy="787151"/>
+          </a:xfrm>
+          <a:prstGeom prst="rect">
+            <a:avLst/>
+          </a:prstGeom>
+        </p:spPr>
+      </p:pic>
+      <p:sp>
+        <p:nvSpPr>
+          <p:cNvPr id="27" name="Arrow: Bent 26">
+            <a:extLst>
+              <a:ext uri="{FF2B5EF4-FFF2-40B4-BE49-F238E27FC236}">
+                <a16:creationId xmlns:a16="http://schemas.microsoft.com/office/drawing/2014/main" id="{D0CF6755-ACDF-4747-BE13-700EBC1D6831}"/>
+              </a:ext>
+            </a:extLst>
+          </p:cNvPr>
+          <p:cNvSpPr/>
+          <p:nvPr/>
+        </p:nvSpPr>
+        <p:spPr>
+          <a:xfrm rot="5400000">
+            <a:off x="5344698" y="1215023"/>
+            <a:ext cx="618458" cy="945277"/>
+          </a:xfrm>
+          <a:prstGeom prst="bentArrow">
+            <a:avLst>
+              <a:gd name="adj1" fmla="val 13588"/>
+              <a:gd name="adj2" fmla="val 15836"/>
+              <a:gd name="adj3" fmla="val 25043"/>
+              <a:gd name="adj4" fmla="val 22786"/>
+            </a:avLst>
+          </a:prstGeom>
+          <a:solidFill>
+            <a:schemeClr val="accent3"/>
+          </a:solidFill>
+          <a:ln>
+            <a:noFill/>
+          </a:ln>
+        </p:spPr>
+        <p:style>
+          <a:lnRef idx="0">
+            <a:scrgbClr r="0" g="0" b="0"/>
+          </a:lnRef>
+          <a:fillRef idx="0">
+            <a:scrgbClr r="0" g="0" b="0"/>
+          </a:fillRef>
+          <a:effectRef idx="0">
+            <a:scrgbClr r="0" g="0" b="0"/>
+          </a:effectRef>
+          <a:fontRef idx="minor">
+            <a:schemeClr val="lt1"/>
+          </a:fontRef>
+        </p:style>
+        <p:txBody>
+          <a:bodyPr rtlCol="0" anchor="ctr"/>
+          <a:lstStyle/>
+          <a:p>
+            <a:pPr algn="ctr"/>
+            <a:endParaRPr lang="en-GB">
+              <a:solidFill>
+                <a:schemeClr val="tx1"/>
+              </a:solidFill>
+            </a:endParaRPr>
+          </a:p>
+        </p:txBody>
+      </p:sp>
+      <p:pic>
+        <p:nvPicPr>
+          <p:cNvPr id="28" name="Picture 27">
+            <a:extLst>
+              <a:ext uri="{FF2B5EF4-FFF2-40B4-BE49-F238E27FC236}">
+                <a16:creationId xmlns:a16="http://schemas.microsoft.com/office/drawing/2014/main" id="{A7FE9D92-AE59-4788-8876-649C6A4E94BA}"/>
+              </a:ext>
+            </a:extLst>
+          </p:cNvPr>
+          <p:cNvPicPr>
+            <a:picLocks noChangeAspect="1"/>
+          </p:cNvPicPr>
+          <p:nvPr/>
+        </p:nvPicPr>
+        <p:blipFill>
+          <a:blip r:embed="rId4"/>
+          <a:stretch>
+            <a:fillRect/>
+          </a:stretch>
+        </p:blipFill>
+        <p:spPr>
+          <a:xfrm>
+            <a:off x="5556568" y="1111408"/>
+            <a:ext cx="945276" cy="618459"/>
+          </a:xfrm>
+          <a:prstGeom prst="rect">
+            <a:avLst/>
+          </a:prstGeom>
+        </p:spPr>
+      </p:pic>
+      <p:pic>
+        <p:nvPicPr>
+          <p:cNvPr id="29" name="Picture 28">
+            <a:extLst>
+              <a:ext uri="{FF2B5EF4-FFF2-40B4-BE49-F238E27FC236}">
+                <a16:creationId xmlns:a16="http://schemas.microsoft.com/office/drawing/2014/main" id="{AB2A6926-AE56-4F14-8F9D-DC591E30ED4C}"/>
+              </a:ext>
+            </a:extLst>
+          </p:cNvPr>
+          <p:cNvPicPr>
+            <a:picLocks noChangeAspect="1"/>
+          </p:cNvPicPr>
+          <p:nvPr/>
+        </p:nvPicPr>
+        <p:blipFill>
+          <a:blip r:embed="rId5"/>
+          <a:stretch>
+            <a:fillRect/>
+          </a:stretch>
+        </p:blipFill>
+        <p:spPr>
+          <a:xfrm>
+            <a:off x="4155030" y="698943"/>
+            <a:ext cx="1205286" cy="1201956"/>
+          </a:xfrm>
+          <a:prstGeom prst="rect">
+            <a:avLst/>
+          </a:prstGeom>
+        </p:spPr>
+      </p:pic>
+    </p:spTree>
+    <p:extLst>
+      <p:ext uri="{BB962C8B-B14F-4D97-AF65-F5344CB8AC3E}">
+        <p14:creationId xmlns:p14="http://schemas.microsoft.com/office/powerpoint/2010/main" val="3244960342"/>
+      </p:ext>
+    </p:extLst>
+  </p:cSld>
+  <p:clrMapOvr>
+    <a:masterClrMapping/>
+  </p:clrMapOvr>
+  <p:timing>
+    <p:tnLst>
+      <p:par>
+        <p:cTn id="1" dur="indefinite" restart="never" nodeType="tmRoot">
+          <p:childTnLst>
+            <p:seq concurrent="1" nextAc="seek">
+              <p:cTn id="2" dur="indefinite" nodeType="mainSeq">
+                <p:childTnLst>
+                  <p:par>
+                    <p:cTn id="3" fill="hold">
+                      <p:stCondLst>
+                        <p:cond delay="indefinite"/>
+                      </p:stCondLst>
+                      <p:childTnLst>
+                        <p:par>
+                          <p:cTn id="4" fill="hold">
+                            <p:stCondLst>
+                              <p:cond delay="0"/>
+                            </p:stCondLst>
+                            <p:childTnLst>
+                              <p:par>
+                                <p:cTn id="5" presetID="10" presetClass="entr" presetSubtype="0" fill="hold" grpId="0" nodeType="clickEffect">
+                                  <p:stCondLst>
+                                    <p:cond delay="0"/>
+                                  </p:stCondLst>
+                                  <p:childTnLst>
+                                    <p:set>
+                                      <p:cBhvr>
+                                        <p:cTn id="6" dur="1" fill="hold">
+                                          <p:stCondLst>
+                                            <p:cond delay="0"/>
+                                          </p:stCondLst>
+                                        </p:cTn>
+                                        <p:tgtEl>
+                                          <p:spTgt spid="16"/>
+                                        </p:tgtEl>
+                                        <p:attrNameLst>
+                                          <p:attrName>style.visibility</p:attrName>
+                                        </p:attrNameLst>
+                                      </p:cBhvr>
+                                      <p:to>
+                                        <p:strVal val="visible"/>
+                                      </p:to>
+                                    </p:set>
+                                    <p:animEffect transition="in" filter="fade">
+                                      <p:cBhvr>
+                                        <p:cTn id="7" dur="500"/>
+                                        <p:tgtEl>
+                                          <p:spTgt spid="16"/>
+                                        </p:tgtEl>
+                                      </p:cBhvr>
+                                    </p:animEffect>
+                                  </p:childTnLst>
+                                </p:cTn>
+                              </p:par>
+                              <p:par>
+                                <p:cTn id="8" presetID="10" presetClass="entr" presetSubtype="0" fill="hold" nodeType="withEffect">
+                                  <p:stCondLst>
+                                    <p:cond delay="0"/>
+                                  </p:stCondLst>
+                                  <p:childTnLst>
+                                    <p:set>
+                                      <p:cBhvr>
+                                        <p:cTn id="9" dur="1" fill="hold">
+                                          <p:stCondLst>
+                                            <p:cond delay="0"/>
+                                          </p:stCondLst>
+                                        </p:cTn>
+                                        <p:tgtEl>
+                                          <p:spTgt spid="17"/>
+                                        </p:tgtEl>
+                                        <p:attrNameLst>
+                                          <p:attrName>style.visibility</p:attrName>
+                                        </p:attrNameLst>
+                                      </p:cBhvr>
+                                      <p:to>
+                                        <p:strVal val="visible"/>
+                                      </p:to>
+                                    </p:set>
+                                    <p:animEffect transition="in" filter="fade">
+                                      <p:cBhvr>
+                                        <p:cTn id="10" dur="500"/>
+                                        <p:tgtEl>
+                                          <p:spTgt spid="17"/>
+                                        </p:tgtEl>
+                                      </p:cBhvr>
+                                    </p:animEffect>
+                                  </p:childTnLst>
+                                </p:cTn>
+                              </p:par>
+                              <p:par>
+                                <p:cTn id="11" presetID="10" presetClass="entr" presetSubtype="0" fill="hold" nodeType="withEffect">
+                                  <p:stCondLst>
+                                    <p:cond delay="0"/>
+                                  </p:stCondLst>
+                                  <p:childTnLst>
+                                    <p:set>
+                                      <p:cBhvr>
+                                        <p:cTn id="12" dur="1" fill="hold">
+                                          <p:stCondLst>
+                                            <p:cond delay="0"/>
+                                          </p:stCondLst>
+                                        </p:cTn>
+                                        <p:tgtEl>
+                                          <p:spTgt spid="18"/>
+                                        </p:tgtEl>
+                                        <p:attrNameLst>
+                                          <p:attrName>style.visibility</p:attrName>
+                                        </p:attrNameLst>
+                                      </p:cBhvr>
+                                      <p:to>
+                                        <p:strVal val="visible"/>
+                                      </p:to>
+                                    </p:set>
+                                    <p:animEffect transition="in" filter="fade">
+                                      <p:cBhvr>
+                                        <p:cTn id="13" dur="500"/>
+                                        <p:tgtEl>
+                                          <p:spTgt spid="18"/>
+                                        </p:tgtEl>
+                                      </p:cBhvr>
+                                    </p:animEffect>
+                                  </p:childTnLst>
+                                </p:cTn>
+                              </p:par>
+                              <p:par>
+                                <p:cTn id="14" presetID="10" presetClass="entr" presetSubtype="0" fill="hold" nodeType="withEffect">
+                                  <p:stCondLst>
+                                    <p:cond delay="0"/>
+                                  </p:stCondLst>
+                                  <p:childTnLst>
+                                    <p:set>
+                                      <p:cBhvr>
+                                        <p:cTn id="15" dur="1" fill="hold">
+                                          <p:stCondLst>
+                                            <p:cond delay="0"/>
+                                          </p:stCondLst>
+                                        </p:cTn>
+                                        <p:tgtEl>
+                                          <p:spTgt spid="19"/>
+                                        </p:tgtEl>
+                                        <p:attrNameLst>
+                                          <p:attrName>style.visibility</p:attrName>
+                                        </p:attrNameLst>
+                                      </p:cBhvr>
+                                      <p:to>
+                                        <p:strVal val="visible"/>
+                                      </p:to>
+                                    </p:set>
+                                    <p:animEffect transition="in" filter="fade">
+                                      <p:cBhvr>
+                                        <p:cTn id="16" dur="500"/>
+                                        <p:tgtEl>
+                                          <p:spTgt spid="19"/>
+                                        </p:tgtEl>
+                                      </p:cBhvr>
+                                    </p:animEffect>
+                                  </p:childTnLst>
+                                </p:cTn>
+                              </p:par>
+                              <p:par>
+                                <p:cTn id="17" presetID="10" presetClass="entr" presetSubtype="0" fill="hold" nodeType="withEffect">
+                                  <p:stCondLst>
+                                    <p:cond delay="0"/>
+                                  </p:stCondLst>
+                                  <p:childTnLst>
+                                    <p:set>
+                                      <p:cBhvr>
+                                        <p:cTn id="18" dur="1" fill="hold">
+                                          <p:stCondLst>
+                                            <p:cond delay="0"/>
+                                          </p:stCondLst>
+                                        </p:cTn>
+                                        <p:tgtEl>
+                                          <p:spTgt spid="20"/>
+                                        </p:tgtEl>
+                                        <p:attrNameLst>
+                                          <p:attrName>style.visibility</p:attrName>
+                                        </p:attrNameLst>
+                                      </p:cBhvr>
+                                      <p:to>
+                                        <p:strVal val="visible"/>
+                                      </p:to>
+                                    </p:set>
+                                    <p:animEffect transition="in" filter="fade">
+                                      <p:cBhvr>
+                                        <p:cTn id="19" dur="500"/>
+                                        <p:tgtEl>
+                                          <p:spTgt spid="20"/>
+                                        </p:tgtEl>
+                                      </p:cBhvr>
+                                    </p:animEffect>
+                                  </p:childTnLst>
+                                </p:cTn>
+                              </p:par>
+                              <p:par>
+                                <p:cTn id="20" presetID="10" presetClass="entr" presetSubtype="0" fill="hold" grpId="0" nodeType="withEffect">
+                                  <p:stCondLst>
+                                    <p:cond delay="0"/>
+                                  </p:stCondLst>
+                                  <p:childTnLst>
+                                    <p:set>
+                                      <p:cBhvr>
+                                        <p:cTn id="21" dur="1" fill="hold">
+                                          <p:stCondLst>
+                                            <p:cond delay="0"/>
+                                          </p:stCondLst>
+                                        </p:cTn>
+                                        <p:tgtEl>
+                                          <p:spTgt spid="21"/>
+                                        </p:tgtEl>
+                                        <p:attrNameLst>
+                                          <p:attrName>style.visibility</p:attrName>
+                                        </p:attrNameLst>
+                                      </p:cBhvr>
+                                      <p:to>
+                                        <p:strVal val="visible"/>
+                                      </p:to>
+                                    </p:set>
+                                    <p:animEffect transition="in" filter="fade">
+                                      <p:cBhvr>
+                                        <p:cTn id="22" dur="500"/>
+                                        <p:tgtEl>
+                                          <p:spTgt spid="21"/>
+                                        </p:tgtEl>
+                                      </p:cBhvr>
+                                    </p:animEffect>
+                                  </p:childTnLst>
+                                </p:cTn>
+                              </p:par>
+                              <p:par>
+                                <p:cTn id="23" presetID="10" presetClass="entr" presetSubtype="0" fill="hold" grpId="0" nodeType="withEffect">
+                                  <p:stCondLst>
+                                    <p:cond delay="0"/>
+                                  </p:stCondLst>
+                                  <p:childTnLst>
+                                    <p:set>
+                                      <p:cBhvr>
+                                        <p:cTn id="24" dur="1" fill="hold">
+                                          <p:stCondLst>
+                                            <p:cond delay="0"/>
+                                          </p:stCondLst>
+                                        </p:cTn>
+                                        <p:tgtEl>
+                                          <p:spTgt spid="22"/>
+                                        </p:tgtEl>
+                                        <p:attrNameLst>
+                                          <p:attrName>style.visibility</p:attrName>
+                                        </p:attrNameLst>
+                                      </p:cBhvr>
+                                      <p:to>
+                                        <p:strVal val="visible"/>
+                                      </p:to>
+                                    </p:set>
+                                    <p:animEffect transition="in" filter="fade">
+                                      <p:cBhvr>
+                                        <p:cTn id="25" dur="500"/>
+                                        <p:tgtEl>
+                                          <p:spTgt spid="22"/>
+                                        </p:tgtEl>
+                                      </p:cBhvr>
+                                    </p:animEffect>
+                                  </p:childTnLst>
+                                </p:cTn>
+                              </p:par>
+                              <p:par>
+                                <p:cTn id="26" presetID="10" presetClass="entr" presetSubtype="0" fill="hold" grpId="0" nodeType="withEffect">
+                                  <p:stCondLst>
+                                    <p:cond delay="0"/>
+                                  </p:stCondLst>
+                                  <p:childTnLst>
+                                    <p:set>
+                                      <p:cBhvr>
+                                        <p:cTn id="27" dur="1" fill="hold">
+                                          <p:stCondLst>
+                                            <p:cond delay="0"/>
+                                          </p:stCondLst>
+                                        </p:cTn>
+                                        <p:tgtEl>
+                                          <p:spTgt spid="23"/>
+                                        </p:tgtEl>
+                                        <p:attrNameLst>
+                                          <p:attrName>style.visibility</p:attrName>
+                                        </p:attrNameLst>
+                                      </p:cBhvr>
+                                      <p:to>
+                                        <p:strVal val="visible"/>
+                                      </p:to>
+                                    </p:set>
+                                    <p:animEffect transition="in" filter="fade">
+                                      <p:cBhvr>
+                                        <p:cTn id="28" dur="500"/>
+                                        <p:tgtEl>
+                                          <p:spTgt spid="23"/>
+                                        </p:tgtEl>
+                                      </p:cBhvr>
+                                    </p:animEffect>
+                                  </p:childTnLst>
+                                </p:cTn>
+                              </p:par>
+                            </p:childTnLst>
+                          </p:cTn>
+                        </p:par>
+                      </p:childTnLst>
+                    </p:cTn>
+                  </p:par>
+                </p:childTnLst>
+              </p:cTn>
+              <p:prevCondLst>
+                <p:cond evt="onPrev" delay="0">
+                  <p:tgtEl>
+                    <p:sldTgt/>
+                  </p:tgtEl>
+                </p:cond>
+              </p:prevCondLst>
+              <p:nextCondLst>
+                <p:cond evt="onNext" delay="0">
+                  <p:tgtEl>
+                    <p:sldTgt/>
+                  </p:tgtEl>
+                </p:cond>
+              </p:nextCondLst>
+            </p:seq>
+          </p:childTnLst>
+        </p:cTn>
+      </p:par>
+    </p:tnLst>
+    <p:bldLst>
+      <p:bldP spid="16" grpId="0"/>
+      <p:bldP spid="21" grpId="0"/>
+      <p:bldP spid="22" grpId="0"/>
+      <p:bldP spid="23" grpId="0"/>
+    </p:bldLst>
+  </p:timing>
 </p:sld>
 </file>
 

</xml_diff>

<commit_message>
Tweaks to functions and PowerPoint visual
</commit_message>
<xml_diff>
--- a/Images/All ADF Activities.pptx
+++ b/Images/All ADF Activities.pptx
@@ -2,16 +2,17 @@
 <file path=ppt/presentation.xml><?xml version="1.0" encoding="utf-8"?>
 <p:presentation xmlns:a="http://schemas.openxmlformats.org/drawingml/2006/main" xmlns:r="http://schemas.openxmlformats.org/officeDocument/2006/relationships" xmlns:p="http://schemas.openxmlformats.org/presentationml/2006/main" saveSubsetFonts="1">
   <p:sldMasterIdLst>
-    <p:sldMasterId id="2147483660" r:id="rId1"/>
+    <p:sldMasterId id="2147483672" r:id="rId1"/>
   </p:sldMasterIdLst>
   <p:sldIdLst>
     <p:sldId id="257" r:id="rId2"/>
     <p:sldId id="258" r:id="rId3"/>
     <p:sldId id="259" r:id="rId4"/>
     <p:sldId id="261" r:id="rId5"/>
-    <p:sldId id="260" r:id="rId6"/>
+    <p:sldId id="262" r:id="rId6"/>
+    <p:sldId id="260" r:id="rId7"/>
   </p:sldIdLst>
-  <p:sldSz cx="12192000" cy="10799763"/>
+  <p:sldSz cx="12599988" cy="12599988"/>
   <p:notesSz cx="6858000" cy="9144000"/>
   <p:defaultTextStyle>
     <a:defPPr>
@@ -145,15 +146,15 @@
         </p:nvSpPr>
         <p:spPr>
           <a:xfrm>
-            <a:off x="914400" y="1767462"/>
-            <a:ext cx="10363200" cy="3759917"/>
+            <a:off x="944999" y="2062083"/>
+            <a:ext cx="10709990" cy="4386662"/>
           </a:xfrm>
         </p:spPr>
         <p:txBody>
           <a:bodyPr anchor="b"/>
           <a:lstStyle>
             <a:lvl1pPr algn="ctr">
-              <a:defRPr sz="8000"/>
+              <a:defRPr sz="8268"/>
             </a:lvl1pPr>
           </a:lstStyle>
           <a:p>
@@ -177,8 +178,8 @@
         </p:nvSpPr>
         <p:spPr>
           <a:xfrm>
-            <a:off x="1524000" y="5672376"/>
-            <a:ext cx="9144000" cy="2607442"/>
+            <a:off x="1574999" y="6617911"/>
+            <a:ext cx="9449991" cy="3042080"/>
           </a:xfrm>
         </p:spPr>
         <p:txBody>
@@ -186,39 +187,39 @@
           <a:lstStyle>
             <a:lvl1pPr marL="0" indent="0" algn="ctr">
               <a:buNone/>
-              <a:defRPr sz="3200"/>
+              <a:defRPr sz="3307"/>
             </a:lvl1pPr>
-            <a:lvl2pPr marL="609585" indent="0" algn="ctr">
+            <a:lvl2pPr marL="630022" indent="0" algn="ctr">
               <a:buNone/>
-              <a:defRPr sz="2667"/>
+              <a:defRPr sz="2756"/>
             </a:lvl2pPr>
-            <a:lvl3pPr marL="1219170" indent="0" algn="ctr">
+            <a:lvl3pPr marL="1260043" indent="0" algn="ctr">
               <a:buNone/>
-              <a:defRPr sz="2400"/>
+              <a:defRPr sz="2480"/>
             </a:lvl3pPr>
-            <a:lvl4pPr marL="1828754" indent="0" algn="ctr">
+            <a:lvl4pPr marL="1890065" indent="0" algn="ctr">
               <a:buNone/>
-              <a:defRPr sz="2133"/>
+              <a:defRPr sz="2205"/>
             </a:lvl4pPr>
-            <a:lvl5pPr marL="2438339" indent="0" algn="ctr">
+            <a:lvl5pPr marL="2520086" indent="0" algn="ctr">
               <a:buNone/>
-              <a:defRPr sz="2133"/>
+              <a:defRPr sz="2205"/>
             </a:lvl5pPr>
-            <a:lvl6pPr marL="3047924" indent="0" algn="ctr">
+            <a:lvl6pPr marL="3150108" indent="0" algn="ctr">
               <a:buNone/>
-              <a:defRPr sz="2133"/>
+              <a:defRPr sz="2205"/>
             </a:lvl6pPr>
-            <a:lvl7pPr marL="3657509" indent="0" algn="ctr">
+            <a:lvl7pPr marL="3780130" indent="0" algn="ctr">
               <a:buNone/>
-              <a:defRPr sz="2133"/>
+              <a:defRPr sz="2205"/>
             </a:lvl7pPr>
-            <a:lvl8pPr marL="4267093" indent="0" algn="ctr">
+            <a:lvl8pPr marL="4410151" indent="0" algn="ctr">
               <a:buNone/>
-              <a:defRPr sz="2133"/>
+              <a:defRPr sz="2205"/>
             </a:lvl8pPr>
-            <a:lvl9pPr marL="4876678" indent="0" algn="ctr">
+            <a:lvl9pPr marL="5040173" indent="0" algn="ctr">
               <a:buNone/>
-              <a:defRPr sz="2133"/>
+              <a:defRPr sz="2205"/>
             </a:lvl9pPr>
           </a:lstStyle>
           <a:p>
@@ -247,7 +248,7 @@
           <a:p>
             <a:fld id="{1F80DB50-5271-4B1A-976D-0A7715B55622}" type="datetimeFigureOut">
               <a:rPr lang="en-GB" smtClean="0"/>
-              <a:t>31/03/2020</a:t>
+              <a:t>07/04/2020</a:t>
             </a:fld>
             <a:endParaRPr lang="en-GB"/>
           </a:p>
@@ -298,7 +299,7 @@
     </p:spTree>
     <p:extLst>
       <p:ext uri="{BB962C8B-B14F-4D97-AF65-F5344CB8AC3E}">
-        <p14:creationId xmlns:p14="http://schemas.microsoft.com/office/powerpoint/2010/main" val="3440236250"/>
+        <p14:creationId xmlns:p14="http://schemas.microsoft.com/office/powerpoint/2010/main" val="4189068272"/>
       </p:ext>
     </p:extLst>
   </p:cSld>
@@ -417,7 +418,7 @@
           <a:p>
             <a:fld id="{1F80DB50-5271-4B1A-976D-0A7715B55622}" type="datetimeFigureOut">
               <a:rPr lang="en-GB" smtClean="0"/>
-              <a:t>31/03/2020</a:t>
+              <a:t>07/04/2020</a:t>
             </a:fld>
             <a:endParaRPr lang="en-GB"/>
           </a:p>
@@ -468,7 +469,7 @@
     </p:spTree>
     <p:extLst>
       <p:ext uri="{BB962C8B-B14F-4D97-AF65-F5344CB8AC3E}">
-        <p14:creationId xmlns:p14="http://schemas.microsoft.com/office/powerpoint/2010/main" val="2882513047"/>
+        <p14:creationId xmlns:p14="http://schemas.microsoft.com/office/powerpoint/2010/main" val="2989490021"/>
       </p:ext>
     </p:extLst>
   </p:cSld>
@@ -507,8 +508,8 @@
         </p:nvSpPr>
         <p:spPr>
           <a:xfrm>
-            <a:off x="8724901" y="574987"/>
-            <a:ext cx="2628900" cy="9152300"/>
+            <a:off x="9016867" y="670833"/>
+            <a:ext cx="2716872" cy="10677907"/>
           </a:xfrm>
         </p:spPr>
         <p:txBody>
@@ -535,8 +536,8 @@
         </p:nvSpPr>
         <p:spPr>
           <a:xfrm>
-            <a:off x="838201" y="574987"/>
-            <a:ext cx="7734300" cy="9152300"/>
+            <a:off x="866250" y="670833"/>
+            <a:ext cx="7993117" cy="10677907"/>
           </a:xfrm>
         </p:spPr>
         <p:txBody>
@@ -597,7 +598,7 @@
           <a:p>
             <a:fld id="{1F80DB50-5271-4B1A-976D-0A7715B55622}" type="datetimeFigureOut">
               <a:rPr lang="en-GB" smtClean="0"/>
-              <a:t>31/03/2020</a:t>
+              <a:t>07/04/2020</a:t>
             </a:fld>
             <a:endParaRPr lang="en-GB"/>
           </a:p>
@@ -648,7 +649,7 @@
     </p:spTree>
     <p:extLst>
       <p:ext uri="{BB962C8B-B14F-4D97-AF65-F5344CB8AC3E}">
-        <p14:creationId xmlns:p14="http://schemas.microsoft.com/office/powerpoint/2010/main" val="4023126191"/>
+        <p14:creationId xmlns:p14="http://schemas.microsoft.com/office/powerpoint/2010/main" val="2316592601"/>
       </p:ext>
     </p:extLst>
   </p:cSld>
@@ -767,7 +768,7 @@
           <a:p>
             <a:fld id="{1F80DB50-5271-4B1A-976D-0A7715B55622}" type="datetimeFigureOut">
               <a:rPr lang="en-GB" smtClean="0"/>
-              <a:t>31/03/2020</a:t>
+              <a:t>07/04/2020</a:t>
             </a:fld>
             <a:endParaRPr lang="en-GB"/>
           </a:p>
@@ -818,7 +819,7 @@
     </p:spTree>
     <p:extLst>
       <p:ext uri="{BB962C8B-B14F-4D97-AF65-F5344CB8AC3E}">
-        <p14:creationId xmlns:p14="http://schemas.microsoft.com/office/powerpoint/2010/main" val="1987097556"/>
+        <p14:creationId xmlns:p14="http://schemas.microsoft.com/office/powerpoint/2010/main" val="1087156337"/>
       </p:ext>
     </p:extLst>
   </p:cSld>
@@ -857,15 +858,15 @@
         </p:nvSpPr>
         <p:spPr>
           <a:xfrm>
-            <a:off x="831851" y="2692444"/>
-            <a:ext cx="10515600" cy="4492401"/>
+            <a:off x="859687" y="3141251"/>
+            <a:ext cx="10867490" cy="5241244"/>
           </a:xfrm>
         </p:spPr>
         <p:txBody>
           <a:bodyPr anchor="b"/>
           <a:lstStyle>
             <a:lvl1pPr>
-              <a:defRPr sz="8000"/>
+              <a:defRPr sz="8268"/>
             </a:lvl1pPr>
           </a:lstStyle>
           <a:p>
@@ -889,8 +890,8 @@
         </p:nvSpPr>
         <p:spPr>
           <a:xfrm>
-            <a:off x="831851" y="7227345"/>
-            <a:ext cx="10515600" cy="2362447"/>
+            <a:off x="859687" y="8432079"/>
+            <a:ext cx="10867490" cy="2756246"/>
           </a:xfrm>
         </p:spPr>
         <p:txBody>
@@ -898,15 +899,15 @@
           <a:lstStyle>
             <a:lvl1pPr marL="0" indent="0">
               <a:buNone/>
-              <a:defRPr sz="3200">
+              <a:defRPr sz="3307">
                 <a:solidFill>
                   <a:schemeClr val="tx1"/>
                 </a:solidFill>
               </a:defRPr>
             </a:lvl1pPr>
-            <a:lvl2pPr marL="609585" indent="0">
+            <a:lvl2pPr marL="630022" indent="0">
               <a:buNone/>
-              <a:defRPr sz="2667">
+              <a:defRPr sz="2756">
                 <a:solidFill>
                   <a:schemeClr val="tx1">
                     <a:tint val="75000"/>
@@ -914,9 +915,9 @@
                 </a:solidFill>
               </a:defRPr>
             </a:lvl2pPr>
-            <a:lvl3pPr marL="1219170" indent="0">
+            <a:lvl3pPr marL="1260043" indent="0">
               <a:buNone/>
-              <a:defRPr sz="2400">
+              <a:defRPr sz="2480">
                 <a:solidFill>
                   <a:schemeClr val="tx1">
                     <a:tint val="75000"/>
@@ -924,9 +925,9 @@
                 </a:solidFill>
               </a:defRPr>
             </a:lvl3pPr>
-            <a:lvl4pPr marL="1828754" indent="0">
+            <a:lvl4pPr marL="1890065" indent="0">
               <a:buNone/>
-              <a:defRPr sz="2133">
+              <a:defRPr sz="2205">
                 <a:solidFill>
                   <a:schemeClr val="tx1">
                     <a:tint val="75000"/>
@@ -934,9 +935,9 @@
                 </a:solidFill>
               </a:defRPr>
             </a:lvl4pPr>
-            <a:lvl5pPr marL="2438339" indent="0">
+            <a:lvl5pPr marL="2520086" indent="0">
               <a:buNone/>
-              <a:defRPr sz="2133">
+              <a:defRPr sz="2205">
                 <a:solidFill>
                   <a:schemeClr val="tx1">
                     <a:tint val="75000"/>
@@ -944,9 +945,9 @@
                 </a:solidFill>
               </a:defRPr>
             </a:lvl5pPr>
-            <a:lvl6pPr marL="3047924" indent="0">
+            <a:lvl6pPr marL="3150108" indent="0">
               <a:buNone/>
-              <a:defRPr sz="2133">
+              <a:defRPr sz="2205">
                 <a:solidFill>
                   <a:schemeClr val="tx1">
                     <a:tint val="75000"/>
@@ -954,9 +955,9 @@
                 </a:solidFill>
               </a:defRPr>
             </a:lvl6pPr>
-            <a:lvl7pPr marL="3657509" indent="0">
+            <a:lvl7pPr marL="3780130" indent="0">
               <a:buNone/>
-              <a:defRPr sz="2133">
+              <a:defRPr sz="2205">
                 <a:solidFill>
                   <a:schemeClr val="tx1">
                     <a:tint val="75000"/>
@@ -964,9 +965,9 @@
                 </a:solidFill>
               </a:defRPr>
             </a:lvl7pPr>
-            <a:lvl8pPr marL="4267093" indent="0">
+            <a:lvl8pPr marL="4410151" indent="0">
               <a:buNone/>
-              <a:defRPr sz="2133">
+              <a:defRPr sz="2205">
                 <a:solidFill>
                   <a:schemeClr val="tx1">
                     <a:tint val="75000"/>
@@ -974,9 +975,9 @@
                 </a:solidFill>
               </a:defRPr>
             </a:lvl8pPr>
-            <a:lvl9pPr marL="4876678" indent="0">
+            <a:lvl9pPr marL="5040173" indent="0">
               <a:buNone/>
-              <a:defRPr sz="2133">
+              <a:defRPr sz="2205">
                 <a:solidFill>
                   <a:schemeClr val="tx1">
                     <a:tint val="75000"/>
@@ -1011,7 +1012,7 @@
           <a:p>
             <a:fld id="{1F80DB50-5271-4B1A-976D-0A7715B55622}" type="datetimeFigureOut">
               <a:rPr lang="en-GB" smtClean="0"/>
-              <a:t>31/03/2020</a:t>
+              <a:t>07/04/2020</a:t>
             </a:fld>
             <a:endParaRPr lang="en-GB"/>
           </a:p>
@@ -1062,7 +1063,7 @@
     </p:spTree>
     <p:extLst>
       <p:ext uri="{BB962C8B-B14F-4D97-AF65-F5344CB8AC3E}">
-        <p14:creationId xmlns:p14="http://schemas.microsoft.com/office/powerpoint/2010/main" val="3875938107"/>
+        <p14:creationId xmlns:p14="http://schemas.microsoft.com/office/powerpoint/2010/main" val="428378815"/>
       </p:ext>
     </p:extLst>
   </p:cSld>
@@ -1124,8 +1125,8 @@
         </p:nvSpPr>
         <p:spPr>
           <a:xfrm>
-            <a:off x="838200" y="2874937"/>
-            <a:ext cx="5181600" cy="6852350"/>
+            <a:off x="866249" y="3354163"/>
+            <a:ext cx="5354995" cy="7994577"/>
           </a:xfrm>
         </p:spPr>
         <p:txBody>
@@ -1181,8 +1182,8 @@
         </p:nvSpPr>
         <p:spPr>
           <a:xfrm>
-            <a:off x="6172200" y="2874937"/>
-            <a:ext cx="5181600" cy="6852350"/>
+            <a:off x="6378744" y="3354163"/>
+            <a:ext cx="5354995" cy="7994577"/>
           </a:xfrm>
         </p:spPr>
         <p:txBody>
@@ -1243,7 +1244,7 @@
           <a:p>
             <a:fld id="{1F80DB50-5271-4B1A-976D-0A7715B55622}" type="datetimeFigureOut">
               <a:rPr lang="en-GB" smtClean="0"/>
-              <a:t>31/03/2020</a:t>
+              <a:t>07/04/2020</a:t>
             </a:fld>
             <a:endParaRPr lang="en-GB"/>
           </a:p>
@@ -1294,7 +1295,7 @@
     </p:spTree>
     <p:extLst>
       <p:ext uri="{BB962C8B-B14F-4D97-AF65-F5344CB8AC3E}">
-        <p14:creationId xmlns:p14="http://schemas.microsoft.com/office/powerpoint/2010/main" val="2273438764"/>
+        <p14:creationId xmlns:p14="http://schemas.microsoft.com/office/powerpoint/2010/main" val="743543654"/>
       </p:ext>
     </p:extLst>
   </p:cSld>
@@ -1333,8 +1334,8 @@
         </p:nvSpPr>
         <p:spPr>
           <a:xfrm>
-            <a:off x="839788" y="574990"/>
-            <a:ext cx="10515600" cy="2087455"/>
+            <a:off x="867890" y="670836"/>
+            <a:ext cx="10867490" cy="2435415"/>
           </a:xfrm>
         </p:spPr>
         <p:txBody>
@@ -1361,8 +1362,8 @@
         </p:nvSpPr>
         <p:spPr>
           <a:xfrm>
-            <a:off x="839789" y="2647443"/>
-            <a:ext cx="5157787" cy="1297471"/>
+            <a:off x="867892" y="3088748"/>
+            <a:ext cx="5330385" cy="1513748"/>
           </a:xfrm>
         </p:spPr>
         <p:txBody>
@@ -1370,39 +1371,39 @@
           <a:lstStyle>
             <a:lvl1pPr marL="0" indent="0">
               <a:buNone/>
-              <a:defRPr sz="3200" b="1"/>
+              <a:defRPr sz="3307" b="1"/>
             </a:lvl1pPr>
-            <a:lvl2pPr marL="609585" indent="0">
+            <a:lvl2pPr marL="630022" indent="0">
               <a:buNone/>
-              <a:defRPr sz="2667" b="1"/>
+              <a:defRPr sz="2756" b="1"/>
             </a:lvl2pPr>
-            <a:lvl3pPr marL="1219170" indent="0">
+            <a:lvl3pPr marL="1260043" indent="0">
               <a:buNone/>
-              <a:defRPr sz="2400" b="1"/>
+              <a:defRPr sz="2480" b="1"/>
             </a:lvl3pPr>
-            <a:lvl4pPr marL="1828754" indent="0">
+            <a:lvl4pPr marL="1890065" indent="0">
               <a:buNone/>
-              <a:defRPr sz="2133" b="1"/>
+              <a:defRPr sz="2205" b="1"/>
             </a:lvl4pPr>
-            <a:lvl5pPr marL="2438339" indent="0">
+            <a:lvl5pPr marL="2520086" indent="0">
               <a:buNone/>
-              <a:defRPr sz="2133" b="1"/>
+              <a:defRPr sz="2205" b="1"/>
             </a:lvl5pPr>
-            <a:lvl6pPr marL="3047924" indent="0">
+            <a:lvl6pPr marL="3150108" indent="0">
               <a:buNone/>
-              <a:defRPr sz="2133" b="1"/>
+              <a:defRPr sz="2205" b="1"/>
             </a:lvl6pPr>
-            <a:lvl7pPr marL="3657509" indent="0">
+            <a:lvl7pPr marL="3780130" indent="0">
               <a:buNone/>
-              <a:defRPr sz="2133" b="1"/>
+              <a:defRPr sz="2205" b="1"/>
             </a:lvl7pPr>
-            <a:lvl8pPr marL="4267093" indent="0">
+            <a:lvl8pPr marL="4410151" indent="0">
               <a:buNone/>
-              <a:defRPr sz="2133" b="1"/>
+              <a:defRPr sz="2205" b="1"/>
             </a:lvl8pPr>
-            <a:lvl9pPr marL="4876678" indent="0">
+            <a:lvl9pPr marL="5040173" indent="0">
               <a:buNone/>
-              <a:defRPr sz="2133" b="1"/>
+              <a:defRPr sz="2205" b="1"/>
             </a:lvl9pPr>
           </a:lstStyle>
           <a:p>
@@ -1426,8 +1427,8 @@
         </p:nvSpPr>
         <p:spPr>
           <a:xfrm>
-            <a:off x="839789" y="3944914"/>
-            <a:ext cx="5157787" cy="5802373"/>
+            <a:off x="867892" y="4602496"/>
+            <a:ext cx="5330385" cy="6769578"/>
           </a:xfrm>
         </p:spPr>
         <p:txBody>
@@ -1483,8 +1484,8 @@
         </p:nvSpPr>
         <p:spPr>
           <a:xfrm>
-            <a:off x="6172201" y="2647443"/>
-            <a:ext cx="5183188" cy="1297471"/>
+            <a:off x="6378745" y="3088748"/>
+            <a:ext cx="5356636" cy="1513748"/>
           </a:xfrm>
         </p:spPr>
         <p:txBody>
@@ -1492,39 +1493,39 @@
           <a:lstStyle>
             <a:lvl1pPr marL="0" indent="0">
               <a:buNone/>
-              <a:defRPr sz="3200" b="1"/>
+              <a:defRPr sz="3307" b="1"/>
             </a:lvl1pPr>
-            <a:lvl2pPr marL="609585" indent="0">
+            <a:lvl2pPr marL="630022" indent="0">
               <a:buNone/>
-              <a:defRPr sz="2667" b="1"/>
+              <a:defRPr sz="2756" b="1"/>
             </a:lvl2pPr>
-            <a:lvl3pPr marL="1219170" indent="0">
+            <a:lvl3pPr marL="1260043" indent="0">
               <a:buNone/>
-              <a:defRPr sz="2400" b="1"/>
+              <a:defRPr sz="2480" b="1"/>
             </a:lvl3pPr>
-            <a:lvl4pPr marL="1828754" indent="0">
+            <a:lvl4pPr marL="1890065" indent="0">
               <a:buNone/>
-              <a:defRPr sz="2133" b="1"/>
+              <a:defRPr sz="2205" b="1"/>
             </a:lvl4pPr>
-            <a:lvl5pPr marL="2438339" indent="0">
+            <a:lvl5pPr marL="2520086" indent="0">
               <a:buNone/>
-              <a:defRPr sz="2133" b="1"/>
+              <a:defRPr sz="2205" b="1"/>
             </a:lvl5pPr>
-            <a:lvl6pPr marL="3047924" indent="0">
+            <a:lvl6pPr marL="3150108" indent="0">
               <a:buNone/>
-              <a:defRPr sz="2133" b="1"/>
+              <a:defRPr sz="2205" b="1"/>
             </a:lvl6pPr>
-            <a:lvl7pPr marL="3657509" indent="0">
+            <a:lvl7pPr marL="3780130" indent="0">
               <a:buNone/>
-              <a:defRPr sz="2133" b="1"/>
+              <a:defRPr sz="2205" b="1"/>
             </a:lvl7pPr>
-            <a:lvl8pPr marL="4267093" indent="0">
+            <a:lvl8pPr marL="4410151" indent="0">
               <a:buNone/>
-              <a:defRPr sz="2133" b="1"/>
+              <a:defRPr sz="2205" b="1"/>
             </a:lvl8pPr>
-            <a:lvl9pPr marL="4876678" indent="0">
+            <a:lvl9pPr marL="5040173" indent="0">
               <a:buNone/>
-              <a:defRPr sz="2133" b="1"/>
+              <a:defRPr sz="2205" b="1"/>
             </a:lvl9pPr>
           </a:lstStyle>
           <a:p>
@@ -1548,8 +1549,8 @@
         </p:nvSpPr>
         <p:spPr>
           <a:xfrm>
-            <a:off x="6172201" y="3944914"/>
-            <a:ext cx="5183188" cy="5802373"/>
+            <a:off x="6378745" y="4602496"/>
+            <a:ext cx="5356636" cy="6769578"/>
           </a:xfrm>
         </p:spPr>
         <p:txBody>
@@ -1610,7 +1611,7 @@
           <a:p>
             <a:fld id="{1F80DB50-5271-4B1A-976D-0A7715B55622}" type="datetimeFigureOut">
               <a:rPr lang="en-GB" smtClean="0"/>
-              <a:t>31/03/2020</a:t>
+              <a:t>07/04/2020</a:t>
             </a:fld>
             <a:endParaRPr lang="en-GB"/>
           </a:p>
@@ -1661,7 +1662,7 @@
     </p:spTree>
     <p:extLst>
       <p:ext uri="{BB962C8B-B14F-4D97-AF65-F5344CB8AC3E}">
-        <p14:creationId xmlns:p14="http://schemas.microsoft.com/office/powerpoint/2010/main" val="3899613517"/>
+        <p14:creationId xmlns:p14="http://schemas.microsoft.com/office/powerpoint/2010/main" val="138047795"/>
       </p:ext>
     </p:extLst>
   </p:cSld>
@@ -1728,7 +1729,7 @@
           <a:p>
             <a:fld id="{1F80DB50-5271-4B1A-976D-0A7715B55622}" type="datetimeFigureOut">
               <a:rPr lang="en-GB" smtClean="0"/>
-              <a:t>31/03/2020</a:t>
+              <a:t>07/04/2020</a:t>
             </a:fld>
             <a:endParaRPr lang="en-GB"/>
           </a:p>
@@ -1779,7 +1780,7 @@
     </p:spTree>
     <p:extLst>
       <p:ext uri="{BB962C8B-B14F-4D97-AF65-F5344CB8AC3E}">
-        <p14:creationId xmlns:p14="http://schemas.microsoft.com/office/powerpoint/2010/main" val="2357814314"/>
+        <p14:creationId xmlns:p14="http://schemas.microsoft.com/office/powerpoint/2010/main" val="2966297590"/>
       </p:ext>
     </p:extLst>
   </p:cSld>
@@ -1823,7 +1824,7 @@
           <a:p>
             <a:fld id="{1F80DB50-5271-4B1A-976D-0A7715B55622}" type="datetimeFigureOut">
               <a:rPr lang="en-GB" smtClean="0"/>
-              <a:t>31/03/2020</a:t>
+              <a:t>07/04/2020</a:t>
             </a:fld>
             <a:endParaRPr lang="en-GB"/>
           </a:p>
@@ -1874,7 +1875,7 @@
     </p:spTree>
     <p:extLst>
       <p:ext uri="{BB962C8B-B14F-4D97-AF65-F5344CB8AC3E}">
-        <p14:creationId xmlns:p14="http://schemas.microsoft.com/office/powerpoint/2010/main" val="4093149544"/>
+        <p14:creationId xmlns:p14="http://schemas.microsoft.com/office/powerpoint/2010/main" val="3640355125"/>
       </p:ext>
     </p:extLst>
   </p:cSld>
@@ -1913,15 +1914,15 @@
         </p:nvSpPr>
         <p:spPr>
           <a:xfrm>
-            <a:off x="839788" y="719984"/>
-            <a:ext cx="3932237" cy="2519945"/>
+            <a:off x="867890" y="839999"/>
+            <a:ext cx="4063824" cy="2939997"/>
           </a:xfrm>
         </p:spPr>
         <p:txBody>
           <a:bodyPr anchor="b"/>
           <a:lstStyle>
             <a:lvl1pPr>
-              <a:defRPr sz="4267"/>
+              <a:defRPr sz="4410"/>
             </a:lvl1pPr>
           </a:lstStyle>
           <a:p>
@@ -1945,39 +1946,39 @@
         </p:nvSpPr>
         <p:spPr>
           <a:xfrm>
-            <a:off x="5183188" y="1554968"/>
-            <a:ext cx="6172200" cy="7674832"/>
+            <a:off x="5356636" y="1814168"/>
+            <a:ext cx="6378744" cy="8954158"/>
           </a:xfrm>
         </p:spPr>
         <p:txBody>
           <a:bodyPr/>
           <a:lstStyle>
             <a:lvl1pPr>
-              <a:defRPr sz="4267"/>
+              <a:defRPr sz="4410"/>
             </a:lvl1pPr>
             <a:lvl2pPr>
-              <a:defRPr sz="3733"/>
+              <a:defRPr sz="3858"/>
             </a:lvl2pPr>
             <a:lvl3pPr>
-              <a:defRPr sz="3200"/>
+              <a:defRPr sz="3307"/>
             </a:lvl3pPr>
             <a:lvl4pPr>
-              <a:defRPr sz="2667"/>
+              <a:defRPr sz="2756"/>
             </a:lvl4pPr>
             <a:lvl5pPr>
-              <a:defRPr sz="2667"/>
+              <a:defRPr sz="2756"/>
             </a:lvl5pPr>
             <a:lvl6pPr>
-              <a:defRPr sz="2667"/>
+              <a:defRPr sz="2756"/>
             </a:lvl6pPr>
             <a:lvl7pPr>
-              <a:defRPr sz="2667"/>
+              <a:defRPr sz="2756"/>
             </a:lvl7pPr>
             <a:lvl8pPr>
-              <a:defRPr sz="2667"/>
+              <a:defRPr sz="2756"/>
             </a:lvl8pPr>
             <a:lvl9pPr>
-              <a:defRPr sz="2667"/>
+              <a:defRPr sz="2756"/>
             </a:lvl9pPr>
           </a:lstStyle>
           <a:p>
@@ -2030,8 +2031,8 @@
         </p:nvSpPr>
         <p:spPr>
           <a:xfrm>
-            <a:off x="839788" y="3239929"/>
-            <a:ext cx="3932237" cy="6002369"/>
+            <a:off x="867890" y="3779996"/>
+            <a:ext cx="4063824" cy="7002911"/>
           </a:xfrm>
         </p:spPr>
         <p:txBody>
@@ -2039,39 +2040,39 @@
           <a:lstStyle>
             <a:lvl1pPr marL="0" indent="0">
               <a:buNone/>
-              <a:defRPr sz="2133"/>
+              <a:defRPr sz="2205"/>
             </a:lvl1pPr>
-            <a:lvl2pPr marL="609585" indent="0">
+            <a:lvl2pPr marL="630022" indent="0">
               <a:buNone/>
-              <a:defRPr sz="1867"/>
+              <a:defRPr sz="1929"/>
             </a:lvl2pPr>
-            <a:lvl3pPr marL="1219170" indent="0">
+            <a:lvl3pPr marL="1260043" indent="0">
               <a:buNone/>
-              <a:defRPr sz="1600"/>
+              <a:defRPr sz="1654"/>
             </a:lvl3pPr>
-            <a:lvl4pPr marL="1828754" indent="0">
+            <a:lvl4pPr marL="1890065" indent="0">
               <a:buNone/>
-              <a:defRPr sz="1333"/>
+              <a:defRPr sz="1378"/>
             </a:lvl4pPr>
-            <a:lvl5pPr marL="2438339" indent="0">
+            <a:lvl5pPr marL="2520086" indent="0">
               <a:buNone/>
-              <a:defRPr sz="1333"/>
+              <a:defRPr sz="1378"/>
             </a:lvl5pPr>
-            <a:lvl6pPr marL="3047924" indent="0">
+            <a:lvl6pPr marL="3150108" indent="0">
               <a:buNone/>
-              <a:defRPr sz="1333"/>
+              <a:defRPr sz="1378"/>
             </a:lvl6pPr>
-            <a:lvl7pPr marL="3657509" indent="0">
+            <a:lvl7pPr marL="3780130" indent="0">
               <a:buNone/>
-              <a:defRPr sz="1333"/>
+              <a:defRPr sz="1378"/>
             </a:lvl7pPr>
-            <a:lvl8pPr marL="4267093" indent="0">
+            <a:lvl8pPr marL="4410151" indent="0">
               <a:buNone/>
-              <a:defRPr sz="1333"/>
+              <a:defRPr sz="1378"/>
             </a:lvl8pPr>
-            <a:lvl9pPr marL="4876678" indent="0">
+            <a:lvl9pPr marL="5040173" indent="0">
               <a:buNone/>
-              <a:defRPr sz="1333"/>
+              <a:defRPr sz="1378"/>
             </a:lvl9pPr>
           </a:lstStyle>
           <a:p>
@@ -2100,7 +2101,7 @@
           <a:p>
             <a:fld id="{1F80DB50-5271-4B1A-976D-0A7715B55622}" type="datetimeFigureOut">
               <a:rPr lang="en-GB" smtClean="0"/>
-              <a:t>31/03/2020</a:t>
+              <a:t>07/04/2020</a:t>
             </a:fld>
             <a:endParaRPr lang="en-GB"/>
           </a:p>
@@ -2151,7 +2152,7 @@
     </p:spTree>
     <p:extLst>
       <p:ext uri="{BB962C8B-B14F-4D97-AF65-F5344CB8AC3E}">
-        <p14:creationId xmlns:p14="http://schemas.microsoft.com/office/powerpoint/2010/main" val="743331835"/>
+        <p14:creationId xmlns:p14="http://schemas.microsoft.com/office/powerpoint/2010/main" val="3886216359"/>
       </p:ext>
     </p:extLst>
   </p:cSld>
@@ -2190,15 +2191,15 @@
         </p:nvSpPr>
         <p:spPr>
           <a:xfrm>
-            <a:off x="839788" y="719984"/>
-            <a:ext cx="3932237" cy="2519945"/>
+            <a:off x="867890" y="839999"/>
+            <a:ext cx="4063824" cy="2939997"/>
           </a:xfrm>
         </p:spPr>
         <p:txBody>
           <a:bodyPr anchor="b"/>
           <a:lstStyle>
             <a:lvl1pPr>
-              <a:defRPr sz="4267"/>
+              <a:defRPr sz="4410"/>
             </a:lvl1pPr>
           </a:lstStyle>
           <a:p>
@@ -2222,8 +2223,8 @@
         </p:nvSpPr>
         <p:spPr>
           <a:xfrm>
-            <a:off x="5183188" y="1554968"/>
-            <a:ext cx="6172200" cy="7674832"/>
+            <a:off x="5356636" y="1814168"/>
+            <a:ext cx="6378744" cy="8954158"/>
           </a:xfrm>
         </p:spPr>
         <p:txBody>
@@ -2231,39 +2232,39 @@
           <a:lstStyle>
             <a:lvl1pPr marL="0" indent="0">
               <a:buNone/>
-              <a:defRPr sz="4267"/>
+              <a:defRPr sz="4410"/>
             </a:lvl1pPr>
-            <a:lvl2pPr marL="609585" indent="0">
+            <a:lvl2pPr marL="630022" indent="0">
               <a:buNone/>
-              <a:defRPr sz="3733"/>
+              <a:defRPr sz="3858"/>
             </a:lvl2pPr>
-            <a:lvl3pPr marL="1219170" indent="0">
+            <a:lvl3pPr marL="1260043" indent="0">
               <a:buNone/>
-              <a:defRPr sz="3200"/>
+              <a:defRPr sz="3307"/>
             </a:lvl3pPr>
-            <a:lvl4pPr marL="1828754" indent="0">
+            <a:lvl4pPr marL="1890065" indent="0">
               <a:buNone/>
-              <a:defRPr sz="2667"/>
+              <a:defRPr sz="2756"/>
             </a:lvl4pPr>
-            <a:lvl5pPr marL="2438339" indent="0">
+            <a:lvl5pPr marL="2520086" indent="0">
               <a:buNone/>
-              <a:defRPr sz="2667"/>
+              <a:defRPr sz="2756"/>
             </a:lvl5pPr>
-            <a:lvl6pPr marL="3047924" indent="0">
+            <a:lvl6pPr marL="3150108" indent="0">
               <a:buNone/>
-              <a:defRPr sz="2667"/>
+              <a:defRPr sz="2756"/>
             </a:lvl6pPr>
-            <a:lvl7pPr marL="3657509" indent="0">
+            <a:lvl7pPr marL="3780130" indent="0">
               <a:buNone/>
-              <a:defRPr sz="2667"/>
+              <a:defRPr sz="2756"/>
             </a:lvl7pPr>
-            <a:lvl8pPr marL="4267093" indent="0">
+            <a:lvl8pPr marL="4410151" indent="0">
               <a:buNone/>
-              <a:defRPr sz="2667"/>
+              <a:defRPr sz="2756"/>
             </a:lvl8pPr>
-            <a:lvl9pPr marL="4876678" indent="0">
+            <a:lvl9pPr marL="5040173" indent="0">
               <a:buNone/>
-              <a:defRPr sz="2667"/>
+              <a:defRPr sz="2756"/>
             </a:lvl9pPr>
           </a:lstStyle>
           <a:p>
@@ -2287,8 +2288,8 @@
         </p:nvSpPr>
         <p:spPr>
           <a:xfrm>
-            <a:off x="839788" y="3239929"/>
-            <a:ext cx="3932237" cy="6002369"/>
+            <a:off x="867890" y="3779996"/>
+            <a:ext cx="4063824" cy="7002911"/>
           </a:xfrm>
         </p:spPr>
         <p:txBody>
@@ -2296,39 +2297,39 @@
           <a:lstStyle>
             <a:lvl1pPr marL="0" indent="0">
               <a:buNone/>
-              <a:defRPr sz="2133"/>
+              <a:defRPr sz="2205"/>
             </a:lvl1pPr>
-            <a:lvl2pPr marL="609585" indent="0">
+            <a:lvl2pPr marL="630022" indent="0">
               <a:buNone/>
-              <a:defRPr sz="1867"/>
+              <a:defRPr sz="1929"/>
             </a:lvl2pPr>
-            <a:lvl3pPr marL="1219170" indent="0">
+            <a:lvl3pPr marL="1260043" indent="0">
               <a:buNone/>
-              <a:defRPr sz="1600"/>
+              <a:defRPr sz="1654"/>
             </a:lvl3pPr>
-            <a:lvl4pPr marL="1828754" indent="0">
+            <a:lvl4pPr marL="1890065" indent="0">
               <a:buNone/>
-              <a:defRPr sz="1333"/>
+              <a:defRPr sz="1378"/>
             </a:lvl4pPr>
-            <a:lvl5pPr marL="2438339" indent="0">
+            <a:lvl5pPr marL="2520086" indent="0">
               <a:buNone/>
-              <a:defRPr sz="1333"/>
+              <a:defRPr sz="1378"/>
             </a:lvl5pPr>
-            <a:lvl6pPr marL="3047924" indent="0">
+            <a:lvl6pPr marL="3150108" indent="0">
               <a:buNone/>
-              <a:defRPr sz="1333"/>
+              <a:defRPr sz="1378"/>
             </a:lvl6pPr>
-            <a:lvl7pPr marL="3657509" indent="0">
+            <a:lvl7pPr marL="3780130" indent="0">
               <a:buNone/>
-              <a:defRPr sz="1333"/>
+              <a:defRPr sz="1378"/>
             </a:lvl7pPr>
-            <a:lvl8pPr marL="4267093" indent="0">
+            <a:lvl8pPr marL="4410151" indent="0">
               <a:buNone/>
-              <a:defRPr sz="1333"/>
+              <a:defRPr sz="1378"/>
             </a:lvl8pPr>
-            <a:lvl9pPr marL="4876678" indent="0">
+            <a:lvl9pPr marL="5040173" indent="0">
               <a:buNone/>
-              <a:defRPr sz="1333"/>
+              <a:defRPr sz="1378"/>
             </a:lvl9pPr>
           </a:lstStyle>
           <a:p>
@@ -2357,7 +2358,7 @@
           <a:p>
             <a:fld id="{1F80DB50-5271-4B1A-976D-0A7715B55622}" type="datetimeFigureOut">
               <a:rPr lang="en-GB" smtClean="0"/>
-              <a:t>31/03/2020</a:t>
+              <a:t>07/04/2020</a:t>
             </a:fld>
             <a:endParaRPr lang="en-GB"/>
           </a:p>
@@ -2408,7 +2409,7 @@
     </p:spTree>
     <p:extLst>
       <p:ext uri="{BB962C8B-B14F-4D97-AF65-F5344CB8AC3E}">
-        <p14:creationId xmlns:p14="http://schemas.microsoft.com/office/powerpoint/2010/main" val="209468333"/>
+        <p14:creationId xmlns:p14="http://schemas.microsoft.com/office/powerpoint/2010/main" val="1553515288"/>
       </p:ext>
     </p:extLst>
   </p:cSld>
@@ -2452,8 +2453,8 @@
         </p:nvSpPr>
         <p:spPr>
           <a:xfrm>
-            <a:off x="838200" y="574990"/>
-            <a:ext cx="10515600" cy="2087455"/>
+            <a:off x="866249" y="670836"/>
+            <a:ext cx="10867490" cy="2435415"/>
           </a:xfrm>
           <a:prstGeom prst="rect">
             <a:avLst/>
@@ -2485,8 +2486,8 @@
         </p:nvSpPr>
         <p:spPr>
           <a:xfrm>
-            <a:off x="838200" y="2874937"/>
-            <a:ext cx="10515600" cy="6852350"/>
+            <a:off x="866249" y="3354163"/>
+            <a:ext cx="10867490" cy="7994577"/>
           </a:xfrm>
           <a:prstGeom prst="rect">
             <a:avLst/>
@@ -2547,8 +2548,8 @@
         </p:nvSpPr>
         <p:spPr>
           <a:xfrm>
-            <a:off x="838200" y="10009783"/>
-            <a:ext cx="2743200" cy="574987"/>
+            <a:off x="866249" y="11678325"/>
+            <a:ext cx="2834997" cy="670833"/>
           </a:xfrm>
           <a:prstGeom prst="rect">
             <a:avLst/>
@@ -2558,7 +2559,7 @@
           <a:bodyPr vert="horz" lIns="91440" tIns="45720" rIns="91440" bIns="45720" rtlCol="0" anchor="ctr"/>
           <a:lstStyle>
             <a:lvl1pPr algn="l">
-              <a:defRPr sz="1600">
+              <a:defRPr sz="1654">
                 <a:solidFill>
                   <a:schemeClr val="tx1">
                     <a:tint val="75000"/>
@@ -2570,7 +2571,7 @@
           <a:p>
             <a:fld id="{1F80DB50-5271-4B1A-976D-0A7715B55622}" type="datetimeFigureOut">
               <a:rPr lang="en-GB" smtClean="0"/>
-              <a:t>31/03/2020</a:t>
+              <a:t>07/04/2020</a:t>
             </a:fld>
             <a:endParaRPr lang="en-GB"/>
           </a:p>
@@ -2588,8 +2589,8 @@
         </p:nvSpPr>
         <p:spPr>
           <a:xfrm>
-            <a:off x="4038600" y="10009783"/>
-            <a:ext cx="4114800" cy="574987"/>
+            <a:off x="4173746" y="11678325"/>
+            <a:ext cx="4252496" cy="670833"/>
           </a:xfrm>
           <a:prstGeom prst="rect">
             <a:avLst/>
@@ -2599,7 +2600,7 @@
           <a:bodyPr vert="horz" lIns="91440" tIns="45720" rIns="91440" bIns="45720" rtlCol="0" anchor="ctr"/>
           <a:lstStyle>
             <a:lvl1pPr algn="ctr">
-              <a:defRPr sz="1600">
+              <a:defRPr sz="1654">
                 <a:solidFill>
                   <a:schemeClr val="tx1">
                     <a:tint val="75000"/>
@@ -2625,8 +2626,8 @@
         </p:nvSpPr>
         <p:spPr>
           <a:xfrm>
-            <a:off x="8610600" y="10009783"/>
-            <a:ext cx="2743200" cy="574987"/>
+            <a:off x="8898742" y="11678325"/>
+            <a:ext cx="2834997" cy="670833"/>
           </a:xfrm>
           <a:prstGeom prst="rect">
             <a:avLst/>
@@ -2636,7 +2637,7 @@
           <a:bodyPr vert="horz" lIns="91440" tIns="45720" rIns="91440" bIns="45720" rtlCol="0" anchor="ctr"/>
           <a:lstStyle>
             <a:lvl1pPr algn="r">
-              <a:defRPr sz="1600">
+              <a:defRPr sz="1654">
                 <a:solidFill>
                   <a:schemeClr val="tx1">
                     <a:tint val="75000"/>
@@ -2657,27 +2658,27 @@
     </p:spTree>
     <p:extLst>
       <p:ext uri="{BB962C8B-B14F-4D97-AF65-F5344CB8AC3E}">
-        <p14:creationId xmlns:p14="http://schemas.microsoft.com/office/powerpoint/2010/main" val="3317130137"/>
+        <p14:creationId xmlns:p14="http://schemas.microsoft.com/office/powerpoint/2010/main" val="3198898577"/>
       </p:ext>
     </p:extLst>
   </p:cSld>
   <p:clrMap bg1="lt1" tx1="dk1" bg2="lt2" tx2="dk2" accent1="accent1" accent2="accent2" accent3="accent3" accent4="accent4" accent5="accent5" accent6="accent6" hlink="hlink" folHlink="folHlink"/>
   <p:sldLayoutIdLst>
-    <p:sldLayoutId id="2147483661" r:id="rId1"/>
-    <p:sldLayoutId id="2147483662" r:id="rId2"/>
-    <p:sldLayoutId id="2147483663" r:id="rId3"/>
-    <p:sldLayoutId id="2147483664" r:id="rId4"/>
-    <p:sldLayoutId id="2147483665" r:id="rId5"/>
-    <p:sldLayoutId id="2147483666" r:id="rId6"/>
-    <p:sldLayoutId id="2147483667" r:id="rId7"/>
-    <p:sldLayoutId id="2147483668" r:id="rId8"/>
-    <p:sldLayoutId id="2147483669" r:id="rId9"/>
-    <p:sldLayoutId id="2147483670" r:id="rId10"/>
-    <p:sldLayoutId id="2147483671" r:id="rId11"/>
+    <p:sldLayoutId id="2147483673" r:id="rId1"/>
+    <p:sldLayoutId id="2147483674" r:id="rId2"/>
+    <p:sldLayoutId id="2147483675" r:id="rId3"/>
+    <p:sldLayoutId id="2147483676" r:id="rId4"/>
+    <p:sldLayoutId id="2147483677" r:id="rId5"/>
+    <p:sldLayoutId id="2147483678" r:id="rId6"/>
+    <p:sldLayoutId id="2147483679" r:id="rId7"/>
+    <p:sldLayoutId id="2147483680" r:id="rId8"/>
+    <p:sldLayoutId id="2147483681" r:id="rId9"/>
+    <p:sldLayoutId id="2147483682" r:id="rId10"/>
+    <p:sldLayoutId id="2147483683" r:id="rId11"/>
   </p:sldLayoutIdLst>
   <p:txStyles>
     <p:titleStyle>
-      <a:lvl1pPr algn="l" defTabSz="1219170" rtl="0" eaLnBrk="1" latinLnBrk="0" hangingPunct="1">
+      <a:lvl1pPr algn="l" defTabSz="1260043" rtl="0" eaLnBrk="1" latinLnBrk="0" hangingPunct="1">
         <a:lnSpc>
           <a:spcPct val="90000"/>
         </a:lnSpc>
@@ -2685,7 +2686,7 @@
           <a:spcPct val="0"/>
         </a:spcBef>
         <a:buNone/>
-        <a:defRPr sz="5867" kern="1200">
+        <a:defRPr sz="6063" kern="1200">
           <a:solidFill>
             <a:schemeClr val="tx1"/>
           </a:solidFill>
@@ -2696,16 +2697,16 @@
       </a:lvl1pPr>
     </p:titleStyle>
     <p:bodyStyle>
-      <a:lvl1pPr marL="304792" indent="-304792" algn="l" defTabSz="1219170" rtl="0" eaLnBrk="1" latinLnBrk="0" hangingPunct="1">
+      <a:lvl1pPr marL="315011" indent="-315011" algn="l" defTabSz="1260043" rtl="0" eaLnBrk="1" latinLnBrk="0" hangingPunct="1">
         <a:lnSpc>
           <a:spcPct val="90000"/>
         </a:lnSpc>
         <a:spcBef>
-          <a:spcPts val="1333"/>
+          <a:spcPts val="1378"/>
         </a:spcBef>
         <a:buFont typeface="Arial" panose="020B0604020202020204" pitchFamily="34" charset="0"/>
         <a:buChar char="•"/>
-        <a:defRPr sz="3733" kern="1200">
+        <a:defRPr sz="3858" kern="1200">
           <a:solidFill>
             <a:schemeClr val="tx1"/>
           </a:solidFill>
@@ -2714,16 +2715,16 @@
           <a:cs typeface="+mn-cs"/>
         </a:defRPr>
       </a:lvl1pPr>
-      <a:lvl2pPr marL="914377" indent="-304792" algn="l" defTabSz="1219170" rtl="0" eaLnBrk="1" latinLnBrk="0" hangingPunct="1">
+      <a:lvl2pPr marL="945032" indent="-315011" algn="l" defTabSz="1260043" rtl="0" eaLnBrk="1" latinLnBrk="0" hangingPunct="1">
         <a:lnSpc>
           <a:spcPct val="90000"/>
         </a:lnSpc>
         <a:spcBef>
-          <a:spcPts val="667"/>
+          <a:spcPts val="689"/>
         </a:spcBef>
         <a:buFont typeface="Arial" panose="020B0604020202020204" pitchFamily="34" charset="0"/>
         <a:buChar char="•"/>
-        <a:defRPr sz="3200" kern="1200">
+        <a:defRPr sz="3307" kern="1200">
           <a:solidFill>
             <a:schemeClr val="tx1"/>
           </a:solidFill>
@@ -2732,16 +2733,16 @@
           <a:cs typeface="+mn-cs"/>
         </a:defRPr>
       </a:lvl2pPr>
-      <a:lvl3pPr marL="1523962" indent="-304792" algn="l" defTabSz="1219170" rtl="0" eaLnBrk="1" latinLnBrk="0" hangingPunct="1">
+      <a:lvl3pPr marL="1575054" indent="-315011" algn="l" defTabSz="1260043" rtl="0" eaLnBrk="1" latinLnBrk="0" hangingPunct="1">
         <a:lnSpc>
           <a:spcPct val="90000"/>
         </a:lnSpc>
         <a:spcBef>
-          <a:spcPts val="667"/>
+          <a:spcPts val="689"/>
         </a:spcBef>
         <a:buFont typeface="Arial" panose="020B0604020202020204" pitchFamily="34" charset="0"/>
         <a:buChar char="•"/>
-        <a:defRPr sz="2667" kern="1200">
+        <a:defRPr sz="2756" kern="1200">
           <a:solidFill>
             <a:schemeClr val="tx1"/>
           </a:solidFill>
@@ -2750,16 +2751,16 @@
           <a:cs typeface="+mn-cs"/>
         </a:defRPr>
       </a:lvl3pPr>
-      <a:lvl4pPr marL="2133547" indent="-304792" algn="l" defTabSz="1219170" rtl="0" eaLnBrk="1" latinLnBrk="0" hangingPunct="1">
+      <a:lvl4pPr marL="2205076" indent="-315011" algn="l" defTabSz="1260043" rtl="0" eaLnBrk="1" latinLnBrk="0" hangingPunct="1">
         <a:lnSpc>
           <a:spcPct val="90000"/>
         </a:lnSpc>
         <a:spcBef>
-          <a:spcPts val="667"/>
+          <a:spcPts val="689"/>
         </a:spcBef>
         <a:buFont typeface="Arial" panose="020B0604020202020204" pitchFamily="34" charset="0"/>
         <a:buChar char="•"/>
-        <a:defRPr sz="2400" kern="1200">
+        <a:defRPr sz="2480" kern="1200">
           <a:solidFill>
             <a:schemeClr val="tx1"/>
           </a:solidFill>
@@ -2768,16 +2769,16 @@
           <a:cs typeface="+mn-cs"/>
         </a:defRPr>
       </a:lvl4pPr>
-      <a:lvl5pPr marL="2743131" indent="-304792" algn="l" defTabSz="1219170" rtl="0" eaLnBrk="1" latinLnBrk="0" hangingPunct="1">
+      <a:lvl5pPr marL="2835097" indent="-315011" algn="l" defTabSz="1260043" rtl="0" eaLnBrk="1" latinLnBrk="0" hangingPunct="1">
         <a:lnSpc>
           <a:spcPct val="90000"/>
         </a:lnSpc>
         <a:spcBef>
-          <a:spcPts val="667"/>
+          <a:spcPts val="689"/>
         </a:spcBef>
         <a:buFont typeface="Arial" panose="020B0604020202020204" pitchFamily="34" charset="0"/>
         <a:buChar char="•"/>
-        <a:defRPr sz="2400" kern="1200">
+        <a:defRPr sz="2480" kern="1200">
           <a:solidFill>
             <a:schemeClr val="tx1"/>
           </a:solidFill>
@@ -2786,16 +2787,16 @@
           <a:cs typeface="+mn-cs"/>
         </a:defRPr>
       </a:lvl5pPr>
-      <a:lvl6pPr marL="3352716" indent="-304792" algn="l" defTabSz="1219170" rtl="0" eaLnBrk="1" latinLnBrk="0" hangingPunct="1">
+      <a:lvl6pPr marL="3465119" indent="-315011" algn="l" defTabSz="1260043" rtl="0" eaLnBrk="1" latinLnBrk="0" hangingPunct="1">
         <a:lnSpc>
           <a:spcPct val="90000"/>
         </a:lnSpc>
         <a:spcBef>
-          <a:spcPts val="667"/>
+          <a:spcPts val="689"/>
         </a:spcBef>
         <a:buFont typeface="Arial" panose="020B0604020202020204" pitchFamily="34" charset="0"/>
         <a:buChar char="•"/>
-        <a:defRPr sz="2400" kern="1200">
+        <a:defRPr sz="2480" kern="1200">
           <a:solidFill>
             <a:schemeClr val="tx1"/>
           </a:solidFill>
@@ -2804,16 +2805,16 @@
           <a:cs typeface="+mn-cs"/>
         </a:defRPr>
       </a:lvl6pPr>
-      <a:lvl7pPr marL="3962301" indent="-304792" algn="l" defTabSz="1219170" rtl="0" eaLnBrk="1" latinLnBrk="0" hangingPunct="1">
+      <a:lvl7pPr marL="4095140" indent="-315011" algn="l" defTabSz="1260043" rtl="0" eaLnBrk="1" latinLnBrk="0" hangingPunct="1">
         <a:lnSpc>
           <a:spcPct val="90000"/>
         </a:lnSpc>
         <a:spcBef>
-          <a:spcPts val="667"/>
+          <a:spcPts val="689"/>
         </a:spcBef>
         <a:buFont typeface="Arial" panose="020B0604020202020204" pitchFamily="34" charset="0"/>
         <a:buChar char="•"/>
-        <a:defRPr sz="2400" kern="1200">
+        <a:defRPr sz="2480" kern="1200">
           <a:solidFill>
             <a:schemeClr val="tx1"/>
           </a:solidFill>
@@ -2822,16 +2823,16 @@
           <a:cs typeface="+mn-cs"/>
         </a:defRPr>
       </a:lvl7pPr>
-      <a:lvl8pPr marL="4571886" indent="-304792" algn="l" defTabSz="1219170" rtl="0" eaLnBrk="1" latinLnBrk="0" hangingPunct="1">
+      <a:lvl8pPr marL="4725162" indent="-315011" algn="l" defTabSz="1260043" rtl="0" eaLnBrk="1" latinLnBrk="0" hangingPunct="1">
         <a:lnSpc>
           <a:spcPct val="90000"/>
         </a:lnSpc>
         <a:spcBef>
-          <a:spcPts val="667"/>
+          <a:spcPts val="689"/>
         </a:spcBef>
         <a:buFont typeface="Arial" panose="020B0604020202020204" pitchFamily="34" charset="0"/>
         <a:buChar char="•"/>
-        <a:defRPr sz="2400" kern="1200">
+        <a:defRPr sz="2480" kern="1200">
           <a:solidFill>
             <a:schemeClr val="tx1"/>
           </a:solidFill>
@@ -2840,16 +2841,16 @@
           <a:cs typeface="+mn-cs"/>
         </a:defRPr>
       </a:lvl8pPr>
-      <a:lvl9pPr marL="5181470" indent="-304792" algn="l" defTabSz="1219170" rtl="0" eaLnBrk="1" latinLnBrk="0" hangingPunct="1">
+      <a:lvl9pPr marL="5355184" indent="-315011" algn="l" defTabSz="1260043" rtl="0" eaLnBrk="1" latinLnBrk="0" hangingPunct="1">
         <a:lnSpc>
           <a:spcPct val="90000"/>
         </a:lnSpc>
         <a:spcBef>
-          <a:spcPts val="667"/>
+          <a:spcPts val="689"/>
         </a:spcBef>
         <a:buFont typeface="Arial" panose="020B0604020202020204" pitchFamily="34" charset="0"/>
         <a:buChar char="•"/>
-        <a:defRPr sz="2400" kern="1200">
+        <a:defRPr sz="2480" kern="1200">
           <a:solidFill>
             <a:schemeClr val="tx1"/>
           </a:solidFill>
@@ -2863,8 +2864,8 @@
       <a:defPPr>
         <a:defRPr lang="en-US"/>
       </a:defPPr>
-      <a:lvl1pPr marL="0" algn="l" defTabSz="1219170" rtl="0" eaLnBrk="1" latinLnBrk="0" hangingPunct="1">
-        <a:defRPr sz="2400" kern="1200">
+      <a:lvl1pPr marL="0" algn="l" defTabSz="1260043" rtl="0" eaLnBrk="1" latinLnBrk="0" hangingPunct="1">
+        <a:defRPr sz="2480" kern="1200">
           <a:solidFill>
             <a:schemeClr val="tx1"/>
           </a:solidFill>
@@ -2873,8 +2874,8 @@
           <a:cs typeface="+mn-cs"/>
         </a:defRPr>
       </a:lvl1pPr>
-      <a:lvl2pPr marL="609585" algn="l" defTabSz="1219170" rtl="0" eaLnBrk="1" latinLnBrk="0" hangingPunct="1">
-        <a:defRPr sz="2400" kern="1200">
+      <a:lvl2pPr marL="630022" algn="l" defTabSz="1260043" rtl="0" eaLnBrk="1" latinLnBrk="0" hangingPunct="1">
+        <a:defRPr sz="2480" kern="1200">
           <a:solidFill>
             <a:schemeClr val="tx1"/>
           </a:solidFill>
@@ -2883,8 +2884,8 @@
           <a:cs typeface="+mn-cs"/>
         </a:defRPr>
       </a:lvl2pPr>
-      <a:lvl3pPr marL="1219170" algn="l" defTabSz="1219170" rtl="0" eaLnBrk="1" latinLnBrk="0" hangingPunct="1">
-        <a:defRPr sz="2400" kern="1200">
+      <a:lvl3pPr marL="1260043" algn="l" defTabSz="1260043" rtl="0" eaLnBrk="1" latinLnBrk="0" hangingPunct="1">
+        <a:defRPr sz="2480" kern="1200">
           <a:solidFill>
             <a:schemeClr val="tx1"/>
           </a:solidFill>
@@ -2893,8 +2894,8 @@
           <a:cs typeface="+mn-cs"/>
         </a:defRPr>
       </a:lvl3pPr>
-      <a:lvl4pPr marL="1828754" algn="l" defTabSz="1219170" rtl="0" eaLnBrk="1" latinLnBrk="0" hangingPunct="1">
-        <a:defRPr sz="2400" kern="1200">
+      <a:lvl4pPr marL="1890065" algn="l" defTabSz="1260043" rtl="0" eaLnBrk="1" latinLnBrk="0" hangingPunct="1">
+        <a:defRPr sz="2480" kern="1200">
           <a:solidFill>
             <a:schemeClr val="tx1"/>
           </a:solidFill>
@@ -2903,8 +2904,8 @@
           <a:cs typeface="+mn-cs"/>
         </a:defRPr>
       </a:lvl4pPr>
-      <a:lvl5pPr marL="2438339" algn="l" defTabSz="1219170" rtl="0" eaLnBrk="1" latinLnBrk="0" hangingPunct="1">
-        <a:defRPr sz="2400" kern="1200">
+      <a:lvl5pPr marL="2520086" algn="l" defTabSz="1260043" rtl="0" eaLnBrk="1" latinLnBrk="0" hangingPunct="1">
+        <a:defRPr sz="2480" kern="1200">
           <a:solidFill>
             <a:schemeClr val="tx1"/>
           </a:solidFill>
@@ -2913,8 +2914,8 @@
           <a:cs typeface="+mn-cs"/>
         </a:defRPr>
       </a:lvl5pPr>
-      <a:lvl6pPr marL="3047924" algn="l" defTabSz="1219170" rtl="0" eaLnBrk="1" latinLnBrk="0" hangingPunct="1">
-        <a:defRPr sz="2400" kern="1200">
+      <a:lvl6pPr marL="3150108" algn="l" defTabSz="1260043" rtl="0" eaLnBrk="1" latinLnBrk="0" hangingPunct="1">
+        <a:defRPr sz="2480" kern="1200">
           <a:solidFill>
             <a:schemeClr val="tx1"/>
           </a:solidFill>
@@ -2923,8 +2924,8 @@
           <a:cs typeface="+mn-cs"/>
         </a:defRPr>
       </a:lvl6pPr>
-      <a:lvl7pPr marL="3657509" algn="l" defTabSz="1219170" rtl="0" eaLnBrk="1" latinLnBrk="0" hangingPunct="1">
-        <a:defRPr sz="2400" kern="1200">
+      <a:lvl7pPr marL="3780130" algn="l" defTabSz="1260043" rtl="0" eaLnBrk="1" latinLnBrk="0" hangingPunct="1">
+        <a:defRPr sz="2480" kern="1200">
           <a:solidFill>
             <a:schemeClr val="tx1"/>
           </a:solidFill>
@@ -2933,8 +2934,8 @@
           <a:cs typeface="+mn-cs"/>
         </a:defRPr>
       </a:lvl7pPr>
-      <a:lvl8pPr marL="4267093" algn="l" defTabSz="1219170" rtl="0" eaLnBrk="1" latinLnBrk="0" hangingPunct="1">
-        <a:defRPr sz="2400" kern="1200">
+      <a:lvl8pPr marL="4410151" algn="l" defTabSz="1260043" rtl="0" eaLnBrk="1" latinLnBrk="0" hangingPunct="1">
+        <a:defRPr sz="2480" kern="1200">
           <a:solidFill>
             <a:schemeClr val="tx1"/>
           </a:solidFill>
@@ -2943,8 +2944,8 @@
           <a:cs typeface="+mn-cs"/>
         </a:defRPr>
       </a:lvl8pPr>
-      <a:lvl9pPr marL="4876678" algn="l" defTabSz="1219170" rtl="0" eaLnBrk="1" latinLnBrk="0" hangingPunct="1">
-        <a:defRPr sz="2400" kern="1200">
+      <a:lvl9pPr marL="5040173" algn="l" defTabSz="1260043" rtl="0" eaLnBrk="1" latinLnBrk="0" hangingPunct="1">
+        <a:defRPr sz="2480" kern="1200">
           <a:solidFill>
             <a:schemeClr val="tx1"/>
           </a:solidFill>
@@ -3003,7 +3004,7 @@
         </p:blipFill>
         <p:spPr>
           <a:xfrm>
-            <a:off x="3012346" y="167135"/>
+            <a:off x="3216340" y="1067248"/>
             <a:ext cx="6699512" cy="1527060"/>
           </a:xfrm>
           <a:prstGeom prst="rect">
@@ -3039,7 +3040,7 @@
         </p:blipFill>
         <p:spPr>
           <a:xfrm>
-            <a:off x="4380903" y="5308499"/>
+            <a:off x="4584901" y="6208612"/>
             <a:ext cx="6911787" cy="1572828"/>
           </a:xfrm>
           <a:prstGeom prst="rect">
@@ -3061,7 +3062,7 @@
         </p:nvSpPr>
         <p:spPr>
           <a:xfrm rot="5400000">
-            <a:off x="5286830" y="-1633524"/>
+            <a:off x="5490827" y="-733411"/>
             <a:ext cx="669973" cy="6997234"/>
           </a:xfrm>
           <a:prstGeom prst="leftBrace">
@@ -3113,7 +3114,7 @@
         </p:nvSpPr>
         <p:spPr>
           <a:xfrm rot="5400000">
-            <a:off x="6177586" y="1230238"/>
+            <a:off x="6381584" y="2130352"/>
             <a:ext cx="669973" cy="3491130"/>
           </a:xfrm>
           <a:prstGeom prst="leftBrace">
@@ -3179,7 +3180,7 @@
         </p:blipFill>
         <p:spPr>
           <a:xfrm>
-            <a:off x="2159711" y="2076869"/>
+            <a:off x="2363709" y="2976986"/>
             <a:ext cx="6911787" cy="669971"/>
           </a:xfrm>
           <a:prstGeom prst="rect">
@@ -3201,7 +3202,7 @@
         </p:nvSpPr>
         <p:spPr>
           <a:xfrm rot="5400000">
-            <a:off x="7042369" y="2319328"/>
+            <a:off x="7246367" y="3219441"/>
             <a:ext cx="669973" cy="3491130"/>
           </a:xfrm>
           <a:prstGeom prst="leftBrace">
@@ -3267,7 +3268,7 @@
         </p:blipFill>
         <p:spPr>
           <a:xfrm>
-            <a:off x="4825367" y="3142213"/>
+            <a:off x="5029365" y="4042329"/>
             <a:ext cx="3394671" cy="704555"/>
           </a:xfrm>
           <a:prstGeom prst="rect">
@@ -3289,7 +3290,7 @@
         </p:nvSpPr>
         <p:spPr>
           <a:xfrm rot="5400000">
-            <a:off x="7466510" y="1641022"/>
+            <a:off x="7670507" y="2541138"/>
             <a:ext cx="669973" cy="6982383"/>
           </a:xfrm>
           <a:prstGeom prst="leftBrace">
@@ -3355,7 +3356,7 @@
         </p:blipFill>
         <p:spPr>
           <a:xfrm>
-            <a:off x="5702243" y="4235790"/>
+            <a:off x="5906237" y="5135903"/>
             <a:ext cx="3394672" cy="684890"/>
           </a:xfrm>
           <a:prstGeom prst="rect">
@@ -3385,7 +3386,7 @@
         </p:blipFill>
         <p:spPr>
           <a:xfrm>
-            <a:off x="80211" y="84621"/>
+            <a:off x="284205" y="984734"/>
             <a:ext cx="892528" cy="579404"/>
           </a:xfrm>
           <a:prstGeom prst="rect">
@@ -3415,7 +3416,7 @@
         </p:blipFill>
         <p:spPr>
           <a:xfrm>
-            <a:off x="80211" y="1831752"/>
+            <a:off x="284205" y="2731865"/>
             <a:ext cx="892528" cy="586800"/>
           </a:xfrm>
           <a:prstGeom prst="rect">
@@ -3445,7 +3446,7 @@
         </p:blipFill>
         <p:spPr>
           <a:xfrm>
-            <a:off x="80211" y="4056258"/>
+            <a:off x="284205" y="4956371"/>
             <a:ext cx="892528" cy="586800"/>
           </a:xfrm>
           <a:prstGeom prst="rect">
@@ -3469,7 +3470,7 @@
         </p:nvCxnSpPr>
         <p:spPr>
           <a:xfrm>
-            <a:off x="80211" y="1726279"/>
+            <a:off x="284205" y="2626392"/>
             <a:ext cx="12092554" cy="0"/>
           </a:xfrm>
           <a:prstGeom prst="line">
@@ -3515,7 +3516,7 @@
         </p:nvCxnSpPr>
         <p:spPr>
           <a:xfrm>
-            <a:off x="80211" y="3956130"/>
+            <a:off x="284205" y="4856243"/>
             <a:ext cx="12092554" cy="0"/>
           </a:xfrm>
           <a:prstGeom prst="line">
@@ -3559,7 +3560,7 @@
         </p:nvSpPr>
         <p:spPr>
           <a:xfrm>
-            <a:off x="972739" y="149690"/>
+            <a:off x="1176733" y="1049807"/>
             <a:ext cx="1813060" cy="461665"/>
           </a:xfrm>
           <a:prstGeom prst="rect">
@@ -3595,7 +3596,7 @@
         </p:nvSpPr>
         <p:spPr>
           <a:xfrm>
-            <a:off x="949408" y="1894320"/>
+            <a:off x="1153405" y="2794437"/>
             <a:ext cx="1025089" cy="461665"/>
           </a:xfrm>
           <a:prstGeom prst="rect">
@@ -3631,7 +3632,7 @@
         </p:nvSpPr>
         <p:spPr>
           <a:xfrm>
-            <a:off x="950090" y="4118826"/>
+            <a:off x="1154087" y="5018943"/>
             <a:ext cx="829073" cy="461665"/>
           </a:xfrm>
           <a:prstGeom prst="rect">
@@ -3667,8 +3668,8 @@
         </p:nvSpPr>
         <p:spPr>
           <a:xfrm>
-            <a:off x="11584142" y="23327"/>
-            <a:ext cx="588623" cy="369332"/>
+            <a:off x="11788138" y="923440"/>
+            <a:ext cx="628698" cy="395942"/>
           </a:xfrm>
           <a:prstGeom prst="rect">
             <a:avLst/>
@@ -3732,7 +3733,7 @@
         </p:nvSpPr>
         <p:spPr>
           <a:xfrm rot="5400000">
-            <a:off x="8572249" y="3467005"/>
+            <a:off x="8776247" y="4367118"/>
             <a:ext cx="669973" cy="4490358"/>
           </a:xfrm>
           <a:prstGeom prst="leftBrace">
@@ -3792,7 +3793,7 @@
         </p:blipFill>
         <p:spPr>
           <a:xfrm>
-            <a:off x="6733536" y="4492827"/>
+            <a:off x="6937530" y="5392944"/>
             <a:ext cx="2884534" cy="1038183"/>
           </a:xfrm>
           <a:prstGeom prst="rect">
@@ -3814,7 +3815,7 @@
         </p:nvSpPr>
         <p:spPr>
           <a:xfrm rot="5400000">
-            <a:off x="5240602" y="-1462661"/>
+            <a:off x="5444599" y="-562548"/>
             <a:ext cx="669973" cy="6256206"/>
           </a:xfrm>
           <a:prstGeom prst="leftBrace">
@@ -3866,7 +3867,7 @@
         </p:nvSpPr>
         <p:spPr>
           <a:xfrm rot="5400000">
-            <a:off x="7851972" y="2970555"/>
+            <a:off x="8055969" y="3870671"/>
             <a:ext cx="669973" cy="3049801"/>
           </a:xfrm>
           <a:prstGeom prst="leftBrace">
@@ -3932,7 +3933,7 @@
         </p:blipFill>
         <p:spPr>
           <a:xfrm>
-            <a:off x="5738883" y="3571651"/>
+            <a:off x="5942881" y="4471764"/>
             <a:ext cx="3164539" cy="656792"/>
           </a:xfrm>
           <a:prstGeom prst="rect">
@@ -3962,7 +3963,7 @@
         </p:blipFill>
         <p:spPr>
           <a:xfrm>
-            <a:off x="80211" y="89075"/>
+            <a:off x="284205" y="989188"/>
             <a:ext cx="892528" cy="579404"/>
           </a:xfrm>
           <a:prstGeom prst="rect">
@@ -3992,7 +3993,7 @@
         </p:blipFill>
         <p:spPr>
           <a:xfrm>
-            <a:off x="80211" y="1656591"/>
+            <a:off x="284205" y="2556704"/>
             <a:ext cx="892528" cy="586800"/>
           </a:xfrm>
           <a:prstGeom prst="rect">
@@ -4022,7 +4023,7 @@
         </p:blipFill>
         <p:spPr>
           <a:xfrm>
-            <a:off x="80211" y="4452598"/>
+            <a:off x="284205" y="5352711"/>
             <a:ext cx="892528" cy="586800"/>
           </a:xfrm>
           <a:prstGeom prst="rect">
@@ -4046,7 +4047,7 @@
         </p:nvCxnSpPr>
         <p:spPr>
           <a:xfrm>
-            <a:off x="80211" y="1591940"/>
+            <a:off x="284208" y="2492053"/>
             <a:ext cx="12111789" cy="0"/>
           </a:xfrm>
           <a:prstGeom prst="line">
@@ -4092,7 +4093,7 @@
         </p:nvCxnSpPr>
         <p:spPr>
           <a:xfrm>
-            <a:off x="80211" y="4360634"/>
+            <a:off x="284208" y="5260747"/>
             <a:ext cx="12111789" cy="0"/>
           </a:xfrm>
           <a:prstGeom prst="line">
@@ -4136,7 +4137,7 @@
         </p:nvSpPr>
         <p:spPr>
           <a:xfrm>
-            <a:off x="972739" y="154144"/>
+            <a:off x="1176733" y="1054261"/>
             <a:ext cx="1813060" cy="461665"/>
           </a:xfrm>
           <a:prstGeom prst="rect">
@@ -4172,7 +4173,7 @@
         </p:nvSpPr>
         <p:spPr>
           <a:xfrm>
-            <a:off x="949408" y="1719159"/>
+            <a:off x="1153405" y="2619276"/>
             <a:ext cx="1025089" cy="461665"/>
           </a:xfrm>
           <a:prstGeom prst="rect">
@@ -4208,7 +4209,7 @@
         </p:nvSpPr>
         <p:spPr>
           <a:xfrm>
-            <a:off x="950090" y="4515166"/>
+            <a:off x="1154087" y="5415283"/>
             <a:ext cx="829073" cy="461665"/>
           </a:xfrm>
           <a:prstGeom prst="rect">
@@ -4244,8 +4245,8 @@
         </p:nvSpPr>
         <p:spPr>
           <a:xfrm>
-            <a:off x="11603377" y="0"/>
-            <a:ext cx="588623" cy="369332"/>
+            <a:off x="11807373" y="900113"/>
+            <a:ext cx="628698" cy="395942"/>
           </a:xfrm>
           <a:prstGeom prst="rect">
             <a:avLst/>
@@ -4279,7 +4280,7 @@
         </p:nvSpPr>
         <p:spPr>
           <a:xfrm rot="5400000">
-            <a:off x="7026584" y="1916607"/>
+            <a:off x="7230578" y="2816724"/>
             <a:ext cx="508102" cy="3245571"/>
           </a:xfrm>
           <a:prstGeom prst="leftBrace">
@@ -4345,7 +4346,7 @@
         </p:blipFill>
         <p:spPr>
           <a:xfrm>
-            <a:off x="3012346" y="32795"/>
+            <a:off x="3216340" y="932908"/>
             <a:ext cx="6699512" cy="1527060"/>
           </a:xfrm>
           <a:prstGeom prst="rect">
@@ -4375,7 +4376,7 @@
         </p:blipFill>
         <p:spPr>
           <a:xfrm>
-            <a:off x="2548061" y="1709948"/>
+            <a:off x="2752055" y="2610061"/>
             <a:ext cx="5901976" cy="2202766"/>
           </a:xfrm>
           <a:prstGeom prst="rect">
@@ -4405,7 +4406,7 @@
         </p:blipFill>
         <p:spPr>
           <a:xfrm>
-            <a:off x="6718507" y="5760983"/>
+            <a:off x="6922501" y="6661096"/>
             <a:ext cx="4369828" cy="2163642"/>
           </a:xfrm>
           <a:prstGeom prst="rect">
@@ -4465,7 +4466,7 @@
         </p:blipFill>
         <p:spPr>
           <a:xfrm>
-            <a:off x="6495504" y="5986272"/>
+            <a:off x="6699498" y="6886389"/>
             <a:ext cx="5565716" cy="2227507"/>
           </a:xfrm>
           <a:prstGeom prst="rect">
@@ -4489,7 +4490,7 @@
         </p:nvCxnSpPr>
         <p:spPr>
           <a:xfrm>
-            <a:off x="80211" y="1603815"/>
+            <a:off x="284208" y="2503928"/>
             <a:ext cx="12111789" cy="0"/>
           </a:xfrm>
           <a:prstGeom prst="line">
@@ -4535,7 +4536,7 @@
         </p:nvCxnSpPr>
         <p:spPr>
           <a:xfrm>
-            <a:off x="80211" y="4467515"/>
+            <a:off x="284208" y="5367628"/>
             <a:ext cx="12111789" cy="0"/>
           </a:xfrm>
           <a:prstGeom prst="line">
@@ -4579,7 +4580,7 @@
         </p:nvSpPr>
         <p:spPr>
           <a:xfrm rot="5400000">
-            <a:off x="8938190" y="3012702"/>
+            <a:off x="9142187" y="3912818"/>
             <a:ext cx="669973" cy="5774307"/>
           </a:xfrm>
           <a:prstGeom prst="leftBrace">
@@ -4631,7 +4632,7 @@
         </p:nvSpPr>
         <p:spPr>
           <a:xfrm rot="5400000">
-            <a:off x="5240602" y="-1403286"/>
+            <a:off x="5444599" y="-503173"/>
             <a:ext cx="669973" cy="6256206"/>
           </a:xfrm>
           <a:prstGeom prst="leftBrace">
@@ -4683,7 +4684,7 @@
         </p:nvSpPr>
         <p:spPr>
           <a:xfrm rot="5400000">
-            <a:off x="8378418" y="3129980"/>
+            <a:off x="8582416" y="4030097"/>
             <a:ext cx="669973" cy="2944717"/>
           </a:xfrm>
           <a:prstGeom prst="leftBrace">
@@ -4743,7 +4744,7 @@
         </p:blipFill>
         <p:spPr>
           <a:xfrm>
-            <a:off x="80211" y="89075"/>
+            <a:off x="284205" y="989188"/>
             <a:ext cx="892528" cy="579404"/>
           </a:xfrm>
           <a:prstGeom prst="rect">
@@ -4773,7 +4774,7 @@
         </p:blipFill>
         <p:spPr>
           <a:xfrm>
-            <a:off x="80211" y="1727841"/>
+            <a:off x="284205" y="2627955"/>
             <a:ext cx="892528" cy="586800"/>
           </a:xfrm>
           <a:prstGeom prst="rect">
@@ -4803,7 +4804,7 @@
         </p:blipFill>
         <p:spPr>
           <a:xfrm>
-            <a:off x="80211" y="4559479"/>
+            <a:off x="284205" y="5459592"/>
             <a:ext cx="892528" cy="586800"/>
           </a:xfrm>
           <a:prstGeom prst="rect">
@@ -4825,7 +4826,7 @@
         </p:nvSpPr>
         <p:spPr>
           <a:xfrm>
-            <a:off x="972739" y="154144"/>
+            <a:off x="1176733" y="1054261"/>
             <a:ext cx="1813060" cy="461665"/>
           </a:xfrm>
           <a:prstGeom prst="rect">
@@ -4861,7 +4862,7 @@
         </p:nvSpPr>
         <p:spPr>
           <a:xfrm>
-            <a:off x="949408" y="1790409"/>
+            <a:off x="1153405" y="2690526"/>
             <a:ext cx="1025089" cy="461665"/>
           </a:xfrm>
           <a:prstGeom prst="rect">
@@ -4897,7 +4898,7 @@
         </p:nvSpPr>
         <p:spPr>
           <a:xfrm>
-            <a:off x="950090" y="4622047"/>
+            <a:off x="1154087" y="5522164"/>
             <a:ext cx="829073" cy="461665"/>
           </a:xfrm>
           <a:prstGeom prst="rect">
@@ -4933,8 +4934,8 @@
         </p:nvSpPr>
         <p:spPr>
           <a:xfrm>
-            <a:off x="11603377" y="0"/>
-            <a:ext cx="588623" cy="369332"/>
+            <a:off x="11807373" y="900113"/>
+            <a:ext cx="628698" cy="395942"/>
           </a:xfrm>
           <a:prstGeom prst="rect">
             <a:avLst/>
@@ -4982,7 +4983,7 @@
         </p:blipFill>
         <p:spPr>
           <a:xfrm>
-            <a:off x="3012346" y="32795"/>
+            <a:off x="3216340" y="932908"/>
             <a:ext cx="6699512" cy="1527060"/>
           </a:xfrm>
           <a:prstGeom prst="rect">
@@ -5012,7 +5013,7 @@
         </p:blipFill>
         <p:spPr>
           <a:xfrm>
-            <a:off x="2621035" y="1816996"/>
+            <a:off x="2825029" y="2717109"/>
             <a:ext cx="5909106" cy="2202766"/>
           </a:xfrm>
           <a:prstGeom prst="rect">
@@ -5034,7 +5035,7 @@
         </p:nvSpPr>
         <p:spPr>
           <a:xfrm rot="5400000">
-            <a:off x="9243556" y="6950281"/>
+            <a:off x="9447554" y="7850394"/>
             <a:ext cx="669973" cy="2339616"/>
           </a:xfrm>
           <a:prstGeom prst="leftBrace">
@@ -5094,7 +5095,7 @@
         </p:blipFill>
         <p:spPr>
           <a:xfrm>
-            <a:off x="9390111" y="8226693"/>
+            <a:off x="9594105" y="9126806"/>
             <a:ext cx="1281782" cy="628684"/>
           </a:xfrm>
           <a:prstGeom prst="rect">
@@ -5124,7 +5125,7 @@
         </p:blipFill>
         <p:spPr>
           <a:xfrm>
-            <a:off x="9397967" y="8879747"/>
+            <a:off x="9601965" y="9779863"/>
             <a:ext cx="1271547" cy="626469"/>
           </a:xfrm>
           <a:prstGeom prst="rect">
@@ -5154,7 +5155,7 @@
         </p:blipFill>
         <p:spPr>
           <a:xfrm>
-            <a:off x="9366361" y="9532043"/>
+            <a:off x="9570358" y="10432159"/>
             <a:ext cx="1295931" cy="626469"/>
           </a:xfrm>
           <a:prstGeom prst="rect">
@@ -5176,8 +5177,8 @@
         </p:nvSpPr>
         <p:spPr>
           <a:xfrm>
-            <a:off x="8408735" y="8356369"/>
-            <a:ext cx="994183" cy="369332"/>
+            <a:off x="8612730" y="9256482"/>
+            <a:ext cx="1053494" cy="395942"/>
           </a:xfrm>
           <a:prstGeom prst="rect">
             <a:avLst/>
@@ -5219,7 +5220,7 @@
         </p:blipFill>
         <p:spPr>
           <a:xfrm>
-            <a:off x="5736148" y="3693677"/>
+            <a:off x="5940142" y="4593790"/>
             <a:ext cx="4449616" cy="641100"/>
           </a:xfrm>
           <a:prstGeom prst="rect">
@@ -5241,7 +5242,7 @@
         </p:nvSpPr>
         <p:spPr>
           <a:xfrm rot="5400000">
-            <a:off x="7667756" y="1346686"/>
+            <a:off x="7871750" y="2246799"/>
             <a:ext cx="508102" cy="4527914"/>
           </a:xfrm>
           <a:prstGeom prst="leftBrace">
@@ -5301,7 +5302,7 @@
         </p:blipFill>
         <p:spPr>
           <a:xfrm>
-            <a:off x="7350529" y="4695897"/>
+            <a:off x="7554527" y="5596011"/>
             <a:ext cx="2803699" cy="928418"/>
           </a:xfrm>
           <a:prstGeom prst="rect">
@@ -5353,7 +5354,7 @@
         </p:nvSpPr>
         <p:spPr>
           <a:xfrm rot="5400000">
-            <a:off x="8896480" y="1337161"/>
+            <a:off x="9100474" y="2237278"/>
             <a:ext cx="508102" cy="4546963"/>
           </a:xfrm>
           <a:prstGeom prst="leftBrace">
@@ -5419,7 +5420,7 @@
         </p:blipFill>
         <p:spPr>
           <a:xfrm>
-            <a:off x="1974497" y="1801862"/>
+            <a:off x="2178495" y="2701975"/>
             <a:ext cx="7839515" cy="2293856"/>
           </a:xfrm>
           <a:prstGeom prst="rect">
@@ -5449,7 +5450,7 @@
         </p:blipFill>
         <p:spPr>
           <a:xfrm>
-            <a:off x="6495504" y="5948172"/>
+            <a:off x="6699498" y="6848288"/>
             <a:ext cx="5565716" cy="2227507"/>
           </a:xfrm>
           <a:prstGeom prst="rect">
@@ -5473,7 +5474,7 @@
         </p:nvCxnSpPr>
         <p:spPr>
           <a:xfrm>
-            <a:off x="80211" y="1603815"/>
+            <a:off x="284208" y="2503928"/>
             <a:ext cx="12111789" cy="0"/>
           </a:xfrm>
           <a:prstGeom prst="line">
@@ -5519,7 +5520,7 @@
         </p:nvCxnSpPr>
         <p:spPr>
           <a:xfrm>
-            <a:off x="80211" y="4467515"/>
+            <a:off x="284208" y="5367628"/>
             <a:ext cx="12111789" cy="0"/>
           </a:xfrm>
           <a:prstGeom prst="line">
@@ -5563,7 +5564,7 @@
         </p:nvSpPr>
         <p:spPr>
           <a:xfrm rot="5400000">
-            <a:off x="8938190" y="2974602"/>
+            <a:off x="9142187" y="3874718"/>
             <a:ext cx="669973" cy="5774307"/>
           </a:xfrm>
           <a:prstGeom prst="leftBrace">
@@ -5615,7 +5616,7 @@
         </p:nvSpPr>
         <p:spPr>
           <a:xfrm rot="5400000">
-            <a:off x="5559266" y="-2194939"/>
+            <a:off x="5763263" y="-1294826"/>
             <a:ext cx="669973" cy="7839514"/>
           </a:xfrm>
           <a:prstGeom prst="leftBrace">
@@ -5667,7 +5668,7 @@
         </p:nvSpPr>
         <p:spPr>
           <a:xfrm rot="5400000">
-            <a:off x="9569043" y="3129980"/>
+            <a:off x="9773040" y="4030097"/>
             <a:ext cx="669973" cy="2944717"/>
           </a:xfrm>
           <a:prstGeom prst="leftBrace">
@@ -5727,7 +5728,7 @@
         </p:blipFill>
         <p:spPr>
           <a:xfrm>
-            <a:off x="80211" y="89075"/>
+            <a:off x="284205" y="989188"/>
             <a:ext cx="892528" cy="579404"/>
           </a:xfrm>
           <a:prstGeom prst="rect">
@@ -5757,7 +5758,7 @@
         </p:blipFill>
         <p:spPr>
           <a:xfrm>
-            <a:off x="80211" y="1727841"/>
+            <a:off x="284205" y="2627955"/>
             <a:ext cx="892528" cy="586800"/>
           </a:xfrm>
           <a:prstGeom prst="rect">
@@ -5787,7 +5788,7 @@
         </p:blipFill>
         <p:spPr>
           <a:xfrm>
-            <a:off x="80211" y="4559479"/>
+            <a:off x="284205" y="5459592"/>
             <a:ext cx="892528" cy="586800"/>
           </a:xfrm>
           <a:prstGeom prst="rect">
@@ -5809,7 +5810,7 @@
         </p:nvSpPr>
         <p:spPr>
           <a:xfrm>
-            <a:off x="972739" y="154144"/>
+            <a:off x="1176733" y="1054261"/>
             <a:ext cx="1813060" cy="461665"/>
           </a:xfrm>
           <a:prstGeom prst="rect">
@@ -5845,7 +5846,7 @@
         </p:nvSpPr>
         <p:spPr>
           <a:xfrm>
-            <a:off x="949408" y="1790409"/>
+            <a:off x="1153405" y="2690526"/>
             <a:ext cx="1025089" cy="461665"/>
           </a:xfrm>
           <a:prstGeom prst="rect">
@@ -5881,7 +5882,7 @@
         </p:nvSpPr>
         <p:spPr>
           <a:xfrm>
-            <a:off x="950090" y="4622047"/>
+            <a:off x="1154087" y="5522164"/>
             <a:ext cx="829073" cy="461665"/>
           </a:xfrm>
           <a:prstGeom prst="rect">
@@ -5917,8 +5918,8 @@
         </p:nvSpPr>
         <p:spPr>
           <a:xfrm>
-            <a:off x="11603377" y="0"/>
-            <a:ext cx="588623" cy="369332"/>
+            <a:off x="11807373" y="900113"/>
+            <a:ext cx="628698" cy="395942"/>
           </a:xfrm>
           <a:prstGeom prst="rect">
             <a:avLst/>
@@ -5966,7 +5967,7 @@
         </p:blipFill>
         <p:spPr>
           <a:xfrm>
-            <a:off x="3012346" y="32795"/>
+            <a:off x="3216340" y="932908"/>
             <a:ext cx="6699512" cy="1527060"/>
           </a:xfrm>
           <a:prstGeom prst="rect">
@@ -5988,7 +5989,7 @@
         </p:nvSpPr>
         <p:spPr>
           <a:xfrm rot="5400000">
-            <a:off x="9243556" y="6912181"/>
+            <a:off x="9447554" y="7812294"/>
             <a:ext cx="669973" cy="2339616"/>
           </a:xfrm>
           <a:prstGeom prst="leftBrace">
@@ -6048,7 +6049,7 @@
         </p:blipFill>
         <p:spPr>
           <a:xfrm>
-            <a:off x="9390111" y="8188593"/>
+            <a:off x="9594105" y="9088706"/>
             <a:ext cx="1281782" cy="628684"/>
           </a:xfrm>
           <a:prstGeom prst="rect">
@@ -6078,7 +6079,7 @@
         </p:blipFill>
         <p:spPr>
           <a:xfrm>
-            <a:off x="9397967" y="8841647"/>
+            <a:off x="9601965" y="9741764"/>
             <a:ext cx="1271547" cy="626469"/>
           </a:xfrm>
           <a:prstGeom prst="rect">
@@ -6108,7 +6109,7 @@
         </p:blipFill>
         <p:spPr>
           <a:xfrm>
-            <a:off x="9366361" y="9493943"/>
+            <a:off x="9570358" y="10394060"/>
             <a:ext cx="1295931" cy="626469"/>
           </a:xfrm>
           <a:prstGeom prst="rect">
@@ -6130,8 +6131,8 @@
         </p:nvSpPr>
         <p:spPr>
           <a:xfrm>
-            <a:off x="8408735" y="8318269"/>
-            <a:ext cx="994183" cy="369332"/>
+            <a:off x="8612730" y="9218382"/>
+            <a:ext cx="1053494" cy="395942"/>
           </a:xfrm>
           <a:prstGeom prst="rect">
             <a:avLst/>
@@ -6173,7 +6174,7 @@
         </p:blipFill>
         <p:spPr>
           <a:xfrm>
-            <a:off x="6945823" y="3693677"/>
+            <a:off x="7149817" y="4593790"/>
             <a:ext cx="4449616" cy="641100"/>
           </a:xfrm>
           <a:prstGeom prst="rect">
@@ -6203,7 +6204,7 @@
         </p:blipFill>
         <p:spPr>
           <a:xfrm>
-            <a:off x="8541154" y="4695897"/>
+            <a:off x="8745151" y="5596011"/>
             <a:ext cx="2803699" cy="928418"/>
           </a:xfrm>
           <a:prstGeom prst="rect">
@@ -6243,10 +6244,740 @@
       </p:grpSpPr>
       <p:sp>
         <p:nvSpPr>
-          <p:cNvPr id="16" name="TextBox 15">
-            <a:extLst>
-              <a:ext uri="{FF2B5EF4-FFF2-40B4-BE49-F238E27FC236}">
-                <a16:creationId xmlns:a16="http://schemas.microsoft.com/office/drawing/2014/main" id="{73A2C03B-7980-42A1-AE0F-C2B2904F8E3B}"/>
+          <p:cNvPr id="38" name="Left Brace 37">
+            <a:extLst>
+              <a:ext uri="{FF2B5EF4-FFF2-40B4-BE49-F238E27FC236}">
+                <a16:creationId xmlns:a16="http://schemas.microsoft.com/office/drawing/2014/main" id="{113523E7-4C37-484A-AEB2-5827C7EEAAD4}"/>
+              </a:ext>
+            </a:extLst>
+          </p:cNvPr>
+          <p:cNvSpPr/>
+          <p:nvPr/>
+        </p:nvSpPr>
+        <p:spPr>
+          <a:xfrm rot="5400000">
+            <a:off x="7763579" y="10363791"/>
+            <a:ext cx="669973" cy="2339616"/>
+          </a:xfrm>
+          <a:prstGeom prst="leftBrace">
+            <a:avLst>
+              <a:gd name="adj1" fmla="val 8333"/>
+              <a:gd name="adj2" fmla="val 33218"/>
+            </a:avLst>
+          </a:prstGeom>
+          <a:ln w="38100">
+            <a:solidFill>
+              <a:schemeClr val="accent4"/>
+            </a:solidFill>
+          </a:ln>
+        </p:spPr>
+        <p:style>
+          <a:lnRef idx="1">
+            <a:schemeClr val="accent1"/>
+          </a:lnRef>
+          <a:fillRef idx="0">
+            <a:schemeClr val="accent1"/>
+          </a:fillRef>
+          <a:effectRef idx="0">
+            <a:schemeClr val="accent1"/>
+          </a:effectRef>
+          <a:fontRef idx="minor">
+            <a:schemeClr val="tx1"/>
+          </a:fontRef>
+        </p:style>
+        <p:txBody>
+          <a:bodyPr rtlCol="0" anchor="ctr"/>
+          <a:lstStyle/>
+          <a:p>
+            <a:pPr algn="ctr"/>
+            <a:endParaRPr lang="en-GB" dirty="0"/>
+          </a:p>
+        </p:txBody>
+      </p:sp>
+      <p:sp>
+        <p:nvSpPr>
+          <p:cNvPr id="26" name="Left Brace 25">
+            <a:extLst>
+              <a:ext uri="{FF2B5EF4-FFF2-40B4-BE49-F238E27FC236}">
+                <a16:creationId xmlns:a16="http://schemas.microsoft.com/office/drawing/2014/main" id="{BFEB9A75-8F72-4342-9B37-CDA035FC48E7}"/>
+              </a:ext>
+            </a:extLst>
+          </p:cNvPr>
+          <p:cNvSpPr/>
+          <p:nvPr/>
+        </p:nvSpPr>
+        <p:spPr>
+          <a:xfrm rot="5400000">
+            <a:off x="10454302" y="9082094"/>
+            <a:ext cx="669973" cy="2339616"/>
+          </a:xfrm>
+          <a:prstGeom prst="leftBrace">
+            <a:avLst>
+              <a:gd name="adj1" fmla="val 8333"/>
+              <a:gd name="adj2" fmla="val 33218"/>
+            </a:avLst>
+          </a:prstGeom>
+          <a:ln w="38100">
+            <a:solidFill>
+              <a:schemeClr val="accent4"/>
+            </a:solidFill>
+          </a:ln>
+        </p:spPr>
+        <p:style>
+          <a:lnRef idx="1">
+            <a:schemeClr val="accent1"/>
+          </a:lnRef>
+          <a:fillRef idx="0">
+            <a:schemeClr val="accent1"/>
+          </a:fillRef>
+          <a:effectRef idx="0">
+            <a:schemeClr val="accent1"/>
+          </a:effectRef>
+          <a:fontRef idx="minor">
+            <a:schemeClr val="tx1"/>
+          </a:fontRef>
+        </p:style>
+        <p:txBody>
+          <a:bodyPr rtlCol="0" anchor="ctr"/>
+          <a:lstStyle/>
+          <a:p>
+            <a:pPr algn="ctr"/>
+            <a:endParaRPr lang="en-GB" dirty="0"/>
+          </a:p>
+        </p:txBody>
+      </p:sp>
+      <p:pic>
+        <p:nvPicPr>
+          <p:cNvPr id="35" name="Picture 34">
+            <a:extLst>
+              <a:ext uri="{FF2B5EF4-FFF2-40B4-BE49-F238E27FC236}">
+                <a16:creationId xmlns:a16="http://schemas.microsoft.com/office/drawing/2014/main" id="{9E6A9A10-B48B-483F-AB52-B0E0B2EFE1F0}"/>
+              </a:ext>
+            </a:extLst>
+          </p:cNvPr>
+          <p:cNvPicPr>
+            <a:picLocks noChangeAspect="1"/>
+          </p:cNvPicPr>
+          <p:nvPr/>
+        </p:nvPicPr>
+        <p:blipFill>
+          <a:blip r:embed="rId2"/>
+          <a:stretch>
+            <a:fillRect/>
+          </a:stretch>
+        </p:blipFill>
+        <p:spPr>
+          <a:xfrm>
+            <a:off x="6358173" y="10102189"/>
+            <a:ext cx="2802424" cy="1222988"/>
+          </a:xfrm>
+          <a:prstGeom prst="rect">
+            <a:avLst/>
+          </a:prstGeom>
+        </p:spPr>
+      </p:pic>
+      <p:sp>
+        <p:nvSpPr>
+          <p:cNvPr id="36" name="Left Brace 35">
+            <a:extLst>
+              <a:ext uri="{FF2B5EF4-FFF2-40B4-BE49-F238E27FC236}">
+                <a16:creationId xmlns:a16="http://schemas.microsoft.com/office/drawing/2014/main" id="{A031CF25-C2FD-4ED8-9178-17403CC0C15B}"/>
+              </a:ext>
+            </a:extLst>
+          </p:cNvPr>
+          <p:cNvSpPr/>
+          <p:nvPr/>
+        </p:nvSpPr>
+        <p:spPr>
+          <a:xfrm rot="5400000">
+            <a:off x="7399284" y="8579830"/>
+            <a:ext cx="669973" cy="2868554"/>
+          </a:xfrm>
+          <a:prstGeom prst="leftBrace">
+            <a:avLst>
+              <a:gd name="adj1" fmla="val 8333"/>
+              <a:gd name="adj2" fmla="val 23826"/>
+            </a:avLst>
+          </a:prstGeom>
+          <a:ln w="38100">
+            <a:solidFill>
+              <a:schemeClr val="accent4"/>
+            </a:solidFill>
+          </a:ln>
+        </p:spPr>
+        <p:style>
+          <a:lnRef idx="1">
+            <a:schemeClr val="accent1"/>
+          </a:lnRef>
+          <a:fillRef idx="0">
+            <a:schemeClr val="accent1"/>
+          </a:fillRef>
+          <a:effectRef idx="0">
+            <a:schemeClr val="accent1"/>
+          </a:effectRef>
+          <a:fontRef idx="minor">
+            <a:schemeClr val="tx1"/>
+          </a:fontRef>
+        </p:style>
+        <p:txBody>
+          <a:bodyPr rtlCol="0" anchor="ctr"/>
+          <a:lstStyle/>
+          <a:p>
+            <a:pPr algn="ctr"/>
+            <a:endParaRPr lang="en-GB" dirty="0"/>
+          </a:p>
+        </p:txBody>
+      </p:sp>
+      <p:pic>
+        <p:nvPicPr>
+          <p:cNvPr id="34" name="Picture 33" descr="A screenshot of a social media post&#10;&#10;Description automatically generated">
+            <a:extLst>
+              <a:ext uri="{FF2B5EF4-FFF2-40B4-BE49-F238E27FC236}">
+                <a16:creationId xmlns:a16="http://schemas.microsoft.com/office/drawing/2014/main" id="{ACC9A16F-2081-4769-BF18-CF2EB9F31C20}"/>
+              </a:ext>
+            </a:extLst>
+          </p:cNvPr>
+          <p:cNvPicPr>
+            <a:picLocks noChangeAspect="1"/>
+          </p:cNvPicPr>
+          <p:nvPr/>
+        </p:nvPicPr>
+        <p:blipFill>
+          <a:blip r:embed="rId3">
+            <a:extLst>
+              <a:ext uri="{28A0092B-C50C-407E-A947-70E740481C1C}">
+                <a14:useLocalDpi xmlns:a14="http://schemas.microsoft.com/office/drawing/2010/main" val="0"/>
+              </a:ext>
+            </a:extLst>
+          </a:blip>
+          <a:stretch>
+            <a:fillRect/>
+          </a:stretch>
+        </p:blipFill>
+        <p:spPr>
+          <a:xfrm>
+            <a:off x="7903210" y="8440388"/>
+            <a:ext cx="3919057" cy="1606687"/>
+          </a:xfrm>
+          <a:prstGeom prst="rect">
+            <a:avLst/>
+          </a:prstGeom>
+        </p:spPr>
+      </p:pic>
+      <p:sp>
+        <p:nvSpPr>
+          <p:cNvPr id="30" name="Left Brace 29">
+            <a:extLst>
+              <a:ext uri="{FF2B5EF4-FFF2-40B4-BE49-F238E27FC236}">
+                <a16:creationId xmlns:a16="http://schemas.microsoft.com/office/drawing/2014/main" id="{3E44B7B7-CD1E-4EE2-B996-8B77D6AE9EF4}"/>
+              </a:ext>
+            </a:extLst>
+          </p:cNvPr>
+          <p:cNvSpPr/>
+          <p:nvPr/>
+        </p:nvSpPr>
+        <p:spPr>
+          <a:xfrm rot="5400000">
+            <a:off x="9508065" y="6378113"/>
+            <a:ext cx="669973" cy="4006134"/>
+          </a:xfrm>
+          <a:prstGeom prst="leftBrace">
+            <a:avLst>
+              <a:gd name="adj1" fmla="val 8333"/>
+              <a:gd name="adj2" fmla="val 38577"/>
+            </a:avLst>
+          </a:prstGeom>
+          <a:ln w="38100">
+            <a:solidFill>
+              <a:schemeClr val="accent4"/>
+            </a:solidFill>
+          </a:ln>
+        </p:spPr>
+        <p:style>
+          <a:lnRef idx="1">
+            <a:schemeClr val="accent1"/>
+          </a:lnRef>
+          <a:fillRef idx="0">
+            <a:schemeClr val="accent1"/>
+          </a:fillRef>
+          <a:effectRef idx="0">
+            <a:schemeClr val="accent1"/>
+          </a:effectRef>
+          <a:fontRef idx="minor">
+            <a:schemeClr val="tx1"/>
+          </a:fontRef>
+        </p:style>
+        <p:txBody>
+          <a:bodyPr rtlCol="0" anchor="ctr"/>
+          <a:lstStyle/>
+          <a:p>
+            <a:pPr algn="ctr"/>
+            <a:endParaRPr lang="en-GB" dirty="0"/>
+          </a:p>
+        </p:txBody>
+      </p:sp>
+      <p:pic>
+        <p:nvPicPr>
+          <p:cNvPr id="17" name="Picture 16">
+            <a:extLst>
+              <a:ext uri="{FF2B5EF4-FFF2-40B4-BE49-F238E27FC236}">
+                <a16:creationId xmlns:a16="http://schemas.microsoft.com/office/drawing/2014/main" id="{09E60E53-8619-45A9-BCB3-15237464DDBF}"/>
+              </a:ext>
+            </a:extLst>
+          </p:cNvPr>
+          <p:cNvPicPr>
+            <a:picLocks noChangeAspect="1"/>
+          </p:cNvPicPr>
+          <p:nvPr/>
+        </p:nvPicPr>
+        <p:blipFill>
+          <a:blip r:embed="rId4"/>
+          <a:stretch>
+            <a:fillRect/>
+          </a:stretch>
+        </p:blipFill>
+        <p:spPr>
+          <a:xfrm>
+            <a:off x="6471743" y="5930202"/>
+            <a:ext cx="4837965" cy="2223700"/>
+          </a:xfrm>
+          <a:prstGeom prst="rect">
+            <a:avLst/>
+          </a:prstGeom>
+        </p:spPr>
+      </p:pic>
+      <p:sp>
+        <p:nvSpPr>
+          <p:cNvPr id="15" name="Left Brace 14">
+            <a:extLst>
+              <a:ext uri="{FF2B5EF4-FFF2-40B4-BE49-F238E27FC236}">
+                <a16:creationId xmlns:a16="http://schemas.microsoft.com/office/drawing/2014/main" id="{E4F55F19-6D3D-40FC-9579-C24CDFA3E5B6}"/>
+              </a:ext>
+            </a:extLst>
+          </p:cNvPr>
+          <p:cNvSpPr/>
+          <p:nvPr/>
+        </p:nvSpPr>
+        <p:spPr>
+          <a:xfrm rot="5400000">
+            <a:off x="8914497" y="1338379"/>
+            <a:ext cx="508102" cy="4546963"/>
+          </a:xfrm>
+          <a:prstGeom prst="leftBrace">
+            <a:avLst>
+              <a:gd name="adj1" fmla="val 8333"/>
+              <a:gd name="adj2" fmla="val 86241"/>
+            </a:avLst>
+          </a:prstGeom>
+          <a:ln w="38100">
+            <a:solidFill>
+              <a:schemeClr val="accent4"/>
+            </a:solidFill>
+          </a:ln>
+        </p:spPr>
+        <p:style>
+          <a:lnRef idx="1">
+            <a:schemeClr val="accent1"/>
+          </a:lnRef>
+          <a:fillRef idx="0">
+            <a:schemeClr val="accent1"/>
+          </a:fillRef>
+          <a:effectRef idx="0">
+            <a:schemeClr val="accent1"/>
+          </a:effectRef>
+          <a:fontRef idx="minor">
+            <a:schemeClr val="tx1"/>
+          </a:fontRef>
+        </p:style>
+        <p:txBody>
+          <a:bodyPr rtlCol="0" anchor="ctr"/>
+          <a:lstStyle/>
+          <a:p>
+            <a:pPr algn="ctr"/>
+            <a:endParaRPr lang="en-GB" dirty="0"/>
+          </a:p>
+        </p:txBody>
+      </p:sp>
+      <p:pic>
+        <p:nvPicPr>
+          <p:cNvPr id="13" name="Picture 12" descr="A screenshot of a cell phone&#10;&#10;Description automatically generated">
+            <a:extLst>
+              <a:ext uri="{FF2B5EF4-FFF2-40B4-BE49-F238E27FC236}">
+                <a16:creationId xmlns:a16="http://schemas.microsoft.com/office/drawing/2014/main" id="{7860A320-08A3-4062-A05C-E92AEB629F67}"/>
+              </a:ext>
+            </a:extLst>
+          </p:cNvPr>
+          <p:cNvPicPr>
+            <a:picLocks noChangeAspect="1"/>
+          </p:cNvPicPr>
+          <p:nvPr/>
+        </p:nvPicPr>
+        <p:blipFill>
+          <a:blip r:embed="rId5">
+            <a:extLst>
+              <a:ext uri="{28A0092B-C50C-407E-A947-70E740481C1C}">
+                <a14:useLocalDpi xmlns:a14="http://schemas.microsoft.com/office/drawing/2010/main" val="0"/>
+              </a:ext>
+            </a:extLst>
+          </a:blip>
+          <a:stretch>
+            <a:fillRect/>
+          </a:stretch>
+        </p:blipFill>
+        <p:spPr>
+          <a:xfrm>
+            <a:off x="1992518" y="1803076"/>
+            <a:ext cx="7839515" cy="2293856"/>
+          </a:xfrm>
+          <a:prstGeom prst="rect">
+            <a:avLst/>
+          </a:prstGeom>
+        </p:spPr>
+      </p:pic>
+      <p:cxnSp>
+        <p:nvCxnSpPr>
+          <p:cNvPr id="8" name="Straight Connector 7">
+            <a:extLst>
+              <a:ext uri="{FF2B5EF4-FFF2-40B4-BE49-F238E27FC236}">
+                <a16:creationId xmlns:a16="http://schemas.microsoft.com/office/drawing/2014/main" id="{B3C21FE1-62D5-40B2-8293-E02C7F95F45F}"/>
+              </a:ext>
+            </a:extLst>
+          </p:cNvPr>
+          <p:cNvCxnSpPr>
+            <a:cxnSpLocks/>
+          </p:cNvCxnSpPr>
+          <p:nvPr/>
+        </p:nvCxnSpPr>
+        <p:spPr>
+          <a:xfrm>
+            <a:off x="98231" y="1605029"/>
+            <a:ext cx="12111789" cy="0"/>
+          </a:xfrm>
+          <a:prstGeom prst="line">
+            <a:avLst/>
+          </a:prstGeom>
+          <a:ln w="57150">
+            <a:solidFill>
+              <a:schemeClr val="bg1">
+                <a:lumMod val="50000"/>
+              </a:schemeClr>
+            </a:solidFill>
+            <a:prstDash val="sysDot"/>
+          </a:ln>
+        </p:spPr>
+        <p:style>
+          <a:lnRef idx="1">
+            <a:schemeClr val="accent1"/>
+          </a:lnRef>
+          <a:fillRef idx="0">
+            <a:schemeClr val="accent1"/>
+          </a:fillRef>
+          <a:effectRef idx="0">
+            <a:schemeClr val="accent1"/>
+          </a:effectRef>
+          <a:fontRef idx="minor">
+            <a:schemeClr val="tx1"/>
+          </a:fontRef>
+        </p:style>
+      </p:cxnSp>
+      <p:cxnSp>
+        <p:nvCxnSpPr>
+          <p:cNvPr id="18" name="Straight Connector 17">
+            <a:extLst>
+              <a:ext uri="{FF2B5EF4-FFF2-40B4-BE49-F238E27FC236}">
+                <a16:creationId xmlns:a16="http://schemas.microsoft.com/office/drawing/2014/main" id="{38FE55ED-9890-448D-B9B6-36A3574E90DB}"/>
+              </a:ext>
+            </a:extLst>
+          </p:cNvPr>
+          <p:cNvCxnSpPr>
+            <a:cxnSpLocks/>
+          </p:cNvCxnSpPr>
+          <p:nvPr/>
+        </p:nvCxnSpPr>
+        <p:spPr>
+          <a:xfrm>
+            <a:off x="98231" y="4468729"/>
+            <a:ext cx="12111789" cy="0"/>
+          </a:xfrm>
+          <a:prstGeom prst="line">
+            <a:avLst/>
+          </a:prstGeom>
+          <a:ln w="57150">
+            <a:solidFill>
+              <a:schemeClr val="bg1">
+                <a:lumMod val="50000"/>
+              </a:schemeClr>
+            </a:solidFill>
+            <a:prstDash val="sysDot"/>
+          </a:ln>
+        </p:spPr>
+        <p:style>
+          <a:lnRef idx="1">
+            <a:schemeClr val="accent1"/>
+          </a:lnRef>
+          <a:fillRef idx="0">
+            <a:schemeClr val="accent1"/>
+          </a:fillRef>
+          <a:effectRef idx="0">
+            <a:schemeClr val="accent1"/>
+          </a:effectRef>
+          <a:fontRef idx="minor">
+            <a:schemeClr val="tx1"/>
+          </a:fontRef>
+        </p:style>
+      </p:cxnSp>
+      <p:sp>
+        <p:nvSpPr>
+          <p:cNvPr id="12" name="Left Brace 11">
+            <a:extLst>
+              <a:ext uri="{FF2B5EF4-FFF2-40B4-BE49-F238E27FC236}">
+                <a16:creationId xmlns:a16="http://schemas.microsoft.com/office/drawing/2014/main" id="{77D93561-8CDB-430E-8A88-3911DEFB7740}"/>
+              </a:ext>
+            </a:extLst>
+          </p:cNvPr>
+          <p:cNvSpPr/>
+          <p:nvPr/>
+        </p:nvSpPr>
+        <p:spPr>
+          <a:xfrm rot="5400000">
+            <a:off x="8548471" y="3383558"/>
+            <a:ext cx="669973" cy="4958831"/>
+          </a:xfrm>
+          <a:prstGeom prst="leftBrace">
+            <a:avLst>
+              <a:gd name="adj1" fmla="val 8333"/>
+              <a:gd name="adj2" fmla="val 13658"/>
+            </a:avLst>
+          </a:prstGeom>
+          <a:ln w="38100">
+            <a:solidFill>
+              <a:schemeClr val="accent4"/>
+            </a:solidFill>
+          </a:ln>
+        </p:spPr>
+        <p:style>
+          <a:lnRef idx="1">
+            <a:schemeClr val="accent1"/>
+          </a:lnRef>
+          <a:fillRef idx="0">
+            <a:schemeClr val="accent1"/>
+          </a:fillRef>
+          <a:effectRef idx="0">
+            <a:schemeClr val="accent1"/>
+          </a:effectRef>
+          <a:fontRef idx="minor">
+            <a:schemeClr val="tx1"/>
+          </a:fontRef>
+        </p:style>
+        <p:txBody>
+          <a:bodyPr rtlCol="0" anchor="ctr"/>
+          <a:lstStyle/>
+          <a:p>
+            <a:pPr algn="ctr"/>
+            <a:endParaRPr lang="en-GB" dirty="0"/>
+          </a:p>
+        </p:txBody>
+      </p:sp>
+      <p:sp>
+        <p:nvSpPr>
+          <p:cNvPr id="14" name="Left Brace 13">
+            <a:extLst>
+              <a:ext uri="{FF2B5EF4-FFF2-40B4-BE49-F238E27FC236}">
+                <a16:creationId xmlns:a16="http://schemas.microsoft.com/office/drawing/2014/main" id="{21CB80A6-2177-4740-A5FA-B2FC1E8D547F}"/>
+              </a:ext>
+            </a:extLst>
+          </p:cNvPr>
+          <p:cNvSpPr/>
+          <p:nvPr/>
+        </p:nvSpPr>
+        <p:spPr>
+          <a:xfrm rot="5400000">
+            <a:off x="5577286" y="-2193725"/>
+            <a:ext cx="669973" cy="7839514"/>
+          </a:xfrm>
+          <a:prstGeom prst="leftBrace">
+            <a:avLst>
+              <a:gd name="adj1" fmla="val 8333"/>
+              <a:gd name="adj2" fmla="val 53531"/>
+            </a:avLst>
+          </a:prstGeom>
+          <a:ln w="38100">
+            <a:solidFill>
+              <a:schemeClr val="accent4"/>
+            </a:solidFill>
+          </a:ln>
+        </p:spPr>
+        <p:style>
+          <a:lnRef idx="1">
+            <a:schemeClr val="accent1"/>
+          </a:lnRef>
+          <a:fillRef idx="0">
+            <a:schemeClr val="accent1"/>
+          </a:fillRef>
+          <a:effectRef idx="0">
+            <a:schemeClr val="accent1"/>
+          </a:effectRef>
+          <a:fontRef idx="minor">
+            <a:schemeClr val="tx1"/>
+          </a:fontRef>
+        </p:style>
+        <p:txBody>
+          <a:bodyPr rtlCol="0" anchor="ctr"/>
+          <a:lstStyle/>
+          <a:p>
+            <a:pPr algn="ctr"/>
+            <a:endParaRPr lang="en-GB" dirty="0"/>
+          </a:p>
+        </p:txBody>
+      </p:sp>
+      <p:sp>
+        <p:nvSpPr>
+          <p:cNvPr id="10" name="Left Brace 9">
+            <a:extLst>
+              <a:ext uri="{FF2B5EF4-FFF2-40B4-BE49-F238E27FC236}">
+                <a16:creationId xmlns:a16="http://schemas.microsoft.com/office/drawing/2014/main" id="{D9BAFF37-C112-4618-A993-30FC9730AEDC}"/>
+              </a:ext>
+            </a:extLst>
+          </p:cNvPr>
+          <p:cNvSpPr/>
+          <p:nvPr/>
+        </p:nvSpPr>
+        <p:spPr>
+          <a:xfrm rot="5400000">
+            <a:off x="9587063" y="3131198"/>
+            <a:ext cx="669973" cy="2944717"/>
+          </a:xfrm>
+          <a:prstGeom prst="leftBrace">
+            <a:avLst>
+              <a:gd name="adj1" fmla="val 8333"/>
+              <a:gd name="adj2" fmla="val 23563"/>
+            </a:avLst>
+          </a:prstGeom>
+          <a:ln w="38100">
+            <a:solidFill>
+              <a:schemeClr val="accent4"/>
+            </a:solidFill>
+          </a:ln>
+        </p:spPr>
+        <p:style>
+          <a:lnRef idx="1">
+            <a:schemeClr val="accent1"/>
+          </a:lnRef>
+          <a:fillRef idx="0">
+            <a:schemeClr val="accent1"/>
+          </a:fillRef>
+          <a:effectRef idx="0">
+            <a:schemeClr val="accent1"/>
+          </a:effectRef>
+          <a:fontRef idx="minor">
+            <a:schemeClr val="tx1"/>
+          </a:fontRef>
+        </p:style>
+        <p:txBody>
+          <a:bodyPr rtlCol="0" anchor="ctr"/>
+          <a:lstStyle/>
+          <a:p>
+            <a:pPr algn="ctr"/>
+            <a:endParaRPr lang="en-GB" dirty="0"/>
+          </a:p>
+        </p:txBody>
+      </p:sp>
+      <p:pic>
+        <p:nvPicPr>
+          <p:cNvPr id="2" name="Picture 1">
+            <a:extLst>
+              <a:ext uri="{FF2B5EF4-FFF2-40B4-BE49-F238E27FC236}">
+                <a16:creationId xmlns:a16="http://schemas.microsoft.com/office/drawing/2014/main" id="{36CE73C9-BA77-4ECA-AA16-858684EEB8DD}"/>
+              </a:ext>
+            </a:extLst>
+          </p:cNvPr>
+          <p:cNvPicPr>
+            <a:picLocks noChangeAspect="1"/>
+          </p:cNvPicPr>
+          <p:nvPr/>
+        </p:nvPicPr>
+        <p:blipFill>
+          <a:blip r:embed="rId6"/>
+          <a:stretch>
+            <a:fillRect/>
+          </a:stretch>
+        </p:blipFill>
+        <p:spPr>
+          <a:xfrm>
+            <a:off x="98228" y="90289"/>
+            <a:ext cx="892528" cy="579404"/>
+          </a:xfrm>
+          <a:prstGeom prst="rect">
+            <a:avLst/>
+          </a:prstGeom>
+        </p:spPr>
+      </p:pic>
+      <p:pic>
+        <p:nvPicPr>
+          <p:cNvPr id="3" name="Picture 2">
+            <a:extLst>
+              <a:ext uri="{FF2B5EF4-FFF2-40B4-BE49-F238E27FC236}">
+                <a16:creationId xmlns:a16="http://schemas.microsoft.com/office/drawing/2014/main" id="{BAC2FA6D-7E44-4A70-ABBF-441AC58C61D8}"/>
+              </a:ext>
+            </a:extLst>
+          </p:cNvPr>
+          <p:cNvPicPr>
+            <a:picLocks noChangeAspect="1"/>
+          </p:cNvPicPr>
+          <p:nvPr/>
+        </p:nvPicPr>
+        <p:blipFill>
+          <a:blip r:embed="rId7"/>
+          <a:stretch>
+            <a:fillRect/>
+          </a:stretch>
+        </p:blipFill>
+        <p:spPr>
+          <a:xfrm>
+            <a:off x="98228" y="1729056"/>
+            <a:ext cx="892528" cy="586800"/>
+          </a:xfrm>
+          <a:prstGeom prst="rect">
+            <a:avLst/>
+          </a:prstGeom>
+        </p:spPr>
+      </p:pic>
+      <p:pic>
+        <p:nvPicPr>
+          <p:cNvPr id="4" name="Picture 3">
+            <a:extLst>
+              <a:ext uri="{FF2B5EF4-FFF2-40B4-BE49-F238E27FC236}">
+                <a16:creationId xmlns:a16="http://schemas.microsoft.com/office/drawing/2014/main" id="{FB95A457-1250-418F-8752-3AD3D6CA1CBF}"/>
+              </a:ext>
+            </a:extLst>
+          </p:cNvPr>
+          <p:cNvPicPr>
+            <a:picLocks noChangeAspect="1"/>
+          </p:cNvPicPr>
+          <p:nvPr/>
+        </p:nvPicPr>
+        <p:blipFill>
+          <a:blip r:embed="rId8"/>
+          <a:stretch>
+            <a:fillRect/>
+          </a:stretch>
+        </p:blipFill>
+        <p:spPr>
+          <a:xfrm>
+            <a:off x="98228" y="4560693"/>
+            <a:ext cx="892528" cy="586800"/>
+          </a:xfrm>
+          <a:prstGeom prst="rect">
+            <a:avLst/>
+          </a:prstGeom>
+        </p:spPr>
+      </p:pic>
+      <p:sp>
+        <p:nvSpPr>
+          <p:cNvPr id="23" name="TextBox 22">
+            <a:extLst>
+              <a:ext uri="{FF2B5EF4-FFF2-40B4-BE49-F238E27FC236}">
+                <a16:creationId xmlns:a16="http://schemas.microsoft.com/office/drawing/2014/main" id="{06F8B482-C37F-4E4C-9FB0-942BA9C3D5D1}"/>
               </a:ext>
             </a:extLst>
           </p:cNvPr>
@@ -6255,8 +6986,8 @@
         </p:nvSpPr>
         <p:spPr>
           <a:xfrm>
-            <a:off x="8314606" y="2200830"/>
-            <a:ext cx="1141659" cy="461665"/>
+            <a:off x="990756" y="155362"/>
+            <a:ext cx="1813060" cy="461665"/>
           </a:xfrm>
           <a:prstGeom prst="rect">
             <a:avLst/>
@@ -6270,6 +7001,577 @@
           <a:lstStyle/>
           <a:p>
             <a:r>
+              <a:rPr lang="en-US" sz="2400" b="1" dirty="0"/>
+              <a:t>Grandparent</a:t>
+            </a:r>
+            <a:endParaRPr lang="en-GB" sz="2400" b="1" dirty="0"/>
+          </a:p>
+        </p:txBody>
+      </p:sp>
+      <p:sp>
+        <p:nvSpPr>
+          <p:cNvPr id="24" name="TextBox 23">
+            <a:extLst>
+              <a:ext uri="{FF2B5EF4-FFF2-40B4-BE49-F238E27FC236}">
+                <a16:creationId xmlns:a16="http://schemas.microsoft.com/office/drawing/2014/main" id="{2B1D7642-1297-4FF4-AC1C-9E90A1648238}"/>
+              </a:ext>
+            </a:extLst>
+          </p:cNvPr>
+          <p:cNvSpPr txBox="1"/>
+          <p:nvPr/>
+        </p:nvSpPr>
+        <p:spPr>
+          <a:xfrm>
+            <a:off x="967428" y="1791627"/>
+            <a:ext cx="1025089" cy="461665"/>
+          </a:xfrm>
+          <a:prstGeom prst="rect">
+            <a:avLst/>
+          </a:prstGeom>
+          <a:noFill/>
+        </p:spPr>
+        <p:txBody>
+          <a:bodyPr wrap="none" rtlCol="0">
+            <a:spAutoFit/>
+          </a:bodyPr>
+          <a:lstStyle/>
+          <a:p>
+            <a:r>
+              <a:rPr lang="en-US" sz="2400" b="1" dirty="0"/>
+              <a:t>Parent</a:t>
+            </a:r>
+            <a:endParaRPr lang="en-GB" sz="2400" b="1" dirty="0"/>
+          </a:p>
+        </p:txBody>
+      </p:sp>
+      <p:sp>
+        <p:nvSpPr>
+          <p:cNvPr id="25" name="TextBox 24">
+            <a:extLst>
+              <a:ext uri="{FF2B5EF4-FFF2-40B4-BE49-F238E27FC236}">
+                <a16:creationId xmlns:a16="http://schemas.microsoft.com/office/drawing/2014/main" id="{6B7827E1-5A9B-4381-BD48-FF1E8075FB93}"/>
+              </a:ext>
+            </a:extLst>
+          </p:cNvPr>
+          <p:cNvSpPr txBox="1"/>
+          <p:nvPr/>
+        </p:nvSpPr>
+        <p:spPr>
+          <a:xfrm>
+            <a:off x="968110" y="4623265"/>
+            <a:ext cx="829073" cy="461665"/>
+          </a:xfrm>
+          <a:prstGeom prst="rect">
+            <a:avLst/>
+          </a:prstGeom>
+          <a:noFill/>
+        </p:spPr>
+        <p:txBody>
+          <a:bodyPr wrap="none" rtlCol="0">
+            <a:spAutoFit/>
+          </a:bodyPr>
+          <a:lstStyle/>
+          <a:p>
+            <a:r>
+              <a:rPr lang="en-US" sz="2400" b="1" dirty="0"/>
+              <a:t>Child</a:t>
+            </a:r>
+            <a:endParaRPr lang="en-GB" sz="2400" b="1" dirty="0"/>
+          </a:p>
+        </p:txBody>
+      </p:sp>
+      <p:sp>
+        <p:nvSpPr>
+          <p:cNvPr id="6" name="TextBox 5">
+            <a:extLst>
+              <a:ext uri="{FF2B5EF4-FFF2-40B4-BE49-F238E27FC236}">
+                <a16:creationId xmlns:a16="http://schemas.microsoft.com/office/drawing/2014/main" id="{17F8A168-3F01-42AA-ACD1-52226D338250}"/>
+              </a:ext>
+            </a:extLst>
+          </p:cNvPr>
+          <p:cNvSpPr txBox="1"/>
+          <p:nvPr/>
+        </p:nvSpPr>
+        <p:spPr>
+          <a:xfrm>
+            <a:off x="11621396" y="1214"/>
+            <a:ext cx="588623" cy="369332"/>
+          </a:xfrm>
+          <a:prstGeom prst="rect">
+            <a:avLst/>
+          </a:prstGeom>
+          <a:noFill/>
+        </p:spPr>
+        <p:txBody>
+          <a:bodyPr wrap="none" rtlCol="0">
+            <a:spAutoFit/>
+          </a:bodyPr>
+          <a:lstStyle/>
+          <a:p>
+            <a:r>
+              <a:rPr lang="en-GB" b="1" dirty="0"/>
+              <a:t>v1.4</a:t>
+            </a:r>
+          </a:p>
+        </p:txBody>
+      </p:sp>
+      <p:pic>
+        <p:nvPicPr>
+          <p:cNvPr id="5" name="Picture 4" descr="A screenshot of a cell phone&#10;&#10;Description automatically generated">
+            <a:extLst>
+              <a:ext uri="{FF2B5EF4-FFF2-40B4-BE49-F238E27FC236}">
+                <a16:creationId xmlns:a16="http://schemas.microsoft.com/office/drawing/2014/main" id="{9D5DA8E3-64DB-4086-90D5-4957AE971C73}"/>
+              </a:ext>
+            </a:extLst>
+          </p:cNvPr>
+          <p:cNvPicPr>
+            <a:picLocks noChangeAspect="1"/>
+          </p:cNvPicPr>
+          <p:nvPr/>
+        </p:nvPicPr>
+        <p:blipFill>
+          <a:blip r:embed="rId9">
+            <a:extLst>
+              <a:ext uri="{28A0092B-C50C-407E-A947-70E740481C1C}">
+                <a14:useLocalDpi xmlns:a14="http://schemas.microsoft.com/office/drawing/2010/main" val="0"/>
+              </a:ext>
+            </a:extLst>
+          </a:blip>
+          <a:stretch>
+            <a:fillRect/>
+          </a:stretch>
+        </p:blipFill>
+        <p:spPr>
+          <a:xfrm>
+            <a:off x="3030363" y="34009"/>
+            <a:ext cx="6699512" cy="1527060"/>
+          </a:xfrm>
+          <a:prstGeom prst="rect">
+            <a:avLst/>
+          </a:prstGeom>
+        </p:spPr>
+      </p:pic>
+      <p:pic>
+        <p:nvPicPr>
+          <p:cNvPr id="16" name="Picture 15">
+            <a:extLst>
+              <a:ext uri="{FF2B5EF4-FFF2-40B4-BE49-F238E27FC236}">
+                <a16:creationId xmlns:a16="http://schemas.microsoft.com/office/drawing/2014/main" id="{F24BA0AF-BC82-4B39-B34F-61FA814CDF4F}"/>
+              </a:ext>
+            </a:extLst>
+          </p:cNvPr>
+          <p:cNvPicPr>
+            <a:picLocks noChangeAspect="1"/>
+          </p:cNvPicPr>
+          <p:nvPr/>
+        </p:nvPicPr>
+        <p:blipFill>
+          <a:blip r:embed="rId10"/>
+          <a:stretch>
+            <a:fillRect/>
+          </a:stretch>
+        </p:blipFill>
+        <p:spPr>
+          <a:xfrm>
+            <a:off x="10600853" y="10326702"/>
+            <a:ext cx="1281782" cy="628684"/>
+          </a:xfrm>
+          <a:prstGeom prst="rect">
+            <a:avLst/>
+          </a:prstGeom>
+        </p:spPr>
+      </p:pic>
+      <p:pic>
+        <p:nvPicPr>
+          <p:cNvPr id="21" name="Picture 20">
+            <a:extLst>
+              <a:ext uri="{FF2B5EF4-FFF2-40B4-BE49-F238E27FC236}">
+                <a16:creationId xmlns:a16="http://schemas.microsoft.com/office/drawing/2014/main" id="{E4C2318B-2360-42D0-9299-8909E272F9B4}"/>
+              </a:ext>
+            </a:extLst>
+          </p:cNvPr>
+          <p:cNvPicPr>
+            <a:picLocks noChangeAspect="1"/>
+          </p:cNvPicPr>
+          <p:nvPr/>
+        </p:nvPicPr>
+        <p:blipFill>
+          <a:blip r:embed="rId11"/>
+          <a:stretch>
+            <a:fillRect/>
+          </a:stretch>
+        </p:blipFill>
+        <p:spPr>
+          <a:xfrm>
+            <a:off x="10608713" y="10979760"/>
+            <a:ext cx="1271547" cy="626469"/>
+          </a:xfrm>
+          <a:prstGeom prst="rect">
+            <a:avLst/>
+          </a:prstGeom>
+        </p:spPr>
+      </p:pic>
+      <p:pic>
+        <p:nvPicPr>
+          <p:cNvPr id="22" name="Picture 21">
+            <a:extLst>
+              <a:ext uri="{FF2B5EF4-FFF2-40B4-BE49-F238E27FC236}">
+                <a16:creationId xmlns:a16="http://schemas.microsoft.com/office/drawing/2014/main" id="{363DAB9F-0C05-4E7F-85D5-DC404795DA15}"/>
+              </a:ext>
+            </a:extLst>
+          </p:cNvPr>
+          <p:cNvPicPr>
+            <a:picLocks noChangeAspect="1"/>
+          </p:cNvPicPr>
+          <p:nvPr/>
+        </p:nvPicPr>
+        <p:blipFill>
+          <a:blip r:embed="rId12"/>
+          <a:stretch>
+            <a:fillRect/>
+          </a:stretch>
+        </p:blipFill>
+        <p:spPr>
+          <a:xfrm>
+            <a:off x="10577106" y="11632056"/>
+            <a:ext cx="1295931" cy="626469"/>
+          </a:xfrm>
+          <a:prstGeom prst="rect">
+            <a:avLst/>
+          </a:prstGeom>
+        </p:spPr>
+      </p:pic>
+      <p:sp>
+        <p:nvSpPr>
+          <p:cNvPr id="27" name="TextBox 26">
+            <a:extLst>
+              <a:ext uri="{FF2B5EF4-FFF2-40B4-BE49-F238E27FC236}">
+                <a16:creationId xmlns:a16="http://schemas.microsoft.com/office/drawing/2014/main" id="{7D5378B2-2ACB-40F2-81F0-5133D5E3A132}"/>
+              </a:ext>
+            </a:extLst>
+          </p:cNvPr>
+          <p:cNvSpPr txBox="1"/>
+          <p:nvPr/>
+        </p:nvSpPr>
+        <p:spPr>
+          <a:xfrm>
+            <a:off x="9619478" y="10456378"/>
+            <a:ext cx="1053494" cy="395942"/>
+          </a:xfrm>
+          <a:prstGeom prst="rect">
+            <a:avLst/>
+          </a:prstGeom>
+          <a:noFill/>
+        </p:spPr>
+        <p:txBody>
+          <a:bodyPr wrap="none" rtlCol="0">
+            <a:spAutoFit/>
+          </a:bodyPr>
+          <a:lstStyle/>
+          <a:p>
+            <a:r>
+              <a:rPr lang="en-GB" dirty="0"/>
+              <a:t>@{Case}</a:t>
+            </a:r>
+          </a:p>
+        </p:txBody>
+      </p:sp>
+      <p:pic>
+        <p:nvPicPr>
+          <p:cNvPr id="9" name="Picture 8">
+            <a:extLst>
+              <a:ext uri="{FF2B5EF4-FFF2-40B4-BE49-F238E27FC236}">
+                <a16:creationId xmlns:a16="http://schemas.microsoft.com/office/drawing/2014/main" id="{830ECE33-9E5F-4091-9D12-99B9CAA53606}"/>
+              </a:ext>
+            </a:extLst>
+          </p:cNvPr>
+          <p:cNvPicPr>
+            <a:picLocks noChangeAspect="1"/>
+          </p:cNvPicPr>
+          <p:nvPr/>
+        </p:nvPicPr>
+        <p:blipFill>
+          <a:blip r:embed="rId13"/>
+          <a:stretch>
+            <a:fillRect/>
+          </a:stretch>
+        </p:blipFill>
+        <p:spPr>
+          <a:xfrm>
+            <a:off x="6963840" y="3694891"/>
+            <a:ext cx="4449616" cy="641100"/>
+          </a:xfrm>
+          <a:prstGeom prst="rect">
+            <a:avLst/>
+          </a:prstGeom>
+        </p:spPr>
+      </p:pic>
+      <p:pic>
+        <p:nvPicPr>
+          <p:cNvPr id="19" name="Picture 18">
+            <a:extLst>
+              <a:ext uri="{FF2B5EF4-FFF2-40B4-BE49-F238E27FC236}">
+                <a16:creationId xmlns:a16="http://schemas.microsoft.com/office/drawing/2014/main" id="{45593E8A-47D3-4EAD-9C33-0C4BD7D50503}"/>
+              </a:ext>
+            </a:extLst>
+          </p:cNvPr>
+          <p:cNvPicPr>
+            <a:picLocks noChangeAspect="1"/>
+          </p:cNvPicPr>
+          <p:nvPr/>
+        </p:nvPicPr>
+        <p:blipFill>
+          <a:blip r:embed="rId14"/>
+          <a:stretch>
+            <a:fillRect/>
+          </a:stretch>
+        </p:blipFill>
+        <p:spPr>
+          <a:xfrm>
+            <a:off x="8559174" y="4697112"/>
+            <a:ext cx="2803699" cy="928418"/>
+          </a:xfrm>
+          <a:prstGeom prst="rect">
+            <a:avLst/>
+          </a:prstGeom>
+        </p:spPr>
+      </p:pic>
+      <p:cxnSp>
+        <p:nvCxnSpPr>
+          <p:cNvPr id="28" name="Straight Connector 27">
+            <a:extLst>
+              <a:ext uri="{FF2B5EF4-FFF2-40B4-BE49-F238E27FC236}">
+                <a16:creationId xmlns:a16="http://schemas.microsoft.com/office/drawing/2014/main" id="{ECB87505-EE27-4221-BABC-E83F318564FE}"/>
+              </a:ext>
+            </a:extLst>
+          </p:cNvPr>
+          <p:cNvCxnSpPr>
+            <a:cxnSpLocks/>
+          </p:cNvCxnSpPr>
+          <p:nvPr/>
+        </p:nvCxnSpPr>
+        <p:spPr>
+          <a:xfrm>
+            <a:off x="98228" y="8232352"/>
+            <a:ext cx="12111789" cy="0"/>
+          </a:xfrm>
+          <a:prstGeom prst="line">
+            <a:avLst/>
+          </a:prstGeom>
+          <a:ln w="57150">
+            <a:solidFill>
+              <a:schemeClr val="bg1">
+                <a:lumMod val="50000"/>
+              </a:schemeClr>
+            </a:solidFill>
+            <a:prstDash val="sysDot"/>
+          </a:ln>
+        </p:spPr>
+        <p:style>
+          <a:lnRef idx="1">
+            <a:schemeClr val="accent1"/>
+          </a:lnRef>
+          <a:fillRef idx="0">
+            <a:schemeClr val="accent1"/>
+          </a:fillRef>
+          <a:effectRef idx="0">
+            <a:schemeClr val="accent1"/>
+          </a:effectRef>
+          <a:fontRef idx="minor">
+            <a:schemeClr val="tx1"/>
+          </a:fontRef>
+        </p:style>
+      </p:cxnSp>
+      <p:sp>
+        <p:nvSpPr>
+          <p:cNvPr id="37" name="TextBox 36">
+            <a:extLst>
+              <a:ext uri="{FF2B5EF4-FFF2-40B4-BE49-F238E27FC236}">
+                <a16:creationId xmlns:a16="http://schemas.microsoft.com/office/drawing/2014/main" id="{6F1134F0-B278-42E9-8045-C82105634470}"/>
+              </a:ext>
+            </a:extLst>
+          </p:cNvPr>
+          <p:cNvSpPr txBox="1"/>
+          <p:nvPr/>
+        </p:nvSpPr>
+        <p:spPr>
+          <a:xfrm>
+            <a:off x="6913061" y="11759279"/>
+            <a:ext cx="1003993" cy="369332"/>
+          </a:xfrm>
+          <a:prstGeom prst="rect">
+            <a:avLst/>
+          </a:prstGeom>
+          <a:noFill/>
+        </p:spPr>
+        <p:txBody>
+          <a:bodyPr wrap="none" rtlCol="0">
+            <a:spAutoFit/>
+          </a:bodyPr>
+          <a:lstStyle/>
+          <a:p>
+            <a:r>
+              <a:rPr lang="en-GB" dirty="0"/>
+              <a:t>@{False}</a:t>
+            </a:r>
+          </a:p>
+        </p:txBody>
+      </p:sp>
+      <p:pic>
+        <p:nvPicPr>
+          <p:cNvPr id="39" name="Picture 38">
+            <a:extLst>
+              <a:ext uri="{FF2B5EF4-FFF2-40B4-BE49-F238E27FC236}">
+                <a16:creationId xmlns:a16="http://schemas.microsoft.com/office/drawing/2014/main" id="{5E8338BF-3C0E-4D21-82FF-37CD415C1135}"/>
+              </a:ext>
+            </a:extLst>
+          </p:cNvPr>
+          <p:cNvPicPr>
+            <a:picLocks noChangeAspect="1"/>
+          </p:cNvPicPr>
+          <p:nvPr/>
+        </p:nvPicPr>
+        <p:blipFill>
+          <a:blip r:embed="rId15"/>
+          <a:stretch>
+            <a:fillRect/>
+          </a:stretch>
+        </p:blipFill>
+        <p:spPr>
+          <a:xfrm>
+            <a:off x="7901357" y="11606229"/>
+            <a:ext cx="1363978" cy="675432"/>
+          </a:xfrm>
+          <a:prstGeom prst="rect">
+            <a:avLst/>
+          </a:prstGeom>
+        </p:spPr>
+      </p:pic>
+      <p:pic>
+        <p:nvPicPr>
+          <p:cNvPr id="40" name="Picture 39">
+            <a:extLst>
+              <a:ext uri="{FF2B5EF4-FFF2-40B4-BE49-F238E27FC236}">
+                <a16:creationId xmlns:a16="http://schemas.microsoft.com/office/drawing/2014/main" id="{4DAF1527-CD65-4AB9-828A-1ED6FE0D86D7}"/>
+              </a:ext>
+            </a:extLst>
+          </p:cNvPr>
+          <p:cNvPicPr>
+            <a:picLocks noChangeAspect="1"/>
+          </p:cNvPicPr>
+          <p:nvPr/>
+        </p:nvPicPr>
+        <p:blipFill>
+          <a:blip r:embed="rId16"/>
+          <a:stretch>
+            <a:fillRect/>
+          </a:stretch>
+        </p:blipFill>
+        <p:spPr>
+          <a:xfrm>
+            <a:off x="80849" y="8355427"/>
+            <a:ext cx="927286" cy="600309"/>
+          </a:xfrm>
+          <a:prstGeom prst="rect">
+            <a:avLst/>
+          </a:prstGeom>
+        </p:spPr>
+      </p:pic>
+      <p:sp>
+        <p:nvSpPr>
+          <p:cNvPr id="41" name="TextBox 40">
+            <a:extLst>
+              <a:ext uri="{FF2B5EF4-FFF2-40B4-BE49-F238E27FC236}">
+                <a16:creationId xmlns:a16="http://schemas.microsoft.com/office/drawing/2014/main" id="{E5D01E17-60FE-405E-8FC1-C403C23EA74D}"/>
+              </a:ext>
+            </a:extLst>
+          </p:cNvPr>
+          <p:cNvSpPr txBox="1"/>
+          <p:nvPr/>
+        </p:nvSpPr>
+        <p:spPr>
+          <a:xfrm>
+            <a:off x="990756" y="8424748"/>
+            <a:ext cx="944618" cy="461665"/>
+          </a:xfrm>
+          <a:prstGeom prst="rect">
+            <a:avLst/>
+          </a:prstGeom>
+          <a:noFill/>
+        </p:spPr>
+        <p:txBody>
+          <a:bodyPr wrap="none" rtlCol="0">
+            <a:spAutoFit/>
+          </a:bodyPr>
+          <a:lstStyle/>
+          <a:p>
+            <a:r>
+              <a:rPr lang="en-US" sz="2400" b="1" dirty="0"/>
+              <a:t>Infant</a:t>
+            </a:r>
+            <a:endParaRPr lang="en-GB" sz="2400" b="1" dirty="0"/>
+          </a:p>
+        </p:txBody>
+      </p:sp>
+    </p:spTree>
+    <p:extLst>
+      <p:ext uri="{BB962C8B-B14F-4D97-AF65-F5344CB8AC3E}">
+        <p14:creationId xmlns:p14="http://schemas.microsoft.com/office/powerpoint/2010/main" val="2783873713"/>
+      </p:ext>
+    </p:extLst>
+  </p:cSld>
+  <p:clrMapOvr>
+    <a:masterClrMapping/>
+  </p:clrMapOvr>
+</p:sld>
+</file>
+
+<file path=ppt/slides/slide6.xml><?xml version="1.0" encoding="utf-8"?>
+<p:sld xmlns:a="http://schemas.openxmlformats.org/drawingml/2006/main" xmlns:r="http://schemas.openxmlformats.org/officeDocument/2006/relationships" xmlns:p="http://schemas.openxmlformats.org/presentationml/2006/main">
+  <p:cSld>
+    <p:spTree>
+      <p:nvGrpSpPr>
+        <p:cNvPr id="1" name=""/>
+        <p:cNvGrpSpPr/>
+        <p:nvPr/>
+      </p:nvGrpSpPr>
+      <p:grpSpPr>
+        <a:xfrm>
+          <a:off x="0" y="0"/>
+          <a:ext cx="0" cy="0"/>
+          <a:chOff x="0" y="0"/>
+          <a:chExt cx="0" cy="0"/>
+        </a:xfrm>
+      </p:grpSpPr>
+      <p:sp>
+        <p:nvSpPr>
+          <p:cNvPr id="16" name="TextBox 15">
+            <a:extLst>
+              <a:ext uri="{FF2B5EF4-FFF2-40B4-BE49-F238E27FC236}">
+                <a16:creationId xmlns:a16="http://schemas.microsoft.com/office/drawing/2014/main" id="{73A2C03B-7980-42A1-AE0F-C2B2904F8E3B}"/>
+              </a:ext>
+            </a:extLst>
+          </p:cNvPr>
+          <p:cNvSpPr txBox="1"/>
+          <p:nvPr/>
+        </p:nvSpPr>
+        <p:spPr>
+          <a:xfrm>
+            <a:off x="8518602" y="3100943"/>
+            <a:ext cx="974947" cy="395942"/>
+          </a:xfrm>
+          <a:prstGeom prst="rect">
+            <a:avLst/>
+          </a:prstGeom>
+          <a:noFill/>
+        </p:spPr>
+        <p:txBody>
+          <a:bodyPr wrap="none" rtlCol="0">
+            <a:spAutoFit/>
+          </a:bodyPr>
+          <a:lstStyle/>
+          <a:p>
+            <a:r>
               <a:rPr lang="en-GB" dirty="0"/>
               <a:t>Success</a:t>
             </a:r>
@@ -6292,7 +7594,7 @@
         </p:nvCxnSpPr>
         <p:spPr>
           <a:xfrm>
-            <a:off x="6299860" y="3054675"/>
+            <a:off x="6503858" y="3954792"/>
             <a:ext cx="1982707" cy="461665"/>
           </a:xfrm>
           <a:prstGeom prst="bentConnector3">
@@ -6340,7 +7642,7 @@
         </p:nvCxnSpPr>
         <p:spPr>
           <a:xfrm>
-            <a:off x="6311900" y="2979010"/>
+            <a:off x="6515898" y="3879127"/>
             <a:ext cx="1982707" cy="195203"/>
           </a:xfrm>
           <a:prstGeom prst="bentConnector3">
@@ -6384,8 +7686,8 @@
         </p:nvCxnSpPr>
         <p:spPr>
           <a:xfrm flipV="1">
-            <a:off x="6299860" y="2752586"/>
-            <a:ext cx="2007209" cy="150749"/>
+            <a:off x="6503857" y="3666004"/>
+            <a:ext cx="2007208" cy="137450"/>
           </a:xfrm>
           <a:prstGeom prst="bentConnector3">
             <a:avLst>
@@ -6431,12 +7733,12 @@
         </p:nvCxnSpPr>
         <p:spPr>
           <a:xfrm flipV="1">
-            <a:off x="6827520" y="2431663"/>
-            <a:ext cx="1487086" cy="398530"/>
+            <a:off x="7031515" y="3298914"/>
+            <a:ext cx="1487087" cy="431398"/>
           </a:xfrm>
           <a:prstGeom prst="bentConnector3">
             <a:avLst>
-              <a:gd name="adj1" fmla="val 27454"/>
+              <a:gd name="adj1" fmla="val 50000"/>
             </a:avLst>
           </a:prstGeom>
           <a:ln w="76200">
@@ -6475,8 +7777,8 @@
         </p:nvSpPr>
         <p:spPr>
           <a:xfrm>
-            <a:off x="8307069" y="2567920"/>
-            <a:ext cx="500650" cy="369332"/>
+            <a:off x="8511066" y="3468033"/>
+            <a:ext cx="532133" cy="395942"/>
           </a:xfrm>
           <a:prstGeom prst="rect">
             <a:avLst/>
@@ -6510,8 +7812,8 @@
         </p:nvSpPr>
         <p:spPr>
           <a:xfrm>
-            <a:off x="8297782" y="2975782"/>
-            <a:ext cx="1393138" cy="461665"/>
+            <a:off x="8501778" y="3875896"/>
+            <a:ext cx="1179297" cy="395942"/>
           </a:xfrm>
           <a:prstGeom prst="rect">
             <a:avLst/>
@@ -6545,8 +7847,8 @@
         </p:nvSpPr>
         <p:spPr>
           <a:xfrm>
-            <a:off x="8282567" y="3335715"/>
-            <a:ext cx="697627" cy="461665"/>
+            <a:off x="8486564" y="4235828"/>
+            <a:ext cx="607859" cy="395942"/>
           </a:xfrm>
           <a:prstGeom prst="rect">
             <a:avLst/>
@@ -6588,7 +7890,7 @@
         </p:blipFill>
         <p:spPr>
           <a:xfrm>
-            <a:off x="4116388" y="1996889"/>
+            <a:off x="4320385" y="2897006"/>
             <a:ext cx="2895447" cy="1569659"/>
           </a:xfrm>
           <a:prstGeom prst="rect">
@@ -6610,7 +7912,7 @@
         </p:nvSpPr>
         <p:spPr>
           <a:xfrm>
-            <a:off x="5103542" y="2723239"/>
+            <a:off x="5307540" y="3623353"/>
             <a:ext cx="1891993" cy="400110"/>
           </a:xfrm>
           <a:prstGeom prst="rect">
@@ -6653,7 +7955,7 @@
         </p:blipFill>
         <p:spPr>
           <a:xfrm>
-            <a:off x="4269440" y="2546608"/>
+            <a:off x="4473434" y="3446725"/>
             <a:ext cx="854296" cy="787151"/>
           </a:xfrm>
           <a:prstGeom prst="rect">
@@ -6675,7 +7977,7 @@
         </p:nvSpPr>
         <p:spPr>
           <a:xfrm rot="5400000">
-            <a:off x="5344698" y="1215023"/>
+            <a:off x="5548693" y="2115140"/>
             <a:ext cx="618458" cy="945277"/>
           </a:xfrm>
           <a:prstGeom prst="bentArrow">
@@ -6742,7 +8044,7 @@
         </p:blipFill>
         <p:spPr>
           <a:xfrm>
-            <a:off x="5556568" y="1111408"/>
+            <a:off x="5760562" y="2011525"/>
             <a:ext cx="945276" cy="618459"/>
           </a:xfrm>
           <a:prstGeom prst="rect">
@@ -6772,7 +8074,7 @@
         </p:blipFill>
         <p:spPr>
           <a:xfrm>
-            <a:off x="4155030" y="698943"/>
+            <a:off x="4359024" y="1599057"/>
             <a:ext cx="1205286" cy="1201956"/>
           </a:xfrm>
           <a:prstGeom prst="rect">

</xml_diff>

<commit_message>
Function status checking hardening.
</commit_message>
<xml_diff>
--- a/Images/All ADF Activities.pptx
+++ b/Images/All ADF Activities.pptx
@@ -248,7 +248,7 @@
           <a:p>
             <a:fld id="{1F80DB50-5271-4B1A-976D-0A7715B55622}" type="datetimeFigureOut">
               <a:rPr lang="en-GB" smtClean="0"/>
-              <a:t>07/04/2020</a:t>
+              <a:t>14/04/2020</a:t>
             </a:fld>
             <a:endParaRPr lang="en-GB"/>
           </a:p>
@@ -418,7 +418,7 @@
           <a:p>
             <a:fld id="{1F80DB50-5271-4B1A-976D-0A7715B55622}" type="datetimeFigureOut">
               <a:rPr lang="en-GB" smtClean="0"/>
-              <a:t>07/04/2020</a:t>
+              <a:t>14/04/2020</a:t>
             </a:fld>
             <a:endParaRPr lang="en-GB"/>
           </a:p>
@@ -598,7 +598,7 @@
           <a:p>
             <a:fld id="{1F80DB50-5271-4B1A-976D-0A7715B55622}" type="datetimeFigureOut">
               <a:rPr lang="en-GB" smtClean="0"/>
-              <a:t>07/04/2020</a:t>
+              <a:t>14/04/2020</a:t>
             </a:fld>
             <a:endParaRPr lang="en-GB"/>
           </a:p>
@@ -768,7 +768,7 @@
           <a:p>
             <a:fld id="{1F80DB50-5271-4B1A-976D-0A7715B55622}" type="datetimeFigureOut">
               <a:rPr lang="en-GB" smtClean="0"/>
-              <a:t>07/04/2020</a:t>
+              <a:t>14/04/2020</a:t>
             </a:fld>
             <a:endParaRPr lang="en-GB"/>
           </a:p>
@@ -1012,7 +1012,7 @@
           <a:p>
             <a:fld id="{1F80DB50-5271-4B1A-976D-0A7715B55622}" type="datetimeFigureOut">
               <a:rPr lang="en-GB" smtClean="0"/>
-              <a:t>07/04/2020</a:t>
+              <a:t>14/04/2020</a:t>
             </a:fld>
             <a:endParaRPr lang="en-GB"/>
           </a:p>
@@ -1244,7 +1244,7 @@
           <a:p>
             <a:fld id="{1F80DB50-5271-4B1A-976D-0A7715B55622}" type="datetimeFigureOut">
               <a:rPr lang="en-GB" smtClean="0"/>
-              <a:t>07/04/2020</a:t>
+              <a:t>14/04/2020</a:t>
             </a:fld>
             <a:endParaRPr lang="en-GB"/>
           </a:p>
@@ -1611,7 +1611,7 @@
           <a:p>
             <a:fld id="{1F80DB50-5271-4B1A-976D-0A7715B55622}" type="datetimeFigureOut">
               <a:rPr lang="en-GB" smtClean="0"/>
-              <a:t>07/04/2020</a:t>
+              <a:t>14/04/2020</a:t>
             </a:fld>
             <a:endParaRPr lang="en-GB"/>
           </a:p>
@@ -1729,7 +1729,7 @@
           <a:p>
             <a:fld id="{1F80DB50-5271-4B1A-976D-0A7715B55622}" type="datetimeFigureOut">
               <a:rPr lang="en-GB" smtClean="0"/>
-              <a:t>07/04/2020</a:t>
+              <a:t>14/04/2020</a:t>
             </a:fld>
             <a:endParaRPr lang="en-GB"/>
           </a:p>
@@ -1824,7 +1824,7 @@
           <a:p>
             <a:fld id="{1F80DB50-5271-4B1A-976D-0A7715B55622}" type="datetimeFigureOut">
               <a:rPr lang="en-GB" smtClean="0"/>
-              <a:t>07/04/2020</a:t>
+              <a:t>14/04/2020</a:t>
             </a:fld>
             <a:endParaRPr lang="en-GB"/>
           </a:p>
@@ -2101,7 +2101,7 @@
           <a:p>
             <a:fld id="{1F80DB50-5271-4B1A-976D-0A7715B55622}" type="datetimeFigureOut">
               <a:rPr lang="en-GB" smtClean="0"/>
-              <a:t>07/04/2020</a:t>
+              <a:t>14/04/2020</a:t>
             </a:fld>
             <a:endParaRPr lang="en-GB"/>
           </a:p>
@@ -2358,7 +2358,7 @@
           <a:p>
             <a:fld id="{1F80DB50-5271-4B1A-976D-0A7715B55622}" type="datetimeFigureOut">
               <a:rPr lang="en-GB" smtClean="0"/>
-              <a:t>07/04/2020</a:t>
+              <a:t>14/04/2020</a:t>
             </a:fld>
             <a:endParaRPr lang="en-GB"/>
           </a:p>
@@ -2571,7 +2571,7 @@
           <a:p>
             <a:fld id="{1F80DB50-5271-4B1A-976D-0A7715B55622}" type="datetimeFigureOut">
               <a:rPr lang="en-GB" smtClean="0"/>
-              <a:t>07/04/2020</a:t>
+              <a:t>14/04/2020</a:t>
             </a:fld>
             <a:endParaRPr lang="en-GB"/>
           </a:p>
@@ -6242,116 +6242,12 @@
           <a:chExt cx="0" cy="0"/>
         </a:xfrm>
       </p:grpSpPr>
-      <p:sp>
-        <p:nvSpPr>
-          <p:cNvPr id="38" name="Left Brace 37">
-            <a:extLst>
-              <a:ext uri="{FF2B5EF4-FFF2-40B4-BE49-F238E27FC236}">
-                <a16:creationId xmlns:a16="http://schemas.microsoft.com/office/drawing/2014/main" id="{113523E7-4C37-484A-AEB2-5827C7EEAAD4}"/>
-              </a:ext>
-            </a:extLst>
-          </p:cNvPr>
-          <p:cNvSpPr/>
-          <p:nvPr/>
-        </p:nvSpPr>
-        <p:spPr>
-          <a:xfrm rot="5400000">
-            <a:off x="7763579" y="10363791"/>
-            <a:ext cx="669973" cy="2339616"/>
-          </a:xfrm>
-          <a:prstGeom prst="leftBrace">
-            <a:avLst>
-              <a:gd name="adj1" fmla="val 8333"/>
-              <a:gd name="adj2" fmla="val 33218"/>
-            </a:avLst>
-          </a:prstGeom>
-          <a:ln w="38100">
-            <a:solidFill>
-              <a:schemeClr val="accent4"/>
-            </a:solidFill>
-          </a:ln>
-        </p:spPr>
-        <p:style>
-          <a:lnRef idx="1">
-            <a:schemeClr val="accent1"/>
-          </a:lnRef>
-          <a:fillRef idx="0">
-            <a:schemeClr val="accent1"/>
-          </a:fillRef>
-          <a:effectRef idx="0">
-            <a:schemeClr val="accent1"/>
-          </a:effectRef>
-          <a:fontRef idx="minor">
-            <a:schemeClr val="tx1"/>
-          </a:fontRef>
-        </p:style>
-        <p:txBody>
-          <a:bodyPr rtlCol="0" anchor="ctr"/>
-          <a:lstStyle/>
-          <a:p>
-            <a:pPr algn="ctr"/>
-            <a:endParaRPr lang="en-GB" dirty="0"/>
-          </a:p>
-        </p:txBody>
-      </p:sp>
-      <p:sp>
-        <p:nvSpPr>
-          <p:cNvPr id="26" name="Left Brace 25">
-            <a:extLst>
-              <a:ext uri="{FF2B5EF4-FFF2-40B4-BE49-F238E27FC236}">
-                <a16:creationId xmlns:a16="http://schemas.microsoft.com/office/drawing/2014/main" id="{BFEB9A75-8F72-4342-9B37-CDA035FC48E7}"/>
-              </a:ext>
-            </a:extLst>
-          </p:cNvPr>
-          <p:cNvSpPr/>
-          <p:nvPr/>
-        </p:nvSpPr>
-        <p:spPr>
-          <a:xfrm rot="5400000">
-            <a:off x="10454302" y="9082094"/>
-            <a:ext cx="669973" cy="2339616"/>
-          </a:xfrm>
-          <a:prstGeom prst="leftBrace">
-            <a:avLst>
-              <a:gd name="adj1" fmla="val 8333"/>
-              <a:gd name="adj2" fmla="val 33218"/>
-            </a:avLst>
-          </a:prstGeom>
-          <a:ln w="38100">
-            <a:solidFill>
-              <a:schemeClr val="accent4"/>
-            </a:solidFill>
-          </a:ln>
-        </p:spPr>
-        <p:style>
-          <a:lnRef idx="1">
-            <a:schemeClr val="accent1"/>
-          </a:lnRef>
-          <a:fillRef idx="0">
-            <a:schemeClr val="accent1"/>
-          </a:fillRef>
-          <a:effectRef idx="0">
-            <a:schemeClr val="accent1"/>
-          </a:effectRef>
-          <a:fontRef idx="minor">
-            <a:schemeClr val="tx1"/>
-          </a:fontRef>
-        </p:style>
-        <p:txBody>
-          <a:bodyPr rtlCol="0" anchor="ctr"/>
-          <a:lstStyle/>
-          <a:p>
-            <a:pPr algn="ctr"/>
-            <a:endParaRPr lang="en-GB" dirty="0"/>
-          </a:p>
-        </p:txBody>
-      </p:sp>
       <p:pic>
         <p:nvPicPr>
-          <p:cNvPr id="35" name="Picture 34">
-            <a:extLst>
-              <a:ext uri="{FF2B5EF4-FFF2-40B4-BE49-F238E27FC236}">
-                <a16:creationId xmlns:a16="http://schemas.microsoft.com/office/drawing/2014/main" id="{9E6A9A10-B48B-483F-AB52-B0E0B2EFE1F0}"/>
+          <p:cNvPr id="39" name="Picture 38">
+            <a:extLst>
+              <a:ext uri="{FF2B5EF4-FFF2-40B4-BE49-F238E27FC236}">
+                <a16:creationId xmlns:a16="http://schemas.microsoft.com/office/drawing/2014/main" id="{5E8338BF-3C0E-4D21-82FF-37CD415C1135}"/>
               </a:ext>
             </a:extLst>
           </p:cNvPr>
@@ -6368,8 +6264,8 @@
         </p:blipFill>
         <p:spPr>
           <a:xfrm>
-            <a:off x="6358173" y="10102189"/>
-            <a:ext cx="2802424" cy="1222988"/>
+            <a:off x="6160022" y="11924273"/>
+            <a:ext cx="1363978" cy="675432"/>
           </a:xfrm>
           <a:prstGeom prst="rect">
             <a:avLst/>
@@ -6378,10 +6274,10 @@
       </p:pic>
       <p:sp>
         <p:nvSpPr>
-          <p:cNvPr id="36" name="Left Brace 35">
-            <a:extLst>
-              <a:ext uri="{FF2B5EF4-FFF2-40B4-BE49-F238E27FC236}">
-                <a16:creationId xmlns:a16="http://schemas.microsoft.com/office/drawing/2014/main" id="{A031CF25-C2FD-4ED8-9178-17403CC0C15B}"/>
+          <p:cNvPr id="38" name="Left Brace 37">
+            <a:extLst>
+              <a:ext uri="{FF2B5EF4-FFF2-40B4-BE49-F238E27FC236}">
+                <a16:creationId xmlns:a16="http://schemas.microsoft.com/office/drawing/2014/main" id="{113523E7-4C37-484A-AEB2-5827C7EEAAD4}"/>
               </a:ext>
             </a:extLst>
           </p:cNvPr>
@@ -6390,13 +6286,13 @@
         </p:nvSpPr>
         <p:spPr>
           <a:xfrm rot="5400000">
-            <a:off x="7399284" y="8579830"/>
-            <a:ext cx="669973" cy="2868554"/>
+            <a:off x="6030195" y="10681835"/>
+            <a:ext cx="669973" cy="2339616"/>
           </a:xfrm>
           <a:prstGeom prst="leftBrace">
             <a:avLst>
               <a:gd name="adj1" fmla="val 8333"/>
-              <a:gd name="adj2" fmla="val 23826"/>
+              <a:gd name="adj2" fmla="val 33218"/>
             </a:avLst>
           </a:prstGeom>
           <a:ln w="38100">
@@ -6430,10 +6326,10 @@
       </p:sp>
       <p:pic>
         <p:nvPicPr>
-          <p:cNvPr id="34" name="Picture 33" descr="A screenshot of a social media post&#10;&#10;Description automatically generated">
-            <a:extLst>
-              <a:ext uri="{FF2B5EF4-FFF2-40B4-BE49-F238E27FC236}">
-                <a16:creationId xmlns:a16="http://schemas.microsoft.com/office/drawing/2014/main" id="{ACC9A16F-2081-4769-BF18-CF2EB9F31C20}"/>
+          <p:cNvPr id="32" name="Picture 31" descr="A screenshot of a cell phone&#10;&#10;Description automatically generated">
+            <a:extLst>
+              <a:ext uri="{FF2B5EF4-FFF2-40B4-BE49-F238E27FC236}">
+                <a16:creationId xmlns:a16="http://schemas.microsoft.com/office/drawing/2014/main" id="{F26DFA87-DB02-40BE-B78D-D52C12BB164C}"/>
               </a:ext>
             </a:extLst>
           </p:cNvPr>
@@ -6456,8 +6352,8 @@
         </p:blipFill>
         <p:spPr>
           <a:xfrm>
-            <a:off x="7903210" y="8440388"/>
-            <a:ext cx="3919057" cy="1606687"/>
+            <a:off x="4578423" y="10064431"/>
+            <a:ext cx="4633285" cy="1962932"/>
           </a:xfrm>
           <a:prstGeom prst="rect">
             <a:avLst/>
@@ -6466,10 +6362,10 @@
       </p:pic>
       <p:sp>
         <p:nvSpPr>
-          <p:cNvPr id="30" name="Left Brace 29">
-            <a:extLst>
-              <a:ext uri="{FF2B5EF4-FFF2-40B4-BE49-F238E27FC236}">
-                <a16:creationId xmlns:a16="http://schemas.microsoft.com/office/drawing/2014/main" id="{3E44B7B7-CD1E-4EE2-B996-8B77D6AE9EF4}"/>
+          <p:cNvPr id="26" name="Left Brace 25">
+            <a:extLst>
+              <a:ext uri="{FF2B5EF4-FFF2-40B4-BE49-F238E27FC236}">
+                <a16:creationId xmlns:a16="http://schemas.microsoft.com/office/drawing/2014/main" id="{BFEB9A75-8F72-4342-9B37-CDA035FC48E7}"/>
               </a:ext>
             </a:extLst>
           </p:cNvPr>
@@ -6478,13 +6374,117 @@
         </p:nvSpPr>
         <p:spPr>
           <a:xfrm rot="5400000">
-            <a:off x="9508065" y="6378113"/>
-            <a:ext cx="669973" cy="4006134"/>
+            <a:off x="10454302" y="9082094"/>
+            <a:ext cx="669973" cy="2339616"/>
           </a:xfrm>
           <a:prstGeom prst="leftBrace">
             <a:avLst>
               <a:gd name="adj1" fmla="val 8333"/>
-              <a:gd name="adj2" fmla="val 38577"/>
+              <a:gd name="adj2" fmla="val 33218"/>
+            </a:avLst>
+          </a:prstGeom>
+          <a:ln w="38100">
+            <a:solidFill>
+              <a:schemeClr val="accent4"/>
+            </a:solidFill>
+          </a:ln>
+        </p:spPr>
+        <p:style>
+          <a:lnRef idx="1">
+            <a:schemeClr val="accent1"/>
+          </a:lnRef>
+          <a:fillRef idx="0">
+            <a:schemeClr val="accent1"/>
+          </a:fillRef>
+          <a:effectRef idx="0">
+            <a:schemeClr val="accent1"/>
+          </a:effectRef>
+          <a:fontRef idx="minor">
+            <a:schemeClr val="tx1"/>
+          </a:fontRef>
+        </p:style>
+        <p:txBody>
+          <a:bodyPr rtlCol="0" anchor="ctr"/>
+          <a:lstStyle/>
+          <a:p>
+            <a:pPr algn="ctr"/>
+            <a:endParaRPr lang="en-GB" dirty="0"/>
+          </a:p>
+        </p:txBody>
+      </p:sp>
+      <p:sp>
+        <p:nvSpPr>
+          <p:cNvPr id="36" name="Left Brace 35">
+            <a:extLst>
+              <a:ext uri="{FF2B5EF4-FFF2-40B4-BE49-F238E27FC236}">
+                <a16:creationId xmlns:a16="http://schemas.microsoft.com/office/drawing/2014/main" id="{A031CF25-C2FD-4ED8-9178-17403CC0C15B}"/>
+              </a:ext>
+            </a:extLst>
+          </p:cNvPr>
+          <p:cNvSpPr/>
+          <p:nvPr/>
+        </p:nvSpPr>
+        <p:spPr>
+          <a:xfrm rot="5400000">
+            <a:off x="6516918" y="7697466"/>
+            <a:ext cx="669973" cy="4633286"/>
+          </a:xfrm>
+          <a:prstGeom prst="leftBrace">
+            <a:avLst>
+              <a:gd name="adj1" fmla="val 8333"/>
+              <a:gd name="adj2" fmla="val 25586"/>
+            </a:avLst>
+          </a:prstGeom>
+          <a:ln w="38100">
+            <a:solidFill>
+              <a:schemeClr val="accent4"/>
+            </a:solidFill>
+          </a:ln>
+        </p:spPr>
+        <p:style>
+          <a:lnRef idx="1">
+            <a:schemeClr val="accent1"/>
+          </a:lnRef>
+          <a:fillRef idx="0">
+            <a:schemeClr val="accent1"/>
+          </a:fillRef>
+          <a:effectRef idx="0">
+            <a:schemeClr val="accent1"/>
+          </a:effectRef>
+          <a:fontRef idx="minor">
+            <a:schemeClr val="tx1"/>
+          </a:fontRef>
+        </p:style>
+        <p:txBody>
+          <a:bodyPr rtlCol="0" anchor="ctr"/>
+          <a:lstStyle/>
+          <a:p>
+            <a:pPr algn="ctr"/>
+            <a:endParaRPr lang="en-GB" dirty="0"/>
+          </a:p>
+        </p:txBody>
+      </p:sp>
+      <p:sp>
+        <p:nvSpPr>
+          <p:cNvPr id="30" name="Left Brace 29">
+            <a:extLst>
+              <a:ext uri="{FF2B5EF4-FFF2-40B4-BE49-F238E27FC236}">
+                <a16:creationId xmlns:a16="http://schemas.microsoft.com/office/drawing/2014/main" id="{3E44B7B7-CD1E-4EE2-B996-8B77D6AE9EF4}"/>
+              </a:ext>
+            </a:extLst>
+          </p:cNvPr>
+          <p:cNvSpPr/>
+          <p:nvPr/>
+        </p:nvSpPr>
+        <p:spPr>
+          <a:xfrm rot="5400000">
+            <a:off x="8540589" y="5410638"/>
+            <a:ext cx="669973" cy="5941086"/>
+          </a:xfrm>
+          <a:prstGeom prst="leftBrace">
+            <a:avLst>
+              <a:gd name="adj1" fmla="val 8333"/>
+              <a:gd name="adj2" fmla="val 26665"/>
             </a:avLst>
           </a:prstGeom>
           <a:ln w="38100">
@@ -6987,7 +6987,7 @@
         <p:spPr>
           <a:xfrm>
             <a:off x="990756" y="155362"/>
-            <a:ext cx="1813060" cy="461665"/>
+            <a:ext cx="1813060" cy="707886"/>
           </a:xfrm>
           <a:prstGeom prst="rect">
             <a:avLst/>
@@ -7004,7 +7004,25 @@
               <a:rPr lang="en-US" sz="2400" b="1" dirty="0"/>
               <a:t>Grandparent</a:t>
             </a:r>
-            <a:endParaRPr lang="en-GB" sz="2400" b="1" dirty="0"/>
+          </a:p>
+          <a:p>
+            <a:r>
+              <a:rPr lang="en-US" sz="1600" b="1" dirty="0">
+                <a:solidFill>
+                  <a:schemeClr val="bg1">
+                    <a:lumMod val="75000"/>
+                  </a:schemeClr>
+                </a:solidFill>
+              </a:rPr>
+              <a:t>(optional)</a:t>
+            </a:r>
+            <a:endParaRPr lang="en-GB" sz="1600" b="1" dirty="0">
+              <a:solidFill>
+                <a:schemeClr val="bg1">
+                  <a:lumMod val="75000"/>
+                </a:schemeClr>
+              </a:solidFill>
+            </a:endParaRPr>
           </a:p>
         </p:txBody>
       </p:sp>
@@ -7396,7 +7414,7 @@
         </p:nvSpPr>
         <p:spPr>
           <a:xfrm>
-            <a:off x="6913061" y="11759279"/>
+            <a:off x="5187628" y="12101176"/>
             <a:ext cx="1003993" cy="369332"/>
           </a:xfrm>
           <a:prstGeom prst="rect">
@@ -7419,10 +7437,10 @@
       </p:sp>
       <p:pic>
         <p:nvPicPr>
-          <p:cNvPr id="39" name="Picture 38">
-            <a:extLst>
-              <a:ext uri="{FF2B5EF4-FFF2-40B4-BE49-F238E27FC236}">
-                <a16:creationId xmlns:a16="http://schemas.microsoft.com/office/drawing/2014/main" id="{5E8338BF-3C0E-4D21-82FF-37CD415C1135}"/>
+          <p:cNvPr id="40" name="Picture 39">
+            <a:extLst>
+              <a:ext uri="{FF2B5EF4-FFF2-40B4-BE49-F238E27FC236}">
+                <a16:creationId xmlns:a16="http://schemas.microsoft.com/office/drawing/2014/main" id="{4DAF1527-CD65-4AB9-828A-1ED6FE0D86D7}"/>
               </a:ext>
             </a:extLst>
           </p:cNvPr>
@@ -7439,20 +7457,56 @@
         </p:blipFill>
         <p:spPr>
           <a:xfrm>
-            <a:off x="7901357" y="11606229"/>
-            <a:ext cx="1363978" cy="675432"/>
+            <a:off x="80849" y="8355427"/>
+            <a:ext cx="927286" cy="600309"/>
           </a:xfrm>
           <a:prstGeom prst="rect">
             <a:avLst/>
           </a:prstGeom>
         </p:spPr>
       </p:pic>
+      <p:sp>
+        <p:nvSpPr>
+          <p:cNvPr id="41" name="TextBox 40">
+            <a:extLst>
+              <a:ext uri="{FF2B5EF4-FFF2-40B4-BE49-F238E27FC236}">
+                <a16:creationId xmlns:a16="http://schemas.microsoft.com/office/drawing/2014/main" id="{E5D01E17-60FE-405E-8FC1-C403C23EA74D}"/>
+              </a:ext>
+            </a:extLst>
+          </p:cNvPr>
+          <p:cNvSpPr txBox="1"/>
+          <p:nvPr/>
+        </p:nvSpPr>
+        <p:spPr>
+          <a:xfrm>
+            <a:off x="990756" y="8424748"/>
+            <a:ext cx="944618" cy="461665"/>
+          </a:xfrm>
+          <a:prstGeom prst="rect">
+            <a:avLst/>
+          </a:prstGeom>
+          <a:noFill/>
+        </p:spPr>
+        <p:txBody>
+          <a:bodyPr wrap="none" rtlCol="0">
+            <a:spAutoFit/>
+          </a:bodyPr>
+          <a:lstStyle/>
+          <a:p>
+            <a:r>
+              <a:rPr lang="en-US" sz="2400" b="1" dirty="0"/>
+              <a:t>Infant</a:t>
+            </a:r>
+            <a:endParaRPr lang="en-GB" sz="2400" b="1" dirty="0"/>
+          </a:p>
+        </p:txBody>
+      </p:sp>
       <p:pic>
         <p:nvPicPr>
-          <p:cNvPr id="40" name="Picture 39">
-            <a:extLst>
-              <a:ext uri="{FF2B5EF4-FFF2-40B4-BE49-F238E27FC236}">
-                <a16:creationId xmlns:a16="http://schemas.microsoft.com/office/drawing/2014/main" id="{4DAF1527-CD65-4AB9-828A-1ED6FE0D86D7}"/>
+          <p:cNvPr id="11" name="Picture 10" descr="A screenshot of a cell phone&#10;&#10;Description automatically generated">
+            <a:extLst>
+              <a:ext uri="{FF2B5EF4-FFF2-40B4-BE49-F238E27FC236}">
+                <a16:creationId xmlns:a16="http://schemas.microsoft.com/office/drawing/2014/main" id="{57191F3E-170B-4F81-A7D6-7D0954D05196}"/>
               </a:ext>
             </a:extLst>
           </p:cNvPr>
@@ -7462,57 +7516,27 @@
           <p:nvPr/>
         </p:nvPicPr>
         <p:blipFill>
-          <a:blip r:embed="rId16"/>
+          <a:blip r:embed="rId16">
+            <a:extLst>
+              <a:ext uri="{28A0092B-C50C-407E-A947-70E740481C1C}">
+                <a14:useLocalDpi xmlns:a14="http://schemas.microsoft.com/office/drawing/2010/main" val="0"/>
+              </a:ext>
+            </a:extLst>
+          </a:blip>
           <a:stretch>
             <a:fillRect/>
           </a:stretch>
         </p:blipFill>
         <p:spPr>
           <a:xfrm>
-            <a:off x="80849" y="8355427"/>
-            <a:ext cx="927286" cy="600309"/>
+            <a:off x="5936837" y="8454810"/>
+            <a:ext cx="5850832" cy="1599102"/>
           </a:xfrm>
           <a:prstGeom prst="rect">
             <a:avLst/>
           </a:prstGeom>
         </p:spPr>
       </p:pic>
-      <p:sp>
-        <p:nvSpPr>
-          <p:cNvPr id="41" name="TextBox 40">
-            <a:extLst>
-              <a:ext uri="{FF2B5EF4-FFF2-40B4-BE49-F238E27FC236}">
-                <a16:creationId xmlns:a16="http://schemas.microsoft.com/office/drawing/2014/main" id="{E5D01E17-60FE-405E-8FC1-C403C23EA74D}"/>
-              </a:ext>
-            </a:extLst>
-          </p:cNvPr>
-          <p:cNvSpPr txBox="1"/>
-          <p:nvPr/>
-        </p:nvSpPr>
-        <p:spPr>
-          <a:xfrm>
-            <a:off x="990756" y="8424748"/>
-            <a:ext cx="944618" cy="461665"/>
-          </a:xfrm>
-          <a:prstGeom prst="rect">
-            <a:avLst/>
-          </a:prstGeom>
-          <a:noFill/>
-        </p:spPr>
-        <p:txBody>
-          <a:bodyPr wrap="none" rtlCol="0">
-            <a:spAutoFit/>
-          </a:bodyPr>
-          <a:lstStyle/>
-          <a:p>
-            <a:r>
-              <a:rPr lang="en-US" sz="2400" b="1" dirty="0"/>
-              <a:t>Infant</a:t>
-            </a:r>
-            <a:endParaRPr lang="en-GB" sz="2400" b="1" dirty="0"/>
-          </a:p>
-        </p:txBody>
-      </p:sp>
     </p:spTree>
     <p:extLst>
       <p:ext uri="{BB962C8B-B14F-4D97-AF65-F5344CB8AC3E}">

</xml_diff>

<commit_message>
Document updates for v1.4
</commit_message>
<xml_diff>
--- a/Images/All ADF Activities.pptx
+++ b/Images/All ADF Activities.pptx
@@ -248,7 +248,7 @@
           <a:p>
             <a:fld id="{1F80DB50-5271-4B1A-976D-0A7715B55622}" type="datetimeFigureOut">
               <a:rPr lang="en-GB" smtClean="0"/>
-              <a:t>14/04/2020</a:t>
+              <a:t>15/04/2020</a:t>
             </a:fld>
             <a:endParaRPr lang="en-GB"/>
           </a:p>
@@ -418,7 +418,7 @@
           <a:p>
             <a:fld id="{1F80DB50-5271-4B1A-976D-0A7715B55622}" type="datetimeFigureOut">
               <a:rPr lang="en-GB" smtClean="0"/>
-              <a:t>14/04/2020</a:t>
+              <a:t>15/04/2020</a:t>
             </a:fld>
             <a:endParaRPr lang="en-GB"/>
           </a:p>
@@ -598,7 +598,7 @@
           <a:p>
             <a:fld id="{1F80DB50-5271-4B1A-976D-0A7715B55622}" type="datetimeFigureOut">
               <a:rPr lang="en-GB" smtClean="0"/>
-              <a:t>14/04/2020</a:t>
+              <a:t>15/04/2020</a:t>
             </a:fld>
             <a:endParaRPr lang="en-GB"/>
           </a:p>
@@ -768,7 +768,7 @@
           <a:p>
             <a:fld id="{1F80DB50-5271-4B1A-976D-0A7715B55622}" type="datetimeFigureOut">
               <a:rPr lang="en-GB" smtClean="0"/>
-              <a:t>14/04/2020</a:t>
+              <a:t>15/04/2020</a:t>
             </a:fld>
             <a:endParaRPr lang="en-GB"/>
           </a:p>
@@ -1012,7 +1012,7 @@
           <a:p>
             <a:fld id="{1F80DB50-5271-4B1A-976D-0A7715B55622}" type="datetimeFigureOut">
               <a:rPr lang="en-GB" smtClean="0"/>
-              <a:t>14/04/2020</a:t>
+              <a:t>15/04/2020</a:t>
             </a:fld>
             <a:endParaRPr lang="en-GB"/>
           </a:p>
@@ -1244,7 +1244,7 @@
           <a:p>
             <a:fld id="{1F80DB50-5271-4B1A-976D-0A7715B55622}" type="datetimeFigureOut">
               <a:rPr lang="en-GB" smtClean="0"/>
-              <a:t>14/04/2020</a:t>
+              <a:t>15/04/2020</a:t>
             </a:fld>
             <a:endParaRPr lang="en-GB"/>
           </a:p>
@@ -1611,7 +1611,7 @@
           <a:p>
             <a:fld id="{1F80DB50-5271-4B1A-976D-0A7715B55622}" type="datetimeFigureOut">
               <a:rPr lang="en-GB" smtClean="0"/>
-              <a:t>14/04/2020</a:t>
+              <a:t>15/04/2020</a:t>
             </a:fld>
             <a:endParaRPr lang="en-GB"/>
           </a:p>
@@ -1729,7 +1729,7 @@
           <a:p>
             <a:fld id="{1F80DB50-5271-4B1A-976D-0A7715B55622}" type="datetimeFigureOut">
               <a:rPr lang="en-GB" smtClean="0"/>
-              <a:t>14/04/2020</a:t>
+              <a:t>15/04/2020</a:t>
             </a:fld>
             <a:endParaRPr lang="en-GB"/>
           </a:p>
@@ -1824,7 +1824,7 @@
           <a:p>
             <a:fld id="{1F80DB50-5271-4B1A-976D-0A7715B55622}" type="datetimeFigureOut">
               <a:rPr lang="en-GB" smtClean="0"/>
-              <a:t>14/04/2020</a:t>
+              <a:t>15/04/2020</a:t>
             </a:fld>
             <a:endParaRPr lang="en-GB"/>
           </a:p>
@@ -2101,7 +2101,7 @@
           <a:p>
             <a:fld id="{1F80DB50-5271-4B1A-976D-0A7715B55622}" type="datetimeFigureOut">
               <a:rPr lang="en-GB" smtClean="0"/>
-              <a:t>14/04/2020</a:t>
+              <a:t>15/04/2020</a:t>
             </a:fld>
             <a:endParaRPr lang="en-GB"/>
           </a:p>
@@ -2358,7 +2358,7 @@
           <a:p>
             <a:fld id="{1F80DB50-5271-4B1A-976D-0A7715B55622}" type="datetimeFigureOut">
               <a:rPr lang="en-GB" smtClean="0"/>
-              <a:t>14/04/2020</a:t>
+              <a:t>15/04/2020</a:t>
             </a:fld>
             <a:endParaRPr lang="en-GB"/>
           </a:p>
@@ -2571,7 +2571,7 @@
           <a:p>
             <a:fld id="{1F80DB50-5271-4B1A-976D-0A7715B55622}" type="datetimeFigureOut">
               <a:rPr lang="en-GB" smtClean="0"/>
-              <a:t>14/04/2020</a:t>
+              <a:t>15/04/2020</a:t>
             </a:fld>
             <a:endParaRPr lang="en-GB"/>
           </a:p>
@@ -8100,38 +8100,6 @@
           <a:xfrm>
             <a:off x="4359024" y="1599057"/>
             <a:ext cx="1205286" cy="1201956"/>
-          </a:xfrm>
-          <a:prstGeom prst="rect">
-            <a:avLst/>
-          </a:prstGeom>
-        </p:spPr>
-      </p:pic>
-      <p:pic>
-        <p:nvPicPr>
-          <p:cNvPr id="7" name="Picture 6">
-            <a:extLst>
-              <a:ext uri="{FF2B5EF4-FFF2-40B4-BE49-F238E27FC236}">
-                <a16:creationId xmlns:a16="http://schemas.microsoft.com/office/drawing/2014/main" id="{61385BAD-12F1-4F2D-B585-425291CF3683}"/>
-              </a:ext>
-            </a:extLst>
-          </p:cNvPr>
-          <p:cNvPicPr>
-            <a:picLocks noChangeAspect="1"/>
-          </p:cNvPicPr>
-          <p:nvPr/>
-        </p:nvPicPr>
-        <p:blipFill>
-          <a:blip r:embed="rId6">
-            <a:grayscl/>
-          </a:blip>
-          <a:stretch>
-            <a:fillRect/>
-          </a:stretch>
-        </p:blipFill>
-        <p:spPr>
-          <a:xfrm>
-            <a:off x="1671094" y="5653871"/>
-            <a:ext cx="8848725" cy="5743575"/>
           </a:xfrm>
           <a:prstGeom prst="rect">
             <a:avLst/>

</xml_diff>

<commit_message>
Documentation updates ready for release.
</commit_message>
<xml_diff>
--- a/Images/All ADF Activities.pptx
+++ b/Images/All ADF Activities.pptx
@@ -2,7 +2,7 @@
 <file path=ppt/presentation.xml><?xml version="1.0" encoding="utf-8"?>
 <p:presentation xmlns:a="http://schemas.openxmlformats.org/drawingml/2006/main" xmlns:r="http://schemas.openxmlformats.org/officeDocument/2006/relationships" xmlns:p="http://schemas.openxmlformats.org/presentationml/2006/main" saveSubsetFonts="1">
   <p:sldMasterIdLst>
-    <p:sldMasterId id="2147483672" r:id="rId1"/>
+    <p:sldMasterId id="2147483684" r:id="rId1"/>
   </p:sldMasterIdLst>
   <p:sldIdLst>
     <p:sldId id="257" r:id="rId2"/>
@@ -12,9 +12,10 @@
     <p:sldId id="262" r:id="rId6"/>
     <p:sldId id="263" r:id="rId7"/>
     <p:sldId id="264" r:id="rId8"/>
-    <p:sldId id="260" r:id="rId9"/>
+    <p:sldId id="265" r:id="rId9"/>
+    <p:sldId id="260" r:id="rId10"/>
   </p:sldIdLst>
-  <p:sldSz cx="12599988" cy="12599988"/>
+  <p:sldSz cx="12599988" cy="14400213"/>
   <p:notesSz cx="6858000" cy="9144000"/>
   <p:defaultTextStyle>
     <a:defPPr>
@@ -148,8 +149,8 @@
         </p:nvSpPr>
         <p:spPr>
           <a:xfrm>
-            <a:off x="944999" y="2062083"/>
-            <a:ext cx="10709990" cy="4386662"/>
+            <a:off x="944999" y="2356703"/>
+            <a:ext cx="10709990" cy="5013407"/>
           </a:xfrm>
         </p:spPr>
         <p:txBody>
@@ -180,8 +181,8 @@
         </p:nvSpPr>
         <p:spPr>
           <a:xfrm>
-            <a:off x="1574999" y="6617911"/>
-            <a:ext cx="9449991" cy="3042080"/>
+            <a:off x="1574999" y="7563446"/>
+            <a:ext cx="9449991" cy="3476717"/>
           </a:xfrm>
         </p:spPr>
         <p:txBody>
@@ -250,7 +251,7 @@
           <a:p>
             <a:fld id="{1F80DB50-5271-4B1A-976D-0A7715B55622}" type="datetimeFigureOut">
               <a:rPr lang="en-GB" smtClean="0"/>
-              <a:t>04/05/2020</a:t>
+              <a:t>02/06/2020</a:t>
             </a:fld>
             <a:endParaRPr lang="en-GB"/>
           </a:p>
@@ -301,7 +302,7 @@
     </p:spTree>
     <p:extLst>
       <p:ext uri="{BB962C8B-B14F-4D97-AF65-F5344CB8AC3E}">
-        <p14:creationId xmlns:p14="http://schemas.microsoft.com/office/powerpoint/2010/main" val="4189068272"/>
+        <p14:creationId xmlns:p14="http://schemas.microsoft.com/office/powerpoint/2010/main" val="108162907"/>
       </p:ext>
     </p:extLst>
   </p:cSld>
@@ -420,7 +421,7 @@
           <a:p>
             <a:fld id="{1F80DB50-5271-4B1A-976D-0A7715B55622}" type="datetimeFigureOut">
               <a:rPr lang="en-GB" smtClean="0"/>
-              <a:t>04/05/2020</a:t>
+              <a:t>02/06/2020</a:t>
             </a:fld>
             <a:endParaRPr lang="en-GB"/>
           </a:p>
@@ -471,7 +472,7 @@
     </p:spTree>
     <p:extLst>
       <p:ext uri="{BB962C8B-B14F-4D97-AF65-F5344CB8AC3E}">
-        <p14:creationId xmlns:p14="http://schemas.microsoft.com/office/powerpoint/2010/main" val="2989490021"/>
+        <p14:creationId xmlns:p14="http://schemas.microsoft.com/office/powerpoint/2010/main" val="1790326725"/>
       </p:ext>
     </p:extLst>
   </p:cSld>
@@ -510,8 +511,8 @@
         </p:nvSpPr>
         <p:spPr>
           <a:xfrm>
-            <a:off x="9016867" y="670833"/>
-            <a:ext cx="2716872" cy="10677907"/>
+            <a:off x="9016867" y="766678"/>
+            <a:ext cx="2716872" cy="12203515"/>
           </a:xfrm>
         </p:spPr>
         <p:txBody>
@@ -538,8 +539,8 @@
         </p:nvSpPr>
         <p:spPr>
           <a:xfrm>
-            <a:off x="866250" y="670833"/>
-            <a:ext cx="7993117" cy="10677907"/>
+            <a:off x="866250" y="766678"/>
+            <a:ext cx="7993117" cy="12203515"/>
           </a:xfrm>
         </p:spPr>
         <p:txBody>
@@ -600,7 +601,7 @@
           <a:p>
             <a:fld id="{1F80DB50-5271-4B1A-976D-0A7715B55622}" type="datetimeFigureOut">
               <a:rPr lang="en-GB" smtClean="0"/>
-              <a:t>04/05/2020</a:t>
+              <a:t>02/06/2020</a:t>
             </a:fld>
             <a:endParaRPr lang="en-GB"/>
           </a:p>
@@ -651,7 +652,7 @@
     </p:spTree>
     <p:extLst>
       <p:ext uri="{BB962C8B-B14F-4D97-AF65-F5344CB8AC3E}">
-        <p14:creationId xmlns:p14="http://schemas.microsoft.com/office/powerpoint/2010/main" val="2316592601"/>
+        <p14:creationId xmlns:p14="http://schemas.microsoft.com/office/powerpoint/2010/main" val="3093745881"/>
       </p:ext>
     </p:extLst>
   </p:cSld>
@@ -770,7 +771,7 @@
           <a:p>
             <a:fld id="{1F80DB50-5271-4B1A-976D-0A7715B55622}" type="datetimeFigureOut">
               <a:rPr lang="en-GB" smtClean="0"/>
-              <a:t>04/05/2020</a:t>
+              <a:t>02/06/2020</a:t>
             </a:fld>
             <a:endParaRPr lang="en-GB"/>
           </a:p>
@@ -821,7 +822,7 @@
     </p:spTree>
     <p:extLst>
       <p:ext uri="{BB962C8B-B14F-4D97-AF65-F5344CB8AC3E}">
-        <p14:creationId xmlns:p14="http://schemas.microsoft.com/office/powerpoint/2010/main" val="1087156337"/>
+        <p14:creationId xmlns:p14="http://schemas.microsoft.com/office/powerpoint/2010/main" val="1146888034"/>
       </p:ext>
     </p:extLst>
   </p:cSld>
@@ -860,8 +861,8 @@
         </p:nvSpPr>
         <p:spPr>
           <a:xfrm>
-            <a:off x="859687" y="3141251"/>
-            <a:ext cx="10867490" cy="5241244"/>
+            <a:off x="859687" y="3590057"/>
+            <a:ext cx="10867490" cy="5990088"/>
           </a:xfrm>
         </p:spPr>
         <p:txBody>
@@ -892,8 +893,8 @@
         </p:nvSpPr>
         <p:spPr>
           <a:xfrm>
-            <a:off x="859687" y="8432079"/>
-            <a:ext cx="10867490" cy="2756246"/>
+            <a:off x="859687" y="9636813"/>
+            <a:ext cx="10867490" cy="3150046"/>
           </a:xfrm>
         </p:spPr>
         <p:txBody>
@@ -1014,7 +1015,7 @@
           <a:p>
             <a:fld id="{1F80DB50-5271-4B1A-976D-0A7715B55622}" type="datetimeFigureOut">
               <a:rPr lang="en-GB" smtClean="0"/>
-              <a:t>04/05/2020</a:t>
+              <a:t>02/06/2020</a:t>
             </a:fld>
             <a:endParaRPr lang="en-GB"/>
           </a:p>
@@ -1065,7 +1066,7 @@
     </p:spTree>
     <p:extLst>
       <p:ext uri="{BB962C8B-B14F-4D97-AF65-F5344CB8AC3E}">
-        <p14:creationId xmlns:p14="http://schemas.microsoft.com/office/powerpoint/2010/main" val="428378815"/>
+        <p14:creationId xmlns:p14="http://schemas.microsoft.com/office/powerpoint/2010/main" val="3825742707"/>
       </p:ext>
     </p:extLst>
   </p:cSld>
@@ -1127,8 +1128,8 @@
         </p:nvSpPr>
         <p:spPr>
           <a:xfrm>
-            <a:off x="866249" y="3354163"/>
-            <a:ext cx="5354995" cy="7994577"/>
+            <a:off x="866249" y="3833390"/>
+            <a:ext cx="5354995" cy="9136803"/>
           </a:xfrm>
         </p:spPr>
         <p:txBody>
@@ -1184,8 +1185,8 @@
         </p:nvSpPr>
         <p:spPr>
           <a:xfrm>
-            <a:off x="6378744" y="3354163"/>
-            <a:ext cx="5354995" cy="7994577"/>
+            <a:off x="6378744" y="3833390"/>
+            <a:ext cx="5354995" cy="9136803"/>
           </a:xfrm>
         </p:spPr>
         <p:txBody>
@@ -1246,7 +1247,7 @@
           <a:p>
             <a:fld id="{1F80DB50-5271-4B1A-976D-0A7715B55622}" type="datetimeFigureOut">
               <a:rPr lang="en-GB" smtClean="0"/>
-              <a:t>04/05/2020</a:t>
+              <a:t>02/06/2020</a:t>
             </a:fld>
             <a:endParaRPr lang="en-GB"/>
           </a:p>
@@ -1297,7 +1298,7 @@
     </p:spTree>
     <p:extLst>
       <p:ext uri="{BB962C8B-B14F-4D97-AF65-F5344CB8AC3E}">
-        <p14:creationId xmlns:p14="http://schemas.microsoft.com/office/powerpoint/2010/main" val="743543654"/>
+        <p14:creationId xmlns:p14="http://schemas.microsoft.com/office/powerpoint/2010/main" val="114011578"/>
       </p:ext>
     </p:extLst>
   </p:cSld>
@@ -1336,8 +1337,8 @@
         </p:nvSpPr>
         <p:spPr>
           <a:xfrm>
-            <a:off x="867890" y="670836"/>
-            <a:ext cx="10867490" cy="2435415"/>
+            <a:off x="867890" y="766681"/>
+            <a:ext cx="10867490" cy="2783376"/>
           </a:xfrm>
         </p:spPr>
         <p:txBody>
@@ -1364,8 +1365,8 @@
         </p:nvSpPr>
         <p:spPr>
           <a:xfrm>
-            <a:off x="867892" y="3088748"/>
-            <a:ext cx="5330385" cy="1513748"/>
+            <a:off x="867892" y="3530053"/>
+            <a:ext cx="5330385" cy="1730025"/>
           </a:xfrm>
         </p:spPr>
         <p:txBody>
@@ -1429,8 +1430,8 @@
         </p:nvSpPr>
         <p:spPr>
           <a:xfrm>
-            <a:off x="867892" y="4602496"/>
-            <a:ext cx="5330385" cy="6769578"/>
+            <a:off x="867892" y="5260078"/>
+            <a:ext cx="5330385" cy="7736782"/>
           </a:xfrm>
         </p:spPr>
         <p:txBody>
@@ -1486,8 +1487,8 @@
         </p:nvSpPr>
         <p:spPr>
           <a:xfrm>
-            <a:off x="6378745" y="3088748"/>
-            <a:ext cx="5356636" cy="1513748"/>
+            <a:off x="6378745" y="3530053"/>
+            <a:ext cx="5356636" cy="1730025"/>
           </a:xfrm>
         </p:spPr>
         <p:txBody>
@@ -1551,8 +1552,8 @@
         </p:nvSpPr>
         <p:spPr>
           <a:xfrm>
-            <a:off x="6378745" y="4602496"/>
-            <a:ext cx="5356636" cy="6769578"/>
+            <a:off x="6378745" y="5260078"/>
+            <a:ext cx="5356636" cy="7736782"/>
           </a:xfrm>
         </p:spPr>
         <p:txBody>
@@ -1613,7 +1614,7 @@
           <a:p>
             <a:fld id="{1F80DB50-5271-4B1A-976D-0A7715B55622}" type="datetimeFigureOut">
               <a:rPr lang="en-GB" smtClean="0"/>
-              <a:t>04/05/2020</a:t>
+              <a:t>02/06/2020</a:t>
             </a:fld>
             <a:endParaRPr lang="en-GB"/>
           </a:p>
@@ -1664,7 +1665,7 @@
     </p:spTree>
     <p:extLst>
       <p:ext uri="{BB962C8B-B14F-4D97-AF65-F5344CB8AC3E}">
-        <p14:creationId xmlns:p14="http://schemas.microsoft.com/office/powerpoint/2010/main" val="138047795"/>
+        <p14:creationId xmlns:p14="http://schemas.microsoft.com/office/powerpoint/2010/main" val="1481668437"/>
       </p:ext>
     </p:extLst>
   </p:cSld>
@@ -1731,7 +1732,7 @@
           <a:p>
             <a:fld id="{1F80DB50-5271-4B1A-976D-0A7715B55622}" type="datetimeFigureOut">
               <a:rPr lang="en-GB" smtClean="0"/>
-              <a:t>04/05/2020</a:t>
+              <a:t>02/06/2020</a:t>
             </a:fld>
             <a:endParaRPr lang="en-GB"/>
           </a:p>
@@ -1782,7 +1783,7 @@
     </p:spTree>
     <p:extLst>
       <p:ext uri="{BB962C8B-B14F-4D97-AF65-F5344CB8AC3E}">
-        <p14:creationId xmlns:p14="http://schemas.microsoft.com/office/powerpoint/2010/main" val="2966297590"/>
+        <p14:creationId xmlns:p14="http://schemas.microsoft.com/office/powerpoint/2010/main" val="3334354582"/>
       </p:ext>
     </p:extLst>
   </p:cSld>
@@ -1826,7 +1827,7 @@
           <a:p>
             <a:fld id="{1F80DB50-5271-4B1A-976D-0A7715B55622}" type="datetimeFigureOut">
               <a:rPr lang="en-GB" smtClean="0"/>
-              <a:t>04/05/2020</a:t>
+              <a:t>02/06/2020</a:t>
             </a:fld>
             <a:endParaRPr lang="en-GB"/>
           </a:p>
@@ -1877,7 +1878,7 @@
     </p:spTree>
     <p:extLst>
       <p:ext uri="{BB962C8B-B14F-4D97-AF65-F5344CB8AC3E}">
-        <p14:creationId xmlns:p14="http://schemas.microsoft.com/office/powerpoint/2010/main" val="3640355125"/>
+        <p14:creationId xmlns:p14="http://schemas.microsoft.com/office/powerpoint/2010/main" val="1767995728"/>
       </p:ext>
     </p:extLst>
   </p:cSld>
@@ -1916,8 +1917,8 @@
         </p:nvSpPr>
         <p:spPr>
           <a:xfrm>
-            <a:off x="867890" y="839999"/>
-            <a:ext cx="4063824" cy="2939997"/>
+            <a:off x="867890" y="960014"/>
+            <a:ext cx="4063824" cy="3360050"/>
           </a:xfrm>
         </p:spPr>
         <p:txBody>
@@ -1948,8 +1949,8 @@
         </p:nvSpPr>
         <p:spPr>
           <a:xfrm>
-            <a:off x="5356636" y="1814168"/>
-            <a:ext cx="6378744" cy="8954158"/>
+            <a:off x="5356636" y="2073367"/>
+            <a:ext cx="6378744" cy="10233485"/>
           </a:xfrm>
         </p:spPr>
         <p:txBody>
@@ -2033,8 +2034,8 @@
         </p:nvSpPr>
         <p:spPr>
           <a:xfrm>
-            <a:off x="867890" y="3779996"/>
-            <a:ext cx="4063824" cy="7002911"/>
+            <a:off x="867890" y="4320064"/>
+            <a:ext cx="4063824" cy="8003453"/>
           </a:xfrm>
         </p:spPr>
         <p:txBody>
@@ -2103,7 +2104,7 @@
           <a:p>
             <a:fld id="{1F80DB50-5271-4B1A-976D-0A7715B55622}" type="datetimeFigureOut">
               <a:rPr lang="en-GB" smtClean="0"/>
-              <a:t>04/05/2020</a:t>
+              <a:t>02/06/2020</a:t>
             </a:fld>
             <a:endParaRPr lang="en-GB"/>
           </a:p>
@@ -2154,7 +2155,7 @@
     </p:spTree>
     <p:extLst>
       <p:ext uri="{BB962C8B-B14F-4D97-AF65-F5344CB8AC3E}">
-        <p14:creationId xmlns:p14="http://schemas.microsoft.com/office/powerpoint/2010/main" val="3886216359"/>
+        <p14:creationId xmlns:p14="http://schemas.microsoft.com/office/powerpoint/2010/main" val="547639549"/>
       </p:ext>
     </p:extLst>
   </p:cSld>
@@ -2193,8 +2194,8 @@
         </p:nvSpPr>
         <p:spPr>
           <a:xfrm>
-            <a:off x="867890" y="839999"/>
-            <a:ext cx="4063824" cy="2939997"/>
+            <a:off x="867890" y="960014"/>
+            <a:ext cx="4063824" cy="3360050"/>
           </a:xfrm>
         </p:spPr>
         <p:txBody>
@@ -2225,8 +2226,8 @@
         </p:nvSpPr>
         <p:spPr>
           <a:xfrm>
-            <a:off x="5356636" y="1814168"/>
-            <a:ext cx="6378744" cy="8954158"/>
+            <a:off x="5356636" y="2073367"/>
+            <a:ext cx="6378744" cy="10233485"/>
           </a:xfrm>
         </p:spPr>
         <p:txBody>
@@ -2290,8 +2291,8 @@
         </p:nvSpPr>
         <p:spPr>
           <a:xfrm>
-            <a:off x="867890" y="3779996"/>
-            <a:ext cx="4063824" cy="7002911"/>
+            <a:off x="867890" y="4320064"/>
+            <a:ext cx="4063824" cy="8003453"/>
           </a:xfrm>
         </p:spPr>
         <p:txBody>
@@ -2360,7 +2361,7 @@
           <a:p>
             <a:fld id="{1F80DB50-5271-4B1A-976D-0A7715B55622}" type="datetimeFigureOut">
               <a:rPr lang="en-GB" smtClean="0"/>
-              <a:t>04/05/2020</a:t>
+              <a:t>02/06/2020</a:t>
             </a:fld>
             <a:endParaRPr lang="en-GB"/>
           </a:p>
@@ -2411,7 +2412,7 @@
     </p:spTree>
     <p:extLst>
       <p:ext uri="{BB962C8B-B14F-4D97-AF65-F5344CB8AC3E}">
-        <p14:creationId xmlns:p14="http://schemas.microsoft.com/office/powerpoint/2010/main" val="1553515288"/>
+        <p14:creationId xmlns:p14="http://schemas.microsoft.com/office/powerpoint/2010/main" val="808238097"/>
       </p:ext>
     </p:extLst>
   </p:cSld>
@@ -2455,8 +2456,8 @@
         </p:nvSpPr>
         <p:spPr>
           <a:xfrm>
-            <a:off x="866249" y="670836"/>
-            <a:ext cx="10867490" cy="2435415"/>
+            <a:off x="866249" y="766681"/>
+            <a:ext cx="10867490" cy="2783376"/>
           </a:xfrm>
           <a:prstGeom prst="rect">
             <a:avLst/>
@@ -2488,8 +2489,8 @@
         </p:nvSpPr>
         <p:spPr>
           <a:xfrm>
-            <a:off x="866249" y="3354163"/>
-            <a:ext cx="10867490" cy="7994577"/>
+            <a:off x="866249" y="3833390"/>
+            <a:ext cx="10867490" cy="9136803"/>
           </a:xfrm>
           <a:prstGeom prst="rect">
             <a:avLst/>
@@ -2550,8 +2551,8 @@
         </p:nvSpPr>
         <p:spPr>
           <a:xfrm>
-            <a:off x="866249" y="11678325"/>
-            <a:ext cx="2834997" cy="670833"/>
+            <a:off x="866249" y="13346867"/>
+            <a:ext cx="2834997" cy="766678"/>
           </a:xfrm>
           <a:prstGeom prst="rect">
             <a:avLst/>
@@ -2573,7 +2574,7 @@
           <a:p>
             <a:fld id="{1F80DB50-5271-4B1A-976D-0A7715B55622}" type="datetimeFigureOut">
               <a:rPr lang="en-GB" smtClean="0"/>
-              <a:t>04/05/2020</a:t>
+              <a:t>02/06/2020</a:t>
             </a:fld>
             <a:endParaRPr lang="en-GB"/>
           </a:p>
@@ -2591,8 +2592,8 @@
         </p:nvSpPr>
         <p:spPr>
           <a:xfrm>
-            <a:off x="4173746" y="11678325"/>
-            <a:ext cx="4252496" cy="670833"/>
+            <a:off x="4173746" y="13346867"/>
+            <a:ext cx="4252496" cy="766678"/>
           </a:xfrm>
           <a:prstGeom prst="rect">
             <a:avLst/>
@@ -2628,8 +2629,8 @@
         </p:nvSpPr>
         <p:spPr>
           <a:xfrm>
-            <a:off x="8898742" y="11678325"/>
-            <a:ext cx="2834997" cy="670833"/>
+            <a:off x="8898742" y="13346867"/>
+            <a:ext cx="2834997" cy="766678"/>
           </a:xfrm>
           <a:prstGeom prst="rect">
             <a:avLst/>
@@ -2660,23 +2661,23 @@
     </p:spTree>
     <p:extLst>
       <p:ext uri="{BB962C8B-B14F-4D97-AF65-F5344CB8AC3E}">
-        <p14:creationId xmlns:p14="http://schemas.microsoft.com/office/powerpoint/2010/main" val="3198898577"/>
+        <p14:creationId xmlns:p14="http://schemas.microsoft.com/office/powerpoint/2010/main" val="2969128163"/>
       </p:ext>
     </p:extLst>
   </p:cSld>
   <p:clrMap bg1="lt1" tx1="dk1" bg2="lt2" tx2="dk2" accent1="accent1" accent2="accent2" accent3="accent3" accent4="accent4" accent5="accent5" accent6="accent6" hlink="hlink" folHlink="folHlink"/>
   <p:sldLayoutIdLst>
-    <p:sldLayoutId id="2147483673" r:id="rId1"/>
-    <p:sldLayoutId id="2147483674" r:id="rId2"/>
-    <p:sldLayoutId id="2147483675" r:id="rId3"/>
-    <p:sldLayoutId id="2147483676" r:id="rId4"/>
-    <p:sldLayoutId id="2147483677" r:id="rId5"/>
-    <p:sldLayoutId id="2147483678" r:id="rId6"/>
-    <p:sldLayoutId id="2147483679" r:id="rId7"/>
-    <p:sldLayoutId id="2147483680" r:id="rId8"/>
-    <p:sldLayoutId id="2147483681" r:id="rId9"/>
-    <p:sldLayoutId id="2147483682" r:id="rId10"/>
-    <p:sldLayoutId id="2147483683" r:id="rId11"/>
+    <p:sldLayoutId id="2147483685" r:id="rId1"/>
+    <p:sldLayoutId id="2147483686" r:id="rId2"/>
+    <p:sldLayoutId id="2147483687" r:id="rId3"/>
+    <p:sldLayoutId id="2147483688" r:id="rId4"/>
+    <p:sldLayoutId id="2147483689" r:id="rId5"/>
+    <p:sldLayoutId id="2147483690" r:id="rId6"/>
+    <p:sldLayoutId id="2147483691" r:id="rId7"/>
+    <p:sldLayoutId id="2147483692" r:id="rId8"/>
+    <p:sldLayoutId id="2147483693" r:id="rId9"/>
+    <p:sldLayoutId id="2147483694" r:id="rId10"/>
+    <p:sldLayoutId id="2147483695" r:id="rId11"/>
   </p:sldLayoutIdLst>
   <p:txStyles>
     <p:titleStyle>
@@ -3006,7 +3007,7 @@
         </p:blipFill>
         <p:spPr>
           <a:xfrm>
-            <a:off x="3216340" y="1067248"/>
+            <a:off x="3216340" y="1967360"/>
             <a:ext cx="6699512" cy="1527060"/>
           </a:xfrm>
           <a:prstGeom prst="rect">
@@ -3042,7 +3043,7 @@
         </p:blipFill>
         <p:spPr>
           <a:xfrm>
-            <a:off x="4584901" y="6208612"/>
+            <a:off x="4584902" y="7108724"/>
             <a:ext cx="6911787" cy="1572828"/>
           </a:xfrm>
           <a:prstGeom prst="rect">
@@ -3064,7 +3065,7 @@
         </p:nvSpPr>
         <p:spPr>
           <a:xfrm rot="5400000">
-            <a:off x="5490827" y="-733411"/>
+            <a:off x="5490828" y="166701"/>
             <a:ext cx="669973" cy="6997234"/>
           </a:xfrm>
           <a:prstGeom prst="leftBrace">
@@ -3116,7 +3117,7 @@
         </p:nvSpPr>
         <p:spPr>
           <a:xfrm rot="5400000">
-            <a:off x="6381584" y="2130352"/>
+            <a:off x="6381585" y="3030464"/>
             <a:ext cx="669973" cy="3491130"/>
           </a:xfrm>
           <a:prstGeom prst="leftBrace">
@@ -3182,7 +3183,7 @@
         </p:blipFill>
         <p:spPr>
           <a:xfrm>
-            <a:off x="2363709" y="2976986"/>
+            <a:off x="2363710" y="3877099"/>
             <a:ext cx="6911787" cy="669971"/>
           </a:xfrm>
           <a:prstGeom prst="rect">
@@ -3204,7 +3205,7 @@
         </p:nvSpPr>
         <p:spPr>
           <a:xfrm rot="5400000">
-            <a:off x="7246367" y="3219441"/>
+            <a:off x="7246368" y="4119553"/>
             <a:ext cx="669973" cy="3491130"/>
           </a:xfrm>
           <a:prstGeom prst="leftBrace">
@@ -3270,7 +3271,7 @@
         </p:blipFill>
         <p:spPr>
           <a:xfrm>
-            <a:off x="5029365" y="4042329"/>
+            <a:off x="5029366" y="4942442"/>
             <a:ext cx="3394671" cy="704555"/>
           </a:xfrm>
           <a:prstGeom prst="rect">
@@ -3292,7 +3293,7 @@
         </p:nvSpPr>
         <p:spPr>
           <a:xfrm rot="5400000">
-            <a:off x="7670507" y="2541138"/>
+            <a:off x="7670508" y="3441251"/>
             <a:ext cx="669973" cy="6982383"/>
           </a:xfrm>
           <a:prstGeom prst="leftBrace">
@@ -3358,7 +3359,7 @@
         </p:blipFill>
         <p:spPr>
           <a:xfrm>
-            <a:off x="5906237" y="5135903"/>
+            <a:off x="5906237" y="6036015"/>
             <a:ext cx="3394672" cy="684890"/>
           </a:xfrm>
           <a:prstGeom prst="rect">
@@ -3388,7 +3389,7 @@
         </p:blipFill>
         <p:spPr>
           <a:xfrm>
-            <a:off x="284205" y="984734"/>
+            <a:off x="284205" y="1884846"/>
             <a:ext cx="892528" cy="579404"/>
           </a:xfrm>
           <a:prstGeom prst="rect">
@@ -3418,7 +3419,7 @@
         </p:blipFill>
         <p:spPr>
           <a:xfrm>
-            <a:off x="284205" y="2731865"/>
+            <a:off x="284205" y="3631977"/>
             <a:ext cx="892528" cy="586800"/>
           </a:xfrm>
           <a:prstGeom prst="rect">
@@ -3448,7 +3449,7 @@
         </p:blipFill>
         <p:spPr>
           <a:xfrm>
-            <a:off x="284205" y="4956371"/>
+            <a:off x="284205" y="5856483"/>
             <a:ext cx="892528" cy="586800"/>
           </a:xfrm>
           <a:prstGeom prst="rect">
@@ -3472,7 +3473,7 @@
         </p:nvCxnSpPr>
         <p:spPr>
           <a:xfrm>
-            <a:off x="284205" y="2626392"/>
+            <a:off x="284205" y="3526504"/>
             <a:ext cx="12092554" cy="0"/>
           </a:xfrm>
           <a:prstGeom prst="line">
@@ -3518,7 +3519,7 @@
         </p:nvCxnSpPr>
         <p:spPr>
           <a:xfrm>
-            <a:off x="284205" y="4856243"/>
+            <a:off x="284205" y="5756355"/>
             <a:ext cx="12092554" cy="0"/>
           </a:xfrm>
           <a:prstGeom prst="line">
@@ -3562,7 +3563,7 @@
         </p:nvSpPr>
         <p:spPr>
           <a:xfrm>
-            <a:off x="1176733" y="1049807"/>
+            <a:off x="1176733" y="1949920"/>
             <a:ext cx="1813060" cy="461665"/>
           </a:xfrm>
           <a:prstGeom prst="rect">
@@ -3598,7 +3599,7 @@
         </p:nvSpPr>
         <p:spPr>
           <a:xfrm>
-            <a:off x="1153405" y="2794437"/>
+            <a:off x="1153406" y="3694550"/>
             <a:ext cx="1025089" cy="461665"/>
           </a:xfrm>
           <a:prstGeom prst="rect">
@@ -3634,7 +3635,7 @@
         </p:nvSpPr>
         <p:spPr>
           <a:xfrm>
-            <a:off x="1154087" y="5018943"/>
+            <a:off x="1154088" y="5919056"/>
             <a:ext cx="829073" cy="461665"/>
           </a:xfrm>
           <a:prstGeom prst="rect">
@@ -3670,8 +3671,8 @@
         </p:nvSpPr>
         <p:spPr>
           <a:xfrm>
-            <a:off x="11788138" y="923440"/>
-            <a:ext cx="628698" cy="395942"/>
+            <a:off x="11788139" y="1823552"/>
+            <a:ext cx="588623" cy="369332"/>
           </a:xfrm>
           <a:prstGeom prst="rect">
             <a:avLst/>
@@ -3735,7 +3736,7 @@
         </p:nvSpPr>
         <p:spPr>
           <a:xfrm rot="5400000">
-            <a:off x="8776247" y="4367118"/>
+            <a:off x="8776248" y="5267230"/>
             <a:ext cx="669973" cy="4490358"/>
           </a:xfrm>
           <a:prstGeom prst="leftBrace">
@@ -3795,7 +3796,7 @@
         </p:blipFill>
         <p:spPr>
           <a:xfrm>
-            <a:off x="6937530" y="5392944"/>
+            <a:off x="6937530" y="6293057"/>
             <a:ext cx="2884534" cy="1038183"/>
           </a:xfrm>
           <a:prstGeom prst="rect">
@@ -3817,7 +3818,7 @@
         </p:nvSpPr>
         <p:spPr>
           <a:xfrm rot="5400000">
-            <a:off x="5444599" y="-562548"/>
+            <a:off x="5444600" y="337564"/>
             <a:ext cx="669973" cy="6256206"/>
           </a:xfrm>
           <a:prstGeom prst="leftBrace">
@@ -3869,7 +3870,7 @@
         </p:nvSpPr>
         <p:spPr>
           <a:xfrm rot="5400000">
-            <a:off x="8055969" y="3870671"/>
+            <a:off x="8055970" y="4770784"/>
             <a:ext cx="669973" cy="3049801"/>
           </a:xfrm>
           <a:prstGeom prst="leftBrace">
@@ -3935,7 +3936,7 @@
         </p:blipFill>
         <p:spPr>
           <a:xfrm>
-            <a:off x="5942881" y="4471764"/>
+            <a:off x="5942882" y="5371876"/>
             <a:ext cx="3164539" cy="656792"/>
           </a:xfrm>
           <a:prstGeom prst="rect">
@@ -3965,7 +3966,7 @@
         </p:blipFill>
         <p:spPr>
           <a:xfrm>
-            <a:off x="284205" y="989188"/>
+            <a:off x="284205" y="1889300"/>
             <a:ext cx="892528" cy="579404"/>
           </a:xfrm>
           <a:prstGeom prst="rect">
@@ -3995,7 +3996,7 @@
         </p:blipFill>
         <p:spPr>
           <a:xfrm>
-            <a:off x="284205" y="2556704"/>
+            <a:off x="284205" y="3456816"/>
             <a:ext cx="892528" cy="586800"/>
           </a:xfrm>
           <a:prstGeom prst="rect">
@@ -4025,7 +4026,7 @@
         </p:blipFill>
         <p:spPr>
           <a:xfrm>
-            <a:off x="284205" y="5352711"/>
+            <a:off x="284205" y="6252823"/>
             <a:ext cx="892528" cy="586800"/>
           </a:xfrm>
           <a:prstGeom prst="rect">
@@ -4049,7 +4050,7 @@
         </p:nvCxnSpPr>
         <p:spPr>
           <a:xfrm>
-            <a:off x="284208" y="2492053"/>
+            <a:off x="284209" y="3392165"/>
             <a:ext cx="12111789" cy="0"/>
           </a:xfrm>
           <a:prstGeom prst="line">
@@ -4095,7 +4096,7 @@
         </p:nvCxnSpPr>
         <p:spPr>
           <a:xfrm>
-            <a:off x="284208" y="5260747"/>
+            <a:off x="284209" y="6160859"/>
             <a:ext cx="12111789" cy="0"/>
           </a:xfrm>
           <a:prstGeom prst="line">
@@ -4139,7 +4140,7 @@
         </p:nvSpPr>
         <p:spPr>
           <a:xfrm>
-            <a:off x="1176733" y="1054261"/>
+            <a:off x="1176733" y="1954374"/>
             <a:ext cx="1813060" cy="461665"/>
           </a:xfrm>
           <a:prstGeom prst="rect">
@@ -4175,7 +4176,7 @@
         </p:nvSpPr>
         <p:spPr>
           <a:xfrm>
-            <a:off x="1153405" y="2619276"/>
+            <a:off x="1153406" y="3519389"/>
             <a:ext cx="1025089" cy="461665"/>
           </a:xfrm>
           <a:prstGeom prst="rect">
@@ -4211,7 +4212,7 @@
         </p:nvSpPr>
         <p:spPr>
           <a:xfrm>
-            <a:off x="1154087" y="5415283"/>
+            <a:off x="1154088" y="6315396"/>
             <a:ext cx="829073" cy="461665"/>
           </a:xfrm>
           <a:prstGeom prst="rect">
@@ -4247,8 +4248,8 @@
         </p:nvSpPr>
         <p:spPr>
           <a:xfrm>
-            <a:off x="11807373" y="900113"/>
-            <a:ext cx="628698" cy="395942"/>
+            <a:off x="11807374" y="1800225"/>
+            <a:ext cx="588623" cy="369332"/>
           </a:xfrm>
           <a:prstGeom prst="rect">
             <a:avLst/>
@@ -4282,7 +4283,7 @@
         </p:nvSpPr>
         <p:spPr>
           <a:xfrm rot="5400000">
-            <a:off x="7230578" y="2816724"/>
+            <a:off x="7230578" y="3716837"/>
             <a:ext cx="508102" cy="3245571"/>
           </a:xfrm>
           <a:prstGeom prst="leftBrace">
@@ -4348,7 +4349,7 @@
         </p:blipFill>
         <p:spPr>
           <a:xfrm>
-            <a:off x="3216340" y="932908"/>
+            <a:off x="3216340" y="1833020"/>
             <a:ext cx="6699512" cy="1527060"/>
           </a:xfrm>
           <a:prstGeom prst="rect">
@@ -4378,7 +4379,7 @@
         </p:blipFill>
         <p:spPr>
           <a:xfrm>
-            <a:off x="2752055" y="2610061"/>
+            <a:off x="2752055" y="3510173"/>
             <a:ext cx="5901976" cy="2202766"/>
           </a:xfrm>
           <a:prstGeom prst="rect">
@@ -4408,7 +4409,7 @@
         </p:blipFill>
         <p:spPr>
           <a:xfrm>
-            <a:off x="6922501" y="6661096"/>
+            <a:off x="6922501" y="7561208"/>
             <a:ext cx="4369828" cy="2163642"/>
           </a:xfrm>
           <a:prstGeom prst="rect">
@@ -4468,7 +4469,7 @@
         </p:blipFill>
         <p:spPr>
           <a:xfrm>
-            <a:off x="6699498" y="6886389"/>
+            <a:off x="6699498" y="7786502"/>
             <a:ext cx="5565716" cy="2227507"/>
           </a:xfrm>
           <a:prstGeom prst="rect">
@@ -4492,7 +4493,7 @@
         </p:nvCxnSpPr>
         <p:spPr>
           <a:xfrm>
-            <a:off x="284208" y="2503928"/>
+            <a:off x="284209" y="3404040"/>
             <a:ext cx="12111789" cy="0"/>
           </a:xfrm>
           <a:prstGeom prst="line">
@@ -4538,7 +4539,7 @@
         </p:nvCxnSpPr>
         <p:spPr>
           <a:xfrm>
-            <a:off x="284208" y="5367628"/>
+            <a:off x="284209" y="6267740"/>
             <a:ext cx="12111789" cy="0"/>
           </a:xfrm>
           <a:prstGeom prst="line">
@@ -4582,7 +4583,7 @@
         </p:nvSpPr>
         <p:spPr>
           <a:xfrm rot="5400000">
-            <a:off x="9142187" y="3912818"/>
+            <a:off x="9142188" y="4812931"/>
             <a:ext cx="669973" cy="5774307"/>
           </a:xfrm>
           <a:prstGeom prst="leftBrace">
@@ -4634,7 +4635,7 @@
         </p:nvSpPr>
         <p:spPr>
           <a:xfrm rot="5400000">
-            <a:off x="5444599" y="-503173"/>
+            <a:off x="5444600" y="396939"/>
             <a:ext cx="669973" cy="6256206"/>
           </a:xfrm>
           <a:prstGeom prst="leftBrace">
@@ -4686,7 +4687,7 @@
         </p:nvSpPr>
         <p:spPr>
           <a:xfrm rot="5400000">
-            <a:off x="8582416" y="4030097"/>
+            <a:off x="8582417" y="4930210"/>
             <a:ext cx="669973" cy="2944717"/>
           </a:xfrm>
           <a:prstGeom prst="leftBrace">
@@ -4746,7 +4747,7 @@
         </p:blipFill>
         <p:spPr>
           <a:xfrm>
-            <a:off x="284205" y="989188"/>
+            <a:off x="284205" y="1889300"/>
             <a:ext cx="892528" cy="579404"/>
           </a:xfrm>
           <a:prstGeom prst="rect">
@@ -4776,7 +4777,7 @@
         </p:blipFill>
         <p:spPr>
           <a:xfrm>
-            <a:off x="284205" y="2627955"/>
+            <a:off x="284205" y="3528067"/>
             <a:ext cx="892528" cy="586800"/>
           </a:xfrm>
           <a:prstGeom prst="rect">
@@ -4806,7 +4807,7 @@
         </p:blipFill>
         <p:spPr>
           <a:xfrm>
-            <a:off x="284205" y="5459592"/>
+            <a:off x="284205" y="6359704"/>
             <a:ext cx="892528" cy="586800"/>
           </a:xfrm>
           <a:prstGeom prst="rect">
@@ -4828,7 +4829,7 @@
         </p:nvSpPr>
         <p:spPr>
           <a:xfrm>
-            <a:off x="1176733" y="1054261"/>
+            <a:off x="1176733" y="1954374"/>
             <a:ext cx="1813060" cy="461665"/>
           </a:xfrm>
           <a:prstGeom prst="rect">
@@ -4864,7 +4865,7 @@
         </p:nvSpPr>
         <p:spPr>
           <a:xfrm>
-            <a:off x="1153405" y="2690526"/>
+            <a:off x="1153406" y="3590639"/>
             <a:ext cx="1025089" cy="461665"/>
           </a:xfrm>
           <a:prstGeom prst="rect">
@@ -4900,7 +4901,7 @@
         </p:nvSpPr>
         <p:spPr>
           <a:xfrm>
-            <a:off x="1154087" y="5522164"/>
+            <a:off x="1154088" y="6422277"/>
             <a:ext cx="829073" cy="461665"/>
           </a:xfrm>
           <a:prstGeom prst="rect">
@@ -4936,8 +4937,8 @@
         </p:nvSpPr>
         <p:spPr>
           <a:xfrm>
-            <a:off x="11807373" y="900113"/>
-            <a:ext cx="628698" cy="395942"/>
+            <a:off x="11807374" y="1800225"/>
+            <a:ext cx="588623" cy="369332"/>
           </a:xfrm>
           <a:prstGeom prst="rect">
             <a:avLst/>
@@ -4985,7 +4986,7 @@
         </p:blipFill>
         <p:spPr>
           <a:xfrm>
-            <a:off x="3216340" y="932908"/>
+            <a:off x="3216340" y="1833020"/>
             <a:ext cx="6699512" cy="1527060"/>
           </a:xfrm>
           <a:prstGeom prst="rect">
@@ -5015,7 +5016,7 @@
         </p:blipFill>
         <p:spPr>
           <a:xfrm>
-            <a:off x="2825029" y="2717109"/>
+            <a:off x="2825029" y="3617221"/>
             <a:ext cx="5909106" cy="2202766"/>
           </a:xfrm>
           <a:prstGeom prst="rect">
@@ -5037,7 +5038,7 @@
         </p:nvSpPr>
         <p:spPr>
           <a:xfrm rot="5400000">
-            <a:off x="9447554" y="7850394"/>
+            <a:off x="9447555" y="8750506"/>
             <a:ext cx="669973" cy="2339616"/>
           </a:xfrm>
           <a:prstGeom prst="leftBrace">
@@ -5097,7 +5098,7 @@
         </p:blipFill>
         <p:spPr>
           <a:xfrm>
-            <a:off x="9594105" y="9126806"/>
+            <a:off x="9594105" y="10026918"/>
             <a:ext cx="1281782" cy="628684"/>
           </a:xfrm>
           <a:prstGeom prst="rect">
@@ -5127,7 +5128,7 @@
         </p:blipFill>
         <p:spPr>
           <a:xfrm>
-            <a:off x="9601965" y="9779863"/>
+            <a:off x="9601966" y="10679976"/>
             <a:ext cx="1271547" cy="626469"/>
           </a:xfrm>
           <a:prstGeom prst="rect">
@@ -5157,7 +5158,7 @@
         </p:blipFill>
         <p:spPr>
           <a:xfrm>
-            <a:off x="9570358" y="10432159"/>
+            <a:off x="9570359" y="11332272"/>
             <a:ext cx="1295931" cy="626469"/>
           </a:xfrm>
           <a:prstGeom prst="rect">
@@ -5179,8 +5180,8 @@
         </p:nvSpPr>
         <p:spPr>
           <a:xfrm>
-            <a:off x="8612730" y="9256482"/>
-            <a:ext cx="1053494" cy="395942"/>
+            <a:off x="8612731" y="10156594"/>
+            <a:ext cx="974947" cy="369332"/>
           </a:xfrm>
           <a:prstGeom prst="rect">
             <a:avLst/>
@@ -5222,7 +5223,7 @@
         </p:blipFill>
         <p:spPr>
           <a:xfrm>
-            <a:off x="5940142" y="4593790"/>
+            <a:off x="5940142" y="5493902"/>
             <a:ext cx="4449616" cy="641100"/>
           </a:xfrm>
           <a:prstGeom prst="rect">
@@ -5244,7 +5245,7 @@
         </p:nvSpPr>
         <p:spPr>
           <a:xfrm rot="5400000">
-            <a:off x="7871750" y="2246799"/>
+            <a:off x="7871750" y="3146911"/>
             <a:ext cx="508102" cy="4527914"/>
           </a:xfrm>
           <a:prstGeom prst="leftBrace">
@@ -5304,7 +5305,7 @@
         </p:blipFill>
         <p:spPr>
           <a:xfrm>
-            <a:off x="7554527" y="5596011"/>
+            <a:off x="7554528" y="6496123"/>
             <a:ext cx="2803699" cy="928418"/>
           </a:xfrm>
           <a:prstGeom prst="rect">
@@ -5356,7 +5357,7 @@
         </p:nvSpPr>
         <p:spPr>
           <a:xfrm rot="5400000">
-            <a:off x="9100474" y="2237278"/>
+            <a:off x="9100474" y="3137391"/>
             <a:ext cx="508102" cy="4546963"/>
           </a:xfrm>
           <a:prstGeom prst="leftBrace">
@@ -5422,7 +5423,7 @@
         </p:blipFill>
         <p:spPr>
           <a:xfrm>
-            <a:off x="2178495" y="2701975"/>
+            <a:off x="2178496" y="3602087"/>
             <a:ext cx="7839515" cy="2293856"/>
           </a:xfrm>
           <a:prstGeom prst="rect">
@@ -5452,7 +5453,7 @@
         </p:blipFill>
         <p:spPr>
           <a:xfrm>
-            <a:off x="6699498" y="6848288"/>
+            <a:off x="6699498" y="7748401"/>
             <a:ext cx="5565716" cy="2227507"/>
           </a:xfrm>
           <a:prstGeom prst="rect">
@@ -5476,7 +5477,7 @@
         </p:nvCxnSpPr>
         <p:spPr>
           <a:xfrm>
-            <a:off x="284208" y="2503928"/>
+            <a:off x="284209" y="3404040"/>
             <a:ext cx="12111789" cy="0"/>
           </a:xfrm>
           <a:prstGeom prst="line">
@@ -5522,7 +5523,7 @@
         </p:nvCxnSpPr>
         <p:spPr>
           <a:xfrm>
-            <a:off x="284208" y="5367628"/>
+            <a:off x="284209" y="6267740"/>
             <a:ext cx="12111789" cy="0"/>
           </a:xfrm>
           <a:prstGeom prst="line">
@@ -5566,7 +5567,7 @@
         </p:nvSpPr>
         <p:spPr>
           <a:xfrm rot="5400000">
-            <a:off x="9142187" y="3874718"/>
+            <a:off x="9142188" y="4774831"/>
             <a:ext cx="669973" cy="5774307"/>
           </a:xfrm>
           <a:prstGeom prst="leftBrace">
@@ -5618,7 +5619,7 @@
         </p:nvSpPr>
         <p:spPr>
           <a:xfrm rot="5400000">
-            <a:off x="5763263" y="-1294826"/>
+            <a:off x="5763264" y="-394714"/>
             <a:ext cx="669973" cy="7839514"/>
           </a:xfrm>
           <a:prstGeom prst="leftBrace">
@@ -5670,7 +5671,7 @@
         </p:nvSpPr>
         <p:spPr>
           <a:xfrm rot="5400000">
-            <a:off x="9773040" y="4030097"/>
+            <a:off x="9773041" y="4930210"/>
             <a:ext cx="669973" cy="2944717"/>
           </a:xfrm>
           <a:prstGeom prst="leftBrace">
@@ -5730,7 +5731,7 @@
         </p:blipFill>
         <p:spPr>
           <a:xfrm>
-            <a:off x="284205" y="989188"/>
+            <a:off x="284205" y="1889300"/>
             <a:ext cx="892528" cy="579404"/>
           </a:xfrm>
           <a:prstGeom prst="rect">
@@ -5760,7 +5761,7 @@
         </p:blipFill>
         <p:spPr>
           <a:xfrm>
-            <a:off x="284205" y="2627955"/>
+            <a:off x="284205" y="3528067"/>
             <a:ext cx="892528" cy="586800"/>
           </a:xfrm>
           <a:prstGeom prst="rect">
@@ -5790,7 +5791,7 @@
         </p:blipFill>
         <p:spPr>
           <a:xfrm>
-            <a:off x="284205" y="5459592"/>
+            <a:off x="284205" y="6359704"/>
             <a:ext cx="892528" cy="586800"/>
           </a:xfrm>
           <a:prstGeom prst="rect">
@@ -5812,7 +5813,7 @@
         </p:nvSpPr>
         <p:spPr>
           <a:xfrm>
-            <a:off x="1176733" y="1054261"/>
+            <a:off x="1176733" y="1954374"/>
             <a:ext cx="1813060" cy="461665"/>
           </a:xfrm>
           <a:prstGeom prst="rect">
@@ -5848,7 +5849,7 @@
         </p:nvSpPr>
         <p:spPr>
           <a:xfrm>
-            <a:off x="1153405" y="2690526"/>
+            <a:off x="1153406" y="3590639"/>
             <a:ext cx="1025089" cy="461665"/>
           </a:xfrm>
           <a:prstGeom prst="rect">
@@ -5884,7 +5885,7 @@
         </p:nvSpPr>
         <p:spPr>
           <a:xfrm>
-            <a:off x="1154087" y="5522164"/>
+            <a:off x="1154088" y="6422277"/>
             <a:ext cx="829073" cy="461665"/>
           </a:xfrm>
           <a:prstGeom prst="rect">
@@ -5920,8 +5921,8 @@
         </p:nvSpPr>
         <p:spPr>
           <a:xfrm>
-            <a:off x="11807373" y="900113"/>
-            <a:ext cx="628698" cy="395942"/>
+            <a:off x="11807374" y="1800225"/>
+            <a:ext cx="588623" cy="369332"/>
           </a:xfrm>
           <a:prstGeom prst="rect">
             <a:avLst/>
@@ -5969,7 +5970,7 @@
         </p:blipFill>
         <p:spPr>
           <a:xfrm>
-            <a:off x="3216340" y="932908"/>
+            <a:off x="3216340" y="1833020"/>
             <a:ext cx="6699512" cy="1527060"/>
           </a:xfrm>
           <a:prstGeom prst="rect">
@@ -5991,7 +5992,7 @@
         </p:nvSpPr>
         <p:spPr>
           <a:xfrm rot="5400000">
-            <a:off x="9447554" y="7812294"/>
+            <a:off x="9447555" y="8712406"/>
             <a:ext cx="669973" cy="2339616"/>
           </a:xfrm>
           <a:prstGeom prst="leftBrace">
@@ -6051,7 +6052,7 @@
         </p:blipFill>
         <p:spPr>
           <a:xfrm>
-            <a:off x="9594105" y="9088706"/>
+            <a:off x="9594105" y="9988818"/>
             <a:ext cx="1281782" cy="628684"/>
           </a:xfrm>
           <a:prstGeom prst="rect">
@@ -6081,7 +6082,7 @@
         </p:blipFill>
         <p:spPr>
           <a:xfrm>
-            <a:off x="9601965" y="9741764"/>
+            <a:off x="9601966" y="10641877"/>
             <a:ext cx="1271547" cy="626469"/>
           </a:xfrm>
           <a:prstGeom prst="rect">
@@ -6111,7 +6112,7 @@
         </p:blipFill>
         <p:spPr>
           <a:xfrm>
-            <a:off x="9570358" y="10394060"/>
+            <a:off x="9570359" y="11294173"/>
             <a:ext cx="1295931" cy="626469"/>
           </a:xfrm>
           <a:prstGeom prst="rect">
@@ -6133,8 +6134,8 @@
         </p:nvSpPr>
         <p:spPr>
           <a:xfrm>
-            <a:off x="8612730" y="9218382"/>
-            <a:ext cx="1053494" cy="395942"/>
+            <a:off x="8612731" y="10118494"/>
+            <a:ext cx="974947" cy="369332"/>
           </a:xfrm>
           <a:prstGeom prst="rect">
             <a:avLst/>
@@ -6176,7 +6177,7 @@
         </p:blipFill>
         <p:spPr>
           <a:xfrm>
-            <a:off x="7149817" y="4593790"/>
+            <a:off x="7149817" y="5493902"/>
             <a:ext cx="4449616" cy="641100"/>
           </a:xfrm>
           <a:prstGeom prst="rect">
@@ -6206,7 +6207,7 @@
         </p:blipFill>
         <p:spPr>
           <a:xfrm>
-            <a:off x="8745151" y="5596011"/>
+            <a:off x="8745152" y="6496123"/>
             <a:ext cx="2803699" cy="928418"/>
           </a:xfrm>
           <a:prstGeom prst="rect">
@@ -6266,7 +6267,7 @@
         </p:blipFill>
         <p:spPr>
           <a:xfrm>
-            <a:off x="6160022" y="11924273"/>
+            <a:off x="6160022" y="12824385"/>
             <a:ext cx="1363978" cy="675432"/>
           </a:xfrm>
           <a:prstGeom prst="rect">
@@ -6288,7 +6289,7 @@
         </p:nvSpPr>
         <p:spPr>
           <a:xfrm rot="5400000">
-            <a:off x="6030195" y="10681835"/>
+            <a:off x="6030196" y="11581947"/>
             <a:ext cx="669973" cy="2339616"/>
           </a:xfrm>
           <a:prstGeom prst="leftBrace">
@@ -6354,7 +6355,7 @@
         </p:blipFill>
         <p:spPr>
           <a:xfrm>
-            <a:off x="4578423" y="10064431"/>
+            <a:off x="4578424" y="10964543"/>
             <a:ext cx="4633285" cy="1962932"/>
           </a:xfrm>
           <a:prstGeom prst="rect">
@@ -6376,7 +6377,7 @@
         </p:nvSpPr>
         <p:spPr>
           <a:xfrm rot="5400000">
-            <a:off x="10454302" y="9082094"/>
+            <a:off x="10454303" y="9982206"/>
             <a:ext cx="669973" cy="2339616"/>
           </a:xfrm>
           <a:prstGeom prst="leftBrace">
@@ -6428,7 +6429,7 @@
         </p:nvSpPr>
         <p:spPr>
           <a:xfrm rot="5400000">
-            <a:off x="6516918" y="7697466"/>
+            <a:off x="6516919" y="8597578"/>
             <a:ext cx="669973" cy="4633286"/>
           </a:xfrm>
           <a:prstGeom prst="leftBrace">
@@ -6480,7 +6481,7 @@
         </p:nvSpPr>
         <p:spPr>
           <a:xfrm rot="5400000">
-            <a:off x="8540589" y="5410638"/>
+            <a:off x="8540590" y="6310750"/>
             <a:ext cx="669973" cy="5941086"/>
           </a:xfrm>
           <a:prstGeom prst="leftBrace">
@@ -6540,7 +6541,7 @@
         </p:blipFill>
         <p:spPr>
           <a:xfrm>
-            <a:off x="6471743" y="5930202"/>
+            <a:off x="6471744" y="6830314"/>
             <a:ext cx="4837965" cy="2223700"/>
           </a:xfrm>
           <a:prstGeom prst="rect">
@@ -6562,7 +6563,7 @@
         </p:nvSpPr>
         <p:spPr>
           <a:xfrm rot="5400000">
-            <a:off x="8914497" y="1338379"/>
+            <a:off x="8914497" y="2238492"/>
             <a:ext cx="508102" cy="4546963"/>
           </a:xfrm>
           <a:prstGeom prst="leftBrace">
@@ -6628,7 +6629,7 @@
         </p:blipFill>
         <p:spPr>
           <a:xfrm>
-            <a:off x="1992518" y="1803076"/>
+            <a:off x="1992519" y="2703188"/>
             <a:ext cx="7839515" cy="2293856"/>
           </a:xfrm>
           <a:prstGeom prst="rect">
@@ -6652,7 +6653,7 @@
         </p:nvCxnSpPr>
         <p:spPr>
           <a:xfrm>
-            <a:off x="98231" y="1605029"/>
+            <a:off x="98232" y="2505141"/>
             <a:ext cx="12111789" cy="0"/>
           </a:xfrm>
           <a:prstGeom prst="line">
@@ -6698,7 +6699,7 @@
         </p:nvCxnSpPr>
         <p:spPr>
           <a:xfrm>
-            <a:off x="98231" y="4468729"/>
+            <a:off x="98232" y="5368841"/>
             <a:ext cx="12111789" cy="0"/>
           </a:xfrm>
           <a:prstGeom prst="line">
@@ -6742,7 +6743,7 @@
         </p:nvSpPr>
         <p:spPr>
           <a:xfrm rot="5400000">
-            <a:off x="8548471" y="3383558"/>
+            <a:off x="8548472" y="4283671"/>
             <a:ext cx="669973" cy="4958831"/>
           </a:xfrm>
           <a:prstGeom prst="leftBrace">
@@ -6794,7 +6795,7 @@
         </p:nvSpPr>
         <p:spPr>
           <a:xfrm rot="5400000">
-            <a:off x="5577286" y="-2193725"/>
+            <a:off x="5577287" y="-1293613"/>
             <a:ext cx="669973" cy="7839514"/>
           </a:xfrm>
           <a:prstGeom prst="leftBrace">
@@ -6846,7 +6847,7 @@
         </p:nvSpPr>
         <p:spPr>
           <a:xfrm rot="5400000">
-            <a:off x="9587063" y="3131198"/>
+            <a:off x="9587064" y="4031311"/>
             <a:ext cx="669973" cy="2944717"/>
           </a:xfrm>
           <a:prstGeom prst="leftBrace">
@@ -6906,7 +6907,7 @@
         </p:blipFill>
         <p:spPr>
           <a:xfrm>
-            <a:off x="98228" y="90289"/>
+            <a:off x="98228" y="990401"/>
             <a:ext cx="892528" cy="579404"/>
           </a:xfrm>
           <a:prstGeom prst="rect">
@@ -6936,7 +6937,7 @@
         </p:blipFill>
         <p:spPr>
           <a:xfrm>
-            <a:off x="98228" y="1729056"/>
+            <a:off x="98228" y="2629168"/>
             <a:ext cx="892528" cy="586800"/>
           </a:xfrm>
           <a:prstGeom prst="rect">
@@ -6966,7 +6967,7 @@
         </p:blipFill>
         <p:spPr>
           <a:xfrm>
-            <a:off x="98228" y="4560693"/>
+            <a:off x="98228" y="5460805"/>
             <a:ext cx="892528" cy="586800"/>
           </a:xfrm>
           <a:prstGeom prst="rect">
@@ -6988,7 +6989,7 @@
         </p:nvSpPr>
         <p:spPr>
           <a:xfrm>
-            <a:off x="990756" y="155362"/>
+            <a:off x="990756" y="1055474"/>
             <a:ext cx="1813060" cy="707886"/>
           </a:xfrm>
           <a:prstGeom prst="rect">
@@ -7042,7 +7043,7 @@
         </p:nvSpPr>
         <p:spPr>
           <a:xfrm>
-            <a:off x="967428" y="1791627"/>
+            <a:off x="967429" y="2691740"/>
             <a:ext cx="1025089" cy="461665"/>
           </a:xfrm>
           <a:prstGeom prst="rect">
@@ -7078,7 +7079,7 @@
         </p:nvSpPr>
         <p:spPr>
           <a:xfrm>
-            <a:off x="968110" y="4623265"/>
+            <a:off x="968111" y="5523378"/>
             <a:ext cx="829073" cy="461665"/>
           </a:xfrm>
           <a:prstGeom prst="rect">
@@ -7114,7 +7115,7 @@
         </p:nvSpPr>
         <p:spPr>
           <a:xfrm>
-            <a:off x="11621396" y="1214"/>
+            <a:off x="11621397" y="901326"/>
             <a:ext cx="588623" cy="369332"/>
           </a:xfrm>
           <a:prstGeom prst="rect">
@@ -7163,7 +7164,7 @@
         </p:blipFill>
         <p:spPr>
           <a:xfrm>
-            <a:off x="3030363" y="34009"/>
+            <a:off x="3030363" y="934121"/>
             <a:ext cx="6699512" cy="1527060"/>
           </a:xfrm>
           <a:prstGeom prst="rect">
@@ -7193,7 +7194,7 @@
         </p:blipFill>
         <p:spPr>
           <a:xfrm>
-            <a:off x="10600853" y="10326702"/>
+            <a:off x="10600853" y="11226814"/>
             <a:ext cx="1281782" cy="628684"/>
           </a:xfrm>
           <a:prstGeom prst="rect">
@@ -7223,7 +7224,7 @@
         </p:blipFill>
         <p:spPr>
           <a:xfrm>
-            <a:off x="10608713" y="10979760"/>
+            <a:off x="10608714" y="11879873"/>
             <a:ext cx="1271547" cy="626469"/>
           </a:xfrm>
           <a:prstGeom prst="rect">
@@ -7253,7 +7254,7 @@
         </p:blipFill>
         <p:spPr>
           <a:xfrm>
-            <a:off x="10577106" y="11632056"/>
+            <a:off x="10577107" y="12532169"/>
             <a:ext cx="1295931" cy="626469"/>
           </a:xfrm>
           <a:prstGeom prst="rect">
@@ -7275,8 +7276,8 @@
         </p:nvSpPr>
         <p:spPr>
           <a:xfrm>
-            <a:off x="9619478" y="10456378"/>
-            <a:ext cx="1053494" cy="395942"/>
+            <a:off x="9619479" y="11356490"/>
+            <a:ext cx="974947" cy="369332"/>
           </a:xfrm>
           <a:prstGeom prst="rect">
             <a:avLst/>
@@ -7318,7 +7319,7 @@
         </p:blipFill>
         <p:spPr>
           <a:xfrm>
-            <a:off x="6963840" y="3694891"/>
+            <a:off x="6963840" y="4595003"/>
             <a:ext cx="4449616" cy="641100"/>
           </a:xfrm>
           <a:prstGeom prst="rect">
@@ -7348,7 +7349,7 @@
         </p:blipFill>
         <p:spPr>
           <a:xfrm>
-            <a:off x="8559174" y="4697112"/>
+            <a:off x="8559175" y="5597224"/>
             <a:ext cx="2803699" cy="928418"/>
           </a:xfrm>
           <a:prstGeom prst="rect">
@@ -7372,7 +7373,7 @@
         </p:nvCxnSpPr>
         <p:spPr>
           <a:xfrm>
-            <a:off x="98228" y="8232352"/>
+            <a:off x="98229" y="9132464"/>
             <a:ext cx="12111789" cy="0"/>
           </a:xfrm>
           <a:prstGeom prst="line">
@@ -7416,7 +7417,7 @@
         </p:nvSpPr>
         <p:spPr>
           <a:xfrm>
-            <a:off x="5187628" y="12101176"/>
+            <a:off x="5187629" y="13001288"/>
             <a:ext cx="1003993" cy="369332"/>
           </a:xfrm>
           <a:prstGeom prst="rect">
@@ -7459,7 +7460,7 @@
         </p:blipFill>
         <p:spPr>
           <a:xfrm>
-            <a:off x="80849" y="8355427"/>
+            <a:off x="80849" y="9255540"/>
             <a:ext cx="927286" cy="600309"/>
           </a:xfrm>
           <a:prstGeom prst="rect">
@@ -7481,7 +7482,7 @@
         </p:nvSpPr>
         <p:spPr>
           <a:xfrm>
-            <a:off x="990756" y="8424748"/>
+            <a:off x="990756" y="9324861"/>
             <a:ext cx="944618" cy="461665"/>
           </a:xfrm>
           <a:prstGeom prst="rect">
@@ -7531,7 +7532,7 @@
         </p:blipFill>
         <p:spPr>
           <a:xfrm>
-            <a:off x="5936837" y="8454810"/>
+            <a:off x="5936837" y="9354922"/>
             <a:ext cx="5850832" cy="1599102"/>
           </a:xfrm>
           <a:prstGeom prst="rect">
@@ -7583,7 +7584,7 @@
         </p:nvSpPr>
         <p:spPr>
           <a:xfrm rot="5400000">
-            <a:off x="8540589" y="5410638"/>
+            <a:off x="8540590" y="6310750"/>
             <a:ext cx="669973" cy="5941086"/>
           </a:xfrm>
           <a:prstGeom prst="leftBrace">
@@ -7643,7 +7644,7 @@
         </p:blipFill>
         <p:spPr>
           <a:xfrm>
-            <a:off x="6494428" y="5961299"/>
+            <a:off x="6494429" y="6861411"/>
             <a:ext cx="4958831" cy="2184616"/>
           </a:xfrm>
           <a:prstGeom prst="rect">
@@ -7673,7 +7674,7 @@
         </p:blipFill>
         <p:spPr>
           <a:xfrm>
-            <a:off x="6160022" y="11924273"/>
+            <a:off x="6160022" y="12824385"/>
             <a:ext cx="1363978" cy="675432"/>
           </a:xfrm>
           <a:prstGeom prst="rect">
@@ -7695,7 +7696,7 @@
         </p:nvSpPr>
         <p:spPr>
           <a:xfrm rot="5400000">
-            <a:off x="6030195" y="10681835"/>
+            <a:off x="6030196" y="11581947"/>
             <a:ext cx="669973" cy="2339616"/>
           </a:xfrm>
           <a:prstGeom prst="leftBrace">
@@ -7761,7 +7762,7 @@
         </p:blipFill>
         <p:spPr>
           <a:xfrm>
-            <a:off x="4578423" y="10064431"/>
+            <a:off x="4578424" y="10964543"/>
             <a:ext cx="4633285" cy="1962932"/>
           </a:xfrm>
           <a:prstGeom prst="rect">
@@ -7783,7 +7784,7 @@
         </p:nvSpPr>
         <p:spPr>
           <a:xfrm rot="5400000">
-            <a:off x="10454302" y="9082094"/>
+            <a:off x="10454303" y="9982206"/>
             <a:ext cx="669973" cy="2339616"/>
           </a:xfrm>
           <a:prstGeom prst="leftBrace">
@@ -7835,7 +7836,7 @@
         </p:nvSpPr>
         <p:spPr>
           <a:xfrm rot="5400000">
-            <a:off x="6516918" y="7697466"/>
+            <a:off x="6516919" y="8597578"/>
             <a:ext cx="669973" cy="4633286"/>
           </a:xfrm>
           <a:prstGeom prst="leftBrace">
@@ -7887,7 +7888,7 @@
         </p:nvSpPr>
         <p:spPr>
           <a:xfrm rot="5400000">
-            <a:off x="8914497" y="1338379"/>
+            <a:off x="8914497" y="2238492"/>
             <a:ext cx="508102" cy="4546963"/>
           </a:xfrm>
           <a:prstGeom prst="leftBrace">
@@ -7953,7 +7954,7 @@
         </p:blipFill>
         <p:spPr>
           <a:xfrm>
-            <a:off x="1992518" y="1803076"/>
+            <a:off x="1992519" y="2703188"/>
             <a:ext cx="7839515" cy="2293856"/>
           </a:xfrm>
           <a:prstGeom prst="rect">
@@ -7977,7 +7978,7 @@
         </p:nvCxnSpPr>
         <p:spPr>
           <a:xfrm>
-            <a:off x="98231" y="1605029"/>
+            <a:off x="98232" y="2505141"/>
             <a:ext cx="12111789" cy="0"/>
           </a:xfrm>
           <a:prstGeom prst="line">
@@ -8023,7 +8024,7 @@
         </p:nvCxnSpPr>
         <p:spPr>
           <a:xfrm>
-            <a:off x="98231" y="4468729"/>
+            <a:off x="98232" y="5368841"/>
             <a:ext cx="12111789" cy="0"/>
           </a:xfrm>
           <a:prstGeom prst="line">
@@ -8067,7 +8068,7 @@
         </p:nvSpPr>
         <p:spPr>
           <a:xfrm rot="5400000">
-            <a:off x="8593663" y="3338365"/>
+            <a:off x="8593664" y="4238478"/>
             <a:ext cx="669973" cy="5049217"/>
           </a:xfrm>
           <a:prstGeom prst="leftBrace">
@@ -8119,7 +8120,7 @@
         </p:nvSpPr>
         <p:spPr>
           <a:xfrm rot="5400000">
-            <a:off x="5577286" y="-2193725"/>
+            <a:off x="5577287" y="-1293613"/>
             <a:ext cx="669973" cy="7839514"/>
           </a:xfrm>
           <a:prstGeom prst="leftBrace">
@@ -8171,7 +8172,7 @@
         </p:nvSpPr>
         <p:spPr>
           <a:xfrm rot="5400000">
-            <a:off x="9587063" y="3131198"/>
+            <a:off x="9587064" y="4031311"/>
             <a:ext cx="669973" cy="2944717"/>
           </a:xfrm>
           <a:prstGeom prst="leftBrace">
@@ -8231,7 +8232,7 @@
         </p:blipFill>
         <p:spPr>
           <a:xfrm>
-            <a:off x="98228" y="90289"/>
+            <a:off x="98228" y="990401"/>
             <a:ext cx="892528" cy="579404"/>
           </a:xfrm>
           <a:prstGeom prst="rect">
@@ -8261,7 +8262,7 @@
         </p:blipFill>
         <p:spPr>
           <a:xfrm>
-            <a:off x="98228" y="1729056"/>
+            <a:off x="98228" y="2629168"/>
             <a:ext cx="892528" cy="586800"/>
           </a:xfrm>
           <a:prstGeom prst="rect">
@@ -8291,7 +8292,7 @@
         </p:blipFill>
         <p:spPr>
           <a:xfrm>
-            <a:off x="98228" y="4560693"/>
+            <a:off x="98228" y="5460805"/>
             <a:ext cx="892528" cy="586800"/>
           </a:xfrm>
           <a:prstGeom prst="rect">
@@ -8313,7 +8314,7 @@
         </p:nvSpPr>
         <p:spPr>
           <a:xfrm>
-            <a:off x="990756" y="155362"/>
+            <a:off x="990756" y="1055474"/>
             <a:ext cx="1813060" cy="707886"/>
           </a:xfrm>
           <a:prstGeom prst="rect">
@@ -8367,7 +8368,7 @@
         </p:nvSpPr>
         <p:spPr>
           <a:xfrm>
-            <a:off x="967428" y="1791627"/>
+            <a:off x="967429" y="2691740"/>
             <a:ext cx="1025089" cy="461665"/>
           </a:xfrm>
           <a:prstGeom prst="rect">
@@ -8403,7 +8404,7 @@
         </p:nvSpPr>
         <p:spPr>
           <a:xfrm>
-            <a:off x="968110" y="4623265"/>
+            <a:off x="968111" y="5523378"/>
             <a:ext cx="829073" cy="461665"/>
           </a:xfrm>
           <a:prstGeom prst="rect">
@@ -8439,7 +8440,7 @@
         </p:nvSpPr>
         <p:spPr>
           <a:xfrm>
-            <a:off x="11621396" y="1214"/>
+            <a:off x="11621397" y="901326"/>
             <a:ext cx="588623" cy="369332"/>
           </a:xfrm>
           <a:prstGeom prst="rect">
@@ -8488,7 +8489,7 @@
         </p:blipFill>
         <p:spPr>
           <a:xfrm>
-            <a:off x="3030363" y="34009"/>
+            <a:off x="3030363" y="934121"/>
             <a:ext cx="6699512" cy="1527060"/>
           </a:xfrm>
           <a:prstGeom prst="rect">
@@ -8518,7 +8519,7 @@
         </p:blipFill>
         <p:spPr>
           <a:xfrm>
-            <a:off x="10600853" y="10326702"/>
+            <a:off x="10600853" y="11226814"/>
             <a:ext cx="1281782" cy="628684"/>
           </a:xfrm>
           <a:prstGeom prst="rect">
@@ -8548,7 +8549,7 @@
         </p:blipFill>
         <p:spPr>
           <a:xfrm>
-            <a:off x="10608713" y="10979760"/>
+            <a:off x="10608714" y="11879873"/>
             <a:ext cx="1271547" cy="626469"/>
           </a:xfrm>
           <a:prstGeom prst="rect">
@@ -8578,7 +8579,7 @@
         </p:blipFill>
         <p:spPr>
           <a:xfrm>
-            <a:off x="10577106" y="11632056"/>
+            <a:off x="10577107" y="12532169"/>
             <a:ext cx="1295931" cy="626469"/>
           </a:xfrm>
           <a:prstGeom prst="rect">
@@ -8600,8 +8601,8 @@
         </p:nvSpPr>
         <p:spPr>
           <a:xfrm>
-            <a:off x="9619478" y="10456378"/>
-            <a:ext cx="1053494" cy="395942"/>
+            <a:off x="9619479" y="11356490"/>
+            <a:ext cx="974947" cy="369332"/>
           </a:xfrm>
           <a:prstGeom prst="rect">
             <a:avLst/>
@@ -8643,7 +8644,7 @@
         </p:blipFill>
         <p:spPr>
           <a:xfrm>
-            <a:off x="6963840" y="3694891"/>
+            <a:off x="6963840" y="4595003"/>
             <a:ext cx="4449616" cy="641100"/>
           </a:xfrm>
           <a:prstGeom prst="rect">
@@ -8673,7 +8674,7 @@
         </p:blipFill>
         <p:spPr>
           <a:xfrm>
-            <a:off x="8559174" y="4697112"/>
+            <a:off x="8559175" y="5597224"/>
             <a:ext cx="2803699" cy="928418"/>
           </a:xfrm>
           <a:prstGeom prst="rect">
@@ -8697,7 +8698,7 @@
         </p:nvCxnSpPr>
         <p:spPr>
           <a:xfrm>
-            <a:off x="98228" y="8232352"/>
+            <a:off x="98229" y="9132464"/>
             <a:ext cx="12111789" cy="0"/>
           </a:xfrm>
           <a:prstGeom prst="line">
@@ -8741,7 +8742,7 @@
         </p:nvSpPr>
         <p:spPr>
           <a:xfrm>
-            <a:off x="5187628" y="12101176"/>
+            <a:off x="5187629" y="13001288"/>
             <a:ext cx="1003993" cy="369332"/>
           </a:xfrm>
           <a:prstGeom prst="rect">
@@ -8784,7 +8785,7 @@
         </p:blipFill>
         <p:spPr>
           <a:xfrm>
-            <a:off x="80849" y="8355427"/>
+            <a:off x="80849" y="9255540"/>
             <a:ext cx="927286" cy="600309"/>
           </a:xfrm>
           <a:prstGeom prst="rect">
@@ -8806,7 +8807,7 @@
         </p:nvSpPr>
         <p:spPr>
           <a:xfrm>
-            <a:off x="990756" y="8424748"/>
+            <a:off x="990756" y="9324861"/>
             <a:ext cx="944618" cy="461665"/>
           </a:xfrm>
           <a:prstGeom prst="rect">
@@ -8856,7 +8857,7 @@
         </p:blipFill>
         <p:spPr>
           <a:xfrm>
-            <a:off x="5936837" y="8454810"/>
+            <a:off x="5936837" y="9354922"/>
             <a:ext cx="5850832" cy="1599102"/>
           </a:xfrm>
           <a:prstGeom prst="rect">
@@ -8916,7 +8917,7 @@
         </p:blipFill>
         <p:spPr>
           <a:xfrm>
-            <a:off x="9799468" y="10409620"/>
+            <a:off x="9799469" y="11309732"/>
             <a:ext cx="2754851" cy="1371384"/>
           </a:xfrm>
           <a:prstGeom prst="rect">
@@ -8938,7 +8939,7 @@
         </p:nvSpPr>
         <p:spPr>
           <a:xfrm>
-            <a:off x="9454111" y="10357508"/>
+            <a:off x="9454111" y="11257620"/>
             <a:ext cx="485870" cy="1443520"/>
           </a:xfrm>
           <a:prstGeom prst="leftBrace">
@@ -8990,7 +8991,7 @@
         </p:nvSpPr>
         <p:spPr>
           <a:xfrm>
-            <a:off x="9454111" y="8693809"/>
+            <a:off x="9454111" y="9593921"/>
             <a:ext cx="485870" cy="782472"/>
           </a:xfrm>
           <a:prstGeom prst="leftBrace">
@@ -9042,7 +9043,7 @@
         </p:nvSpPr>
         <p:spPr>
           <a:xfrm>
-            <a:off x="9454111" y="9525659"/>
+            <a:off x="9454111" y="10425771"/>
             <a:ext cx="485870" cy="782472"/>
           </a:xfrm>
           <a:prstGeom prst="leftBrace">
@@ -9108,7 +9109,7 @@
         </p:blipFill>
         <p:spPr>
           <a:xfrm>
-            <a:off x="8194419" y="8461240"/>
+            <a:off x="8194419" y="9361353"/>
             <a:ext cx="1305432" cy="2683725"/>
           </a:xfrm>
           <a:prstGeom prst="rect">
@@ -9130,7 +9131,7 @@
         </p:nvSpPr>
         <p:spPr>
           <a:xfrm rot="5400000">
-            <a:off x="7727749" y="3924779"/>
+            <a:off x="7727750" y="4824891"/>
             <a:ext cx="669973" cy="8912806"/>
           </a:xfrm>
           <a:prstGeom prst="leftBrace">
@@ -9190,7 +9191,7 @@
         </p:blipFill>
         <p:spPr>
           <a:xfrm>
-            <a:off x="6494428" y="5961299"/>
+            <a:off x="6494429" y="6861411"/>
             <a:ext cx="4958831" cy="2184616"/>
           </a:xfrm>
           <a:prstGeom prst="rect">
@@ -9220,7 +9221,7 @@
         </p:blipFill>
         <p:spPr>
           <a:xfrm>
-            <a:off x="3861322" y="11924273"/>
+            <a:off x="3861322" y="12824385"/>
             <a:ext cx="1363978" cy="675432"/>
           </a:xfrm>
           <a:prstGeom prst="rect">
@@ -9242,7 +9243,7 @@
         </p:nvSpPr>
         <p:spPr>
           <a:xfrm rot="5400000">
-            <a:off x="3731495" y="10681835"/>
+            <a:off x="3731496" y="11581947"/>
             <a:ext cx="669973" cy="2339616"/>
           </a:xfrm>
           <a:prstGeom prst="leftBrace">
@@ -9308,7 +9309,7 @@
         </p:blipFill>
         <p:spPr>
           <a:xfrm>
-            <a:off x="2279723" y="10064431"/>
+            <a:off x="2279724" y="10964543"/>
             <a:ext cx="4633285" cy="1962932"/>
           </a:xfrm>
           <a:prstGeom prst="rect">
@@ -9330,7 +9331,7 @@
         </p:nvSpPr>
         <p:spPr>
           <a:xfrm rot="5400000">
-            <a:off x="4218218" y="7697466"/>
+            <a:off x="4218219" y="8597578"/>
             <a:ext cx="669973" cy="4633286"/>
           </a:xfrm>
           <a:prstGeom prst="leftBrace">
@@ -9382,7 +9383,7 @@
         </p:nvSpPr>
         <p:spPr>
           <a:xfrm rot="5400000">
-            <a:off x="8914497" y="1338379"/>
+            <a:off x="8914497" y="2238492"/>
             <a:ext cx="508102" cy="4546963"/>
           </a:xfrm>
           <a:prstGeom prst="leftBrace">
@@ -9448,7 +9449,7 @@
         </p:blipFill>
         <p:spPr>
           <a:xfrm>
-            <a:off x="1992518" y="1803076"/>
+            <a:off x="1992519" y="2703188"/>
             <a:ext cx="7839515" cy="2293856"/>
           </a:xfrm>
           <a:prstGeom prst="rect">
@@ -9472,7 +9473,7 @@
         </p:nvCxnSpPr>
         <p:spPr>
           <a:xfrm>
-            <a:off x="98231" y="1605029"/>
+            <a:off x="98232" y="2505141"/>
             <a:ext cx="12111789" cy="0"/>
           </a:xfrm>
           <a:prstGeom prst="line">
@@ -9518,7 +9519,7 @@
         </p:nvCxnSpPr>
         <p:spPr>
           <a:xfrm>
-            <a:off x="98231" y="4468729"/>
+            <a:off x="98232" y="5368841"/>
             <a:ext cx="12111789" cy="0"/>
           </a:xfrm>
           <a:prstGeom prst="line">
@@ -9562,7 +9563,7 @@
         </p:nvSpPr>
         <p:spPr>
           <a:xfrm rot="5400000">
-            <a:off x="8593663" y="3338365"/>
+            <a:off x="8593664" y="4238478"/>
             <a:ext cx="669973" cy="5049217"/>
           </a:xfrm>
           <a:prstGeom prst="leftBrace">
@@ -9614,7 +9615,7 @@
         </p:nvSpPr>
         <p:spPr>
           <a:xfrm rot="5400000">
-            <a:off x="5577286" y="-2193725"/>
+            <a:off x="5577287" y="-1293613"/>
             <a:ext cx="669973" cy="7839514"/>
           </a:xfrm>
           <a:prstGeom prst="leftBrace">
@@ -9666,7 +9667,7 @@
         </p:nvSpPr>
         <p:spPr>
           <a:xfrm rot="5400000">
-            <a:off x="9587063" y="3131198"/>
+            <a:off x="9587064" y="4031311"/>
             <a:ext cx="669973" cy="2944717"/>
           </a:xfrm>
           <a:prstGeom prst="leftBrace">
@@ -9726,7 +9727,7 @@
         </p:blipFill>
         <p:spPr>
           <a:xfrm>
-            <a:off x="98228" y="90289"/>
+            <a:off x="98228" y="990401"/>
             <a:ext cx="892528" cy="579404"/>
           </a:xfrm>
           <a:prstGeom prst="rect">
@@ -9756,7 +9757,7 @@
         </p:blipFill>
         <p:spPr>
           <a:xfrm>
-            <a:off x="98228" y="1729056"/>
+            <a:off x="98228" y="2629168"/>
             <a:ext cx="892528" cy="586800"/>
           </a:xfrm>
           <a:prstGeom prst="rect">
@@ -9786,7 +9787,7 @@
         </p:blipFill>
         <p:spPr>
           <a:xfrm>
-            <a:off x="98228" y="4560693"/>
+            <a:off x="98228" y="5460805"/>
             <a:ext cx="892528" cy="586800"/>
           </a:xfrm>
           <a:prstGeom prst="rect">
@@ -9808,7 +9809,7 @@
         </p:nvSpPr>
         <p:spPr>
           <a:xfrm>
-            <a:off x="990756" y="155362"/>
+            <a:off x="990756" y="1055474"/>
             <a:ext cx="1813060" cy="707886"/>
           </a:xfrm>
           <a:prstGeom prst="rect">
@@ -9862,7 +9863,7 @@
         </p:nvSpPr>
         <p:spPr>
           <a:xfrm>
-            <a:off x="967428" y="1791627"/>
+            <a:off x="967429" y="2691740"/>
             <a:ext cx="1025089" cy="461665"/>
           </a:xfrm>
           <a:prstGeom prst="rect">
@@ -9898,7 +9899,7 @@
         </p:nvSpPr>
         <p:spPr>
           <a:xfrm>
-            <a:off x="968110" y="4623265"/>
+            <a:off x="968111" y="5523378"/>
             <a:ext cx="829073" cy="461665"/>
           </a:xfrm>
           <a:prstGeom prst="rect">
@@ -9934,7 +9935,7 @@
         </p:nvSpPr>
         <p:spPr>
           <a:xfrm>
-            <a:off x="11621396" y="1214"/>
+            <a:off x="11621397" y="901326"/>
             <a:ext cx="588623" cy="369332"/>
           </a:xfrm>
           <a:prstGeom prst="rect">
@@ -9983,7 +9984,7 @@
         </p:blipFill>
         <p:spPr>
           <a:xfrm>
-            <a:off x="3030363" y="34009"/>
+            <a:off x="3030363" y="934121"/>
             <a:ext cx="6699512" cy="1527060"/>
           </a:xfrm>
           <a:prstGeom prst="rect">
@@ -10013,7 +10014,7 @@
         </p:blipFill>
         <p:spPr>
           <a:xfrm>
-            <a:off x="9787025" y="8769183"/>
+            <a:off x="9787025" y="9669295"/>
             <a:ext cx="1281782" cy="628684"/>
           </a:xfrm>
           <a:prstGeom prst="rect">
@@ -10043,7 +10044,7 @@
         </p:blipFill>
         <p:spPr>
           <a:xfrm>
-            <a:off x="9787025" y="9592506"/>
+            <a:off x="9787026" y="10492619"/>
             <a:ext cx="1295931" cy="626469"/>
           </a:xfrm>
           <a:prstGeom prst="rect">
@@ -10065,7 +10066,7 @@
         </p:nvSpPr>
         <p:spPr>
           <a:xfrm>
-            <a:off x="8359661" y="9340993"/>
+            <a:off x="8359662" y="10241105"/>
             <a:ext cx="974947" cy="369332"/>
           </a:xfrm>
           <a:prstGeom prst="rect">
@@ -10108,7 +10109,7 @@
         </p:blipFill>
         <p:spPr>
           <a:xfrm>
-            <a:off x="6963840" y="3694891"/>
+            <a:off x="6963840" y="4595003"/>
             <a:ext cx="4449616" cy="641100"/>
           </a:xfrm>
           <a:prstGeom prst="rect">
@@ -10138,7 +10139,7 @@
         </p:blipFill>
         <p:spPr>
           <a:xfrm>
-            <a:off x="8559174" y="4697112"/>
+            <a:off x="8559175" y="5597224"/>
             <a:ext cx="2803699" cy="928418"/>
           </a:xfrm>
           <a:prstGeom prst="rect">
@@ -10162,7 +10163,7 @@
         </p:nvCxnSpPr>
         <p:spPr>
           <a:xfrm>
-            <a:off x="98228" y="8232352"/>
+            <a:off x="98229" y="9132464"/>
             <a:ext cx="12111789" cy="0"/>
           </a:xfrm>
           <a:prstGeom prst="line">
@@ -10206,7 +10207,7 @@
         </p:nvSpPr>
         <p:spPr>
           <a:xfrm>
-            <a:off x="2888928" y="12101176"/>
+            <a:off x="2888929" y="13001288"/>
             <a:ext cx="1003993" cy="369332"/>
           </a:xfrm>
           <a:prstGeom prst="rect">
@@ -10249,7 +10250,7 @@
         </p:blipFill>
         <p:spPr>
           <a:xfrm>
-            <a:off x="80849" y="8355427"/>
+            <a:off x="80849" y="9255540"/>
             <a:ext cx="927286" cy="600309"/>
           </a:xfrm>
           <a:prstGeom prst="rect">
@@ -10271,7 +10272,7 @@
         </p:nvSpPr>
         <p:spPr>
           <a:xfrm>
-            <a:off x="990756" y="8424748"/>
+            <a:off x="990756" y="9324861"/>
             <a:ext cx="944618" cy="461665"/>
           </a:xfrm>
           <a:prstGeom prst="rect">
@@ -10320,7 +10321,7 @@
         </p:blipFill>
         <p:spPr>
           <a:xfrm>
-            <a:off x="3638137" y="8454810"/>
+            <a:off x="3638137" y="9354922"/>
             <a:ext cx="4556282" cy="1599102"/>
           </a:xfrm>
           <a:prstGeom prst="rect">
@@ -10342,7 +10343,7 @@
         </p:nvSpPr>
         <p:spPr>
           <a:xfrm>
-            <a:off x="8359661" y="10242979"/>
+            <a:off x="8359662" y="11143091"/>
             <a:ext cx="974947" cy="369332"/>
           </a:xfrm>
           <a:prstGeom prst="rect">
@@ -10385,7 +10386,7 @@
         </p:blipFill>
         <p:spPr>
           <a:xfrm>
-            <a:off x="308953" y="673324"/>
+            <a:off x="308953" y="1573436"/>
             <a:ext cx="471078" cy="474308"/>
           </a:xfrm>
           <a:prstGeom prst="rect">
@@ -10423,6 +10424,1617 @@
           <a:chExt cx="0" cy="0"/>
         </a:xfrm>
       </p:grpSpPr>
+      <p:pic>
+        <p:nvPicPr>
+          <p:cNvPr id="34" name="Picture 33">
+            <a:extLst>
+              <a:ext uri="{FF2B5EF4-FFF2-40B4-BE49-F238E27FC236}">
+                <a16:creationId xmlns:a16="http://schemas.microsoft.com/office/drawing/2014/main" id="{DC6E078F-F4E9-45A8-9592-0849B5A771D6}"/>
+              </a:ext>
+            </a:extLst>
+          </p:cNvPr>
+          <p:cNvPicPr>
+            <a:picLocks noChangeAspect="1"/>
+          </p:cNvPicPr>
+          <p:nvPr/>
+        </p:nvPicPr>
+        <p:blipFill>
+          <a:blip r:embed="rId2"/>
+          <a:stretch>
+            <a:fillRect/>
+          </a:stretch>
+        </p:blipFill>
+        <p:spPr>
+          <a:xfrm>
+            <a:off x="9296509" y="7907676"/>
+            <a:ext cx="3213343" cy="639856"/>
+          </a:xfrm>
+          <a:prstGeom prst="rect">
+            <a:avLst/>
+          </a:prstGeom>
+        </p:spPr>
+      </p:pic>
+      <p:sp>
+        <p:nvSpPr>
+          <p:cNvPr id="49" name="Left Brace 48">
+            <a:extLst>
+              <a:ext uri="{FF2B5EF4-FFF2-40B4-BE49-F238E27FC236}">
+                <a16:creationId xmlns:a16="http://schemas.microsoft.com/office/drawing/2014/main" id="{B33C836E-9730-4830-AB37-468222FE110C}"/>
+              </a:ext>
+            </a:extLst>
+          </p:cNvPr>
+          <p:cNvSpPr/>
+          <p:nvPr/>
+        </p:nvSpPr>
+        <p:spPr>
+          <a:xfrm rot="5400000">
+            <a:off x="10533222" y="6152212"/>
+            <a:ext cx="669973" cy="3315068"/>
+          </a:xfrm>
+          <a:prstGeom prst="leftBrace">
+            <a:avLst>
+              <a:gd name="adj1" fmla="val 8333"/>
+              <a:gd name="adj2" fmla="val 82188"/>
+            </a:avLst>
+          </a:prstGeom>
+          <a:ln w="38100">
+            <a:solidFill>
+              <a:schemeClr val="accent4"/>
+            </a:solidFill>
+          </a:ln>
+        </p:spPr>
+        <p:style>
+          <a:lnRef idx="1">
+            <a:schemeClr val="accent1"/>
+          </a:lnRef>
+          <a:fillRef idx="0">
+            <a:schemeClr val="accent1"/>
+          </a:fillRef>
+          <a:effectRef idx="0">
+            <a:schemeClr val="accent1"/>
+          </a:effectRef>
+          <a:fontRef idx="minor">
+            <a:schemeClr val="tx1"/>
+          </a:fontRef>
+        </p:style>
+        <p:txBody>
+          <a:bodyPr rtlCol="0" anchor="ctr"/>
+          <a:lstStyle/>
+          <a:p>
+            <a:pPr algn="ctr"/>
+            <a:endParaRPr lang="en-GB" dirty="0"/>
+          </a:p>
+        </p:txBody>
+      </p:sp>
+      <p:pic>
+        <p:nvPicPr>
+          <p:cNvPr id="17" name="Picture 16">
+            <a:extLst>
+              <a:ext uri="{FF2B5EF4-FFF2-40B4-BE49-F238E27FC236}">
+                <a16:creationId xmlns:a16="http://schemas.microsoft.com/office/drawing/2014/main" id="{2A510AD6-A12F-4614-8D5F-EAA53E47B411}"/>
+              </a:ext>
+            </a:extLst>
+          </p:cNvPr>
+          <p:cNvPicPr>
+            <a:picLocks noChangeAspect="1"/>
+          </p:cNvPicPr>
+          <p:nvPr/>
+        </p:nvPicPr>
+        <p:blipFill>
+          <a:blip r:embed="rId3"/>
+          <a:stretch>
+            <a:fillRect/>
+          </a:stretch>
+        </p:blipFill>
+        <p:spPr>
+          <a:xfrm>
+            <a:off x="9799469" y="11103008"/>
+            <a:ext cx="2754851" cy="1371384"/>
+          </a:xfrm>
+          <a:prstGeom prst="rect">
+            <a:avLst/>
+          </a:prstGeom>
+        </p:spPr>
+      </p:pic>
+      <p:sp>
+        <p:nvSpPr>
+          <p:cNvPr id="46" name="Left Brace 45">
+            <a:extLst>
+              <a:ext uri="{FF2B5EF4-FFF2-40B4-BE49-F238E27FC236}">
+                <a16:creationId xmlns:a16="http://schemas.microsoft.com/office/drawing/2014/main" id="{E4084E21-75CC-4798-B255-E8B429C83765}"/>
+              </a:ext>
+            </a:extLst>
+          </p:cNvPr>
+          <p:cNvSpPr/>
+          <p:nvPr/>
+        </p:nvSpPr>
+        <p:spPr>
+          <a:xfrm>
+            <a:off x="9454111" y="11050896"/>
+            <a:ext cx="485870" cy="1443520"/>
+          </a:xfrm>
+          <a:prstGeom prst="leftBrace">
+            <a:avLst>
+              <a:gd name="adj1" fmla="val 8333"/>
+              <a:gd name="adj2" fmla="val 34253"/>
+            </a:avLst>
+          </a:prstGeom>
+          <a:ln w="38100">
+            <a:solidFill>
+              <a:srgbClr val="FF0000"/>
+            </a:solidFill>
+          </a:ln>
+        </p:spPr>
+        <p:style>
+          <a:lnRef idx="1">
+            <a:schemeClr val="accent1"/>
+          </a:lnRef>
+          <a:fillRef idx="0">
+            <a:schemeClr val="accent1"/>
+          </a:fillRef>
+          <a:effectRef idx="0">
+            <a:schemeClr val="accent1"/>
+          </a:effectRef>
+          <a:fontRef idx="minor">
+            <a:schemeClr val="tx1"/>
+          </a:fontRef>
+        </p:style>
+        <p:txBody>
+          <a:bodyPr rtlCol="0" anchor="ctr"/>
+          <a:lstStyle/>
+          <a:p>
+            <a:pPr algn="ctr"/>
+            <a:endParaRPr lang="en-GB" dirty="0"/>
+          </a:p>
+        </p:txBody>
+      </p:sp>
+      <p:sp>
+        <p:nvSpPr>
+          <p:cNvPr id="45" name="Left Brace 44">
+            <a:extLst>
+              <a:ext uri="{FF2B5EF4-FFF2-40B4-BE49-F238E27FC236}">
+                <a16:creationId xmlns:a16="http://schemas.microsoft.com/office/drawing/2014/main" id="{6A780C7D-167C-4B91-9DB2-93F665E492C2}"/>
+              </a:ext>
+            </a:extLst>
+          </p:cNvPr>
+          <p:cNvSpPr/>
+          <p:nvPr/>
+        </p:nvSpPr>
+        <p:spPr>
+          <a:xfrm>
+            <a:off x="9454111" y="9387197"/>
+            <a:ext cx="485870" cy="782472"/>
+          </a:xfrm>
+          <a:prstGeom prst="leftBrace">
+            <a:avLst>
+              <a:gd name="adj1" fmla="val 8333"/>
+              <a:gd name="adj2" fmla="val 52176"/>
+            </a:avLst>
+          </a:prstGeom>
+          <a:ln w="38100">
+            <a:solidFill>
+              <a:schemeClr val="accent4"/>
+            </a:solidFill>
+          </a:ln>
+        </p:spPr>
+        <p:style>
+          <a:lnRef idx="1">
+            <a:schemeClr val="accent1"/>
+          </a:lnRef>
+          <a:fillRef idx="0">
+            <a:schemeClr val="accent1"/>
+          </a:fillRef>
+          <a:effectRef idx="0">
+            <a:schemeClr val="accent1"/>
+          </a:effectRef>
+          <a:fontRef idx="minor">
+            <a:schemeClr val="tx1"/>
+          </a:fontRef>
+        </p:style>
+        <p:txBody>
+          <a:bodyPr rtlCol="0" anchor="ctr"/>
+          <a:lstStyle/>
+          <a:p>
+            <a:pPr algn="ctr"/>
+            <a:endParaRPr lang="en-GB" dirty="0"/>
+          </a:p>
+        </p:txBody>
+      </p:sp>
+      <p:sp>
+        <p:nvSpPr>
+          <p:cNvPr id="42" name="Left Brace 41">
+            <a:extLst>
+              <a:ext uri="{FF2B5EF4-FFF2-40B4-BE49-F238E27FC236}">
+                <a16:creationId xmlns:a16="http://schemas.microsoft.com/office/drawing/2014/main" id="{68297AD5-5ED6-4FE2-A0AB-A46E54BD1626}"/>
+              </a:ext>
+            </a:extLst>
+          </p:cNvPr>
+          <p:cNvSpPr/>
+          <p:nvPr/>
+        </p:nvSpPr>
+        <p:spPr>
+          <a:xfrm>
+            <a:off x="9454111" y="10219047"/>
+            <a:ext cx="485870" cy="782472"/>
+          </a:xfrm>
+          <a:prstGeom prst="leftBrace">
+            <a:avLst>
+              <a:gd name="adj1" fmla="val 8333"/>
+              <a:gd name="adj2" fmla="val 52176"/>
+            </a:avLst>
+          </a:prstGeom>
+          <a:ln w="38100">
+            <a:solidFill>
+              <a:schemeClr val="accent6"/>
+            </a:solidFill>
+          </a:ln>
+        </p:spPr>
+        <p:style>
+          <a:lnRef idx="1">
+            <a:schemeClr val="accent1"/>
+          </a:lnRef>
+          <a:fillRef idx="0">
+            <a:schemeClr val="accent1"/>
+          </a:fillRef>
+          <a:effectRef idx="0">
+            <a:schemeClr val="accent1"/>
+          </a:effectRef>
+          <a:fontRef idx="minor">
+            <a:schemeClr val="tx1"/>
+          </a:fontRef>
+        </p:style>
+        <p:txBody>
+          <a:bodyPr rtlCol="0" anchor="ctr"/>
+          <a:lstStyle/>
+          <a:p>
+            <a:pPr algn="ctr"/>
+            <a:endParaRPr lang="en-GB" dirty="0"/>
+          </a:p>
+        </p:txBody>
+      </p:sp>
+      <p:pic>
+        <p:nvPicPr>
+          <p:cNvPr id="29" name="Picture 28" descr="A screenshot of a cell phone&#10;&#10;Description automatically generated">
+            <a:extLst>
+              <a:ext uri="{FF2B5EF4-FFF2-40B4-BE49-F238E27FC236}">
+                <a16:creationId xmlns:a16="http://schemas.microsoft.com/office/drawing/2014/main" id="{DB0B8046-6D65-4324-A508-6F926FB842A4}"/>
+              </a:ext>
+            </a:extLst>
+          </p:cNvPr>
+          <p:cNvPicPr>
+            <a:picLocks noChangeAspect="1"/>
+          </p:cNvPicPr>
+          <p:nvPr/>
+        </p:nvPicPr>
+        <p:blipFill>
+          <a:blip r:embed="rId4">
+            <a:extLst>
+              <a:ext uri="{28A0092B-C50C-407E-A947-70E740481C1C}">
+                <a14:useLocalDpi xmlns:a14="http://schemas.microsoft.com/office/drawing/2010/main" val="0"/>
+              </a:ext>
+            </a:extLst>
+          </a:blip>
+          <a:stretch>
+            <a:fillRect/>
+          </a:stretch>
+        </p:blipFill>
+        <p:spPr>
+          <a:xfrm>
+            <a:off x="8194419" y="9154629"/>
+            <a:ext cx="1305432" cy="2683725"/>
+          </a:xfrm>
+          <a:prstGeom prst="rect">
+            <a:avLst/>
+          </a:prstGeom>
+        </p:spPr>
+      </p:pic>
+      <p:sp>
+        <p:nvSpPr>
+          <p:cNvPr id="30" name="Left Brace 29">
+            <a:extLst>
+              <a:ext uri="{FF2B5EF4-FFF2-40B4-BE49-F238E27FC236}">
+                <a16:creationId xmlns:a16="http://schemas.microsoft.com/office/drawing/2014/main" id="{3E44B7B7-CD1E-4EE2-B996-8B77D6AE9EF4}"/>
+              </a:ext>
+            </a:extLst>
+          </p:cNvPr>
+          <p:cNvSpPr/>
+          <p:nvPr/>
+        </p:nvSpPr>
+        <p:spPr>
+          <a:xfrm rot="5400000">
+            <a:off x="7727750" y="4618167"/>
+            <a:ext cx="669973" cy="8912806"/>
+          </a:xfrm>
+          <a:prstGeom prst="leftBrace">
+            <a:avLst>
+              <a:gd name="adj1" fmla="val 8333"/>
+              <a:gd name="adj2" fmla="val 51139"/>
+            </a:avLst>
+          </a:prstGeom>
+          <a:ln w="38100">
+            <a:solidFill>
+              <a:schemeClr val="accent4"/>
+            </a:solidFill>
+          </a:ln>
+        </p:spPr>
+        <p:style>
+          <a:lnRef idx="1">
+            <a:schemeClr val="accent1"/>
+          </a:lnRef>
+          <a:fillRef idx="0">
+            <a:schemeClr val="accent1"/>
+          </a:fillRef>
+          <a:effectRef idx="0">
+            <a:schemeClr val="accent1"/>
+          </a:effectRef>
+          <a:fontRef idx="minor">
+            <a:schemeClr val="tx1"/>
+          </a:fontRef>
+        </p:style>
+        <p:txBody>
+          <a:bodyPr rtlCol="0" anchor="ctr"/>
+          <a:lstStyle/>
+          <a:p>
+            <a:pPr algn="ctr"/>
+            <a:endParaRPr lang="en-GB" dirty="0"/>
+          </a:p>
+        </p:txBody>
+      </p:sp>
+      <p:pic>
+        <p:nvPicPr>
+          <p:cNvPr id="39" name="Picture 38">
+            <a:extLst>
+              <a:ext uri="{FF2B5EF4-FFF2-40B4-BE49-F238E27FC236}">
+                <a16:creationId xmlns:a16="http://schemas.microsoft.com/office/drawing/2014/main" id="{5E8338BF-3C0E-4D21-82FF-37CD415C1135}"/>
+              </a:ext>
+            </a:extLst>
+          </p:cNvPr>
+          <p:cNvPicPr>
+            <a:picLocks noChangeAspect="1"/>
+          </p:cNvPicPr>
+          <p:nvPr/>
+        </p:nvPicPr>
+        <p:blipFill>
+          <a:blip r:embed="rId5"/>
+          <a:stretch>
+            <a:fillRect/>
+          </a:stretch>
+        </p:blipFill>
+        <p:spPr>
+          <a:xfrm>
+            <a:off x="3861322" y="12617661"/>
+            <a:ext cx="1363978" cy="675432"/>
+          </a:xfrm>
+          <a:prstGeom prst="rect">
+            <a:avLst/>
+          </a:prstGeom>
+        </p:spPr>
+      </p:pic>
+      <p:sp>
+        <p:nvSpPr>
+          <p:cNvPr id="38" name="Left Brace 37">
+            <a:extLst>
+              <a:ext uri="{FF2B5EF4-FFF2-40B4-BE49-F238E27FC236}">
+                <a16:creationId xmlns:a16="http://schemas.microsoft.com/office/drawing/2014/main" id="{113523E7-4C37-484A-AEB2-5827C7EEAAD4}"/>
+              </a:ext>
+            </a:extLst>
+          </p:cNvPr>
+          <p:cNvSpPr/>
+          <p:nvPr/>
+        </p:nvSpPr>
+        <p:spPr>
+          <a:xfrm rot="5400000">
+            <a:off x="3731496" y="11375223"/>
+            <a:ext cx="669973" cy="2339616"/>
+          </a:xfrm>
+          <a:prstGeom prst="leftBrace">
+            <a:avLst>
+              <a:gd name="adj1" fmla="val 8333"/>
+              <a:gd name="adj2" fmla="val 33218"/>
+            </a:avLst>
+          </a:prstGeom>
+          <a:ln w="38100">
+            <a:solidFill>
+              <a:schemeClr val="accent4"/>
+            </a:solidFill>
+          </a:ln>
+        </p:spPr>
+        <p:style>
+          <a:lnRef idx="1">
+            <a:schemeClr val="accent1"/>
+          </a:lnRef>
+          <a:fillRef idx="0">
+            <a:schemeClr val="accent1"/>
+          </a:fillRef>
+          <a:effectRef idx="0">
+            <a:schemeClr val="accent1"/>
+          </a:effectRef>
+          <a:fontRef idx="minor">
+            <a:schemeClr val="tx1"/>
+          </a:fontRef>
+        </p:style>
+        <p:txBody>
+          <a:bodyPr rtlCol="0" anchor="ctr"/>
+          <a:lstStyle/>
+          <a:p>
+            <a:pPr algn="ctr"/>
+            <a:endParaRPr lang="en-GB" dirty="0"/>
+          </a:p>
+        </p:txBody>
+      </p:sp>
+      <p:pic>
+        <p:nvPicPr>
+          <p:cNvPr id="32" name="Picture 31" descr="A screenshot of a cell phone&#10;&#10;Description automatically generated">
+            <a:extLst>
+              <a:ext uri="{FF2B5EF4-FFF2-40B4-BE49-F238E27FC236}">
+                <a16:creationId xmlns:a16="http://schemas.microsoft.com/office/drawing/2014/main" id="{F26DFA87-DB02-40BE-B78D-D52C12BB164C}"/>
+              </a:ext>
+            </a:extLst>
+          </p:cNvPr>
+          <p:cNvPicPr>
+            <a:picLocks noChangeAspect="1"/>
+          </p:cNvPicPr>
+          <p:nvPr/>
+        </p:nvPicPr>
+        <p:blipFill>
+          <a:blip r:embed="rId6">
+            <a:extLst>
+              <a:ext uri="{28A0092B-C50C-407E-A947-70E740481C1C}">
+                <a14:useLocalDpi xmlns:a14="http://schemas.microsoft.com/office/drawing/2010/main" val="0"/>
+              </a:ext>
+            </a:extLst>
+          </a:blip>
+          <a:stretch>
+            <a:fillRect/>
+          </a:stretch>
+        </p:blipFill>
+        <p:spPr>
+          <a:xfrm>
+            <a:off x="2279724" y="10757819"/>
+            <a:ext cx="4633285" cy="1962932"/>
+          </a:xfrm>
+          <a:prstGeom prst="rect">
+            <a:avLst/>
+          </a:prstGeom>
+        </p:spPr>
+      </p:pic>
+      <p:sp>
+        <p:nvSpPr>
+          <p:cNvPr id="36" name="Left Brace 35">
+            <a:extLst>
+              <a:ext uri="{FF2B5EF4-FFF2-40B4-BE49-F238E27FC236}">
+                <a16:creationId xmlns:a16="http://schemas.microsoft.com/office/drawing/2014/main" id="{A031CF25-C2FD-4ED8-9178-17403CC0C15B}"/>
+              </a:ext>
+            </a:extLst>
+          </p:cNvPr>
+          <p:cNvSpPr/>
+          <p:nvPr/>
+        </p:nvSpPr>
+        <p:spPr>
+          <a:xfrm rot="5400000">
+            <a:off x="4218219" y="8390854"/>
+            <a:ext cx="669973" cy="4633286"/>
+          </a:xfrm>
+          <a:prstGeom prst="leftBrace">
+            <a:avLst>
+              <a:gd name="adj1" fmla="val 8333"/>
+              <a:gd name="adj2" fmla="val 25586"/>
+            </a:avLst>
+          </a:prstGeom>
+          <a:ln w="38100">
+            <a:solidFill>
+              <a:schemeClr val="accent4"/>
+            </a:solidFill>
+          </a:ln>
+        </p:spPr>
+        <p:style>
+          <a:lnRef idx="1">
+            <a:schemeClr val="accent1"/>
+          </a:lnRef>
+          <a:fillRef idx="0">
+            <a:schemeClr val="accent1"/>
+          </a:fillRef>
+          <a:effectRef idx="0">
+            <a:schemeClr val="accent1"/>
+          </a:effectRef>
+          <a:fontRef idx="minor">
+            <a:schemeClr val="tx1"/>
+          </a:fontRef>
+        </p:style>
+        <p:txBody>
+          <a:bodyPr rtlCol="0" anchor="ctr"/>
+          <a:lstStyle/>
+          <a:p>
+            <a:pPr algn="ctr"/>
+            <a:endParaRPr lang="en-GB" dirty="0"/>
+          </a:p>
+        </p:txBody>
+      </p:sp>
+      <p:sp>
+        <p:nvSpPr>
+          <p:cNvPr id="15" name="Left Brace 14">
+            <a:extLst>
+              <a:ext uri="{FF2B5EF4-FFF2-40B4-BE49-F238E27FC236}">
+                <a16:creationId xmlns:a16="http://schemas.microsoft.com/office/drawing/2014/main" id="{E4F55F19-6D3D-40FC-9579-C24CDFA3E5B6}"/>
+              </a:ext>
+            </a:extLst>
+          </p:cNvPr>
+          <p:cNvSpPr/>
+          <p:nvPr/>
+        </p:nvSpPr>
+        <p:spPr>
+          <a:xfrm rot="5400000">
+            <a:off x="8914497" y="1336443"/>
+            <a:ext cx="508102" cy="4546963"/>
+          </a:xfrm>
+          <a:prstGeom prst="leftBrace">
+            <a:avLst>
+              <a:gd name="adj1" fmla="val 8333"/>
+              <a:gd name="adj2" fmla="val 86241"/>
+            </a:avLst>
+          </a:prstGeom>
+          <a:ln w="38100">
+            <a:solidFill>
+              <a:schemeClr val="accent4"/>
+            </a:solidFill>
+          </a:ln>
+        </p:spPr>
+        <p:style>
+          <a:lnRef idx="1">
+            <a:schemeClr val="accent1"/>
+          </a:lnRef>
+          <a:fillRef idx="0">
+            <a:schemeClr val="accent1"/>
+          </a:fillRef>
+          <a:effectRef idx="0">
+            <a:schemeClr val="accent1"/>
+          </a:effectRef>
+          <a:fontRef idx="minor">
+            <a:schemeClr val="tx1"/>
+          </a:fontRef>
+        </p:style>
+        <p:txBody>
+          <a:bodyPr rtlCol="0" anchor="ctr"/>
+          <a:lstStyle/>
+          <a:p>
+            <a:pPr algn="ctr"/>
+            <a:endParaRPr lang="en-GB" dirty="0"/>
+          </a:p>
+        </p:txBody>
+      </p:sp>
+      <p:pic>
+        <p:nvPicPr>
+          <p:cNvPr id="13" name="Picture 12" descr="A screenshot of a cell phone&#10;&#10;Description automatically generated">
+            <a:extLst>
+              <a:ext uri="{FF2B5EF4-FFF2-40B4-BE49-F238E27FC236}">
+                <a16:creationId xmlns:a16="http://schemas.microsoft.com/office/drawing/2014/main" id="{7860A320-08A3-4062-A05C-E92AEB629F67}"/>
+              </a:ext>
+            </a:extLst>
+          </p:cNvPr>
+          <p:cNvPicPr>
+            <a:picLocks noChangeAspect="1"/>
+          </p:cNvPicPr>
+          <p:nvPr/>
+        </p:nvPicPr>
+        <p:blipFill>
+          <a:blip r:embed="rId7">
+            <a:extLst>
+              <a:ext uri="{28A0092B-C50C-407E-A947-70E740481C1C}">
+                <a14:useLocalDpi xmlns:a14="http://schemas.microsoft.com/office/drawing/2010/main" val="0"/>
+              </a:ext>
+            </a:extLst>
+          </a:blip>
+          <a:stretch>
+            <a:fillRect/>
+          </a:stretch>
+        </p:blipFill>
+        <p:spPr>
+          <a:xfrm>
+            <a:off x="1992519" y="1801139"/>
+            <a:ext cx="7839515" cy="2293856"/>
+          </a:xfrm>
+          <a:prstGeom prst="rect">
+            <a:avLst/>
+          </a:prstGeom>
+        </p:spPr>
+      </p:pic>
+      <p:cxnSp>
+        <p:nvCxnSpPr>
+          <p:cNvPr id="8" name="Straight Connector 7">
+            <a:extLst>
+              <a:ext uri="{FF2B5EF4-FFF2-40B4-BE49-F238E27FC236}">
+                <a16:creationId xmlns:a16="http://schemas.microsoft.com/office/drawing/2014/main" id="{B3C21FE1-62D5-40B2-8293-E02C7F95F45F}"/>
+              </a:ext>
+            </a:extLst>
+          </p:cNvPr>
+          <p:cNvCxnSpPr>
+            <a:cxnSpLocks/>
+          </p:cNvCxnSpPr>
+          <p:nvPr/>
+        </p:nvCxnSpPr>
+        <p:spPr>
+          <a:xfrm>
+            <a:off x="98232" y="1603092"/>
+            <a:ext cx="12420908" cy="0"/>
+          </a:xfrm>
+          <a:prstGeom prst="line">
+            <a:avLst/>
+          </a:prstGeom>
+          <a:ln w="57150">
+            <a:solidFill>
+              <a:schemeClr val="bg1">
+                <a:lumMod val="50000"/>
+              </a:schemeClr>
+            </a:solidFill>
+            <a:prstDash val="sysDot"/>
+          </a:ln>
+        </p:spPr>
+        <p:style>
+          <a:lnRef idx="1">
+            <a:schemeClr val="accent1"/>
+          </a:lnRef>
+          <a:fillRef idx="0">
+            <a:schemeClr val="accent1"/>
+          </a:fillRef>
+          <a:effectRef idx="0">
+            <a:schemeClr val="accent1"/>
+          </a:effectRef>
+          <a:fontRef idx="minor">
+            <a:schemeClr val="tx1"/>
+          </a:fontRef>
+        </p:style>
+      </p:cxnSp>
+      <p:cxnSp>
+        <p:nvCxnSpPr>
+          <p:cNvPr id="18" name="Straight Connector 17">
+            <a:extLst>
+              <a:ext uri="{FF2B5EF4-FFF2-40B4-BE49-F238E27FC236}">
+                <a16:creationId xmlns:a16="http://schemas.microsoft.com/office/drawing/2014/main" id="{38FE55ED-9890-448D-B9B6-36A3574E90DB}"/>
+              </a:ext>
+            </a:extLst>
+          </p:cNvPr>
+          <p:cNvCxnSpPr>
+            <a:cxnSpLocks/>
+          </p:cNvCxnSpPr>
+          <p:nvPr/>
+        </p:nvCxnSpPr>
+        <p:spPr>
+          <a:xfrm>
+            <a:off x="98232" y="4466792"/>
+            <a:ext cx="12420908" cy="0"/>
+          </a:xfrm>
+          <a:prstGeom prst="line">
+            <a:avLst/>
+          </a:prstGeom>
+          <a:ln w="57150">
+            <a:solidFill>
+              <a:schemeClr val="bg1">
+                <a:lumMod val="50000"/>
+              </a:schemeClr>
+            </a:solidFill>
+            <a:prstDash val="sysDot"/>
+          </a:ln>
+        </p:spPr>
+        <p:style>
+          <a:lnRef idx="1">
+            <a:schemeClr val="accent1"/>
+          </a:lnRef>
+          <a:fillRef idx="0">
+            <a:schemeClr val="accent1"/>
+          </a:fillRef>
+          <a:effectRef idx="0">
+            <a:schemeClr val="accent1"/>
+          </a:effectRef>
+          <a:fontRef idx="minor">
+            <a:schemeClr val="tx1"/>
+          </a:fontRef>
+        </p:style>
+      </p:cxnSp>
+      <p:sp>
+        <p:nvSpPr>
+          <p:cNvPr id="14" name="Left Brace 13">
+            <a:extLst>
+              <a:ext uri="{FF2B5EF4-FFF2-40B4-BE49-F238E27FC236}">
+                <a16:creationId xmlns:a16="http://schemas.microsoft.com/office/drawing/2014/main" id="{21CB80A6-2177-4740-A5FA-B2FC1E8D547F}"/>
+              </a:ext>
+            </a:extLst>
+          </p:cNvPr>
+          <p:cNvSpPr/>
+          <p:nvPr/>
+        </p:nvSpPr>
+        <p:spPr>
+          <a:xfrm rot="5400000">
+            <a:off x="5577287" y="-2195662"/>
+            <a:ext cx="669973" cy="7839514"/>
+          </a:xfrm>
+          <a:prstGeom prst="leftBrace">
+            <a:avLst>
+              <a:gd name="adj1" fmla="val 8333"/>
+              <a:gd name="adj2" fmla="val 53531"/>
+            </a:avLst>
+          </a:prstGeom>
+          <a:ln w="38100">
+            <a:solidFill>
+              <a:schemeClr val="accent4"/>
+            </a:solidFill>
+          </a:ln>
+        </p:spPr>
+        <p:style>
+          <a:lnRef idx="1">
+            <a:schemeClr val="accent1"/>
+          </a:lnRef>
+          <a:fillRef idx="0">
+            <a:schemeClr val="accent1"/>
+          </a:fillRef>
+          <a:effectRef idx="0">
+            <a:schemeClr val="accent1"/>
+          </a:effectRef>
+          <a:fontRef idx="minor">
+            <a:schemeClr val="tx1"/>
+          </a:fontRef>
+        </p:style>
+        <p:txBody>
+          <a:bodyPr rtlCol="0" anchor="ctr"/>
+          <a:lstStyle/>
+          <a:p>
+            <a:pPr algn="ctr"/>
+            <a:endParaRPr lang="en-GB" dirty="0"/>
+          </a:p>
+        </p:txBody>
+      </p:sp>
+      <p:sp>
+        <p:nvSpPr>
+          <p:cNvPr id="10" name="Left Brace 9">
+            <a:extLst>
+              <a:ext uri="{FF2B5EF4-FFF2-40B4-BE49-F238E27FC236}">
+                <a16:creationId xmlns:a16="http://schemas.microsoft.com/office/drawing/2014/main" id="{D9BAFF37-C112-4618-A993-30FC9730AEDC}"/>
+              </a:ext>
+            </a:extLst>
+          </p:cNvPr>
+          <p:cNvSpPr/>
+          <p:nvPr/>
+        </p:nvSpPr>
+        <p:spPr>
+          <a:xfrm rot="5400000">
+            <a:off x="9234639" y="3129262"/>
+            <a:ext cx="669973" cy="2944717"/>
+          </a:xfrm>
+          <a:prstGeom prst="leftBrace">
+            <a:avLst>
+              <a:gd name="adj1" fmla="val 8333"/>
+              <a:gd name="adj2" fmla="val 10624"/>
+            </a:avLst>
+          </a:prstGeom>
+          <a:ln w="38100">
+            <a:solidFill>
+              <a:schemeClr val="accent4"/>
+            </a:solidFill>
+          </a:ln>
+        </p:spPr>
+        <p:style>
+          <a:lnRef idx="1">
+            <a:schemeClr val="accent1"/>
+          </a:lnRef>
+          <a:fillRef idx="0">
+            <a:schemeClr val="accent1"/>
+          </a:fillRef>
+          <a:effectRef idx="0">
+            <a:schemeClr val="accent1"/>
+          </a:effectRef>
+          <a:fontRef idx="minor">
+            <a:schemeClr val="tx1"/>
+          </a:fontRef>
+        </p:style>
+        <p:txBody>
+          <a:bodyPr rtlCol="0" anchor="ctr"/>
+          <a:lstStyle/>
+          <a:p>
+            <a:pPr algn="ctr"/>
+            <a:endParaRPr lang="en-GB" dirty="0"/>
+          </a:p>
+        </p:txBody>
+      </p:sp>
+      <p:pic>
+        <p:nvPicPr>
+          <p:cNvPr id="2" name="Picture 1">
+            <a:extLst>
+              <a:ext uri="{FF2B5EF4-FFF2-40B4-BE49-F238E27FC236}">
+                <a16:creationId xmlns:a16="http://schemas.microsoft.com/office/drawing/2014/main" id="{36CE73C9-BA77-4ECA-AA16-858684EEB8DD}"/>
+              </a:ext>
+            </a:extLst>
+          </p:cNvPr>
+          <p:cNvPicPr>
+            <a:picLocks noChangeAspect="1"/>
+          </p:cNvPicPr>
+          <p:nvPr/>
+        </p:nvPicPr>
+        <p:blipFill>
+          <a:blip r:embed="rId8"/>
+          <a:stretch>
+            <a:fillRect/>
+          </a:stretch>
+        </p:blipFill>
+        <p:spPr>
+          <a:xfrm>
+            <a:off x="98228" y="88352"/>
+            <a:ext cx="892528" cy="579404"/>
+          </a:xfrm>
+          <a:prstGeom prst="rect">
+            <a:avLst/>
+          </a:prstGeom>
+        </p:spPr>
+      </p:pic>
+      <p:pic>
+        <p:nvPicPr>
+          <p:cNvPr id="3" name="Picture 2">
+            <a:extLst>
+              <a:ext uri="{FF2B5EF4-FFF2-40B4-BE49-F238E27FC236}">
+                <a16:creationId xmlns:a16="http://schemas.microsoft.com/office/drawing/2014/main" id="{BAC2FA6D-7E44-4A70-ABBF-441AC58C61D8}"/>
+              </a:ext>
+            </a:extLst>
+          </p:cNvPr>
+          <p:cNvPicPr>
+            <a:picLocks noChangeAspect="1"/>
+          </p:cNvPicPr>
+          <p:nvPr/>
+        </p:nvPicPr>
+        <p:blipFill>
+          <a:blip r:embed="rId9"/>
+          <a:stretch>
+            <a:fillRect/>
+          </a:stretch>
+        </p:blipFill>
+        <p:spPr>
+          <a:xfrm>
+            <a:off x="98228" y="1727119"/>
+            <a:ext cx="892528" cy="586800"/>
+          </a:xfrm>
+          <a:prstGeom prst="rect">
+            <a:avLst/>
+          </a:prstGeom>
+        </p:spPr>
+      </p:pic>
+      <p:pic>
+        <p:nvPicPr>
+          <p:cNvPr id="4" name="Picture 3">
+            <a:extLst>
+              <a:ext uri="{FF2B5EF4-FFF2-40B4-BE49-F238E27FC236}">
+                <a16:creationId xmlns:a16="http://schemas.microsoft.com/office/drawing/2014/main" id="{FB95A457-1250-418F-8752-3AD3D6CA1CBF}"/>
+              </a:ext>
+            </a:extLst>
+          </p:cNvPr>
+          <p:cNvPicPr>
+            <a:picLocks noChangeAspect="1"/>
+          </p:cNvPicPr>
+          <p:nvPr/>
+        </p:nvPicPr>
+        <p:blipFill>
+          <a:blip r:embed="rId10"/>
+          <a:stretch>
+            <a:fillRect/>
+          </a:stretch>
+        </p:blipFill>
+        <p:spPr>
+          <a:xfrm>
+            <a:off x="98228" y="4558756"/>
+            <a:ext cx="892528" cy="586800"/>
+          </a:xfrm>
+          <a:prstGeom prst="rect">
+            <a:avLst/>
+          </a:prstGeom>
+        </p:spPr>
+      </p:pic>
+      <p:sp>
+        <p:nvSpPr>
+          <p:cNvPr id="23" name="TextBox 22">
+            <a:extLst>
+              <a:ext uri="{FF2B5EF4-FFF2-40B4-BE49-F238E27FC236}">
+                <a16:creationId xmlns:a16="http://schemas.microsoft.com/office/drawing/2014/main" id="{06F8B482-C37F-4E4C-9FB0-942BA9C3D5D1}"/>
+              </a:ext>
+            </a:extLst>
+          </p:cNvPr>
+          <p:cNvSpPr txBox="1"/>
+          <p:nvPr/>
+        </p:nvSpPr>
+        <p:spPr>
+          <a:xfrm>
+            <a:off x="990756" y="153425"/>
+            <a:ext cx="1813060" cy="707886"/>
+          </a:xfrm>
+          <a:prstGeom prst="rect">
+            <a:avLst/>
+          </a:prstGeom>
+          <a:noFill/>
+        </p:spPr>
+        <p:txBody>
+          <a:bodyPr wrap="none" rtlCol="0">
+            <a:spAutoFit/>
+          </a:bodyPr>
+          <a:lstStyle/>
+          <a:p>
+            <a:r>
+              <a:rPr lang="en-US" sz="2400" b="1" dirty="0"/>
+              <a:t>Grandparent</a:t>
+            </a:r>
+          </a:p>
+          <a:p>
+            <a:r>
+              <a:rPr lang="en-US" sz="1600" b="1" dirty="0">
+                <a:solidFill>
+                  <a:schemeClr val="bg1">
+                    <a:lumMod val="75000"/>
+                  </a:schemeClr>
+                </a:solidFill>
+              </a:rPr>
+              <a:t>(optional)</a:t>
+            </a:r>
+            <a:endParaRPr lang="en-GB" sz="1600" b="1" dirty="0">
+              <a:solidFill>
+                <a:schemeClr val="bg1">
+                  <a:lumMod val="75000"/>
+                </a:schemeClr>
+              </a:solidFill>
+            </a:endParaRPr>
+          </a:p>
+        </p:txBody>
+      </p:sp>
+      <p:sp>
+        <p:nvSpPr>
+          <p:cNvPr id="24" name="TextBox 23">
+            <a:extLst>
+              <a:ext uri="{FF2B5EF4-FFF2-40B4-BE49-F238E27FC236}">
+                <a16:creationId xmlns:a16="http://schemas.microsoft.com/office/drawing/2014/main" id="{2B1D7642-1297-4FF4-AC1C-9E90A1648238}"/>
+              </a:ext>
+            </a:extLst>
+          </p:cNvPr>
+          <p:cNvSpPr txBox="1"/>
+          <p:nvPr/>
+        </p:nvSpPr>
+        <p:spPr>
+          <a:xfrm>
+            <a:off x="967429" y="1789691"/>
+            <a:ext cx="1025089" cy="461665"/>
+          </a:xfrm>
+          <a:prstGeom prst="rect">
+            <a:avLst/>
+          </a:prstGeom>
+          <a:noFill/>
+        </p:spPr>
+        <p:txBody>
+          <a:bodyPr wrap="none" rtlCol="0">
+            <a:spAutoFit/>
+          </a:bodyPr>
+          <a:lstStyle/>
+          <a:p>
+            <a:r>
+              <a:rPr lang="en-US" sz="2400" b="1" dirty="0"/>
+              <a:t>Parent</a:t>
+            </a:r>
+            <a:endParaRPr lang="en-GB" sz="2400" b="1" dirty="0"/>
+          </a:p>
+        </p:txBody>
+      </p:sp>
+      <p:sp>
+        <p:nvSpPr>
+          <p:cNvPr id="25" name="TextBox 24">
+            <a:extLst>
+              <a:ext uri="{FF2B5EF4-FFF2-40B4-BE49-F238E27FC236}">
+                <a16:creationId xmlns:a16="http://schemas.microsoft.com/office/drawing/2014/main" id="{6B7827E1-5A9B-4381-BD48-FF1E8075FB93}"/>
+              </a:ext>
+            </a:extLst>
+          </p:cNvPr>
+          <p:cNvSpPr txBox="1"/>
+          <p:nvPr/>
+        </p:nvSpPr>
+        <p:spPr>
+          <a:xfrm>
+            <a:off x="968111" y="4621329"/>
+            <a:ext cx="829073" cy="461665"/>
+          </a:xfrm>
+          <a:prstGeom prst="rect">
+            <a:avLst/>
+          </a:prstGeom>
+          <a:noFill/>
+        </p:spPr>
+        <p:txBody>
+          <a:bodyPr wrap="none" rtlCol="0">
+            <a:spAutoFit/>
+          </a:bodyPr>
+          <a:lstStyle/>
+          <a:p>
+            <a:r>
+              <a:rPr lang="en-US" sz="2400" b="1" dirty="0"/>
+              <a:t>Child</a:t>
+            </a:r>
+            <a:endParaRPr lang="en-GB" sz="2400" b="1" dirty="0"/>
+          </a:p>
+        </p:txBody>
+      </p:sp>
+      <p:sp>
+        <p:nvSpPr>
+          <p:cNvPr id="6" name="TextBox 5">
+            <a:extLst>
+              <a:ext uri="{FF2B5EF4-FFF2-40B4-BE49-F238E27FC236}">
+                <a16:creationId xmlns:a16="http://schemas.microsoft.com/office/drawing/2014/main" id="{17F8A168-3F01-42AA-ACD1-52226D338250}"/>
+              </a:ext>
+            </a:extLst>
+          </p:cNvPr>
+          <p:cNvSpPr txBox="1"/>
+          <p:nvPr/>
+        </p:nvSpPr>
+        <p:spPr>
+          <a:xfrm>
+            <a:off x="11621397" y="-723"/>
+            <a:ext cx="588623" cy="369332"/>
+          </a:xfrm>
+          <a:prstGeom prst="rect">
+            <a:avLst/>
+          </a:prstGeom>
+          <a:noFill/>
+        </p:spPr>
+        <p:txBody>
+          <a:bodyPr wrap="none" rtlCol="0">
+            <a:spAutoFit/>
+          </a:bodyPr>
+          <a:lstStyle/>
+          <a:p>
+            <a:r>
+              <a:rPr lang="en-GB" b="1" dirty="0"/>
+              <a:t>v1.7</a:t>
+            </a:r>
+          </a:p>
+        </p:txBody>
+      </p:sp>
+      <p:pic>
+        <p:nvPicPr>
+          <p:cNvPr id="5" name="Picture 4" descr="A screenshot of a cell phone&#10;&#10;Description automatically generated">
+            <a:extLst>
+              <a:ext uri="{FF2B5EF4-FFF2-40B4-BE49-F238E27FC236}">
+                <a16:creationId xmlns:a16="http://schemas.microsoft.com/office/drawing/2014/main" id="{9D5DA8E3-64DB-4086-90D5-4957AE971C73}"/>
+              </a:ext>
+            </a:extLst>
+          </p:cNvPr>
+          <p:cNvPicPr>
+            <a:picLocks noChangeAspect="1"/>
+          </p:cNvPicPr>
+          <p:nvPr/>
+        </p:nvPicPr>
+        <p:blipFill>
+          <a:blip r:embed="rId11">
+            <a:extLst>
+              <a:ext uri="{28A0092B-C50C-407E-A947-70E740481C1C}">
+                <a14:useLocalDpi xmlns:a14="http://schemas.microsoft.com/office/drawing/2010/main" val="0"/>
+              </a:ext>
+            </a:extLst>
+          </a:blip>
+          <a:stretch>
+            <a:fillRect/>
+          </a:stretch>
+        </p:blipFill>
+        <p:spPr>
+          <a:xfrm>
+            <a:off x="3030363" y="32072"/>
+            <a:ext cx="6699512" cy="1527060"/>
+          </a:xfrm>
+          <a:prstGeom prst="rect">
+            <a:avLst/>
+          </a:prstGeom>
+        </p:spPr>
+      </p:pic>
+      <p:pic>
+        <p:nvPicPr>
+          <p:cNvPr id="16" name="Picture 15">
+            <a:extLst>
+              <a:ext uri="{FF2B5EF4-FFF2-40B4-BE49-F238E27FC236}">
+                <a16:creationId xmlns:a16="http://schemas.microsoft.com/office/drawing/2014/main" id="{F24BA0AF-BC82-4B39-B34F-61FA814CDF4F}"/>
+              </a:ext>
+            </a:extLst>
+          </p:cNvPr>
+          <p:cNvPicPr>
+            <a:picLocks noChangeAspect="1"/>
+          </p:cNvPicPr>
+          <p:nvPr/>
+        </p:nvPicPr>
+        <p:blipFill>
+          <a:blip r:embed="rId12"/>
+          <a:stretch>
+            <a:fillRect/>
+          </a:stretch>
+        </p:blipFill>
+        <p:spPr>
+          <a:xfrm>
+            <a:off x="9787025" y="9462571"/>
+            <a:ext cx="1281782" cy="628684"/>
+          </a:xfrm>
+          <a:prstGeom prst="rect">
+            <a:avLst/>
+          </a:prstGeom>
+        </p:spPr>
+      </p:pic>
+      <p:pic>
+        <p:nvPicPr>
+          <p:cNvPr id="22" name="Picture 21">
+            <a:extLst>
+              <a:ext uri="{FF2B5EF4-FFF2-40B4-BE49-F238E27FC236}">
+                <a16:creationId xmlns:a16="http://schemas.microsoft.com/office/drawing/2014/main" id="{363DAB9F-0C05-4E7F-85D5-DC404795DA15}"/>
+              </a:ext>
+            </a:extLst>
+          </p:cNvPr>
+          <p:cNvPicPr>
+            <a:picLocks noChangeAspect="1"/>
+          </p:cNvPicPr>
+          <p:nvPr/>
+        </p:nvPicPr>
+        <p:blipFill>
+          <a:blip r:embed="rId13"/>
+          <a:stretch>
+            <a:fillRect/>
+          </a:stretch>
+        </p:blipFill>
+        <p:spPr>
+          <a:xfrm>
+            <a:off x="9787026" y="10285895"/>
+            <a:ext cx="1295931" cy="626469"/>
+          </a:xfrm>
+          <a:prstGeom prst="rect">
+            <a:avLst/>
+          </a:prstGeom>
+        </p:spPr>
+      </p:pic>
+      <p:sp>
+        <p:nvSpPr>
+          <p:cNvPr id="27" name="TextBox 26">
+            <a:extLst>
+              <a:ext uri="{FF2B5EF4-FFF2-40B4-BE49-F238E27FC236}">
+                <a16:creationId xmlns:a16="http://schemas.microsoft.com/office/drawing/2014/main" id="{7D5378B2-2ACB-40F2-81F0-5133D5E3A132}"/>
+              </a:ext>
+            </a:extLst>
+          </p:cNvPr>
+          <p:cNvSpPr txBox="1"/>
+          <p:nvPr/>
+        </p:nvSpPr>
+        <p:spPr>
+          <a:xfrm>
+            <a:off x="8359662" y="10034381"/>
+            <a:ext cx="974947" cy="369332"/>
+          </a:xfrm>
+          <a:prstGeom prst="rect">
+            <a:avLst/>
+          </a:prstGeom>
+          <a:noFill/>
+        </p:spPr>
+        <p:txBody>
+          <a:bodyPr wrap="none" rtlCol="0">
+            <a:spAutoFit/>
+          </a:bodyPr>
+          <a:lstStyle/>
+          <a:p>
+            <a:r>
+              <a:rPr lang="en-GB" dirty="0"/>
+              <a:t>@{Case}</a:t>
+            </a:r>
+          </a:p>
+        </p:txBody>
+      </p:sp>
+      <p:pic>
+        <p:nvPicPr>
+          <p:cNvPr id="9" name="Picture 8">
+            <a:extLst>
+              <a:ext uri="{FF2B5EF4-FFF2-40B4-BE49-F238E27FC236}">
+                <a16:creationId xmlns:a16="http://schemas.microsoft.com/office/drawing/2014/main" id="{830ECE33-9E5F-4091-9D12-99B9CAA53606}"/>
+              </a:ext>
+            </a:extLst>
+          </p:cNvPr>
+          <p:cNvPicPr>
+            <a:picLocks noChangeAspect="1"/>
+          </p:cNvPicPr>
+          <p:nvPr/>
+        </p:nvPicPr>
+        <p:blipFill>
+          <a:blip r:embed="rId14"/>
+          <a:stretch>
+            <a:fillRect/>
+          </a:stretch>
+        </p:blipFill>
+        <p:spPr>
+          <a:xfrm>
+            <a:off x="6963840" y="3692954"/>
+            <a:ext cx="4449616" cy="641100"/>
+          </a:xfrm>
+          <a:prstGeom prst="rect">
+            <a:avLst/>
+          </a:prstGeom>
+        </p:spPr>
+      </p:pic>
+      <p:cxnSp>
+        <p:nvCxnSpPr>
+          <p:cNvPr id="28" name="Straight Connector 27">
+            <a:extLst>
+              <a:ext uri="{FF2B5EF4-FFF2-40B4-BE49-F238E27FC236}">
+                <a16:creationId xmlns:a16="http://schemas.microsoft.com/office/drawing/2014/main" id="{ECB87505-EE27-4221-BABC-E83F318564FE}"/>
+              </a:ext>
+            </a:extLst>
+          </p:cNvPr>
+          <p:cNvCxnSpPr>
+            <a:cxnSpLocks/>
+          </p:cNvCxnSpPr>
+          <p:nvPr/>
+        </p:nvCxnSpPr>
+        <p:spPr>
+          <a:xfrm>
+            <a:off x="98229" y="8925740"/>
+            <a:ext cx="12456091" cy="0"/>
+          </a:xfrm>
+          <a:prstGeom prst="line">
+            <a:avLst/>
+          </a:prstGeom>
+          <a:ln w="57150">
+            <a:solidFill>
+              <a:schemeClr val="bg1">
+                <a:lumMod val="50000"/>
+              </a:schemeClr>
+            </a:solidFill>
+            <a:prstDash val="sysDot"/>
+          </a:ln>
+        </p:spPr>
+        <p:style>
+          <a:lnRef idx="1">
+            <a:schemeClr val="accent1"/>
+          </a:lnRef>
+          <a:fillRef idx="0">
+            <a:schemeClr val="accent1"/>
+          </a:fillRef>
+          <a:effectRef idx="0">
+            <a:schemeClr val="accent1"/>
+          </a:effectRef>
+          <a:fontRef idx="minor">
+            <a:schemeClr val="tx1"/>
+          </a:fontRef>
+        </p:style>
+      </p:cxnSp>
+      <p:sp>
+        <p:nvSpPr>
+          <p:cNvPr id="37" name="TextBox 36">
+            <a:extLst>
+              <a:ext uri="{FF2B5EF4-FFF2-40B4-BE49-F238E27FC236}">
+                <a16:creationId xmlns:a16="http://schemas.microsoft.com/office/drawing/2014/main" id="{6F1134F0-B278-42E9-8045-C82105634470}"/>
+              </a:ext>
+            </a:extLst>
+          </p:cNvPr>
+          <p:cNvSpPr txBox="1"/>
+          <p:nvPr/>
+        </p:nvSpPr>
+        <p:spPr>
+          <a:xfrm>
+            <a:off x="2888929" y="12794564"/>
+            <a:ext cx="1003993" cy="369332"/>
+          </a:xfrm>
+          <a:prstGeom prst="rect">
+            <a:avLst/>
+          </a:prstGeom>
+          <a:noFill/>
+        </p:spPr>
+        <p:txBody>
+          <a:bodyPr wrap="none" rtlCol="0">
+            <a:spAutoFit/>
+          </a:bodyPr>
+          <a:lstStyle/>
+          <a:p>
+            <a:r>
+              <a:rPr lang="en-GB" dirty="0"/>
+              <a:t>@{False}</a:t>
+            </a:r>
+          </a:p>
+        </p:txBody>
+      </p:sp>
+      <p:pic>
+        <p:nvPicPr>
+          <p:cNvPr id="40" name="Picture 39">
+            <a:extLst>
+              <a:ext uri="{FF2B5EF4-FFF2-40B4-BE49-F238E27FC236}">
+                <a16:creationId xmlns:a16="http://schemas.microsoft.com/office/drawing/2014/main" id="{4DAF1527-CD65-4AB9-828A-1ED6FE0D86D7}"/>
+              </a:ext>
+            </a:extLst>
+          </p:cNvPr>
+          <p:cNvPicPr>
+            <a:picLocks noChangeAspect="1"/>
+          </p:cNvPicPr>
+          <p:nvPr/>
+        </p:nvPicPr>
+        <p:blipFill>
+          <a:blip r:embed="rId15"/>
+          <a:stretch>
+            <a:fillRect/>
+          </a:stretch>
+        </p:blipFill>
+        <p:spPr>
+          <a:xfrm>
+            <a:off x="80849" y="9048816"/>
+            <a:ext cx="927286" cy="600309"/>
+          </a:xfrm>
+          <a:prstGeom prst="rect">
+            <a:avLst/>
+          </a:prstGeom>
+        </p:spPr>
+      </p:pic>
+      <p:sp>
+        <p:nvSpPr>
+          <p:cNvPr id="41" name="TextBox 40">
+            <a:extLst>
+              <a:ext uri="{FF2B5EF4-FFF2-40B4-BE49-F238E27FC236}">
+                <a16:creationId xmlns:a16="http://schemas.microsoft.com/office/drawing/2014/main" id="{E5D01E17-60FE-405E-8FC1-C403C23EA74D}"/>
+              </a:ext>
+            </a:extLst>
+          </p:cNvPr>
+          <p:cNvSpPr txBox="1"/>
+          <p:nvPr/>
+        </p:nvSpPr>
+        <p:spPr>
+          <a:xfrm>
+            <a:off x="990756" y="9118137"/>
+            <a:ext cx="944618" cy="461665"/>
+          </a:xfrm>
+          <a:prstGeom prst="rect">
+            <a:avLst/>
+          </a:prstGeom>
+          <a:noFill/>
+        </p:spPr>
+        <p:txBody>
+          <a:bodyPr wrap="none" rtlCol="0">
+            <a:spAutoFit/>
+          </a:bodyPr>
+          <a:lstStyle/>
+          <a:p>
+            <a:r>
+              <a:rPr lang="en-US" sz="2400" b="1" dirty="0"/>
+              <a:t>Infant</a:t>
+            </a:r>
+            <a:endParaRPr lang="en-GB" sz="2400" b="1" dirty="0"/>
+          </a:p>
+        </p:txBody>
+      </p:sp>
+      <p:pic>
+        <p:nvPicPr>
+          <p:cNvPr id="11" name="Picture 10" descr="A screenshot of a cell phone&#10;&#10;Description automatically generated">
+            <a:extLst>
+              <a:ext uri="{FF2B5EF4-FFF2-40B4-BE49-F238E27FC236}">
+                <a16:creationId xmlns:a16="http://schemas.microsoft.com/office/drawing/2014/main" id="{57191F3E-170B-4F81-A7D6-7D0954D05196}"/>
+              </a:ext>
+            </a:extLst>
+          </p:cNvPr>
+          <p:cNvPicPr>
+            <a:picLocks noChangeAspect="1"/>
+          </p:cNvPicPr>
+          <p:nvPr/>
+        </p:nvPicPr>
+        <p:blipFill rotWithShape="1">
+          <a:blip r:embed="rId16">
+            <a:extLst>
+              <a:ext uri="{28A0092B-C50C-407E-A947-70E740481C1C}">
+                <a14:useLocalDpi xmlns:a14="http://schemas.microsoft.com/office/drawing/2010/main" val="0"/>
+              </a:ext>
+            </a:extLst>
+          </a:blip>
+          <a:srcRect r="22126"/>
+          <a:stretch/>
+        </p:blipFill>
+        <p:spPr>
+          <a:xfrm>
+            <a:off x="3638137" y="9148198"/>
+            <a:ext cx="4556282" cy="1599102"/>
+          </a:xfrm>
+          <a:prstGeom prst="rect">
+            <a:avLst/>
+          </a:prstGeom>
+        </p:spPr>
+      </p:pic>
+      <p:sp>
+        <p:nvSpPr>
+          <p:cNvPr id="47" name="TextBox 46">
+            <a:extLst>
+              <a:ext uri="{FF2B5EF4-FFF2-40B4-BE49-F238E27FC236}">
+                <a16:creationId xmlns:a16="http://schemas.microsoft.com/office/drawing/2014/main" id="{D2273E1A-56DD-4FD8-982B-C07D5A38583C}"/>
+              </a:ext>
+            </a:extLst>
+          </p:cNvPr>
+          <p:cNvSpPr txBox="1"/>
+          <p:nvPr/>
+        </p:nvSpPr>
+        <p:spPr>
+          <a:xfrm>
+            <a:off x="8359662" y="10936367"/>
+            <a:ext cx="974947" cy="369332"/>
+          </a:xfrm>
+          <a:prstGeom prst="rect">
+            <a:avLst/>
+          </a:prstGeom>
+          <a:noFill/>
+        </p:spPr>
+        <p:txBody>
+          <a:bodyPr wrap="none" rtlCol="0">
+            <a:spAutoFit/>
+          </a:bodyPr>
+          <a:lstStyle/>
+          <a:p>
+            <a:r>
+              <a:rPr lang="en-GB" dirty="0"/>
+              <a:t>@{Case}</a:t>
+            </a:r>
+          </a:p>
+        </p:txBody>
+      </p:sp>
+      <p:pic>
+        <p:nvPicPr>
+          <p:cNvPr id="48" name="Picture 47">
+            <a:extLst>
+              <a:ext uri="{FF2B5EF4-FFF2-40B4-BE49-F238E27FC236}">
+                <a16:creationId xmlns:a16="http://schemas.microsoft.com/office/drawing/2014/main" id="{87800AD7-8FBA-429D-A4A3-79974C850BB9}"/>
+              </a:ext>
+            </a:extLst>
+          </p:cNvPr>
+          <p:cNvPicPr>
+            <a:picLocks noChangeAspect="1"/>
+          </p:cNvPicPr>
+          <p:nvPr/>
+        </p:nvPicPr>
+        <p:blipFill>
+          <a:blip r:embed="rId17"/>
+          <a:stretch>
+            <a:fillRect/>
+          </a:stretch>
+        </p:blipFill>
+        <p:spPr>
+          <a:xfrm>
+            <a:off x="308953" y="671387"/>
+            <a:ext cx="471078" cy="474308"/>
+          </a:xfrm>
+          <a:prstGeom prst="rect">
+            <a:avLst/>
+          </a:prstGeom>
+        </p:spPr>
+      </p:pic>
+      <p:pic>
+        <p:nvPicPr>
+          <p:cNvPr id="35" name="Picture 34">
+            <a:extLst>
+              <a:ext uri="{FF2B5EF4-FFF2-40B4-BE49-F238E27FC236}">
+                <a16:creationId xmlns:a16="http://schemas.microsoft.com/office/drawing/2014/main" id="{EE2A7D45-D02A-493A-B5A6-868A538E108B}"/>
+              </a:ext>
+            </a:extLst>
+          </p:cNvPr>
+          <p:cNvPicPr>
+            <a:picLocks noChangeAspect="1"/>
+          </p:cNvPicPr>
+          <p:nvPr/>
+        </p:nvPicPr>
+        <p:blipFill>
+          <a:blip r:embed="rId18"/>
+          <a:stretch>
+            <a:fillRect/>
+          </a:stretch>
+        </p:blipFill>
+        <p:spPr>
+          <a:xfrm>
+            <a:off x="3948113" y="5962599"/>
+            <a:ext cx="6643269" cy="2819406"/>
+          </a:xfrm>
+          <a:prstGeom prst="rect">
+            <a:avLst/>
+          </a:prstGeom>
+        </p:spPr>
+      </p:pic>
+      <p:sp>
+        <p:nvSpPr>
+          <p:cNvPr id="12" name="Left Brace 11">
+            <a:extLst>
+              <a:ext uri="{FF2B5EF4-FFF2-40B4-BE49-F238E27FC236}">
+                <a16:creationId xmlns:a16="http://schemas.microsoft.com/office/drawing/2014/main" id="{77D93561-8CDB-430E-8A88-3911DEFB7740}"/>
+              </a:ext>
+            </a:extLst>
+          </p:cNvPr>
+          <p:cNvSpPr/>
+          <p:nvPr/>
+        </p:nvSpPr>
+        <p:spPr>
+          <a:xfrm rot="5400000">
+            <a:off x="6930977" y="2526097"/>
+            <a:ext cx="669973" cy="6727034"/>
+          </a:xfrm>
+          <a:prstGeom prst="leftBrace">
+            <a:avLst>
+              <a:gd name="adj1" fmla="val 8333"/>
+              <a:gd name="adj2" fmla="val 4613"/>
+            </a:avLst>
+          </a:prstGeom>
+          <a:ln w="38100">
+            <a:solidFill>
+              <a:schemeClr val="accent4"/>
+            </a:solidFill>
+          </a:ln>
+        </p:spPr>
+        <p:style>
+          <a:lnRef idx="1">
+            <a:schemeClr val="accent1"/>
+          </a:lnRef>
+          <a:fillRef idx="0">
+            <a:schemeClr val="accent1"/>
+          </a:fillRef>
+          <a:effectRef idx="0">
+            <a:schemeClr val="accent1"/>
+          </a:effectRef>
+          <a:fontRef idx="minor">
+            <a:schemeClr val="tx1"/>
+          </a:fontRef>
+        </p:style>
+        <p:txBody>
+          <a:bodyPr rtlCol="0" anchor="ctr"/>
+          <a:lstStyle/>
+          <a:p>
+            <a:pPr algn="ctr"/>
+            <a:endParaRPr lang="en-GB" dirty="0"/>
+          </a:p>
+        </p:txBody>
+      </p:sp>
+      <p:pic>
+        <p:nvPicPr>
+          <p:cNvPr id="19" name="Picture 18">
+            <a:extLst>
+              <a:ext uri="{FF2B5EF4-FFF2-40B4-BE49-F238E27FC236}">
+                <a16:creationId xmlns:a16="http://schemas.microsoft.com/office/drawing/2014/main" id="{45593E8A-47D3-4EAD-9C33-0C4BD7D50503}"/>
+              </a:ext>
+            </a:extLst>
+          </p:cNvPr>
+          <p:cNvPicPr>
+            <a:picLocks noChangeAspect="1"/>
+          </p:cNvPicPr>
+          <p:nvPr/>
+        </p:nvPicPr>
+        <p:blipFill>
+          <a:blip r:embed="rId19"/>
+          <a:stretch>
+            <a:fillRect/>
+          </a:stretch>
+        </p:blipFill>
+        <p:spPr>
+          <a:xfrm>
+            <a:off x="8206750" y="4695175"/>
+            <a:ext cx="2803699" cy="928418"/>
+          </a:xfrm>
+          <a:prstGeom prst="rect">
+            <a:avLst/>
+          </a:prstGeom>
+        </p:spPr>
+      </p:pic>
+    </p:spTree>
+    <p:extLst>
+      <p:ext uri="{BB962C8B-B14F-4D97-AF65-F5344CB8AC3E}">
+        <p14:creationId xmlns:p14="http://schemas.microsoft.com/office/powerpoint/2010/main" val="1213525950"/>
+      </p:ext>
+    </p:extLst>
+  </p:cSld>
+  <p:clrMapOvr>
+    <a:masterClrMapping/>
+  </p:clrMapOvr>
+</p:sld>
+</file>
+
+<file path=ppt/slides/slide9.xml><?xml version="1.0" encoding="utf-8"?>
+<p:sld xmlns:a="http://schemas.openxmlformats.org/drawingml/2006/main" xmlns:r="http://schemas.openxmlformats.org/officeDocument/2006/relationships" xmlns:p="http://schemas.openxmlformats.org/presentationml/2006/main">
+  <p:cSld>
+    <p:spTree>
+      <p:nvGrpSpPr>
+        <p:cNvPr id="1" name=""/>
+        <p:cNvGrpSpPr/>
+        <p:nvPr/>
+      </p:nvGrpSpPr>
+      <p:grpSpPr>
+        <a:xfrm>
+          <a:off x="0" y="0"/>
+          <a:ext cx="0" cy="0"/>
+          <a:chOff x="0" y="0"/>
+          <a:chExt cx="0" cy="0"/>
+        </a:xfrm>
+      </p:grpSpPr>
       <p:sp>
         <p:nvSpPr>
           <p:cNvPr id="16" name="TextBox 15">
@@ -10437,8 +12049,8 @@
         </p:nvSpPr>
         <p:spPr>
           <a:xfrm>
-            <a:off x="8518602" y="3100943"/>
-            <a:ext cx="974947" cy="395942"/>
+            <a:off x="8518603" y="4001055"/>
+            <a:ext cx="902811" cy="369332"/>
           </a:xfrm>
           <a:prstGeom prst="rect">
             <a:avLst/>
@@ -10474,7 +12086,7 @@
         </p:nvCxnSpPr>
         <p:spPr>
           <a:xfrm>
-            <a:off x="6503858" y="3954792"/>
+            <a:off x="6503859" y="4854905"/>
             <a:ext cx="1982707" cy="461665"/>
           </a:xfrm>
           <a:prstGeom prst="bentConnector3">
@@ -10522,7 +12134,7 @@
         </p:nvCxnSpPr>
         <p:spPr>
           <a:xfrm>
-            <a:off x="6515898" y="3879127"/>
+            <a:off x="6515899" y="4779240"/>
             <a:ext cx="1982707" cy="195203"/>
           </a:xfrm>
           <a:prstGeom prst="bentConnector3">
@@ -10566,8 +12178,8 @@
         </p:nvCxnSpPr>
         <p:spPr>
           <a:xfrm flipV="1">
-            <a:off x="6503857" y="3666004"/>
-            <a:ext cx="2007208" cy="137450"/>
+            <a:off x="6503858" y="4552812"/>
+            <a:ext cx="2007209" cy="150755"/>
           </a:xfrm>
           <a:prstGeom prst="bentConnector3">
             <a:avLst>
@@ -10613,8 +12225,8 @@
         </p:nvCxnSpPr>
         <p:spPr>
           <a:xfrm flipV="1">
-            <a:off x="7031515" y="3298914"/>
-            <a:ext cx="1487087" cy="431398"/>
+            <a:off x="7031516" y="4185722"/>
+            <a:ext cx="1487087" cy="444703"/>
           </a:xfrm>
           <a:prstGeom prst="bentConnector3">
             <a:avLst>
@@ -10657,8 +12269,8 @@
         </p:nvSpPr>
         <p:spPr>
           <a:xfrm>
-            <a:off x="8511066" y="3468033"/>
-            <a:ext cx="532133" cy="395942"/>
+            <a:off x="8511066" y="4368145"/>
+            <a:ext cx="500650" cy="369332"/>
           </a:xfrm>
           <a:prstGeom prst="rect">
             <a:avLst/>
@@ -10692,8 +12304,8 @@
         </p:nvSpPr>
         <p:spPr>
           <a:xfrm>
-            <a:off x="8501778" y="3875896"/>
-            <a:ext cx="1179297" cy="395942"/>
+            <a:off x="8501778" y="4776008"/>
+            <a:ext cx="1093056" cy="369332"/>
           </a:xfrm>
           <a:prstGeom prst="rect">
             <a:avLst/>
@@ -10727,8 +12339,8 @@
         </p:nvSpPr>
         <p:spPr>
           <a:xfrm>
-            <a:off x="8486564" y="4235828"/>
-            <a:ext cx="607859" cy="395942"/>
+            <a:off x="8486565" y="5135940"/>
+            <a:ext cx="569387" cy="369332"/>
           </a:xfrm>
           <a:prstGeom prst="rect">
             <a:avLst/>
@@ -10770,7 +12382,7 @@
         </p:blipFill>
         <p:spPr>
           <a:xfrm>
-            <a:off x="4320385" y="2897006"/>
+            <a:off x="4320386" y="3797119"/>
             <a:ext cx="2895447" cy="1569659"/>
           </a:xfrm>
           <a:prstGeom prst="rect">
@@ -10792,7 +12404,7 @@
         </p:nvSpPr>
         <p:spPr>
           <a:xfrm>
-            <a:off x="5307540" y="3623353"/>
+            <a:off x="5307541" y="4523465"/>
             <a:ext cx="1891993" cy="400110"/>
           </a:xfrm>
           <a:prstGeom prst="rect">
@@ -10835,7 +12447,7 @@
         </p:blipFill>
         <p:spPr>
           <a:xfrm>
-            <a:off x="4473434" y="3446725"/>
+            <a:off x="4473434" y="4346838"/>
             <a:ext cx="854296" cy="787151"/>
           </a:xfrm>
           <a:prstGeom prst="rect">
@@ -10857,7 +12469,7 @@
         </p:nvSpPr>
         <p:spPr>
           <a:xfrm rot="5400000">
-            <a:off x="5548693" y="2115140"/>
+            <a:off x="5548693" y="3015253"/>
             <a:ext cx="618458" cy="945277"/>
           </a:xfrm>
           <a:prstGeom prst="bentArrow">
@@ -10924,7 +12536,7 @@
         </p:blipFill>
         <p:spPr>
           <a:xfrm>
-            <a:off x="5760562" y="2011525"/>
+            <a:off x="5760562" y="2911638"/>
             <a:ext cx="945276" cy="618459"/>
           </a:xfrm>
           <a:prstGeom prst="rect">
@@ -10954,7 +12566,7 @@
         </p:blipFill>
         <p:spPr>
           <a:xfrm>
-            <a:off x="4359024" y="1599057"/>
+            <a:off x="4359024" y="2499169"/>
             <a:ext cx="1205286" cy="1201956"/>
           </a:xfrm>
           <a:prstGeom prst="rect">

</xml_diff>

<commit_message>
Final tweaks before release. SetLogActivityFailed new param.
</commit_message>
<xml_diff>
--- a/Images/All ADF Activities.pptx
+++ b/Images/All ADF Activities.pptx
@@ -251,7 +251,7 @@
           <a:p>
             <a:fld id="{1F80DB50-5271-4B1A-976D-0A7715B55622}" type="datetimeFigureOut">
               <a:rPr lang="en-GB" smtClean="0"/>
-              <a:t>02/06/2020</a:t>
+              <a:t>08/06/2020</a:t>
             </a:fld>
             <a:endParaRPr lang="en-GB"/>
           </a:p>
@@ -421,7 +421,7 @@
           <a:p>
             <a:fld id="{1F80DB50-5271-4B1A-976D-0A7715B55622}" type="datetimeFigureOut">
               <a:rPr lang="en-GB" smtClean="0"/>
-              <a:t>02/06/2020</a:t>
+              <a:t>08/06/2020</a:t>
             </a:fld>
             <a:endParaRPr lang="en-GB"/>
           </a:p>
@@ -601,7 +601,7 @@
           <a:p>
             <a:fld id="{1F80DB50-5271-4B1A-976D-0A7715B55622}" type="datetimeFigureOut">
               <a:rPr lang="en-GB" smtClean="0"/>
-              <a:t>02/06/2020</a:t>
+              <a:t>08/06/2020</a:t>
             </a:fld>
             <a:endParaRPr lang="en-GB"/>
           </a:p>
@@ -771,7 +771,7 @@
           <a:p>
             <a:fld id="{1F80DB50-5271-4B1A-976D-0A7715B55622}" type="datetimeFigureOut">
               <a:rPr lang="en-GB" smtClean="0"/>
-              <a:t>02/06/2020</a:t>
+              <a:t>08/06/2020</a:t>
             </a:fld>
             <a:endParaRPr lang="en-GB"/>
           </a:p>
@@ -1015,7 +1015,7 @@
           <a:p>
             <a:fld id="{1F80DB50-5271-4B1A-976D-0A7715B55622}" type="datetimeFigureOut">
               <a:rPr lang="en-GB" smtClean="0"/>
-              <a:t>02/06/2020</a:t>
+              <a:t>08/06/2020</a:t>
             </a:fld>
             <a:endParaRPr lang="en-GB"/>
           </a:p>
@@ -1247,7 +1247,7 @@
           <a:p>
             <a:fld id="{1F80DB50-5271-4B1A-976D-0A7715B55622}" type="datetimeFigureOut">
               <a:rPr lang="en-GB" smtClean="0"/>
-              <a:t>02/06/2020</a:t>
+              <a:t>08/06/2020</a:t>
             </a:fld>
             <a:endParaRPr lang="en-GB"/>
           </a:p>
@@ -1614,7 +1614,7 @@
           <a:p>
             <a:fld id="{1F80DB50-5271-4B1A-976D-0A7715B55622}" type="datetimeFigureOut">
               <a:rPr lang="en-GB" smtClean="0"/>
-              <a:t>02/06/2020</a:t>
+              <a:t>08/06/2020</a:t>
             </a:fld>
             <a:endParaRPr lang="en-GB"/>
           </a:p>
@@ -1732,7 +1732,7 @@
           <a:p>
             <a:fld id="{1F80DB50-5271-4B1A-976D-0A7715B55622}" type="datetimeFigureOut">
               <a:rPr lang="en-GB" smtClean="0"/>
-              <a:t>02/06/2020</a:t>
+              <a:t>08/06/2020</a:t>
             </a:fld>
             <a:endParaRPr lang="en-GB"/>
           </a:p>
@@ -1827,7 +1827,7 @@
           <a:p>
             <a:fld id="{1F80DB50-5271-4B1A-976D-0A7715B55622}" type="datetimeFigureOut">
               <a:rPr lang="en-GB" smtClean="0"/>
-              <a:t>02/06/2020</a:t>
+              <a:t>08/06/2020</a:t>
             </a:fld>
             <a:endParaRPr lang="en-GB"/>
           </a:p>
@@ -2104,7 +2104,7 @@
           <a:p>
             <a:fld id="{1F80DB50-5271-4B1A-976D-0A7715B55622}" type="datetimeFigureOut">
               <a:rPr lang="en-GB" smtClean="0"/>
-              <a:t>02/06/2020</a:t>
+              <a:t>08/06/2020</a:t>
             </a:fld>
             <a:endParaRPr lang="en-GB"/>
           </a:p>
@@ -2361,7 +2361,7 @@
           <a:p>
             <a:fld id="{1F80DB50-5271-4B1A-976D-0A7715B55622}" type="datetimeFigureOut">
               <a:rPr lang="en-GB" smtClean="0"/>
-              <a:t>02/06/2020</a:t>
+              <a:t>08/06/2020</a:t>
             </a:fld>
             <a:endParaRPr lang="en-GB"/>
           </a:p>
@@ -2574,7 +2574,7 @@
           <a:p>
             <a:fld id="{1F80DB50-5271-4B1A-976D-0A7715B55622}" type="datetimeFigureOut">
               <a:rPr lang="en-GB" smtClean="0"/>
-              <a:t>02/06/2020</a:t>
+              <a:t>08/06/2020</a:t>
             </a:fld>
             <a:endParaRPr lang="en-GB"/>
           </a:p>
@@ -10862,42 +10862,6 @@
           </a:p>
         </p:txBody>
       </p:sp>
-      <p:pic>
-        <p:nvPicPr>
-          <p:cNvPr id="32" name="Picture 31" descr="A screenshot of a cell phone&#10;&#10;Description automatically generated">
-            <a:extLst>
-              <a:ext uri="{FF2B5EF4-FFF2-40B4-BE49-F238E27FC236}">
-                <a16:creationId xmlns:a16="http://schemas.microsoft.com/office/drawing/2014/main" id="{F26DFA87-DB02-40BE-B78D-D52C12BB164C}"/>
-              </a:ext>
-            </a:extLst>
-          </p:cNvPr>
-          <p:cNvPicPr>
-            <a:picLocks noChangeAspect="1"/>
-          </p:cNvPicPr>
-          <p:nvPr/>
-        </p:nvPicPr>
-        <p:blipFill>
-          <a:blip r:embed="rId6">
-            <a:extLst>
-              <a:ext uri="{28A0092B-C50C-407E-A947-70E740481C1C}">
-                <a14:useLocalDpi xmlns:a14="http://schemas.microsoft.com/office/drawing/2010/main" val="0"/>
-              </a:ext>
-            </a:extLst>
-          </a:blip>
-          <a:stretch>
-            <a:fillRect/>
-          </a:stretch>
-        </p:blipFill>
-        <p:spPr>
-          <a:xfrm>
-            <a:off x="2279724" y="10757819"/>
-            <a:ext cx="4633285" cy="1962932"/>
-          </a:xfrm>
-          <a:prstGeom prst="rect">
-            <a:avLst/>
-          </a:prstGeom>
-        </p:spPr>
-      </p:pic>
       <p:sp>
         <p:nvSpPr>
           <p:cNvPr id="36" name="Left Brace 35">
@@ -11017,7 +10981,7 @@
           <p:nvPr/>
         </p:nvPicPr>
         <p:blipFill>
-          <a:blip r:embed="rId7">
+          <a:blip r:embed="rId6">
             <a:extLst>
               <a:ext uri="{28A0092B-C50C-407E-A947-70E740481C1C}">
                 <a14:useLocalDpi xmlns:a14="http://schemas.microsoft.com/office/drawing/2010/main" val="0"/>
@@ -11249,6 +11213,36 @@
           <p:nvPr/>
         </p:nvPicPr>
         <p:blipFill>
+          <a:blip r:embed="rId7"/>
+          <a:stretch>
+            <a:fillRect/>
+          </a:stretch>
+        </p:blipFill>
+        <p:spPr>
+          <a:xfrm>
+            <a:off x="98228" y="88352"/>
+            <a:ext cx="892528" cy="579404"/>
+          </a:xfrm>
+          <a:prstGeom prst="rect">
+            <a:avLst/>
+          </a:prstGeom>
+        </p:spPr>
+      </p:pic>
+      <p:pic>
+        <p:nvPicPr>
+          <p:cNvPr id="3" name="Picture 2">
+            <a:extLst>
+              <a:ext uri="{FF2B5EF4-FFF2-40B4-BE49-F238E27FC236}">
+                <a16:creationId xmlns:a16="http://schemas.microsoft.com/office/drawing/2014/main" id="{BAC2FA6D-7E44-4A70-ABBF-441AC58C61D8}"/>
+              </a:ext>
+            </a:extLst>
+          </p:cNvPr>
+          <p:cNvPicPr>
+            <a:picLocks noChangeAspect="1"/>
+          </p:cNvPicPr>
+          <p:nvPr/>
+        </p:nvPicPr>
+        <p:blipFill>
           <a:blip r:embed="rId8"/>
           <a:stretch>
             <a:fillRect/>
@@ -11256,36 +11250,6 @@
         </p:blipFill>
         <p:spPr>
           <a:xfrm>
-            <a:off x="98228" y="88352"/>
-            <a:ext cx="892528" cy="579404"/>
-          </a:xfrm>
-          <a:prstGeom prst="rect">
-            <a:avLst/>
-          </a:prstGeom>
-        </p:spPr>
-      </p:pic>
-      <p:pic>
-        <p:nvPicPr>
-          <p:cNvPr id="3" name="Picture 2">
-            <a:extLst>
-              <a:ext uri="{FF2B5EF4-FFF2-40B4-BE49-F238E27FC236}">
-                <a16:creationId xmlns:a16="http://schemas.microsoft.com/office/drawing/2014/main" id="{BAC2FA6D-7E44-4A70-ABBF-441AC58C61D8}"/>
-              </a:ext>
-            </a:extLst>
-          </p:cNvPr>
-          <p:cNvPicPr>
-            <a:picLocks noChangeAspect="1"/>
-          </p:cNvPicPr>
-          <p:nvPr/>
-        </p:nvPicPr>
-        <p:blipFill>
-          <a:blip r:embed="rId9"/>
-          <a:stretch>
-            <a:fillRect/>
-          </a:stretch>
-        </p:blipFill>
-        <p:spPr>
-          <a:xfrm>
             <a:off x="98228" y="1727119"/>
             <a:ext cx="892528" cy="586800"/>
           </a:xfrm>
@@ -11309,7 +11273,7 @@
           <p:nvPr/>
         </p:nvPicPr>
         <p:blipFill>
-          <a:blip r:embed="rId10"/>
+          <a:blip r:embed="rId9"/>
           <a:stretch>
             <a:fillRect/>
           </a:stretch>
@@ -11500,7 +11464,7 @@
           <p:nvPr/>
         </p:nvPicPr>
         <p:blipFill>
-          <a:blip r:embed="rId11">
+          <a:blip r:embed="rId10">
             <a:extLst>
               <a:ext uri="{28A0092B-C50C-407E-A947-70E740481C1C}">
                 <a14:useLocalDpi xmlns:a14="http://schemas.microsoft.com/office/drawing/2010/main" val="0"/>
@@ -11527,6 +11491,36 @@
             <a:extLst>
               <a:ext uri="{FF2B5EF4-FFF2-40B4-BE49-F238E27FC236}">
                 <a16:creationId xmlns:a16="http://schemas.microsoft.com/office/drawing/2014/main" id="{F24BA0AF-BC82-4B39-B34F-61FA814CDF4F}"/>
+              </a:ext>
+            </a:extLst>
+          </p:cNvPr>
+          <p:cNvPicPr>
+            <a:picLocks noChangeAspect="1"/>
+          </p:cNvPicPr>
+          <p:nvPr/>
+        </p:nvPicPr>
+        <p:blipFill>
+          <a:blip r:embed="rId11"/>
+          <a:stretch>
+            <a:fillRect/>
+          </a:stretch>
+        </p:blipFill>
+        <p:spPr>
+          <a:xfrm>
+            <a:off x="9787025" y="9462571"/>
+            <a:ext cx="1281782" cy="628684"/>
+          </a:xfrm>
+          <a:prstGeom prst="rect">
+            <a:avLst/>
+          </a:prstGeom>
+        </p:spPr>
+      </p:pic>
+      <p:pic>
+        <p:nvPicPr>
+          <p:cNvPr id="22" name="Picture 21">
+            <a:extLst>
+              <a:ext uri="{FF2B5EF4-FFF2-40B4-BE49-F238E27FC236}">
+                <a16:creationId xmlns:a16="http://schemas.microsoft.com/office/drawing/2014/main" id="{363DAB9F-0C05-4E7F-85D5-DC404795DA15}"/>
               </a:ext>
             </a:extLst>
           </p:cNvPr>
@@ -11543,36 +11537,6 @@
         </p:blipFill>
         <p:spPr>
           <a:xfrm>
-            <a:off x="9787025" y="9462571"/>
-            <a:ext cx="1281782" cy="628684"/>
-          </a:xfrm>
-          <a:prstGeom prst="rect">
-            <a:avLst/>
-          </a:prstGeom>
-        </p:spPr>
-      </p:pic>
-      <p:pic>
-        <p:nvPicPr>
-          <p:cNvPr id="22" name="Picture 21">
-            <a:extLst>
-              <a:ext uri="{FF2B5EF4-FFF2-40B4-BE49-F238E27FC236}">
-                <a16:creationId xmlns:a16="http://schemas.microsoft.com/office/drawing/2014/main" id="{363DAB9F-0C05-4E7F-85D5-DC404795DA15}"/>
-              </a:ext>
-            </a:extLst>
-          </p:cNvPr>
-          <p:cNvPicPr>
-            <a:picLocks noChangeAspect="1"/>
-          </p:cNvPicPr>
-          <p:nvPr/>
-        </p:nvPicPr>
-        <p:blipFill>
-          <a:blip r:embed="rId13"/>
-          <a:stretch>
-            <a:fillRect/>
-          </a:stretch>
-        </p:blipFill>
-        <p:spPr>
-          <a:xfrm>
             <a:off x="9787026" y="10285895"/>
             <a:ext cx="1295931" cy="626469"/>
           </a:xfrm>
@@ -11631,7 +11595,7 @@
           <p:nvPr/>
         </p:nvPicPr>
         <p:blipFill>
-          <a:blip r:embed="rId14"/>
+          <a:blip r:embed="rId13"/>
           <a:stretch>
             <a:fillRect/>
           </a:stretch>
@@ -11742,7 +11706,7 @@
           <p:nvPr/>
         </p:nvPicPr>
         <p:blipFill>
-          <a:blip r:embed="rId15"/>
+          <a:blip r:embed="rId14"/>
           <a:stretch>
             <a:fillRect/>
           </a:stretch>
@@ -11808,7 +11772,7 @@
           <p:nvPr/>
         </p:nvPicPr>
         <p:blipFill rotWithShape="1">
-          <a:blip r:embed="rId16">
+          <a:blip r:embed="rId15">
             <a:extLst>
               <a:ext uri="{28A0092B-C50C-407E-A947-70E740481C1C}">
                 <a14:useLocalDpi xmlns:a14="http://schemas.microsoft.com/office/drawing/2010/main" val="0"/>
@@ -11869,6 +11833,36 @@
             <a:extLst>
               <a:ext uri="{FF2B5EF4-FFF2-40B4-BE49-F238E27FC236}">
                 <a16:creationId xmlns:a16="http://schemas.microsoft.com/office/drawing/2014/main" id="{87800AD7-8FBA-429D-A4A3-79974C850BB9}"/>
+              </a:ext>
+            </a:extLst>
+          </p:cNvPr>
+          <p:cNvPicPr>
+            <a:picLocks noChangeAspect="1"/>
+          </p:cNvPicPr>
+          <p:nvPr/>
+        </p:nvPicPr>
+        <p:blipFill>
+          <a:blip r:embed="rId16"/>
+          <a:stretch>
+            <a:fillRect/>
+          </a:stretch>
+        </p:blipFill>
+        <p:spPr>
+          <a:xfrm>
+            <a:off x="308953" y="671387"/>
+            <a:ext cx="471078" cy="474308"/>
+          </a:xfrm>
+          <a:prstGeom prst="rect">
+            <a:avLst/>
+          </a:prstGeom>
+        </p:spPr>
+      </p:pic>
+      <p:pic>
+        <p:nvPicPr>
+          <p:cNvPr id="35" name="Picture 34">
+            <a:extLst>
+              <a:ext uri="{FF2B5EF4-FFF2-40B4-BE49-F238E27FC236}">
+                <a16:creationId xmlns:a16="http://schemas.microsoft.com/office/drawing/2014/main" id="{EE2A7D45-D02A-493A-B5A6-868A538E108B}"/>
               </a:ext>
             </a:extLst>
           </p:cNvPr>
@@ -11885,20 +11879,72 @@
         </p:blipFill>
         <p:spPr>
           <a:xfrm>
-            <a:off x="308953" y="671387"/>
-            <a:ext cx="471078" cy="474308"/>
+            <a:off x="3948113" y="5962599"/>
+            <a:ext cx="6643269" cy="2819406"/>
           </a:xfrm>
           <a:prstGeom prst="rect">
             <a:avLst/>
           </a:prstGeom>
         </p:spPr>
       </p:pic>
+      <p:sp>
+        <p:nvSpPr>
+          <p:cNvPr id="12" name="Left Brace 11">
+            <a:extLst>
+              <a:ext uri="{FF2B5EF4-FFF2-40B4-BE49-F238E27FC236}">
+                <a16:creationId xmlns:a16="http://schemas.microsoft.com/office/drawing/2014/main" id="{77D93561-8CDB-430E-8A88-3911DEFB7740}"/>
+              </a:ext>
+            </a:extLst>
+          </p:cNvPr>
+          <p:cNvSpPr/>
+          <p:nvPr/>
+        </p:nvSpPr>
+        <p:spPr>
+          <a:xfrm rot="5400000">
+            <a:off x="6930977" y="2526097"/>
+            <a:ext cx="669973" cy="6727034"/>
+          </a:xfrm>
+          <a:prstGeom prst="leftBrace">
+            <a:avLst>
+              <a:gd name="adj1" fmla="val 8333"/>
+              <a:gd name="adj2" fmla="val 4613"/>
+            </a:avLst>
+          </a:prstGeom>
+          <a:ln w="38100">
+            <a:solidFill>
+              <a:schemeClr val="accent4"/>
+            </a:solidFill>
+          </a:ln>
+        </p:spPr>
+        <p:style>
+          <a:lnRef idx="1">
+            <a:schemeClr val="accent1"/>
+          </a:lnRef>
+          <a:fillRef idx="0">
+            <a:schemeClr val="accent1"/>
+          </a:fillRef>
+          <a:effectRef idx="0">
+            <a:schemeClr val="accent1"/>
+          </a:effectRef>
+          <a:fontRef idx="minor">
+            <a:schemeClr val="tx1"/>
+          </a:fontRef>
+        </p:style>
+        <p:txBody>
+          <a:bodyPr rtlCol="0" anchor="ctr"/>
+          <a:lstStyle/>
+          <a:p>
+            <a:pPr algn="ctr"/>
+            <a:endParaRPr lang="en-GB" dirty="0"/>
+          </a:p>
+        </p:txBody>
+      </p:sp>
       <p:pic>
         <p:nvPicPr>
-          <p:cNvPr id="35" name="Picture 34">
-            <a:extLst>
-              <a:ext uri="{FF2B5EF4-FFF2-40B4-BE49-F238E27FC236}">
-                <a16:creationId xmlns:a16="http://schemas.microsoft.com/office/drawing/2014/main" id="{EE2A7D45-D02A-493A-B5A6-868A538E108B}"/>
+          <p:cNvPr id="19" name="Picture 18">
+            <a:extLst>
+              <a:ext uri="{FF2B5EF4-FFF2-40B4-BE49-F238E27FC236}">
+                <a16:creationId xmlns:a16="http://schemas.microsoft.com/office/drawing/2014/main" id="{45593E8A-47D3-4EAD-9C33-0C4BD7D50503}"/>
               </a:ext>
             </a:extLst>
           </p:cNvPr>
@@ -11915,88 +11961,6 @@
         </p:blipFill>
         <p:spPr>
           <a:xfrm>
-            <a:off x="3948113" y="5962599"/>
-            <a:ext cx="6643269" cy="2819406"/>
-          </a:xfrm>
-          <a:prstGeom prst="rect">
-            <a:avLst/>
-          </a:prstGeom>
-        </p:spPr>
-      </p:pic>
-      <p:sp>
-        <p:nvSpPr>
-          <p:cNvPr id="12" name="Left Brace 11">
-            <a:extLst>
-              <a:ext uri="{FF2B5EF4-FFF2-40B4-BE49-F238E27FC236}">
-                <a16:creationId xmlns:a16="http://schemas.microsoft.com/office/drawing/2014/main" id="{77D93561-8CDB-430E-8A88-3911DEFB7740}"/>
-              </a:ext>
-            </a:extLst>
-          </p:cNvPr>
-          <p:cNvSpPr/>
-          <p:nvPr/>
-        </p:nvSpPr>
-        <p:spPr>
-          <a:xfrm rot="5400000">
-            <a:off x="6930977" y="2526097"/>
-            <a:ext cx="669973" cy="6727034"/>
-          </a:xfrm>
-          <a:prstGeom prst="leftBrace">
-            <a:avLst>
-              <a:gd name="adj1" fmla="val 8333"/>
-              <a:gd name="adj2" fmla="val 4613"/>
-            </a:avLst>
-          </a:prstGeom>
-          <a:ln w="38100">
-            <a:solidFill>
-              <a:schemeClr val="accent4"/>
-            </a:solidFill>
-          </a:ln>
-        </p:spPr>
-        <p:style>
-          <a:lnRef idx="1">
-            <a:schemeClr val="accent1"/>
-          </a:lnRef>
-          <a:fillRef idx="0">
-            <a:schemeClr val="accent1"/>
-          </a:fillRef>
-          <a:effectRef idx="0">
-            <a:schemeClr val="accent1"/>
-          </a:effectRef>
-          <a:fontRef idx="minor">
-            <a:schemeClr val="tx1"/>
-          </a:fontRef>
-        </p:style>
-        <p:txBody>
-          <a:bodyPr rtlCol="0" anchor="ctr"/>
-          <a:lstStyle/>
-          <a:p>
-            <a:pPr algn="ctr"/>
-            <a:endParaRPr lang="en-GB" dirty="0"/>
-          </a:p>
-        </p:txBody>
-      </p:sp>
-      <p:pic>
-        <p:nvPicPr>
-          <p:cNvPr id="19" name="Picture 18">
-            <a:extLst>
-              <a:ext uri="{FF2B5EF4-FFF2-40B4-BE49-F238E27FC236}">
-                <a16:creationId xmlns:a16="http://schemas.microsoft.com/office/drawing/2014/main" id="{45593E8A-47D3-4EAD-9C33-0C4BD7D50503}"/>
-              </a:ext>
-            </a:extLst>
-          </p:cNvPr>
-          <p:cNvPicPr>
-            <a:picLocks noChangeAspect="1"/>
-          </p:cNvPicPr>
-          <p:nvPr/>
-        </p:nvPicPr>
-        <p:blipFill>
-          <a:blip r:embed="rId19"/>
-          <a:stretch>
-            <a:fillRect/>
-          </a:stretch>
-        </p:blipFill>
-        <p:spPr>
-          <a:xfrm>
             <a:off x="8206750" y="4695175"/>
             <a:ext cx="2803699" cy="928418"/>
           </a:xfrm>
@@ -12005,6 +11969,93 @@
           </a:prstGeom>
         </p:spPr>
       </p:pic>
+      <p:grpSp>
+        <p:nvGrpSpPr>
+          <p:cNvPr id="21" name="Group 20">
+            <a:extLst>
+              <a:ext uri="{FF2B5EF4-FFF2-40B4-BE49-F238E27FC236}">
+                <a16:creationId xmlns:a16="http://schemas.microsoft.com/office/drawing/2014/main" id="{05E14A1D-BD3D-40A7-B20A-AC1206565C36}"/>
+              </a:ext>
+            </a:extLst>
+          </p:cNvPr>
+          <p:cNvGrpSpPr/>
+          <p:nvPr/>
+        </p:nvGrpSpPr>
+        <p:grpSpPr>
+          <a:xfrm>
+            <a:off x="2279724" y="10757819"/>
+            <a:ext cx="4752787" cy="1962932"/>
+            <a:chOff x="2279724" y="10757819"/>
+            <a:chExt cx="4752787" cy="1962932"/>
+          </a:xfrm>
+        </p:grpSpPr>
+        <p:pic>
+          <p:nvPicPr>
+            <p:cNvPr id="32" name="Picture 31" descr="A screenshot of a cell phone&#10;&#10;Description automatically generated">
+              <a:extLst>
+                <a:ext uri="{FF2B5EF4-FFF2-40B4-BE49-F238E27FC236}">
+                  <a16:creationId xmlns:a16="http://schemas.microsoft.com/office/drawing/2014/main" id="{F26DFA87-DB02-40BE-B78D-D52C12BB164C}"/>
+                </a:ext>
+              </a:extLst>
+            </p:cNvPr>
+            <p:cNvPicPr>
+              <a:picLocks noChangeAspect="1"/>
+            </p:cNvPicPr>
+            <p:nvPr/>
+          </p:nvPicPr>
+          <p:blipFill>
+            <a:blip r:embed="rId19">
+              <a:extLst>
+                <a:ext uri="{28A0092B-C50C-407E-A947-70E740481C1C}">
+                  <a14:useLocalDpi xmlns:a14="http://schemas.microsoft.com/office/drawing/2010/main" val="0"/>
+                </a:ext>
+              </a:extLst>
+            </a:blip>
+            <a:stretch>
+              <a:fillRect/>
+            </a:stretch>
+          </p:blipFill>
+          <p:spPr>
+            <a:xfrm>
+              <a:off x="2279724" y="10757819"/>
+              <a:ext cx="4633285" cy="1962932"/>
+            </a:xfrm>
+            <a:prstGeom prst="rect">
+              <a:avLst/>
+            </a:prstGeom>
+          </p:spPr>
+        </p:pic>
+        <p:pic>
+          <p:nvPicPr>
+            <p:cNvPr id="20" name="Picture 19">
+              <a:extLst>
+                <a:ext uri="{FF2B5EF4-FFF2-40B4-BE49-F238E27FC236}">
+                  <a16:creationId xmlns:a16="http://schemas.microsoft.com/office/drawing/2014/main" id="{2BEF8012-D2C9-4B2F-A72A-CF77DA443D81}"/>
+                </a:ext>
+              </a:extLst>
+            </p:cNvPr>
+            <p:cNvPicPr>
+              <a:picLocks noChangeAspect="1"/>
+            </p:cNvPicPr>
+            <p:nvPr/>
+          </p:nvPicPr>
+          <p:blipFill>
+            <a:blip r:embed="rId20"/>
+            <a:stretch>
+              <a:fillRect/>
+            </a:stretch>
+          </p:blipFill>
+          <p:spPr>
+            <a:xfrm>
+              <a:off x="5315311" y="11981816"/>
+              <a:ext cx="1717200" cy="736965"/>
+            </a:xfrm>
+            <a:prstGeom prst="rect">
+              <a:avLst/>
+            </a:prstGeom>
+          </p:spPr>
+        </p:pic>
+      </p:grpSp>
     </p:spTree>
     <p:extLst>
       <p:ext uri="{BB962C8B-B14F-4D97-AF65-F5344CB8AC3E}">

</xml_diff>

<commit_message>
Dependency handling metadata integrity checks and hardening
</commit_message>
<xml_diff>
--- a/Images/All ADF Activities.pptx
+++ b/Images/All ADF Activities.pptx
@@ -252,7 +252,7 @@
           <a:p>
             <a:fld id="{1F80DB50-5271-4B1A-976D-0A7715B55622}" type="datetimeFigureOut">
               <a:rPr lang="en-GB" smtClean="0"/>
-              <a:t>25/06/2020</a:t>
+              <a:t>30/06/2020</a:t>
             </a:fld>
             <a:endParaRPr lang="en-GB"/>
           </a:p>
@@ -422,7 +422,7 @@
           <a:p>
             <a:fld id="{1F80DB50-5271-4B1A-976D-0A7715B55622}" type="datetimeFigureOut">
               <a:rPr lang="en-GB" smtClean="0"/>
-              <a:t>25/06/2020</a:t>
+              <a:t>30/06/2020</a:t>
             </a:fld>
             <a:endParaRPr lang="en-GB"/>
           </a:p>
@@ -602,7 +602,7 @@
           <a:p>
             <a:fld id="{1F80DB50-5271-4B1A-976D-0A7715B55622}" type="datetimeFigureOut">
               <a:rPr lang="en-GB" smtClean="0"/>
-              <a:t>25/06/2020</a:t>
+              <a:t>30/06/2020</a:t>
             </a:fld>
             <a:endParaRPr lang="en-GB"/>
           </a:p>
@@ -772,7 +772,7 @@
           <a:p>
             <a:fld id="{1F80DB50-5271-4B1A-976D-0A7715B55622}" type="datetimeFigureOut">
               <a:rPr lang="en-GB" smtClean="0"/>
-              <a:t>25/06/2020</a:t>
+              <a:t>30/06/2020</a:t>
             </a:fld>
             <a:endParaRPr lang="en-GB"/>
           </a:p>
@@ -1016,7 +1016,7 @@
           <a:p>
             <a:fld id="{1F80DB50-5271-4B1A-976D-0A7715B55622}" type="datetimeFigureOut">
               <a:rPr lang="en-GB" smtClean="0"/>
-              <a:t>25/06/2020</a:t>
+              <a:t>30/06/2020</a:t>
             </a:fld>
             <a:endParaRPr lang="en-GB"/>
           </a:p>
@@ -1248,7 +1248,7 @@
           <a:p>
             <a:fld id="{1F80DB50-5271-4B1A-976D-0A7715B55622}" type="datetimeFigureOut">
               <a:rPr lang="en-GB" smtClean="0"/>
-              <a:t>25/06/2020</a:t>
+              <a:t>30/06/2020</a:t>
             </a:fld>
             <a:endParaRPr lang="en-GB"/>
           </a:p>
@@ -1615,7 +1615,7 @@
           <a:p>
             <a:fld id="{1F80DB50-5271-4B1A-976D-0A7715B55622}" type="datetimeFigureOut">
               <a:rPr lang="en-GB" smtClean="0"/>
-              <a:t>25/06/2020</a:t>
+              <a:t>30/06/2020</a:t>
             </a:fld>
             <a:endParaRPr lang="en-GB"/>
           </a:p>
@@ -1733,7 +1733,7 @@
           <a:p>
             <a:fld id="{1F80DB50-5271-4B1A-976D-0A7715B55622}" type="datetimeFigureOut">
               <a:rPr lang="en-GB" smtClean="0"/>
-              <a:t>25/06/2020</a:t>
+              <a:t>30/06/2020</a:t>
             </a:fld>
             <a:endParaRPr lang="en-GB"/>
           </a:p>
@@ -1828,7 +1828,7 @@
           <a:p>
             <a:fld id="{1F80DB50-5271-4B1A-976D-0A7715B55622}" type="datetimeFigureOut">
               <a:rPr lang="en-GB" smtClean="0"/>
-              <a:t>25/06/2020</a:t>
+              <a:t>30/06/2020</a:t>
             </a:fld>
             <a:endParaRPr lang="en-GB"/>
           </a:p>
@@ -2105,7 +2105,7 @@
           <a:p>
             <a:fld id="{1F80DB50-5271-4B1A-976D-0A7715B55622}" type="datetimeFigureOut">
               <a:rPr lang="en-GB" smtClean="0"/>
-              <a:t>25/06/2020</a:t>
+              <a:t>30/06/2020</a:t>
             </a:fld>
             <a:endParaRPr lang="en-GB"/>
           </a:p>
@@ -2362,7 +2362,7 @@
           <a:p>
             <a:fld id="{1F80DB50-5271-4B1A-976D-0A7715B55622}" type="datetimeFigureOut">
               <a:rPr lang="en-GB" smtClean="0"/>
-              <a:t>25/06/2020</a:t>
+              <a:t>30/06/2020</a:t>
             </a:fld>
             <a:endParaRPr lang="en-GB"/>
           </a:p>
@@ -2575,7 +2575,7 @@
           <a:p>
             <a:fld id="{1F80DB50-5271-4B1A-976D-0A7715B55622}" type="datetimeFigureOut">
               <a:rPr lang="en-GB" smtClean="0"/>
-              <a:t>25/06/2020</a:t>
+              <a:t>30/06/2020</a:t>
             </a:fld>
             <a:endParaRPr lang="en-GB"/>
           </a:p>
@@ -12992,6 +12992,58 @@
       </p:grpSpPr>
       <p:sp>
         <p:nvSpPr>
+          <p:cNvPr id="73" name="Left Brace 72">
+            <a:extLst>
+              <a:ext uri="{FF2B5EF4-FFF2-40B4-BE49-F238E27FC236}">
+                <a16:creationId xmlns:a16="http://schemas.microsoft.com/office/drawing/2014/main" id="{7A8E53C1-5EB3-47F6-8B17-903ED881EC12}"/>
+              </a:ext>
+            </a:extLst>
+          </p:cNvPr>
+          <p:cNvSpPr/>
+          <p:nvPr/>
+        </p:nvSpPr>
+        <p:spPr>
+          <a:xfrm>
+            <a:off x="12801925" y="10256128"/>
+            <a:ext cx="485870" cy="782472"/>
+          </a:xfrm>
+          <a:prstGeom prst="leftBrace">
+            <a:avLst>
+              <a:gd name="adj1" fmla="val 8333"/>
+              <a:gd name="adj2" fmla="val 55098"/>
+            </a:avLst>
+          </a:prstGeom>
+          <a:ln w="38100">
+            <a:solidFill>
+              <a:schemeClr val="accent4"/>
+            </a:solidFill>
+          </a:ln>
+        </p:spPr>
+        <p:style>
+          <a:lnRef idx="1">
+            <a:schemeClr val="accent1"/>
+          </a:lnRef>
+          <a:fillRef idx="0">
+            <a:schemeClr val="accent1"/>
+          </a:fillRef>
+          <a:effectRef idx="0">
+            <a:schemeClr val="accent1"/>
+          </a:effectRef>
+          <a:fontRef idx="minor">
+            <a:schemeClr val="tx1"/>
+          </a:fontRef>
+        </p:style>
+        <p:txBody>
+          <a:bodyPr rtlCol="0" anchor="ctr"/>
+          <a:lstStyle/>
+          <a:p>
+            <a:pPr algn="ctr"/>
+            <a:endParaRPr lang="en-GB" sz="2025" dirty="0"/>
+          </a:p>
+        </p:txBody>
+      </p:sp>
+      <p:sp>
+        <p:nvSpPr>
           <p:cNvPr id="45" name="Left Brace 44">
             <a:extLst>
               <a:ext uri="{FF2B5EF4-FFF2-40B4-BE49-F238E27FC236}">
@@ -13507,10 +13559,10 @@
       </p:sp>
       <p:pic>
         <p:nvPicPr>
-          <p:cNvPr id="9" name="Picture 8">
-            <a:extLst>
-              <a:ext uri="{FF2B5EF4-FFF2-40B4-BE49-F238E27FC236}">
-                <a16:creationId xmlns:a16="http://schemas.microsoft.com/office/drawing/2014/main" id="{830ECE33-9E5F-4091-9D12-99B9CAA53606}"/>
+          <p:cNvPr id="34" name="Picture 33">
+            <a:extLst>
+              <a:ext uri="{FF2B5EF4-FFF2-40B4-BE49-F238E27FC236}">
+                <a16:creationId xmlns:a16="http://schemas.microsoft.com/office/drawing/2014/main" id="{DC6E078F-F4E9-45A8-9592-0849B5A771D6}"/>
               </a:ext>
             </a:extLst>
           </p:cNvPr>
@@ -13527,20 +13579,72 @@
         </p:blipFill>
         <p:spPr>
           <a:xfrm>
-            <a:off x="6998765" y="4531154"/>
-            <a:ext cx="4449616" cy="641100"/>
+            <a:off x="12644327" y="8783977"/>
+            <a:ext cx="3213343" cy="639856"/>
           </a:xfrm>
           <a:prstGeom prst="rect">
             <a:avLst/>
           </a:prstGeom>
         </p:spPr>
       </p:pic>
+      <p:sp>
+        <p:nvSpPr>
+          <p:cNvPr id="49" name="Left Brace 48">
+            <a:extLst>
+              <a:ext uri="{FF2B5EF4-FFF2-40B4-BE49-F238E27FC236}">
+                <a16:creationId xmlns:a16="http://schemas.microsoft.com/office/drawing/2014/main" id="{B33C836E-9730-4830-AB37-468222FE110C}"/>
+              </a:ext>
+            </a:extLst>
+          </p:cNvPr>
+          <p:cNvSpPr/>
+          <p:nvPr/>
+        </p:nvSpPr>
+        <p:spPr>
+          <a:xfrm rot="5400000">
+            <a:off x="13881039" y="7028513"/>
+            <a:ext cx="669973" cy="3315068"/>
+          </a:xfrm>
+          <a:prstGeom prst="leftBrace">
+            <a:avLst>
+              <a:gd name="adj1" fmla="val 8333"/>
+              <a:gd name="adj2" fmla="val 82188"/>
+            </a:avLst>
+          </a:prstGeom>
+          <a:ln w="38100">
+            <a:solidFill>
+              <a:schemeClr val="accent4"/>
+            </a:solidFill>
+          </a:ln>
+        </p:spPr>
+        <p:style>
+          <a:lnRef idx="1">
+            <a:schemeClr val="accent1"/>
+          </a:lnRef>
+          <a:fillRef idx="0">
+            <a:schemeClr val="accent1"/>
+          </a:fillRef>
+          <a:effectRef idx="0">
+            <a:schemeClr val="accent1"/>
+          </a:effectRef>
+          <a:fontRef idx="minor">
+            <a:schemeClr val="tx1"/>
+          </a:fontRef>
+        </p:style>
+        <p:txBody>
+          <a:bodyPr rtlCol="0" anchor="ctr"/>
+          <a:lstStyle/>
+          <a:p>
+            <a:pPr algn="ctr"/>
+            <a:endParaRPr lang="en-GB" sz="2025" dirty="0"/>
+          </a:p>
+        </p:txBody>
+      </p:sp>
       <p:pic>
         <p:nvPicPr>
-          <p:cNvPr id="34" name="Picture 33">
-            <a:extLst>
-              <a:ext uri="{FF2B5EF4-FFF2-40B4-BE49-F238E27FC236}">
-                <a16:creationId xmlns:a16="http://schemas.microsoft.com/office/drawing/2014/main" id="{DC6E078F-F4E9-45A8-9592-0849B5A771D6}"/>
+          <p:cNvPr id="17" name="Picture 16">
+            <a:extLst>
+              <a:ext uri="{FF2B5EF4-FFF2-40B4-BE49-F238E27FC236}">
+                <a16:creationId xmlns:a16="http://schemas.microsoft.com/office/drawing/2014/main" id="{2A510AD6-A12F-4614-8D5F-EAA53E47B411}"/>
               </a:ext>
             </a:extLst>
           </p:cNvPr>
@@ -13557,8 +13661,8 @@
         </p:blipFill>
         <p:spPr>
           <a:xfrm>
-            <a:off x="12644327" y="8783977"/>
-            <a:ext cx="3213343" cy="639856"/>
+            <a:off x="13147286" y="11979308"/>
+            <a:ext cx="2754851" cy="1371384"/>
           </a:xfrm>
           <a:prstGeom prst="rect">
             <a:avLst/>
@@ -13567,10 +13671,10 @@
       </p:pic>
       <p:sp>
         <p:nvSpPr>
-          <p:cNvPr id="49" name="Left Brace 48">
-            <a:extLst>
-              <a:ext uri="{FF2B5EF4-FFF2-40B4-BE49-F238E27FC236}">
-                <a16:creationId xmlns:a16="http://schemas.microsoft.com/office/drawing/2014/main" id="{B33C836E-9730-4830-AB37-468222FE110C}"/>
+          <p:cNvPr id="46" name="Left Brace 45">
+            <a:extLst>
+              <a:ext uri="{FF2B5EF4-FFF2-40B4-BE49-F238E27FC236}">
+                <a16:creationId xmlns:a16="http://schemas.microsoft.com/office/drawing/2014/main" id="{E4084E21-75CC-4798-B255-E8B429C83765}"/>
               </a:ext>
             </a:extLst>
           </p:cNvPr>
@@ -13578,14 +13682,154 @@
           <p:nvPr/>
         </p:nvSpPr>
         <p:spPr>
-          <a:xfrm rot="5400000">
-            <a:off x="13881039" y="7028513"/>
-            <a:ext cx="669973" cy="3315068"/>
+          <a:xfrm>
+            <a:off x="12801925" y="11927197"/>
+            <a:ext cx="485870" cy="1443520"/>
           </a:xfrm>
           <a:prstGeom prst="leftBrace">
             <a:avLst>
               <a:gd name="adj1" fmla="val 8333"/>
-              <a:gd name="adj2" fmla="val 82188"/>
+              <a:gd name="adj2" fmla="val 34253"/>
+            </a:avLst>
+          </a:prstGeom>
+          <a:ln w="38100">
+            <a:solidFill>
+              <a:srgbClr val="FF0000"/>
+            </a:solidFill>
+          </a:ln>
+        </p:spPr>
+        <p:style>
+          <a:lnRef idx="1">
+            <a:schemeClr val="accent1"/>
+          </a:lnRef>
+          <a:fillRef idx="0">
+            <a:schemeClr val="accent1"/>
+          </a:fillRef>
+          <a:effectRef idx="0">
+            <a:schemeClr val="accent1"/>
+          </a:effectRef>
+          <a:fontRef idx="minor">
+            <a:schemeClr val="tx1"/>
+          </a:fontRef>
+        </p:style>
+        <p:txBody>
+          <a:bodyPr rtlCol="0" anchor="ctr"/>
+          <a:lstStyle/>
+          <a:p>
+            <a:pPr algn="ctr"/>
+            <a:endParaRPr lang="en-GB" sz="2025" dirty="0"/>
+          </a:p>
+        </p:txBody>
+      </p:sp>
+      <p:sp>
+        <p:nvSpPr>
+          <p:cNvPr id="42" name="Left Brace 41">
+            <a:extLst>
+              <a:ext uri="{FF2B5EF4-FFF2-40B4-BE49-F238E27FC236}">
+                <a16:creationId xmlns:a16="http://schemas.microsoft.com/office/drawing/2014/main" id="{68297AD5-5ED6-4FE2-A0AB-A46E54BD1626}"/>
+              </a:ext>
+            </a:extLst>
+          </p:cNvPr>
+          <p:cNvSpPr/>
+          <p:nvPr/>
+        </p:nvSpPr>
+        <p:spPr>
+          <a:xfrm>
+            <a:off x="12801925" y="11095347"/>
+            <a:ext cx="485870" cy="782472"/>
+          </a:xfrm>
+          <a:prstGeom prst="leftBrace">
+            <a:avLst>
+              <a:gd name="adj1" fmla="val 8333"/>
+              <a:gd name="adj2" fmla="val 52176"/>
+            </a:avLst>
+          </a:prstGeom>
+          <a:ln w="38100">
+            <a:solidFill>
+              <a:schemeClr val="accent6"/>
+            </a:solidFill>
+          </a:ln>
+        </p:spPr>
+        <p:style>
+          <a:lnRef idx="1">
+            <a:schemeClr val="accent1"/>
+          </a:lnRef>
+          <a:fillRef idx="0">
+            <a:schemeClr val="accent1"/>
+          </a:fillRef>
+          <a:effectRef idx="0">
+            <a:schemeClr val="accent1"/>
+          </a:effectRef>
+          <a:fontRef idx="minor">
+            <a:schemeClr val="tx1"/>
+          </a:fontRef>
+        </p:style>
+        <p:txBody>
+          <a:bodyPr rtlCol="0" anchor="ctr"/>
+          <a:lstStyle/>
+          <a:p>
+            <a:pPr algn="ctr"/>
+            <a:endParaRPr lang="en-GB" sz="2025" dirty="0"/>
+          </a:p>
+        </p:txBody>
+      </p:sp>
+      <p:pic>
+        <p:nvPicPr>
+          <p:cNvPr id="29" name="Picture 28" descr="A screenshot of a cell phone&#10;&#10;Description automatically generated">
+            <a:extLst>
+              <a:ext uri="{FF2B5EF4-FFF2-40B4-BE49-F238E27FC236}">
+                <a16:creationId xmlns:a16="http://schemas.microsoft.com/office/drawing/2014/main" id="{DB0B8046-6D65-4324-A508-6F926FB842A4}"/>
+              </a:ext>
+            </a:extLst>
+          </p:cNvPr>
+          <p:cNvPicPr>
+            <a:picLocks noChangeAspect="1"/>
+          </p:cNvPicPr>
+          <p:nvPr/>
+        </p:nvPicPr>
+        <p:blipFill>
+          <a:blip r:embed="rId12">
+            <a:extLst>
+              <a:ext uri="{28A0092B-C50C-407E-A947-70E740481C1C}">
+                <a14:useLocalDpi xmlns:a14="http://schemas.microsoft.com/office/drawing/2010/main" val="0"/>
+              </a:ext>
+            </a:extLst>
+          </a:blip>
+          <a:stretch>
+            <a:fillRect/>
+          </a:stretch>
+        </p:blipFill>
+        <p:spPr>
+          <a:xfrm>
+            <a:off x="11542233" y="10030935"/>
+            <a:ext cx="1305432" cy="2683725"/>
+          </a:xfrm>
+          <a:prstGeom prst="rect">
+            <a:avLst/>
+          </a:prstGeom>
+        </p:spPr>
+      </p:pic>
+      <p:sp>
+        <p:nvSpPr>
+          <p:cNvPr id="30" name="Left Brace 29">
+            <a:extLst>
+              <a:ext uri="{FF2B5EF4-FFF2-40B4-BE49-F238E27FC236}">
+                <a16:creationId xmlns:a16="http://schemas.microsoft.com/office/drawing/2014/main" id="{3E44B7B7-CD1E-4EE2-B996-8B77D6AE9EF4}"/>
+              </a:ext>
+            </a:extLst>
+          </p:cNvPr>
+          <p:cNvSpPr/>
+          <p:nvPr/>
+        </p:nvSpPr>
+        <p:spPr>
+          <a:xfrm rot="5400000">
+            <a:off x="11075569" y="5494467"/>
+            <a:ext cx="669973" cy="8912806"/>
+          </a:xfrm>
+          <a:prstGeom prst="leftBrace">
+            <a:avLst>
+              <a:gd name="adj1" fmla="val 8333"/>
+              <a:gd name="adj2" fmla="val 51139"/>
             </a:avLst>
           </a:prstGeom>
           <a:ln w="38100">
@@ -13619,10 +13863,10 @@
       </p:sp>
       <p:pic>
         <p:nvPicPr>
-          <p:cNvPr id="17" name="Picture 16">
-            <a:extLst>
-              <a:ext uri="{FF2B5EF4-FFF2-40B4-BE49-F238E27FC236}">
-                <a16:creationId xmlns:a16="http://schemas.microsoft.com/office/drawing/2014/main" id="{2A510AD6-A12F-4614-8D5F-EAA53E47B411}"/>
+          <p:cNvPr id="39" name="Picture 38">
+            <a:extLst>
+              <a:ext uri="{FF2B5EF4-FFF2-40B4-BE49-F238E27FC236}">
+                <a16:creationId xmlns:a16="http://schemas.microsoft.com/office/drawing/2014/main" id="{5E8338BF-3C0E-4D21-82FF-37CD415C1135}"/>
               </a:ext>
             </a:extLst>
           </p:cNvPr>
@@ -13632,229 +13876,7 @@
           <p:nvPr/>
         </p:nvPicPr>
         <p:blipFill>
-          <a:blip r:embed="rId12"/>
-          <a:stretch>
-            <a:fillRect/>
-          </a:stretch>
-        </p:blipFill>
-        <p:spPr>
-          <a:xfrm>
-            <a:off x="13147286" y="11979308"/>
-            <a:ext cx="2754851" cy="1371384"/>
-          </a:xfrm>
-          <a:prstGeom prst="rect">
-            <a:avLst/>
-          </a:prstGeom>
-        </p:spPr>
-      </p:pic>
-      <p:sp>
-        <p:nvSpPr>
-          <p:cNvPr id="46" name="Left Brace 45">
-            <a:extLst>
-              <a:ext uri="{FF2B5EF4-FFF2-40B4-BE49-F238E27FC236}">
-                <a16:creationId xmlns:a16="http://schemas.microsoft.com/office/drawing/2014/main" id="{E4084E21-75CC-4798-B255-E8B429C83765}"/>
-              </a:ext>
-            </a:extLst>
-          </p:cNvPr>
-          <p:cNvSpPr/>
-          <p:nvPr/>
-        </p:nvSpPr>
-        <p:spPr>
-          <a:xfrm>
-            <a:off x="12801925" y="11927197"/>
-            <a:ext cx="485870" cy="1443520"/>
-          </a:xfrm>
-          <a:prstGeom prst="leftBrace">
-            <a:avLst>
-              <a:gd name="adj1" fmla="val 8333"/>
-              <a:gd name="adj2" fmla="val 34253"/>
-            </a:avLst>
-          </a:prstGeom>
-          <a:ln w="38100">
-            <a:solidFill>
-              <a:srgbClr val="FF0000"/>
-            </a:solidFill>
-          </a:ln>
-        </p:spPr>
-        <p:style>
-          <a:lnRef idx="1">
-            <a:schemeClr val="accent1"/>
-          </a:lnRef>
-          <a:fillRef idx="0">
-            <a:schemeClr val="accent1"/>
-          </a:fillRef>
-          <a:effectRef idx="0">
-            <a:schemeClr val="accent1"/>
-          </a:effectRef>
-          <a:fontRef idx="minor">
-            <a:schemeClr val="tx1"/>
-          </a:fontRef>
-        </p:style>
-        <p:txBody>
-          <a:bodyPr rtlCol="0" anchor="ctr"/>
-          <a:lstStyle/>
-          <a:p>
-            <a:pPr algn="ctr"/>
-            <a:endParaRPr lang="en-GB" sz="2025" dirty="0"/>
-          </a:p>
-        </p:txBody>
-      </p:sp>
-      <p:sp>
-        <p:nvSpPr>
-          <p:cNvPr id="42" name="Left Brace 41">
-            <a:extLst>
-              <a:ext uri="{FF2B5EF4-FFF2-40B4-BE49-F238E27FC236}">
-                <a16:creationId xmlns:a16="http://schemas.microsoft.com/office/drawing/2014/main" id="{68297AD5-5ED6-4FE2-A0AB-A46E54BD1626}"/>
-              </a:ext>
-            </a:extLst>
-          </p:cNvPr>
-          <p:cNvSpPr/>
-          <p:nvPr/>
-        </p:nvSpPr>
-        <p:spPr>
-          <a:xfrm>
-            <a:off x="12801925" y="11095347"/>
-            <a:ext cx="485870" cy="782472"/>
-          </a:xfrm>
-          <a:prstGeom prst="leftBrace">
-            <a:avLst>
-              <a:gd name="adj1" fmla="val 8333"/>
-              <a:gd name="adj2" fmla="val 52176"/>
-            </a:avLst>
-          </a:prstGeom>
-          <a:ln w="38100">
-            <a:solidFill>
-              <a:schemeClr val="accent6"/>
-            </a:solidFill>
-          </a:ln>
-        </p:spPr>
-        <p:style>
-          <a:lnRef idx="1">
-            <a:schemeClr val="accent1"/>
-          </a:lnRef>
-          <a:fillRef idx="0">
-            <a:schemeClr val="accent1"/>
-          </a:fillRef>
-          <a:effectRef idx="0">
-            <a:schemeClr val="accent1"/>
-          </a:effectRef>
-          <a:fontRef idx="minor">
-            <a:schemeClr val="tx1"/>
-          </a:fontRef>
-        </p:style>
-        <p:txBody>
-          <a:bodyPr rtlCol="0" anchor="ctr"/>
-          <a:lstStyle/>
-          <a:p>
-            <a:pPr algn="ctr"/>
-            <a:endParaRPr lang="en-GB" sz="2025" dirty="0"/>
-          </a:p>
-        </p:txBody>
-      </p:sp>
-      <p:pic>
-        <p:nvPicPr>
-          <p:cNvPr id="29" name="Picture 28" descr="A screenshot of a cell phone&#10;&#10;Description automatically generated">
-            <a:extLst>
-              <a:ext uri="{FF2B5EF4-FFF2-40B4-BE49-F238E27FC236}">
-                <a16:creationId xmlns:a16="http://schemas.microsoft.com/office/drawing/2014/main" id="{DB0B8046-6D65-4324-A508-6F926FB842A4}"/>
-              </a:ext>
-            </a:extLst>
-          </p:cNvPr>
-          <p:cNvPicPr>
-            <a:picLocks noChangeAspect="1"/>
-          </p:cNvPicPr>
-          <p:nvPr/>
-        </p:nvPicPr>
-        <p:blipFill>
-          <a:blip r:embed="rId13">
-            <a:extLst>
-              <a:ext uri="{28A0092B-C50C-407E-A947-70E740481C1C}">
-                <a14:useLocalDpi xmlns:a14="http://schemas.microsoft.com/office/drawing/2010/main" val="0"/>
-              </a:ext>
-            </a:extLst>
-          </a:blip>
-          <a:stretch>
-            <a:fillRect/>
-          </a:stretch>
-        </p:blipFill>
-        <p:spPr>
-          <a:xfrm>
-            <a:off x="11542233" y="10030935"/>
-            <a:ext cx="1305432" cy="2683725"/>
-          </a:xfrm>
-          <a:prstGeom prst="rect">
-            <a:avLst/>
-          </a:prstGeom>
-        </p:spPr>
-      </p:pic>
-      <p:sp>
-        <p:nvSpPr>
-          <p:cNvPr id="30" name="Left Brace 29">
-            <a:extLst>
-              <a:ext uri="{FF2B5EF4-FFF2-40B4-BE49-F238E27FC236}">
-                <a16:creationId xmlns:a16="http://schemas.microsoft.com/office/drawing/2014/main" id="{3E44B7B7-CD1E-4EE2-B996-8B77D6AE9EF4}"/>
-              </a:ext>
-            </a:extLst>
-          </p:cNvPr>
-          <p:cNvSpPr/>
-          <p:nvPr/>
-        </p:nvSpPr>
-        <p:spPr>
-          <a:xfrm rot="5400000">
-            <a:off x="11075569" y="5494467"/>
-            <a:ext cx="669973" cy="8912806"/>
-          </a:xfrm>
-          <a:prstGeom prst="leftBrace">
-            <a:avLst>
-              <a:gd name="adj1" fmla="val 8333"/>
-              <a:gd name="adj2" fmla="val 51139"/>
-            </a:avLst>
-          </a:prstGeom>
-          <a:ln w="38100">
-            <a:solidFill>
-              <a:schemeClr val="accent4"/>
-            </a:solidFill>
-          </a:ln>
-        </p:spPr>
-        <p:style>
-          <a:lnRef idx="1">
-            <a:schemeClr val="accent1"/>
-          </a:lnRef>
-          <a:fillRef idx="0">
-            <a:schemeClr val="accent1"/>
-          </a:fillRef>
-          <a:effectRef idx="0">
-            <a:schemeClr val="accent1"/>
-          </a:effectRef>
-          <a:fontRef idx="minor">
-            <a:schemeClr val="tx1"/>
-          </a:fontRef>
-        </p:style>
-        <p:txBody>
-          <a:bodyPr rtlCol="0" anchor="ctr"/>
-          <a:lstStyle/>
-          <a:p>
-            <a:pPr algn="ctr"/>
-            <a:endParaRPr lang="en-GB" sz="2025" dirty="0"/>
-          </a:p>
-        </p:txBody>
-      </p:sp>
-      <p:pic>
-        <p:nvPicPr>
-          <p:cNvPr id="39" name="Picture 38">
-            <a:extLst>
-              <a:ext uri="{FF2B5EF4-FFF2-40B4-BE49-F238E27FC236}">
-                <a16:creationId xmlns:a16="http://schemas.microsoft.com/office/drawing/2014/main" id="{5E8338BF-3C0E-4D21-82FF-37CD415C1135}"/>
-              </a:ext>
-            </a:extLst>
-          </p:cNvPr>
-          <p:cNvPicPr>
-            <a:picLocks noChangeAspect="1"/>
-          </p:cNvPicPr>
-          <p:nvPr/>
-        </p:nvPicPr>
-        <p:blipFill>
-          <a:blip r:embed="rId14"/>
+          <a:blip r:embed="rId13"/>
           <a:stretch>
             <a:fillRect/>
           </a:stretch>
@@ -14086,6 +14108,36 @@
           <p:nvPr/>
         </p:nvPicPr>
         <p:blipFill>
+          <a:blip r:embed="rId14"/>
+          <a:stretch>
+            <a:fillRect/>
+          </a:stretch>
+        </p:blipFill>
+        <p:spPr>
+          <a:xfrm>
+            <a:off x="133153" y="88354"/>
+            <a:ext cx="892528" cy="579404"/>
+          </a:xfrm>
+          <a:prstGeom prst="rect">
+            <a:avLst/>
+          </a:prstGeom>
+        </p:spPr>
+      </p:pic>
+      <p:pic>
+        <p:nvPicPr>
+          <p:cNvPr id="3" name="Picture 2">
+            <a:extLst>
+              <a:ext uri="{FF2B5EF4-FFF2-40B4-BE49-F238E27FC236}">
+                <a16:creationId xmlns:a16="http://schemas.microsoft.com/office/drawing/2014/main" id="{BAC2FA6D-7E44-4A70-ABBF-441AC58C61D8}"/>
+              </a:ext>
+            </a:extLst>
+          </p:cNvPr>
+          <p:cNvPicPr>
+            <a:picLocks noChangeAspect="1"/>
+          </p:cNvPicPr>
+          <p:nvPr/>
+        </p:nvPicPr>
+        <p:blipFill>
           <a:blip r:embed="rId15"/>
           <a:stretch>
             <a:fillRect/>
@@ -14093,36 +14145,6 @@
         </p:blipFill>
         <p:spPr>
           <a:xfrm>
-            <a:off x="133153" y="88354"/>
-            <a:ext cx="892528" cy="579404"/>
-          </a:xfrm>
-          <a:prstGeom prst="rect">
-            <a:avLst/>
-          </a:prstGeom>
-        </p:spPr>
-      </p:pic>
-      <p:pic>
-        <p:nvPicPr>
-          <p:cNvPr id="3" name="Picture 2">
-            <a:extLst>
-              <a:ext uri="{FF2B5EF4-FFF2-40B4-BE49-F238E27FC236}">
-                <a16:creationId xmlns:a16="http://schemas.microsoft.com/office/drawing/2014/main" id="{BAC2FA6D-7E44-4A70-ABBF-441AC58C61D8}"/>
-              </a:ext>
-            </a:extLst>
-          </p:cNvPr>
-          <p:cNvPicPr>
-            <a:picLocks noChangeAspect="1"/>
-          </p:cNvPicPr>
-          <p:nvPr/>
-        </p:nvPicPr>
-        <p:blipFill>
-          <a:blip r:embed="rId16"/>
-          <a:stretch>
-            <a:fillRect/>
-          </a:stretch>
-        </p:blipFill>
-        <p:spPr>
-          <a:xfrm>
             <a:off x="133153" y="1727119"/>
             <a:ext cx="892528" cy="586800"/>
           </a:xfrm>
@@ -14146,7 +14168,7 @@
           <p:nvPr/>
         </p:nvPicPr>
         <p:blipFill>
-          <a:blip r:embed="rId17"/>
+          <a:blip r:embed="rId16"/>
           <a:stretch>
             <a:fillRect/>
           </a:stretch>
@@ -14337,7 +14359,7 @@
           <p:nvPr/>
         </p:nvPicPr>
         <p:blipFill>
-          <a:blip r:embed="rId18">
+          <a:blip r:embed="rId17">
             <a:extLst>
               <a:ext uri="{28A0092B-C50C-407E-A947-70E740481C1C}">
                 <a14:useLocalDpi xmlns:a14="http://schemas.microsoft.com/office/drawing/2010/main" val="0"/>
@@ -14549,7 +14571,7 @@
           <p:nvPr/>
         </p:nvPicPr>
         <p:blipFill>
-          <a:blip r:embed="rId19"/>
+          <a:blip r:embed="rId18"/>
           <a:stretch>
             <a:fillRect/>
           </a:stretch>
@@ -14615,7 +14637,7 @@
           <p:nvPr/>
         </p:nvPicPr>
         <p:blipFill rotWithShape="1">
-          <a:blip r:embed="rId20">
+          <a:blip r:embed="rId19">
             <a:extLst>
               <a:ext uri="{28A0092B-C50C-407E-A947-70E740481C1C}">
                 <a14:useLocalDpi xmlns:a14="http://schemas.microsoft.com/office/drawing/2010/main" val="0"/>
@@ -14676,6 +14698,36 @@
             <a:extLst>
               <a:ext uri="{FF2B5EF4-FFF2-40B4-BE49-F238E27FC236}">
                 <a16:creationId xmlns:a16="http://schemas.microsoft.com/office/drawing/2014/main" id="{87800AD7-8FBA-429D-A4A3-79974C850BB9}"/>
+              </a:ext>
+            </a:extLst>
+          </p:cNvPr>
+          <p:cNvPicPr>
+            <a:picLocks noChangeAspect="1"/>
+          </p:cNvPicPr>
+          <p:nvPr/>
+        </p:nvPicPr>
+        <p:blipFill>
+          <a:blip r:embed="rId20"/>
+          <a:stretch>
+            <a:fillRect/>
+          </a:stretch>
+        </p:blipFill>
+        <p:spPr>
+          <a:xfrm>
+            <a:off x="343880" y="671388"/>
+            <a:ext cx="471078" cy="474308"/>
+          </a:xfrm>
+          <a:prstGeom prst="rect">
+            <a:avLst/>
+          </a:prstGeom>
+        </p:spPr>
+      </p:pic>
+      <p:pic>
+        <p:nvPicPr>
+          <p:cNvPr id="35" name="Picture 34">
+            <a:extLst>
+              <a:ext uri="{FF2B5EF4-FFF2-40B4-BE49-F238E27FC236}">
+                <a16:creationId xmlns:a16="http://schemas.microsoft.com/office/drawing/2014/main" id="{EE2A7D45-D02A-493A-B5A6-868A538E108B}"/>
               </a:ext>
             </a:extLst>
           </p:cNvPr>
@@ -14692,36 +14744,6 @@
         </p:blipFill>
         <p:spPr>
           <a:xfrm>
-            <a:off x="343880" y="671388"/>
-            <a:ext cx="471078" cy="474308"/>
-          </a:xfrm>
-          <a:prstGeom prst="rect">
-            <a:avLst/>
-          </a:prstGeom>
-        </p:spPr>
-      </p:pic>
-      <p:pic>
-        <p:nvPicPr>
-          <p:cNvPr id="35" name="Picture 34">
-            <a:extLst>
-              <a:ext uri="{FF2B5EF4-FFF2-40B4-BE49-F238E27FC236}">
-                <a16:creationId xmlns:a16="http://schemas.microsoft.com/office/drawing/2014/main" id="{EE2A7D45-D02A-493A-B5A6-868A538E108B}"/>
-              </a:ext>
-            </a:extLst>
-          </p:cNvPr>
-          <p:cNvPicPr>
-            <a:picLocks noChangeAspect="1"/>
-          </p:cNvPicPr>
-          <p:nvPr/>
-        </p:nvPicPr>
-        <p:blipFill>
-          <a:blip r:embed="rId22"/>
-          <a:stretch>
-            <a:fillRect/>
-          </a:stretch>
-        </p:blipFill>
-        <p:spPr>
-          <a:xfrm>
             <a:off x="7334032" y="6838901"/>
             <a:ext cx="6643269" cy="2819406"/>
           </a:xfrm>
@@ -14797,7 +14819,7 @@
           <p:nvPr/>
         </p:nvPicPr>
         <p:blipFill>
-          <a:blip r:embed="rId23"/>
+          <a:blip r:embed="rId22"/>
           <a:stretch>
             <a:fillRect/>
           </a:stretch>
@@ -14847,7 +14869,7 @@
             <p:nvPr/>
           </p:nvPicPr>
           <p:blipFill>
-            <a:blip r:embed="rId24">
+            <a:blip r:embed="rId23">
               <a:extLst>
                 <a:ext uri="{28A0092B-C50C-407E-A947-70E740481C1C}">
                   <a14:useLocalDpi xmlns:a14="http://schemas.microsoft.com/office/drawing/2010/main" val="0"/>
@@ -14883,7 +14905,7 @@
             <p:nvPr/>
           </p:nvPicPr>
           <p:blipFill>
-            <a:blip r:embed="rId25"/>
+            <a:blip r:embed="rId24"/>
             <a:stretch>
               <a:fillRect/>
             </a:stretch>
@@ -14899,58 +14921,6 @@
           </p:spPr>
         </p:pic>
       </p:grpSp>
-      <p:sp>
-        <p:nvSpPr>
-          <p:cNvPr id="73" name="Left Brace 72">
-            <a:extLst>
-              <a:ext uri="{FF2B5EF4-FFF2-40B4-BE49-F238E27FC236}">
-                <a16:creationId xmlns:a16="http://schemas.microsoft.com/office/drawing/2014/main" id="{7A8E53C1-5EB3-47F6-8B17-903ED881EC12}"/>
-              </a:ext>
-            </a:extLst>
-          </p:cNvPr>
-          <p:cNvSpPr/>
-          <p:nvPr/>
-        </p:nvSpPr>
-        <p:spPr>
-          <a:xfrm>
-            <a:off x="12801925" y="10256128"/>
-            <a:ext cx="485870" cy="782472"/>
-          </a:xfrm>
-          <a:prstGeom prst="leftBrace">
-            <a:avLst>
-              <a:gd name="adj1" fmla="val 8333"/>
-              <a:gd name="adj2" fmla="val 55098"/>
-            </a:avLst>
-          </a:prstGeom>
-          <a:ln w="38100">
-            <a:solidFill>
-              <a:schemeClr val="accent4"/>
-            </a:solidFill>
-          </a:ln>
-        </p:spPr>
-        <p:style>
-          <a:lnRef idx="1">
-            <a:schemeClr val="accent1"/>
-          </a:lnRef>
-          <a:fillRef idx="0">
-            <a:schemeClr val="accent1"/>
-          </a:fillRef>
-          <a:effectRef idx="0">
-            <a:schemeClr val="accent1"/>
-          </a:effectRef>
-          <a:fontRef idx="minor">
-            <a:schemeClr val="tx1"/>
-          </a:fontRef>
-        </p:style>
-        <p:txBody>
-          <a:bodyPr rtlCol="0" anchor="ctr"/>
-          <a:lstStyle/>
-          <a:p>
-            <a:pPr algn="ctr"/>
-            <a:endParaRPr lang="en-GB" sz="2025" dirty="0"/>
-          </a:p>
-        </p:txBody>
-      </p:sp>
       <p:cxnSp>
         <p:nvCxnSpPr>
           <p:cNvPr id="33" name="Straight Connector 32">
@@ -15043,6 +15013,87 @@
           </a:fontRef>
         </p:style>
       </p:cxnSp>
+      <p:grpSp>
+        <p:nvGrpSpPr>
+          <p:cNvPr id="43" name="Group 42">
+            <a:extLst>
+              <a:ext uri="{FF2B5EF4-FFF2-40B4-BE49-F238E27FC236}">
+                <a16:creationId xmlns:a16="http://schemas.microsoft.com/office/drawing/2014/main" id="{45F19378-2B4E-41D8-AABE-EFDAEC478FEC}"/>
+              </a:ext>
+            </a:extLst>
+          </p:cNvPr>
+          <p:cNvGrpSpPr/>
+          <p:nvPr/>
+        </p:nvGrpSpPr>
+        <p:grpSpPr>
+          <a:xfrm>
+            <a:off x="6969989" y="4502442"/>
+            <a:ext cx="4478392" cy="692724"/>
+            <a:chOff x="6969989" y="4502442"/>
+            <a:chExt cx="4478392" cy="692724"/>
+          </a:xfrm>
+        </p:grpSpPr>
+        <p:pic>
+          <p:nvPicPr>
+            <p:cNvPr id="9" name="Picture 8">
+              <a:extLst>
+                <a:ext uri="{FF2B5EF4-FFF2-40B4-BE49-F238E27FC236}">
+                  <a16:creationId xmlns:a16="http://schemas.microsoft.com/office/drawing/2014/main" id="{830ECE33-9E5F-4091-9D12-99B9CAA53606}"/>
+                </a:ext>
+              </a:extLst>
+            </p:cNvPr>
+            <p:cNvPicPr>
+              <a:picLocks noChangeAspect="1"/>
+            </p:cNvPicPr>
+            <p:nvPr/>
+          </p:nvPicPr>
+          <p:blipFill>
+            <a:blip r:embed="rId25"/>
+            <a:stretch>
+              <a:fillRect/>
+            </a:stretch>
+          </p:blipFill>
+          <p:spPr>
+            <a:xfrm>
+              <a:off x="6998765" y="4531154"/>
+              <a:ext cx="4449616" cy="641100"/>
+            </a:xfrm>
+            <a:prstGeom prst="rect">
+              <a:avLst/>
+            </a:prstGeom>
+          </p:spPr>
+        </p:pic>
+        <p:pic>
+          <p:nvPicPr>
+            <p:cNvPr id="31" name="Picture 30">
+              <a:extLst>
+                <a:ext uri="{FF2B5EF4-FFF2-40B4-BE49-F238E27FC236}">
+                  <a16:creationId xmlns:a16="http://schemas.microsoft.com/office/drawing/2014/main" id="{2D8F6489-47E7-4786-8B5B-EB5910CD260F}"/>
+                </a:ext>
+              </a:extLst>
+            </p:cNvPr>
+            <p:cNvPicPr>
+              <a:picLocks noChangeAspect="1"/>
+            </p:cNvPicPr>
+            <p:nvPr/>
+          </p:nvPicPr>
+          <p:blipFill>
+            <a:blip r:embed="rId26"/>
+            <a:stretch>
+              <a:fillRect/>
+            </a:stretch>
+          </p:blipFill>
+          <p:spPr>
+            <a:xfrm>
+              <a:off x="6969989" y="4502442"/>
+              <a:ext cx="1503210" cy="692724"/>
+            </a:xfrm>
+            <a:prstGeom prst="rect">
+              <a:avLst/>
+            </a:prstGeom>
+          </p:spPr>
+        </p:pic>
+      </p:grpSp>
     </p:spTree>
     <p:extLst>
       <p:ext uri="{BB962C8B-B14F-4D97-AF65-F5344CB8AC3E}">

</xml_diff>

<commit_message>
Image and readme prelease updates
</commit_message>
<xml_diff>
--- a/Images/All ADF Activities.pptx
+++ b/Images/All ADF Activities.pptx
@@ -14,7 +14,8 @@
     <p:sldId id="264" r:id="rId8"/>
     <p:sldId id="265" r:id="rId9"/>
     <p:sldId id="266" r:id="rId10"/>
-    <p:sldId id="260" r:id="rId11"/>
+    <p:sldId id="267" r:id="rId11"/>
+    <p:sldId id="260" r:id="rId12"/>
   </p:sldIdLst>
   <p:sldSz cx="16200438" cy="14400213"/>
   <p:notesSz cx="6858000" cy="9144000"/>
@@ -252,7 +253,7 @@
           <a:p>
             <a:fld id="{1F80DB50-5271-4B1A-976D-0A7715B55622}" type="datetimeFigureOut">
               <a:rPr lang="en-GB" smtClean="0"/>
-              <a:t>30/06/2020</a:t>
+              <a:t>22/07/2020</a:t>
             </a:fld>
             <a:endParaRPr lang="en-GB"/>
           </a:p>
@@ -422,7 +423,7 @@
           <a:p>
             <a:fld id="{1F80DB50-5271-4B1A-976D-0A7715B55622}" type="datetimeFigureOut">
               <a:rPr lang="en-GB" smtClean="0"/>
-              <a:t>30/06/2020</a:t>
+              <a:t>22/07/2020</a:t>
             </a:fld>
             <a:endParaRPr lang="en-GB"/>
           </a:p>
@@ -602,7 +603,7 @@
           <a:p>
             <a:fld id="{1F80DB50-5271-4B1A-976D-0A7715B55622}" type="datetimeFigureOut">
               <a:rPr lang="en-GB" smtClean="0"/>
-              <a:t>30/06/2020</a:t>
+              <a:t>22/07/2020</a:t>
             </a:fld>
             <a:endParaRPr lang="en-GB"/>
           </a:p>
@@ -772,7 +773,7 @@
           <a:p>
             <a:fld id="{1F80DB50-5271-4B1A-976D-0A7715B55622}" type="datetimeFigureOut">
               <a:rPr lang="en-GB" smtClean="0"/>
-              <a:t>30/06/2020</a:t>
+              <a:t>22/07/2020</a:t>
             </a:fld>
             <a:endParaRPr lang="en-GB"/>
           </a:p>
@@ -1016,7 +1017,7 @@
           <a:p>
             <a:fld id="{1F80DB50-5271-4B1A-976D-0A7715B55622}" type="datetimeFigureOut">
               <a:rPr lang="en-GB" smtClean="0"/>
-              <a:t>30/06/2020</a:t>
+              <a:t>22/07/2020</a:t>
             </a:fld>
             <a:endParaRPr lang="en-GB"/>
           </a:p>
@@ -1248,7 +1249,7 @@
           <a:p>
             <a:fld id="{1F80DB50-5271-4B1A-976D-0A7715B55622}" type="datetimeFigureOut">
               <a:rPr lang="en-GB" smtClean="0"/>
-              <a:t>30/06/2020</a:t>
+              <a:t>22/07/2020</a:t>
             </a:fld>
             <a:endParaRPr lang="en-GB"/>
           </a:p>
@@ -1615,7 +1616,7 @@
           <a:p>
             <a:fld id="{1F80DB50-5271-4B1A-976D-0A7715B55622}" type="datetimeFigureOut">
               <a:rPr lang="en-GB" smtClean="0"/>
-              <a:t>30/06/2020</a:t>
+              <a:t>22/07/2020</a:t>
             </a:fld>
             <a:endParaRPr lang="en-GB"/>
           </a:p>
@@ -1733,7 +1734,7 @@
           <a:p>
             <a:fld id="{1F80DB50-5271-4B1A-976D-0A7715B55622}" type="datetimeFigureOut">
               <a:rPr lang="en-GB" smtClean="0"/>
-              <a:t>30/06/2020</a:t>
+              <a:t>22/07/2020</a:t>
             </a:fld>
             <a:endParaRPr lang="en-GB"/>
           </a:p>
@@ -1828,7 +1829,7 @@
           <a:p>
             <a:fld id="{1F80DB50-5271-4B1A-976D-0A7715B55622}" type="datetimeFigureOut">
               <a:rPr lang="en-GB" smtClean="0"/>
-              <a:t>30/06/2020</a:t>
+              <a:t>22/07/2020</a:t>
             </a:fld>
             <a:endParaRPr lang="en-GB"/>
           </a:p>
@@ -2105,7 +2106,7 @@
           <a:p>
             <a:fld id="{1F80DB50-5271-4B1A-976D-0A7715B55622}" type="datetimeFigureOut">
               <a:rPr lang="en-GB" smtClean="0"/>
-              <a:t>30/06/2020</a:t>
+              <a:t>22/07/2020</a:t>
             </a:fld>
             <a:endParaRPr lang="en-GB"/>
           </a:p>
@@ -2362,7 +2363,7 @@
           <a:p>
             <a:fld id="{1F80DB50-5271-4B1A-976D-0A7715B55622}" type="datetimeFigureOut">
               <a:rPr lang="en-GB" smtClean="0"/>
-              <a:t>30/06/2020</a:t>
+              <a:t>22/07/2020</a:t>
             </a:fld>
             <a:endParaRPr lang="en-GB"/>
           </a:p>
@@ -2575,7 +2576,7 @@
           <a:p>
             <a:fld id="{1F80DB50-5271-4B1A-976D-0A7715B55622}" type="datetimeFigureOut">
               <a:rPr lang="en-GB" smtClean="0"/>
-              <a:t>30/06/2020</a:t>
+              <a:t>22/07/2020</a:t>
             </a:fld>
             <a:endParaRPr lang="en-GB"/>
           </a:p>
@@ -3707,6 +3708,2134 @@
 </file>
 
 <file path=ppt/slides/slide10.xml><?xml version="1.0" encoding="utf-8"?>
+<p:sld xmlns:a="http://schemas.openxmlformats.org/drawingml/2006/main" xmlns:r="http://schemas.openxmlformats.org/officeDocument/2006/relationships" xmlns:p="http://schemas.openxmlformats.org/presentationml/2006/main">
+  <p:cSld>
+    <p:spTree>
+      <p:nvGrpSpPr>
+        <p:cNvPr id="1" name=""/>
+        <p:cNvGrpSpPr/>
+        <p:nvPr/>
+      </p:nvGrpSpPr>
+      <p:grpSpPr>
+        <a:xfrm>
+          <a:off x="0" y="0"/>
+          <a:ext cx="0" cy="0"/>
+          <a:chOff x="0" y="0"/>
+          <a:chExt cx="0" cy="0"/>
+        </a:xfrm>
+      </p:grpSpPr>
+      <p:pic>
+        <p:nvPicPr>
+          <p:cNvPr id="75" name="Picture 74">
+            <a:extLst>
+              <a:ext uri="{FF2B5EF4-FFF2-40B4-BE49-F238E27FC236}">
+                <a16:creationId xmlns:a16="http://schemas.microsoft.com/office/drawing/2014/main" id="{0A7FCA97-BC83-46EB-9377-33A9CD4F2DBB}"/>
+              </a:ext>
+            </a:extLst>
+          </p:cNvPr>
+          <p:cNvPicPr>
+            <a:picLocks noChangeAspect="1"/>
+          </p:cNvPicPr>
+          <p:nvPr/>
+        </p:nvPicPr>
+        <p:blipFill>
+          <a:blip r:embed="rId2"/>
+          <a:stretch>
+            <a:fillRect/>
+          </a:stretch>
+        </p:blipFill>
+        <p:spPr>
+          <a:xfrm>
+            <a:off x="6164750" y="10008205"/>
+            <a:ext cx="6481178" cy="2093919"/>
+          </a:xfrm>
+          <a:prstGeom prst="rect">
+            <a:avLst/>
+          </a:prstGeom>
+        </p:spPr>
+      </p:pic>
+      <p:sp>
+        <p:nvSpPr>
+          <p:cNvPr id="30" name="Left Brace 29">
+            <a:extLst>
+              <a:ext uri="{FF2B5EF4-FFF2-40B4-BE49-F238E27FC236}">
+                <a16:creationId xmlns:a16="http://schemas.microsoft.com/office/drawing/2014/main" id="{3E44B7B7-CD1E-4EE2-B996-8B77D6AE9EF4}"/>
+              </a:ext>
+            </a:extLst>
+          </p:cNvPr>
+          <p:cNvSpPr/>
+          <p:nvPr/>
+        </p:nvSpPr>
+        <p:spPr>
+          <a:xfrm rot="5400000">
+            <a:off x="10646493" y="5065392"/>
+            <a:ext cx="669973" cy="9770958"/>
+          </a:xfrm>
+          <a:prstGeom prst="leftBrace">
+            <a:avLst>
+              <a:gd name="adj1" fmla="val 8333"/>
+              <a:gd name="adj2" fmla="val 43625"/>
+            </a:avLst>
+          </a:prstGeom>
+          <a:ln w="38100">
+            <a:solidFill>
+              <a:schemeClr val="accent4"/>
+            </a:solidFill>
+          </a:ln>
+        </p:spPr>
+        <p:style>
+          <a:lnRef idx="1">
+            <a:schemeClr val="accent1"/>
+          </a:lnRef>
+          <a:fillRef idx="0">
+            <a:schemeClr val="accent1"/>
+          </a:fillRef>
+          <a:effectRef idx="0">
+            <a:schemeClr val="accent1"/>
+          </a:effectRef>
+          <a:fontRef idx="minor">
+            <a:schemeClr val="tx1"/>
+          </a:fontRef>
+        </p:style>
+        <p:txBody>
+          <a:bodyPr rtlCol="0" anchor="ctr"/>
+          <a:lstStyle/>
+          <a:p>
+            <a:pPr algn="ctr"/>
+            <a:endParaRPr lang="en-GB" sz="2025" dirty="0"/>
+          </a:p>
+        </p:txBody>
+      </p:sp>
+      <p:sp>
+        <p:nvSpPr>
+          <p:cNvPr id="49" name="Left Brace 48">
+            <a:extLst>
+              <a:ext uri="{FF2B5EF4-FFF2-40B4-BE49-F238E27FC236}">
+                <a16:creationId xmlns:a16="http://schemas.microsoft.com/office/drawing/2014/main" id="{B33C836E-9730-4830-AB37-468222FE110C}"/>
+              </a:ext>
+            </a:extLst>
+          </p:cNvPr>
+          <p:cNvSpPr/>
+          <p:nvPr/>
+        </p:nvSpPr>
+        <p:spPr>
+          <a:xfrm rot="5400000">
+            <a:off x="14166789" y="7247588"/>
+            <a:ext cx="669973" cy="3315068"/>
+          </a:xfrm>
+          <a:prstGeom prst="leftBrace">
+            <a:avLst>
+              <a:gd name="adj1" fmla="val 8333"/>
+              <a:gd name="adj2" fmla="val 26447"/>
+            </a:avLst>
+          </a:prstGeom>
+          <a:ln w="38100">
+            <a:solidFill>
+              <a:schemeClr val="accent4"/>
+            </a:solidFill>
+          </a:ln>
+        </p:spPr>
+        <p:style>
+          <a:lnRef idx="1">
+            <a:schemeClr val="accent1"/>
+          </a:lnRef>
+          <a:fillRef idx="0">
+            <a:schemeClr val="accent1"/>
+          </a:fillRef>
+          <a:effectRef idx="0">
+            <a:schemeClr val="accent1"/>
+          </a:effectRef>
+          <a:fontRef idx="minor">
+            <a:schemeClr val="tx1"/>
+          </a:fontRef>
+        </p:style>
+        <p:txBody>
+          <a:bodyPr rtlCol="0" anchor="ctr"/>
+          <a:lstStyle/>
+          <a:p>
+            <a:pPr algn="ctr"/>
+            <a:endParaRPr lang="en-GB" sz="2025" dirty="0"/>
+          </a:p>
+        </p:txBody>
+      </p:sp>
+      <p:pic>
+        <p:nvPicPr>
+          <p:cNvPr id="69" name="Picture 68">
+            <a:extLst>
+              <a:ext uri="{FF2B5EF4-FFF2-40B4-BE49-F238E27FC236}">
+                <a16:creationId xmlns:a16="http://schemas.microsoft.com/office/drawing/2014/main" id="{5545F5FD-0A29-4733-8303-08F072A9065F}"/>
+              </a:ext>
+            </a:extLst>
+          </p:cNvPr>
+          <p:cNvPicPr>
+            <a:picLocks noChangeAspect="1"/>
+          </p:cNvPicPr>
+          <p:nvPr/>
+        </p:nvPicPr>
+        <p:blipFill>
+          <a:blip r:embed="rId3"/>
+          <a:stretch>
+            <a:fillRect/>
+          </a:stretch>
+        </p:blipFill>
+        <p:spPr>
+          <a:xfrm>
+            <a:off x="7152277" y="6801268"/>
+            <a:ext cx="8912807" cy="2867003"/>
+          </a:xfrm>
+          <a:prstGeom prst="rect">
+            <a:avLst/>
+          </a:prstGeom>
+        </p:spPr>
+      </p:pic>
+      <p:pic>
+        <p:nvPicPr>
+          <p:cNvPr id="68" name="Picture 67">
+            <a:extLst>
+              <a:ext uri="{FF2B5EF4-FFF2-40B4-BE49-F238E27FC236}">
+                <a16:creationId xmlns:a16="http://schemas.microsoft.com/office/drawing/2014/main" id="{42CFFB3A-F8E1-49EA-8D69-A578AEF91F79}"/>
+              </a:ext>
+            </a:extLst>
+          </p:cNvPr>
+          <p:cNvPicPr>
+            <a:picLocks noChangeAspect="1"/>
+          </p:cNvPicPr>
+          <p:nvPr/>
+        </p:nvPicPr>
+        <p:blipFill>
+          <a:blip r:embed="rId4"/>
+          <a:stretch>
+            <a:fillRect/>
+          </a:stretch>
+        </p:blipFill>
+        <p:spPr>
+          <a:xfrm>
+            <a:off x="146132" y="4491589"/>
+            <a:ext cx="4886071" cy="2610081"/>
+          </a:xfrm>
+          <a:prstGeom prst="rect">
+            <a:avLst/>
+          </a:prstGeom>
+        </p:spPr>
+      </p:pic>
+      <p:sp>
+        <p:nvSpPr>
+          <p:cNvPr id="15" name="Left Brace 14">
+            <a:extLst>
+              <a:ext uri="{FF2B5EF4-FFF2-40B4-BE49-F238E27FC236}">
+                <a16:creationId xmlns:a16="http://schemas.microsoft.com/office/drawing/2014/main" id="{E4F55F19-6D3D-40FC-9579-C24CDFA3E5B6}"/>
+              </a:ext>
+            </a:extLst>
+          </p:cNvPr>
+          <p:cNvSpPr/>
+          <p:nvPr/>
+        </p:nvSpPr>
+        <p:spPr>
+          <a:xfrm rot="5400000">
+            <a:off x="8949423" y="2174648"/>
+            <a:ext cx="508102" cy="4546963"/>
+          </a:xfrm>
+          <a:prstGeom prst="leftBrace">
+            <a:avLst>
+              <a:gd name="adj1" fmla="val 8333"/>
+              <a:gd name="adj2" fmla="val 41551"/>
+            </a:avLst>
+          </a:prstGeom>
+          <a:ln w="38100">
+            <a:solidFill>
+              <a:schemeClr val="accent4"/>
+            </a:solidFill>
+          </a:ln>
+        </p:spPr>
+        <p:style>
+          <a:lnRef idx="1">
+            <a:schemeClr val="accent1"/>
+          </a:lnRef>
+          <a:fillRef idx="0">
+            <a:schemeClr val="accent1"/>
+          </a:fillRef>
+          <a:effectRef idx="0">
+            <a:schemeClr val="accent1"/>
+          </a:effectRef>
+          <a:fontRef idx="minor">
+            <a:schemeClr val="tx1"/>
+          </a:fontRef>
+        </p:style>
+        <p:txBody>
+          <a:bodyPr rtlCol="0" anchor="ctr"/>
+          <a:lstStyle/>
+          <a:p>
+            <a:pPr algn="ctr"/>
+            <a:endParaRPr lang="en-GB" sz="2025" dirty="0"/>
+          </a:p>
+        </p:txBody>
+      </p:sp>
+      <p:grpSp>
+        <p:nvGrpSpPr>
+          <p:cNvPr id="26" name="Group 25">
+            <a:extLst>
+              <a:ext uri="{FF2B5EF4-FFF2-40B4-BE49-F238E27FC236}">
+                <a16:creationId xmlns:a16="http://schemas.microsoft.com/office/drawing/2014/main" id="{A3A2006A-3883-445D-B8E9-AD0DF7F16421}"/>
+              </a:ext>
+            </a:extLst>
+          </p:cNvPr>
+          <p:cNvGrpSpPr/>
+          <p:nvPr/>
+        </p:nvGrpSpPr>
+        <p:grpSpPr>
+          <a:xfrm>
+            <a:off x="1836674" y="1636751"/>
+            <a:ext cx="10228394" cy="2569274"/>
+            <a:chOff x="1836674" y="1636751"/>
+            <a:chExt cx="10228394" cy="2569274"/>
+          </a:xfrm>
+        </p:grpSpPr>
+        <p:pic>
+          <p:nvPicPr>
+            <p:cNvPr id="44" name="Picture 43">
+              <a:extLst>
+                <a:ext uri="{FF2B5EF4-FFF2-40B4-BE49-F238E27FC236}">
+                  <a16:creationId xmlns:a16="http://schemas.microsoft.com/office/drawing/2014/main" id="{82216604-D48F-4AA2-B5AB-779FE10A51FB}"/>
+                </a:ext>
+              </a:extLst>
+            </p:cNvPr>
+            <p:cNvPicPr>
+              <a:picLocks noChangeAspect="1"/>
+            </p:cNvPicPr>
+            <p:nvPr/>
+          </p:nvPicPr>
+          <p:blipFill>
+            <a:blip r:embed="rId5"/>
+            <a:stretch>
+              <a:fillRect/>
+            </a:stretch>
+          </p:blipFill>
+          <p:spPr>
+            <a:xfrm>
+              <a:off x="1836674" y="1636751"/>
+              <a:ext cx="10179878" cy="2569274"/>
+            </a:xfrm>
+            <a:prstGeom prst="rect">
+              <a:avLst/>
+            </a:prstGeom>
+          </p:spPr>
+        </p:pic>
+        <p:pic>
+          <p:nvPicPr>
+            <p:cNvPr id="13" name="Picture 12">
+              <a:extLst>
+                <a:ext uri="{FF2B5EF4-FFF2-40B4-BE49-F238E27FC236}">
+                  <a16:creationId xmlns:a16="http://schemas.microsoft.com/office/drawing/2014/main" id="{34AD4F9D-0216-4FC4-9885-6B8860862739}"/>
+                </a:ext>
+              </a:extLst>
+            </p:cNvPr>
+            <p:cNvPicPr>
+              <a:picLocks noChangeAspect="1"/>
+            </p:cNvPicPr>
+            <p:nvPr/>
+          </p:nvPicPr>
+          <p:blipFill>
+            <a:blip r:embed="rId6"/>
+            <a:stretch>
+              <a:fillRect/>
+            </a:stretch>
+          </p:blipFill>
+          <p:spPr>
+            <a:xfrm>
+              <a:off x="10492890" y="2856334"/>
+              <a:ext cx="1572178" cy="664886"/>
+            </a:xfrm>
+            <a:prstGeom prst="rect">
+              <a:avLst/>
+            </a:prstGeom>
+          </p:spPr>
+        </p:pic>
+      </p:grpSp>
+      <p:pic>
+        <p:nvPicPr>
+          <p:cNvPr id="64" name="Picture 63">
+            <a:extLst>
+              <a:ext uri="{FF2B5EF4-FFF2-40B4-BE49-F238E27FC236}">
+                <a16:creationId xmlns:a16="http://schemas.microsoft.com/office/drawing/2014/main" id="{4E715E5D-C7F9-4B23-B2BA-76F64D4CE02B}"/>
+              </a:ext>
+            </a:extLst>
+          </p:cNvPr>
+          <p:cNvPicPr>
+            <a:picLocks noChangeAspect="1"/>
+          </p:cNvPicPr>
+          <p:nvPr/>
+        </p:nvPicPr>
+        <p:blipFill>
+          <a:blip r:embed="rId7"/>
+          <a:stretch>
+            <a:fillRect/>
+          </a:stretch>
+        </p:blipFill>
+        <p:spPr>
+          <a:xfrm>
+            <a:off x="5403087" y="4941575"/>
+            <a:ext cx="1258608" cy="559381"/>
+          </a:xfrm>
+          <a:prstGeom prst="rect">
+            <a:avLst/>
+          </a:prstGeom>
+        </p:spPr>
+      </p:pic>
+      <p:pic>
+        <p:nvPicPr>
+          <p:cNvPr id="66" name="Picture 65">
+            <a:extLst>
+              <a:ext uri="{FF2B5EF4-FFF2-40B4-BE49-F238E27FC236}">
+                <a16:creationId xmlns:a16="http://schemas.microsoft.com/office/drawing/2014/main" id="{7035FBB7-7C33-436E-80F4-4F1006D6D7E1}"/>
+              </a:ext>
+            </a:extLst>
+          </p:cNvPr>
+          <p:cNvPicPr>
+            <a:picLocks noChangeAspect="1"/>
+          </p:cNvPicPr>
+          <p:nvPr/>
+        </p:nvPicPr>
+        <p:blipFill>
+          <a:blip r:embed="rId8"/>
+          <a:stretch>
+            <a:fillRect/>
+          </a:stretch>
+        </p:blipFill>
+        <p:spPr>
+          <a:xfrm>
+            <a:off x="5403087" y="5566807"/>
+            <a:ext cx="1295931" cy="573200"/>
+          </a:xfrm>
+          <a:prstGeom prst="rect">
+            <a:avLst/>
+          </a:prstGeom>
+        </p:spPr>
+      </p:pic>
+      <p:pic>
+        <p:nvPicPr>
+          <p:cNvPr id="70" name="Picture 69">
+            <a:extLst>
+              <a:ext uri="{FF2B5EF4-FFF2-40B4-BE49-F238E27FC236}">
+                <a16:creationId xmlns:a16="http://schemas.microsoft.com/office/drawing/2014/main" id="{D0DF74CB-1C45-4936-9E98-FED28E2528F6}"/>
+              </a:ext>
+            </a:extLst>
+          </p:cNvPr>
+          <p:cNvPicPr>
+            <a:picLocks noChangeAspect="1"/>
+          </p:cNvPicPr>
+          <p:nvPr/>
+        </p:nvPicPr>
+        <p:blipFill>
+          <a:blip r:embed="rId9"/>
+          <a:stretch>
+            <a:fillRect/>
+          </a:stretch>
+        </p:blipFill>
+        <p:spPr>
+          <a:xfrm>
+            <a:off x="5396481" y="6204138"/>
+            <a:ext cx="1271821" cy="562536"/>
+          </a:xfrm>
+          <a:prstGeom prst="rect">
+            <a:avLst/>
+          </a:prstGeom>
+        </p:spPr>
+      </p:pic>
+      <p:cxnSp>
+        <p:nvCxnSpPr>
+          <p:cNvPr id="18" name="Straight Connector 17">
+            <a:extLst>
+              <a:ext uri="{FF2B5EF4-FFF2-40B4-BE49-F238E27FC236}">
+                <a16:creationId xmlns:a16="http://schemas.microsoft.com/office/drawing/2014/main" id="{38FE55ED-9890-448D-B9B6-36A3574E90DB}"/>
+              </a:ext>
+            </a:extLst>
+          </p:cNvPr>
+          <p:cNvCxnSpPr>
+            <a:cxnSpLocks/>
+          </p:cNvCxnSpPr>
+          <p:nvPr/>
+        </p:nvCxnSpPr>
+        <p:spPr>
+          <a:xfrm>
+            <a:off x="6929992" y="5343092"/>
+            <a:ext cx="9270446" cy="0"/>
+          </a:xfrm>
+          <a:prstGeom prst="line">
+            <a:avLst/>
+          </a:prstGeom>
+          <a:ln w="57150">
+            <a:solidFill>
+              <a:schemeClr val="bg1">
+                <a:lumMod val="50000"/>
+              </a:schemeClr>
+            </a:solidFill>
+            <a:prstDash val="sysDot"/>
+          </a:ln>
+        </p:spPr>
+        <p:style>
+          <a:lnRef idx="1">
+            <a:schemeClr val="accent1"/>
+          </a:lnRef>
+          <a:fillRef idx="0">
+            <a:schemeClr val="accent1"/>
+          </a:fillRef>
+          <a:effectRef idx="0">
+            <a:schemeClr val="accent1"/>
+          </a:effectRef>
+          <a:fontRef idx="minor">
+            <a:schemeClr val="tx1"/>
+          </a:fontRef>
+        </p:style>
+      </p:cxnSp>
+      <p:sp>
+        <p:nvSpPr>
+          <p:cNvPr id="10" name="Left Brace 9">
+            <a:extLst>
+              <a:ext uri="{FF2B5EF4-FFF2-40B4-BE49-F238E27FC236}">
+                <a16:creationId xmlns:a16="http://schemas.microsoft.com/office/drawing/2014/main" id="{D9BAFF37-C112-4618-A993-30FC9730AEDC}"/>
+              </a:ext>
+            </a:extLst>
+          </p:cNvPr>
+          <p:cNvSpPr/>
+          <p:nvPr/>
+        </p:nvSpPr>
+        <p:spPr>
+          <a:xfrm rot="5400000">
+            <a:off x="9650567" y="4030968"/>
+            <a:ext cx="669973" cy="2944717"/>
+          </a:xfrm>
+          <a:prstGeom prst="leftBrace">
+            <a:avLst>
+              <a:gd name="adj1" fmla="val 8333"/>
+              <a:gd name="adj2" fmla="val 23994"/>
+            </a:avLst>
+          </a:prstGeom>
+          <a:ln w="38100">
+            <a:solidFill>
+              <a:schemeClr val="accent4"/>
+            </a:solidFill>
+          </a:ln>
+        </p:spPr>
+        <p:style>
+          <a:lnRef idx="1">
+            <a:schemeClr val="accent1"/>
+          </a:lnRef>
+          <a:fillRef idx="0">
+            <a:schemeClr val="accent1"/>
+          </a:fillRef>
+          <a:effectRef idx="0">
+            <a:schemeClr val="accent1"/>
+          </a:effectRef>
+          <a:fontRef idx="minor">
+            <a:schemeClr val="tx1"/>
+          </a:fontRef>
+        </p:style>
+        <p:txBody>
+          <a:bodyPr rtlCol="0" anchor="ctr"/>
+          <a:lstStyle/>
+          <a:p>
+            <a:pPr algn="ctr"/>
+            <a:endParaRPr lang="en-GB" sz="2025" dirty="0"/>
+          </a:p>
+        </p:txBody>
+      </p:sp>
+      <p:pic>
+        <p:nvPicPr>
+          <p:cNvPr id="34" name="Picture 33">
+            <a:extLst>
+              <a:ext uri="{FF2B5EF4-FFF2-40B4-BE49-F238E27FC236}">
+                <a16:creationId xmlns:a16="http://schemas.microsoft.com/office/drawing/2014/main" id="{DC6E078F-F4E9-45A8-9592-0849B5A771D6}"/>
+              </a:ext>
+            </a:extLst>
+          </p:cNvPr>
+          <p:cNvPicPr>
+            <a:picLocks noChangeAspect="1"/>
+          </p:cNvPicPr>
+          <p:nvPr/>
+        </p:nvPicPr>
+        <p:blipFill>
+          <a:blip r:embed="rId10"/>
+          <a:stretch>
+            <a:fillRect/>
+          </a:stretch>
+        </p:blipFill>
+        <p:spPr>
+          <a:xfrm>
+            <a:off x="12930077" y="9003052"/>
+            <a:ext cx="3213343" cy="639856"/>
+          </a:xfrm>
+          <a:prstGeom prst="rect">
+            <a:avLst/>
+          </a:prstGeom>
+        </p:spPr>
+      </p:pic>
+      <p:pic>
+        <p:nvPicPr>
+          <p:cNvPr id="17" name="Picture 16">
+            <a:extLst>
+              <a:ext uri="{FF2B5EF4-FFF2-40B4-BE49-F238E27FC236}">
+                <a16:creationId xmlns:a16="http://schemas.microsoft.com/office/drawing/2014/main" id="{2A510AD6-A12F-4614-8D5F-EAA53E47B411}"/>
+              </a:ext>
+            </a:extLst>
+          </p:cNvPr>
+          <p:cNvPicPr>
+            <a:picLocks noChangeAspect="1"/>
+          </p:cNvPicPr>
+          <p:nvPr/>
+        </p:nvPicPr>
+        <p:blipFill>
+          <a:blip r:embed="rId11"/>
+          <a:stretch>
+            <a:fillRect/>
+          </a:stretch>
+        </p:blipFill>
+        <p:spPr>
+          <a:xfrm>
+            <a:off x="13023642" y="11523642"/>
+            <a:ext cx="2754851" cy="1371384"/>
+          </a:xfrm>
+          <a:prstGeom prst="rect">
+            <a:avLst/>
+          </a:prstGeom>
+        </p:spPr>
+      </p:pic>
+      <p:pic>
+        <p:nvPicPr>
+          <p:cNvPr id="39" name="Picture 38">
+            <a:extLst>
+              <a:ext uri="{FF2B5EF4-FFF2-40B4-BE49-F238E27FC236}">
+                <a16:creationId xmlns:a16="http://schemas.microsoft.com/office/drawing/2014/main" id="{5E8338BF-3C0E-4D21-82FF-37CD415C1135}"/>
+              </a:ext>
+            </a:extLst>
+          </p:cNvPr>
+          <p:cNvPicPr>
+            <a:picLocks noChangeAspect="1"/>
+          </p:cNvPicPr>
+          <p:nvPr/>
+        </p:nvPicPr>
+        <p:blipFill>
+          <a:blip r:embed="rId12"/>
+          <a:stretch>
+            <a:fillRect/>
+          </a:stretch>
+        </p:blipFill>
+        <p:spPr>
+          <a:xfrm>
+            <a:off x="6380459" y="13493961"/>
+            <a:ext cx="1363978" cy="675432"/>
+          </a:xfrm>
+          <a:prstGeom prst="rect">
+            <a:avLst/>
+          </a:prstGeom>
+        </p:spPr>
+      </p:pic>
+      <p:sp>
+        <p:nvSpPr>
+          <p:cNvPr id="38" name="Left Brace 37">
+            <a:extLst>
+              <a:ext uri="{FF2B5EF4-FFF2-40B4-BE49-F238E27FC236}">
+                <a16:creationId xmlns:a16="http://schemas.microsoft.com/office/drawing/2014/main" id="{113523E7-4C37-484A-AEB2-5827C7EEAAD4}"/>
+              </a:ext>
+            </a:extLst>
+          </p:cNvPr>
+          <p:cNvSpPr/>
+          <p:nvPr/>
+        </p:nvSpPr>
+        <p:spPr>
+          <a:xfrm rot="5400000">
+            <a:off x="6250640" y="12251524"/>
+            <a:ext cx="669973" cy="2339616"/>
+          </a:xfrm>
+          <a:prstGeom prst="leftBrace">
+            <a:avLst>
+              <a:gd name="adj1" fmla="val 8333"/>
+              <a:gd name="adj2" fmla="val 33218"/>
+            </a:avLst>
+          </a:prstGeom>
+          <a:ln w="38100">
+            <a:solidFill>
+              <a:schemeClr val="accent4"/>
+            </a:solidFill>
+          </a:ln>
+        </p:spPr>
+        <p:style>
+          <a:lnRef idx="1">
+            <a:schemeClr val="accent1"/>
+          </a:lnRef>
+          <a:fillRef idx="0">
+            <a:schemeClr val="accent1"/>
+          </a:fillRef>
+          <a:effectRef idx="0">
+            <a:schemeClr val="accent1"/>
+          </a:effectRef>
+          <a:fontRef idx="minor">
+            <a:schemeClr val="tx1"/>
+          </a:fontRef>
+        </p:style>
+        <p:txBody>
+          <a:bodyPr rtlCol="0" anchor="ctr"/>
+          <a:lstStyle/>
+          <a:p>
+            <a:pPr algn="ctr"/>
+            <a:endParaRPr lang="en-GB" sz="2025" dirty="0"/>
+          </a:p>
+        </p:txBody>
+      </p:sp>
+      <p:sp>
+        <p:nvSpPr>
+          <p:cNvPr id="36" name="Left Brace 35">
+            <a:extLst>
+              <a:ext uri="{FF2B5EF4-FFF2-40B4-BE49-F238E27FC236}">
+                <a16:creationId xmlns:a16="http://schemas.microsoft.com/office/drawing/2014/main" id="{A031CF25-C2FD-4ED8-9178-17403CC0C15B}"/>
+              </a:ext>
+            </a:extLst>
+          </p:cNvPr>
+          <p:cNvSpPr/>
+          <p:nvPr/>
+        </p:nvSpPr>
+        <p:spPr>
+          <a:xfrm rot="5400000">
+            <a:off x="6737363" y="9267156"/>
+            <a:ext cx="669973" cy="4633286"/>
+          </a:xfrm>
+          <a:prstGeom prst="leftBrace">
+            <a:avLst>
+              <a:gd name="adj1" fmla="val 8333"/>
+              <a:gd name="adj2" fmla="val 25586"/>
+            </a:avLst>
+          </a:prstGeom>
+          <a:ln w="38100">
+            <a:solidFill>
+              <a:schemeClr val="accent4"/>
+            </a:solidFill>
+          </a:ln>
+        </p:spPr>
+        <p:style>
+          <a:lnRef idx="1">
+            <a:schemeClr val="accent1"/>
+          </a:lnRef>
+          <a:fillRef idx="0">
+            <a:schemeClr val="accent1"/>
+          </a:fillRef>
+          <a:effectRef idx="0">
+            <a:schemeClr val="accent1"/>
+          </a:effectRef>
+          <a:fontRef idx="minor">
+            <a:schemeClr val="tx1"/>
+          </a:fontRef>
+        </p:style>
+        <p:txBody>
+          <a:bodyPr rtlCol="0" anchor="ctr"/>
+          <a:lstStyle/>
+          <a:p>
+            <a:pPr algn="ctr"/>
+            <a:endParaRPr lang="en-GB" sz="2025" dirty="0"/>
+          </a:p>
+        </p:txBody>
+      </p:sp>
+      <p:cxnSp>
+        <p:nvCxnSpPr>
+          <p:cNvPr id="8" name="Straight Connector 7">
+            <a:extLst>
+              <a:ext uri="{FF2B5EF4-FFF2-40B4-BE49-F238E27FC236}">
+                <a16:creationId xmlns:a16="http://schemas.microsoft.com/office/drawing/2014/main" id="{B3C21FE1-62D5-40B2-8293-E02C7F95F45F}"/>
+              </a:ext>
+            </a:extLst>
+          </p:cNvPr>
+          <p:cNvCxnSpPr>
+            <a:cxnSpLocks/>
+          </p:cNvCxnSpPr>
+          <p:nvPr/>
+        </p:nvCxnSpPr>
+        <p:spPr>
+          <a:xfrm>
+            <a:off x="133159" y="1603092"/>
+            <a:ext cx="16067279" cy="0"/>
+          </a:xfrm>
+          <a:prstGeom prst="line">
+            <a:avLst/>
+          </a:prstGeom>
+          <a:ln w="57150">
+            <a:solidFill>
+              <a:schemeClr val="bg1">
+                <a:lumMod val="50000"/>
+              </a:schemeClr>
+            </a:solidFill>
+            <a:prstDash val="sysDot"/>
+          </a:ln>
+        </p:spPr>
+        <p:style>
+          <a:lnRef idx="1">
+            <a:schemeClr val="accent1"/>
+          </a:lnRef>
+          <a:fillRef idx="0">
+            <a:schemeClr val="accent1"/>
+          </a:fillRef>
+          <a:effectRef idx="0">
+            <a:schemeClr val="accent1"/>
+          </a:effectRef>
+          <a:fontRef idx="minor">
+            <a:schemeClr val="tx1"/>
+          </a:fontRef>
+        </p:style>
+      </p:cxnSp>
+      <p:sp>
+        <p:nvSpPr>
+          <p:cNvPr id="14" name="Left Brace 13">
+            <a:extLst>
+              <a:ext uri="{FF2B5EF4-FFF2-40B4-BE49-F238E27FC236}">
+                <a16:creationId xmlns:a16="http://schemas.microsoft.com/office/drawing/2014/main" id="{21CB80A6-2177-4740-A5FA-B2FC1E8D547F}"/>
+              </a:ext>
+            </a:extLst>
+          </p:cNvPr>
+          <p:cNvSpPr/>
+          <p:nvPr/>
+        </p:nvSpPr>
+        <p:spPr>
+          <a:xfrm rot="5400000">
+            <a:off x="6658439" y="-3299029"/>
+            <a:ext cx="669973" cy="10046251"/>
+          </a:xfrm>
+          <a:prstGeom prst="leftBrace">
+            <a:avLst>
+              <a:gd name="adj1" fmla="val 8333"/>
+              <a:gd name="adj2" fmla="val 64024"/>
+            </a:avLst>
+          </a:prstGeom>
+          <a:ln w="38100">
+            <a:solidFill>
+              <a:schemeClr val="accent4"/>
+            </a:solidFill>
+          </a:ln>
+        </p:spPr>
+        <p:style>
+          <a:lnRef idx="1">
+            <a:schemeClr val="accent1"/>
+          </a:lnRef>
+          <a:fillRef idx="0">
+            <a:schemeClr val="accent1"/>
+          </a:fillRef>
+          <a:effectRef idx="0">
+            <a:schemeClr val="accent1"/>
+          </a:effectRef>
+          <a:fontRef idx="minor">
+            <a:schemeClr val="tx1"/>
+          </a:fontRef>
+        </p:style>
+        <p:txBody>
+          <a:bodyPr rtlCol="0" anchor="ctr"/>
+          <a:lstStyle/>
+          <a:p>
+            <a:pPr algn="ctr"/>
+            <a:endParaRPr lang="en-GB" sz="2025" dirty="0"/>
+          </a:p>
+        </p:txBody>
+      </p:sp>
+      <p:pic>
+        <p:nvPicPr>
+          <p:cNvPr id="2" name="Picture 1">
+            <a:extLst>
+              <a:ext uri="{FF2B5EF4-FFF2-40B4-BE49-F238E27FC236}">
+                <a16:creationId xmlns:a16="http://schemas.microsoft.com/office/drawing/2014/main" id="{36CE73C9-BA77-4ECA-AA16-858684EEB8DD}"/>
+              </a:ext>
+            </a:extLst>
+          </p:cNvPr>
+          <p:cNvPicPr>
+            <a:picLocks noChangeAspect="1"/>
+          </p:cNvPicPr>
+          <p:nvPr/>
+        </p:nvPicPr>
+        <p:blipFill>
+          <a:blip r:embed="rId13"/>
+          <a:stretch>
+            <a:fillRect/>
+          </a:stretch>
+        </p:blipFill>
+        <p:spPr>
+          <a:xfrm>
+            <a:off x="133153" y="88354"/>
+            <a:ext cx="892528" cy="579404"/>
+          </a:xfrm>
+          <a:prstGeom prst="rect">
+            <a:avLst/>
+          </a:prstGeom>
+        </p:spPr>
+      </p:pic>
+      <p:pic>
+        <p:nvPicPr>
+          <p:cNvPr id="3" name="Picture 2">
+            <a:extLst>
+              <a:ext uri="{FF2B5EF4-FFF2-40B4-BE49-F238E27FC236}">
+                <a16:creationId xmlns:a16="http://schemas.microsoft.com/office/drawing/2014/main" id="{BAC2FA6D-7E44-4A70-ABBF-441AC58C61D8}"/>
+              </a:ext>
+            </a:extLst>
+          </p:cNvPr>
+          <p:cNvPicPr>
+            <a:picLocks noChangeAspect="1"/>
+          </p:cNvPicPr>
+          <p:nvPr/>
+        </p:nvPicPr>
+        <p:blipFill>
+          <a:blip r:embed="rId14"/>
+          <a:stretch>
+            <a:fillRect/>
+          </a:stretch>
+        </p:blipFill>
+        <p:spPr>
+          <a:xfrm>
+            <a:off x="133153" y="1727119"/>
+            <a:ext cx="892528" cy="586800"/>
+          </a:xfrm>
+          <a:prstGeom prst="rect">
+            <a:avLst/>
+          </a:prstGeom>
+        </p:spPr>
+      </p:pic>
+      <p:pic>
+        <p:nvPicPr>
+          <p:cNvPr id="4" name="Picture 3">
+            <a:extLst>
+              <a:ext uri="{FF2B5EF4-FFF2-40B4-BE49-F238E27FC236}">
+                <a16:creationId xmlns:a16="http://schemas.microsoft.com/office/drawing/2014/main" id="{FB95A457-1250-418F-8752-3AD3D6CA1CBF}"/>
+              </a:ext>
+            </a:extLst>
+          </p:cNvPr>
+          <p:cNvPicPr>
+            <a:picLocks noChangeAspect="1"/>
+          </p:cNvPicPr>
+          <p:nvPr/>
+        </p:nvPicPr>
+        <p:blipFill>
+          <a:blip r:embed="rId15"/>
+          <a:stretch>
+            <a:fillRect/>
+          </a:stretch>
+        </p:blipFill>
+        <p:spPr>
+          <a:xfrm>
+            <a:off x="109831" y="8197177"/>
+            <a:ext cx="892528" cy="586800"/>
+          </a:xfrm>
+          <a:prstGeom prst="rect">
+            <a:avLst/>
+          </a:prstGeom>
+        </p:spPr>
+      </p:pic>
+      <p:sp>
+        <p:nvSpPr>
+          <p:cNvPr id="23" name="TextBox 22">
+            <a:extLst>
+              <a:ext uri="{FF2B5EF4-FFF2-40B4-BE49-F238E27FC236}">
+                <a16:creationId xmlns:a16="http://schemas.microsoft.com/office/drawing/2014/main" id="{06F8B482-C37F-4E4C-9FB0-942BA9C3D5D1}"/>
+              </a:ext>
+            </a:extLst>
+          </p:cNvPr>
+          <p:cNvSpPr txBox="1"/>
+          <p:nvPr/>
+        </p:nvSpPr>
+        <p:spPr>
+          <a:xfrm>
+            <a:off x="1025682" y="153427"/>
+            <a:ext cx="1813060" cy="727571"/>
+          </a:xfrm>
+          <a:prstGeom prst="rect">
+            <a:avLst/>
+          </a:prstGeom>
+          <a:noFill/>
+        </p:spPr>
+        <p:txBody>
+          <a:bodyPr wrap="none" rtlCol="0">
+            <a:spAutoFit/>
+          </a:bodyPr>
+          <a:lstStyle/>
+          <a:p>
+            <a:r>
+              <a:rPr lang="en-US" sz="2400" b="1" dirty="0"/>
+              <a:t>Grandparent</a:t>
+            </a:r>
+          </a:p>
+          <a:p>
+            <a:r>
+              <a:rPr lang="en-US" sz="1728" b="1" dirty="0">
+                <a:solidFill>
+                  <a:schemeClr val="bg1">
+                    <a:lumMod val="75000"/>
+                  </a:schemeClr>
+                </a:solidFill>
+              </a:rPr>
+              <a:t>(optional)</a:t>
+            </a:r>
+            <a:endParaRPr lang="en-GB" sz="1728" b="1" dirty="0">
+              <a:solidFill>
+                <a:schemeClr val="bg1">
+                  <a:lumMod val="75000"/>
+                </a:schemeClr>
+              </a:solidFill>
+            </a:endParaRPr>
+          </a:p>
+        </p:txBody>
+      </p:sp>
+      <p:sp>
+        <p:nvSpPr>
+          <p:cNvPr id="24" name="TextBox 23">
+            <a:extLst>
+              <a:ext uri="{FF2B5EF4-FFF2-40B4-BE49-F238E27FC236}">
+                <a16:creationId xmlns:a16="http://schemas.microsoft.com/office/drawing/2014/main" id="{2B1D7642-1297-4FF4-AC1C-9E90A1648238}"/>
+              </a:ext>
+            </a:extLst>
+          </p:cNvPr>
+          <p:cNvSpPr txBox="1"/>
+          <p:nvPr/>
+        </p:nvSpPr>
+        <p:spPr>
+          <a:xfrm>
+            <a:off x="1002359" y="1789696"/>
+            <a:ext cx="1025089" cy="461665"/>
+          </a:xfrm>
+          <a:prstGeom prst="rect">
+            <a:avLst/>
+          </a:prstGeom>
+          <a:noFill/>
+        </p:spPr>
+        <p:txBody>
+          <a:bodyPr wrap="none" rtlCol="0">
+            <a:spAutoFit/>
+          </a:bodyPr>
+          <a:lstStyle/>
+          <a:p>
+            <a:r>
+              <a:rPr lang="en-US" sz="2400" b="1" dirty="0"/>
+              <a:t>Parent</a:t>
+            </a:r>
+            <a:endParaRPr lang="en-GB" sz="2400" b="1" dirty="0"/>
+          </a:p>
+        </p:txBody>
+      </p:sp>
+      <p:sp>
+        <p:nvSpPr>
+          <p:cNvPr id="25" name="TextBox 24">
+            <a:extLst>
+              <a:ext uri="{FF2B5EF4-FFF2-40B4-BE49-F238E27FC236}">
+                <a16:creationId xmlns:a16="http://schemas.microsoft.com/office/drawing/2014/main" id="{6B7827E1-5A9B-4381-BD48-FF1E8075FB93}"/>
+              </a:ext>
+            </a:extLst>
+          </p:cNvPr>
+          <p:cNvSpPr txBox="1"/>
+          <p:nvPr/>
+        </p:nvSpPr>
+        <p:spPr>
+          <a:xfrm>
+            <a:off x="1043060" y="8259823"/>
+            <a:ext cx="829073" cy="461665"/>
+          </a:xfrm>
+          <a:prstGeom prst="rect">
+            <a:avLst/>
+          </a:prstGeom>
+          <a:noFill/>
+        </p:spPr>
+        <p:txBody>
+          <a:bodyPr wrap="none" rtlCol="0">
+            <a:spAutoFit/>
+          </a:bodyPr>
+          <a:lstStyle/>
+          <a:p>
+            <a:r>
+              <a:rPr lang="en-US" sz="2400" b="1" dirty="0"/>
+              <a:t>Child</a:t>
+            </a:r>
+            <a:endParaRPr lang="en-GB" sz="2400" b="1" dirty="0"/>
+          </a:p>
+        </p:txBody>
+      </p:sp>
+      <p:sp>
+        <p:nvSpPr>
+          <p:cNvPr id="6" name="TextBox 5">
+            <a:extLst>
+              <a:ext uri="{FF2B5EF4-FFF2-40B4-BE49-F238E27FC236}">
+                <a16:creationId xmlns:a16="http://schemas.microsoft.com/office/drawing/2014/main" id="{17F8A168-3F01-42AA-ACD1-52226D338250}"/>
+              </a:ext>
+            </a:extLst>
+          </p:cNvPr>
+          <p:cNvSpPr txBox="1"/>
+          <p:nvPr/>
+        </p:nvSpPr>
+        <p:spPr>
+          <a:xfrm>
+            <a:off x="15370019" y="-5272"/>
+            <a:ext cx="840295" cy="403957"/>
+          </a:xfrm>
+          <a:prstGeom prst="rect">
+            <a:avLst/>
+          </a:prstGeom>
+          <a:noFill/>
+        </p:spPr>
+        <p:txBody>
+          <a:bodyPr wrap="none" rtlCol="0">
+            <a:spAutoFit/>
+          </a:bodyPr>
+          <a:lstStyle/>
+          <a:p>
+            <a:r>
+              <a:rPr lang="en-GB" sz="2025" b="1" dirty="0"/>
+              <a:t>v1.8.3</a:t>
+            </a:r>
+          </a:p>
+        </p:txBody>
+      </p:sp>
+      <p:pic>
+        <p:nvPicPr>
+          <p:cNvPr id="5" name="Picture 4" descr="A screenshot of a cell phone&#10;&#10;Description automatically generated">
+            <a:extLst>
+              <a:ext uri="{FF2B5EF4-FFF2-40B4-BE49-F238E27FC236}">
+                <a16:creationId xmlns:a16="http://schemas.microsoft.com/office/drawing/2014/main" id="{9D5DA8E3-64DB-4086-90D5-4957AE971C73}"/>
+              </a:ext>
+            </a:extLst>
+          </p:cNvPr>
+          <p:cNvPicPr>
+            <a:picLocks noChangeAspect="1"/>
+          </p:cNvPicPr>
+          <p:nvPr/>
+        </p:nvPicPr>
+        <p:blipFill>
+          <a:blip r:embed="rId16">
+            <a:extLst>
+              <a:ext uri="{28A0092B-C50C-407E-A947-70E740481C1C}">
+                <a14:useLocalDpi xmlns:a14="http://schemas.microsoft.com/office/drawing/2010/main" val="0"/>
+              </a:ext>
+            </a:extLst>
+          </a:blip>
+          <a:stretch>
+            <a:fillRect/>
+          </a:stretch>
+        </p:blipFill>
+        <p:spPr>
+          <a:xfrm>
+            <a:off x="3065290" y="32072"/>
+            <a:ext cx="6699512" cy="1527060"/>
+          </a:xfrm>
+          <a:prstGeom prst="rect">
+            <a:avLst/>
+          </a:prstGeom>
+        </p:spPr>
+      </p:pic>
+      <p:cxnSp>
+        <p:nvCxnSpPr>
+          <p:cNvPr id="28" name="Straight Connector 27">
+            <a:extLst>
+              <a:ext uri="{FF2B5EF4-FFF2-40B4-BE49-F238E27FC236}">
+                <a16:creationId xmlns:a16="http://schemas.microsoft.com/office/drawing/2014/main" id="{ECB87505-EE27-4221-BABC-E83F318564FE}"/>
+              </a:ext>
+            </a:extLst>
+          </p:cNvPr>
+          <p:cNvCxnSpPr>
+            <a:cxnSpLocks/>
+          </p:cNvCxnSpPr>
+          <p:nvPr/>
+        </p:nvCxnSpPr>
+        <p:spPr>
+          <a:xfrm>
+            <a:off x="133158" y="9802040"/>
+            <a:ext cx="16067280" cy="0"/>
+          </a:xfrm>
+          <a:prstGeom prst="line">
+            <a:avLst/>
+          </a:prstGeom>
+          <a:ln w="57150">
+            <a:solidFill>
+              <a:schemeClr val="bg1">
+                <a:lumMod val="50000"/>
+              </a:schemeClr>
+            </a:solidFill>
+            <a:prstDash val="sysDot"/>
+          </a:ln>
+        </p:spPr>
+        <p:style>
+          <a:lnRef idx="1">
+            <a:schemeClr val="accent1"/>
+          </a:lnRef>
+          <a:fillRef idx="0">
+            <a:schemeClr val="accent1"/>
+          </a:fillRef>
+          <a:effectRef idx="0">
+            <a:schemeClr val="accent1"/>
+          </a:effectRef>
+          <a:fontRef idx="minor">
+            <a:schemeClr val="tx1"/>
+          </a:fontRef>
+        </p:style>
+      </p:cxnSp>
+      <p:sp>
+        <p:nvSpPr>
+          <p:cNvPr id="37" name="TextBox 36">
+            <a:extLst>
+              <a:ext uri="{FF2B5EF4-FFF2-40B4-BE49-F238E27FC236}">
+                <a16:creationId xmlns:a16="http://schemas.microsoft.com/office/drawing/2014/main" id="{6F1134F0-B278-42E9-8045-C82105634470}"/>
+              </a:ext>
+            </a:extLst>
+          </p:cNvPr>
+          <p:cNvSpPr txBox="1"/>
+          <p:nvPr/>
+        </p:nvSpPr>
+        <p:spPr>
+          <a:xfrm>
+            <a:off x="5500941" y="13698616"/>
+            <a:ext cx="822661" cy="307777"/>
+          </a:xfrm>
+          <a:prstGeom prst="rect">
+            <a:avLst/>
+          </a:prstGeom>
+          <a:noFill/>
+        </p:spPr>
+        <p:txBody>
+          <a:bodyPr wrap="none" rtlCol="0">
+            <a:spAutoFit/>
+          </a:bodyPr>
+          <a:lstStyle>
+            <a:defPPr>
+              <a:defRPr lang="en-US"/>
+            </a:defPPr>
+            <a:lvl1pPr>
+              <a:defRPr sz="1400"/>
+            </a:lvl1pPr>
+          </a:lstStyle>
+          <a:p>
+            <a:r>
+              <a:rPr lang="en-GB" dirty="0"/>
+              <a:t>@{False}</a:t>
+            </a:r>
+          </a:p>
+        </p:txBody>
+      </p:sp>
+      <p:pic>
+        <p:nvPicPr>
+          <p:cNvPr id="40" name="Picture 39">
+            <a:extLst>
+              <a:ext uri="{FF2B5EF4-FFF2-40B4-BE49-F238E27FC236}">
+                <a16:creationId xmlns:a16="http://schemas.microsoft.com/office/drawing/2014/main" id="{4DAF1527-CD65-4AB9-828A-1ED6FE0D86D7}"/>
+              </a:ext>
+            </a:extLst>
+          </p:cNvPr>
+          <p:cNvPicPr>
+            <a:picLocks noChangeAspect="1"/>
+          </p:cNvPicPr>
+          <p:nvPr/>
+        </p:nvPicPr>
+        <p:blipFill>
+          <a:blip r:embed="rId17"/>
+          <a:stretch>
+            <a:fillRect/>
+          </a:stretch>
+        </p:blipFill>
+        <p:spPr>
+          <a:xfrm>
+            <a:off x="115774" y="9925122"/>
+            <a:ext cx="927286" cy="600309"/>
+          </a:xfrm>
+          <a:prstGeom prst="rect">
+            <a:avLst/>
+          </a:prstGeom>
+        </p:spPr>
+      </p:pic>
+      <p:sp>
+        <p:nvSpPr>
+          <p:cNvPr id="41" name="TextBox 40">
+            <a:extLst>
+              <a:ext uri="{FF2B5EF4-FFF2-40B4-BE49-F238E27FC236}">
+                <a16:creationId xmlns:a16="http://schemas.microsoft.com/office/drawing/2014/main" id="{E5D01E17-60FE-405E-8FC1-C403C23EA74D}"/>
+              </a:ext>
+            </a:extLst>
+          </p:cNvPr>
+          <p:cNvSpPr txBox="1"/>
+          <p:nvPr/>
+        </p:nvSpPr>
+        <p:spPr>
+          <a:xfrm>
+            <a:off x="1025682" y="9994442"/>
+            <a:ext cx="944618" cy="461665"/>
+          </a:xfrm>
+          <a:prstGeom prst="rect">
+            <a:avLst/>
+          </a:prstGeom>
+          <a:noFill/>
+        </p:spPr>
+        <p:txBody>
+          <a:bodyPr wrap="none" rtlCol="0">
+            <a:spAutoFit/>
+          </a:bodyPr>
+          <a:lstStyle/>
+          <a:p>
+            <a:r>
+              <a:rPr lang="en-US" sz="2400" b="1" dirty="0"/>
+              <a:t>Infant</a:t>
+            </a:r>
+            <a:endParaRPr lang="en-GB" sz="2400" b="1" dirty="0"/>
+          </a:p>
+        </p:txBody>
+      </p:sp>
+      <p:pic>
+        <p:nvPicPr>
+          <p:cNvPr id="48" name="Picture 47">
+            <a:extLst>
+              <a:ext uri="{FF2B5EF4-FFF2-40B4-BE49-F238E27FC236}">
+                <a16:creationId xmlns:a16="http://schemas.microsoft.com/office/drawing/2014/main" id="{87800AD7-8FBA-429D-A4A3-79974C850BB9}"/>
+              </a:ext>
+            </a:extLst>
+          </p:cNvPr>
+          <p:cNvPicPr>
+            <a:picLocks noChangeAspect="1"/>
+          </p:cNvPicPr>
+          <p:nvPr/>
+        </p:nvPicPr>
+        <p:blipFill>
+          <a:blip r:embed="rId18"/>
+          <a:stretch>
+            <a:fillRect/>
+          </a:stretch>
+        </p:blipFill>
+        <p:spPr>
+          <a:xfrm>
+            <a:off x="343880" y="671388"/>
+            <a:ext cx="471078" cy="474308"/>
+          </a:xfrm>
+          <a:prstGeom prst="rect">
+            <a:avLst/>
+          </a:prstGeom>
+        </p:spPr>
+      </p:pic>
+      <p:sp>
+        <p:nvSpPr>
+          <p:cNvPr id="12" name="Left Brace 11">
+            <a:extLst>
+              <a:ext uri="{FF2B5EF4-FFF2-40B4-BE49-F238E27FC236}">
+                <a16:creationId xmlns:a16="http://schemas.microsoft.com/office/drawing/2014/main" id="{77D93561-8CDB-430E-8A88-3911DEFB7740}"/>
+              </a:ext>
+            </a:extLst>
+          </p:cNvPr>
+          <p:cNvSpPr/>
+          <p:nvPr/>
+        </p:nvSpPr>
+        <p:spPr>
+          <a:xfrm rot="5400000">
+            <a:off x="11086635" y="2440420"/>
+            <a:ext cx="669973" cy="8650992"/>
+          </a:xfrm>
+          <a:prstGeom prst="leftBrace">
+            <a:avLst>
+              <a:gd name="adj1" fmla="val 8333"/>
+              <a:gd name="adj2" fmla="val 58009"/>
+            </a:avLst>
+          </a:prstGeom>
+          <a:ln w="38100">
+            <a:solidFill>
+              <a:schemeClr val="accent4"/>
+            </a:solidFill>
+          </a:ln>
+        </p:spPr>
+        <p:style>
+          <a:lnRef idx="1">
+            <a:schemeClr val="accent1"/>
+          </a:lnRef>
+          <a:fillRef idx="0">
+            <a:schemeClr val="accent1"/>
+          </a:fillRef>
+          <a:effectRef idx="0">
+            <a:schemeClr val="accent1"/>
+          </a:effectRef>
+          <a:fontRef idx="minor">
+            <a:schemeClr val="tx1"/>
+          </a:fontRef>
+        </p:style>
+        <p:txBody>
+          <a:bodyPr rtlCol="0" anchor="ctr"/>
+          <a:lstStyle/>
+          <a:p>
+            <a:pPr algn="ctr"/>
+            <a:endParaRPr lang="en-GB" sz="2025" dirty="0"/>
+          </a:p>
+        </p:txBody>
+      </p:sp>
+      <p:pic>
+        <p:nvPicPr>
+          <p:cNvPr id="19" name="Picture 18">
+            <a:extLst>
+              <a:ext uri="{FF2B5EF4-FFF2-40B4-BE49-F238E27FC236}">
+                <a16:creationId xmlns:a16="http://schemas.microsoft.com/office/drawing/2014/main" id="{45593E8A-47D3-4EAD-9C33-0C4BD7D50503}"/>
+              </a:ext>
+            </a:extLst>
+          </p:cNvPr>
+          <p:cNvPicPr>
+            <a:picLocks noChangeAspect="1"/>
+          </p:cNvPicPr>
+          <p:nvPr/>
+        </p:nvPicPr>
+        <p:blipFill>
+          <a:blip r:embed="rId19"/>
+          <a:stretch>
+            <a:fillRect/>
+          </a:stretch>
+        </p:blipFill>
+        <p:spPr>
+          <a:xfrm>
+            <a:off x="8622678" y="5571477"/>
+            <a:ext cx="2803699" cy="928418"/>
+          </a:xfrm>
+          <a:prstGeom prst="rect">
+            <a:avLst/>
+          </a:prstGeom>
+        </p:spPr>
+      </p:pic>
+      <p:grpSp>
+        <p:nvGrpSpPr>
+          <p:cNvPr id="21" name="Group 20">
+            <a:extLst>
+              <a:ext uri="{FF2B5EF4-FFF2-40B4-BE49-F238E27FC236}">
+                <a16:creationId xmlns:a16="http://schemas.microsoft.com/office/drawing/2014/main" id="{05E14A1D-BD3D-40A7-B20A-AC1206565C36}"/>
+              </a:ext>
+            </a:extLst>
+          </p:cNvPr>
+          <p:cNvGrpSpPr/>
+          <p:nvPr/>
+        </p:nvGrpSpPr>
+        <p:grpSpPr>
+          <a:xfrm>
+            <a:off x="4798866" y="11634120"/>
+            <a:ext cx="4752787" cy="1962932"/>
+            <a:chOff x="2279724" y="10757819"/>
+            <a:chExt cx="4752787" cy="1962932"/>
+          </a:xfrm>
+        </p:grpSpPr>
+        <p:pic>
+          <p:nvPicPr>
+            <p:cNvPr id="32" name="Picture 31" descr="A screenshot of a cell phone&#10;&#10;Description automatically generated">
+              <a:extLst>
+                <a:ext uri="{FF2B5EF4-FFF2-40B4-BE49-F238E27FC236}">
+                  <a16:creationId xmlns:a16="http://schemas.microsoft.com/office/drawing/2014/main" id="{F26DFA87-DB02-40BE-B78D-D52C12BB164C}"/>
+                </a:ext>
+              </a:extLst>
+            </p:cNvPr>
+            <p:cNvPicPr>
+              <a:picLocks noChangeAspect="1"/>
+            </p:cNvPicPr>
+            <p:nvPr/>
+          </p:nvPicPr>
+          <p:blipFill>
+            <a:blip r:embed="rId20">
+              <a:extLst>
+                <a:ext uri="{28A0092B-C50C-407E-A947-70E740481C1C}">
+                  <a14:useLocalDpi xmlns:a14="http://schemas.microsoft.com/office/drawing/2010/main" val="0"/>
+                </a:ext>
+              </a:extLst>
+            </a:blip>
+            <a:stretch>
+              <a:fillRect/>
+            </a:stretch>
+          </p:blipFill>
+          <p:spPr>
+            <a:xfrm>
+              <a:off x="2279724" y="10757819"/>
+              <a:ext cx="4633285" cy="1962932"/>
+            </a:xfrm>
+            <a:prstGeom prst="rect">
+              <a:avLst/>
+            </a:prstGeom>
+          </p:spPr>
+        </p:pic>
+        <p:pic>
+          <p:nvPicPr>
+            <p:cNvPr id="20" name="Picture 19">
+              <a:extLst>
+                <a:ext uri="{FF2B5EF4-FFF2-40B4-BE49-F238E27FC236}">
+                  <a16:creationId xmlns:a16="http://schemas.microsoft.com/office/drawing/2014/main" id="{2BEF8012-D2C9-4B2F-A72A-CF77DA443D81}"/>
+                </a:ext>
+              </a:extLst>
+            </p:cNvPr>
+            <p:cNvPicPr>
+              <a:picLocks noChangeAspect="1"/>
+            </p:cNvPicPr>
+            <p:nvPr/>
+          </p:nvPicPr>
+          <p:blipFill>
+            <a:blip r:embed="rId21"/>
+            <a:stretch>
+              <a:fillRect/>
+            </a:stretch>
+          </p:blipFill>
+          <p:spPr>
+            <a:xfrm>
+              <a:off x="5315311" y="11981816"/>
+              <a:ext cx="1717200" cy="736965"/>
+            </a:xfrm>
+            <a:prstGeom prst="rect">
+              <a:avLst/>
+            </a:prstGeom>
+          </p:spPr>
+        </p:pic>
+      </p:grpSp>
+      <p:cxnSp>
+        <p:nvCxnSpPr>
+          <p:cNvPr id="33" name="Straight Connector 32">
+            <a:extLst>
+              <a:ext uri="{FF2B5EF4-FFF2-40B4-BE49-F238E27FC236}">
+                <a16:creationId xmlns:a16="http://schemas.microsoft.com/office/drawing/2014/main" id="{551D01C0-A5F9-4EF1-AE16-8AEB83CFB30D}"/>
+              </a:ext>
+            </a:extLst>
+          </p:cNvPr>
+          <p:cNvCxnSpPr>
+            <a:cxnSpLocks/>
+          </p:cNvCxnSpPr>
+          <p:nvPr/>
+        </p:nvCxnSpPr>
+        <p:spPr>
+          <a:xfrm>
+            <a:off x="6929992" y="5343092"/>
+            <a:ext cx="0" cy="2746808"/>
+          </a:xfrm>
+          <a:prstGeom prst="line">
+            <a:avLst/>
+          </a:prstGeom>
+          <a:ln w="57150">
+            <a:solidFill>
+              <a:schemeClr val="bg1">
+                <a:lumMod val="50000"/>
+              </a:schemeClr>
+            </a:solidFill>
+            <a:prstDash val="sysDot"/>
+          </a:ln>
+        </p:spPr>
+        <p:style>
+          <a:lnRef idx="1">
+            <a:schemeClr val="accent1"/>
+          </a:lnRef>
+          <a:fillRef idx="0">
+            <a:schemeClr val="accent1"/>
+          </a:fillRef>
+          <a:effectRef idx="0">
+            <a:schemeClr val="accent1"/>
+          </a:effectRef>
+          <a:fontRef idx="minor">
+            <a:schemeClr val="tx1"/>
+          </a:fontRef>
+        </p:style>
+      </p:cxnSp>
+      <p:cxnSp>
+        <p:nvCxnSpPr>
+          <p:cNvPr id="52" name="Straight Connector 51">
+            <a:extLst>
+              <a:ext uri="{FF2B5EF4-FFF2-40B4-BE49-F238E27FC236}">
+                <a16:creationId xmlns:a16="http://schemas.microsoft.com/office/drawing/2014/main" id="{E6E46D17-E649-4B9B-90DE-49E7518214F1}"/>
+              </a:ext>
+            </a:extLst>
+          </p:cNvPr>
+          <p:cNvCxnSpPr>
+            <a:cxnSpLocks/>
+          </p:cNvCxnSpPr>
+          <p:nvPr/>
+        </p:nvCxnSpPr>
+        <p:spPr>
+          <a:xfrm>
+            <a:off x="109831" y="8102600"/>
+            <a:ext cx="6816782" cy="0"/>
+          </a:xfrm>
+          <a:prstGeom prst="line">
+            <a:avLst/>
+          </a:prstGeom>
+          <a:ln w="57150">
+            <a:solidFill>
+              <a:schemeClr val="bg1">
+                <a:lumMod val="50000"/>
+              </a:schemeClr>
+            </a:solidFill>
+            <a:prstDash val="sysDot"/>
+          </a:ln>
+        </p:spPr>
+        <p:style>
+          <a:lnRef idx="1">
+            <a:schemeClr val="accent1"/>
+          </a:lnRef>
+          <a:fillRef idx="0">
+            <a:schemeClr val="accent1"/>
+          </a:fillRef>
+          <a:effectRef idx="0">
+            <a:schemeClr val="accent1"/>
+          </a:effectRef>
+          <a:fontRef idx="minor">
+            <a:schemeClr val="tx1"/>
+          </a:fontRef>
+        </p:style>
+      </p:cxnSp>
+      <p:grpSp>
+        <p:nvGrpSpPr>
+          <p:cNvPr id="43" name="Group 42">
+            <a:extLst>
+              <a:ext uri="{FF2B5EF4-FFF2-40B4-BE49-F238E27FC236}">
+                <a16:creationId xmlns:a16="http://schemas.microsoft.com/office/drawing/2014/main" id="{45F19378-2B4E-41D8-AABE-EFDAEC478FEC}"/>
+              </a:ext>
+            </a:extLst>
+          </p:cNvPr>
+          <p:cNvGrpSpPr/>
+          <p:nvPr/>
+        </p:nvGrpSpPr>
+        <p:grpSpPr>
+          <a:xfrm>
+            <a:off x="6969989" y="4502442"/>
+            <a:ext cx="4478392" cy="692724"/>
+            <a:chOff x="6969989" y="4502442"/>
+            <a:chExt cx="4478392" cy="692724"/>
+          </a:xfrm>
+        </p:grpSpPr>
+        <p:pic>
+          <p:nvPicPr>
+            <p:cNvPr id="9" name="Picture 8">
+              <a:extLst>
+                <a:ext uri="{FF2B5EF4-FFF2-40B4-BE49-F238E27FC236}">
+                  <a16:creationId xmlns:a16="http://schemas.microsoft.com/office/drawing/2014/main" id="{830ECE33-9E5F-4091-9D12-99B9CAA53606}"/>
+                </a:ext>
+              </a:extLst>
+            </p:cNvPr>
+            <p:cNvPicPr>
+              <a:picLocks noChangeAspect="1"/>
+            </p:cNvPicPr>
+            <p:nvPr/>
+          </p:nvPicPr>
+          <p:blipFill>
+            <a:blip r:embed="rId22"/>
+            <a:stretch>
+              <a:fillRect/>
+            </a:stretch>
+          </p:blipFill>
+          <p:spPr>
+            <a:xfrm>
+              <a:off x="6998765" y="4531154"/>
+              <a:ext cx="4449616" cy="641100"/>
+            </a:xfrm>
+            <a:prstGeom prst="rect">
+              <a:avLst/>
+            </a:prstGeom>
+          </p:spPr>
+        </p:pic>
+        <p:pic>
+          <p:nvPicPr>
+            <p:cNvPr id="31" name="Picture 30">
+              <a:extLst>
+                <a:ext uri="{FF2B5EF4-FFF2-40B4-BE49-F238E27FC236}">
+                  <a16:creationId xmlns:a16="http://schemas.microsoft.com/office/drawing/2014/main" id="{2D8F6489-47E7-4786-8B5B-EB5910CD260F}"/>
+                </a:ext>
+              </a:extLst>
+            </p:cNvPr>
+            <p:cNvPicPr>
+              <a:picLocks noChangeAspect="1"/>
+            </p:cNvPicPr>
+            <p:nvPr/>
+          </p:nvPicPr>
+          <p:blipFill>
+            <a:blip r:embed="rId23"/>
+            <a:stretch>
+              <a:fillRect/>
+            </a:stretch>
+          </p:blipFill>
+          <p:spPr>
+            <a:xfrm>
+              <a:off x="6969989" y="4502442"/>
+              <a:ext cx="1503210" cy="692724"/>
+            </a:xfrm>
+            <a:prstGeom prst="rect">
+              <a:avLst/>
+            </a:prstGeom>
+          </p:spPr>
+        </p:pic>
+      </p:grpSp>
+      <p:pic>
+        <p:nvPicPr>
+          <p:cNvPr id="50" name="Picture 49">
+            <a:extLst>
+              <a:ext uri="{FF2B5EF4-FFF2-40B4-BE49-F238E27FC236}">
+                <a16:creationId xmlns:a16="http://schemas.microsoft.com/office/drawing/2014/main" id="{67041243-E3AA-467F-A19F-44790A44FF91}"/>
+              </a:ext>
+            </a:extLst>
+          </p:cNvPr>
+          <p:cNvPicPr>
+            <a:picLocks noChangeAspect="1"/>
+          </p:cNvPicPr>
+          <p:nvPr/>
+        </p:nvPicPr>
+        <p:blipFill>
+          <a:blip r:embed="rId24"/>
+          <a:stretch>
+            <a:fillRect/>
+          </a:stretch>
+        </p:blipFill>
+        <p:spPr>
+          <a:xfrm>
+            <a:off x="5391661" y="7410693"/>
+            <a:ext cx="1276641" cy="579731"/>
+          </a:xfrm>
+          <a:prstGeom prst="rect">
+            <a:avLst/>
+          </a:prstGeom>
+        </p:spPr>
+      </p:pic>
+      <p:pic>
+        <p:nvPicPr>
+          <p:cNvPr id="54" name="Picture 53">
+            <a:extLst>
+              <a:ext uri="{FF2B5EF4-FFF2-40B4-BE49-F238E27FC236}">
+                <a16:creationId xmlns:a16="http://schemas.microsoft.com/office/drawing/2014/main" id="{5917B25F-E8F2-4398-B37D-9DDFA6C746DA}"/>
+              </a:ext>
+            </a:extLst>
+          </p:cNvPr>
+          <p:cNvPicPr>
+            <a:picLocks noChangeAspect="1"/>
+          </p:cNvPicPr>
+          <p:nvPr/>
+        </p:nvPicPr>
+        <p:blipFill>
+          <a:blip r:embed="rId25"/>
+          <a:stretch>
+            <a:fillRect/>
+          </a:stretch>
+        </p:blipFill>
+        <p:spPr>
+          <a:xfrm>
+            <a:off x="5389143" y="6833595"/>
+            <a:ext cx="1250928" cy="559309"/>
+          </a:xfrm>
+          <a:prstGeom prst="rect">
+            <a:avLst/>
+          </a:prstGeom>
+        </p:spPr>
+      </p:pic>
+      <p:sp>
+        <p:nvSpPr>
+          <p:cNvPr id="45" name="Left Brace 44">
+            <a:extLst>
+              <a:ext uri="{FF2B5EF4-FFF2-40B4-BE49-F238E27FC236}">
+                <a16:creationId xmlns:a16="http://schemas.microsoft.com/office/drawing/2014/main" id="{6A780C7D-167C-4B91-9DB2-93F665E492C2}"/>
+              </a:ext>
+            </a:extLst>
+          </p:cNvPr>
+          <p:cNvSpPr/>
+          <p:nvPr/>
+        </p:nvSpPr>
+        <p:spPr>
+          <a:xfrm>
+            <a:off x="5026465" y="4218725"/>
+            <a:ext cx="485870" cy="3789295"/>
+          </a:xfrm>
+          <a:prstGeom prst="leftBrace">
+            <a:avLst>
+              <a:gd name="adj1" fmla="val 8333"/>
+              <a:gd name="adj2" fmla="val 53133"/>
+            </a:avLst>
+          </a:prstGeom>
+          <a:ln w="38100">
+            <a:solidFill>
+              <a:schemeClr val="accent4"/>
+            </a:solidFill>
+          </a:ln>
+        </p:spPr>
+        <p:style>
+          <a:lnRef idx="1">
+            <a:schemeClr val="accent1"/>
+          </a:lnRef>
+          <a:fillRef idx="0">
+            <a:schemeClr val="accent1"/>
+          </a:fillRef>
+          <a:effectRef idx="0">
+            <a:schemeClr val="accent1"/>
+          </a:effectRef>
+          <a:fontRef idx="minor">
+            <a:schemeClr val="tx1"/>
+          </a:fontRef>
+        </p:style>
+        <p:txBody>
+          <a:bodyPr rtlCol="0" anchor="ctr"/>
+          <a:lstStyle/>
+          <a:p>
+            <a:pPr algn="ctr"/>
+            <a:endParaRPr lang="en-GB" sz="2025" dirty="0"/>
+          </a:p>
+        </p:txBody>
+      </p:sp>
+      <p:pic>
+        <p:nvPicPr>
+          <p:cNvPr id="57" name="Picture 56">
+            <a:extLst>
+              <a:ext uri="{FF2B5EF4-FFF2-40B4-BE49-F238E27FC236}">
+                <a16:creationId xmlns:a16="http://schemas.microsoft.com/office/drawing/2014/main" id="{D721CD48-32D5-43A7-B433-41F18EE16BAA}"/>
+              </a:ext>
+            </a:extLst>
+          </p:cNvPr>
+          <p:cNvPicPr>
+            <a:picLocks noChangeAspect="1"/>
+          </p:cNvPicPr>
+          <p:nvPr/>
+        </p:nvPicPr>
+        <p:blipFill>
+          <a:blip r:embed="rId26"/>
+          <a:stretch>
+            <a:fillRect/>
+          </a:stretch>
+        </p:blipFill>
+        <p:spPr>
+          <a:xfrm>
+            <a:off x="3612408" y="4474604"/>
+            <a:ext cx="1507100" cy="1947855"/>
+          </a:xfrm>
+          <a:prstGeom prst="rect">
+            <a:avLst/>
+          </a:prstGeom>
+        </p:spPr>
+      </p:pic>
+      <p:sp>
+        <p:nvSpPr>
+          <p:cNvPr id="55" name="TextBox 54">
+            <a:extLst>
+              <a:ext uri="{FF2B5EF4-FFF2-40B4-BE49-F238E27FC236}">
+                <a16:creationId xmlns:a16="http://schemas.microsoft.com/office/drawing/2014/main" id="{77599DE6-779A-4C83-AF46-B859F76E6394}"/>
+              </a:ext>
+            </a:extLst>
+          </p:cNvPr>
+          <p:cNvSpPr txBox="1"/>
+          <p:nvPr/>
+        </p:nvSpPr>
+        <p:spPr>
+          <a:xfrm>
+            <a:off x="4268745" y="6083548"/>
+            <a:ext cx="800219" cy="307777"/>
+          </a:xfrm>
+          <a:prstGeom prst="rect">
+            <a:avLst/>
+          </a:prstGeom>
+          <a:noFill/>
+        </p:spPr>
+        <p:txBody>
+          <a:bodyPr wrap="none" rtlCol="0">
+            <a:spAutoFit/>
+          </a:bodyPr>
+          <a:lstStyle/>
+          <a:p>
+            <a:r>
+              <a:rPr lang="en-GB" sz="1400" dirty="0"/>
+              <a:t>@{Case}</a:t>
+            </a:r>
+          </a:p>
+        </p:txBody>
+      </p:sp>
+      <p:sp>
+        <p:nvSpPr>
+          <p:cNvPr id="51" name="Left Brace 50">
+            <a:extLst>
+              <a:ext uri="{FF2B5EF4-FFF2-40B4-BE49-F238E27FC236}">
+                <a16:creationId xmlns:a16="http://schemas.microsoft.com/office/drawing/2014/main" id="{20BB1BE2-0BEE-4190-9F30-70ED65678B14}"/>
+              </a:ext>
+            </a:extLst>
+          </p:cNvPr>
+          <p:cNvSpPr/>
+          <p:nvPr/>
+        </p:nvSpPr>
+        <p:spPr>
+          <a:xfrm rot="5400000">
+            <a:off x="2369988" y="1954608"/>
+            <a:ext cx="508102" cy="4981772"/>
+          </a:xfrm>
+          <a:prstGeom prst="leftBrace">
+            <a:avLst>
+              <a:gd name="adj1" fmla="val 8333"/>
+              <a:gd name="adj2" fmla="val 15207"/>
+            </a:avLst>
+          </a:prstGeom>
+          <a:ln w="38100">
+            <a:solidFill>
+              <a:schemeClr val="accent4"/>
+            </a:solidFill>
+          </a:ln>
+        </p:spPr>
+        <p:style>
+          <a:lnRef idx="1">
+            <a:schemeClr val="accent1"/>
+          </a:lnRef>
+          <a:fillRef idx="0">
+            <a:schemeClr val="accent1"/>
+          </a:fillRef>
+          <a:effectRef idx="0">
+            <a:schemeClr val="accent1"/>
+          </a:effectRef>
+          <a:fontRef idx="minor">
+            <a:schemeClr val="tx1"/>
+          </a:fontRef>
+        </p:style>
+        <p:txBody>
+          <a:bodyPr rtlCol="0" anchor="ctr"/>
+          <a:lstStyle/>
+          <a:p>
+            <a:pPr algn="ctr"/>
+            <a:endParaRPr lang="en-GB" sz="2025" dirty="0"/>
+          </a:p>
+        </p:txBody>
+      </p:sp>
+      <p:sp>
+        <p:nvSpPr>
+          <p:cNvPr id="77" name="Left Brace 76">
+            <a:extLst>
+              <a:ext uri="{FF2B5EF4-FFF2-40B4-BE49-F238E27FC236}">
+                <a16:creationId xmlns:a16="http://schemas.microsoft.com/office/drawing/2014/main" id="{611FAC59-4A3F-467B-8E6F-34EFBE66EDDA}"/>
+              </a:ext>
+            </a:extLst>
+          </p:cNvPr>
+          <p:cNvSpPr/>
+          <p:nvPr/>
+        </p:nvSpPr>
+        <p:spPr>
+          <a:xfrm>
+            <a:off x="12681829" y="10151768"/>
+            <a:ext cx="485870" cy="3443314"/>
+          </a:xfrm>
+          <a:prstGeom prst="leftBrace">
+            <a:avLst>
+              <a:gd name="adj1" fmla="val 8333"/>
+              <a:gd name="adj2" fmla="val 51628"/>
+            </a:avLst>
+          </a:prstGeom>
+          <a:ln w="38100">
+            <a:solidFill>
+              <a:schemeClr val="accent4"/>
+            </a:solidFill>
+          </a:ln>
+        </p:spPr>
+        <p:style>
+          <a:lnRef idx="1">
+            <a:schemeClr val="accent1"/>
+          </a:lnRef>
+          <a:fillRef idx="0">
+            <a:schemeClr val="accent1"/>
+          </a:fillRef>
+          <a:effectRef idx="0">
+            <a:schemeClr val="accent1"/>
+          </a:effectRef>
+          <a:fontRef idx="minor">
+            <a:schemeClr val="tx1"/>
+          </a:fontRef>
+        </p:style>
+        <p:txBody>
+          <a:bodyPr rtlCol="0" anchor="ctr"/>
+          <a:lstStyle/>
+          <a:p>
+            <a:pPr algn="ctr"/>
+            <a:endParaRPr lang="en-GB" sz="2025" dirty="0"/>
+          </a:p>
+        </p:txBody>
+      </p:sp>
+      <p:pic>
+        <p:nvPicPr>
+          <p:cNvPr id="79" name="Picture 78">
+            <a:extLst>
+              <a:ext uri="{FF2B5EF4-FFF2-40B4-BE49-F238E27FC236}">
+                <a16:creationId xmlns:a16="http://schemas.microsoft.com/office/drawing/2014/main" id="{9599B374-72EC-4DB4-8B2D-5068CAAC141C}"/>
+              </a:ext>
+            </a:extLst>
+          </p:cNvPr>
+          <p:cNvPicPr>
+            <a:picLocks noChangeAspect="1"/>
+          </p:cNvPicPr>
+          <p:nvPr/>
+        </p:nvPicPr>
+        <p:blipFill>
+          <a:blip r:embed="rId27"/>
+          <a:stretch>
+            <a:fillRect/>
+          </a:stretch>
+        </p:blipFill>
+        <p:spPr>
+          <a:xfrm>
+            <a:off x="5383564" y="4296649"/>
+            <a:ext cx="1293815" cy="587530"/>
+          </a:xfrm>
+          <a:prstGeom prst="rect">
+            <a:avLst/>
+          </a:prstGeom>
+        </p:spPr>
+      </p:pic>
+      <p:pic>
+        <p:nvPicPr>
+          <p:cNvPr id="83" name="Picture 82">
+            <a:extLst>
+              <a:ext uri="{FF2B5EF4-FFF2-40B4-BE49-F238E27FC236}">
+                <a16:creationId xmlns:a16="http://schemas.microsoft.com/office/drawing/2014/main" id="{3725C369-4778-4849-8C1C-7ABBBA95D4F2}"/>
+              </a:ext>
+            </a:extLst>
+          </p:cNvPr>
+          <p:cNvPicPr>
+            <a:picLocks noChangeAspect="1"/>
+          </p:cNvPicPr>
+          <p:nvPr/>
+        </p:nvPicPr>
+        <p:blipFill>
+          <a:blip r:embed="rId24"/>
+          <a:stretch>
+            <a:fillRect/>
+          </a:stretch>
+        </p:blipFill>
+        <p:spPr>
+          <a:xfrm>
+            <a:off x="13054795" y="12963773"/>
+            <a:ext cx="1276641" cy="579731"/>
+          </a:xfrm>
+          <a:prstGeom prst="rect">
+            <a:avLst/>
+          </a:prstGeom>
+        </p:spPr>
+      </p:pic>
+      <p:pic>
+        <p:nvPicPr>
+          <p:cNvPr id="85" name="Picture 84">
+            <a:extLst>
+              <a:ext uri="{FF2B5EF4-FFF2-40B4-BE49-F238E27FC236}">
+                <a16:creationId xmlns:a16="http://schemas.microsoft.com/office/drawing/2014/main" id="{06BFAB01-972F-4DF5-8F4D-CCDD668042F6}"/>
+              </a:ext>
+            </a:extLst>
+          </p:cNvPr>
+          <p:cNvPicPr>
+            <a:picLocks noChangeAspect="1"/>
+          </p:cNvPicPr>
+          <p:nvPr/>
+        </p:nvPicPr>
+        <p:blipFill>
+          <a:blip r:embed="rId25"/>
+          <a:stretch>
+            <a:fillRect/>
+          </a:stretch>
+        </p:blipFill>
+        <p:spPr>
+          <a:xfrm>
+            <a:off x="13017952" y="10876536"/>
+            <a:ext cx="1250928" cy="559309"/>
+          </a:xfrm>
+          <a:prstGeom prst="rect">
+            <a:avLst/>
+          </a:prstGeom>
+        </p:spPr>
+      </p:pic>
+      <p:pic>
+        <p:nvPicPr>
+          <p:cNvPr id="87" name="Picture 86">
+            <a:extLst>
+              <a:ext uri="{FF2B5EF4-FFF2-40B4-BE49-F238E27FC236}">
+                <a16:creationId xmlns:a16="http://schemas.microsoft.com/office/drawing/2014/main" id="{B3526AD5-1686-43B8-8AB8-C26D164205A3}"/>
+              </a:ext>
+            </a:extLst>
+          </p:cNvPr>
+          <p:cNvPicPr>
+            <a:picLocks noChangeAspect="1"/>
+          </p:cNvPicPr>
+          <p:nvPr/>
+        </p:nvPicPr>
+        <p:blipFill>
+          <a:blip r:embed="rId27"/>
+          <a:stretch>
+            <a:fillRect/>
+          </a:stretch>
+        </p:blipFill>
+        <p:spPr>
+          <a:xfrm>
+            <a:off x="13017952" y="10232456"/>
+            <a:ext cx="1293815" cy="587530"/>
+          </a:xfrm>
+          <a:prstGeom prst="rect">
+            <a:avLst/>
+          </a:prstGeom>
+        </p:spPr>
+      </p:pic>
+      <p:sp>
+        <p:nvSpPr>
+          <p:cNvPr id="89" name="TextBox 88">
+            <a:extLst>
+              <a:ext uri="{FF2B5EF4-FFF2-40B4-BE49-F238E27FC236}">
+                <a16:creationId xmlns:a16="http://schemas.microsoft.com/office/drawing/2014/main" id="{0D5B15BF-D171-4762-8B87-B6E717E9EE74}"/>
+              </a:ext>
+            </a:extLst>
+          </p:cNvPr>
+          <p:cNvSpPr txBox="1"/>
+          <p:nvPr/>
+        </p:nvSpPr>
+        <p:spPr>
+          <a:xfrm>
+            <a:off x="11782822" y="11764897"/>
+            <a:ext cx="800219" cy="307777"/>
+          </a:xfrm>
+          <a:prstGeom prst="rect">
+            <a:avLst/>
+          </a:prstGeom>
+          <a:noFill/>
+        </p:spPr>
+        <p:txBody>
+          <a:bodyPr wrap="none" rtlCol="0">
+            <a:spAutoFit/>
+          </a:bodyPr>
+          <a:lstStyle/>
+          <a:p>
+            <a:r>
+              <a:rPr lang="en-GB" sz="1400" dirty="0"/>
+              <a:t>@{Case}</a:t>
+            </a:r>
+          </a:p>
+        </p:txBody>
+      </p:sp>
+      <p:sp>
+        <p:nvSpPr>
+          <p:cNvPr id="91" name="TextBox 90">
+            <a:extLst>
+              <a:ext uri="{FF2B5EF4-FFF2-40B4-BE49-F238E27FC236}">
+                <a16:creationId xmlns:a16="http://schemas.microsoft.com/office/drawing/2014/main" id="{E9965364-AE61-41AD-AE4E-CE1C64F25218}"/>
+              </a:ext>
+            </a:extLst>
+          </p:cNvPr>
+          <p:cNvSpPr txBox="1"/>
+          <p:nvPr/>
+        </p:nvSpPr>
+        <p:spPr>
+          <a:xfrm>
+            <a:off x="14844203" y="8488271"/>
+            <a:ext cx="781048" cy="307777"/>
+          </a:xfrm>
+          <a:prstGeom prst="rect">
+            <a:avLst/>
+          </a:prstGeom>
+          <a:noFill/>
+        </p:spPr>
+        <p:txBody>
+          <a:bodyPr wrap="none" rtlCol="0">
+            <a:spAutoFit/>
+          </a:bodyPr>
+          <a:lstStyle>
+            <a:defPPr>
+              <a:defRPr lang="en-US"/>
+            </a:defPPr>
+            <a:lvl1pPr>
+              <a:defRPr sz="1400"/>
+            </a:lvl1pPr>
+          </a:lstStyle>
+          <a:p>
+            <a:r>
+              <a:rPr lang="en-GB" dirty="0"/>
+              <a:t>@{True}</a:t>
+            </a:r>
+          </a:p>
+        </p:txBody>
+      </p:sp>
+    </p:spTree>
+    <p:extLst>
+      <p:ext uri="{BB962C8B-B14F-4D97-AF65-F5344CB8AC3E}">
+        <p14:creationId xmlns:p14="http://schemas.microsoft.com/office/powerpoint/2010/main" val="4143835974"/>
+      </p:ext>
+    </p:extLst>
+  </p:cSld>
+  <p:clrMapOvr>
+    <a:masterClrMapping/>
+  </p:clrMapOvr>
+</p:sld>
+</file>
+
+<file path=ppt/slides/slide11.xml><?xml version="1.0" encoding="utf-8"?>
 <p:sld xmlns:a="http://schemas.openxmlformats.org/drawingml/2006/main" xmlns:r="http://schemas.openxmlformats.org/officeDocument/2006/relationships" xmlns:p="http://schemas.openxmlformats.org/presentationml/2006/main">
   <p:cSld>
     <p:spTree>

</xml_diff>

<commit_message>
Prerelease readme and document updates
</commit_message>
<xml_diff>
--- a/Images/All ADF Activities.pptx
+++ b/Images/All ADF Activities.pptx
@@ -15,7 +15,8 @@
     <p:sldId id="265" r:id="rId9"/>
     <p:sldId id="266" r:id="rId10"/>
     <p:sldId id="267" r:id="rId11"/>
-    <p:sldId id="260" r:id="rId12"/>
+    <p:sldId id="268" r:id="rId12"/>
+    <p:sldId id="260" r:id="rId13"/>
   </p:sldIdLst>
   <p:sldSz cx="16200438" cy="14400213"/>
   <p:notesSz cx="6858000" cy="9144000"/>
@@ -253,7 +254,7 @@
           <a:p>
             <a:fld id="{1F80DB50-5271-4B1A-976D-0A7715B55622}" type="datetimeFigureOut">
               <a:rPr lang="en-GB" smtClean="0"/>
-              <a:t>22/07/2020</a:t>
+              <a:t>17/08/2020</a:t>
             </a:fld>
             <a:endParaRPr lang="en-GB"/>
           </a:p>
@@ -423,7 +424,7 @@
           <a:p>
             <a:fld id="{1F80DB50-5271-4B1A-976D-0A7715B55622}" type="datetimeFigureOut">
               <a:rPr lang="en-GB" smtClean="0"/>
-              <a:t>22/07/2020</a:t>
+              <a:t>17/08/2020</a:t>
             </a:fld>
             <a:endParaRPr lang="en-GB"/>
           </a:p>
@@ -603,7 +604,7 @@
           <a:p>
             <a:fld id="{1F80DB50-5271-4B1A-976D-0A7715B55622}" type="datetimeFigureOut">
               <a:rPr lang="en-GB" smtClean="0"/>
-              <a:t>22/07/2020</a:t>
+              <a:t>17/08/2020</a:t>
             </a:fld>
             <a:endParaRPr lang="en-GB"/>
           </a:p>
@@ -773,7 +774,7 @@
           <a:p>
             <a:fld id="{1F80DB50-5271-4B1A-976D-0A7715B55622}" type="datetimeFigureOut">
               <a:rPr lang="en-GB" smtClean="0"/>
-              <a:t>22/07/2020</a:t>
+              <a:t>17/08/2020</a:t>
             </a:fld>
             <a:endParaRPr lang="en-GB"/>
           </a:p>
@@ -1017,7 +1018,7 @@
           <a:p>
             <a:fld id="{1F80DB50-5271-4B1A-976D-0A7715B55622}" type="datetimeFigureOut">
               <a:rPr lang="en-GB" smtClean="0"/>
-              <a:t>22/07/2020</a:t>
+              <a:t>17/08/2020</a:t>
             </a:fld>
             <a:endParaRPr lang="en-GB"/>
           </a:p>
@@ -1249,7 +1250,7 @@
           <a:p>
             <a:fld id="{1F80DB50-5271-4B1A-976D-0A7715B55622}" type="datetimeFigureOut">
               <a:rPr lang="en-GB" smtClean="0"/>
-              <a:t>22/07/2020</a:t>
+              <a:t>17/08/2020</a:t>
             </a:fld>
             <a:endParaRPr lang="en-GB"/>
           </a:p>
@@ -1616,7 +1617,7 @@
           <a:p>
             <a:fld id="{1F80DB50-5271-4B1A-976D-0A7715B55622}" type="datetimeFigureOut">
               <a:rPr lang="en-GB" smtClean="0"/>
-              <a:t>22/07/2020</a:t>
+              <a:t>17/08/2020</a:t>
             </a:fld>
             <a:endParaRPr lang="en-GB"/>
           </a:p>
@@ -1734,7 +1735,7 @@
           <a:p>
             <a:fld id="{1F80DB50-5271-4B1A-976D-0A7715B55622}" type="datetimeFigureOut">
               <a:rPr lang="en-GB" smtClean="0"/>
-              <a:t>22/07/2020</a:t>
+              <a:t>17/08/2020</a:t>
             </a:fld>
             <a:endParaRPr lang="en-GB"/>
           </a:p>
@@ -1829,7 +1830,7 @@
           <a:p>
             <a:fld id="{1F80DB50-5271-4B1A-976D-0A7715B55622}" type="datetimeFigureOut">
               <a:rPr lang="en-GB" smtClean="0"/>
-              <a:t>22/07/2020</a:t>
+              <a:t>17/08/2020</a:t>
             </a:fld>
             <a:endParaRPr lang="en-GB"/>
           </a:p>
@@ -2106,7 +2107,7 @@
           <a:p>
             <a:fld id="{1F80DB50-5271-4B1A-976D-0A7715B55622}" type="datetimeFigureOut">
               <a:rPr lang="en-GB" smtClean="0"/>
-              <a:t>22/07/2020</a:t>
+              <a:t>17/08/2020</a:t>
             </a:fld>
             <a:endParaRPr lang="en-GB"/>
           </a:p>
@@ -2363,7 +2364,7 @@
           <a:p>
             <a:fld id="{1F80DB50-5271-4B1A-976D-0A7715B55622}" type="datetimeFigureOut">
               <a:rPr lang="en-GB" smtClean="0"/>
-              <a:t>22/07/2020</a:t>
+              <a:t>17/08/2020</a:t>
             </a:fld>
             <a:endParaRPr lang="en-GB"/>
           </a:p>
@@ -2576,7 +2577,7 @@
           <a:p>
             <a:fld id="{1F80DB50-5271-4B1A-976D-0A7715B55622}" type="datetimeFigureOut">
               <a:rPr lang="en-GB" smtClean="0"/>
-              <a:t>22/07/2020</a:t>
+              <a:t>17/08/2020</a:t>
             </a:fld>
             <a:endParaRPr lang="en-GB"/>
           </a:p>
@@ -5836,6 +5837,2185 @@
 </file>
 
 <file path=ppt/slides/slide11.xml><?xml version="1.0" encoding="utf-8"?>
+<p:sld xmlns:a="http://schemas.openxmlformats.org/drawingml/2006/main" xmlns:r="http://schemas.openxmlformats.org/officeDocument/2006/relationships" xmlns:p="http://schemas.openxmlformats.org/presentationml/2006/main">
+  <p:cSld>
+    <p:spTree>
+      <p:nvGrpSpPr>
+        <p:cNvPr id="1" name=""/>
+        <p:cNvGrpSpPr/>
+        <p:nvPr/>
+      </p:nvGrpSpPr>
+      <p:grpSpPr>
+        <a:xfrm>
+          <a:off x="0" y="0"/>
+          <a:ext cx="0" cy="0"/>
+          <a:chOff x="0" y="0"/>
+          <a:chExt cx="0" cy="0"/>
+        </a:xfrm>
+      </p:grpSpPr>
+      <p:grpSp>
+        <p:nvGrpSpPr>
+          <p:cNvPr id="16" name="Group 15">
+            <a:extLst>
+              <a:ext uri="{FF2B5EF4-FFF2-40B4-BE49-F238E27FC236}">
+                <a16:creationId xmlns:a16="http://schemas.microsoft.com/office/drawing/2014/main" id="{E4BA4CAF-2072-4C50-B830-C80FFC2BE420}"/>
+              </a:ext>
+            </a:extLst>
+          </p:cNvPr>
+          <p:cNvGrpSpPr/>
+          <p:nvPr/>
+        </p:nvGrpSpPr>
+        <p:grpSpPr>
+          <a:xfrm>
+            <a:off x="298450" y="1636751"/>
+            <a:ext cx="11766618" cy="2569274"/>
+            <a:chOff x="298450" y="1636751"/>
+            <a:chExt cx="11766618" cy="2569274"/>
+          </a:xfrm>
+        </p:grpSpPr>
+        <p:grpSp>
+          <p:nvGrpSpPr>
+            <p:cNvPr id="26" name="Group 25">
+              <a:extLst>
+                <a:ext uri="{FF2B5EF4-FFF2-40B4-BE49-F238E27FC236}">
+                  <a16:creationId xmlns:a16="http://schemas.microsoft.com/office/drawing/2014/main" id="{A3A2006A-3883-445D-B8E9-AD0DF7F16421}"/>
+                </a:ext>
+              </a:extLst>
+            </p:cNvPr>
+            <p:cNvGrpSpPr/>
+            <p:nvPr/>
+          </p:nvGrpSpPr>
+          <p:grpSpPr>
+            <a:xfrm>
+              <a:off x="1836674" y="1636751"/>
+              <a:ext cx="10228394" cy="2569274"/>
+              <a:chOff x="1836674" y="1636751"/>
+              <a:chExt cx="10228394" cy="2569274"/>
+            </a:xfrm>
+          </p:grpSpPr>
+          <p:pic>
+            <p:nvPicPr>
+              <p:cNvPr id="44" name="Picture 43">
+                <a:extLst>
+                  <a:ext uri="{FF2B5EF4-FFF2-40B4-BE49-F238E27FC236}">
+                    <a16:creationId xmlns:a16="http://schemas.microsoft.com/office/drawing/2014/main" id="{82216604-D48F-4AA2-B5AB-779FE10A51FB}"/>
+                  </a:ext>
+                </a:extLst>
+              </p:cNvPr>
+              <p:cNvPicPr>
+                <a:picLocks noChangeAspect="1"/>
+              </p:cNvPicPr>
+              <p:nvPr/>
+            </p:nvPicPr>
+            <p:blipFill>
+              <a:blip r:embed="rId2"/>
+              <a:stretch>
+                <a:fillRect/>
+              </a:stretch>
+            </p:blipFill>
+            <p:spPr>
+              <a:xfrm>
+                <a:off x="1836674" y="1636751"/>
+                <a:ext cx="10179878" cy="2569274"/>
+              </a:xfrm>
+              <a:prstGeom prst="rect">
+                <a:avLst/>
+              </a:prstGeom>
+            </p:spPr>
+          </p:pic>
+          <p:pic>
+            <p:nvPicPr>
+              <p:cNvPr id="13" name="Picture 12">
+                <a:extLst>
+                  <a:ext uri="{FF2B5EF4-FFF2-40B4-BE49-F238E27FC236}">
+                    <a16:creationId xmlns:a16="http://schemas.microsoft.com/office/drawing/2014/main" id="{34AD4F9D-0216-4FC4-9885-6B8860862739}"/>
+                  </a:ext>
+                </a:extLst>
+              </p:cNvPr>
+              <p:cNvPicPr>
+                <a:picLocks noChangeAspect="1"/>
+              </p:cNvPicPr>
+              <p:nvPr/>
+            </p:nvPicPr>
+            <p:blipFill>
+              <a:blip r:embed="rId3"/>
+              <a:stretch>
+                <a:fillRect/>
+              </a:stretch>
+            </p:blipFill>
+            <p:spPr>
+              <a:xfrm>
+                <a:off x="10492890" y="2856334"/>
+                <a:ext cx="1572178" cy="664886"/>
+              </a:xfrm>
+              <a:prstGeom prst="rect">
+                <a:avLst/>
+              </a:prstGeom>
+            </p:spPr>
+          </p:pic>
+        </p:grpSp>
+        <p:pic>
+          <p:nvPicPr>
+            <p:cNvPr id="11" name="Picture 10">
+              <a:extLst>
+                <a:ext uri="{FF2B5EF4-FFF2-40B4-BE49-F238E27FC236}">
+                  <a16:creationId xmlns:a16="http://schemas.microsoft.com/office/drawing/2014/main" id="{06186010-0E5A-4508-A7B1-30323FEA879D}"/>
+                </a:ext>
+              </a:extLst>
+            </p:cNvPr>
+            <p:cNvPicPr>
+              <a:picLocks noChangeAspect="1"/>
+            </p:cNvPicPr>
+            <p:nvPr/>
+          </p:nvPicPr>
+          <p:blipFill>
+            <a:blip r:embed="rId4"/>
+            <a:stretch>
+              <a:fillRect/>
+            </a:stretch>
+          </p:blipFill>
+          <p:spPr>
+            <a:xfrm>
+              <a:off x="298450" y="2429634"/>
+              <a:ext cx="2933700" cy="646526"/>
+            </a:xfrm>
+            <a:prstGeom prst="rect">
+              <a:avLst/>
+            </a:prstGeom>
+          </p:spPr>
+        </p:pic>
+      </p:grpSp>
+      <p:pic>
+        <p:nvPicPr>
+          <p:cNvPr id="75" name="Picture 74">
+            <a:extLst>
+              <a:ext uri="{FF2B5EF4-FFF2-40B4-BE49-F238E27FC236}">
+                <a16:creationId xmlns:a16="http://schemas.microsoft.com/office/drawing/2014/main" id="{0A7FCA97-BC83-46EB-9377-33A9CD4F2DBB}"/>
+              </a:ext>
+            </a:extLst>
+          </p:cNvPr>
+          <p:cNvPicPr>
+            <a:picLocks noChangeAspect="1"/>
+          </p:cNvPicPr>
+          <p:nvPr/>
+        </p:nvPicPr>
+        <p:blipFill>
+          <a:blip r:embed="rId5"/>
+          <a:stretch>
+            <a:fillRect/>
+          </a:stretch>
+        </p:blipFill>
+        <p:spPr>
+          <a:xfrm>
+            <a:off x="6164750" y="10008205"/>
+            <a:ext cx="6481178" cy="2093919"/>
+          </a:xfrm>
+          <a:prstGeom prst="rect">
+            <a:avLst/>
+          </a:prstGeom>
+        </p:spPr>
+      </p:pic>
+      <p:sp>
+        <p:nvSpPr>
+          <p:cNvPr id="30" name="Left Brace 29">
+            <a:extLst>
+              <a:ext uri="{FF2B5EF4-FFF2-40B4-BE49-F238E27FC236}">
+                <a16:creationId xmlns:a16="http://schemas.microsoft.com/office/drawing/2014/main" id="{3E44B7B7-CD1E-4EE2-B996-8B77D6AE9EF4}"/>
+              </a:ext>
+            </a:extLst>
+          </p:cNvPr>
+          <p:cNvSpPr/>
+          <p:nvPr/>
+        </p:nvSpPr>
+        <p:spPr>
+          <a:xfrm rot="5400000">
+            <a:off x="10646493" y="5065392"/>
+            <a:ext cx="669973" cy="9770958"/>
+          </a:xfrm>
+          <a:prstGeom prst="leftBrace">
+            <a:avLst>
+              <a:gd name="adj1" fmla="val 8333"/>
+              <a:gd name="adj2" fmla="val 43625"/>
+            </a:avLst>
+          </a:prstGeom>
+          <a:ln w="38100">
+            <a:solidFill>
+              <a:schemeClr val="accent4"/>
+            </a:solidFill>
+          </a:ln>
+        </p:spPr>
+        <p:style>
+          <a:lnRef idx="1">
+            <a:schemeClr val="accent1"/>
+          </a:lnRef>
+          <a:fillRef idx="0">
+            <a:schemeClr val="accent1"/>
+          </a:fillRef>
+          <a:effectRef idx="0">
+            <a:schemeClr val="accent1"/>
+          </a:effectRef>
+          <a:fontRef idx="minor">
+            <a:schemeClr val="tx1"/>
+          </a:fontRef>
+        </p:style>
+        <p:txBody>
+          <a:bodyPr rtlCol="0" anchor="ctr"/>
+          <a:lstStyle/>
+          <a:p>
+            <a:pPr algn="ctr"/>
+            <a:endParaRPr lang="en-GB" sz="2025" dirty="0"/>
+          </a:p>
+        </p:txBody>
+      </p:sp>
+      <p:sp>
+        <p:nvSpPr>
+          <p:cNvPr id="49" name="Left Brace 48">
+            <a:extLst>
+              <a:ext uri="{FF2B5EF4-FFF2-40B4-BE49-F238E27FC236}">
+                <a16:creationId xmlns:a16="http://schemas.microsoft.com/office/drawing/2014/main" id="{B33C836E-9730-4830-AB37-468222FE110C}"/>
+              </a:ext>
+            </a:extLst>
+          </p:cNvPr>
+          <p:cNvSpPr/>
+          <p:nvPr/>
+        </p:nvSpPr>
+        <p:spPr>
+          <a:xfrm rot="5400000">
+            <a:off x="14166789" y="7247588"/>
+            <a:ext cx="669973" cy="3315068"/>
+          </a:xfrm>
+          <a:prstGeom prst="leftBrace">
+            <a:avLst>
+              <a:gd name="adj1" fmla="val 8333"/>
+              <a:gd name="adj2" fmla="val 26447"/>
+            </a:avLst>
+          </a:prstGeom>
+          <a:ln w="38100">
+            <a:solidFill>
+              <a:schemeClr val="accent4"/>
+            </a:solidFill>
+          </a:ln>
+        </p:spPr>
+        <p:style>
+          <a:lnRef idx="1">
+            <a:schemeClr val="accent1"/>
+          </a:lnRef>
+          <a:fillRef idx="0">
+            <a:schemeClr val="accent1"/>
+          </a:fillRef>
+          <a:effectRef idx="0">
+            <a:schemeClr val="accent1"/>
+          </a:effectRef>
+          <a:fontRef idx="minor">
+            <a:schemeClr val="tx1"/>
+          </a:fontRef>
+        </p:style>
+        <p:txBody>
+          <a:bodyPr rtlCol="0" anchor="ctr"/>
+          <a:lstStyle/>
+          <a:p>
+            <a:pPr algn="ctr"/>
+            <a:endParaRPr lang="en-GB" sz="2025" dirty="0"/>
+          </a:p>
+        </p:txBody>
+      </p:sp>
+      <p:pic>
+        <p:nvPicPr>
+          <p:cNvPr id="69" name="Picture 68">
+            <a:extLst>
+              <a:ext uri="{FF2B5EF4-FFF2-40B4-BE49-F238E27FC236}">
+                <a16:creationId xmlns:a16="http://schemas.microsoft.com/office/drawing/2014/main" id="{5545F5FD-0A29-4733-8303-08F072A9065F}"/>
+              </a:ext>
+            </a:extLst>
+          </p:cNvPr>
+          <p:cNvPicPr>
+            <a:picLocks noChangeAspect="1"/>
+          </p:cNvPicPr>
+          <p:nvPr/>
+        </p:nvPicPr>
+        <p:blipFill>
+          <a:blip r:embed="rId6"/>
+          <a:stretch>
+            <a:fillRect/>
+          </a:stretch>
+        </p:blipFill>
+        <p:spPr>
+          <a:xfrm>
+            <a:off x="7152277" y="6801268"/>
+            <a:ext cx="8912807" cy="2867003"/>
+          </a:xfrm>
+          <a:prstGeom prst="rect">
+            <a:avLst/>
+          </a:prstGeom>
+        </p:spPr>
+      </p:pic>
+      <p:pic>
+        <p:nvPicPr>
+          <p:cNvPr id="68" name="Picture 67">
+            <a:extLst>
+              <a:ext uri="{FF2B5EF4-FFF2-40B4-BE49-F238E27FC236}">
+                <a16:creationId xmlns:a16="http://schemas.microsoft.com/office/drawing/2014/main" id="{42CFFB3A-F8E1-49EA-8D69-A578AEF91F79}"/>
+              </a:ext>
+            </a:extLst>
+          </p:cNvPr>
+          <p:cNvPicPr>
+            <a:picLocks noChangeAspect="1"/>
+          </p:cNvPicPr>
+          <p:nvPr/>
+        </p:nvPicPr>
+        <p:blipFill>
+          <a:blip r:embed="rId7"/>
+          <a:stretch>
+            <a:fillRect/>
+          </a:stretch>
+        </p:blipFill>
+        <p:spPr>
+          <a:xfrm>
+            <a:off x="146132" y="4491589"/>
+            <a:ext cx="4886071" cy="2610081"/>
+          </a:xfrm>
+          <a:prstGeom prst="rect">
+            <a:avLst/>
+          </a:prstGeom>
+        </p:spPr>
+      </p:pic>
+      <p:sp>
+        <p:nvSpPr>
+          <p:cNvPr id="15" name="Left Brace 14">
+            <a:extLst>
+              <a:ext uri="{FF2B5EF4-FFF2-40B4-BE49-F238E27FC236}">
+                <a16:creationId xmlns:a16="http://schemas.microsoft.com/office/drawing/2014/main" id="{E4F55F19-6D3D-40FC-9579-C24CDFA3E5B6}"/>
+              </a:ext>
+            </a:extLst>
+          </p:cNvPr>
+          <p:cNvSpPr/>
+          <p:nvPr/>
+        </p:nvSpPr>
+        <p:spPr>
+          <a:xfrm rot="5400000">
+            <a:off x="8949423" y="2174648"/>
+            <a:ext cx="508102" cy="4546963"/>
+          </a:xfrm>
+          <a:prstGeom prst="leftBrace">
+            <a:avLst>
+              <a:gd name="adj1" fmla="val 8333"/>
+              <a:gd name="adj2" fmla="val 41551"/>
+            </a:avLst>
+          </a:prstGeom>
+          <a:ln w="38100">
+            <a:solidFill>
+              <a:schemeClr val="accent4"/>
+            </a:solidFill>
+          </a:ln>
+        </p:spPr>
+        <p:style>
+          <a:lnRef idx="1">
+            <a:schemeClr val="accent1"/>
+          </a:lnRef>
+          <a:fillRef idx="0">
+            <a:schemeClr val="accent1"/>
+          </a:fillRef>
+          <a:effectRef idx="0">
+            <a:schemeClr val="accent1"/>
+          </a:effectRef>
+          <a:fontRef idx="minor">
+            <a:schemeClr val="tx1"/>
+          </a:fontRef>
+        </p:style>
+        <p:txBody>
+          <a:bodyPr rtlCol="0" anchor="ctr"/>
+          <a:lstStyle/>
+          <a:p>
+            <a:pPr algn="ctr"/>
+            <a:endParaRPr lang="en-GB" sz="2025" dirty="0"/>
+          </a:p>
+        </p:txBody>
+      </p:sp>
+      <p:pic>
+        <p:nvPicPr>
+          <p:cNvPr id="64" name="Picture 63">
+            <a:extLst>
+              <a:ext uri="{FF2B5EF4-FFF2-40B4-BE49-F238E27FC236}">
+                <a16:creationId xmlns:a16="http://schemas.microsoft.com/office/drawing/2014/main" id="{4E715E5D-C7F9-4B23-B2BA-76F64D4CE02B}"/>
+              </a:ext>
+            </a:extLst>
+          </p:cNvPr>
+          <p:cNvPicPr>
+            <a:picLocks noChangeAspect="1"/>
+          </p:cNvPicPr>
+          <p:nvPr/>
+        </p:nvPicPr>
+        <p:blipFill>
+          <a:blip r:embed="rId8"/>
+          <a:stretch>
+            <a:fillRect/>
+          </a:stretch>
+        </p:blipFill>
+        <p:spPr>
+          <a:xfrm>
+            <a:off x="5403087" y="4941575"/>
+            <a:ext cx="1258608" cy="559381"/>
+          </a:xfrm>
+          <a:prstGeom prst="rect">
+            <a:avLst/>
+          </a:prstGeom>
+        </p:spPr>
+      </p:pic>
+      <p:pic>
+        <p:nvPicPr>
+          <p:cNvPr id="66" name="Picture 65">
+            <a:extLst>
+              <a:ext uri="{FF2B5EF4-FFF2-40B4-BE49-F238E27FC236}">
+                <a16:creationId xmlns:a16="http://schemas.microsoft.com/office/drawing/2014/main" id="{7035FBB7-7C33-436E-80F4-4F1006D6D7E1}"/>
+              </a:ext>
+            </a:extLst>
+          </p:cNvPr>
+          <p:cNvPicPr>
+            <a:picLocks noChangeAspect="1"/>
+          </p:cNvPicPr>
+          <p:nvPr/>
+        </p:nvPicPr>
+        <p:blipFill>
+          <a:blip r:embed="rId9"/>
+          <a:stretch>
+            <a:fillRect/>
+          </a:stretch>
+        </p:blipFill>
+        <p:spPr>
+          <a:xfrm>
+            <a:off x="5403087" y="5566807"/>
+            <a:ext cx="1295931" cy="573200"/>
+          </a:xfrm>
+          <a:prstGeom prst="rect">
+            <a:avLst/>
+          </a:prstGeom>
+        </p:spPr>
+      </p:pic>
+      <p:pic>
+        <p:nvPicPr>
+          <p:cNvPr id="70" name="Picture 69">
+            <a:extLst>
+              <a:ext uri="{FF2B5EF4-FFF2-40B4-BE49-F238E27FC236}">
+                <a16:creationId xmlns:a16="http://schemas.microsoft.com/office/drawing/2014/main" id="{D0DF74CB-1C45-4936-9E98-FED28E2528F6}"/>
+              </a:ext>
+            </a:extLst>
+          </p:cNvPr>
+          <p:cNvPicPr>
+            <a:picLocks noChangeAspect="1"/>
+          </p:cNvPicPr>
+          <p:nvPr/>
+        </p:nvPicPr>
+        <p:blipFill>
+          <a:blip r:embed="rId10"/>
+          <a:stretch>
+            <a:fillRect/>
+          </a:stretch>
+        </p:blipFill>
+        <p:spPr>
+          <a:xfrm>
+            <a:off x="5396481" y="6204138"/>
+            <a:ext cx="1271821" cy="562536"/>
+          </a:xfrm>
+          <a:prstGeom prst="rect">
+            <a:avLst/>
+          </a:prstGeom>
+        </p:spPr>
+      </p:pic>
+      <p:cxnSp>
+        <p:nvCxnSpPr>
+          <p:cNvPr id="18" name="Straight Connector 17">
+            <a:extLst>
+              <a:ext uri="{FF2B5EF4-FFF2-40B4-BE49-F238E27FC236}">
+                <a16:creationId xmlns:a16="http://schemas.microsoft.com/office/drawing/2014/main" id="{38FE55ED-9890-448D-B9B6-36A3574E90DB}"/>
+              </a:ext>
+            </a:extLst>
+          </p:cNvPr>
+          <p:cNvCxnSpPr>
+            <a:cxnSpLocks/>
+          </p:cNvCxnSpPr>
+          <p:nvPr/>
+        </p:nvCxnSpPr>
+        <p:spPr>
+          <a:xfrm>
+            <a:off x="6929992" y="5343092"/>
+            <a:ext cx="9270446" cy="0"/>
+          </a:xfrm>
+          <a:prstGeom prst="line">
+            <a:avLst/>
+          </a:prstGeom>
+          <a:ln w="57150">
+            <a:solidFill>
+              <a:schemeClr val="bg1">
+                <a:lumMod val="50000"/>
+              </a:schemeClr>
+            </a:solidFill>
+            <a:prstDash val="sysDot"/>
+          </a:ln>
+        </p:spPr>
+        <p:style>
+          <a:lnRef idx="1">
+            <a:schemeClr val="accent1"/>
+          </a:lnRef>
+          <a:fillRef idx="0">
+            <a:schemeClr val="accent1"/>
+          </a:fillRef>
+          <a:effectRef idx="0">
+            <a:schemeClr val="accent1"/>
+          </a:effectRef>
+          <a:fontRef idx="minor">
+            <a:schemeClr val="tx1"/>
+          </a:fontRef>
+        </p:style>
+      </p:cxnSp>
+      <p:sp>
+        <p:nvSpPr>
+          <p:cNvPr id="10" name="Left Brace 9">
+            <a:extLst>
+              <a:ext uri="{FF2B5EF4-FFF2-40B4-BE49-F238E27FC236}">
+                <a16:creationId xmlns:a16="http://schemas.microsoft.com/office/drawing/2014/main" id="{D9BAFF37-C112-4618-A993-30FC9730AEDC}"/>
+              </a:ext>
+            </a:extLst>
+          </p:cNvPr>
+          <p:cNvSpPr/>
+          <p:nvPr/>
+        </p:nvSpPr>
+        <p:spPr>
+          <a:xfrm rot="5400000">
+            <a:off x="9650567" y="4030968"/>
+            <a:ext cx="669973" cy="2944717"/>
+          </a:xfrm>
+          <a:prstGeom prst="leftBrace">
+            <a:avLst>
+              <a:gd name="adj1" fmla="val 8333"/>
+              <a:gd name="adj2" fmla="val 23994"/>
+            </a:avLst>
+          </a:prstGeom>
+          <a:ln w="38100">
+            <a:solidFill>
+              <a:schemeClr val="accent4"/>
+            </a:solidFill>
+          </a:ln>
+        </p:spPr>
+        <p:style>
+          <a:lnRef idx="1">
+            <a:schemeClr val="accent1"/>
+          </a:lnRef>
+          <a:fillRef idx="0">
+            <a:schemeClr val="accent1"/>
+          </a:fillRef>
+          <a:effectRef idx="0">
+            <a:schemeClr val="accent1"/>
+          </a:effectRef>
+          <a:fontRef idx="minor">
+            <a:schemeClr val="tx1"/>
+          </a:fontRef>
+        </p:style>
+        <p:txBody>
+          <a:bodyPr rtlCol="0" anchor="ctr"/>
+          <a:lstStyle/>
+          <a:p>
+            <a:pPr algn="ctr"/>
+            <a:endParaRPr lang="en-GB" sz="2025" dirty="0"/>
+          </a:p>
+        </p:txBody>
+      </p:sp>
+      <p:pic>
+        <p:nvPicPr>
+          <p:cNvPr id="34" name="Picture 33">
+            <a:extLst>
+              <a:ext uri="{FF2B5EF4-FFF2-40B4-BE49-F238E27FC236}">
+                <a16:creationId xmlns:a16="http://schemas.microsoft.com/office/drawing/2014/main" id="{DC6E078F-F4E9-45A8-9592-0849B5A771D6}"/>
+              </a:ext>
+            </a:extLst>
+          </p:cNvPr>
+          <p:cNvPicPr>
+            <a:picLocks noChangeAspect="1"/>
+          </p:cNvPicPr>
+          <p:nvPr/>
+        </p:nvPicPr>
+        <p:blipFill>
+          <a:blip r:embed="rId11"/>
+          <a:stretch>
+            <a:fillRect/>
+          </a:stretch>
+        </p:blipFill>
+        <p:spPr>
+          <a:xfrm>
+            <a:off x="12930077" y="9003052"/>
+            <a:ext cx="3213343" cy="639856"/>
+          </a:xfrm>
+          <a:prstGeom prst="rect">
+            <a:avLst/>
+          </a:prstGeom>
+        </p:spPr>
+      </p:pic>
+      <p:pic>
+        <p:nvPicPr>
+          <p:cNvPr id="17" name="Picture 16">
+            <a:extLst>
+              <a:ext uri="{FF2B5EF4-FFF2-40B4-BE49-F238E27FC236}">
+                <a16:creationId xmlns:a16="http://schemas.microsoft.com/office/drawing/2014/main" id="{2A510AD6-A12F-4614-8D5F-EAA53E47B411}"/>
+              </a:ext>
+            </a:extLst>
+          </p:cNvPr>
+          <p:cNvPicPr>
+            <a:picLocks noChangeAspect="1"/>
+          </p:cNvPicPr>
+          <p:nvPr/>
+        </p:nvPicPr>
+        <p:blipFill>
+          <a:blip r:embed="rId12"/>
+          <a:stretch>
+            <a:fillRect/>
+          </a:stretch>
+        </p:blipFill>
+        <p:spPr>
+          <a:xfrm>
+            <a:off x="13023642" y="11523642"/>
+            <a:ext cx="2754851" cy="1371384"/>
+          </a:xfrm>
+          <a:prstGeom prst="rect">
+            <a:avLst/>
+          </a:prstGeom>
+        </p:spPr>
+      </p:pic>
+      <p:pic>
+        <p:nvPicPr>
+          <p:cNvPr id="39" name="Picture 38">
+            <a:extLst>
+              <a:ext uri="{FF2B5EF4-FFF2-40B4-BE49-F238E27FC236}">
+                <a16:creationId xmlns:a16="http://schemas.microsoft.com/office/drawing/2014/main" id="{5E8338BF-3C0E-4D21-82FF-37CD415C1135}"/>
+              </a:ext>
+            </a:extLst>
+          </p:cNvPr>
+          <p:cNvPicPr>
+            <a:picLocks noChangeAspect="1"/>
+          </p:cNvPicPr>
+          <p:nvPr/>
+        </p:nvPicPr>
+        <p:blipFill>
+          <a:blip r:embed="rId13"/>
+          <a:stretch>
+            <a:fillRect/>
+          </a:stretch>
+        </p:blipFill>
+        <p:spPr>
+          <a:xfrm>
+            <a:off x="6380459" y="13493961"/>
+            <a:ext cx="1363978" cy="675432"/>
+          </a:xfrm>
+          <a:prstGeom prst="rect">
+            <a:avLst/>
+          </a:prstGeom>
+        </p:spPr>
+      </p:pic>
+      <p:sp>
+        <p:nvSpPr>
+          <p:cNvPr id="38" name="Left Brace 37">
+            <a:extLst>
+              <a:ext uri="{FF2B5EF4-FFF2-40B4-BE49-F238E27FC236}">
+                <a16:creationId xmlns:a16="http://schemas.microsoft.com/office/drawing/2014/main" id="{113523E7-4C37-484A-AEB2-5827C7EEAAD4}"/>
+              </a:ext>
+            </a:extLst>
+          </p:cNvPr>
+          <p:cNvSpPr/>
+          <p:nvPr/>
+        </p:nvSpPr>
+        <p:spPr>
+          <a:xfrm rot="5400000">
+            <a:off x="6250640" y="12251524"/>
+            <a:ext cx="669973" cy="2339616"/>
+          </a:xfrm>
+          <a:prstGeom prst="leftBrace">
+            <a:avLst>
+              <a:gd name="adj1" fmla="val 8333"/>
+              <a:gd name="adj2" fmla="val 33218"/>
+            </a:avLst>
+          </a:prstGeom>
+          <a:ln w="38100">
+            <a:solidFill>
+              <a:schemeClr val="accent4"/>
+            </a:solidFill>
+          </a:ln>
+        </p:spPr>
+        <p:style>
+          <a:lnRef idx="1">
+            <a:schemeClr val="accent1"/>
+          </a:lnRef>
+          <a:fillRef idx="0">
+            <a:schemeClr val="accent1"/>
+          </a:fillRef>
+          <a:effectRef idx="0">
+            <a:schemeClr val="accent1"/>
+          </a:effectRef>
+          <a:fontRef idx="minor">
+            <a:schemeClr val="tx1"/>
+          </a:fontRef>
+        </p:style>
+        <p:txBody>
+          <a:bodyPr rtlCol="0" anchor="ctr"/>
+          <a:lstStyle/>
+          <a:p>
+            <a:pPr algn="ctr"/>
+            <a:endParaRPr lang="en-GB" sz="2025" dirty="0"/>
+          </a:p>
+        </p:txBody>
+      </p:sp>
+      <p:sp>
+        <p:nvSpPr>
+          <p:cNvPr id="36" name="Left Brace 35">
+            <a:extLst>
+              <a:ext uri="{FF2B5EF4-FFF2-40B4-BE49-F238E27FC236}">
+                <a16:creationId xmlns:a16="http://schemas.microsoft.com/office/drawing/2014/main" id="{A031CF25-C2FD-4ED8-9178-17403CC0C15B}"/>
+              </a:ext>
+            </a:extLst>
+          </p:cNvPr>
+          <p:cNvSpPr/>
+          <p:nvPr/>
+        </p:nvSpPr>
+        <p:spPr>
+          <a:xfrm rot="5400000">
+            <a:off x="6737363" y="9267156"/>
+            <a:ext cx="669973" cy="4633286"/>
+          </a:xfrm>
+          <a:prstGeom prst="leftBrace">
+            <a:avLst>
+              <a:gd name="adj1" fmla="val 8333"/>
+              <a:gd name="adj2" fmla="val 25586"/>
+            </a:avLst>
+          </a:prstGeom>
+          <a:ln w="38100">
+            <a:solidFill>
+              <a:schemeClr val="accent4"/>
+            </a:solidFill>
+          </a:ln>
+        </p:spPr>
+        <p:style>
+          <a:lnRef idx="1">
+            <a:schemeClr val="accent1"/>
+          </a:lnRef>
+          <a:fillRef idx="0">
+            <a:schemeClr val="accent1"/>
+          </a:fillRef>
+          <a:effectRef idx="0">
+            <a:schemeClr val="accent1"/>
+          </a:effectRef>
+          <a:fontRef idx="minor">
+            <a:schemeClr val="tx1"/>
+          </a:fontRef>
+        </p:style>
+        <p:txBody>
+          <a:bodyPr rtlCol="0" anchor="ctr"/>
+          <a:lstStyle/>
+          <a:p>
+            <a:pPr algn="ctr"/>
+            <a:endParaRPr lang="en-GB" sz="2025" dirty="0"/>
+          </a:p>
+        </p:txBody>
+      </p:sp>
+      <p:cxnSp>
+        <p:nvCxnSpPr>
+          <p:cNvPr id="8" name="Straight Connector 7">
+            <a:extLst>
+              <a:ext uri="{FF2B5EF4-FFF2-40B4-BE49-F238E27FC236}">
+                <a16:creationId xmlns:a16="http://schemas.microsoft.com/office/drawing/2014/main" id="{B3C21FE1-62D5-40B2-8293-E02C7F95F45F}"/>
+              </a:ext>
+            </a:extLst>
+          </p:cNvPr>
+          <p:cNvCxnSpPr>
+            <a:cxnSpLocks/>
+          </p:cNvCxnSpPr>
+          <p:nvPr/>
+        </p:nvCxnSpPr>
+        <p:spPr>
+          <a:xfrm>
+            <a:off x="133159" y="1603092"/>
+            <a:ext cx="16067279" cy="0"/>
+          </a:xfrm>
+          <a:prstGeom prst="line">
+            <a:avLst/>
+          </a:prstGeom>
+          <a:ln w="57150">
+            <a:solidFill>
+              <a:schemeClr val="bg1">
+                <a:lumMod val="50000"/>
+              </a:schemeClr>
+            </a:solidFill>
+            <a:prstDash val="sysDot"/>
+          </a:ln>
+        </p:spPr>
+        <p:style>
+          <a:lnRef idx="1">
+            <a:schemeClr val="accent1"/>
+          </a:lnRef>
+          <a:fillRef idx="0">
+            <a:schemeClr val="accent1"/>
+          </a:fillRef>
+          <a:effectRef idx="0">
+            <a:schemeClr val="accent1"/>
+          </a:effectRef>
+          <a:fontRef idx="minor">
+            <a:schemeClr val="tx1"/>
+          </a:fontRef>
+        </p:style>
+      </p:cxnSp>
+      <p:sp>
+        <p:nvSpPr>
+          <p:cNvPr id="14" name="Left Brace 13">
+            <a:extLst>
+              <a:ext uri="{FF2B5EF4-FFF2-40B4-BE49-F238E27FC236}">
+                <a16:creationId xmlns:a16="http://schemas.microsoft.com/office/drawing/2014/main" id="{21CB80A6-2177-4740-A5FA-B2FC1E8D547F}"/>
+              </a:ext>
+            </a:extLst>
+          </p:cNvPr>
+          <p:cNvSpPr/>
+          <p:nvPr/>
+        </p:nvSpPr>
+        <p:spPr>
+          <a:xfrm rot="5400000">
+            <a:off x="6658439" y="-3299029"/>
+            <a:ext cx="669973" cy="10046251"/>
+          </a:xfrm>
+          <a:prstGeom prst="leftBrace">
+            <a:avLst>
+              <a:gd name="adj1" fmla="val 8333"/>
+              <a:gd name="adj2" fmla="val 64024"/>
+            </a:avLst>
+          </a:prstGeom>
+          <a:ln w="38100">
+            <a:solidFill>
+              <a:schemeClr val="accent4"/>
+            </a:solidFill>
+          </a:ln>
+        </p:spPr>
+        <p:style>
+          <a:lnRef idx="1">
+            <a:schemeClr val="accent1"/>
+          </a:lnRef>
+          <a:fillRef idx="0">
+            <a:schemeClr val="accent1"/>
+          </a:fillRef>
+          <a:effectRef idx="0">
+            <a:schemeClr val="accent1"/>
+          </a:effectRef>
+          <a:fontRef idx="minor">
+            <a:schemeClr val="tx1"/>
+          </a:fontRef>
+        </p:style>
+        <p:txBody>
+          <a:bodyPr rtlCol="0" anchor="ctr"/>
+          <a:lstStyle/>
+          <a:p>
+            <a:pPr algn="ctr"/>
+            <a:endParaRPr lang="en-GB" sz="2025" dirty="0"/>
+          </a:p>
+        </p:txBody>
+      </p:sp>
+      <p:pic>
+        <p:nvPicPr>
+          <p:cNvPr id="2" name="Picture 1">
+            <a:extLst>
+              <a:ext uri="{FF2B5EF4-FFF2-40B4-BE49-F238E27FC236}">
+                <a16:creationId xmlns:a16="http://schemas.microsoft.com/office/drawing/2014/main" id="{36CE73C9-BA77-4ECA-AA16-858684EEB8DD}"/>
+              </a:ext>
+            </a:extLst>
+          </p:cNvPr>
+          <p:cNvPicPr>
+            <a:picLocks noChangeAspect="1"/>
+          </p:cNvPicPr>
+          <p:nvPr/>
+        </p:nvPicPr>
+        <p:blipFill>
+          <a:blip r:embed="rId14"/>
+          <a:stretch>
+            <a:fillRect/>
+          </a:stretch>
+        </p:blipFill>
+        <p:spPr>
+          <a:xfrm>
+            <a:off x="133153" y="88354"/>
+            <a:ext cx="892528" cy="579404"/>
+          </a:xfrm>
+          <a:prstGeom prst="rect">
+            <a:avLst/>
+          </a:prstGeom>
+        </p:spPr>
+      </p:pic>
+      <p:pic>
+        <p:nvPicPr>
+          <p:cNvPr id="3" name="Picture 2">
+            <a:extLst>
+              <a:ext uri="{FF2B5EF4-FFF2-40B4-BE49-F238E27FC236}">
+                <a16:creationId xmlns:a16="http://schemas.microsoft.com/office/drawing/2014/main" id="{BAC2FA6D-7E44-4A70-ABBF-441AC58C61D8}"/>
+              </a:ext>
+            </a:extLst>
+          </p:cNvPr>
+          <p:cNvPicPr>
+            <a:picLocks noChangeAspect="1"/>
+          </p:cNvPicPr>
+          <p:nvPr/>
+        </p:nvPicPr>
+        <p:blipFill>
+          <a:blip r:embed="rId15"/>
+          <a:stretch>
+            <a:fillRect/>
+          </a:stretch>
+        </p:blipFill>
+        <p:spPr>
+          <a:xfrm>
+            <a:off x="133153" y="1727119"/>
+            <a:ext cx="892528" cy="586800"/>
+          </a:xfrm>
+          <a:prstGeom prst="rect">
+            <a:avLst/>
+          </a:prstGeom>
+        </p:spPr>
+      </p:pic>
+      <p:pic>
+        <p:nvPicPr>
+          <p:cNvPr id="4" name="Picture 3">
+            <a:extLst>
+              <a:ext uri="{FF2B5EF4-FFF2-40B4-BE49-F238E27FC236}">
+                <a16:creationId xmlns:a16="http://schemas.microsoft.com/office/drawing/2014/main" id="{FB95A457-1250-418F-8752-3AD3D6CA1CBF}"/>
+              </a:ext>
+            </a:extLst>
+          </p:cNvPr>
+          <p:cNvPicPr>
+            <a:picLocks noChangeAspect="1"/>
+          </p:cNvPicPr>
+          <p:nvPr/>
+        </p:nvPicPr>
+        <p:blipFill>
+          <a:blip r:embed="rId16"/>
+          <a:stretch>
+            <a:fillRect/>
+          </a:stretch>
+        </p:blipFill>
+        <p:spPr>
+          <a:xfrm>
+            <a:off x="109831" y="8197177"/>
+            <a:ext cx="892528" cy="586800"/>
+          </a:xfrm>
+          <a:prstGeom prst="rect">
+            <a:avLst/>
+          </a:prstGeom>
+        </p:spPr>
+      </p:pic>
+      <p:sp>
+        <p:nvSpPr>
+          <p:cNvPr id="23" name="TextBox 22">
+            <a:extLst>
+              <a:ext uri="{FF2B5EF4-FFF2-40B4-BE49-F238E27FC236}">
+                <a16:creationId xmlns:a16="http://schemas.microsoft.com/office/drawing/2014/main" id="{06F8B482-C37F-4E4C-9FB0-942BA9C3D5D1}"/>
+              </a:ext>
+            </a:extLst>
+          </p:cNvPr>
+          <p:cNvSpPr txBox="1"/>
+          <p:nvPr/>
+        </p:nvSpPr>
+        <p:spPr>
+          <a:xfrm>
+            <a:off x="1025682" y="153427"/>
+            <a:ext cx="1813060" cy="727571"/>
+          </a:xfrm>
+          <a:prstGeom prst="rect">
+            <a:avLst/>
+          </a:prstGeom>
+          <a:noFill/>
+        </p:spPr>
+        <p:txBody>
+          <a:bodyPr wrap="none" rtlCol="0">
+            <a:spAutoFit/>
+          </a:bodyPr>
+          <a:lstStyle/>
+          <a:p>
+            <a:r>
+              <a:rPr lang="en-US" sz="2400" b="1" dirty="0"/>
+              <a:t>Grandparent</a:t>
+            </a:r>
+          </a:p>
+          <a:p>
+            <a:r>
+              <a:rPr lang="en-US" sz="1728" b="1" dirty="0">
+                <a:solidFill>
+                  <a:schemeClr val="bg1">
+                    <a:lumMod val="75000"/>
+                  </a:schemeClr>
+                </a:solidFill>
+              </a:rPr>
+              <a:t>(optional)</a:t>
+            </a:r>
+            <a:endParaRPr lang="en-GB" sz="1728" b="1" dirty="0">
+              <a:solidFill>
+                <a:schemeClr val="bg1">
+                  <a:lumMod val="75000"/>
+                </a:schemeClr>
+              </a:solidFill>
+            </a:endParaRPr>
+          </a:p>
+        </p:txBody>
+      </p:sp>
+      <p:sp>
+        <p:nvSpPr>
+          <p:cNvPr id="24" name="TextBox 23">
+            <a:extLst>
+              <a:ext uri="{FF2B5EF4-FFF2-40B4-BE49-F238E27FC236}">
+                <a16:creationId xmlns:a16="http://schemas.microsoft.com/office/drawing/2014/main" id="{2B1D7642-1297-4FF4-AC1C-9E90A1648238}"/>
+              </a:ext>
+            </a:extLst>
+          </p:cNvPr>
+          <p:cNvSpPr txBox="1"/>
+          <p:nvPr/>
+        </p:nvSpPr>
+        <p:spPr>
+          <a:xfrm>
+            <a:off x="1002359" y="1789696"/>
+            <a:ext cx="1025089" cy="461665"/>
+          </a:xfrm>
+          <a:prstGeom prst="rect">
+            <a:avLst/>
+          </a:prstGeom>
+          <a:noFill/>
+        </p:spPr>
+        <p:txBody>
+          <a:bodyPr wrap="none" rtlCol="0">
+            <a:spAutoFit/>
+          </a:bodyPr>
+          <a:lstStyle/>
+          <a:p>
+            <a:r>
+              <a:rPr lang="en-US" sz="2400" b="1" dirty="0"/>
+              <a:t>Parent</a:t>
+            </a:r>
+            <a:endParaRPr lang="en-GB" sz="2400" b="1" dirty="0"/>
+          </a:p>
+        </p:txBody>
+      </p:sp>
+      <p:sp>
+        <p:nvSpPr>
+          <p:cNvPr id="25" name="TextBox 24">
+            <a:extLst>
+              <a:ext uri="{FF2B5EF4-FFF2-40B4-BE49-F238E27FC236}">
+                <a16:creationId xmlns:a16="http://schemas.microsoft.com/office/drawing/2014/main" id="{6B7827E1-5A9B-4381-BD48-FF1E8075FB93}"/>
+              </a:ext>
+            </a:extLst>
+          </p:cNvPr>
+          <p:cNvSpPr txBox="1"/>
+          <p:nvPr/>
+        </p:nvSpPr>
+        <p:spPr>
+          <a:xfrm>
+            <a:off x="1043060" y="8259823"/>
+            <a:ext cx="829073" cy="461665"/>
+          </a:xfrm>
+          <a:prstGeom prst="rect">
+            <a:avLst/>
+          </a:prstGeom>
+          <a:noFill/>
+        </p:spPr>
+        <p:txBody>
+          <a:bodyPr wrap="none" rtlCol="0">
+            <a:spAutoFit/>
+          </a:bodyPr>
+          <a:lstStyle/>
+          <a:p>
+            <a:r>
+              <a:rPr lang="en-US" sz="2400" b="1" dirty="0"/>
+              <a:t>Child</a:t>
+            </a:r>
+            <a:endParaRPr lang="en-GB" sz="2400" b="1" dirty="0"/>
+          </a:p>
+        </p:txBody>
+      </p:sp>
+      <p:sp>
+        <p:nvSpPr>
+          <p:cNvPr id="6" name="TextBox 5">
+            <a:extLst>
+              <a:ext uri="{FF2B5EF4-FFF2-40B4-BE49-F238E27FC236}">
+                <a16:creationId xmlns:a16="http://schemas.microsoft.com/office/drawing/2014/main" id="{17F8A168-3F01-42AA-ACD1-52226D338250}"/>
+              </a:ext>
+            </a:extLst>
+          </p:cNvPr>
+          <p:cNvSpPr txBox="1"/>
+          <p:nvPr/>
+        </p:nvSpPr>
+        <p:spPr>
+          <a:xfrm>
+            <a:off x="15370019" y="-5272"/>
+            <a:ext cx="840295" cy="403957"/>
+          </a:xfrm>
+          <a:prstGeom prst="rect">
+            <a:avLst/>
+          </a:prstGeom>
+          <a:noFill/>
+        </p:spPr>
+        <p:txBody>
+          <a:bodyPr wrap="none" rtlCol="0">
+            <a:spAutoFit/>
+          </a:bodyPr>
+          <a:lstStyle/>
+          <a:p>
+            <a:r>
+              <a:rPr lang="en-GB" sz="2025" b="1" dirty="0"/>
+              <a:t>v1.8.5</a:t>
+            </a:r>
+          </a:p>
+        </p:txBody>
+      </p:sp>
+      <p:pic>
+        <p:nvPicPr>
+          <p:cNvPr id="5" name="Picture 4" descr="A screenshot of a cell phone&#10;&#10;Description automatically generated">
+            <a:extLst>
+              <a:ext uri="{FF2B5EF4-FFF2-40B4-BE49-F238E27FC236}">
+                <a16:creationId xmlns:a16="http://schemas.microsoft.com/office/drawing/2014/main" id="{9D5DA8E3-64DB-4086-90D5-4957AE971C73}"/>
+              </a:ext>
+            </a:extLst>
+          </p:cNvPr>
+          <p:cNvPicPr>
+            <a:picLocks noChangeAspect="1"/>
+          </p:cNvPicPr>
+          <p:nvPr/>
+        </p:nvPicPr>
+        <p:blipFill>
+          <a:blip r:embed="rId17">
+            <a:extLst>
+              <a:ext uri="{28A0092B-C50C-407E-A947-70E740481C1C}">
+                <a14:useLocalDpi xmlns:a14="http://schemas.microsoft.com/office/drawing/2010/main" val="0"/>
+              </a:ext>
+            </a:extLst>
+          </a:blip>
+          <a:stretch>
+            <a:fillRect/>
+          </a:stretch>
+        </p:blipFill>
+        <p:spPr>
+          <a:xfrm>
+            <a:off x="3065290" y="32072"/>
+            <a:ext cx="6699512" cy="1527060"/>
+          </a:xfrm>
+          <a:prstGeom prst="rect">
+            <a:avLst/>
+          </a:prstGeom>
+        </p:spPr>
+      </p:pic>
+      <p:cxnSp>
+        <p:nvCxnSpPr>
+          <p:cNvPr id="28" name="Straight Connector 27">
+            <a:extLst>
+              <a:ext uri="{FF2B5EF4-FFF2-40B4-BE49-F238E27FC236}">
+                <a16:creationId xmlns:a16="http://schemas.microsoft.com/office/drawing/2014/main" id="{ECB87505-EE27-4221-BABC-E83F318564FE}"/>
+              </a:ext>
+            </a:extLst>
+          </p:cNvPr>
+          <p:cNvCxnSpPr>
+            <a:cxnSpLocks/>
+          </p:cNvCxnSpPr>
+          <p:nvPr/>
+        </p:nvCxnSpPr>
+        <p:spPr>
+          <a:xfrm>
+            <a:off x="133158" y="9802040"/>
+            <a:ext cx="16067280" cy="0"/>
+          </a:xfrm>
+          <a:prstGeom prst="line">
+            <a:avLst/>
+          </a:prstGeom>
+          <a:ln w="57150">
+            <a:solidFill>
+              <a:schemeClr val="bg1">
+                <a:lumMod val="50000"/>
+              </a:schemeClr>
+            </a:solidFill>
+            <a:prstDash val="sysDot"/>
+          </a:ln>
+        </p:spPr>
+        <p:style>
+          <a:lnRef idx="1">
+            <a:schemeClr val="accent1"/>
+          </a:lnRef>
+          <a:fillRef idx="0">
+            <a:schemeClr val="accent1"/>
+          </a:fillRef>
+          <a:effectRef idx="0">
+            <a:schemeClr val="accent1"/>
+          </a:effectRef>
+          <a:fontRef idx="minor">
+            <a:schemeClr val="tx1"/>
+          </a:fontRef>
+        </p:style>
+      </p:cxnSp>
+      <p:sp>
+        <p:nvSpPr>
+          <p:cNvPr id="37" name="TextBox 36">
+            <a:extLst>
+              <a:ext uri="{FF2B5EF4-FFF2-40B4-BE49-F238E27FC236}">
+                <a16:creationId xmlns:a16="http://schemas.microsoft.com/office/drawing/2014/main" id="{6F1134F0-B278-42E9-8045-C82105634470}"/>
+              </a:ext>
+            </a:extLst>
+          </p:cNvPr>
+          <p:cNvSpPr txBox="1"/>
+          <p:nvPr/>
+        </p:nvSpPr>
+        <p:spPr>
+          <a:xfrm>
+            <a:off x="5500941" y="13698616"/>
+            <a:ext cx="822661" cy="307777"/>
+          </a:xfrm>
+          <a:prstGeom prst="rect">
+            <a:avLst/>
+          </a:prstGeom>
+          <a:noFill/>
+        </p:spPr>
+        <p:txBody>
+          <a:bodyPr wrap="none" rtlCol="0">
+            <a:spAutoFit/>
+          </a:bodyPr>
+          <a:lstStyle>
+            <a:defPPr>
+              <a:defRPr lang="en-US"/>
+            </a:defPPr>
+            <a:lvl1pPr>
+              <a:defRPr sz="1400"/>
+            </a:lvl1pPr>
+          </a:lstStyle>
+          <a:p>
+            <a:r>
+              <a:rPr lang="en-GB" dirty="0"/>
+              <a:t>@{False}</a:t>
+            </a:r>
+          </a:p>
+        </p:txBody>
+      </p:sp>
+      <p:pic>
+        <p:nvPicPr>
+          <p:cNvPr id="40" name="Picture 39">
+            <a:extLst>
+              <a:ext uri="{FF2B5EF4-FFF2-40B4-BE49-F238E27FC236}">
+                <a16:creationId xmlns:a16="http://schemas.microsoft.com/office/drawing/2014/main" id="{4DAF1527-CD65-4AB9-828A-1ED6FE0D86D7}"/>
+              </a:ext>
+            </a:extLst>
+          </p:cNvPr>
+          <p:cNvPicPr>
+            <a:picLocks noChangeAspect="1"/>
+          </p:cNvPicPr>
+          <p:nvPr/>
+        </p:nvPicPr>
+        <p:blipFill>
+          <a:blip r:embed="rId18"/>
+          <a:stretch>
+            <a:fillRect/>
+          </a:stretch>
+        </p:blipFill>
+        <p:spPr>
+          <a:xfrm>
+            <a:off x="115774" y="9925122"/>
+            <a:ext cx="927286" cy="600309"/>
+          </a:xfrm>
+          <a:prstGeom prst="rect">
+            <a:avLst/>
+          </a:prstGeom>
+        </p:spPr>
+      </p:pic>
+      <p:sp>
+        <p:nvSpPr>
+          <p:cNvPr id="41" name="TextBox 40">
+            <a:extLst>
+              <a:ext uri="{FF2B5EF4-FFF2-40B4-BE49-F238E27FC236}">
+                <a16:creationId xmlns:a16="http://schemas.microsoft.com/office/drawing/2014/main" id="{E5D01E17-60FE-405E-8FC1-C403C23EA74D}"/>
+              </a:ext>
+            </a:extLst>
+          </p:cNvPr>
+          <p:cNvSpPr txBox="1"/>
+          <p:nvPr/>
+        </p:nvSpPr>
+        <p:spPr>
+          <a:xfrm>
+            <a:off x="1025682" y="9994442"/>
+            <a:ext cx="944618" cy="461665"/>
+          </a:xfrm>
+          <a:prstGeom prst="rect">
+            <a:avLst/>
+          </a:prstGeom>
+          <a:noFill/>
+        </p:spPr>
+        <p:txBody>
+          <a:bodyPr wrap="none" rtlCol="0">
+            <a:spAutoFit/>
+          </a:bodyPr>
+          <a:lstStyle/>
+          <a:p>
+            <a:r>
+              <a:rPr lang="en-US" sz="2400" b="1" dirty="0"/>
+              <a:t>Infant</a:t>
+            </a:r>
+            <a:endParaRPr lang="en-GB" sz="2400" b="1" dirty="0"/>
+          </a:p>
+        </p:txBody>
+      </p:sp>
+      <p:pic>
+        <p:nvPicPr>
+          <p:cNvPr id="48" name="Picture 47">
+            <a:extLst>
+              <a:ext uri="{FF2B5EF4-FFF2-40B4-BE49-F238E27FC236}">
+                <a16:creationId xmlns:a16="http://schemas.microsoft.com/office/drawing/2014/main" id="{87800AD7-8FBA-429D-A4A3-79974C850BB9}"/>
+              </a:ext>
+            </a:extLst>
+          </p:cNvPr>
+          <p:cNvPicPr>
+            <a:picLocks noChangeAspect="1"/>
+          </p:cNvPicPr>
+          <p:nvPr/>
+        </p:nvPicPr>
+        <p:blipFill>
+          <a:blip r:embed="rId19"/>
+          <a:stretch>
+            <a:fillRect/>
+          </a:stretch>
+        </p:blipFill>
+        <p:spPr>
+          <a:xfrm>
+            <a:off x="343880" y="671388"/>
+            <a:ext cx="471078" cy="474308"/>
+          </a:xfrm>
+          <a:prstGeom prst="rect">
+            <a:avLst/>
+          </a:prstGeom>
+        </p:spPr>
+      </p:pic>
+      <p:sp>
+        <p:nvSpPr>
+          <p:cNvPr id="12" name="Left Brace 11">
+            <a:extLst>
+              <a:ext uri="{FF2B5EF4-FFF2-40B4-BE49-F238E27FC236}">
+                <a16:creationId xmlns:a16="http://schemas.microsoft.com/office/drawing/2014/main" id="{77D93561-8CDB-430E-8A88-3911DEFB7740}"/>
+              </a:ext>
+            </a:extLst>
+          </p:cNvPr>
+          <p:cNvSpPr/>
+          <p:nvPr/>
+        </p:nvSpPr>
+        <p:spPr>
+          <a:xfrm rot="5400000">
+            <a:off x="11086635" y="2440420"/>
+            <a:ext cx="669973" cy="8650992"/>
+          </a:xfrm>
+          <a:prstGeom prst="leftBrace">
+            <a:avLst>
+              <a:gd name="adj1" fmla="val 8333"/>
+              <a:gd name="adj2" fmla="val 58009"/>
+            </a:avLst>
+          </a:prstGeom>
+          <a:ln w="38100">
+            <a:solidFill>
+              <a:schemeClr val="accent4"/>
+            </a:solidFill>
+          </a:ln>
+        </p:spPr>
+        <p:style>
+          <a:lnRef idx="1">
+            <a:schemeClr val="accent1"/>
+          </a:lnRef>
+          <a:fillRef idx="0">
+            <a:schemeClr val="accent1"/>
+          </a:fillRef>
+          <a:effectRef idx="0">
+            <a:schemeClr val="accent1"/>
+          </a:effectRef>
+          <a:fontRef idx="minor">
+            <a:schemeClr val="tx1"/>
+          </a:fontRef>
+        </p:style>
+        <p:txBody>
+          <a:bodyPr rtlCol="0" anchor="ctr"/>
+          <a:lstStyle/>
+          <a:p>
+            <a:pPr algn="ctr"/>
+            <a:endParaRPr lang="en-GB" sz="2025" dirty="0"/>
+          </a:p>
+        </p:txBody>
+      </p:sp>
+      <p:pic>
+        <p:nvPicPr>
+          <p:cNvPr id="19" name="Picture 18">
+            <a:extLst>
+              <a:ext uri="{FF2B5EF4-FFF2-40B4-BE49-F238E27FC236}">
+                <a16:creationId xmlns:a16="http://schemas.microsoft.com/office/drawing/2014/main" id="{45593E8A-47D3-4EAD-9C33-0C4BD7D50503}"/>
+              </a:ext>
+            </a:extLst>
+          </p:cNvPr>
+          <p:cNvPicPr>
+            <a:picLocks noChangeAspect="1"/>
+          </p:cNvPicPr>
+          <p:nvPr/>
+        </p:nvPicPr>
+        <p:blipFill>
+          <a:blip r:embed="rId20"/>
+          <a:stretch>
+            <a:fillRect/>
+          </a:stretch>
+        </p:blipFill>
+        <p:spPr>
+          <a:xfrm>
+            <a:off x="8622678" y="5571477"/>
+            <a:ext cx="2803699" cy="928418"/>
+          </a:xfrm>
+          <a:prstGeom prst="rect">
+            <a:avLst/>
+          </a:prstGeom>
+        </p:spPr>
+      </p:pic>
+      <p:grpSp>
+        <p:nvGrpSpPr>
+          <p:cNvPr id="21" name="Group 20">
+            <a:extLst>
+              <a:ext uri="{FF2B5EF4-FFF2-40B4-BE49-F238E27FC236}">
+                <a16:creationId xmlns:a16="http://schemas.microsoft.com/office/drawing/2014/main" id="{05E14A1D-BD3D-40A7-B20A-AC1206565C36}"/>
+              </a:ext>
+            </a:extLst>
+          </p:cNvPr>
+          <p:cNvGrpSpPr/>
+          <p:nvPr/>
+        </p:nvGrpSpPr>
+        <p:grpSpPr>
+          <a:xfrm>
+            <a:off x="4798866" y="11634120"/>
+            <a:ext cx="4752787" cy="1962932"/>
+            <a:chOff x="2279724" y="10757819"/>
+            <a:chExt cx="4752787" cy="1962932"/>
+          </a:xfrm>
+        </p:grpSpPr>
+        <p:pic>
+          <p:nvPicPr>
+            <p:cNvPr id="32" name="Picture 31" descr="A screenshot of a cell phone&#10;&#10;Description automatically generated">
+              <a:extLst>
+                <a:ext uri="{FF2B5EF4-FFF2-40B4-BE49-F238E27FC236}">
+                  <a16:creationId xmlns:a16="http://schemas.microsoft.com/office/drawing/2014/main" id="{F26DFA87-DB02-40BE-B78D-D52C12BB164C}"/>
+                </a:ext>
+              </a:extLst>
+            </p:cNvPr>
+            <p:cNvPicPr>
+              <a:picLocks noChangeAspect="1"/>
+            </p:cNvPicPr>
+            <p:nvPr/>
+          </p:nvPicPr>
+          <p:blipFill>
+            <a:blip r:embed="rId21">
+              <a:extLst>
+                <a:ext uri="{28A0092B-C50C-407E-A947-70E740481C1C}">
+                  <a14:useLocalDpi xmlns:a14="http://schemas.microsoft.com/office/drawing/2010/main" val="0"/>
+                </a:ext>
+              </a:extLst>
+            </a:blip>
+            <a:stretch>
+              <a:fillRect/>
+            </a:stretch>
+          </p:blipFill>
+          <p:spPr>
+            <a:xfrm>
+              <a:off x="2279724" y="10757819"/>
+              <a:ext cx="4633285" cy="1962932"/>
+            </a:xfrm>
+            <a:prstGeom prst="rect">
+              <a:avLst/>
+            </a:prstGeom>
+          </p:spPr>
+        </p:pic>
+        <p:pic>
+          <p:nvPicPr>
+            <p:cNvPr id="20" name="Picture 19">
+              <a:extLst>
+                <a:ext uri="{FF2B5EF4-FFF2-40B4-BE49-F238E27FC236}">
+                  <a16:creationId xmlns:a16="http://schemas.microsoft.com/office/drawing/2014/main" id="{2BEF8012-D2C9-4B2F-A72A-CF77DA443D81}"/>
+                </a:ext>
+              </a:extLst>
+            </p:cNvPr>
+            <p:cNvPicPr>
+              <a:picLocks noChangeAspect="1"/>
+            </p:cNvPicPr>
+            <p:nvPr/>
+          </p:nvPicPr>
+          <p:blipFill>
+            <a:blip r:embed="rId22"/>
+            <a:stretch>
+              <a:fillRect/>
+            </a:stretch>
+          </p:blipFill>
+          <p:spPr>
+            <a:xfrm>
+              <a:off x="5315311" y="11981816"/>
+              <a:ext cx="1717200" cy="736965"/>
+            </a:xfrm>
+            <a:prstGeom prst="rect">
+              <a:avLst/>
+            </a:prstGeom>
+          </p:spPr>
+        </p:pic>
+      </p:grpSp>
+      <p:cxnSp>
+        <p:nvCxnSpPr>
+          <p:cNvPr id="33" name="Straight Connector 32">
+            <a:extLst>
+              <a:ext uri="{FF2B5EF4-FFF2-40B4-BE49-F238E27FC236}">
+                <a16:creationId xmlns:a16="http://schemas.microsoft.com/office/drawing/2014/main" id="{551D01C0-A5F9-4EF1-AE16-8AEB83CFB30D}"/>
+              </a:ext>
+            </a:extLst>
+          </p:cNvPr>
+          <p:cNvCxnSpPr>
+            <a:cxnSpLocks/>
+          </p:cNvCxnSpPr>
+          <p:nvPr/>
+        </p:nvCxnSpPr>
+        <p:spPr>
+          <a:xfrm>
+            <a:off x="6929992" y="5343092"/>
+            <a:ext cx="0" cy="2746808"/>
+          </a:xfrm>
+          <a:prstGeom prst="line">
+            <a:avLst/>
+          </a:prstGeom>
+          <a:ln w="57150">
+            <a:solidFill>
+              <a:schemeClr val="bg1">
+                <a:lumMod val="50000"/>
+              </a:schemeClr>
+            </a:solidFill>
+            <a:prstDash val="sysDot"/>
+          </a:ln>
+        </p:spPr>
+        <p:style>
+          <a:lnRef idx="1">
+            <a:schemeClr val="accent1"/>
+          </a:lnRef>
+          <a:fillRef idx="0">
+            <a:schemeClr val="accent1"/>
+          </a:fillRef>
+          <a:effectRef idx="0">
+            <a:schemeClr val="accent1"/>
+          </a:effectRef>
+          <a:fontRef idx="minor">
+            <a:schemeClr val="tx1"/>
+          </a:fontRef>
+        </p:style>
+      </p:cxnSp>
+      <p:cxnSp>
+        <p:nvCxnSpPr>
+          <p:cNvPr id="52" name="Straight Connector 51">
+            <a:extLst>
+              <a:ext uri="{FF2B5EF4-FFF2-40B4-BE49-F238E27FC236}">
+                <a16:creationId xmlns:a16="http://schemas.microsoft.com/office/drawing/2014/main" id="{E6E46D17-E649-4B9B-90DE-49E7518214F1}"/>
+              </a:ext>
+            </a:extLst>
+          </p:cNvPr>
+          <p:cNvCxnSpPr>
+            <a:cxnSpLocks/>
+          </p:cNvCxnSpPr>
+          <p:nvPr/>
+        </p:nvCxnSpPr>
+        <p:spPr>
+          <a:xfrm>
+            <a:off x="109831" y="8102600"/>
+            <a:ext cx="6816782" cy="0"/>
+          </a:xfrm>
+          <a:prstGeom prst="line">
+            <a:avLst/>
+          </a:prstGeom>
+          <a:ln w="57150">
+            <a:solidFill>
+              <a:schemeClr val="bg1">
+                <a:lumMod val="50000"/>
+              </a:schemeClr>
+            </a:solidFill>
+            <a:prstDash val="sysDot"/>
+          </a:ln>
+        </p:spPr>
+        <p:style>
+          <a:lnRef idx="1">
+            <a:schemeClr val="accent1"/>
+          </a:lnRef>
+          <a:fillRef idx="0">
+            <a:schemeClr val="accent1"/>
+          </a:fillRef>
+          <a:effectRef idx="0">
+            <a:schemeClr val="accent1"/>
+          </a:effectRef>
+          <a:fontRef idx="minor">
+            <a:schemeClr val="tx1"/>
+          </a:fontRef>
+        </p:style>
+      </p:cxnSp>
+      <p:grpSp>
+        <p:nvGrpSpPr>
+          <p:cNvPr id="43" name="Group 42">
+            <a:extLst>
+              <a:ext uri="{FF2B5EF4-FFF2-40B4-BE49-F238E27FC236}">
+                <a16:creationId xmlns:a16="http://schemas.microsoft.com/office/drawing/2014/main" id="{45F19378-2B4E-41D8-AABE-EFDAEC478FEC}"/>
+              </a:ext>
+            </a:extLst>
+          </p:cNvPr>
+          <p:cNvGrpSpPr/>
+          <p:nvPr/>
+        </p:nvGrpSpPr>
+        <p:grpSpPr>
+          <a:xfrm>
+            <a:off x="6969989" y="4502442"/>
+            <a:ext cx="4478392" cy="692724"/>
+            <a:chOff x="6969989" y="4502442"/>
+            <a:chExt cx="4478392" cy="692724"/>
+          </a:xfrm>
+        </p:grpSpPr>
+        <p:pic>
+          <p:nvPicPr>
+            <p:cNvPr id="9" name="Picture 8">
+              <a:extLst>
+                <a:ext uri="{FF2B5EF4-FFF2-40B4-BE49-F238E27FC236}">
+                  <a16:creationId xmlns:a16="http://schemas.microsoft.com/office/drawing/2014/main" id="{830ECE33-9E5F-4091-9D12-99B9CAA53606}"/>
+                </a:ext>
+              </a:extLst>
+            </p:cNvPr>
+            <p:cNvPicPr>
+              <a:picLocks noChangeAspect="1"/>
+            </p:cNvPicPr>
+            <p:nvPr/>
+          </p:nvPicPr>
+          <p:blipFill>
+            <a:blip r:embed="rId23"/>
+            <a:stretch>
+              <a:fillRect/>
+            </a:stretch>
+          </p:blipFill>
+          <p:spPr>
+            <a:xfrm>
+              <a:off x="6998765" y="4531154"/>
+              <a:ext cx="4449616" cy="641100"/>
+            </a:xfrm>
+            <a:prstGeom prst="rect">
+              <a:avLst/>
+            </a:prstGeom>
+          </p:spPr>
+        </p:pic>
+        <p:pic>
+          <p:nvPicPr>
+            <p:cNvPr id="31" name="Picture 30">
+              <a:extLst>
+                <a:ext uri="{FF2B5EF4-FFF2-40B4-BE49-F238E27FC236}">
+                  <a16:creationId xmlns:a16="http://schemas.microsoft.com/office/drawing/2014/main" id="{2D8F6489-47E7-4786-8B5B-EB5910CD260F}"/>
+                </a:ext>
+              </a:extLst>
+            </p:cNvPr>
+            <p:cNvPicPr>
+              <a:picLocks noChangeAspect="1"/>
+            </p:cNvPicPr>
+            <p:nvPr/>
+          </p:nvPicPr>
+          <p:blipFill>
+            <a:blip r:embed="rId24"/>
+            <a:stretch>
+              <a:fillRect/>
+            </a:stretch>
+          </p:blipFill>
+          <p:spPr>
+            <a:xfrm>
+              <a:off x="6969989" y="4502442"/>
+              <a:ext cx="1503210" cy="692724"/>
+            </a:xfrm>
+            <a:prstGeom prst="rect">
+              <a:avLst/>
+            </a:prstGeom>
+          </p:spPr>
+        </p:pic>
+      </p:grpSp>
+      <p:pic>
+        <p:nvPicPr>
+          <p:cNvPr id="50" name="Picture 49">
+            <a:extLst>
+              <a:ext uri="{FF2B5EF4-FFF2-40B4-BE49-F238E27FC236}">
+                <a16:creationId xmlns:a16="http://schemas.microsoft.com/office/drawing/2014/main" id="{67041243-E3AA-467F-A19F-44790A44FF91}"/>
+              </a:ext>
+            </a:extLst>
+          </p:cNvPr>
+          <p:cNvPicPr>
+            <a:picLocks noChangeAspect="1"/>
+          </p:cNvPicPr>
+          <p:nvPr/>
+        </p:nvPicPr>
+        <p:blipFill>
+          <a:blip r:embed="rId25"/>
+          <a:stretch>
+            <a:fillRect/>
+          </a:stretch>
+        </p:blipFill>
+        <p:spPr>
+          <a:xfrm>
+            <a:off x="5391661" y="7410693"/>
+            <a:ext cx="1276641" cy="579731"/>
+          </a:xfrm>
+          <a:prstGeom prst="rect">
+            <a:avLst/>
+          </a:prstGeom>
+        </p:spPr>
+      </p:pic>
+      <p:pic>
+        <p:nvPicPr>
+          <p:cNvPr id="54" name="Picture 53">
+            <a:extLst>
+              <a:ext uri="{FF2B5EF4-FFF2-40B4-BE49-F238E27FC236}">
+                <a16:creationId xmlns:a16="http://schemas.microsoft.com/office/drawing/2014/main" id="{5917B25F-E8F2-4398-B37D-9DDFA6C746DA}"/>
+              </a:ext>
+            </a:extLst>
+          </p:cNvPr>
+          <p:cNvPicPr>
+            <a:picLocks noChangeAspect="1"/>
+          </p:cNvPicPr>
+          <p:nvPr/>
+        </p:nvPicPr>
+        <p:blipFill>
+          <a:blip r:embed="rId26"/>
+          <a:stretch>
+            <a:fillRect/>
+          </a:stretch>
+        </p:blipFill>
+        <p:spPr>
+          <a:xfrm>
+            <a:off x="5389143" y="6833595"/>
+            <a:ext cx="1250928" cy="559309"/>
+          </a:xfrm>
+          <a:prstGeom prst="rect">
+            <a:avLst/>
+          </a:prstGeom>
+        </p:spPr>
+      </p:pic>
+      <p:sp>
+        <p:nvSpPr>
+          <p:cNvPr id="45" name="Left Brace 44">
+            <a:extLst>
+              <a:ext uri="{FF2B5EF4-FFF2-40B4-BE49-F238E27FC236}">
+                <a16:creationId xmlns:a16="http://schemas.microsoft.com/office/drawing/2014/main" id="{6A780C7D-167C-4B91-9DB2-93F665E492C2}"/>
+              </a:ext>
+            </a:extLst>
+          </p:cNvPr>
+          <p:cNvSpPr/>
+          <p:nvPr/>
+        </p:nvSpPr>
+        <p:spPr>
+          <a:xfrm>
+            <a:off x="5026465" y="4218725"/>
+            <a:ext cx="485870" cy="3789295"/>
+          </a:xfrm>
+          <a:prstGeom prst="leftBrace">
+            <a:avLst>
+              <a:gd name="adj1" fmla="val 8333"/>
+              <a:gd name="adj2" fmla="val 53133"/>
+            </a:avLst>
+          </a:prstGeom>
+          <a:ln w="38100">
+            <a:solidFill>
+              <a:schemeClr val="accent4"/>
+            </a:solidFill>
+          </a:ln>
+        </p:spPr>
+        <p:style>
+          <a:lnRef idx="1">
+            <a:schemeClr val="accent1"/>
+          </a:lnRef>
+          <a:fillRef idx="0">
+            <a:schemeClr val="accent1"/>
+          </a:fillRef>
+          <a:effectRef idx="0">
+            <a:schemeClr val="accent1"/>
+          </a:effectRef>
+          <a:fontRef idx="minor">
+            <a:schemeClr val="tx1"/>
+          </a:fontRef>
+        </p:style>
+        <p:txBody>
+          <a:bodyPr rtlCol="0" anchor="ctr"/>
+          <a:lstStyle/>
+          <a:p>
+            <a:pPr algn="ctr"/>
+            <a:endParaRPr lang="en-GB" sz="2025" dirty="0"/>
+          </a:p>
+        </p:txBody>
+      </p:sp>
+      <p:pic>
+        <p:nvPicPr>
+          <p:cNvPr id="57" name="Picture 56">
+            <a:extLst>
+              <a:ext uri="{FF2B5EF4-FFF2-40B4-BE49-F238E27FC236}">
+                <a16:creationId xmlns:a16="http://schemas.microsoft.com/office/drawing/2014/main" id="{D721CD48-32D5-43A7-B433-41F18EE16BAA}"/>
+              </a:ext>
+            </a:extLst>
+          </p:cNvPr>
+          <p:cNvPicPr>
+            <a:picLocks noChangeAspect="1"/>
+          </p:cNvPicPr>
+          <p:nvPr/>
+        </p:nvPicPr>
+        <p:blipFill>
+          <a:blip r:embed="rId27"/>
+          <a:stretch>
+            <a:fillRect/>
+          </a:stretch>
+        </p:blipFill>
+        <p:spPr>
+          <a:xfrm>
+            <a:off x="3612408" y="4474604"/>
+            <a:ext cx="1507100" cy="1947855"/>
+          </a:xfrm>
+          <a:prstGeom prst="rect">
+            <a:avLst/>
+          </a:prstGeom>
+        </p:spPr>
+      </p:pic>
+      <p:sp>
+        <p:nvSpPr>
+          <p:cNvPr id="55" name="TextBox 54">
+            <a:extLst>
+              <a:ext uri="{FF2B5EF4-FFF2-40B4-BE49-F238E27FC236}">
+                <a16:creationId xmlns:a16="http://schemas.microsoft.com/office/drawing/2014/main" id="{77599DE6-779A-4C83-AF46-B859F76E6394}"/>
+              </a:ext>
+            </a:extLst>
+          </p:cNvPr>
+          <p:cNvSpPr txBox="1"/>
+          <p:nvPr/>
+        </p:nvSpPr>
+        <p:spPr>
+          <a:xfrm>
+            <a:off x="4268745" y="6083548"/>
+            <a:ext cx="800219" cy="307777"/>
+          </a:xfrm>
+          <a:prstGeom prst="rect">
+            <a:avLst/>
+          </a:prstGeom>
+          <a:noFill/>
+        </p:spPr>
+        <p:txBody>
+          <a:bodyPr wrap="none" rtlCol="0">
+            <a:spAutoFit/>
+          </a:bodyPr>
+          <a:lstStyle/>
+          <a:p>
+            <a:r>
+              <a:rPr lang="en-GB" sz="1400" dirty="0"/>
+              <a:t>@{Case}</a:t>
+            </a:r>
+          </a:p>
+        </p:txBody>
+      </p:sp>
+      <p:sp>
+        <p:nvSpPr>
+          <p:cNvPr id="51" name="Left Brace 50">
+            <a:extLst>
+              <a:ext uri="{FF2B5EF4-FFF2-40B4-BE49-F238E27FC236}">
+                <a16:creationId xmlns:a16="http://schemas.microsoft.com/office/drawing/2014/main" id="{20BB1BE2-0BEE-4190-9F30-70ED65678B14}"/>
+              </a:ext>
+            </a:extLst>
+          </p:cNvPr>
+          <p:cNvSpPr/>
+          <p:nvPr/>
+        </p:nvSpPr>
+        <p:spPr>
+          <a:xfrm rot="5400000">
+            <a:off x="2369988" y="1954608"/>
+            <a:ext cx="508102" cy="4981772"/>
+          </a:xfrm>
+          <a:prstGeom prst="leftBrace">
+            <a:avLst>
+              <a:gd name="adj1" fmla="val 8333"/>
+              <a:gd name="adj2" fmla="val 15207"/>
+            </a:avLst>
+          </a:prstGeom>
+          <a:ln w="38100">
+            <a:solidFill>
+              <a:schemeClr val="accent4"/>
+            </a:solidFill>
+          </a:ln>
+        </p:spPr>
+        <p:style>
+          <a:lnRef idx="1">
+            <a:schemeClr val="accent1"/>
+          </a:lnRef>
+          <a:fillRef idx="0">
+            <a:schemeClr val="accent1"/>
+          </a:fillRef>
+          <a:effectRef idx="0">
+            <a:schemeClr val="accent1"/>
+          </a:effectRef>
+          <a:fontRef idx="minor">
+            <a:schemeClr val="tx1"/>
+          </a:fontRef>
+        </p:style>
+        <p:txBody>
+          <a:bodyPr rtlCol="0" anchor="ctr"/>
+          <a:lstStyle/>
+          <a:p>
+            <a:pPr algn="ctr"/>
+            <a:endParaRPr lang="en-GB" sz="2025" dirty="0"/>
+          </a:p>
+        </p:txBody>
+      </p:sp>
+      <p:sp>
+        <p:nvSpPr>
+          <p:cNvPr id="77" name="Left Brace 76">
+            <a:extLst>
+              <a:ext uri="{FF2B5EF4-FFF2-40B4-BE49-F238E27FC236}">
+                <a16:creationId xmlns:a16="http://schemas.microsoft.com/office/drawing/2014/main" id="{611FAC59-4A3F-467B-8E6F-34EFBE66EDDA}"/>
+              </a:ext>
+            </a:extLst>
+          </p:cNvPr>
+          <p:cNvSpPr/>
+          <p:nvPr/>
+        </p:nvSpPr>
+        <p:spPr>
+          <a:xfrm>
+            <a:off x="12681829" y="10151768"/>
+            <a:ext cx="485870" cy="3443314"/>
+          </a:xfrm>
+          <a:prstGeom prst="leftBrace">
+            <a:avLst>
+              <a:gd name="adj1" fmla="val 8333"/>
+              <a:gd name="adj2" fmla="val 51628"/>
+            </a:avLst>
+          </a:prstGeom>
+          <a:ln w="38100">
+            <a:solidFill>
+              <a:schemeClr val="accent4"/>
+            </a:solidFill>
+          </a:ln>
+        </p:spPr>
+        <p:style>
+          <a:lnRef idx="1">
+            <a:schemeClr val="accent1"/>
+          </a:lnRef>
+          <a:fillRef idx="0">
+            <a:schemeClr val="accent1"/>
+          </a:fillRef>
+          <a:effectRef idx="0">
+            <a:schemeClr val="accent1"/>
+          </a:effectRef>
+          <a:fontRef idx="minor">
+            <a:schemeClr val="tx1"/>
+          </a:fontRef>
+        </p:style>
+        <p:txBody>
+          <a:bodyPr rtlCol="0" anchor="ctr"/>
+          <a:lstStyle/>
+          <a:p>
+            <a:pPr algn="ctr"/>
+            <a:endParaRPr lang="en-GB" sz="2025" dirty="0"/>
+          </a:p>
+        </p:txBody>
+      </p:sp>
+      <p:pic>
+        <p:nvPicPr>
+          <p:cNvPr id="79" name="Picture 78">
+            <a:extLst>
+              <a:ext uri="{FF2B5EF4-FFF2-40B4-BE49-F238E27FC236}">
+                <a16:creationId xmlns:a16="http://schemas.microsoft.com/office/drawing/2014/main" id="{9599B374-72EC-4DB4-8B2D-5068CAAC141C}"/>
+              </a:ext>
+            </a:extLst>
+          </p:cNvPr>
+          <p:cNvPicPr>
+            <a:picLocks noChangeAspect="1"/>
+          </p:cNvPicPr>
+          <p:nvPr/>
+        </p:nvPicPr>
+        <p:blipFill>
+          <a:blip r:embed="rId28"/>
+          <a:stretch>
+            <a:fillRect/>
+          </a:stretch>
+        </p:blipFill>
+        <p:spPr>
+          <a:xfrm>
+            <a:off x="5383564" y="4296649"/>
+            <a:ext cx="1293815" cy="587530"/>
+          </a:xfrm>
+          <a:prstGeom prst="rect">
+            <a:avLst/>
+          </a:prstGeom>
+        </p:spPr>
+      </p:pic>
+      <p:pic>
+        <p:nvPicPr>
+          <p:cNvPr id="83" name="Picture 82">
+            <a:extLst>
+              <a:ext uri="{FF2B5EF4-FFF2-40B4-BE49-F238E27FC236}">
+                <a16:creationId xmlns:a16="http://schemas.microsoft.com/office/drawing/2014/main" id="{3725C369-4778-4849-8C1C-7ABBBA95D4F2}"/>
+              </a:ext>
+            </a:extLst>
+          </p:cNvPr>
+          <p:cNvPicPr>
+            <a:picLocks noChangeAspect="1"/>
+          </p:cNvPicPr>
+          <p:nvPr/>
+        </p:nvPicPr>
+        <p:blipFill>
+          <a:blip r:embed="rId25"/>
+          <a:stretch>
+            <a:fillRect/>
+          </a:stretch>
+        </p:blipFill>
+        <p:spPr>
+          <a:xfrm>
+            <a:off x="13054795" y="12963773"/>
+            <a:ext cx="1276641" cy="579731"/>
+          </a:xfrm>
+          <a:prstGeom prst="rect">
+            <a:avLst/>
+          </a:prstGeom>
+        </p:spPr>
+      </p:pic>
+      <p:pic>
+        <p:nvPicPr>
+          <p:cNvPr id="85" name="Picture 84">
+            <a:extLst>
+              <a:ext uri="{FF2B5EF4-FFF2-40B4-BE49-F238E27FC236}">
+                <a16:creationId xmlns:a16="http://schemas.microsoft.com/office/drawing/2014/main" id="{06BFAB01-972F-4DF5-8F4D-CCDD668042F6}"/>
+              </a:ext>
+            </a:extLst>
+          </p:cNvPr>
+          <p:cNvPicPr>
+            <a:picLocks noChangeAspect="1"/>
+          </p:cNvPicPr>
+          <p:nvPr/>
+        </p:nvPicPr>
+        <p:blipFill>
+          <a:blip r:embed="rId26"/>
+          <a:stretch>
+            <a:fillRect/>
+          </a:stretch>
+        </p:blipFill>
+        <p:spPr>
+          <a:xfrm>
+            <a:off x="13017952" y="10876536"/>
+            <a:ext cx="1250928" cy="559309"/>
+          </a:xfrm>
+          <a:prstGeom prst="rect">
+            <a:avLst/>
+          </a:prstGeom>
+        </p:spPr>
+      </p:pic>
+      <p:pic>
+        <p:nvPicPr>
+          <p:cNvPr id="87" name="Picture 86">
+            <a:extLst>
+              <a:ext uri="{FF2B5EF4-FFF2-40B4-BE49-F238E27FC236}">
+                <a16:creationId xmlns:a16="http://schemas.microsoft.com/office/drawing/2014/main" id="{B3526AD5-1686-43B8-8AB8-C26D164205A3}"/>
+              </a:ext>
+            </a:extLst>
+          </p:cNvPr>
+          <p:cNvPicPr>
+            <a:picLocks noChangeAspect="1"/>
+          </p:cNvPicPr>
+          <p:nvPr/>
+        </p:nvPicPr>
+        <p:blipFill>
+          <a:blip r:embed="rId28"/>
+          <a:stretch>
+            <a:fillRect/>
+          </a:stretch>
+        </p:blipFill>
+        <p:spPr>
+          <a:xfrm>
+            <a:off x="13017952" y="10232456"/>
+            <a:ext cx="1293815" cy="587530"/>
+          </a:xfrm>
+          <a:prstGeom prst="rect">
+            <a:avLst/>
+          </a:prstGeom>
+        </p:spPr>
+      </p:pic>
+      <p:sp>
+        <p:nvSpPr>
+          <p:cNvPr id="89" name="TextBox 88">
+            <a:extLst>
+              <a:ext uri="{FF2B5EF4-FFF2-40B4-BE49-F238E27FC236}">
+                <a16:creationId xmlns:a16="http://schemas.microsoft.com/office/drawing/2014/main" id="{0D5B15BF-D171-4762-8B87-B6E717E9EE74}"/>
+              </a:ext>
+            </a:extLst>
+          </p:cNvPr>
+          <p:cNvSpPr txBox="1"/>
+          <p:nvPr/>
+        </p:nvSpPr>
+        <p:spPr>
+          <a:xfrm>
+            <a:off x="11782822" y="11764897"/>
+            <a:ext cx="800219" cy="307777"/>
+          </a:xfrm>
+          <a:prstGeom prst="rect">
+            <a:avLst/>
+          </a:prstGeom>
+          <a:noFill/>
+        </p:spPr>
+        <p:txBody>
+          <a:bodyPr wrap="none" rtlCol="0">
+            <a:spAutoFit/>
+          </a:bodyPr>
+          <a:lstStyle/>
+          <a:p>
+            <a:r>
+              <a:rPr lang="en-GB" sz="1400" dirty="0"/>
+              <a:t>@{Case}</a:t>
+            </a:r>
+          </a:p>
+        </p:txBody>
+      </p:sp>
+      <p:sp>
+        <p:nvSpPr>
+          <p:cNvPr id="91" name="TextBox 90">
+            <a:extLst>
+              <a:ext uri="{FF2B5EF4-FFF2-40B4-BE49-F238E27FC236}">
+                <a16:creationId xmlns:a16="http://schemas.microsoft.com/office/drawing/2014/main" id="{E9965364-AE61-41AD-AE4E-CE1C64F25218}"/>
+              </a:ext>
+            </a:extLst>
+          </p:cNvPr>
+          <p:cNvSpPr txBox="1"/>
+          <p:nvPr/>
+        </p:nvSpPr>
+        <p:spPr>
+          <a:xfrm>
+            <a:off x="14844203" y="8488271"/>
+            <a:ext cx="781048" cy="307777"/>
+          </a:xfrm>
+          <a:prstGeom prst="rect">
+            <a:avLst/>
+          </a:prstGeom>
+          <a:noFill/>
+        </p:spPr>
+        <p:txBody>
+          <a:bodyPr wrap="none" rtlCol="0">
+            <a:spAutoFit/>
+          </a:bodyPr>
+          <a:lstStyle>
+            <a:defPPr>
+              <a:defRPr lang="en-US"/>
+            </a:defPPr>
+            <a:lvl1pPr>
+              <a:defRPr sz="1400"/>
+            </a:lvl1pPr>
+          </a:lstStyle>
+          <a:p>
+            <a:r>
+              <a:rPr lang="en-GB" dirty="0"/>
+              <a:t>@{True}</a:t>
+            </a:r>
+          </a:p>
+        </p:txBody>
+      </p:sp>
+    </p:spTree>
+    <p:extLst>
+      <p:ext uri="{BB962C8B-B14F-4D97-AF65-F5344CB8AC3E}">
+        <p14:creationId xmlns:p14="http://schemas.microsoft.com/office/powerpoint/2010/main" val="6099002"/>
+      </p:ext>
+    </p:extLst>
+  </p:cSld>
+  <p:clrMapOvr>
+    <a:masterClrMapping/>
+  </p:clrMapOvr>
+</p:sld>
+</file>
+
+<file path=ppt/slides/slide12.xml><?xml version="1.0" encoding="utf-8"?>
 <p:sld xmlns:a="http://schemas.openxmlformats.org/drawingml/2006/main" xmlns:r="http://schemas.openxmlformats.org/officeDocument/2006/relationships" xmlns:p="http://schemas.openxmlformats.org/presentationml/2006/main">
   <p:cSld>
     <p:spTree>

</xml_diff>

<commit_message>
Pre release documentation updates.
</commit_message>
<xml_diff>
--- a/Images/All ADF Activities.pptx
+++ b/Images/All ADF Activities.pptx
@@ -16,7 +16,8 @@
     <p:sldId id="266" r:id="rId10"/>
     <p:sldId id="267" r:id="rId11"/>
     <p:sldId id="268" r:id="rId12"/>
-    <p:sldId id="260" r:id="rId13"/>
+    <p:sldId id="269" r:id="rId13"/>
+    <p:sldId id="260" r:id="rId14"/>
   </p:sldIdLst>
   <p:sldSz cx="16200438" cy="14400213"/>
   <p:notesSz cx="6858000" cy="9144000"/>
@@ -254,7 +255,7 @@
           <a:p>
             <a:fld id="{1F80DB50-5271-4B1A-976D-0A7715B55622}" type="datetimeFigureOut">
               <a:rPr lang="en-GB" smtClean="0"/>
-              <a:t>17/08/2020</a:t>
+              <a:t>03/09/2020</a:t>
             </a:fld>
             <a:endParaRPr lang="en-GB"/>
           </a:p>
@@ -424,7 +425,7 @@
           <a:p>
             <a:fld id="{1F80DB50-5271-4B1A-976D-0A7715B55622}" type="datetimeFigureOut">
               <a:rPr lang="en-GB" smtClean="0"/>
-              <a:t>17/08/2020</a:t>
+              <a:t>03/09/2020</a:t>
             </a:fld>
             <a:endParaRPr lang="en-GB"/>
           </a:p>
@@ -604,7 +605,7 @@
           <a:p>
             <a:fld id="{1F80DB50-5271-4B1A-976D-0A7715B55622}" type="datetimeFigureOut">
               <a:rPr lang="en-GB" smtClean="0"/>
-              <a:t>17/08/2020</a:t>
+              <a:t>03/09/2020</a:t>
             </a:fld>
             <a:endParaRPr lang="en-GB"/>
           </a:p>
@@ -774,7 +775,7 @@
           <a:p>
             <a:fld id="{1F80DB50-5271-4B1A-976D-0A7715B55622}" type="datetimeFigureOut">
               <a:rPr lang="en-GB" smtClean="0"/>
-              <a:t>17/08/2020</a:t>
+              <a:t>03/09/2020</a:t>
             </a:fld>
             <a:endParaRPr lang="en-GB"/>
           </a:p>
@@ -1018,7 +1019,7 @@
           <a:p>
             <a:fld id="{1F80DB50-5271-4B1A-976D-0A7715B55622}" type="datetimeFigureOut">
               <a:rPr lang="en-GB" smtClean="0"/>
-              <a:t>17/08/2020</a:t>
+              <a:t>03/09/2020</a:t>
             </a:fld>
             <a:endParaRPr lang="en-GB"/>
           </a:p>
@@ -1250,7 +1251,7 @@
           <a:p>
             <a:fld id="{1F80DB50-5271-4B1A-976D-0A7715B55622}" type="datetimeFigureOut">
               <a:rPr lang="en-GB" smtClean="0"/>
-              <a:t>17/08/2020</a:t>
+              <a:t>03/09/2020</a:t>
             </a:fld>
             <a:endParaRPr lang="en-GB"/>
           </a:p>
@@ -1617,7 +1618,7 @@
           <a:p>
             <a:fld id="{1F80DB50-5271-4B1A-976D-0A7715B55622}" type="datetimeFigureOut">
               <a:rPr lang="en-GB" smtClean="0"/>
-              <a:t>17/08/2020</a:t>
+              <a:t>03/09/2020</a:t>
             </a:fld>
             <a:endParaRPr lang="en-GB"/>
           </a:p>
@@ -1735,7 +1736,7 @@
           <a:p>
             <a:fld id="{1F80DB50-5271-4B1A-976D-0A7715B55622}" type="datetimeFigureOut">
               <a:rPr lang="en-GB" smtClean="0"/>
-              <a:t>17/08/2020</a:t>
+              <a:t>03/09/2020</a:t>
             </a:fld>
             <a:endParaRPr lang="en-GB"/>
           </a:p>
@@ -1830,7 +1831,7 @@
           <a:p>
             <a:fld id="{1F80DB50-5271-4B1A-976D-0A7715B55622}" type="datetimeFigureOut">
               <a:rPr lang="en-GB" smtClean="0"/>
-              <a:t>17/08/2020</a:t>
+              <a:t>03/09/2020</a:t>
             </a:fld>
             <a:endParaRPr lang="en-GB"/>
           </a:p>
@@ -2107,7 +2108,7 @@
           <a:p>
             <a:fld id="{1F80DB50-5271-4B1A-976D-0A7715B55622}" type="datetimeFigureOut">
               <a:rPr lang="en-GB" smtClean="0"/>
-              <a:t>17/08/2020</a:t>
+              <a:t>03/09/2020</a:t>
             </a:fld>
             <a:endParaRPr lang="en-GB"/>
           </a:p>
@@ -2364,7 +2365,7 @@
           <a:p>
             <a:fld id="{1F80DB50-5271-4B1A-976D-0A7715B55622}" type="datetimeFigureOut">
               <a:rPr lang="en-GB" smtClean="0"/>
-              <a:t>17/08/2020</a:t>
+              <a:t>03/09/2020</a:t>
             </a:fld>
             <a:endParaRPr lang="en-GB"/>
           </a:p>
@@ -2577,7 +2578,7 @@
           <a:p>
             <a:fld id="{1F80DB50-5271-4B1A-976D-0A7715B55622}" type="datetimeFigureOut">
               <a:rPr lang="en-GB" smtClean="0"/>
-              <a:t>17/08/2020</a:t>
+              <a:t>03/09/2020</a:t>
             </a:fld>
             <a:endParaRPr lang="en-GB"/>
           </a:p>
@@ -8016,6 +8017,2025 @@
 </file>
 
 <file path=ppt/slides/slide12.xml><?xml version="1.0" encoding="utf-8"?>
+<p:sld xmlns:a="http://schemas.openxmlformats.org/drawingml/2006/main" xmlns:r="http://schemas.openxmlformats.org/officeDocument/2006/relationships" xmlns:p="http://schemas.openxmlformats.org/presentationml/2006/main">
+  <p:cSld>
+    <p:spTree>
+      <p:nvGrpSpPr>
+        <p:cNvPr id="1" name=""/>
+        <p:cNvGrpSpPr/>
+        <p:nvPr/>
+      </p:nvGrpSpPr>
+      <p:grpSpPr>
+        <a:xfrm>
+          <a:off x="0" y="0"/>
+          <a:ext cx="0" cy="0"/>
+          <a:chOff x="0" y="0"/>
+          <a:chExt cx="0" cy="0"/>
+        </a:xfrm>
+      </p:grpSpPr>
+      <p:pic>
+        <p:nvPicPr>
+          <p:cNvPr id="34" name="Picture 33">
+            <a:extLst>
+              <a:ext uri="{FF2B5EF4-FFF2-40B4-BE49-F238E27FC236}">
+                <a16:creationId xmlns:a16="http://schemas.microsoft.com/office/drawing/2014/main" id="{DC6E078F-F4E9-45A8-9592-0849B5A771D6}"/>
+              </a:ext>
+            </a:extLst>
+          </p:cNvPr>
+          <p:cNvPicPr>
+            <a:picLocks noChangeAspect="1"/>
+          </p:cNvPicPr>
+          <p:nvPr/>
+        </p:nvPicPr>
+        <p:blipFill>
+          <a:blip r:embed="rId2"/>
+          <a:stretch>
+            <a:fillRect/>
+          </a:stretch>
+        </p:blipFill>
+        <p:spPr>
+          <a:xfrm>
+            <a:off x="12930077" y="9003052"/>
+            <a:ext cx="3213343" cy="639856"/>
+          </a:xfrm>
+          <a:prstGeom prst="rect">
+            <a:avLst/>
+          </a:prstGeom>
+        </p:spPr>
+      </p:pic>
+      <p:pic>
+        <p:nvPicPr>
+          <p:cNvPr id="39" name="Picture 38">
+            <a:extLst>
+              <a:ext uri="{FF2B5EF4-FFF2-40B4-BE49-F238E27FC236}">
+                <a16:creationId xmlns:a16="http://schemas.microsoft.com/office/drawing/2014/main" id="{5E8338BF-3C0E-4D21-82FF-37CD415C1135}"/>
+              </a:ext>
+            </a:extLst>
+          </p:cNvPr>
+          <p:cNvPicPr>
+            <a:picLocks noChangeAspect="1"/>
+          </p:cNvPicPr>
+          <p:nvPr/>
+        </p:nvPicPr>
+        <p:blipFill>
+          <a:blip r:embed="rId3"/>
+          <a:stretch>
+            <a:fillRect/>
+          </a:stretch>
+        </p:blipFill>
+        <p:spPr>
+          <a:xfrm>
+            <a:off x="8731960" y="13205788"/>
+            <a:ext cx="1363978" cy="675432"/>
+          </a:xfrm>
+          <a:prstGeom prst="rect">
+            <a:avLst/>
+          </a:prstGeom>
+        </p:spPr>
+      </p:pic>
+      <p:sp>
+        <p:nvSpPr>
+          <p:cNvPr id="38" name="Left Brace 37">
+            <a:extLst>
+              <a:ext uri="{FF2B5EF4-FFF2-40B4-BE49-F238E27FC236}">
+                <a16:creationId xmlns:a16="http://schemas.microsoft.com/office/drawing/2014/main" id="{113523E7-4C37-484A-AEB2-5827C7EEAAD4}"/>
+              </a:ext>
+            </a:extLst>
+          </p:cNvPr>
+          <p:cNvSpPr/>
+          <p:nvPr/>
+        </p:nvSpPr>
+        <p:spPr>
+          <a:xfrm rot="5400000">
+            <a:off x="8602141" y="11963351"/>
+            <a:ext cx="669973" cy="2339616"/>
+          </a:xfrm>
+          <a:prstGeom prst="leftBrace">
+            <a:avLst>
+              <a:gd name="adj1" fmla="val 8333"/>
+              <a:gd name="adj2" fmla="val 33218"/>
+            </a:avLst>
+          </a:prstGeom>
+          <a:ln w="38100">
+            <a:solidFill>
+              <a:schemeClr val="accent4"/>
+            </a:solidFill>
+          </a:ln>
+        </p:spPr>
+        <p:style>
+          <a:lnRef idx="1">
+            <a:schemeClr val="accent1"/>
+          </a:lnRef>
+          <a:fillRef idx="0">
+            <a:schemeClr val="accent1"/>
+          </a:fillRef>
+          <a:effectRef idx="0">
+            <a:schemeClr val="accent1"/>
+          </a:effectRef>
+          <a:fontRef idx="minor">
+            <a:schemeClr val="tx1"/>
+          </a:fontRef>
+        </p:style>
+        <p:txBody>
+          <a:bodyPr rtlCol="0" anchor="ctr"/>
+          <a:lstStyle/>
+          <a:p>
+            <a:pPr algn="ctr"/>
+            <a:endParaRPr lang="en-GB" sz="2025" dirty="0"/>
+          </a:p>
+        </p:txBody>
+      </p:sp>
+      <p:pic>
+        <p:nvPicPr>
+          <p:cNvPr id="42" name="Picture 41">
+            <a:extLst>
+              <a:ext uri="{FF2B5EF4-FFF2-40B4-BE49-F238E27FC236}">
+                <a16:creationId xmlns:a16="http://schemas.microsoft.com/office/drawing/2014/main" id="{A15B9308-AB32-4618-82C7-97D66FA144A6}"/>
+              </a:ext>
+            </a:extLst>
+          </p:cNvPr>
+          <p:cNvPicPr>
+            <a:picLocks noChangeAspect="1"/>
+          </p:cNvPicPr>
+          <p:nvPr/>
+        </p:nvPicPr>
+        <p:blipFill>
+          <a:blip r:embed="rId4"/>
+          <a:stretch>
+            <a:fillRect/>
+          </a:stretch>
+        </p:blipFill>
+        <p:spPr>
+          <a:xfrm>
+            <a:off x="3354937" y="11427489"/>
+            <a:ext cx="6716098" cy="1529337"/>
+          </a:xfrm>
+          <a:prstGeom prst="rect">
+            <a:avLst/>
+          </a:prstGeom>
+        </p:spPr>
+      </p:pic>
+      <p:sp>
+        <p:nvSpPr>
+          <p:cNvPr id="36" name="Left Brace 35">
+            <a:extLst>
+              <a:ext uri="{FF2B5EF4-FFF2-40B4-BE49-F238E27FC236}">
+                <a16:creationId xmlns:a16="http://schemas.microsoft.com/office/drawing/2014/main" id="{A031CF25-C2FD-4ED8-9178-17403CC0C15B}"/>
+              </a:ext>
+            </a:extLst>
+          </p:cNvPr>
+          <p:cNvSpPr/>
+          <p:nvPr/>
+        </p:nvSpPr>
+        <p:spPr>
+          <a:xfrm rot="5400000">
+            <a:off x="6399468" y="7975682"/>
+            <a:ext cx="669973" cy="6759036"/>
+          </a:xfrm>
+          <a:prstGeom prst="leftBrace">
+            <a:avLst>
+              <a:gd name="adj1" fmla="val 8333"/>
+              <a:gd name="adj2" fmla="val 18399"/>
+            </a:avLst>
+          </a:prstGeom>
+          <a:ln w="38100">
+            <a:solidFill>
+              <a:schemeClr val="accent4"/>
+            </a:solidFill>
+          </a:ln>
+        </p:spPr>
+        <p:style>
+          <a:lnRef idx="1">
+            <a:schemeClr val="accent1"/>
+          </a:lnRef>
+          <a:fillRef idx="0">
+            <a:schemeClr val="accent1"/>
+          </a:fillRef>
+          <a:effectRef idx="0">
+            <a:schemeClr val="accent1"/>
+          </a:effectRef>
+          <a:fontRef idx="minor">
+            <a:schemeClr val="tx1"/>
+          </a:fontRef>
+        </p:style>
+        <p:txBody>
+          <a:bodyPr rtlCol="0" anchor="ctr"/>
+          <a:lstStyle/>
+          <a:p>
+            <a:pPr algn="ctr"/>
+            <a:endParaRPr lang="en-GB" sz="2025" dirty="0"/>
+          </a:p>
+        </p:txBody>
+      </p:sp>
+      <p:pic>
+        <p:nvPicPr>
+          <p:cNvPr id="57" name="Picture 56">
+            <a:extLst>
+              <a:ext uri="{FF2B5EF4-FFF2-40B4-BE49-F238E27FC236}">
+                <a16:creationId xmlns:a16="http://schemas.microsoft.com/office/drawing/2014/main" id="{D721CD48-32D5-43A7-B433-41F18EE16BAA}"/>
+              </a:ext>
+            </a:extLst>
+          </p:cNvPr>
+          <p:cNvPicPr>
+            <a:picLocks noChangeAspect="1"/>
+          </p:cNvPicPr>
+          <p:nvPr/>
+        </p:nvPicPr>
+        <p:blipFill>
+          <a:blip r:embed="rId5"/>
+          <a:stretch>
+            <a:fillRect/>
+          </a:stretch>
+        </p:blipFill>
+        <p:spPr>
+          <a:xfrm>
+            <a:off x="3612408" y="4474604"/>
+            <a:ext cx="1507100" cy="1947855"/>
+          </a:xfrm>
+          <a:prstGeom prst="rect">
+            <a:avLst/>
+          </a:prstGeom>
+        </p:spPr>
+      </p:pic>
+      <p:sp>
+        <p:nvSpPr>
+          <p:cNvPr id="51" name="Left Brace 50">
+            <a:extLst>
+              <a:ext uri="{FF2B5EF4-FFF2-40B4-BE49-F238E27FC236}">
+                <a16:creationId xmlns:a16="http://schemas.microsoft.com/office/drawing/2014/main" id="{20BB1BE2-0BEE-4190-9F30-70ED65678B14}"/>
+              </a:ext>
+            </a:extLst>
+          </p:cNvPr>
+          <p:cNvSpPr/>
+          <p:nvPr/>
+        </p:nvSpPr>
+        <p:spPr>
+          <a:xfrm rot="5400000">
+            <a:off x="2369988" y="1954608"/>
+            <a:ext cx="508102" cy="4981772"/>
+          </a:xfrm>
+          <a:prstGeom prst="leftBrace">
+            <a:avLst>
+              <a:gd name="adj1" fmla="val 8333"/>
+              <a:gd name="adj2" fmla="val 15207"/>
+            </a:avLst>
+          </a:prstGeom>
+          <a:ln w="38100">
+            <a:solidFill>
+              <a:schemeClr val="accent4"/>
+            </a:solidFill>
+          </a:ln>
+        </p:spPr>
+        <p:style>
+          <a:lnRef idx="1">
+            <a:schemeClr val="accent1"/>
+          </a:lnRef>
+          <a:fillRef idx="0">
+            <a:schemeClr val="accent1"/>
+          </a:fillRef>
+          <a:effectRef idx="0">
+            <a:schemeClr val="accent1"/>
+          </a:effectRef>
+          <a:fontRef idx="minor">
+            <a:schemeClr val="tx1"/>
+          </a:fontRef>
+        </p:style>
+        <p:txBody>
+          <a:bodyPr rtlCol="0" anchor="ctr"/>
+          <a:lstStyle/>
+          <a:p>
+            <a:pPr algn="ctr"/>
+            <a:endParaRPr lang="en-GB" sz="2025" dirty="0"/>
+          </a:p>
+        </p:txBody>
+      </p:sp>
+      <p:pic>
+        <p:nvPicPr>
+          <p:cNvPr id="22" name="Picture 21">
+            <a:extLst>
+              <a:ext uri="{FF2B5EF4-FFF2-40B4-BE49-F238E27FC236}">
+                <a16:creationId xmlns:a16="http://schemas.microsoft.com/office/drawing/2014/main" id="{0FF7A91A-9CEC-41C9-86AC-FDC92A4C36AA}"/>
+              </a:ext>
+            </a:extLst>
+          </p:cNvPr>
+          <p:cNvPicPr>
+            <a:picLocks noChangeAspect="1"/>
+          </p:cNvPicPr>
+          <p:nvPr/>
+        </p:nvPicPr>
+        <p:blipFill rotWithShape="1">
+          <a:blip r:embed="rId6"/>
+          <a:srcRect b="2983"/>
+          <a:stretch/>
+        </p:blipFill>
+        <p:spPr>
+          <a:xfrm>
+            <a:off x="419430" y="1849710"/>
+            <a:ext cx="13101117" cy="2481894"/>
+          </a:xfrm>
+          <a:prstGeom prst="rect">
+            <a:avLst/>
+          </a:prstGeom>
+        </p:spPr>
+      </p:pic>
+      <p:sp>
+        <p:nvSpPr>
+          <p:cNvPr id="30" name="Left Brace 29">
+            <a:extLst>
+              <a:ext uri="{FF2B5EF4-FFF2-40B4-BE49-F238E27FC236}">
+                <a16:creationId xmlns:a16="http://schemas.microsoft.com/office/drawing/2014/main" id="{3E44B7B7-CD1E-4EE2-B996-8B77D6AE9EF4}"/>
+              </a:ext>
+            </a:extLst>
+          </p:cNvPr>
+          <p:cNvSpPr/>
+          <p:nvPr/>
+        </p:nvSpPr>
+        <p:spPr>
+          <a:xfrm rot="5400000">
+            <a:off x="10646493" y="5065392"/>
+            <a:ext cx="669973" cy="9770958"/>
+          </a:xfrm>
+          <a:prstGeom prst="leftBrace">
+            <a:avLst>
+              <a:gd name="adj1" fmla="val 8333"/>
+              <a:gd name="adj2" fmla="val 43625"/>
+            </a:avLst>
+          </a:prstGeom>
+          <a:ln w="38100">
+            <a:solidFill>
+              <a:schemeClr val="accent4"/>
+            </a:solidFill>
+          </a:ln>
+        </p:spPr>
+        <p:style>
+          <a:lnRef idx="1">
+            <a:schemeClr val="accent1"/>
+          </a:lnRef>
+          <a:fillRef idx="0">
+            <a:schemeClr val="accent1"/>
+          </a:fillRef>
+          <a:effectRef idx="0">
+            <a:schemeClr val="accent1"/>
+          </a:effectRef>
+          <a:fontRef idx="minor">
+            <a:schemeClr val="tx1"/>
+          </a:fontRef>
+        </p:style>
+        <p:txBody>
+          <a:bodyPr rtlCol="0" anchor="ctr"/>
+          <a:lstStyle/>
+          <a:p>
+            <a:pPr algn="ctr"/>
+            <a:endParaRPr lang="en-GB" sz="2025" dirty="0"/>
+          </a:p>
+        </p:txBody>
+      </p:sp>
+      <p:sp>
+        <p:nvSpPr>
+          <p:cNvPr id="49" name="Left Brace 48">
+            <a:extLst>
+              <a:ext uri="{FF2B5EF4-FFF2-40B4-BE49-F238E27FC236}">
+                <a16:creationId xmlns:a16="http://schemas.microsoft.com/office/drawing/2014/main" id="{B33C836E-9730-4830-AB37-468222FE110C}"/>
+              </a:ext>
+            </a:extLst>
+          </p:cNvPr>
+          <p:cNvSpPr/>
+          <p:nvPr/>
+        </p:nvSpPr>
+        <p:spPr>
+          <a:xfrm rot="5400000">
+            <a:off x="14166789" y="7247588"/>
+            <a:ext cx="669973" cy="3315068"/>
+          </a:xfrm>
+          <a:prstGeom prst="leftBrace">
+            <a:avLst>
+              <a:gd name="adj1" fmla="val 8333"/>
+              <a:gd name="adj2" fmla="val 26447"/>
+            </a:avLst>
+          </a:prstGeom>
+          <a:ln w="38100">
+            <a:solidFill>
+              <a:schemeClr val="accent4"/>
+            </a:solidFill>
+          </a:ln>
+        </p:spPr>
+        <p:style>
+          <a:lnRef idx="1">
+            <a:schemeClr val="accent1"/>
+          </a:lnRef>
+          <a:fillRef idx="0">
+            <a:schemeClr val="accent1"/>
+          </a:fillRef>
+          <a:effectRef idx="0">
+            <a:schemeClr val="accent1"/>
+          </a:effectRef>
+          <a:fontRef idx="minor">
+            <a:schemeClr val="tx1"/>
+          </a:fontRef>
+        </p:style>
+        <p:txBody>
+          <a:bodyPr rtlCol="0" anchor="ctr"/>
+          <a:lstStyle/>
+          <a:p>
+            <a:pPr algn="ctr"/>
+            <a:endParaRPr lang="en-GB" sz="2025" dirty="0"/>
+          </a:p>
+        </p:txBody>
+      </p:sp>
+      <p:pic>
+        <p:nvPicPr>
+          <p:cNvPr id="69" name="Picture 68">
+            <a:extLst>
+              <a:ext uri="{FF2B5EF4-FFF2-40B4-BE49-F238E27FC236}">
+                <a16:creationId xmlns:a16="http://schemas.microsoft.com/office/drawing/2014/main" id="{5545F5FD-0A29-4733-8303-08F072A9065F}"/>
+              </a:ext>
+            </a:extLst>
+          </p:cNvPr>
+          <p:cNvPicPr>
+            <a:picLocks noChangeAspect="1"/>
+          </p:cNvPicPr>
+          <p:nvPr/>
+        </p:nvPicPr>
+        <p:blipFill>
+          <a:blip r:embed="rId7"/>
+          <a:stretch>
+            <a:fillRect/>
+          </a:stretch>
+        </p:blipFill>
+        <p:spPr>
+          <a:xfrm>
+            <a:off x="7152277" y="6801268"/>
+            <a:ext cx="8912807" cy="2867003"/>
+          </a:xfrm>
+          <a:prstGeom prst="rect">
+            <a:avLst/>
+          </a:prstGeom>
+        </p:spPr>
+      </p:pic>
+      <p:pic>
+        <p:nvPicPr>
+          <p:cNvPr id="68" name="Picture 67">
+            <a:extLst>
+              <a:ext uri="{FF2B5EF4-FFF2-40B4-BE49-F238E27FC236}">
+                <a16:creationId xmlns:a16="http://schemas.microsoft.com/office/drawing/2014/main" id="{42CFFB3A-F8E1-49EA-8D69-A578AEF91F79}"/>
+              </a:ext>
+            </a:extLst>
+          </p:cNvPr>
+          <p:cNvPicPr>
+            <a:picLocks noChangeAspect="1"/>
+          </p:cNvPicPr>
+          <p:nvPr/>
+        </p:nvPicPr>
+        <p:blipFill>
+          <a:blip r:embed="rId8"/>
+          <a:stretch>
+            <a:fillRect/>
+          </a:stretch>
+        </p:blipFill>
+        <p:spPr>
+          <a:xfrm>
+            <a:off x="146132" y="4491589"/>
+            <a:ext cx="4886071" cy="2610081"/>
+          </a:xfrm>
+          <a:prstGeom prst="rect">
+            <a:avLst/>
+          </a:prstGeom>
+        </p:spPr>
+      </p:pic>
+      <p:sp>
+        <p:nvSpPr>
+          <p:cNvPr id="15" name="Left Brace 14">
+            <a:extLst>
+              <a:ext uri="{FF2B5EF4-FFF2-40B4-BE49-F238E27FC236}">
+                <a16:creationId xmlns:a16="http://schemas.microsoft.com/office/drawing/2014/main" id="{E4F55F19-6D3D-40FC-9579-C24CDFA3E5B6}"/>
+              </a:ext>
+            </a:extLst>
+          </p:cNvPr>
+          <p:cNvSpPr/>
+          <p:nvPr/>
+        </p:nvSpPr>
+        <p:spPr>
+          <a:xfrm rot="5400000">
+            <a:off x="8949423" y="2174648"/>
+            <a:ext cx="508102" cy="4546963"/>
+          </a:xfrm>
+          <a:prstGeom prst="leftBrace">
+            <a:avLst>
+              <a:gd name="adj1" fmla="val 8333"/>
+              <a:gd name="adj2" fmla="val 15575"/>
+            </a:avLst>
+          </a:prstGeom>
+          <a:ln w="38100">
+            <a:solidFill>
+              <a:schemeClr val="accent4"/>
+            </a:solidFill>
+          </a:ln>
+        </p:spPr>
+        <p:style>
+          <a:lnRef idx="1">
+            <a:schemeClr val="accent1"/>
+          </a:lnRef>
+          <a:fillRef idx="0">
+            <a:schemeClr val="accent1"/>
+          </a:fillRef>
+          <a:effectRef idx="0">
+            <a:schemeClr val="accent1"/>
+          </a:effectRef>
+          <a:fontRef idx="minor">
+            <a:schemeClr val="tx1"/>
+          </a:fontRef>
+        </p:style>
+        <p:txBody>
+          <a:bodyPr rtlCol="0" anchor="ctr"/>
+          <a:lstStyle/>
+          <a:p>
+            <a:pPr algn="ctr"/>
+            <a:endParaRPr lang="en-GB" sz="2025" dirty="0"/>
+          </a:p>
+        </p:txBody>
+      </p:sp>
+      <p:pic>
+        <p:nvPicPr>
+          <p:cNvPr id="64" name="Picture 63">
+            <a:extLst>
+              <a:ext uri="{FF2B5EF4-FFF2-40B4-BE49-F238E27FC236}">
+                <a16:creationId xmlns:a16="http://schemas.microsoft.com/office/drawing/2014/main" id="{4E715E5D-C7F9-4B23-B2BA-76F64D4CE02B}"/>
+              </a:ext>
+            </a:extLst>
+          </p:cNvPr>
+          <p:cNvPicPr>
+            <a:picLocks noChangeAspect="1"/>
+          </p:cNvPicPr>
+          <p:nvPr/>
+        </p:nvPicPr>
+        <p:blipFill>
+          <a:blip r:embed="rId9"/>
+          <a:stretch>
+            <a:fillRect/>
+          </a:stretch>
+        </p:blipFill>
+        <p:spPr>
+          <a:xfrm>
+            <a:off x="5403087" y="4941575"/>
+            <a:ext cx="1258608" cy="559381"/>
+          </a:xfrm>
+          <a:prstGeom prst="rect">
+            <a:avLst/>
+          </a:prstGeom>
+        </p:spPr>
+      </p:pic>
+      <p:pic>
+        <p:nvPicPr>
+          <p:cNvPr id="66" name="Picture 65">
+            <a:extLst>
+              <a:ext uri="{FF2B5EF4-FFF2-40B4-BE49-F238E27FC236}">
+                <a16:creationId xmlns:a16="http://schemas.microsoft.com/office/drawing/2014/main" id="{7035FBB7-7C33-436E-80F4-4F1006D6D7E1}"/>
+              </a:ext>
+            </a:extLst>
+          </p:cNvPr>
+          <p:cNvPicPr>
+            <a:picLocks noChangeAspect="1"/>
+          </p:cNvPicPr>
+          <p:nvPr/>
+        </p:nvPicPr>
+        <p:blipFill>
+          <a:blip r:embed="rId10"/>
+          <a:stretch>
+            <a:fillRect/>
+          </a:stretch>
+        </p:blipFill>
+        <p:spPr>
+          <a:xfrm>
+            <a:off x="5403087" y="5566807"/>
+            <a:ext cx="1295931" cy="573200"/>
+          </a:xfrm>
+          <a:prstGeom prst="rect">
+            <a:avLst/>
+          </a:prstGeom>
+        </p:spPr>
+      </p:pic>
+      <p:pic>
+        <p:nvPicPr>
+          <p:cNvPr id="70" name="Picture 69">
+            <a:extLst>
+              <a:ext uri="{FF2B5EF4-FFF2-40B4-BE49-F238E27FC236}">
+                <a16:creationId xmlns:a16="http://schemas.microsoft.com/office/drawing/2014/main" id="{D0DF74CB-1C45-4936-9E98-FED28E2528F6}"/>
+              </a:ext>
+            </a:extLst>
+          </p:cNvPr>
+          <p:cNvPicPr>
+            <a:picLocks noChangeAspect="1"/>
+          </p:cNvPicPr>
+          <p:nvPr/>
+        </p:nvPicPr>
+        <p:blipFill>
+          <a:blip r:embed="rId11"/>
+          <a:stretch>
+            <a:fillRect/>
+          </a:stretch>
+        </p:blipFill>
+        <p:spPr>
+          <a:xfrm>
+            <a:off x="5396481" y="6204138"/>
+            <a:ext cx="1271821" cy="562536"/>
+          </a:xfrm>
+          <a:prstGeom prst="rect">
+            <a:avLst/>
+          </a:prstGeom>
+        </p:spPr>
+      </p:pic>
+      <p:cxnSp>
+        <p:nvCxnSpPr>
+          <p:cNvPr id="18" name="Straight Connector 17">
+            <a:extLst>
+              <a:ext uri="{FF2B5EF4-FFF2-40B4-BE49-F238E27FC236}">
+                <a16:creationId xmlns:a16="http://schemas.microsoft.com/office/drawing/2014/main" id="{38FE55ED-9890-448D-B9B6-36A3574E90DB}"/>
+              </a:ext>
+            </a:extLst>
+          </p:cNvPr>
+          <p:cNvCxnSpPr>
+            <a:cxnSpLocks/>
+          </p:cNvCxnSpPr>
+          <p:nvPr/>
+        </p:nvCxnSpPr>
+        <p:spPr>
+          <a:xfrm>
+            <a:off x="6929992" y="5343092"/>
+            <a:ext cx="9270446" cy="0"/>
+          </a:xfrm>
+          <a:prstGeom prst="line">
+            <a:avLst/>
+          </a:prstGeom>
+          <a:ln w="57150">
+            <a:solidFill>
+              <a:schemeClr val="bg1">
+                <a:lumMod val="50000"/>
+              </a:schemeClr>
+            </a:solidFill>
+            <a:prstDash val="sysDot"/>
+          </a:ln>
+        </p:spPr>
+        <p:style>
+          <a:lnRef idx="1">
+            <a:schemeClr val="accent1"/>
+          </a:lnRef>
+          <a:fillRef idx="0">
+            <a:schemeClr val="accent1"/>
+          </a:fillRef>
+          <a:effectRef idx="0">
+            <a:schemeClr val="accent1"/>
+          </a:effectRef>
+          <a:fontRef idx="minor">
+            <a:schemeClr val="tx1"/>
+          </a:fontRef>
+        </p:style>
+      </p:cxnSp>
+      <p:sp>
+        <p:nvSpPr>
+          <p:cNvPr id="10" name="Left Brace 9">
+            <a:extLst>
+              <a:ext uri="{FF2B5EF4-FFF2-40B4-BE49-F238E27FC236}">
+                <a16:creationId xmlns:a16="http://schemas.microsoft.com/office/drawing/2014/main" id="{D9BAFF37-C112-4618-A993-30FC9730AEDC}"/>
+              </a:ext>
+            </a:extLst>
+          </p:cNvPr>
+          <p:cNvSpPr/>
+          <p:nvPr/>
+        </p:nvSpPr>
+        <p:spPr>
+          <a:xfrm rot="5400000">
+            <a:off x="9650567" y="4030968"/>
+            <a:ext cx="669973" cy="2944717"/>
+          </a:xfrm>
+          <a:prstGeom prst="leftBrace">
+            <a:avLst>
+              <a:gd name="adj1" fmla="val 8333"/>
+              <a:gd name="adj2" fmla="val 23994"/>
+            </a:avLst>
+          </a:prstGeom>
+          <a:ln w="38100">
+            <a:solidFill>
+              <a:schemeClr val="accent4"/>
+            </a:solidFill>
+          </a:ln>
+        </p:spPr>
+        <p:style>
+          <a:lnRef idx="1">
+            <a:schemeClr val="accent1"/>
+          </a:lnRef>
+          <a:fillRef idx="0">
+            <a:schemeClr val="accent1"/>
+          </a:fillRef>
+          <a:effectRef idx="0">
+            <a:schemeClr val="accent1"/>
+          </a:effectRef>
+          <a:fontRef idx="minor">
+            <a:schemeClr val="tx1"/>
+          </a:fontRef>
+        </p:style>
+        <p:txBody>
+          <a:bodyPr rtlCol="0" anchor="ctr"/>
+          <a:lstStyle/>
+          <a:p>
+            <a:pPr algn="ctr"/>
+            <a:endParaRPr lang="en-GB" sz="2025" dirty="0"/>
+          </a:p>
+        </p:txBody>
+      </p:sp>
+      <p:pic>
+        <p:nvPicPr>
+          <p:cNvPr id="17" name="Picture 16">
+            <a:extLst>
+              <a:ext uri="{FF2B5EF4-FFF2-40B4-BE49-F238E27FC236}">
+                <a16:creationId xmlns:a16="http://schemas.microsoft.com/office/drawing/2014/main" id="{2A510AD6-A12F-4614-8D5F-EAA53E47B411}"/>
+              </a:ext>
+            </a:extLst>
+          </p:cNvPr>
+          <p:cNvPicPr>
+            <a:picLocks noChangeAspect="1"/>
+          </p:cNvPicPr>
+          <p:nvPr/>
+        </p:nvPicPr>
+        <p:blipFill>
+          <a:blip r:embed="rId12"/>
+          <a:stretch>
+            <a:fillRect/>
+          </a:stretch>
+        </p:blipFill>
+        <p:spPr>
+          <a:xfrm>
+            <a:off x="13023642" y="11523642"/>
+            <a:ext cx="2754851" cy="1371384"/>
+          </a:xfrm>
+          <a:prstGeom prst="rect">
+            <a:avLst/>
+          </a:prstGeom>
+        </p:spPr>
+      </p:pic>
+      <p:cxnSp>
+        <p:nvCxnSpPr>
+          <p:cNvPr id="8" name="Straight Connector 7">
+            <a:extLst>
+              <a:ext uri="{FF2B5EF4-FFF2-40B4-BE49-F238E27FC236}">
+                <a16:creationId xmlns:a16="http://schemas.microsoft.com/office/drawing/2014/main" id="{B3C21FE1-62D5-40B2-8293-E02C7F95F45F}"/>
+              </a:ext>
+            </a:extLst>
+          </p:cNvPr>
+          <p:cNvCxnSpPr>
+            <a:cxnSpLocks/>
+          </p:cNvCxnSpPr>
+          <p:nvPr/>
+        </p:nvCxnSpPr>
+        <p:spPr>
+          <a:xfrm>
+            <a:off x="133159" y="1603092"/>
+            <a:ext cx="16067279" cy="0"/>
+          </a:xfrm>
+          <a:prstGeom prst="line">
+            <a:avLst/>
+          </a:prstGeom>
+          <a:ln w="57150">
+            <a:solidFill>
+              <a:schemeClr val="bg1">
+                <a:lumMod val="50000"/>
+              </a:schemeClr>
+            </a:solidFill>
+            <a:prstDash val="sysDot"/>
+          </a:ln>
+        </p:spPr>
+        <p:style>
+          <a:lnRef idx="1">
+            <a:schemeClr val="accent1"/>
+          </a:lnRef>
+          <a:fillRef idx="0">
+            <a:schemeClr val="accent1"/>
+          </a:fillRef>
+          <a:effectRef idx="0">
+            <a:schemeClr val="accent1"/>
+          </a:effectRef>
+          <a:fontRef idx="minor">
+            <a:schemeClr val="tx1"/>
+          </a:fontRef>
+        </p:style>
+      </p:cxnSp>
+      <p:sp>
+        <p:nvSpPr>
+          <p:cNvPr id="14" name="Left Brace 13">
+            <a:extLst>
+              <a:ext uri="{FF2B5EF4-FFF2-40B4-BE49-F238E27FC236}">
+                <a16:creationId xmlns:a16="http://schemas.microsoft.com/office/drawing/2014/main" id="{21CB80A6-2177-4740-A5FA-B2FC1E8D547F}"/>
+              </a:ext>
+            </a:extLst>
+          </p:cNvPr>
+          <p:cNvSpPr/>
+          <p:nvPr/>
+        </p:nvSpPr>
+        <p:spPr>
+          <a:xfrm rot="5400000">
+            <a:off x="6658439" y="-3299029"/>
+            <a:ext cx="669973" cy="10046251"/>
+          </a:xfrm>
+          <a:prstGeom prst="leftBrace">
+            <a:avLst>
+              <a:gd name="adj1" fmla="val 8333"/>
+              <a:gd name="adj2" fmla="val 64024"/>
+            </a:avLst>
+          </a:prstGeom>
+          <a:ln w="38100">
+            <a:solidFill>
+              <a:schemeClr val="accent4"/>
+            </a:solidFill>
+          </a:ln>
+        </p:spPr>
+        <p:style>
+          <a:lnRef idx="1">
+            <a:schemeClr val="accent1"/>
+          </a:lnRef>
+          <a:fillRef idx="0">
+            <a:schemeClr val="accent1"/>
+          </a:fillRef>
+          <a:effectRef idx="0">
+            <a:schemeClr val="accent1"/>
+          </a:effectRef>
+          <a:fontRef idx="minor">
+            <a:schemeClr val="tx1"/>
+          </a:fontRef>
+        </p:style>
+        <p:txBody>
+          <a:bodyPr rtlCol="0" anchor="ctr"/>
+          <a:lstStyle/>
+          <a:p>
+            <a:pPr algn="ctr"/>
+            <a:endParaRPr lang="en-GB" sz="2025" dirty="0"/>
+          </a:p>
+        </p:txBody>
+      </p:sp>
+      <p:pic>
+        <p:nvPicPr>
+          <p:cNvPr id="2" name="Picture 1">
+            <a:extLst>
+              <a:ext uri="{FF2B5EF4-FFF2-40B4-BE49-F238E27FC236}">
+                <a16:creationId xmlns:a16="http://schemas.microsoft.com/office/drawing/2014/main" id="{36CE73C9-BA77-4ECA-AA16-858684EEB8DD}"/>
+              </a:ext>
+            </a:extLst>
+          </p:cNvPr>
+          <p:cNvPicPr>
+            <a:picLocks noChangeAspect="1"/>
+          </p:cNvPicPr>
+          <p:nvPr/>
+        </p:nvPicPr>
+        <p:blipFill>
+          <a:blip r:embed="rId13"/>
+          <a:stretch>
+            <a:fillRect/>
+          </a:stretch>
+        </p:blipFill>
+        <p:spPr>
+          <a:xfrm>
+            <a:off x="133153" y="88354"/>
+            <a:ext cx="892528" cy="579404"/>
+          </a:xfrm>
+          <a:prstGeom prst="rect">
+            <a:avLst/>
+          </a:prstGeom>
+        </p:spPr>
+      </p:pic>
+      <p:pic>
+        <p:nvPicPr>
+          <p:cNvPr id="3" name="Picture 2">
+            <a:extLst>
+              <a:ext uri="{FF2B5EF4-FFF2-40B4-BE49-F238E27FC236}">
+                <a16:creationId xmlns:a16="http://schemas.microsoft.com/office/drawing/2014/main" id="{BAC2FA6D-7E44-4A70-ABBF-441AC58C61D8}"/>
+              </a:ext>
+            </a:extLst>
+          </p:cNvPr>
+          <p:cNvPicPr>
+            <a:picLocks noChangeAspect="1"/>
+          </p:cNvPicPr>
+          <p:nvPr/>
+        </p:nvPicPr>
+        <p:blipFill>
+          <a:blip r:embed="rId14"/>
+          <a:stretch>
+            <a:fillRect/>
+          </a:stretch>
+        </p:blipFill>
+        <p:spPr>
+          <a:xfrm>
+            <a:off x="133153" y="1727119"/>
+            <a:ext cx="892528" cy="586800"/>
+          </a:xfrm>
+          <a:prstGeom prst="rect">
+            <a:avLst/>
+          </a:prstGeom>
+        </p:spPr>
+      </p:pic>
+      <p:pic>
+        <p:nvPicPr>
+          <p:cNvPr id="4" name="Picture 3">
+            <a:extLst>
+              <a:ext uri="{FF2B5EF4-FFF2-40B4-BE49-F238E27FC236}">
+                <a16:creationId xmlns:a16="http://schemas.microsoft.com/office/drawing/2014/main" id="{FB95A457-1250-418F-8752-3AD3D6CA1CBF}"/>
+              </a:ext>
+            </a:extLst>
+          </p:cNvPr>
+          <p:cNvPicPr>
+            <a:picLocks noChangeAspect="1"/>
+          </p:cNvPicPr>
+          <p:nvPr/>
+        </p:nvPicPr>
+        <p:blipFill>
+          <a:blip r:embed="rId15"/>
+          <a:stretch>
+            <a:fillRect/>
+          </a:stretch>
+        </p:blipFill>
+        <p:spPr>
+          <a:xfrm>
+            <a:off x="109831" y="8197177"/>
+            <a:ext cx="892528" cy="586800"/>
+          </a:xfrm>
+          <a:prstGeom prst="rect">
+            <a:avLst/>
+          </a:prstGeom>
+        </p:spPr>
+      </p:pic>
+      <p:sp>
+        <p:nvSpPr>
+          <p:cNvPr id="23" name="TextBox 22">
+            <a:extLst>
+              <a:ext uri="{FF2B5EF4-FFF2-40B4-BE49-F238E27FC236}">
+                <a16:creationId xmlns:a16="http://schemas.microsoft.com/office/drawing/2014/main" id="{06F8B482-C37F-4E4C-9FB0-942BA9C3D5D1}"/>
+              </a:ext>
+            </a:extLst>
+          </p:cNvPr>
+          <p:cNvSpPr txBox="1"/>
+          <p:nvPr/>
+        </p:nvSpPr>
+        <p:spPr>
+          <a:xfrm>
+            <a:off x="1025682" y="153427"/>
+            <a:ext cx="1813060" cy="727571"/>
+          </a:xfrm>
+          <a:prstGeom prst="rect">
+            <a:avLst/>
+          </a:prstGeom>
+          <a:noFill/>
+        </p:spPr>
+        <p:txBody>
+          <a:bodyPr wrap="none" rtlCol="0">
+            <a:spAutoFit/>
+          </a:bodyPr>
+          <a:lstStyle/>
+          <a:p>
+            <a:r>
+              <a:rPr lang="en-US" sz="2400" b="1" dirty="0"/>
+              <a:t>Grandparent</a:t>
+            </a:r>
+          </a:p>
+          <a:p>
+            <a:r>
+              <a:rPr lang="en-US" sz="1728" b="1" dirty="0">
+                <a:solidFill>
+                  <a:schemeClr val="bg1">
+                    <a:lumMod val="75000"/>
+                  </a:schemeClr>
+                </a:solidFill>
+              </a:rPr>
+              <a:t>(optional)</a:t>
+            </a:r>
+            <a:endParaRPr lang="en-GB" sz="1728" b="1" dirty="0">
+              <a:solidFill>
+                <a:schemeClr val="bg1">
+                  <a:lumMod val="75000"/>
+                </a:schemeClr>
+              </a:solidFill>
+            </a:endParaRPr>
+          </a:p>
+        </p:txBody>
+      </p:sp>
+      <p:sp>
+        <p:nvSpPr>
+          <p:cNvPr id="24" name="TextBox 23">
+            <a:extLst>
+              <a:ext uri="{FF2B5EF4-FFF2-40B4-BE49-F238E27FC236}">
+                <a16:creationId xmlns:a16="http://schemas.microsoft.com/office/drawing/2014/main" id="{2B1D7642-1297-4FF4-AC1C-9E90A1648238}"/>
+              </a:ext>
+            </a:extLst>
+          </p:cNvPr>
+          <p:cNvSpPr txBox="1"/>
+          <p:nvPr/>
+        </p:nvSpPr>
+        <p:spPr>
+          <a:xfrm>
+            <a:off x="1002359" y="1789696"/>
+            <a:ext cx="1025089" cy="461665"/>
+          </a:xfrm>
+          <a:prstGeom prst="rect">
+            <a:avLst/>
+          </a:prstGeom>
+          <a:noFill/>
+        </p:spPr>
+        <p:txBody>
+          <a:bodyPr wrap="none" rtlCol="0">
+            <a:spAutoFit/>
+          </a:bodyPr>
+          <a:lstStyle/>
+          <a:p>
+            <a:r>
+              <a:rPr lang="en-US" sz="2400" b="1" dirty="0"/>
+              <a:t>Parent</a:t>
+            </a:r>
+            <a:endParaRPr lang="en-GB" sz="2400" b="1" dirty="0"/>
+          </a:p>
+        </p:txBody>
+      </p:sp>
+      <p:sp>
+        <p:nvSpPr>
+          <p:cNvPr id="25" name="TextBox 24">
+            <a:extLst>
+              <a:ext uri="{FF2B5EF4-FFF2-40B4-BE49-F238E27FC236}">
+                <a16:creationId xmlns:a16="http://schemas.microsoft.com/office/drawing/2014/main" id="{6B7827E1-5A9B-4381-BD48-FF1E8075FB93}"/>
+              </a:ext>
+            </a:extLst>
+          </p:cNvPr>
+          <p:cNvSpPr txBox="1"/>
+          <p:nvPr/>
+        </p:nvSpPr>
+        <p:spPr>
+          <a:xfrm>
+            <a:off x="1043060" y="8259823"/>
+            <a:ext cx="829073" cy="461665"/>
+          </a:xfrm>
+          <a:prstGeom prst="rect">
+            <a:avLst/>
+          </a:prstGeom>
+          <a:noFill/>
+        </p:spPr>
+        <p:txBody>
+          <a:bodyPr wrap="none" rtlCol="0">
+            <a:spAutoFit/>
+          </a:bodyPr>
+          <a:lstStyle/>
+          <a:p>
+            <a:r>
+              <a:rPr lang="en-US" sz="2400" b="1" dirty="0"/>
+              <a:t>Child</a:t>
+            </a:r>
+            <a:endParaRPr lang="en-GB" sz="2400" b="1" dirty="0"/>
+          </a:p>
+        </p:txBody>
+      </p:sp>
+      <p:sp>
+        <p:nvSpPr>
+          <p:cNvPr id="6" name="TextBox 5">
+            <a:extLst>
+              <a:ext uri="{FF2B5EF4-FFF2-40B4-BE49-F238E27FC236}">
+                <a16:creationId xmlns:a16="http://schemas.microsoft.com/office/drawing/2014/main" id="{17F8A168-3F01-42AA-ACD1-52226D338250}"/>
+              </a:ext>
+            </a:extLst>
+          </p:cNvPr>
+          <p:cNvSpPr txBox="1"/>
+          <p:nvPr/>
+        </p:nvSpPr>
+        <p:spPr>
+          <a:xfrm>
+            <a:off x="15370019" y="-5272"/>
+            <a:ext cx="840295" cy="403957"/>
+          </a:xfrm>
+          <a:prstGeom prst="rect">
+            <a:avLst/>
+          </a:prstGeom>
+          <a:noFill/>
+        </p:spPr>
+        <p:txBody>
+          <a:bodyPr wrap="none" rtlCol="0">
+            <a:spAutoFit/>
+          </a:bodyPr>
+          <a:lstStyle/>
+          <a:p>
+            <a:r>
+              <a:rPr lang="en-GB" sz="2025" b="1" dirty="0"/>
+              <a:t>v1.8.6</a:t>
+            </a:r>
+          </a:p>
+        </p:txBody>
+      </p:sp>
+      <p:pic>
+        <p:nvPicPr>
+          <p:cNvPr id="5" name="Picture 4" descr="A screenshot of a cell phone&#10;&#10;Description automatically generated">
+            <a:extLst>
+              <a:ext uri="{FF2B5EF4-FFF2-40B4-BE49-F238E27FC236}">
+                <a16:creationId xmlns:a16="http://schemas.microsoft.com/office/drawing/2014/main" id="{9D5DA8E3-64DB-4086-90D5-4957AE971C73}"/>
+              </a:ext>
+            </a:extLst>
+          </p:cNvPr>
+          <p:cNvPicPr>
+            <a:picLocks noChangeAspect="1"/>
+          </p:cNvPicPr>
+          <p:nvPr/>
+        </p:nvPicPr>
+        <p:blipFill>
+          <a:blip r:embed="rId16">
+            <a:extLst>
+              <a:ext uri="{28A0092B-C50C-407E-A947-70E740481C1C}">
+                <a14:useLocalDpi xmlns:a14="http://schemas.microsoft.com/office/drawing/2010/main" val="0"/>
+              </a:ext>
+            </a:extLst>
+          </a:blip>
+          <a:stretch>
+            <a:fillRect/>
+          </a:stretch>
+        </p:blipFill>
+        <p:spPr>
+          <a:xfrm>
+            <a:off x="3065290" y="32072"/>
+            <a:ext cx="6699512" cy="1527060"/>
+          </a:xfrm>
+          <a:prstGeom prst="rect">
+            <a:avLst/>
+          </a:prstGeom>
+        </p:spPr>
+      </p:pic>
+      <p:cxnSp>
+        <p:nvCxnSpPr>
+          <p:cNvPr id="28" name="Straight Connector 27">
+            <a:extLst>
+              <a:ext uri="{FF2B5EF4-FFF2-40B4-BE49-F238E27FC236}">
+                <a16:creationId xmlns:a16="http://schemas.microsoft.com/office/drawing/2014/main" id="{ECB87505-EE27-4221-BABC-E83F318564FE}"/>
+              </a:ext>
+            </a:extLst>
+          </p:cNvPr>
+          <p:cNvCxnSpPr>
+            <a:cxnSpLocks/>
+          </p:cNvCxnSpPr>
+          <p:nvPr/>
+        </p:nvCxnSpPr>
+        <p:spPr>
+          <a:xfrm>
+            <a:off x="133158" y="9802040"/>
+            <a:ext cx="16067280" cy="0"/>
+          </a:xfrm>
+          <a:prstGeom prst="line">
+            <a:avLst/>
+          </a:prstGeom>
+          <a:ln w="57150">
+            <a:solidFill>
+              <a:schemeClr val="bg1">
+                <a:lumMod val="50000"/>
+              </a:schemeClr>
+            </a:solidFill>
+            <a:prstDash val="sysDot"/>
+          </a:ln>
+        </p:spPr>
+        <p:style>
+          <a:lnRef idx="1">
+            <a:schemeClr val="accent1"/>
+          </a:lnRef>
+          <a:fillRef idx="0">
+            <a:schemeClr val="accent1"/>
+          </a:fillRef>
+          <a:effectRef idx="0">
+            <a:schemeClr val="accent1"/>
+          </a:effectRef>
+          <a:fontRef idx="minor">
+            <a:schemeClr val="tx1"/>
+          </a:fontRef>
+        </p:style>
+      </p:cxnSp>
+      <p:sp>
+        <p:nvSpPr>
+          <p:cNvPr id="37" name="TextBox 36">
+            <a:extLst>
+              <a:ext uri="{FF2B5EF4-FFF2-40B4-BE49-F238E27FC236}">
+                <a16:creationId xmlns:a16="http://schemas.microsoft.com/office/drawing/2014/main" id="{6F1134F0-B278-42E9-8045-C82105634470}"/>
+              </a:ext>
+            </a:extLst>
+          </p:cNvPr>
+          <p:cNvSpPr txBox="1"/>
+          <p:nvPr/>
+        </p:nvSpPr>
+        <p:spPr>
+          <a:xfrm>
+            <a:off x="7852442" y="13410443"/>
+            <a:ext cx="822661" cy="307777"/>
+          </a:xfrm>
+          <a:prstGeom prst="rect">
+            <a:avLst/>
+          </a:prstGeom>
+          <a:noFill/>
+        </p:spPr>
+        <p:txBody>
+          <a:bodyPr wrap="none" rtlCol="0">
+            <a:spAutoFit/>
+          </a:bodyPr>
+          <a:lstStyle>
+            <a:defPPr>
+              <a:defRPr lang="en-US"/>
+            </a:defPPr>
+            <a:lvl1pPr>
+              <a:defRPr sz="1400"/>
+            </a:lvl1pPr>
+          </a:lstStyle>
+          <a:p>
+            <a:r>
+              <a:rPr lang="en-GB" dirty="0"/>
+              <a:t>@{False}</a:t>
+            </a:r>
+          </a:p>
+        </p:txBody>
+      </p:sp>
+      <p:pic>
+        <p:nvPicPr>
+          <p:cNvPr id="40" name="Picture 39">
+            <a:extLst>
+              <a:ext uri="{FF2B5EF4-FFF2-40B4-BE49-F238E27FC236}">
+                <a16:creationId xmlns:a16="http://schemas.microsoft.com/office/drawing/2014/main" id="{4DAF1527-CD65-4AB9-828A-1ED6FE0D86D7}"/>
+              </a:ext>
+            </a:extLst>
+          </p:cNvPr>
+          <p:cNvPicPr>
+            <a:picLocks noChangeAspect="1"/>
+          </p:cNvPicPr>
+          <p:nvPr/>
+        </p:nvPicPr>
+        <p:blipFill>
+          <a:blip r:embed="rId17"/>
+          <a:stretch>
+            <a:fillRect/>
+          </a:stretch>
+        </p:blipFill>
+        <p:spPr>
+          <a:xfrm>
+            <a:off x="115774" y="9925122"/>
+            <a:ext cx="927286" cy="600309"/>
+          </a:xfrm>
+          <a:prstGeom prst="rect">
+            <a:avLst/>
+          </a:prstGeom>
+        </p:spPr>
+      </p:pic>
+      <p:sp>
+        <p:nvSpPr>
+          <p:cNvPr id="41" name="TextBox 40">
+            <a:extLst>
+              <a:ext uri="{FF2B5EF4-FFF2-40B4-BE49-F238E27FC236}">
+                <a16:creationId xmlns:a16="http://schemas.microsoft.com/office/drawing/2014/main" id="{E5D01E17-60FE-405E-8FC1-C403C23EA74D}"/>
+              </a:ext>
+            </a:extLst>
+          </p:cNvPr>
+          <p:cNvSpPr txBox="1"/>
+          <p:nvPr/>
+        </p:nvSpPr>
+        <p:spPr>
+          <a:xfrm>
+            <a:off x="1025682" y="9994442"/>
+            <a:ext cx="944618" cy="461665"/>
+          </a:xfrm>
+          <a:prstGeom prst="rect">
+            <a:avLst/>
+          </a:prstGeom>
+          <a:noFill/>
+        </p:spPr>
+        <p:txBody>
+          <a:bodyPr wrap="none" rtlCol="0">
+            <a:spAutoFit/>
+          </a:bodyPr>
+          <a:lstStyle/>
+          <a:p>
+            <a:r>
+              <a:rPr lang="en-US" sz="2400" b="1" dirty="0"/>
+              <a:t>Infant</a:t>
+            </a:r>
+            <a:endParaRPr lang="en-GB" sz="2400" b="1" dirty="0"/>
+          </a:p>
+        </p:txBody>
+      </p:sp>
+      <p:pic>
+        <p:nvPicPr>
+          <p:cNvPr id="48" name="Picture 47">
+            <a:extLst>
+              <a:ext uri="{FF2B5EF4-FFF2-40B4-BE49-F238E27FC236}">
+                <a16:creationId xmlns:a16="http://schemas.microsoft.com/office/drawing/2014/main" id="{87800AD7-8FBA-429D-A4A3-79974C850BB9}"/>
+              </a:ext>
+            </a:extLst>
+          </p:cNvPr>
+          <p:cNvPicPr>
+            <a:picLocks noChangeAspect="1"/>
+          </p:cNvPicPr>
+          <p:nvPr/>
+        </p:nvPicPr>
+        <p:blipFill>
+          <a:blip r:embed="rId18"/>
+          <a:stretch>
+            <a:fillRect/>
+          </a:stretch>
+        </p:blipFill>
+        <p:spPr>
+          <a:xfrm>
+            <a:off x="343880" y="671388"/>
+            <a:ext cx="471078" cy="474308"/>
+          </a:xfrm>
+          <a:prstGeom prst="rect">
+            <a:avLst/>
+          </a:prstGeom>
+        </p:spPr>
+      </p:pic>
+      <p:sp>
+        <p:nvSpPr>
+          <p:cNvPr id="12" name="Left Brace 11">
+            <a:extLst>
+              <a:ext uri="{FF2B5EF4-FFF2-40B4-BE49-F238E27FC236}">
+                <a16:creationId xmlns:a16="http://schemas.microsoft.com/office/drawing/2014/main" id="{77D93561-8CDB-430E-8A88-3911DEFB7740}"/>
+              </a:ext>
+            </a:extLst>
+          </p:cNvPr>
+          <p:cNvSpPr/>
+          <p:nvPr/>
+        </p:nvSpPr>
+        <p:spPr>
+          <a:xfrm rot="5400000">
+            <a:off x="11245617" y="2281439"/>
+            <a:ext cx="669973" cy="8968956"/>
+          </a:xfrm>
+          <a:prstGeom prst="leftBrace">
+            <a:avLst>
+              <a:gd name="adj1" fmla="val 8333"/>
+              <a:gd name="adj2" fmla="val 58009"/>
+            </a:avLst>
+          </a:prstGeom>
+          <a:ln w="38100">
+            <a:solidFill>
+              <a:schemeClr val="accent4"/>
+            </a:solidFill>
+          </a:ln>
+        </p:spPr>
+        <p:style>
+          <a:lnRef idx="1">
+            <a:schemeClr val="accent1"/>
+          </a:lnRef>
+          <a:fillRef idx="0">
+            <a:schemeClr val="accent1"/>
+          </a:fillRef>
+          <a:effectRef idx="0">
+            <a:schemeClr val="accent1"/>
+          </a:effectRef>
+          <a:fontRef idx="minor">
+            <a:schemeClr val="tx1"/>
+          </a:fontRef>
+        </p:style>
+        <p:txBody>
+          <a:bodyPr rtlCol="0" anchor="ctr"/>
+          <a:lstStyle/>
+          <a:p>
+            <a:pPr algn="ctr"/>
+            <a:endParaRPr lang="en-GB" sz="2025" dirty="0"/>
+          </a:p>
+        </p:txBody>
+      </p:sp>
+      <p:pic>
+        <p:nvPicPr>
+          <p:cNvPr id="19" name="Picture 18">
+            <a:extLst>
+              <a:ext uri="{FF2B5EF4-FFF2-40B4-BE49-F238E27FC236}">
+                <a16:creationId xmlns:a16="http://schemas.microsoft.com/office/drawing/2014/main" id="{45593E8A-47D3-4EAD-9C33-0C4BD7D50503}"/>
+              </a:ext>
+            </a:extLst>
+          </p:cNvPr>
+          <p:cNvPicPr>
+            <a:picLocks noChangeAspect="1"/>
+          </p:cNvPicPr>
+          <p:nvPr/>
+        </p:nvPicPr>
+        <p:blipFill>
+          <a:blip r:embed="rId19"/>
+          <a:stretch>
+            <a:fillRect/>
+          </a:stretch>
+        </p:blipFill>
+        <p:spPr>
+          <a:xfrm>
+            <a:off x="8622678" y="5571477"/>
+            <a:ext cx="2803699" cy="928418"/>
+          </a:xfrm>
+          <a:prstGeom prst="rect">
+            <a:avLst/>
+          </a:prstGeom>
+        </p:spPr>
+      </p:pic>
+      <p:cxnSp>
+        <p:nvCxnSpPr>
+          <p:cNvPr id="33" name="Straight Connector 32">
+            <a:extLst>
+              <a:ext uri="{FF2B5EF4-FFF2-40B4-BE49-F238E27FC236}">
+                <a16:creationId xmlns:a16="http://schemas.microsoft.com/office/drawing/2014/main" id="{551D01C0-A5F9-4EF1-AE16-8AEB83CFB30D}"/>
+              </a:ext>
+            </a:extLst>
+          </p:cNvPr>
+          <p:cNvCxnSpPr>
+            <a:cxnSpLocks/>
+          </p:cNvCxnSpPr>
+          <p:nvPr/>
+        </p:nvCxnSpPr>
+        <p:spPr>
+          <a:xfrm>
+            <a:off x="6929992" y="5343092"/>
+            <a:ext cx="0" cy="2746808"/>
+          </a:xfrm>
+          <a:prstGeom prst="line">
+            <a:avLst/>
+          </a:prstGeom>
+          <a:ln w="57150">
+            <a:solidFill>
+              <a:schemeClr val="bg1">
+                <a:lumMod val="50000"/>
+              </a:schemeClr>
+            </a:solidFill>
+            <a:prstDash val="sysDot"/>
+          </a:ln>
+        </p:spPr>
+        <p:style>
+          <a:lnRef idx="1">
+            <a:schemeClr val="accent1"/>
+          </a:lnRef>
+          <a:fillRef idx="0">
+            <a:schemeClr val="accent1"/>
+          </a:fillRef>
+          <a:effectRef idx="0">
+            <a:schemeClr val="accent1"/>
+          </a:effectRef>
+          <a:fontRef idx="minor">
+            <a:schemeClr val="tx1"/>
+          </a:fontRef>
+        </p:style>
+      </p:cxnSp>
+      <p:cxnSp>
+        <p:nvCxnSpPr>
+          <p:cNvPr id="52" name="Straight Connector 51">
+            <a:extLst>
+              <a:ext uri="{FF2B5EF4-FFF2-40B4-BE49-F238E27FC236}">
+                <a16:creationId xmlns:a16="http://schemas.microsoft.com/office/drawing/2014/main" id="{E6E46D17-E649-4B9B-90DE-49E7518214F1}"/>
+              </a:ext>
+            </a:extLst>
+          </p:cNvPr>
+          <p:cNvCxnSpPr>
+            <a:cxnSpLocks/>
+          </p:cNvCxnSpPr>
+          <p:nvPr/>
+        </p:nvCxnSpPr>
+        <p:spPr>
+          <a:xfrm>
+            <a:off x="109831" y="8102600"/>
+            <a:ext cx="6816782" cy="0"/>
+          </a:xfrm>
+          <a:prstGeom prst="line">
+            <a:avLst/>
+          </a:prstGeom>
+          <a:ln w="57150">
+            <a:solidFill>
+              <a:schemeClr val="bg1">
+                <a:lumMod val="50000"/>
+              </a:schemeClr>
+            </a:solidFill>
+            <a:prstDash val="sysDot"/>
+          </a:ln>
+        </p:spPr>
+        <p:style>
+          <a:lnRef idx="1">
+            <a:schemeClr val="accent1"/>
+          </a:lnRef>
+          <a:fillRef idx="0">
+            <a:schemeClr val="accent1"/>
+          </a:fillRef>
+          <a:effectRef idx="0">
+            <a:schemeClr val="accent1"/>
+          </a:effectRef>
+          <a:fontRef idx="minor">
+            <a:schemeClr val="tx1"/>
+          </a:fontRef>
+        </p:style>
+      </p:cxnSp>
+      <p:grpSp>
+        <p:nvGrpSpPr>
+          <p:cNvPr id="43" name="Group 42">
+            <a:extLst>
+              <a:ext uri="{FF2B5EF4-FFF2-40B4-BE49-F238E27FC236}">
+                <a16:creationId xmlns:a16="http://schemas.microsoft.com/office/drawing/2014/main" id="{45F19378-2B4E-41D8-AABE-EFDAEC478FEC}"/>
+              </a:ext>
+            </a:extLst>
+          </p:cNvPr>
+          <p:cNvGrpSpPr/>
+          <p:nvPr/>
+        </p:nvGrpSpPr>
+        <p:grpSpPr>
+          <a:xfrm>
+            <a:off x="6969989" y="4502442"/>
+            <a:ext cx="4478392" cy="692724"/>
+            <a:chOff x="6969989" y="4502442"/>
+            <a:chExt cx="4478392" cy="692724"/>
+          </a:xfrm>
+        </p:grpSpPr>
+        <p:pic>
+          <p:nvPicPr>
+            <p:cNvPr id="9" name="Picture 8">
+              <a:extLst>
+                <a:ext uri="{FF2B5EF4-FFF2-40B4-BE49-F238E27FC236}">
+                  <a16:creationId xmlns:a16="http://schemas.microsoft.com/office/drawing/2014/main" id="{830ECE33-9E5F-4091-9D12-99B9CAA53606}"/>
+                </a:ext>
+              </a:extLst>
+            </p:cNvPr>
+            <p:cNvPicPr>
+              <a:picLocks noChangeAspect="1"/>
+            </p:cNvPicPr>
+            <p:nvPr/>
+          </p:nvPicPr>
+          <p:blipFill>
+            <a:blip r:embed="rId20"/>
+            <a:stretch>
+              <a:fillRect/>
+            </a:stretch>
+          </p:blipFill>
+          <p:spPr>
+            <a:xfrm>
+              <a:off x="6998765" y="4531154"/>
+              <a:ext cx="4449616" cy="641100"/>
+            </a:xfrm>
+            <a:prstGeom prst="rect">
+              <a:avLst/>
+            </a:prstGeom>
+          </p:spPr>
+        </p:pic>
+        <p:pic>
+          <p:nvPicPr>
+            <p:cNvPr id="31" name="Picture 30">
+              <a:extLst>
+                <a:ext uri="{FF2B5EF4-FFF2-40B4-BE49-F238E27FC236}">
+                  <a16:creationId xmlns:a16="http://schemas.microsoft.com/office/drawing/2014/main" id="{2D8F6489-47E7-4786-8B5B-EB5910CD260F}"/>
+                </a:ext>
+              </a:extLst>
+            </p:cNvPr>
+            <p:cNvPicPr>
+              <a:picLocks noChangeAspect="1"/>
+            </p:cNvPicPr>
+            <p:nvPr/>
+          </p:nvPicPr>
+          <p:blipFill>
+            <a:blip r:embed="rId21"/>
+            <a:stretch>
+              <a:fillRect/>
+            </a:stretch>
+          </p:blipFill>
+          <p:spPr>
+            <a:xfrm>
+              <a:off x="6969989" y="4502442"/>
+              <a:ext cx="1503210" cy="692724"/>
+            </a:xfrm>
+            <a:prstGeom prst="rect">
+              <a:avLst/>
+            </a:prstGeom>
+          </p:spPr>
+        </p:pic>
+      </p:grpSp>
+      <p:pic>
+        <p:nvPicPr>
+          <p:cNvPr id="50" name="Picture 49">
+            <a:extLst>
+              <a:ext uri="{FF2B5EF4-FFF2-40B4-BE49-F238E27FC236}">
+                <a16:creationId xmlns:a16="http://schemas.microsoft.com/office/drawing/2014/main" id="{67041243-E3AA-467F-A19F-44790A44FF91}"/>
+              </a:ext>
+            </a:extLst>
+          </p:cNvPr>
+          <p:cNvPicPr>
+            <a:picLocks noChangeAspect="1"/>
+          </p:cNvPicPr>
+          <p:nvPr/>
+        </p:nvPicPr>
+        <p:blipFill>
+          <a:blip r:embed="rId22"/>
+          <a:stretch>
+            <a:fillRect/>
+          </a:stretch>
+        </p:blipFill>
+        <p:spPr>
+          <a:xfrm>
+            <a:off x="5391661" y="7410693"/>
+            <a:ext cx="1276641" cy="579731"/>
+          </a:xfrm>
+          <a:prstGeom prst="rect">
+            <a:avLst/>
+          </a:prstGeom>
+        </p:spPr>
+      </p:pic>
+      <p:pic>
+        <p:nvPicPr>
+          <p:cNvPr id="54" name="Picture 53">
+            <a:extLst>
+              <a:ext uri="{FF2B5EF4-FFF2-40B4-BE49-F238E27FC236}">
+                <a16:creationId xmlns:a16="http://schemas.microsoft.com/office/drawing/2014/main" id="{5917B25F-E8F2-4398-B37D-9DDFA6C746DA}"/>
+              </a:ext>
+            </a:extLst>
+          </p:cNvPr>
+          <p:cNvPicPr>
+            <a:picLocks noChangeAspect="1"/>
+          </p:cNvPicPr>
+          <p:nvPr/>
+        </p:nvPicPr>
+        <p:blipFill>
+          <a:blip r:embed="rId23"/>
+          <a:stretch>
+            <a:fillRect/>
+          </a:stretch>
+        </p:blipFill>
+        <p:spPr>
+          <a:xfrm>
+            <a:off x="5389143" y="6833595"/>
+            <a:ext cx="1250928" cy="559309"/>
+          </a:xfrm>
+          <a:prstGeom prst="rect">
+            <a:avLst/>
+          </a:prstGeom>
+        </p:spPr>
+      </p:pic>
+      <p:sp>
+        <p:nvSpPr>
+          <p:cNvPr id="45" name="Left Brace 44">
+            <a:extLst>
+              <a:ext uri="{FF2B5EF4-FFF2-40B4-BE49-F238E27FC236}">
+                <a16:creationId xmlns:a16="http://schemas.microsoft.com/office/drawing/2014/main" id="{6A780C7D-167C-4B91-9DB2-93F665E492C2}"/>
+              </a:ext>
+            </a:extLst>
+          </p:cNvPr>
+          <p:cNvSpPr/>
+          <p:nvPr/>
+        </p:nvSpPr>
+        <p:spPr>
+          <a:xfrm>
+            <a:off x="5026465" y="4218725"/>
+            <a:ext cx="485870" cy="3789295"/>
+          </a:xfrm>
+          <a:prstGeom prst="leftBrace">
+            <a:avLst>
+              <a:gd name="adj1" fmla="val 8333"/>
+              <a:gd name="adj2" fmla="val 53133"/>
+            </a:avLst>
+          </a:prstGeom>
+          <a:ln w="38100">
+            <a:solidFill>
+              <a:schemeClr val="accent4"/>
+            </a:solidFill>
+          </a:ln>
+        </p:spPr>
+        <p:style>
+          <a:lnRef idx="1">
+            <a:schemeClr val="accent1"/>
+          </a:lnRef>
+          <a:fillRef idx="0">
+            <a:schemeClr val="accent1"/>
+          </a:fillRef>
+          <a:effectRef idx="0">
+            <a:schemeClr val="accent1"/>
+          </a:effectRef>
+          <a:fontRef idx="minor">
+            <a:schemeClr val="tx1"/>
+          </a:fontRef>
+        </p:style>
+        <p:txBody>
+          <a:bodyPr rtlCol="0" anchor="ctr"/>
+          <a:lstStyle/>
+          <a:p>
+            <a:pPr algn="ctr"/>
+            <a:endParaRPr lang="en-GB" sz="2025" dirty="0"/>
+          </a:p>
+        </p:txBody>
+      </p:sp>
+      <p:sp>
+        <p:nvSpPr>
+          <p:cNvPr id="55" name="TextBox 54">
+            <a:extLst>
+              <a:ext uri="{FF2B5EF4-FFF2-40B4-BE49-F238E27FC236}">
+                <a16:creationId xmlns:a16="http://schemas.microsoft.com/office/drawing/2014/main" id="{77599DE6-779A-4C83-AF46-B859F76E6394}"/>
+              </a:ext>
+            </a:extLst>
+          </p:cNvPr>
+          <p:cNvSpPr txBox="1"/>
+          <p:nvPr/>
+        </p:nvSpPr>
+        <p:spPr>
+          <a:xfrm>
+            <a:off x="4268745" y="6083548"/>
+            <a:ext cx="800219" cy="307777"/>
+          </a:xfrm>
+          <a:prstGeom prst="rect">
+            <a:avLst/>
+          </a:prstGeom>
+          <a:noFill/>
+        </p:spPr>
+        <p:txBody>
+          <a:bodyPr wrap="none" rtlCol="0">
+            <a:spAutoFit/>
+          </a:bodyPr>
+          <a:lstStyle/>
+          <a:p>
+            <a:r>
+              <a:rPr lang="en-GB" sz="1400" dirty="0"/>
+              <a:t>@{Case}</a:t>
+            </a:r>
+          </a:p>
+        </p:txBody>
+      </p:sp>
+      <p:sp>
+        <p:nvSpPr>
+          <p:cNvPr id="77" name="Left Brace 76">
+            <a:extLst>
+              <a:ext uri="{FF2B5EF4-FFF2-40B4-BE49-F238E27FC236}">
+                <a16:creationId xmlns:a16="http://schemas.microsoft.com/office/drawing/2014/main" id="{611FAC59-4A3F-467B-8E6F-34EFBE66EDDA}"/>
+              </a:ext>
+            </a:extLst>
+          </p:cNvPr>
+          <p:cNvSpPr/>
+          <p:nvPr/>
+        </p:nvSpPr>
+        <p:spPr>
+          <a:xfrm>
+            <a:off x="12681829" y="10151768"/>
+            <a:ext cx="485870" cy="3443314"/>
+          </a:xfrm>
+          <a:prstGeom prst="leftBrace">
+            <a:avLst>
+              <a:gd name="adj1" fmla="val 8333"/>
+              <a:gd name="adj2" fmla="val 51628"/>
+            </a:avLst>
+          </a:prstGeom>
+          <a:ln w="38100">
+            <a:solidFill>
+              <a:schemeClr val="accent4"/>
+            </a:solidFill>
+          </a:ln>
+        </p:spPr>
+        <p:style>
+          <a:lnRef idx="1">
+            <a:schemeClr val="accent1"/>
+          </a:lnRef>
+          <a:fillRef idx="0">
+            <a:schemeClr val="accent1"/>
+          </a:fillRef>
+          <a:effectRef idx="0">
+            <a:schemeClr val="accent1"/>
+          </a:effectRef>
+          <a:fontRef idx="minor">
+            <a:schemeClr val="tx1"/>
+          </a:fontRef>
+        </p:style>
+        <p:txBody>
+          <a:bodyPr rtlCol="0" anchor="ctr"/>
+          <a:lstStyle/>
+          <a:p>
+            <a:pPr algn="ctr"/>
+            <a:endParaRPr lang="en-GB" sz="2025" dirty="0"/>
+          </a:p>
+        </p:txBody>
+      </p:sp>
+      <p:pic>
+        <p:nvPicPr>
+          <p:cNvPr id="79" name="Picture 78">
+            <a:extLst>
+              <a:ext uri="{FF2B5EF4-FFF2-40B4-BE49-F238E27FC236}">
+                <a16:creationId xmlns:a16="http://schemas.microsoft.com/office/drawing/2014/main" id="{9599B374-72EC-4DB4-8B2D-5068CAAC141C}"/>
+              </a:ext>
+            </a:extLst>
+          </p:cNvPr>
+          <p:cNvPicPr>
+            <a:picLocks noChangeAspect="1"/>
+          </p:cNvPicPr>
+          <p:nvPr/>
+        </p:nvPicPr>
+        <p:blipFill>
+          <a:blip r:embed="rId24"/>
+          <a:stretch>
+            <a:fillRect/>
+          </a:stretch>
+        </p:blipFill>
+        <p:spPr>
+          <a:xfrm>
+            <a:off x="5383564" y="4296649"/>
+            <a:ext cx="1293815" cy="587530"/>
+          </a:xfrm>
+          <a:prstGeom prst="rect">
+            <a:avLst/>
+          </a:prstGeom>
+        </p:spPr>
+      </p:pic>
+      <p:pic>
+        <p:nvPicPr>
+          <p:cNvPr id="83" name="Picture 82">
+            <a:extLst>
+              <a:ext uri="{FF2B5EF4-FFF2-40B4-BE49-F238E27FC236}">
+                <a16:creationId xmlns:a16="http://schemas.microsoft.com/office/drawing/2014/main" id="{3725C369-4778-4849-8C1C-7ABBBA95D4F2}"/>
+              </a:ext>
+            </a:extLst>
+          </p:cNvPr>
+          <p:cNvPicPr>
+            <a:picLocks noChangeAspect="1"/>
+          </p:cNvPicPr>
+          <p:nvPr/>
+        </p:nvPicPr>
+        <p:blipFill>
+          <a:blip r:embed="rId22"/>
+          <a:stretch>
+            <a:fillRect/>
+          </a:stretch>
+        </p:blipFill>
+        <p:spPr>
+          <a:xfrm>
+            <a:off x="13054795" y="12963773"/>
+            <a:ext cx="1276641" cy="579731"/>
+          </a:xfrm>
+          <a:prstGeom prst="rect">
+            <a:avLst/>
+          </a:prstGeom>
+        </p:spPr>
+      </p:pic>
+      <p:pic>
+        <p:nvPicPr>
+          <p:cNvPr id="85" name="Picture 84">
+            <a:extLst>
+              <a:ext uri="{FF2B5EF4-FFF2-40B4-BE49-F238E27FC236}">
+                <a16:creationId xmlns:a16="http://schemas.microsoft.com/office/drawing/2014/main" id="{06BFAB01-972F-4DF5-8F4D-CCDD668042F6}"/>
+              </a:ext>
+            </a:extLst>
+          </p:cNvPr>
+          <p:cNvPicPr>
+            <a:picLocks noChangeAspect="1"/>
+          </p:cNvPicPr>
+          <p:nvPr/>
+        </p:nvPicPr>
+        <p:blipFill>
+          <a:blip r:embed="rId23"/>
+          <a:stretch>
+            <a:fillRect/>
+          </a:stretch>
+        </p:blipFill>
+        <p:spPr>
+          <a:xfrm>
+            <a:off x="13017952" y="10876536"/>
+            <a:ext cx="1250928" cy="559309"/>
+          </a:xfrm>
+          <a:prstGeom prst="rect">
+            <a:avLst/>
+          </a:prstGeom>
+        </p:spPr>
+      </p:pic>
+      <p:pic>
+        <p:nvPicPr>
+          <p:cNvPr id="87" name="Picture 86">
+            <a:extLst>
+              <a:ext uri="{FF2B5EF4-FFF2-40B4-BE49-F238E27FC236}">
+                <a16:creationId xmlns:a16="http://schemas.microsoft.com/office/drawing/2014/main" id="{B3526AD5-1686-43B8-8AB8-C26D164205A3}"/>
+              </a:ext>
+            </a:extLst>
+          </p:cNvPr>
+          <p:cNvPicPr>
+            <a:picLocks noChangeAspect="1"/>
+          </p:cNvPicPr>
+          <p:nvPr/>
+        </p:nvPicPr>
+        <p:blipFill>
+          <a:blip r:embed="rId24"/>
+          <a:stretch>
+            <a:fillRect/>
+          </a:stretch>
+        </p:blipFill>
+        <p:spPr>
+          <a:xfrm>
+            <a:off x="13017952" y="10232456"/>
+            <a:ext cx="1293815" cy="587530"/>
+          </a:xfrm>
+          <a:prstGeom prst="rect">
+            <a:avLst/>
+          </a:prstGeom>
+        </p:spPr>
+      </p:pic>
+      <p:sp>
+        <p:nvSpPr>
+          <p:cNvPr id="89" name="TextBox 88">
+            <a:extLst>
+              <a:ext uri="{FF2B5EF4-FFF2-40B4-BE49-F238E27FC236}">
+                <a16:creationId xmlns:a16="http://schemas.microsoft.com/office/drawing/2014/main" id="{0D5B15BF-D171-4762-8B87-B6E717E9EE74}"/>
+              </a:ext>
+            </a:extLst>
+          </p:cNvPr>
+          <p:cNvSpPr txBox="1"/>
+          <p:nvPr/>
+        </p:nvSpPr>
+        <p:spPr>
+          <a:xfrm>
+            <a:off x="11782822" y="11764897"/>
+            <a:ext cx="800219" cy="307777"/>
+          </a:xfrm>
+          <a:prstGeom prst="rect">
+            <a:avLst/>
+          </a:prstGeom>
+          <a:noFill/>
+        </p:spPr>
+        <p:txBody>
+          <a:bodyPr wrap="none" rtlCol="0">
+            <a:spAutoFit/>
+          </a:bodyPr>
+          <a:lstStyle/>
+          <a:p>
+            <a:r>
+              <a:rPr lang="en-GB" sz="1400" dirty="0"/>
+              <a:t>@{Case}</a:t>
+            </a:r>
+          </a:p>
+        </p:txBody>
+      </p:sp>
+      <p:sp>
+        <p:nvSpPr>
+          <p:cNvPr id="91" name="TextBox 90">
+            <a:extLst>
+              <a:ext uri="{FF2B5EF4-FFF2-40B4-BE49-F238E27FC236}">
+                <a16:creationId xmlns:a16="http://schemas.microsoft.com/office/drawing/2014/main" id="{E9965364-AE61-41AD-AE4E-CE1C64F25218}"/>
+              </a:ext>
+            </a:extLst>
+          </p:cNvPr>
+          <p:cNvSpPr txBox="1"/>
+          <p:nvPr/>
+        </p:nvSpPr>
+        <p:spPr>
+          <a:xfrm>
+            <a:off x="14844203" y="8488271"/>
+            <a:ext cx="781048" cy="307777"/>
+          </a:xfrm>
+          <a:prstGeom prst="rect">
+            <a:avLst/>
+          </a:prstGeom>
+          <a:noFill/>
+        </p:spPr>
+        <p:txBody>
+          <a:bodyPr wrap="none" rtlCol="0">
+            <a:spAutoFit/>
+          </a:bodyPr>
+          <a:lstStyle>
+            <a:defPPr>
+              <a:defRPr lang="en-US"/>
+            </a:defPPr>
+            <a:lvl1pPr>
+              <a:defRPr sz="1400"/>
+            </a:lvl1pPr>
+          </a:lstStyle>
+          <a:p>
+            <a:r>
+              <a:rPr lang="en-GB" dirty="0"/>
+              <a:t>@{True}</a:t>
+            </a:r>
+          </a:p>
+        </p:txBody>
+      </p:sp>
+      <p:pic>
+        <p:nvPicPr>
+          <p:cNvPr id="75" name="Picture 74">
+            <a:extLst>
+              <a:ext uri="{FF2B5EF4-FFF2-40B4-BE49-F238E27FC236}">
+                <a16:creationId xmlns:a16="http://schemas.microsoft.com/office/drawing/2014/main" id="{0A7FCA97-BC83-46EB-9377-33A9CD4F2DBB}"/>
+              </a:ext>
+            </a:extLst>
+          </p:cNvPr>
+          <p:cNvPicPr>
+            <a:picLocks noChangeAspect="1"/>
+          </p:cNvPicPr>
+          <p:nvPr/>
+        </p:nvPicPr>
+        <p:blipFill>
+          <a:blip r:embed="rId25"/>
+          <a:stretch>
+            <a:fillRect/>
+          </a:stretch>
+        </p:blipFill>
+        <p:spPr>
+          <a:xfrm>
+            <a:off x="6164750" y="10008205"/>
+            <a:ext cx="6481178" cy="2093919"/>
+          </a:xfrm>
+          <a:prstGeom prst="rect">
+            <a:avLst/>
+          </a:prstGeom>
+        </p:spPr>
+      </p:pic>
+    </p:spTree>
+    <p:extLst>
+      <p:ext uri="{BB962C8B-B14F-4D97-AF65-F5344CB8AC3E}">
+        <p14:creationId xmlns:p14="http://schemas.microsoft.com/office/powerpoint/2010/main" val="2152424416"/>
+      </p:ext>
+    </p:extLst>
+  </p:cSld>
+  <p:clrMapOvr>
+    <a:masterClrMapping/>
+  </p:clrMapOvr>
+</p:sld>
+</file>
+
+<file path=ppt/slides/slide13.xml><?xml version="1.0" encoding="utf-8"?>
 <p:sld xmlns:a="http://schemas.openxmlformats.org/drawingml/2006/main" xmlns:r="http://schemas.openxmlformats.org/officeDocument/2006/relationships" xmlns:p="http://schemas.openxmlformats.org/presentationml/2006/main">
   <p:cSld>
     <p:spTree>

</xml_diff>

<commit_message>
Added v1.9 ADF arm template
</commit_message>
<xml_diff>
--- a/Images/All ADF Activities.pptx
+++ b/Images/All ADF Activities.pptx
@@ -18,7 +18,6 @@
     <p:sldId id="268" r:id="rId12"/>
     <p:sldId id="269" r:id="rId13"/>
     <p:sldId id="270" r:id="rId14"/>
-    <p:sldId id="260" r:id="rId15"/>
   </p:sldIdLst>
   <p:sldSz cx="16200438" cy="14400213"/>
   <p:notesSz cx="6858000" cy="9144000"/>
@@ -256,7 +255,7 @@
           <a:p>
             <a:fld id="{1F80DB50-5271-4B1A-976D-0A7715B55622}" type="datetimeFigureOut">
               <a:rPr lang="en-GB" smtClean="0"/>
-              <a:t>16/09/2020</a:t>
+              <a:t>22/09/2020</a:t>
             </a:fld>
             <a:endParaRPr lang="en-GB"/>
           </a:p>
@@ -426,7 +425,7 @@
           <a:p>
             <a:fld id="{1F80DB50-5271-4B1A-976D-0A7715B55622}" type="datetimeFigureOut">
               <a:rPr lang="en-GB" smtClean="0"/>
-              <a:t>16/09/2020</a:t>
+              <a:t>22/09/2020</a:t>
             </a:fld>
             <a:endParaRPr lang="en-GB"/>
           </a:p>
@@ -606,7 +605,7 @@
           <a:p>
             <a:fld id="{1F80DB50-5271-4B1A-976D-0A7715B55622}" type="datetimeFigureOut">
               <a:rPr lang="en-GB" smtClean="0"/>
-              <a:t>16/09/2020</a:t>
+              <a:t>22/09/2020</a:t>
             </a:fld>
             <a:endParaRPr lang="en-GB"/>
           </a:p>
@@ -776,7 +775,7 @@
           <a:p>
             <a:fld id="{1F80DB50-5271-4B1A-976D-0A7715B55622}" type="datetimeFigureOut">
               <a:rPr lang="en-GB" smtClean="0"/>
-              <a:t>16/09/2020</a:t>
+              <a:t>22/09/2020</a:t>
             </a:fld>
             <a:endParaRPr lang="en-GB"/>
           </a:p>
@@ -1020,7 +1019,7 @@
           <a:p>
             <a:fld id="{1F80DB50-5271-4B1A-976D-0A7715B55622}" type="datetimeFigureOut">
               <a:rPr lang="en-GB" smtClean="0"/>
-              <a:t>16/09/2020</a:t>
+              <a:t>22/09/2020</a:t>
             </a:fld>
             <a:endParaRPr lang="en-GB"/>
           </a:p>
@@ -1252,7 +1251,7 @@
           <a:p>
             <a:fld id="{1F80DB50-5271-4B1A-976D-0A7715B55622}" type="datetimeFigureOut">
               <a:rPr lang="en-GB" smtClean="0"/>
-              <a:t>16/09/2020</a:t>
+              <a:t>22/09/2020</a:t>
             </a:fld>
             <a:endParaRPr lang="en-GB"/>
           </a:p>
@@ -1619,7 +1618,7 @@
           <a:p>
             <a:fld id="{1F80DB50-5271-4B1A-976D-0A7715B55622}" type="datetimeFigureOut">
               <a:rPr lang="en-GB" smtClean="0"/>
-              <a:t>16/09/2020</a:t>
+              <a:t>22/09/2020</a:t>
             </a:fld>
             <a:endParaRPr lang="en-GB"/>
           </a:p>
@@ -1737,7 +1736,7 @@
           <a:p>
             <a:fld id="{1F80DB50-5271-4B1A-976D-0A7715B55622}" type="datetimeFigureOut">
               <a:rPr lang="en-GB" smtClean="0"/>
-              <a:t>16/09/2020</a:t>
+              <a:t>22/09/2020</a:t>
             </a:fld>
             <a:endParaRPr lang="en-GB"/>
           </a:p>
@@ -1832,7 +1831,7 @@
           <a:p>
             <a:fld id="{1F80DB50-5271-4B1A-976D-0A7715B55622}" type="datetimeFigureOut">
               <a:rPr lang="en-GB" smtClean="0"/>
-              <a:t>16/09/2020</a:t>
+              <a:t>22/09/2020</a:t>
             </a:fld>
             <a:endParaRPr lang="en-GB"/>
           </a:p>
@@ -2109,7 +2108,7 @@
           <a:p>
             <a:fld id="{1F80DB50-5271-4B1A-976D-0A7715B55622}" type="datetimeFigureOut">
               <a:rPr lang="en-GB" smtClean="0"/>
-              <a:t>16/09/2020</a:t>
+              <a:t>22/09/2020</a:t>
             </a:fld>
             <a:endParaRPr lang="en-GB"/>
           </a:p>
@@ -2366,7 +2365,7 @@
           <a:p>
             <a:fld id="{1F80DB50-5271-4B1A-976D-0A7715B55622}" type="datetimeFigureOut">
               <a:rPr lang="en-GB" smtClean="0"/>
-              <a:t>16/09/2020</a:t>
+              <a:t>22/09/2020</a:t>
             </a:fld>
             <a:endParaRPr lang="en-GB"/>
           </a:p>
@@ -2579,7 +2578,7 @@
           <a:p>
             <a:fld id="{1F80DB50-5271-4B1A-976D-0A7715B55622}" type="datetimeFigureOut">
               <a:rPr lang="en-GB" smtClean="0"/>
-              <a:t>16/09/2020</a:t>
+              <a:t>22/09/2020</a:t>
             </a:fld>
             <a:endParaRPr lang="en-GB"/>
           </a:p>
@@ -10128,909 +10127,6 @@
   <p:clrMapOvr>
     <a:masterClrMapping/>
   </p:clrMapOvr>
-</p:sld>
-</file>
-
-<file path=ppt/slides/slide14.xml><?xml version="1.0" encoding="utf-8"?>
-<p:sld xmlns:a="http://schemas.openxmlformats.org/drawingml/2006/main" xmlns:r="http://schemas.openxmlformats.org/officeDocument/2006/relationships" xmlns:p="http://schemas.openxmlformats.org/presentationml/2006/main">
-  <p:cSld>
-    <p:spTree>
-      <p:nvGrpSpPr>
-        <p:cNvPr id="1" name=""/>
-        <p:cNvGrpSpPr/>
-        <p:nvPr/>
-      </p:nvGrpSpPr>
-      <p:grpSpPr>
-        <a:xfrm>
-          <a:off x="0" y="0"/>
-          <a:ext cx="0" cy="0"/>
-          <a:chOff x="0" y="0"/>
-          <a:chExt cx="0" cy="0"/>
-        </a:xfrm>
-      </p:grpSpPr>
-      <p:sp>
-        <p:nvSpPr>
-          <p:cNvPr id="16" name="TextBox 15">
-            <a:extLst>
-              <a:ext uri="{FF2B5EF4-FFF2-40B4-BE49-F238E27FC236}">
-                <a16:creationId xmlns:a16="http://schemas.microsoft.com/office/drawing/2014/main" id="{73A2C03B-7980-42A1-AE0F-C2B2904F8E3B}"/>
-              </a:ext>
-            </a:extLst>
-          </p:cNvPr>
-          <p:cNvSpPr txBox="1"/>
-          <p:nvPr/>
-        </p:nvSpPr>
-        <p:spPr>
-          <a:xfrm>
-            <a:off x="10318834" y="4001058"/>
-            <a:ext cx="992579" cy="403957"/>
-          </a:xfrm>
-          <a:prstGeom prst="rect">
-            <a:avLst/>
-          </a:prstGeom>
-          <a:noFill/>
-        </p:spPr>
-        <p:txBody>
-          <a:bodyPr wrap="none" rtlCol="0">
-            <a:spAutoFit/>
-          </a:bodyPr>
-          <a:lstStyle/>
-          <a:p>
-            <a:r>
-              <a:rPr lang="en-GB" sz="2025" dirty="0"/>
-              <a:t>Success</a:t>
-            </a:r>
-          </a:p>
-        </p:txBody>
-      </p:sp>
-      <p:cxnSp>
-        <p:nvCxnSpPr>
-          <p:cNvPr id="17" name="Connector: Elbow 16">
-            <a:extLst>
-              <a:ext uri="{FF2B5EF4-FFF2-40B4-BE49-F238E27FC236}">
-                <a16:creationId xmlns:a16="http://schemas.microsoft.com/office/drawing/2014/main" id="{0326AC0F-054E-497A-8BD7-FCE6E6C13963}"/>
-              </a:ext>
-            </a:extLst>
-          </p:cNvPr>
-          <p:cNvCxnSpPr>
-            <a:cxnSpLocks/>
-          </p:cNvCxnSpPr>
-          <p:nvPr/>
-        </p:nvCxnSpPr>
-        <p:spPr>
-          <a:xfrm>
-            <a:off x="8304091" y="4854912"/>
-            <a:ext cx="1982707" cy="461665"/>
-          </a:xfrm>
-          <a:prstGeom prst="bentConnector3">
-            <a:avLst>
-              <a:gd name="adj1" fmla="val 46957"/>
-            </a:avLst>
-          </a:prstGeom>
-          <a:ln w="76200">
-            <a:solidFill>
-              <a:schemeClr val="bg1">
-                <a:lumMod val="65000"/>
-              </a:schemeClr>
-            </a:solidFill>
-            <a:tailEnd type="triangle"/>
-          </a:ln>
-        </p:spPr>
-        <p:style>
-          <a:lnRef idx="1">
-            <a:schemeClr val="accent1"/>
-          </a:lnRef>
-          <a:fillRef idx="0">
-            <a:schemeClr val="accent1"/>
-          </a:fillRef>
-          <a:effectRef idx="0">
-            <a:schemeClr val="accent1"/>
-          </a:effectRef>
-          <a:fontRef idx="minor">
-            <a:schemeClr val="tx1"/>
-          </a:fontRef>
-        </p:style>
-      </p:cxnSp>
-      <p:cxnSp>
-        <p:nvCxnSpPr>
-          <p:cNvPr id="18" name="Connector: Elbow 17">
-            <a:extLst>
-              <a:ext uri="{FF2B5EF4-FFF2-40B4-BE49-F238E27FC236}">
-                <a16:creationId xmlns:a16="http://schemas.microsoft.com/office/drawing/2014/main" id="{EA9ED334-623E-4A4E-BEEC-894068130618}"/>
-              </a:ext>
-            </a:extLst>
-          </p:cNvPr>
-          <p:cNvCxnSpPr>
-            <a:cxnSpLocks/>
-          </p:cNvCxnSpPr>
-          <p:nvPr/>
-        </p:nvCxnSpPr>
-        <p:spPr>
-          <a:xfrm>
-            <a:off x="8316131" y="4779245"/>
-            <a:ext cx="1982707" cy="195203"/>
-          </a:xfrm>
-          <a:prstGeom prst="bentConnector3">
-            <a:avLst>
-              <a:gd name="adj1" fmla="val 50160"/>
-            </a:avLst>
-          </a:prstGeom>
-          <a:ln w="76200">
-            <a:tailEnd type="triangle"/>
-          </a:ln>
-        </p:spPr>
-        <p:style>
-          <a:lnRef idx="1">
-            <a:schemeClr val="accent1"/>
-          </a:lnRef>
-          <a:fillRef idx="0">
-            <a:schemeClr val="accent1"/>
-          </a:fillRef>
-          <a:effectRef idx="0">
-            <a:schemeClr val="accent1"/>
-          </a:effectRef>
-          <a:fontRef idx="minor">
-            <a:schemeClr val="tx1"/>
-          </a:fontRef>
-        </p:style>
-      </p:cxnSp>
-      <p:cxnSp>
-        <p:nvCxnSpPr>
-          <p:cNvPr id="19" name="Connector: Elbow 18">
-            <a:extLst>
-              <a:ext uri="{FF2B5EF4-FFF2-40B4-BE49-F238E27FC236}">
-                <a16:creationId xmlns:a16="http://schemas.microsoft.com/office/drawing/2014/main" id="{A7930426-A189-4EF6-8BAD-519392C80A3D}"/>
-              </a:ext>
-            </a:extLst>
-          </p:cNvPr>
-          <p:cNvCxnSpPr>
-            <a:cxnSpLocks/>
-            <a:endCxn id="21" idx="1"/>
-          </p:cNvCxnSpPr>
-          <p:nvPr/>
-        </p:nvCxnSpPr>
-        <p:spPr>
-          <a:xfrm flipV="1">
-            <a:off x="8304087" y="4570128"/>
-            <a:ext cx="2007207" cy="133455"/>
-          </a:xfrm>
-          <a:prstGeom prst="bentConnector3">
-            <a:avLst>
-              <a:gd name="adj1" fmla="val 50000"/>
-            </a:avLst>
-          </a:prstGeom>
-          <a:ln w="76200">
-            <a:solidFill>
-              <a:srgbClr val="FF0000"/>
-            </a:solidFill>
-            <a:tailEnd type="triangle"/>
-          </a:ln>
-        </p:spPr>
-        <p:style>
-          <a:lnRef idx="1">
-            <a:schemeClr val="accent1"/>
-          </a:lnRef>
-          <a:fillRef idx="0">
-            <a:schemeClr val="accent1"/>
-          </a:fillRef>
-          <a:effectRef idx="0">
-            <a:schemeClr val="accent1"/>
-          </a:effectRef>
-          <a:fontRef idx="minor">
-            <a:schemeClr val="tx1"/>
-          </a:fontRef>
-        </p:style>
-      </p:cxnSp>
-      <p:cxnSp>
-        <p:nvCxnSpPr>
-          <p:cNvPr id="20" name="Connector: Elbow 19">
-            <a:extLst>
-              <a:ext uri="{FF2B5EF4-FFF2-40B4-BE49-F238E27FC236}">
-                <a16:creationId xmlns:a16="http://schemas.microsoft.com/office/drawing/2014/main" id="{CD0BAEEF-EF43-4C49-9EDB-FFCB13114794}"/>
-              </a:ext>
-            </a:extLst>
-          </p:cNvPr>
-          <p:cNvCxnSpPr>
-            <a:cxnSpLocks/>
-            <a:endCxn id="16" idx="1"/>
-          </p:cNvCxnSpPr>
-          <p:nvPr/>
-        </p:nvCxnSpPr>
-        <p:spPr>
-          <a:xfrm flipV="1">
-            <a:off x="8831745" y="4203037"/>
-            <a:ext cx="1487088" cy="427405"/>
-          </a:xfrm>
-          <a:prstGeom prst="bentConnector3">
-            <a:avLst>
-              <a:gd name="adj1" fmla="val 50000"/>
-            </a:avLst>
-          </a:prstGeom>
-          <a:ln w="76200">
-            <a:solidFill>
-              <a:schemeClr val="accent6"/>
-            </a:solidFill>
-            <a:tailEnd type="triangle"/>
-          </a:ln>
-        </p:spPr>
-        <p:style>
-          <a:lnRef idx="1">
-            <a:schemeClr val="accent1"/>
-          </a:lnRef>
-          <a:fillRef idx="0">
-            <a:schemeClr val="accent1"/>
-          </a:fillRef>
-          <a:effectRef idx="0">
-            <a:schemeClr val="accent1"/>
-          </a:effectRef>
-          <a:fontRef idx="minor">
-            <a:schemeClr val="tx1"/>
-          </a:fontRef>
-        </p:style>
-      </p:cxnSp>
-      <p:sp>
-        <p:nvSpPr>
-          <p:cNvPr id="21" name="TextBox 20">
-            <a:extLst>
-              <a:ext uri="{FF2B5EF4-FFF2-40B4-BE49-F238E27FC236}">
-                <a16:creationId xmlns:a16="http://schemas.microsoft.com/office/drawing/2014/main" id="{AD76AEFE-ADAA-4EDA-BE04-480A9CC89AD5}"/>
-              </a:ext>
-            </a:extLst>
-          </p:cNvPr>
-          <p:cNvSpPr txBox="1"/>
-          <p:nvPr/>
-        </p:nvSpPr>
-        <p:spPr>
-          <a:xfrm>
-            <a:off x="10311293" y="4368149"/>
-            <a:ext cx="539956" cy="403957"/>
-          </a:xfrm>
-          <a:prstGeom prst="rect">
-            <a:avLst/>
-          </a:prstGeom>
-          <a:noFill/>
-        </p:spPr>
-        <p:txBody>
-          <a:bodyPr wrap="none" rtlCol="0">
-            <a:spAutoFit/>
-          </a:bodyPr>
-          <a:lstStyle/>
-          <a:p>
-            <a:r>
-              <a:rPr lang="en-GB" sz="2025" dirty="0"/>
-              <a:t>Fail</a:t>
-            </a:r>
-          </a:p>
-        </p:txBody>
-      </p:sp>
-      <p:sp>
-        <p:nvSpPr>
-          <p:cNvPr id="22" name="TextBox 21">
-            <a:extLst>
-              <a:ext uri="{FF2B5EF4-FFF2-40B4-BE49-F238E27FC236}">
-                <a16:creationId xmlns:a16="http://schemas.microsoft.com/office/drawing/2014/main" id="{2DD5DCBD-88FD-4D3F-889E-91C2A2822707}"/>
-              </a:ext>
-            </a:extLst>
-          </p:cNvPr>
-          <p:cNvSpPr txBox="1"/>
-          <p:nvPr/>
-        </p:nvSpPr>
-        <p:spPr>
-          <a:xfrm>
-            <a:off x="10302002" y="4776012"/>
-            <a:ext cx="1203150" cy="403957"/>
-          </a:xfrm>
-          <a:prstGeom prst="rect">
-            <a:avLst/>
-          </a:prstGeom>
-          <a:noFill/>
-        </p:spPr>
-        <p:txBody>
-          <a:bodyPr wrap="none" rtlCol="0">
-            <a:spAutoFit/>
-          </a:bodyPr>
-          <a:lstStyle/>
-          <a:p>
-            <a:r>
-              <a:rPr lang="en-GB" sz="2025" dirty="0"/>
-              <a:t>Complete</a:t>
-            </a:r>
-          </a:p>
-        </p:txBody>
-      </p:sp>
-      <p:sp>
-        <p:nvSpPr>
-          <p:cNvPr id="23" name="TextBox 22">
-            <a:extLst>
-              <a:ext uri="{FF2B5EF4-FFF2-40B4-BE49-F238E27FC236}">
-                <a16:creationId xmlns:a16="http://schemas.microsoft.com/office/drawing/2014/main" id="{9034F2AF-5A71-4276-A703-86E9B2038E5D}"/>
-              </a:ext>
-            </a:extLst>
-          </p:cNvPr>
-          <p:cNvSpPr txBox="1"/>
-          <p:nvPr/>
-        </p:nvSpPr>
-        <p:spPr>
-          <a:xfrm>
-            <a:off x="10286794" y="5135945"/>
-            <a:ext cx="617477" cy="403957"/>
-          </a:xfrm>
-          <a:prstGeom prst="rect">
-            <a:avLst/>
-          </a:prstGeom>
-          <a:noFill/>
-        </p:spPr>
-        <p:txBody>
-          <a:bodyPr wrap="none" rtlCol="0">
-            <a:spAutoFit/>
-          </a:bodyPr>
-          <a:lstStyle/>
-          <a:p>
-            <a:r>
-              <a:rPr lang="en-GB" sz="2025" dirty="0"/>
-              <a:t>Skip</a:t>
-            </a:r>
-          </a:p>
-        </p:txBody>
-      </p:sp>
-      <p:pic>
-        <p:nvPicPr>
-          <p:cNvPr id="24" name="Picture 23">
-            <a:extLst>
-              <a:ext uri="{FF2B5EF4-FFF2-40B4-BE49-F238E27FC236}">
-                <a16:creationId xmlns:a16="http://schemas.microsoft.com/office/drawing/2014/main" id="{4625E80D-718C-4D38-BE2D-9FD3ABC359C0}"/>
-              </a:ext>
-            </a:extLst>
-          </p:cNvPr>
-          <p:cNvPicPr>
-            <a:picLocks noChangeAspect="1"/>
-          </p:cNvPicPr>
-          <p:nvPr/>
-        </p:nvPicPr>
-        <p:blipFill>
-          <a:blip r:embed="rId2"/>
-          <a:stretch>
-            <a:fillRect/>
-          </a:stretch>
-        </p:blipFill>
-        <p:spPr>
-          <a:xfrm>
-            <a:off x="6120615" y="3797122"/>
-            <a:ext cx="2895447" cy="1569659"/>
-          </a:xfrm>
-          <a:prstGeom prst="rect">
-            <a:avLst/>
-          </a:prstGeom>
-        </p:spPr>
-      </p:pic>
-      <p:sp>
-        <p:nvSpPr>
-          <p:cNvPr id="25" name="TextBox 24">
-            <a:extLst>
-              <a:ext uri="{FF2B5EF4-FFF2-40B4-BE49-F238E27FC236}">
-                <a16:creationId xmlns:a16="http://schemas.microsoft.com/office/drawing/2014/main" id="{3180D369-A55E-4F58-9859-E4C0EF3EDE42}"/>
-              </a:ext>
-            </a:extLst>
-          </p:cNvPr>
-          <p:cNvSpPr txBox="1"/>
-          <p:nvPr/>
-        </p:nvSpPr>
-        <p:spPr>
-          <a:xfrm>
-            <a:off x="7107770" y="4523465"/>
-            <a:ext cx="1891993" cy="400110"/>
-          </a:xfrm>
-          <a:prstGeom prst="rect">
-            <a:avLst/>
-          </a:prstGeom>
-          <a:noFill/>
-        </p:spPr>
-        <p:txBody>
-          <a:bodyPr wrap="none" rtlCol="0" anchor="ctr">
-            <a:spAutoFit/>
-          </a:bodyPr>
-          <a:lstStyle/>
-          <a:p>
-            <a:r>
-              <a:rPr lang="en-GB" sz="2000" dirty="0"/>
-              <a:t>Execute Pipeline</a:t>
-            </a:r>
-          </a:p>
-        </p:txBody>
-      </p:sp>
-      <p:pic>
-        <p:nvPicPr>
-          <p:cNvPr id="26" name="Picture 25">
-            <a:extLst>
-              <a:ext uri="{FF2B5EF4-FFF2-40B4-BE49-F238E27FC236}">
-                <a16:creationId xmlns:a16="http://schemas.microsoft.com/office/drawing/2014/main" id="{CC5615AE-C25D-4330-8F85-12448AE786F2}"/>
-              </a:ext>
-            </a:extLst>
-          </p:cNvPr>
-          <p:cNvPicPr>
-            <a:picLocks noChangeAspect="1"/>
-          </p:cNvPicPr>
-          <p:nvPr/>
-        </p:nvPicPr>
-        <p:blipFill>
-          <a:blip r:embed="rId3"/>
-          <a:stretch>
-            <a:fillRect/>
-          </a:stretch>
-        </p:blipFill>
-        <p:spPr>
-          <a:xfrm>
-            <a:off x="6273661" y="4346843"/>
-            <a:ext cx="854296" cy="787151"/>
-          </a:xfrm>
-          <a:prstGeom prst="rect">
-            <a:avLst/>
-          </a:prstGeom>
-        </p:spPr>
-      </p:pic>
-      <p:sp>
-        <p:nvSpPr>
-          <p:cNvPr id="27" name="Arrow: Bent 26">
-            <a:extLst>
-              <a:ext uri="{FF2B5EF4-FFF2-40B4-BE49-F238E27FC236}">
-                <a16:creationId xmlns:a16="http://schemas.microsoft.com/office/drawing/2014/main" id="{D0CF6755-ACDF-4747-BE13-700EBC1D6831}"/>
-              </a:ext>
-            </a:extLst>
-          </p:cNvPr>
-          <p:cNvSpPr/>
-          <p:nvPr/>
-        </p:nvSpPr>
-        <p:spPr>
-          <a:xfrm rot="5400000">
-            <a:off x="7348918" y="3015258"/>
-            <a:ext cx="618458" cy="945277"/>
-          </a:xfrm>
-          <a:prstGeom prst="bentArrow">
-            <a:avLst>
-              <a:gd name="adj1" fmla="val 13588"/>
-              <a:gd name="adj2" fmla="val 15836"/>
-              <a:gd name="adj3" fmla="val 25043"/>
-              <a:gd name="adj4" fmla="val 22786"/>
-            </a:avLst>
-          </a:prstGeom>
-          <a:solidFill>
-            <a:schemeClr val="accent3"/>
-          </a:solidFill>
-          <a:ln>
-            <a:noFill/>
-          </a:ln>
-        </p:spPr>
-        <p:style>
-          <a:lnRef idx="0">
-            <a:scrgbClr r="0" g="0" b="0"/>
-          </a:lnRef>
-          <a:fillRef idx="0">
-            <a:scrgbClr r="0" g="0" b="0"/>
-          </a:fillRef>
-          <a:effectRef idx="0">
-            <a:scrgbClr r="0" g="0" b="0"/>
-          </a:effectRef>
-          <a:fontRef idx="minor">
-            <a:schemeClr val="lt1"/>
-          </a:fontRef>
-        </p:style>
-        <p:txBody>
-          <a:bodyPr rtlCol="0" anchor="ctr"/>
-          <a:lstStyle/>
-          <a:p>
-            <a:pPr algn="ctr"/>
-            <a:endParaRPr lang="en-GB" sz="2025">
-              <a:solidFill>
-                <a:schemeClr val="tx1"/>
-              </a:solidFill>
-            </a:endParaRPr>
-          </a:p>
-        </p:txBody>
-      </p:sp>
-      <p:pic>
-        <p:nvPicPr>
-          <p:cNvPr id="28" name="Picture 27">
-            <a:extLst>
-              <a:ext uri="{FF2B5EF4-FFF2-40B4-BE49-F238E27FC236}">
-                <a16:creationId xmlns:a16="http://schemas.microsoft.com/office/drawing/2014/main" id="{A7FE9D92-AE59-4788-8876-649C6A4E94BA}"/>
-              </a:ext>
-            </a:extLst>
-          </p:cNvPr>
-          <p:cNvPicPr>
-            <a:picLocks noChangeAspect="1"/>
-          </p:cNvPicPr>
-          <p:nvPr/>
-        </p:nvPicPr>
-        <p:blipFill>
-          <a:blip r:embed="rId4"/>
-          <a:stretch>
-            <a:fillRect/>
-          </a:stretch>
-        </p:blipFill>
-        <p:spPr>
-          <a:xfrm>
-            <a:off x="7560789" y="2911644"/>
-            <a:ext cx="945276" cy="618459"/>
-          </a:xfrm>
-          <a:prstGeom prst="rect">
-            <a:avLst/>
-          </a:prstGeom>
-        </p:spPr>
-      </p:pic>
-      <p:pic>
-        <p:nvPicPr>
-          <p:cNvPr id="29" name="Picture 28">
-            <a:extLst>
-              <a:ext uri="{FF2B5EF4-FFF2-40B4-BE49-F238E27FC236}">
-                <a16:creationId xmlns:a16="http://schemas.microsoft.com/office/drawing/2014/main" id="{AB2A6926-AE56-4F14-8F9D-DC591E30ED4C}"/>
-              </a:ext>
-            </a:extLst>
-          </p:cNvPr>
-          <p:cNvPicPr>
-            <a:picLocks noChangeAspect="1"/>
-          </p:cNvPicPr>
-          <p:nvPr/>
-        </p:nvPicPr>
-        <p:blipFill>
-          <a:blip r:embed="rId5"/>
-          <a:stretch>
-            <a:fillRect/>
-          </a:stretch>
-        </p:blipFill>
-        <p:spPr>
-          <a:xfrm>
-            <a:off x="6159251" y="2499170"/>
-            <a:ext cx="1205286" cy="1201956"/>
-          </a:xfrm>
-          <a:prstGeom prst="rect">
-            <a:avLst/>
-          </a:prstGeom>
-        </p:spPr>
-      </p:pic>
-    </p:spTree>
-    <p:extLst>
-      <p:ext uri="{BB962C8B-B14F-4D97-AF65-F5344CB8AC3E}">
-        <p14:creationId xmlns:p14="http://schemas.microsoft.com/office/powerpoint/2010/main" val="3244960342"/>
-      </p:ext>
-    </p:extLst>
-  </p:cSld>
-  <p:clrMapOvr>
-    <a:masterClrMapping/>
-  </p:clrMapOvr>
-  <p:timing>
-    <p:tnLst>
-      <p:par>
-        <p:cTn id="1" dur="indefinite" restart="never" nodeType="tmRoot">
-          <p:childTnLst>
-            <p:seq concurrent="1" nextAc="seek">
-              <p:cTn id="2" dur="indefinite" nodeType="mainSeq">
-                <p:childTnLst>
-                  <p:par>
-                    <p:cTn id="3" fill="hold">
-                      <p:stCondLst>
-                        <p:cond delay="indefinite"/>
-                      </p:stCondLst>
-                      <p:childTnLst>
-                        <p:par>
-                          <p:cTn id="4" fill="hold">
-                            <p:stCondLst>
-                              <p:cond delay="0"/>
-                            </p:stCondLst>
-                            <p:childTnLst>
-                              <p:par>
-                                <p:cTn id="5" presetID="10" presetClass="entr" presetSubtype="0" fill="hold" grpId="0" nodeType="clickEffect">
-                                  <p:stCondLst>
-                                    <p:cond delay="0"/>
-                                  </p:stCondLst>
-                                  <p:childTnLst>
-                                    <p:set>
-                                      <p:cBhvr>
-                                        <p:cTn id="6" dur="1" fill="hold">
-                                          <p:stCondLst>
-                                            <p:cond delay="0"/>
-                                          </p:stCondLst>
-                                        </p:cTn>
-                                        <p:tgtEl>
-                                          <p:spTgt spid="16"/>
-                                        </p:tgtEl>
-                                        <p:attrNameLst>
-                                          <p:attrName>style.visibility</p:attrName>
-                                        </p:attrNameLst>
-                                      </p:cBhvr>
-                                      <p:to>
-                                        <p:strVal val="visible"/>
-                                      </p:to>
-                                    </p:set>
-                                    <p:animEffect transition="in" filter="fade">
-                                      <p:cBhvr>
-                                        <p:cTn id="7" dur="500"/>
-                                        <p:tgtEl>
-                                          <p:spTgt spid="16"/>
-                                        </p:tgtEl>
-                                      </p:cBhvr>
-                                    </p:animEffect>
-                                  </p:childTnLst>
-                                </p:cTn>
-                              </p:par>
-                              <p:par>
-                                <p:cTn id="8" presetID="10" presetClass="entr" presetSubtype="0" fill="hold" nodeType="withEffect">
-                                  <p:stCondLst>
-                                    <p:cond delay="0"/>
-                                  </p:stCondLst>
-                                  <p:childTnLst>
-                                    <p:set>
-                                      <p:cBhvr>
-                                        <p:cTn id="9" dur="1" fill="hold">
-                                          <p:stCondLst>
-                                            <p:cond delay="0"/>
-                                          </p:stCondLst>
-                                        </p:cTn>
-                                        <p:tgtEl>
-                                          <p:spTgt spid="17"/>
-                                        </p:tgtEl>
-                                        <p:attrNameLst>
-                                          <p:attrName>style.visibility</p:attrName>
-                                        </p:attrNameLst>
-                                      </p:cBhvr>
-                                      <p:to>
-                                        <p:strVal val="visible"/>
-                                      </p:to>
-                                    </p:set>
-                                    <p:animEffect transition="in" filter="fade">
-                                      <p:cBhvr>
-                                        <p:cTn id="10" dur="500"/>
-                                        <p:tgtEl>
-                                          <p:spTgt spid="17"/>
-                                        </p:tgtEl>
-                                      </p:cBhvr>
-                                    </p:animEffect>
-                                  </p:childTnLst>
-                                </p:cTn>
-                              </p:par>
-                              <p:par>
-                                <p:cTn id="11" presetID="10" presetClass="entr" presetSubtype="0" fill="hold" nodeType="withEffect">
-                                  <p:stCondLst>
-                                    <p:cond delay="0"/>
-                                  </p:stCondLst>
-                                  <p:childTnLst>
-                                    <p:set>
-                                      <p:cBhvr>
-                                        <p:cTn id="12" dur="1" fill="hold">
-                                          <p:stCondLst>
-                                            <p:cond delay="0"/>
-                                          </p:stCondLst>
-                                        </p:cTn>
-                                        <p:tgtEl>
-                                          <p:spTgt spid="18"/>
-                                        </p:tgtEl>
-                                        <p:attrNameLst>
-                                          <p:attrName>style.visibility</p:attrName>
-                                        </p:attrNameLst>
-                                      </p:cBhvr>
-                                      <p:to>
-                                        <p:strVal val="visible"/>
-                                      </p:to>
-                                    </p:set>
-                                    <p:animEffect transition="in" filter="fade">
-                                      <p:cBhvr>
-                                        <p:cTn id="13" dur="500"/>
-                                        <p:tgtEl>
-                                          <p:spTgt spid="18"/>
-                                        </p:tgtEl>
-                                      </p:cBhvr>
-                                    </p:animEffect>
-                                  </p:childTnLst>
-                                </p:cTn>
-                              </p:par>
-                              <p:par>
-                                <p:cTn id="14" presetID="10" presetClass="entr" presetSubtype="0" fill="hold" nodeType="withEffect">
-                                  <p:stCondLst>
-                                    <p:cond delay="0"/>
-                                  </p:stCondLst>
-                                  <p:childTnLst>
-                                    <p:set>
-                                      <p:cBhvr>
-                                        <p:cTn id="15" dur="1" fill="hold">
-                                          <p:stCondLst>
-                                            <p:cond delay="0"/>
-                                          </p:stCondLst>
-                                        </p:cTn>
-                                        <p:tgtEl>
-                                          <p:spTgt spid="19"/>
-                                        </p:tgtEl>
-                                        <p:attrNameLst>
-                                          <p:attrName>style.visibility</p:attrName>
-                                        </p:attrNameLst>
-                                      </p:cBhvr>
-                                      <p:to>
-                                        <p:strVal val="visible"/>
-                                      </p:to>
-                                    </p:set>
-                                    <p:animEffect transition="in" filter="fade">
-                                      <p:cBhvr>
-                                        <p:cTn id="16" dur="500"/>
-                                        <p:tgtEl>
-                                          <p:spTgt spid="19"/>
-                                        </p:tgtEl>
-                                      </p:cBhvr>
-                                    </p:animEffect>
-                                  </p:childTnLst>
-                                </p:cTn>
-                              </p:par>
-                              <p:par>
-                                <p:cTn id="17" presetID="10" presetClass="entr" presetSubtype="0" fill="hold" nodeType="withEffect">
-                                  <p:stCondLst>
-                                    <p:cond delay="0"/>
-                                  </p:stCondLst>
-                                  <p:childTnLst>
-                                    <p:set>
-                                      <p:cBhvr>
-                                        <p:cTn id="18" dur="1" fill="hold">
-                                          <p:stCondLst>
-                                            <p:cond delay="0"/>
-                                          </p:stCondLst>
-                                        </p:cTn>
-                                        <p:tgtEl>
-                                          <p:spTgt spid="20"/>
-                                        </p:tgtEl>
-                                        <p:attrNameLst>
-                                          <p:attrName>style.visibility</p:attrName>
-                                        </p:attrNameLst>
-                                      </p:cBhvr>
-                                      <p:to>
-                                        <p:strVal val="visible"/>
-                                      </p:to>
-                                    </p:set>
-                                    <p:animEffect transition="in" filter="fade">
-                                      <p:cBhvr>
-                                        <p:cTn id="19" dur="500"/>
-                                        <p:tgtEl>
-                                          <p:spTgt spid="20"/>
-                                        </p:tgtEl>
-                                      </p:cBhvr>
-                                    </p:animEffect>
-                                  </p:childTnLst>
-                                </p:cTn>
-                              </p:par>
-                              <p:par>
-                                <p:cTn id="20" presetID="10" presetClass="entr" presetSubtype="0" fill="hold" grpId="0" nodeType="withEffect">
-                                  <p:stCondLst>
-                                    <p:cond delay="0"/>
-                                  </p:stCondLst>
-                                  <p:childTnLst>
-                                    <p:set>
-                                      <p:cBhvr>
-                                        <p:cTn id="21" dur="1" fill="hold">
-                                          <p:stCondLst>
-                                            <p:cond delay="0"/>
-                                          </p:stCondLst>
-                                        </p:cTn>
-                                        <p:tgtEl>
-                                          <p:spTgt spid="21"/>
-                                        </p:tgtEl>
-                                        <p:attrNameLst>
-                                          <p:attrName>style.visibility</p:attrName>
-                                        </p:attrNameLst>
-                                      </p:cBhvr>
-                                      <p:to>
-                                        <p:strVal val="visible"/>
-                                      </p:to>
-                                    </p:set>
-                                    <p:animEffect transition="in" filter="fade">
-                                      <p:cBhvr>
-                                        <p:cTn id="22" dur="500"/>
-                                        <p:tgtEl>
-                                          <p:spTgt spid="21"/>
-                                        </p:tgtEl>
-                                      </p:cBhvr>
-                                    </p:animEffect>
-                                  </p:childTnLst>
-                                </p:cTn>
-                              </p:par>
-                              <p:par>
-                                <p:cTn id="23" presetID="10" presetClass="entr" presetSubtype="0" fill="hold" grpId="0" nodeType="withEffect">
-                                  <p:stCondLst>
-                                    <p:cond delay="0"/>
-                                  </p:stCondLst>
-                                  <p:childTnLst>
-                                    <p:set>
-                                      <p:cBhvr>
-                                        <p:cTn id="24" dur="1" fill="hold">
-                                          <p:stCondLst>
-                                            <p:cond delay="0"/>
-                                          </p:stCondLst>
-                                        </p:cTn>
-                                        <p:tgtEl>
-                                          <p:spTgt spid="22"/>
-                                        </p:tgtEl>
-                                        <p:attrNameLst>
-                                          <p:attrName>style.visibility</p:attrName>
-                                        </p:attrNameLst>
-                                      </p:cBhvr>
-                                      <p:to>
-                                        <p:strVal val="visible"/>
-                                      </p:to>
-                                    </p:set>
-                                    <p:animEffect transition="in" filter="fade">
-                                      <p:cBhvr>
-                                        <p:cTn id="25" dur="500"/>
-                                        <p:tgtEl>
-                                          <p:spTgt spid="22"/>
-                                        </p:tgtEl>
-                                      </p:cBhvr>
-                                    </p:animEffect>
-                                  </p:childTnLst>
-                                </p:cTn>
-                              </p:par>
-                              <p:par>
-                                <p:cTn id="26" presetID="10" presetClass="entr" presetSubtype="0" fill="hold" grpId="0" nodeType="withEffect">
-                                  <p:stCondLst>
-                                    <p:cond delay="0"/>
-                                  </p:stCondLst>
-                                  <p:childTnLst>
-                                    <p:set>
-                                      <p:cBhvr>
-                                        <p:cTn id="27" dur="1" fill="hold">
-                                          <p:stCondLst>
-                                            <p:cond delay="0"/>
-                                          </p:stCondLst>
-                                        </p:cTn>
-                                        <p:tgtEl>
-                                          <p:spTgt spid="23"/>
-                                        </p:tgtEl>
-                                        <p:attrNameLst>
-                                          <p:attrName>style.visibility</p:attrName>
-                                        </p:attrNameLst>
-                                      </p:cBhvr>
-                                      <p:to>
-                                        <p:strVal val="visible"/>
-                                      </p:to>
-                                    </p:set>
-                                    <p:animEffect transition="in" filter="fade">
-                                      <p:cBhvr>
-                                        <p:cTn id="28" dur="500"/>
-                                        <p:tgtEl>
-                                          <p:spTgt spid="23"/>
-                                        </p:tgtEl>
-                                      </p:cBhvr>
-                                    </p:animEffect>
-                                  </p:childTnLst>
-                                </p:cTn>
-                              </p:par>
-                            </p:childTnLst>
-                          </p:cTn>
-                        </p:par>
-                      </p:childTnLst>
-                    </p:cTn>
-                  </p:par>
-                </p:childTnLst>
-              </p:cTn>
-              <p:prevCondLst>
-                <p:cond evt="onPrev" delay="0">
-                  <p:tgtEl>
-                    <p:sldTgt/>
-                  </p:tgtEl>
-                </p:cond>
-              </p:prevCondLst>
-              <p:nextCondLst>
-                <p:cond evt="onNext" delay="0">
-                  <p:tgtEl>
-                    <p:sldTgt/>
-                  </p:tgtEl>
-                </p:cond>
-              </p:nextCondLst>
-            </p:seq>
-          </p:childTnLst>
-        </p:cTn>
-      </p:par>
-    </p:tnLst>
-    <p:bldLst>
-      <p:bldP spid="16" grpId="0"/>
-      <p:bldP spid="21" grpId="0"/>
-      <p:bldP spid="22" grpId="0"/>
-      <p:bldP spid="23" grpId="0"/>
-    </p:bldLst>
-  </p:timing>
 </p:sld>
 </file>
 

</xml_diff>